<commit_message>
Update Introduction to Time Series Analysis.pptx
</commit_message>
<xml_diff>
--- a/tsa/Introduction to Time Series Analysis.pptx
+++ b/tsa/Introduction to Time Series Analysis.pptx
@@ -5,13 +5,29 @@
     <p:sldMasterId id="2147483707" r:id="rId1"/>
   </p:sldMasterIdLst>
   <p:notesMasterIdLst>
-    <p:notesMasterId r:id="rId6"/>
+    <p:notesMasterId r:id="rId22"/>
   </p:notesMasterIdLst>
   <p:sldIdLst>
     <p:sldId id="266" r:id="rId2"/>
     <p:sldId id="264" r:id="rId3"/>
-    <p:sldId id="267" r:id="rId4"/>
-    <p:sldId id="268" r:id="rId5"/>
+    <p:sldId id="269" r:id="rId4"/>
+    <p:sldId id="278" r:id="rId5"/>
+    <p:sldId id="267" r:id="rId6"/>
+    <p:sldId id="270" r:id="rId7"/>
+    <p:sldId id="272" r:id="rId8"/>
+    <p:sldId id="277" r:id="rId9"/>
+    <p:sldId id="276" r:id="rId10"/>
+    <p:sldId id="273" r:id="rId11"/>
+    <p:sldId id="274" r:id="rId12"/>
+    <p:sldId id="275" r:id="rId13"/>
+    <p:sldId id="279" r:id="rId14"/>
+    <p:sldId id="280" r:id="rId15"/>
+    <p:sldId id="281" r:id="rId16"/>
+    <p:sldId id="282" r:id="rId17"/>
+    <p:sldId id="283" r:id="rId18"/>
+    <p:sldId id="284" r:id="rId19"/>
+    <p:sldId id="285" r:id="rId20"/>
+    <p:sldId id="268" r:id="rId21"/>
   </p:sldIdLst>
   <p:sldSz cx="12192000" cy="6858000"/>
   <p:notesSz cx="6858000" cy="9144000"/>
@@ -200,7 +216,7 @@
           <a:p>
             <a:fld id="{D46E3B93-8523-4DBC-8FC5-65A9B9CDE5EE}" type="datetimeFigureOut">
               <a:rPr lang="en-US" smtClean="0"/>
-              <a:t>6/22/2019</a:t>
+              <a:t>7/17/2019</a:t>
             </a:fld>
             <a:endParaRPr lang="en-US"/>
           </a:p>
@@ -596,7 +612,7 @@
           <a:p>
             <a:fld id="{CE8F6EB4-B6EF-44F6-BBD1-CD5E279CFAE2}" type="datetime4">
               <a:rPr lang="en-US" smtClean="0"/>
-              <a:t>June 22, 2019</a:t>
+              <a:t>July 17, 2019</a:t>
             </a:fld>
             <a:endParaRPr lang="en-US" dirty="0"/>
           </a:p>
@@ -768,7 +784,7 @@
           <a:p>
             <a:fld id="{8A405AA7-4C18-4A99-8AAA-8677C1976FC9}" type="datetime4">
               <a:rPr lang="en-US" smtClean="0"/>
-              <a:t>June 22, 2019</a:t>
+              <a:t>July 17, 2019</a:t>
             </a:fld>
             <a:endParaRPr lang="en-US" dirty="0"/>
           </a:p>
@@ -950,7 +966,7 @@
           <a:p>
             <a:fld id="{4EA0D668-33DD-41B9-B668-7E7FF430C345}" type="datetime4">
               <a:rPr lang="en-US" smtClean="0"/>
-              <a:t>June 22, 2019</a:t>
+              <a:t>July 17, 2019</a:t>
             </a:fld>
             <a:endParaRPr lang="en-US" dirty="0"/>
           </a:p>
@@ -1133,7 +1149,7 @@
           <a:p>
             <a:fld id="{8AAE40A0-A7D8-4DC3-BC9E-BADA32DA2004}" type="datetime4">
               <a:rPr lang="en-US" smtClean="0"/>
-              <a:t>June 22, 2019</a:t>
+              <a:t>July 17, 2019</a:t>
             </a:fld>
             <a:endParaRPr lang="en-US" dirty="0"/>
           </a:p>
@@ -1460,7 +1476,7 @@
           <a:p>
             <a:fld id="{B08FEED8-D7D4-44E9-BFBC-ED06B5996D94}" type="datetime4">
               <a:rPr lang="en-US" smtClean="0"/>
-              <a:t>June 22, 2019</a:t>
+              <a:t>July 17, 2019</a:t>
             </a:fld>
             <a:endParaRPr lang="en-US" dirty="0"/>
           </a:p>
@@ -1770,7 +1786,7 @@
           <a:p>
             <a:fld id="{A143C325-9442-4629-8CC6-5CAC69736C93}" type="datetime4">
               <a:rPr lang="en-US" smtClean="0"/>
-              <a:t>June 22, 2019</a:t>
+              <a:t>July 17, 2019</a:t>
             </a:fld>
             <a:endParaRPr lang="en-US" dirty="0"/>
           </a:p>
@@ -2138,7 +2154,7 @@
           <a:p>
             <a:fld id="{EEDAFACB-3FED-4607-9FDD-34A82581A119}" type="datetime4">
               <a:rPr lang="en-US" smtClean="0"/>
-              <a:t>June 22, 2019</a:t>
+              <a:t>July 17, 2019</a:t>
             </a:fld>
             <a:endParaRPr lang="en-US" dirty="0"/>
           </a:p>
@@ -2259,7 +2275,7 @@
           <a:p>
             <a:fld id="{EC2805D6-2E3E-42F7-ABBA-DCD51C704328}" type="datetime4">
               <a:rPr lang="en-US" smtClean="0"/>
-              <a:t>June 22, 2019</a:t>
+              <a:t>July 17, 2019</a:t>
             </a:fld>
             <a:endParaRPr lang="en-US" dirty="0"/>
           </a:p>
@@ -2358,7 +2374,7 @@
           <a:p>
             <a:fld id="{7A745AAB-8888-45FB-8C4E-B86AF9A05200}" type="datetime4">
               <a:rPr lang="en-US" smtClean="0"/>
-              <a:t>June 22, 2019</a:t>
+              <a:t>July 17, 2019</a:t>
             </a:fld>
             <a:endParaRPr lang="en-US" dirty="0"/>
           </a:p>
@@ -2637,7 +2653,7 @@
           <a:p>
             <a:fld id="{9F896CED-8AFA-412F-B61A-472E6093CDBA}" type="datetime4">
               <a:rPr lang="en-US" smtClean="0"/>
-              <a:t>June 22, 2019</a:t>
+              <a:t>July 17, 2019</a:t>
             </a:fld>
             <a:endParaRPr lang="en-US" dirty="0"/>
           </a:p>
@@ -2896,7 +2912,7 @@
           <a:p>
             <a:fld id="{61078AB2-2970-444D-B1FF-A9F37FC020F5}" type="datetime4">
               <a:rPr lang="en-US" smtClean="0"/>
-              <a:t>June 22, 2019</a:t>
+              <a:t>July 17, 2019</a:t>
             </a:fld>
             <a:endParaRPr lang="en-US" dirty="0"/>
           </a:p>
@@ -3114,7 +3130,7 @@
           <a:p>
             <a:fld id="{1148AE1E-D441-45CD-8192-49B13802301D}" type="datetime4">
               <a:rPr lang="en-US" smtClean="0"/>
-              <a:t>June 22, 2019</a:t>
+              <a:t>July 17, 2019</a:t>
             </a:fld>
             <a:endParaRPr lang="en-US" dirty="0"/>
           </a:p>
@@ -3843,6 +3859,1999 @@
 </p:sld>
 </file>
 
+<file path=ppt/slides/slide10.xml><?xml version="1.0" encoding="utf-8"?>
+<p:sld xmlns:a="http://schemas.openxmlformats.org/drawingml/2006/main" xmlns:r="http://schemas.openxmlformats.org/officeDocument/2006/relationships" xmlns:p="http://schemas.openxmlformats.org/presentationml/2006/main">
+  <p:cSld>
+    <p:spTree>
+      <p:nvGrpSpPr>
+        <p:cNvPr id="1" name=""/>
+        <p:cNvGrpSpPr/>
+        <p:nvPr/>
+      </p:nvGrpSpPr>
+      <p:grpSpPr>
+        <a:xfrm>
+          <a:off x="0" y="0"/>
+          <a:ext cx="0" cy="0"/>
+          <a:chOff x="0" y="0"/>
+          <a:chExt cx="0" cy="0"/>
+        </a:xfrm>
+      </p:grpSpPr>
+      <p:sp>
+        <p:nvSpPr>
+          <p:cNvPr id="7" name="Title 6">
+            <a:extLst>
+              <a:ext uri="{FF2B5EF4-FFF2-40B4-BE49-F238E27FC236}">
+                <a16:creationId xmlns:a16="http://schemas.microsoft.com/office/drawing/2014/main" id="{184E2338-1026-45D4-9455-B21A88F18B28}"/>
+              </a:ext>
+            </a:extLst>
+          </p:cNvPr>
+          <p:cNvSpPr>
+            <a:spLocks noGrp="1"/>
+          </p:cNvSpPr>
+          <p:nvPr>
+            <p:ph type="title"/>
+          </p:nvPr>
+        </p:nvSpPr>
+        <p:spPr/>
+        <p:txBody>
+          <a:bodyPr/>
+          <a:lstStyle/>
+          <a:p>
+            <a:r>
+              <a:rPr lang="en-US" dirty="0"/>
+              <a:t>HOW TO MAKE YOUR</a:t>
+            </a:r>
+            <a:br>
+              <a:rPr lang="en-US" dirty="0"/>
+            </a:br>
+            <a:r>
+              <a:rPr lang="en-US" dirty="0"/>
+              <a:t>DATA STATIONARY</a:t>
+            </a:r>
+          </a:p>
+        </p:txBody>
+      </p:sp>
+      <p:sp>
+        <p:nvSpPr>
+          <p:cNvPr id="8" name="Text Placeholder 7">
+            <a:extLst>
+              <a:ext uri="{FF2B5EF4-FFF2-40B4-BE49-F238E27FC236}">
+                <a16:creationId xmlns:a16="http://schemas.microsoft.com/office/drawing/2014/main" id="{DB42CCAB-C8E2-48A8-A9DF-EB0383A8B33C}"/>
+              </a:ext>
+            </a:extLst>
+          </p:cNvPr>
+          <p:cNvSpPr>
+            <a:spLocks noGrp="1"/>
+          </p:cNvSpPr>
+          <p:nvPr>
+            <p:ph type="body" idx="1"/>
+          </p:nvPr>
+        </p:nvSpPr>
+        <p:spPr/>
+        <p:txBody>
+          <a:bodyPr/>
+          <a:lstStyle/>
+          <a:p>
+            <a:r>
+              <a:rPr lang="en-US" dirty="0"/>
+              <a:t>Make your data appetizing for modeling</a:t>
+            </a:r>
+          </a:p>
+        </p:txBody>
+      </p:sp>
+      <p:sp>
+        <p:nvSpPr>
+          <p:cNvPr id="4" name="Date Placeholder 3">
+            <a:extLst>
+              <a:ext uri="{FF2B5EF4-FFF2-40B4-BE49-F238E27FC236}">
+                <a16:creationId xmlns:a16="http://schemas.microsoft.com/office/drawing/2014/main" id="{1CA94ACB-62A5-4F09-8C21-F0CE9BFB1606}"/>
+              </a:ext>
+            </a:extLst>
+          </p:cNvPr>
+          <p:cNvSpPr>
+            <a:spLocks noGrp="1"/>
+          </p:cNvSpPr>
+          <p:nvPr>
+            <p:ph type="dt" sz="half" idx="10"/>
+          </p:nvPr>
+        </p:nvSpPr>
+        <p:spPr/>
+        <p:txBody>
+          <a:bodyPr/>
+          <a:lstStyle/>
+          <a:p>
+            <a:fld id="{8AAE40A0-A7D8-4DC3-BC9E-BADA32DA2004}" type="datetime4">
+              <a:rPr lang="en-US" smtClean="0"/>
+              <a:t>July 17, 2019</a:t>
+            </a:fld>
+            <a:endParaRPr lang="en-US" dirty="0"/>
+          </a:p>
+        </p:txBody>
+      </p:sp>
+      <p:sp>
+        <p:nvSpPr>
+          <p:cNvPr id="5" name="Footer Placeholder 4">
+            <a:extLst>
+              <a:ext uri="{FF2B5EF4-FFF2-40B4-BE49-F238E27FC236}">
+                <a16:creationId xmlns:a16="http://schemas.microsoft.com/office/drawing/2014/main" id="{D20B02B0-893D-4696-B6F7-A126B8D18E99}"/>
+              </a:ext>
+            </a:extLst>
+          </p:cNvPr>
+          <p:cNvSpPr>
+            <a:spLocks noGrp="1"/>
+          </p:cNvSpPr>
+          <p:nvPr>
+            <p:ph type="ftr" sz="quarter" idx="11"/>
+          </p:nvPr>
+        </p:nvSpPr>
+        <p:spPr/>
+        <p:txBody>
+          <a:bodyPr/>
+          <a:lstStyle/>
+          <a:p>
+            <a:r>
+              <a:rPr lang="en-US"/>
+              <a:t>Digital Scholarship Services </a:t>
+            </a:r>
+            <a:r>
+              <a:rPr lang="en-US">
+                <a:solidFill>
+                  <a:schemeClr val="accent1">
+                    <a:lumMod val="50000"/>
+                  </a:schemeClr>
+                </a:solidFill>
+              </a:rPr>
+              <a:t>| Email</a:t>
+            </a:r>
+            <a:r>
+              <a:rPr lang="en-US"/>
+              <a:t> cf24@rice.edu </a:t>
+            </a:r>
+            <a:r>
+              <a:rPr lang="en-US">
+                <a:solidFill>
+                  <a:schemeClr val="accent1">
+                    <a:lumMod val="50000"/>
+                  </a:schemeClr>
+                </a:solidFill>
+              </a:rPr>
+              <a:t>|</a:t>
+            </a:r>
+            <a:r>
+              <a:rPr lang="en-US"/>
+              <a:t> library.rice.edu/dss</a:t>
+            </a:r>
+            <a:endParaRPr lang="en-US" dirty="0"/>
+          </a:p>
+        </p:txBody>
+      </p:sp>
+      <p:sp>
+        <p:nvSpPr>
+          <p:cNvPr id="6" name="Slide Number Placeholder 5">
+            <a:extLst>
+              <a:ext uri="{FF2B5EF4-FFF2-40B4-BE49-F238E27FC236}">
+                <a16:creationId xmlns:a16="http://schemas.microsoft.com/office/drawing/2014/main" id="{1CFDA495-0063-4571-8969-0DD770DB39E0}"/>
+              </a:ext>
+            </a:extLst>
+          </p:cNvPr>
+          <p:cNvSpPr>
+            <a:spLocks noGrp="1"/>
+          </p:cNvSpPr>
+          <p:nvPr>
+            <p:ph type="sldNum" sz="quarter" idx="12"/>
+          </p:nvPr>
+        </p:nvSpPr>
+        <p:spPr/>
+        <p:txBody>
+          <a:bodyPr/>
+          <a:lstStyle/>
+          <a:p>
+            <a:fld id="{D57F1E4F-1CFF-5643-939E-02111984F565}" type="slidenum">
+              <a:rPr lang="en-US" smtClean="0"/>
+              <a:t>10</a:t>
+            </a:fld>
+            <a:endParaRPr lang="en-US" dirty="0"/>
+          </a:p>
+        </p:txBody>
+      </p:sp>
+    </p:spTree>
+    <p:extLst>
+      <p:ext uri="{BB962C8B-B14F-4D97-AF65-F5344CB8AC3E}">
+        <p14:creationId xmlns:p14="http://schemas.microsoft.com/office/powerpoint/2010/main" val="3850339889"/>
+      </p:ext>
+    </p:extLst>
+  </p:cSld>
+  <p:clrMapOvr>
+    <a:masterClrMapping/>
+  </p:clrMapOvr>
+</p:sld>
+</file>
+
+<file path=ppt/slides/slide11.xml><?xml version="1.0" encoding="utf-8"?>
+<p:sld xmlns:a="http://schemas.openxmlformats.org/drawingml/2006/main" xmlns:r="http://schemas.openxmlformats.org/officeDocument/2006/relationships" xmlns:p="http://schemas.openxmlformats.org/presentationml/2006/main">
+  <p:cSld>
+    <p:spTree>
+      <p:nvGrpSpPr>
+        <p:cNvPr id="1" name=""/>
+        <p:cNvGrpSpPr/>
+        <p:nvPr/>
+      </p:nvGrpSpPr>
+      <p:grpSpPr>
+        <a:xfrm>
+          <a:off x="0" y="0"/>
+          <a:ext cx="0" cy="0"/>
+          <a:chOff x="0" y="0"/>
+          <a:chExt cx="0" cy="0"/>
+        </a:xfrm>
+      </p:grpSpPr>
+      <p:sp>
+        <p:nvSpPr>
+          <p:cNvPr id="7" name="Title 6">
+            <a:extLst>
+              <a:ext uri="{FF2B5EF4-FFF2-40B4-BE49-F238E27FC236}">
+                <a16:creationId xmlns:a16="http://schemas.microsoft.com/office/drawing/2014/main" id="{495B4BC0-844B-4414-A623-BEF78AAC1BA1}"/>
+              </a:ext>
+            </a:extLst>
+          </p:cNvPr>
+          <p:cNvSpPr>
+            <a:spLocks noGrp="1"/>
+          </p:cNvSpPr>
+          <p:nvPr>
+            <p:ph type="title"/>
+          </p:nvPr>
+        </p:nvSpPr>
+        <p:spPr/>
+        <p:txBody>
+          <a:bodyPr/>
+          <a:lstStyle/>
+          <a:p>
+            <a:r>
+              <a:rPr lang="en-US" dirty="0"/>
+              <a:t>STATIONARITY</a:t>
+            </a:r>
+          </a:p>
+        </p:txBody>
+      </p:sp>
+      <p:sp>
+        <p:nvSpPr>
+          <p:cNvPr id="8" name="Content Placeholder 7">
+            <a:extLst>
+              <a:ext uri="{FF2B5EF4-FFF2-40B4-BE49-F238E27FC236}">
+                <a16:creationId xmlns:a16="http://schemas.microsoft.com/office/drawing/2014/main" id="{2BED3EB3-7E98-4A82-8335-7321D9E37B16}"/>
+              </a:ext>
+            </a:extLst>
+          </p:cNvPr>
+          <p:cNvSpPr>
+            <a:spLocks noGrp="1"/>
+          </p:cNvSpPr>
+          <p:nvPr>
+            <p:ph idx="1"/>
+          </p:nvPr>
+        </p:nvSpPr>
+        <p:spPr/>
+        <p:txBody>
+          <a:bodyPr/>
+          <a:lstStyle/>
+          <a:p>
+            <a:endParaRPr lang="en-US" dirty="0"/>
+          </a:p>
+        </p:txBody>
+      </p:sp>
+      <p:sp>
+        <p:nvSpPr>
+          <p:cNvPr id="4" name="Date Placeholder 3">
+            <a:extLst>
+              <a:ext uri="{FF2B5EF4-FFF2-40B4-BE49-F238E27FC236}">
+                <a16:creationId xmlns:a16="http://schemas.microsoft.com/office/drawing/2014/main" id="{540F37F1-4F33-429F-A568-1A3ADC499E54}"/>
+              </a:ext>
+            </a:extLst>
+          </p:cNvPr>
+          <p:cNvSpPr>
+            <a:spLocks noGrp="1"/>
+          </p:cNvSpPr>
+          <p:nvPr>
+            <p:ph type="dt" sz="half" idx="10"/>
+          </p:nvPr>
+        </p:nvSpPr>
+        <p:spPr/>
+        <p:txBody>
+          <a:bodyPr/>
+          <a:lstStyle/>
+          <a:p>
+            <a:fld id="{B08FEED8-D7D4-44E9-BFBC-ED06B5996D94}" type="datetime4">
+              <a:rPr lang="en-US" smtClean="0"/>
+              <a:t>July 17, 2019</a:t>
+            </a:fld>
+            <a:endParaRPr lang="en-US" dirty="0"/>
+          </a:p>
+        </p:txBody>
+      </p:sp>
+      <p:sp>
+        <p:nvSpPr>
+          <p:cNvPr id="5" name="Footer Placeholder 4">
+            <a:extLst>
+              <a:ext uri="{FF2B5EF4-FFF2-40B4-BE49-F238E27FC236}">
+                <a16:creationId xmlns:a16="http://schemas.microsoft.com/office/drawing/2014/main" id="{673FFA57-C126-4795-A5F6-DD33AAC5ACBD}"/>
+              </a:ext>
+            </a:extLst>
+          </p:cNvPr>
+          <p:cNvSpPr>
+            <a:spLocks noGrp="1"/>
+          </p:cNvSpPr>
+          <p:nvPr>
+            <p:ph type="ftr" sz="quarter" idx="11"/>
+          </p:nvPr>
+        </p:nvSpPr>
+        <p:spPr/>
+        <p:txBody>
+          <a:bodyPr/>
+          <a:lstStyle/>
+          <a:p>
+            <a:r>
+              <a:rPr lang="en-US"/>
+              <a:t>Digital Scholarship Services </a:t>
+            </a:r>
+            <a:r>
+              <a:rPr lang="en-US">
+                <a:solidFill>
+                  <a:schemeClr val="accent1">
+                    <a:lumMod val="50000"/>
+                  </a:schemeClr>
+                </a:solidFill>
+              </a:rPr>
+              <a:t>| Email</a:t>
+            </a:r>
+            <a:r>
+              <a:rPr lang="en-US"/>
+              <a:t> cf24@rice.edu </a:t>
+            </a:r>
+            <a:r>
+              <a:rPr lang="en-US">
+                <a:solidFill>
+                  <a:schemeClr val="accent1">
+                    <a:lumMod val="50000"/>
+                  </a:schemeClr>
+                </a:solidFill>
+              </a:rPr>
+              <a:t>|</a:t>
+            </a:r>
+            <a:r>
+              <a:rPr lang="en-US"/>
+              <a:t> library.rice.edu/dss</a:t>
+            </a:r>
+            <a:endParaRPr lang="en-US" dirty="0"/>
+          </a:p>
+        </p:txBody>
+      </p:sp>
+      <p:sp>
+        <p:nvSpPr>
+          <p:cNvPr id="6" name="Slide Number Placeholder 5">
+            <a:extLst>
+              <a:ext uri="{FF2B5EF4-FFF2-40B4-BE49-F238E27FC236}">
+                <a16:creationId xmlns:a16="http://schemas.microsoft.com/office/drawing/2014/main" id="{2FA49567-BB70-4798-8746-D0B522CCEE20}"/>
+              </a:ext>
+            </a:extLst>
+          </p:cNvPr>
+          <p:cNvSpPr>
+            <a:spLocks noGrp="1"/>
+          </p:cNvSpPr>
+          <p:nvPr>
+            <p:ph type="sldNum" sz="quarter" idx="12"/>
+          </p:nvPr>
+        </p:nvSpPr>
+        <p:spPr/>
+        <p:txBody>
+          <a:bodyPr/>
+          <a:lstStyle/>
+          <a:p>
+            <a:fld id="{D57F1E4F-1CFF-5643-939E-02111984F565}" type="slidenum">
+              <a:rPr lang="en-US" smtClean="0"/>
+              <a:t>11</a:t>
+            </a:fld>
+            <a:endParaRPr lang="en-US" dirty="0"/>
+          </a:p>
+        </p:txBody>
+      </p:sp>
+    </p:spTree>
+    <p:extLst>
+      <p:ext uri="{BB962C8B-B14F-4D97-AF65-F5344CB8AC3E}">
+        <p14:creationId xmlns:p14="http://schemas.microsoft.com/office/powerpoint/2010/main" val="3590493067"/>
+      </p:ext>
+    </p:extLst>
+  </p:cSld>
+  <p:clrMapOvr>
+    <a:masterClrMapping/>
+  </p:clrMapOvr>
+</p:sld>
+</file>
+
+<file path=ppt/slides/slide12.xml><?xml version="1.0" encoding="utf-8"?>
+<p:sld xmlns:a="http://schemas.openxmlformats.org/drawingml/2006/main" xmlns:r="http://schemas.openxmlformats.org/officeDocument/2006/relationships" xmlns:p="http://schemas.openxmlformats.org/presentationml/2006/main">
+  <p:cSld>
+    <p:spTree>
+      <p:nvGrpSpPr>
+        <p:cNvPr id="1" name=""/>
+        <p:cNvGrpSpPr/>
+        <p:nvPr/>
+      </p:nvGrpSpPr>
+      <p:grpSpPr>
+        <a:xfrm>
+          <a:off x="0" y="0"/>
+          <a:ext cx="0" cy="0"/>
+          <a:chOff x="0" y="0"/>
+          <a:chExt cx="0" cy="0"/>
+        </a:xfrm>
+      </p:grpSpPr>
+      <p:sp>
+        <p:nvSpPr>
+          <p:cNvPr id="7" name="Title 6">
+            <a:extLst>
+              <a:ext uri="{FF2B5EF4-FFF2-40B4-BE49-F238E27FC236}">
+                <a16:creationId xmlns:a16="http://schemas.microsoft.com/office/drawing/2014/main" id="{495B4BC0-844B-4414-A623-BEF78AAC1BA1}"/>
+              </a:ext>
+            </a:extLst>
+          </p:cNvPr>
+          <p:cNvSpPr>
+            <a:spLocks noGrp="1"/>
+          </p:cNvSpPr>
+          <p:nvPr>
+            <p:ph type="title"/>
+          </p:nvPr>
+        </p:nvSpPr>
+        <p:spPr/>
+        <p:txBody>
+          <a:bodyPr/>
+          <a:lstStyle/>
+          <a:p>
+            <a:r>
+              <a:rPr lang="en-US" dirty="0"/>
+              <a:t>DETRENDING</a:t>
+            </a:r>
+          </a:p>
+        </p:txBody>
+      </p:sp>
+      <p:sp>
+        <p:nvSpPr>
+          <p:cNvPr id="8" name="Content Placeholder 7">
+            <a:extLst>
+              <a:ext uri="{FF2B5EF4-FFF2-40B4-BE49-F238E27FC236}">
+                <a16:creationId xmlns:a16="http://schemas.microsoft.com/office/drawing/2014/main" id="{2BED3EB3-7E98-4A82-8335-7321D9E37B16}"/>
+              </a:ext>
+            </a:extLst>
+          </p:cNvPr>
+          <p:cNvSpPr>
+            <a:spLocks noGrp="1"/>
+          </p:cNvSpPr>
+          <p:nvPr>
+            <p:ph idx="1"/>
+          </p:nvPr>
+        </p:nvSpPr>
+        <p:spPr/>
+        <p:txBody>
+          <a:bodyPr/>
+          <a:lstStyle/>
+          <a:p>
+            <a:endParaRPr lang="en-US" dirty="0"/>
+          </a:p>
+        </p:txBody>
+      </p:sp>
+      <p:sp>
+        <p:nvSpPr>
+          <p:cNvPr id="4" name="Date Placeholder 3">
+            <a:extLst>
+              <a:ext uri="{FF2B5EF4-FFF2-40B4-BE49-F238E27FC236}">
+                <a16:creationId xmlns:a16="http://schemas.microsoft.com/office/drawing/2014/main" id="{540F37F1-4F33-429F-A568-1A3ADC499E54}"/>
+              </a:ext>
+            </a:extLst>
+          </p:cNvPr>
+          <p:cNvSpPr>
+            <a:spLocks noGrp="1"/>
+          </p:cNvSpPr>
+          <p:nvPr>
+            <p:ph type="dt" sz="half" idx="10"/>
+          </p:nvPr>
+        </p:nvSpPr>
+        <p:spPr/>
+        <p:txBody>
+          <a:bodyPr/>
+          <a:lstStyle/>
+          <a:p>
+            <a:fld id="{B08FEED8-D7D4-44E9-BFBC-ED06B5996D94}" type="datetime4">
+              <a:rPr lang="en-US" smtClean="0"/>
+              <a:t>July 17, 2019</a:t>
+            </a:fld>
+            <a:endParaRPr lang="en-US" dirty="0"/>
+          </a:p>
+        </p:txBody>
+      </p:sp>
+      <p:sp>
+        <p:nvSpPr>
+          <p:cNvPr id="5" name="Footer Placeholder 4">
+            <a:extLst>
+              <a:ext uri="{FF2B5EF4-FFF2-40B4-BE49-F238E27FC236}">
+                <a16:creationId xmlns:a16="http://schemas.microsoft.com/office/drawing/2014/main" id="{673FFA57-C126-4795-A5F6-DD33AAC5ACBD}"/>
+              </a:ext>
+            </a:extLst>
+          </p:cNvPr>
+          <p:cNvSpPr>
+            <a:spLocks noGrp="1"/>
+          </p:cNvSpPr>
+          <p:nvPr>
+            <p:ph type="ftr" sz="quarter" idx="11"/>
+          </p:nvPr>
+        </p:nvSpPr>
+        <p:spPr/>
+        <p:txBody>
+          <a:bodyPr/>
+          <a:lstStyle/>
+          <a:p>
+            <a:r>
+              <a:rPr lang="en-US"/>
+              <a:t>Digital Scholarship Services </a:t>
+            </a:r>
+            <a:r>
+              <a:rPr lang="en-US">
+                <a:solidFill>
+                  <a:schemeClr val="accent1">
+                    <a:lumMod val="50000"/>
+                  </a:schemeClr>
+                </a:solidFill>
+              </a:rPr>
+              <a:t>| Email</a:t>
+            </a:r>
+            <a:r>
+              <a:rPr lang="en-US"/>
+              <a:t> cf24@rice.edu </a:t>
+            </a:r>
+            <a:r>
+              <a:rPr lang="en-US">
+                <a:solidFill>
+                  <a:schemeClr val="accent1">
+                    <a:lumMod val="50000"/>
+                  </a:schemeClr>
+                </a:solidFill>
+              </a:rPr>
+              <a:t>|</a:t>
+            </a:r>
+            <a:r>
+              <a:rPr lang="en-US"/>
+              <a:t> library.rice.edu/dss</a:t>
+            </a:r>
+            <a:endParaRPr lang="en-US" dirty="0"/>
+          </a:p>
+        </p:txBody>
+      </p:sp>
+      <p:sp>
+        <p:nvSpPr>
+          <p:cNvPr id="6" name="Slide Number Placeholder 5">
+            <a:extLst>
+              <a:ext uri="{FF2B5EF4-FFF2-40B4-BE49-F238E27FC236}">
+                <a16:creationId xmlns:a16="http://schemas.microsoft.com/office/drawing/2014/main" id="{2FA49567-BB70-4798-8746-D0B522CCEE20}"/>
+              </a:ext>
+            </a:extLst>
+          </p:cNvPr>
+          <p:cNvSpPr>
+            <a:spLocks noGrp="1"/>
+          </p:cNvSpPr>
+          <p:nvPr>
+            <p:ph type="sldNum" sz="quarter" idx="12"/>
+          </p:nvPr>
+        </p:nvSpPr>
+        <p:spPr/>
+        <p:txBody>
+          <a:bodyPr/>
+          <a:lstStyle/>
+          <a:p>
+            <a:fld id="{D57F1E4F-1CFF-5643-939E-02111984F565}" type="slidenum">
+              <a:rPr lang="en-US" smtClean="0"/>
+              <a:t>12</a:t>
+            </a:fld>
+            <a:endParaRPr lang="en-US" dirty="0"/>
+          </a:p>
+        </p:txBody>
+      </p:sp>
+    </p:spTree>
+    <p:extLst>
+      <p:ext uri="{BB962C8B-B14F-4D97-AF65-F5344CB8AC3E}">
+        <p14:creationId xmlns:p14="http://schemas.microsoft.com/office/powerpoint/2010/main" val="4109370477"/>
+      </p:ext>
+    </p:extLst>
+  </p:cSld>
+  <p:clrMapOvr>
+    <a:masterClrMapping/>
+  </p:clrMapOvr>
+</p:sld>
+</file>
+
+<file path=ppt/slides/slide13.xml><?xml version="1.0" encoding="utf-8"?>
+<p:sld xmlns:a="http://schemas.openxmlformats.org/drawingml/2006/main" xmlns:r="http://schemas.openxmlformats.org/officeDocument/2006/relationships" xmlns:p="http://schemas.openxmlformats.org/presentationml/2006/main">
+  <p:cSld>
+    <p:spTree>
+      <p:nvGrpSpPr>
+        <p:cNvPr id="1" name=""/>
+        <p:cNvGrpSpPr/>
+        <p:nvPr/>
+      </p:nvGrpSpPr>
+      <p:grpSpPr>
+        <a:xfrm>
+          <a:off x="0" y="0"/>
+          <a:ext cx="0" cy="0"/>
+          <a:chOff x="0" y="0"/>
+          <a:chExt cx="0" cy="0"/>
+        </a:xfrm>
+      </p:grpSpPr>
+      <p:sp>
+        <p:nvSpPr>
+          <p:cNvPr id="2" name="Title 1">
+            <a:extLst>
+              <a:ext uri="{FF2B5EF4-FFF2-40B4-BE49-F238E27FC236}">
+                <a16:creationId xmlns:a16="http://schemas.microsoft.com/office/drawing/2014/main" id="{A694862C-8B28-4EF5-9C6F-0187B05C2B03}"/>
+              </a:ext>
+            </a:extLst>
+          </p:cNvPr>
+          <p:cNvSpPr>
+            <a:spLocks noGrp="1"/>
+          </p:cNvSpPr>
+          <p:nvPr>
+            <p:ph type="title"/>
+          </p:nvPr>
+        </p:nvSpPr>
+        <p:spPr/>
+        <p:txBody>
+          <a:bodyPr/>
+          <a:lstStyle/>
+          <a:p>
+            <a:r>
+              <a:rPr lang="en-US" dirty="0"/>
+              <a:t>LAGGING</a:t>
+            </a:r>
+          </a:p>
+        </p:txBody>
+      </p:sp>
+      <p:sp>
+        <p:nvSpPr>
+          <p:cNvPr id="3" name="Content Placeholder 2">
+            <a:extLst>
+              <a:ext uri="{FF2B5EF4-FFF2-40B4-BE49-F238E27FC236}">
+                <a16:creationId xmlns:a16="http://schemas.microsoft.com/office/drawing/2014/main" id="{5DFC40A6-4344-46B7-89C4-4E16031C9B39}"/>
+              </a:ext>
+            </a:extLst>
+          </p:cNvPr>
+          <p:cNvSpPr>
+            <a:spLocks noGrp="1"/>
+          </p:cNvSpPr>
+          <p:nvPr>
+            <p:ph idx="1"/>
+          </p:nvPr>
+        </p:nvSpPr>
+        <p:spPr/>
+        <p:txBody>
+          <a:bodyPr/>
+          <a:lstStyle/>
+          <a:p>
+            <a:endParaRPr lang="en-US"/>
+          </a:p>
+        </p:txBody>
+      </p:sp>
+      <p:sp>
+        <p:nvSpPr>
+          <p:cNvPr id="4" name="Date Placeholder 3">
+            <a:extLst>
+              <a:ext uri="{FF2B5EF4-FFF2-40B4-BE49-F238E27FC236}">
+                <a16:creationId xmlns:a16="http://schemas.microsoft.com/office/drawing/2014/main" id="{ADEE79BB-4734-4439-A76F-2976CABC29C1}"/>
+              </a:ext>
+            </a:extLst>
+          </p:cNvPr>
+          <p:cNvSpPr>
+            <a:spLocks noGrp="1"/>
+          </p:cNvSpPr>
+          <p:nvPr>
+            <p:ph type="dt" sz="half" idx="10"/>
+          </p:nvPr>
+        </p:nvSpPr>
+        <p:spPr/>
+        <p:txBody>
+          <a:bodyPr/>
+          <a:lstStyle/>
+          <a:p>
+            <a:fld id="{8AAE40A0-A7D8-4DC3-BC9E-BADA32DA2004}" type="datetime4">
+              <a:rPr lang="en-US" smtClean="0"/>
+              <a:t>July 17, 2019</a:t>
+            </a:fld>
+            <a:endParaRPr lang="en-US" dirty="0"/>
+          </a:p>
+        </p:txBody>
+      </p:sp>
+      <p:sp>
+        <p:nvSpPr>
+          <p:cNvPr id="5" name="Footer Placeholder 4">
+            <a:extLst>
+              <a:ext uri="{FF2B5EF4-FFF2-40B4-BE49-F238E27FC236}">
+                <a16:creationId xmlns:a16="http://schemas.microsoft.com/office/drawing/2014/main" id="{14093F74-35B5-4B3E-BE77-B47F35290D05}"/>
+              </a:ext>
+            </a:extLst>
+          </p:cNvPr>
+          <p:cNvSpPr>
+            <a:spLocks noGrp="1"/>
+          </p:cNvSpPr>
+          <p:nvPr>
+            <p:ph type="ftr" sz="quarter" idx="11"/>
+          </p:nvPr>
+        </p:nvSpPr>
+        <p:spPr/>
+        <p:txBody>
+          <a:bodyPr/>
+          <a:lstStyle/>
+          <a:p>
+            <a:r>
+              <a:rPr lang="en-US"/>
+              <a:t>Digital Scholarship Services </a:t>
+            </a:r>
+            <a:r>
+              <a:rPr lang="en-US">
+                <a:solidFill>
+                  <a:schemeClr val="accent1">
+                    <a:lumMod val="50000"/>
+                  </a:schemeClr>
+                </a:solidFill>
+              </a:rPr>
+              <a:t>| Email</a:t>
+            </a:r>
+            <a:r>
+              <a:rPr lang="en-US"/>
+              <a:t> cf24@rice.edu </a:t>
+            </a:r>
+            <a:r>
+              <a:rPr lang="en-US">
+                <a:solidFill>
+                  <a:schemeClr val="accent1">
+                    <a:lumMod val="50000"/>
+                  </a:schemeClr>
+                </a:solidFill>
+              </a:rPr>
+              <a:t>|</a:t>
+            </a:r>
+            <a:r>
+              <a:rPr lang="en-US"/>
+              <a:t> library.rice.edu/dss</a:t>
+            </a:r>
+            <a:endParaRPr lang="en-US" dirty="0"/>
+          </a:p>
+        </p:txBody>
+      </p:sp>
+      <p:sp>
+        <p:nvSpPr>
+          <p:cNvPr id="6" name="Slide Number Placeholder 5">
+            <a:extLst>
+              <a:ext uri="{FF2B5EF4-FFF2-40B4-BE49-F238E27FC236}">
+                <a16:creationId xmlns:a16="http://schemas.microsoft.com/office/drawing/2014/main" id="{76F6E8AA-9A3E-467A-A16A-CED9E58CFA80}"/>
+              </a:ext>
+            </a:extLst>
+          </p:cNvPr>
+          <p:cNvSpPr>
+            <a:spLocks noGrp="1"/>
+          </p:cNvSpPr>
+          <p:nvPr>
+            <p:ph type="sldNum" sz="quarter" idx="12"/>
+          </p:nvPr>
+        </p:nvSpPr>
+        <p:spPr/>
+        <p:txBody>
+          <a:bodyPr/>
+          <a:lstStyle/>
+          <a:p>
+            <a:fld id="{D57F1E4F-1CFF-5643-939E-02111984F565}" type="slidenum">
+              <a:rPr lang="en-US" smtClean="0"/>
+              <a:t>13</a:t>
+            </a:fld>
+            <a:endParaRPr lang="en-US" dirty="0"/>
+          </a:p>
+        </p:txBody>
+      </p:sp>
+    </p:spTree>
+    <p:extLst>
+      <p:ext uri="{BB962C8B-B14F-4D97-AF65-F5344CB8AC3E}">
+        <p14:creationId xmlns:p14="http://schemas.microsoft.com/office/powerpoint/2010/main" val="3805551099"/>
+      </p:ext>
+    </p:extLst>
+  </p:cSld>
+  <p:clrMapOvr>
+    <a:masterClrMapping/>
+  </p:clrMapOvr>
+</p:sld>
+</file>
+
+<file path=ppt/slides/slide14.xml><?xml version="1.0" encoding="utf-8"?>
+<p:sld xmlns:a="http://schemas.openxmlformats.org/drawingml/2006/main" xmlns:r="http://schemas.openxmlformats.org/officeDocument/2006/relationships" xmlns:p="http://schemas.openxmlformats.org/presentationml/2006/main">
+  <p:cSld>
+    <p:spTree>
+      <p:nvGrpSpPr>
+        <p:cNvPr id="1" name=""/>
+        <p:cNvGrpSpPr/>
+        <p:nvPr/>
+      </p:nvGrpSpPr>
+      <p:grpSpPr>
+        <a:xfrm>
+          <a:off x="0" y="0"/>
+          <a:ext cx="0" cy="0"/>
+          <a:chOff x="0" y="0"/>
+          <a:chExt cx="0" cy="0"/>
+        </a:xfrm>
+      </p:grpSpPr>
+      <p:sp>
+        <p:nvSpPr>
+          <p:cNvPr id="2" name="Title 1">
+            <a:extLst>
+              <a:ext uri="{FF2B5EF4-FFF2-40B4-BE49-F238E27FC236}">
+                <a16:creationId xmlns:a16="http://schemas.microsoft.com/office/drawing/2014/main" id="{84FE5820-4288-4CB6-888A-5CBF5468888C}"/>
+              </a:ext>
+            </a:extLst>
+          </p:cNvPr>
+          <p:cNvSpPr>
+            <a:spLocks noGrp="1"/>
+          </p:cNvSpPr>
+          <p:nvPr>
+            <p:ph type="title"/>
+          </p:nvPr>
+        </p:nvSpPr>
+        <p:spPr/>
+        <p:txBody>
+          <a:bodyPr/>
+          <a:lstStyle/>
+          <a:p>
+            <a:r>
+              <a:rPr lang="en-US" dirty="0"/>
+              <a:t>LAGGED SCATTERPLOTS</a:t>
+            </a:r>
+          </a:p>
+        </p:txBody>
+      </p:sp>
+      <p:sp>
+        <p:nvSpPr>
+          <p:cNvPr id="3" name="Content Placeholder 2">
+            <a:extLst>
+              <a:ext uri="{FF2B5EF4-FFF2-40B4-BE49-F238E27FC236}">
+                <a16:creationId xmlns:a16="http://schemas.microsoft.com/office/drawing/2014/main" id="{2952943F-FC31-4BE3-AB00-BAB4B12957BE}"/>
+              </a:ext>
+            </a:extLst>
+          </p:cNvPr>
+          <p:cNvSpPr>
+            <a:spLocks noGrp="1"/>
+          </p:cNvSpPr>
+          <p:nvPr>
+            <p:ph idx="1"/>
+          </p:nvPr>
+        </p:nvSpPr>
+        <p:spPr/>
+        <p:txBody>
+          <a:bodyPr/>
+          <a:lstStyle/>
+          <a:p>
+            <a:endParaRPr lang="en-US" dirty="0"/>
+          </a:p>
+        </p:txBody>
+      </p:sp>
+      <p:sp>
+        <p:nvSpPr>
+          <p:cNvPr id="4" name="Date Placeholder 3">
+            <a:extLst>
+              <a:ext uri="{FF2B5EF4-FFF2-40B4-BE49-F238E27FC236}">
+                <a16:creationId xmlns:a16="http://schemas.microsoft.com/office/drawing/2014/main" id="{F716348B-D7FE-46ED-8C48-CF5A55FF31CF}"/>
+              </a:ext>
+            </a:extLst>
+          </p:cNvPr>
+          <p:cNvSpPr>
+            <a:spLocks noGrp="1"/>
+          </p:cNvSpPr>
+          <p:nvPr>
+            <p:ph type="dt" sz="half" idx="10"/>
+          </p:nvPr>
+        </p:nvSpPr>
+        <p:spPr/>
+        <p:txBody>
+          <a:bodyPr/>
+          <a:lstStyle/>
+          <a:p>
+            <a:fld id="{8AAE40A0-A7D8-4DC3-BC9E-BADA32DA2004}" type="datetime4">
+              <a:rPr lang="en-US" smtClean="0"/>
+              <a:t>July 17, 2019</a:t>
+            </a:fld>
+            <a:endParaRPr lang="en-US" dirty="0"/>
+          </a:p>
+        </p:txBody>
+      </p:sp>
+      <p:sp>
+        <p:nvSpPr>
+          <p:cNvPr id="5" name="Footer Placeholder 4">
+            <a:extLst>
+              <a:ext uri="{FF2B5EF4-FFF2-40B4-BE49-F238E27FC236}">
+                <a16:creationId xmlns:a16="http://schemas.microsoft.com/office/drawing/2014/main" id="{34059279-A1E7-4F19-B4BF-8C6B59A4CEFF}"/>
+              </a:ext>
+            </a:extLst>
+          </p:cNvPr>
+          <p:cNvSpPr>
+            <a:spLocks noGrp="1"/>
+          </p:cNvSpPr>
+          <p:nvPr>
+            <p:ph type="ftr" sz="quarter" idx="11"/>
+          </p:nvPr>
+        </p:nvSpPr>
+        <p:spPr/>
+        <p:txBody>
+          <a:bodyPr/>
+          <a:lstStyle/>
+          <a:p>
+            <a:r>
+              <a:rPr lang="en-US"/>
+              <a:t>Digital Scholarship Services </a:t>
+            </a:r>
+            <a:r>
+              <a:rPr lang="en-US">
+                <a:solidFill>
+                  <a:schemeClr val="accent1">
+                    <a:lumMod val="50000"/>
+                  </a:schemeClr>
+                </a:solidFill>
+              </a:rPr>
+              <a:t>| Email</a:t>
+            </a:r>
+            <a:r>
+              <a:rPr lang="en-US"/>
+              <a:t> cf24@rice.edu </a:t>
+            </a:r>
+            <a:r>
+              <a:rPr lang="en-US">
+                <a:solidFill>
+                  <a:schemeClr val="accent1">
+                    <a:lumMod val="50000"/>
+                  </a:schemeClr>
+                </a:solidFill>
+              </a:rPr>
+              <a:t>|</a:t>
+            </a:r>
+            <a:r>
+              <a:rPr lang="en-US"/>
+              <a:t> library.rice.edu/dss</a:t>
+            </a:r>
+            <a:endParaRPr lang="en-US" dirty="0"/>
+          </a:p>
+        </p:txBody>
+      </p:sp>
+      <p:sp>
+        <p:nvSpPr>
+          <p:cNvPr id="6" name="Slide Number Placeholder 5">
+            <a:extLst>
+              <a:ext uri="{FF2B5EF4-FFF2-40B4-BE49-F238E27FC236}">
+                <a16:creationId xmlns:a16="http://schemas.microsoft.com/office/drawing/2014/main" id="{DE722C41-7366-4DE2-9AF4-E75E189A7733}"/>
+              </a:ext>
+            </a:extLst>
+          </p:cNvPr>
+          <p:cNvSpPr>
+            <a:spLocks noGrp="1"/>
+          </p:cNvSpPr>
+          <p:nvPr>
+            <p:ph type="sldNum" sz="quarter" idx="12"/>
+          </p:nvPr>
+        </p:nvSpPr>
+        <p:spPr/>
+        <p:txBody>
+          <a:bodyPr/>
+          <a:lstStyle/>
+          <a:p>
+            <a:fld id="{D57F1E4F-1CFF-5643-939E-02111984F565}" type="slidenum">
+              <a:rPr lang="en-US" smtClean="0"/>
+              <a:t>14</a:t>
+            </a:fld>
+            <a:endParaRPr lang="en-US" dirty="0"/>
+          </a:p>
+        </p:txBody>
+      </p:sp>
+    </p:spTree>
+    <p:extLst>
+      <p:ext uri="{BB962C8B-B14F-4D97-AF65-F5344CB8AC3E}">
+        <p14:creationId xmlns:p14="http://schemas.microsoft.com/office/powerpoint/2010/main" val="2399367561"/>
+      </p:ext>
+    </p:extLst>
+  </p:cSld>
+  <p:clrMapOvr>
+    <a:masterClrMapping/>
+  </p:clrMapOvr>
+</p:sld>
+</file>
+
+<file path=ppt/slides/slide15.xml><?xml version="1.0" encoding="utf-8"?>
+<p:sld xmlns:a="http://schemas.openxmlformats.org/drawingml/2006/main" xmlns:r="http://schemas.openxmlformats.org/officeDocument/2006/relationships" xmlns:p="http://schemas.openxmlformats.org/presentationml/2006/main">
+  <p:cSld>
+    <p:spTree>
+      <p:nvGrpSpPr>
+        <p:cNvPr id="1" name=""/>
+        <p:cNvGrpSpPr/>
+        <p:nvPr/>
+      </p:nvGrpSpPr>
+      <p:grpSpPr>
+        <a:xfrm>
+          <a:off x="0" y="0"/>
+          <a:ext cx="0" cy="0"/>
+          <a:chOff x="0" y="0"/>
+          <a:chExt cx="0" cy="0"/>
+        </a:xfrm>
+      </p:grpSpPr>
+      <p:sp>
+        <p:nvSpPr>
+          <p:cNvPr id="7" name="Title 6">
+            <a:extLst>
+              <a:ext uri="{FF2B5EF4-FFF2-40B4-BE49-F238E27FC236}">
+                <a16:creationId xmlns:a16="http://schemas.microsoft.com/office/drawing/2014/main" id="{7802FB34-7510-47BC-8952-A1FE9728B0BF}"/>
+              </a:ext>
+            </a:extLst>
+          </p:cNvPr>
+          <p:cNvSpPr>
+            <a:spLocks noGrp="1"/>
+          </p:cNvSpPr>
+          <p:nvPr>
+            <p:ph type="title"/>
+          </p:nvPr>
+        </p:nvSpPr>
+        <p:spPr/>
+        <p:txBody>
+          <a:bodyPr/>
+          <a:lstStyle/>
+          <a:p>
+            <a:r>
+              <a:rPr lang="en-US" dirty="0"/>
+              <a:t>ARIMA MODELS</a:t>
+            </a:r>
+          </a:p>
+        </p:txBody>
+      </p:sp>
+      <p:sp>
+        <p:nvSpPr>
+          <p:cNvPr id="8" name="Text Placeholder 7">
+            <a:extLst>
+              <a:ext uri="{FF2B5EF4-FFF2-40B4-BE49-F238E27FC236}">
+                <a16:creationId xmlns:a16="http://schemas.microsoft.com/office/drawing/2014/main" id="{FCA70F1A-579E-4144-AE97-14FFC08FF0F5}"/>
+              </a:ext>
+            </a:extLst>
+          </p:cNvPr>
+          <p:cNvSpPr>
+            <a:spLocks noGrp="1"/>
+          </p:cNvSpPr>
+          <p:nvPr>
+            <p:ph type="body" idx="1"/>
+          </p:nvPr>
+        </p:nvSpPr>
+        <p:spPr/>
+        <p:txBody>
+          <a:bodyPr/>
+          <a:lstStyle/>
+          <a:p>
+            <a:r>
+              <a:rPr lang="en-US" dirty="0"/>
+              <a:t>Interpretable, simple and speedy time series modeling</a:t>
+            </a:r>
+          </a:p>
+        </p:txBody>
+      </p:sp>
+      <p:sp>
+        <p:nvSpPr>
+          <p:cNvPr id="4" name="Date Placeholder 3">
+            <a:extLst>
+              <a:ext uri="{FF2B5EF4-FFF2-40B4-BE49-F238E27FC236}">
+                <a16:creationId xmlns:a16="http://schemas.microsoft.com/office/drawing/2014/main" id="{3AD929EF-0967-4B34-81B8-24D9EF91892E}"/>
+              </a:ext>
+            </a:extLst>
+          </p:cNvPr>
+          <p:cNvSpPr>
+            <a:spLocks noGrp="1"/>
+          </p:cNvSpPr>
+          <p:nvPr>
+            <p:ph type="dt" sz="half" idx="10"/>
+          </p:nvPr>
+        </p:nvSpPr>
+        <p:spPr/>
+        <p:txBody>
+          <a:bodyPr/>
+          <a:lstStyle/>
+          <a:p>
+            <a:fld id="{8AAE40A0-A7D8-4DC3-BC9E-BADA32DA2004}" type="datetime4">
+              <a:rPr lang="en-US" smtClean="0"/>
+              <a:t>July 17, 2019</a:t>
+            </a:fld>
+            <a:endParaRPr lang="en-US" dirty="0"/>
+          </a:p>
+        </p:txBody>
+      </p:sp>
+      <p:sp>
+        <p:nvSpPr>
+          <p:cNvPr id="5" name="Footer Placeholder 4">
+            <a:extLst>
+              <a:ext uri="{FF2B5EF4-FFF2-40B4-BE49-F238E27FC236}">
+                <a16:creationId xmlns:a16="http://schemas.microsoft.com/office/drawing/2014/main" id="{3B5B35DD-F2EA-40D3-8039-8CD3802B2612}"/>
+              </a:ext>
+            </a:extLst>
+          </p:cNvPr>
+          <p:cNvSpPr>
+            <a:spLocks noGrp="1"/>
+          </p:cNvSpPr>
+          <p:nvPr>
+            <p:ph type="ftr" sz="quarter" idx="11"/>
+          </p:nvPr>
+        </p:nvSpPr>
+        <p:spPr/>
+        <p:txBody>
+          <a:bodyPr/>
+          <a:lstStyle/>
+          <a:p>
+            <a:r>
+              <a:rPr lang="en-US"/>
+              <a:t>Digital Scholarship Services </a:t>
+            </a:r>
+            <a:r>
+              <a:rPr lang="en-US">
+                <a:solidFill>
+                  <a:schemeClr val="accent1">
+                    <a:lumMod val="50000"/>
+                  </a:schemeClr>
+                </a:solidFill>
+              </a:rPr>
+              <a:t>| Email</a:t>
+            </a:r>
+            <a:r>
+              <a:rPr lang="en-US"/>
+              <a:t> cf24@rice.edu </a:t>
+            </a:r>
+            <a:r>
+              <a:rPr lang="en-US">
+                <a:solidFill>
+                  <a:schemeClr val="accent1">
+                    <a:lumMod val="50000"/>
+                  </a:schemeClr>
+                </a:solidFill>
+              </a:rPr>
+              <a:t>|</a:t>
+            </a:r>
+            <a:r>
+              <a:rPr lang="en-US"/>
+              <a:t> library.rice.edu/dss</a:t>
+            </a:r>
+            <a:endParaRPr lang="en-US" dirty="0"/>
+          </a:p>
+        </p:txBody>
+      </p:sp>
+      <p:sp>
+        <p:nvSpPr>
+          <p:cNvPr id="6" name="Slide Number Placeholder 5">
+            <a:extLst>
+              <a:ext uri="{FF2B5EF4-FFF2-40B4-BE49-F238E27FC236}">
+                <a16:creationId xmlns:a16="http://schemas.microsoft.com/office/drawing/2014/main" id="{C3EB9A57-323C-47F5-867F-693F95A15FA4}"/>
+              </a:ext>
+            </a:extLst>
+          </p:cNvPr>
+          <p:cNvSpPr>
+            <a:spLocks noGrp="1"/>
+          </p:cNvSpPr>
+          <p:nvPr>
+            <p:ph type="sldNum" sz="quarter" idx="12"/>
+          </p:nvPr>
+        </p:nvSpPr>
+        <p:spPr/>
+        <p:txBody>
+          <a:bodyPr/>
+          <a:lstStyle/>
+          <a:p>
+            <a:fld id="{D57F1E4F-1CFF-5643-939E-02111984F565}" type="slidenum">
+              <a:rPr lang="en-US" smtClean="0"/>
+              <a:t>15</a:t>
+            </a:fld>
+            <a:endParaRPr lang="en-US" dirty="0"/>
+          </a:p>
+        </p:txBody>
+      </p:sp>
+    </p:spTree>
+    <p:extLst>
+      <p:ext uri="{BB962C8B-B14F-4D97-AF65-F5344CB8AC3E}">
+        <p14:creationId xmlns:p14="http://schemas.microsoft.com/office/powerpoint/2010/main" val="107865345"/>
+      </p:ext>
+    </p:extLst>
+  </p:cSld>
+  <p:clrMapOvr>
+    <a:masterClrMapping/>
+  </p:clrMapOvr>
+</p:sld>
+</file>
+
+<file path=ppt/slides/slide16.xml><?xml version="1.0" encoding="utf-8"?>
+<p:sld xmlns:a="http://schemas.openxmlformats.org/drawingml/2006/main" xmlns:r="http://schemas.openxmlformats.org/officeDocument/2006/relationships" xmlns:p="http://schemas.openxmlformats.org/presentationml/2006/main">
+  <p:cSld>
+    <p:spTree>
+      <p:nvGrpSpPr>
+        <p:cNvPr id="1" name=""/>
+        <p:cNvGrpSpPr/>
+        <p:nvPr/>
+      </p:nvGrpSpPr>
+      <p:grpSpPr>
+        <a:xfrm>
+          <a:off x="0" y="0"/>
+          <a:ext cx="0" cy="0"/>
+          <a:chOff x="0" y="0"/>
+          <a:chExt cx="0" cy="0"/>
+        </a:xfrm>
+      </p:grpSpPr>
+      <p:sp>
+        <p:nvSpPr>
+          <p:cNvPr id="7" name="Title 6">
+            <a:extLst>
+              <a:ext uri="{FF2B5EF4-FFF2-40B4-BE49-F238E27FC236}">
+                <a16:creationId xmlns:a16="http://schemas.microsoft.com/office/drawing/2014/main" id="{75C0DCD3-95F8-4E1F-BF1A-5FAAB84A40A3}"/>
+              </a:ext>
+            </a:extLst>
+          </p:cNvPr>
+          <p:cNvSpPr>
+            <a:spLocks noGrp="1"/>
+          </p:cNvSpPr>
+          <p:nvPr>
+            <p:ph type="title"/>
+          </p:nvPr>
+        </p:nvSpPr>
+        <p:spPr/>
+        <p:txBody>
+          <a:bodyPr/>
+          <a:lstStyle/>
+          <a:p>
+            <a:r>
+              <a:rPr lang="en-US" dirty="0"/>
+              <a:t>ARIMA</a:t>
+            </a:r>
+          </a:p>
+        </p:txBody>
+      </p:sp>
+      <p:sp>
+        <p:nvSpPr>
+          <p:cNvPr id="8" name="Content Placeholder 7">
+            <a:extLst>
+              <a:ext uri="{FF2B5EF4-FFF2-40B4-BE49-F238E27FC236}">
+                <a16:creationId xmlns:a16="http://schemas.microsoft.com/office/drawing/2014/main" id="{52BB1FAB-BB61-4B66-A4EA-A0EABC2B3ECA}"/>
+              </a:ext>
+            </a:extLst>
+          </p:cNvPr>
+          <p:cNvSpPr>
+            <a:spLocks noGrp="1"/>
+          </p:cNvSpPr>
+          <p:nvPr>
+            <p:ph idx="1"/>
+          </p:nvPr>
+        </p:nvSpPr>
+        <p:spPr/>
+        <p:txBody>
+          <a:bodyPr/>
+          <a:lstStyle/>
+          <a:p>
+            <a:endParaRPr lang="en-US"/>
+          </a:p>
+        </p:txBody>
+      </p:sp>
+      <p:sp>
+        <p:nvSpPr>
+          <p:cNvPr id="4" name="Date Placeholder 3">
+            <a:extLst>
+              <a:ext uri="{FF2B5EF4-FFF2-40B4-BE49-F238E27FC236}">
+                <a16:creationId xmlns:a16="http://schemas.microsoft.com/office/drawing/2014/main" id="{02256D86-7CE0-416E-B2A3-402D20EE9E90}"/>
+              </a:ext>
+            </a:extLst>
+          </p:cNvPr>
+          <p:cNvSpPr>
+            <a:spLocks noGrp="1"/>
+          </p:cNvSpPr>
+          <p:nvPr>
+            <p:ph type="dt" sz="half" idx="10"/>
+          </p:nvPr>
+        </p:nvSpPr>
+        <p:spPr/>
+        <p:txBody>
+          <a:bodyPr/>
+          <a:lstStyle/>
+          <a:p>
+            <a:fld id="{B08FEED8-D7D4-44E9-BFBC-ED06B5996D94}" type="datetime4">
+              <a:rPr lang="en-US" smtClean="0"/>
+              <a:t>July 17, 2019</a:t>
+            </a:fld>
+            <a:endParaRPr lang="en-US" dirty="0"/>
+          </a:p>
+        </p:txBody>
+      </p:sp>
+      <p:sp>
+        <p:nvSpPr>
+          <p:cNvPr id="5" name="Footer Placeholder 4">
+            <a:extLst>
+              <a:ext uri="{FF2B5EF4-FFF2-40B4-BE49-F238E27FC236}">
+                <a16:creationId xmlns:a16="http://schemas.microsoft.com/office/drawing/2014/main" id="{1D4ED112-7CF4-4BB9-B46E-B366A5054A9A}"/>
+              </a:ext>
+            </a:extLst>
+          </p:cNvPr>
+          <p:cNvSpPr>
+            <a:spLocks noGrp="1"/>
+          </p:cNvSpPr>
+          <p:nvPr>
+            <p:ph type="ftr" sz="quarter" idx="11"/>
+          </p:nvPr>
+        </p:nvSpPr>
+        <p:spPr/>
+        <p:txBody>
+          <a:bodyPr/>
+          <a:lstStyle/>
+          <a:p>
+            <a:r>
+              <a:rPr lang="en-US"/>
+              <a:t>Digital Scholarship Services </a:t>
+            </a:r>
+            <a:r>
+              <a:rPr lang="en-US">
+                <a:solidFill>
+                  <a:schemeClr val="accent1">
+                    <a:lumMod val="50000"/>
+                  </a:schemeClr>
+                </a:solidFill>
+              </a:rPr>
+              <a:t>| Email</a:t>
+            </a:r>
+            <a:r>
+              <a:rPr lang="en-US"/>
+              <a:t> cf24@rice.edu </a:t>
+            </a:r>
+            <a:r>
+              <a:rPr lang="en-US">
+                <a:solidFill>
+                  <a:schemeClr val="accent1">
+                    <a:lumMod val="50000"/>
+                  </a:schemeClr>
+                </a:solidFill>
+              </a:rPr>
+              <a:t>|</a:t>
+            </a:r>
+            <a:r>
+              <a:rPr lang="en-US"/>
+              <a:t> library.rice.edu/dss</a:t>
+            </a:r>
+            <a:endParaRPr lang="en-US" dirty="0"/>
+          </a:p>
+        </p:txBody>
+      </p:sp>
+      <p:sp>
+        <p:nvSpPr>
+          <p:cNvPr id="6" name="Slide Number Placeholder 5">
+            <a:extLst>
+              <a:ext uri="{FF2B5EF4-FFF2-40B4-BE49-F238E27FC236}">
+                <a16:creationId xmlns:a16="http://schemas.microsoft.com/office/drawing/2014/main" id="{8CC75551-85BF-4C9F-8893-AA28ECA8A6B5}"/>
+              </a:ext>
+            </a:extLst>
+          </p:cNvPr>
+          <p:cNvSpPr>
+            <a:spLocks noGrp="1"/>
+          </p:cNvSpPr>
+          <p:nvPr>
+            <p:ph type="sldNum" sz="quarter" idx="12"/>
+          </p:nvPr>
+        </p:nvSpPr>
+        <p:spPr/>
+        <p:txBody>
+          <a:bodyPr/>
+          <a:lstStyle/>
+          <a:p>
+            <a:fld id="{D57F1E4F-1CFF-5643-939E-02111984F565}" type="slidenum">
+              <a:rPr lang="en-US" smtClean="0"/>
+              <a:t>16</a:t>
+            </a:fld>
+            <a:endParaRPr lang="en-US" dirty="0"/>
+          </a:p>
+        </p:txBody>
+      </p:sp>
+    </p:spTree>
+    <p:extLst>
+      <p:ext uri="{BB962C8B-B14F-4D97-AF65-F5344CB8AC3E}">
+        <p14:creationId xmlns:p14="http://schemas.microsoft.com/office/powerpoint/2010/main" val="1065550565"/>
+      </p:ext>
+    </p:extLst>
+  </p:cSld>
+  <p:clrMapOvr>
+    <a:masterClrMapping/>
+  </p:clrMapOvr>
+</p:sld>
+</file>
+
+<file path=ppt/slides/slide17.xml><?xml version="1.0" encoding="utf-8"?>
+<p:sld xmlns:a="http://schemas.openxmlformats.org/drawingml/2006/main" xmlns:r="http://schemas.openxmlformats.org/officeDocument/2006/relationships" xmlns:p="http://schemas.openxmlformats.org/presentationml/2006/main">
+  <p:cSld>
+    <p:spTree>
+      <p:nvGrpSpPr>
+        <p:cNvPr id="1" name=""/>
+        <p:cNvGrpSpPr/>
+        <p:nvPr/>
+      </p:nvGrpSpPr>
+      <p:grpSpPr>
+        <a:xfrm>
+          <a:off x="0" y="0"/>
+          <a:ext cx="0" cy="0"/>
+          <a:chOff x="0" y="0"/>
+          <a:chExt cx="0" cy="0"/>
+        </a:xfrm>
+      </p:grpSpPr>
+      <p:sp>
+        <p:nvSpPr>
+          <p:cNvPr id="7" name="Title 6">
+            <a:extLst>
+              <a:ext uri="{FF2B5EF4-FFF2-40B4-BE49-F238E27FC236}">
+                <a16:creationId xmlns:a16="http://schemas.microsoft.com/office/drawing/2014/main" id="{75C0DCD3-95F8-4E1F-BF1A-5FAAB84A40A3}"/>
+              </a:ext>
+            </a:extLst>
+          </p:cNvPr>
+          <p:cNvSpPr>
+            <a:spLocks noGrp="1"/>
+          </p:cNvSpPr>
+          <p:nvPr>
+            <p:ph type="title"/>
+          </p:nvPr>
+        </p:nvSpPr>
+        <p:spPr/>
+        <p:txBody>
+          <a:bodyPr/>
+          <a:lstStyle/>
+          <a:p>
+            <a:r>
+              <a:rPr lang="en-US" dirty="0"/>
+              <a:t>AUTOREGRESSIVE</a:t>
+            </a:r>
+          </a:p>
+        </p:txBody>
+      </p:sp>
+      <p:sp>
+        <p:nvSpPr>
+          <p:cNvPr id="8" name="Content Placeholder 7">
+            <a:extLst>
+              <a:ext uri="{FF2B5EF4-FFF2-40B4-BE49-F238E27FC236}">
+                <a16:creationId xmlns:a16="http://schemas.microsoft.com/office/drawing/2014/main" id="{52BB1FAB-BB61-4B66-A4EA-A0EABC2B3ECA}"/>
+              </a:ext>
+            </a:extLst>
+          </p:cNvPr>
+          <p:cNvSpPr>
+            <a:spLocks noGrp="1"/>
+          </p:cNvSpPr>
+          <p:nvPr>
+            <p:ph idx="1"/>
+          </p:nvPr>
+        </p:nvSpPr>
+        <p:spPr/>
+        <p:txBody>
+          <a:bodyPr/>
+          <a:lstStyle/>
+          <a:p>
+            <a:endParaRPr lang="en-US"/>
+          </a:p>
+        </p:txBody>
+      </p:sp>
+      <p:sp>
+        <p:nvSpPr>
+          <p:cNvPr id="4" name="Date Placeholder 3">
+            <a:extLst>
+              <a:ext uri="{FF2B5EF4-FFF2-40B4-BE49-F238E27FC236}">
+                <a16:creationId xmlns:a16="http://schemas.microsoft.com/office/drawing/2014/main" id="{02256D86-7CE0-416E-B2A3-402D20EE9E90}"/>
+              </a:ext>
+            </a:extLst>
+          </p:cNvPr>
+          <p:cNvSpPr>
+            <a:spLocks noGrp="1"/>
+          </p:cNvSpPr>
+          <p:nvPr>
+            <p:ph type="dt" sz="half" idx="10"/>
+          </p:nvPr>
+        </p:nvSpPr>
+        <p:spPr/>
+        <p:txBody>
+          <a:bodyPr/>
+          <a:lstStyle/>
+          <a:p>
+            <a:fld id="{B08FEED8-D7D4-44E9-BFBC-ED06B5996D94}" type="datetime4">
+              <a:rPr lang="en-US" smtClean="0"/>
+              <a:t>July 17, 2019</a:t>
+            </a:fld>
+            <a:endParaRPr lang="en-US" dirty="0"/>
+          </a:p>
+        </p:txBody>
+      </p:sp>
+      <p:sp>
+        <p:nvSpPr>
+          <p:cNvPr id="5" name="Footer Placeholder 4">
+            <a:extLst>
+              <a:ext uri="{FF2B5EF4-FFF2-40B4-BE49-F238E27FC236}">
+                <a16:creationId xmlns:a16="http://schemas.microsoft.com/office/drawing/2014/main" id="{1D4ED112-7CF4-4BB9-B46E-B366A5054A9A}"/>
+              </a:ext>
+            </a:extLst>
+          </p:cNvPr>
+          <p:cNvSpPr>
+            <a:spLocks noGrp="1"/>
+          </p:cNvSpPr>
+          <p:nvPr>
+            <p:ph type="ftr" sz="quarter" idx="11"/>
+          </p:nvPr>
+        </p:nvSpPr>
+        <p:spPr/>
+        <p:txBody>
+          <a:bodyPr/>
+          <a:lstStyle/>
+          <a:p>
+            <a:r>
+              <a:rPr lang="en-US"/>
+              <a:t>Digital Scholarship Services </a:t>
+            </a:r>
+            <a:r>
+              <a:rPr lang="en-US">
+                <a:solidFill>
+                  <a:schemeClr val="accent1">
+                    <a:lumMod val="50000"/>
+                  </a:schemeClr>
+                </a:solidFill>
+              </a:rPr>
+              <a:t>| Email</a:t>
+            </a:r>
+            <a:r>
+              <a:rPr lang="en-US"/>
+              <a:t> cf24@rice.edu </a:t>
+            </a:r>
+            <a:r>
+              <a:rPr lang="en-US">
+                <a:solidFill>
+                  <a:schemeClr val="accent1">
+                    <a:lumMod val="50000"/>
+                  </a:schemeClr>
+                </a:solidFill>
+              </a:rPr>
+              <a:t>|</a:t>
+            </a:r>
+            <a:r>
+              <a:rPr lang="en-US"/>
+              <a:t> library.rice.edu/dss</a:t>
+            </a:r>
+            <a:endParaRPr lang="en-US" dirty="0"/>
+          </a:p>
+        </p:txBody>
+      </p:sp>
+      <p:sp>
+        <p:nvSpPr>
+          <p:cNvPr id="6" name="Slide Number Placeholder 5">
+            <a:extLst>
+              <a:ext uri="{FF2B5EF4-FFF2-40B4-BE49-F238E27FC236}">
+                <a16:creationId xmlns:a16="http://schemas.microsoft.com/office/drawing/2014/main" id="{8CC75551-85BF-4C9F-8893-AA28ECA8A6B5}"/>
+              </a:ext>
+            </a:extLst>
+          </p:cNvPr>
+          <p:cNvSpPr>
+            <a:spLocks noGrp="1"/>
+          </p:cNvSpPr>
+          <p:nvPr>
+            <p:ph type="sldNum" sz="quarter" idx="12"/>
+          </p:nvPr>
+        </p:nvSpPr>
+        <p:spPr/>
+        <p:txBody>
+          <a:bodyPr/>
+          <a:lstStyle/>
+          <a:p>
+            <a:fld id="{D57F1E4F-1CFF-5643-939E-02111984F565}" type="slidenum">
+              <a:rPr lang="en-US" smtClean="0"/>
+              <a:t>17</a:t>
+            </a:fld>
+            <a:endParaRPr lang="en-US" dirty="0"/>
+          </a:p>
+        </p:txBody>
+      </p:sp>
+    </p:spTree>
+    <p:extLst>
+      <p:ext uri="{BB962C8B-B14F-4D97-AF65-F5344CB8AC3E}">
+        <p14:creationId xmlns:p14="http://schemas.microsoft.com/office/powerpoint/2010/main" val="4066560549"/>
+      </p:ext>
+    </p:extLst>
+  </p:cSld>
+  <p:clrMapOvr>
+    <a:masterClrMapping/>
+  </p:clrMapOvr>
+</p:sld>
+</file>
+
+<file path=ppt/slides/slide18.xml><?xml version="1.0" encoding="utf-8"?>
+<p:sld xmlns:a="http://schemas.openxmlformats.org/drawingml/2006/main" xmlns:r="http://schemas.openxmlformats.org/officeDocument/2006/relationships" xmlns:p="http://schemas.openxmlformats.org/presentationml/2006/main">
+  <p:cSld>
+    <p:spTree>
+      <p:nvGrpSpPr>
+        <p:cNvPr id="1" name=""/>
+        <p:cNvGrpSpPr/>
+        <p:nvPr/>
+      </p:nvGrpSpPr>
+      <p:grpSpPr>
+        <a:xfrm>
+          <a:off x="0" y="0"/>
+          <a:ext cx="0" cy="0"/>
+          <a:chOff x="0" y="0"/>
+          <a:chExt cx="0" cy="0"/>
+        </a:xfrm>
+      </p:grpSpPr>
+      <p:sp>
+        <p:nvSpPr>
+          <p:cNvPr id="2" name="Title 1">
+            <a:extLst>
+              <a:ext uri="{FF2B5EF4-FFF2-40B4-BE49-F238E27FC236}">
+                <a16:creationId xmlns:a16="http://schemas.microsoft.com/office/drawing/2014/main" id="{D7EACF90-3E7B-4978-AB0C-ED5165419D19}"/>
+              </a:ext>
+            </a:extLst>
+          </p:cNvPr>
+          <p:cNvSpPr>
+            <a:spLocks noGrp="1"/>
+          </p:cNvSpPr>
+          <p:nvPr>
+            <p:ph type="title"/>
+          </p:nvPr>
+        </p:nvSpPr>
+        <p:spPr/>
+        <p:txBody>
+          <a:bodyPr/>
+          <a:lstStyle/>
+          <a:p>
+            <a:r>
+              <a:rPr lang="en-US" dirty="0"/>
+              <a:t>MOVING AVERAGE</a:t>
+            </a:r>
+          </a:p>
+        </p:txBody>
+      </p:sp>
+      <p:sp>
+        <p:nvSpPr>
+          <p:cNvPr id="3" name="Content Placeholder 2">
+            <a:extLst>
+              <a:ext uri="{FF2B5EF4-FFF2-40B4-BE49-F238E27FC236}">
+                <a16:creationId xmlns:a16="http://schemas.microsoft.com/office/drawing/2014/main" id="{A7CEFEF5-E74A-4EFE-9368-8FD74B059E10}"/>
+              </a:ext>
+            </a:extLst>
+          </p:cNvPr>
+          <p:cNvSpPr>
+            <a:spLocks noGrp="1"/>
+          </p:cNvSpPr>
+          <p:nvPr>
+            <p:ph idx="1"/>
+          </p:nvPr>
+        </p:nvSpPr>
+        <p:spPr/>
+        <p:txBody>
+          <a:bodyPr/>
+          <a:lstStyle/>
+          <a:p>
+            <a:endParaRPr lang="en-US"/>
+          </a:p>
+        </p:txBody>
+      </p:sp>
+      <p:sp>
+        <p:nvSpPr>
+          <p:cNvPr id="4" name="Date Placeholder 3">
+            <a:extLst>
+              <a:ext uri="{FF2B5EF4-FFF2-40B4-BE49-F238E27FC236}">
+                <a16:creationId xmlns:a16="http://schemas.microsoft.com/office/drawing/2014/main" id="{64E0A09F-EC7A-4EF6-AB3A-0DC48B1B7271}"/>
+              </a:ext>
+            </a:extLst>
+          </p:cNvPr>
+          <p:cNvSpPr>
+            <a:spLocks noGrp="1"/>
+          </p:cNvSpPr>
+          <p:nvPr>
+            <p:ph type="dt" sz="half" idx="10"/>
+          </p:nvPr>
+        </p:nvSpPr>
+        <p:spPr/>
+        <p:txBody>
+          <a:bodyPr/>
+          <a:lstStyle/>
+          <a:p>
+            <a:fld id="{8AAE40A0-A7D8-4DC3-BC9E-BADA32DA2004}" type="datetime4">
+              <a:rPr lang="en-US" smtClean="0"/>
+              <a:t>July 17, 2019</a:t>
+            </a:fld>
+            <a:endParaRPr lang="en-US" dirty="0"/>
+          </a:p>
+        </p:txBody>
+      </p:sp>
+      <p:sp>
+        <p:nvSpPr>
+          <p:cNvPr id="5" name="Footer Placeholder 4">
+            <a:extLst>
+              <a:ext uri="{FF2B5EF4-FFF2-40B4-BE49-F238E27FC236}">
+                <a16:creationId xmlns:a16="http://schemas.microsoft.com/office/drawing/2014/main" id="{9D8B7F07-2C50-4473-BABC-57C52FDD38D2}"/>
+              </a:ext>
+            </a:extLst>
+          </p:cNvPr>
+          <p:cNvSpPr>
+            <a:spLocks noGrp="1"/>
+          </p:cNvSpPr>
+          <p:nvPr>
+            <p:ph type="ftr" sz="quarter" idx="11"/>
+          </p:nvPr>
+        </p:nvSpPr>
+        <p:spPr/>
+        <p:txBody>
+          <a:bodyPr/>
+          <a:lstStyle/>
+          <a:p>
+            <a:r>
+              <a:rPr lang="en-US"/>
+              <a:t>Digital Scholarship Services </a:t>
+            </a:r>
+            <a:r>
+              <a:rPr lang="en-US">
+                <a:solidFill>
+                  <a:schemeClr val="accent1">
+                    <a:lumMod val="50000"/>
+                  </a:schemeClr>
+                </a:solidFill>
+              </a:rPr>
+              <a:t>| Email</a:t>
+            </a:r>
+            <a:r>
+              <a:rPr lang="en-US"/>
+              <a:t> cf24@rice.edu </a:t>
+            </a:r>
+            <a:r>
+              <a:rPr lang="en-US">
+                <a:solidFill>
+                  <a:schemeClr val="accent1">
+                    <a:lumMod val="50000"/>
+                  </a:schemeClr>
+                </a:solidFill>
+              </a:rPr>
+              <a:t>|</a:t>
+            </a:r>
+            <a:r>
+              <a:rPr lang="en-US"/>
+              <a:t> library.rice.edu/dss</a:t>
+            </a:r>
+            <a:endParaRPr lang="en-US" dirty="0"/>
+          </a:p>
+        </p:txBody>
+      </p:sp>
+      <p:sp>
+        <p:nvSpPr>
+          <p:cNvPr id="6" name="Slide Number Placeholder 5">
+            <a:extLst>
+              <a:ext uri="{FF2B5EF4-FFF2-40B4-BE49-F238E27FC236}">
+                <a16:creationId xmlns:a16="http://schemas.microsoft.com/office/drawing/2014/main" id="{6BE5E43E-0696-4C60-A72C-BBB5B4448760}"/>
+              </a:ext>
+            </a:extLst>
+          </p:cNvPr>
+          <p:cNvSpPr>
+            <a:spLocks noGrp="1"/>
+          </p:cNvSpPr>
+          <p:nvPr>
+            <p:ph type="sldNum" sz="quarter" idx="12"/>
+          </p:nvPr>
+        </p:nvSpPr>
+        <p:spPr/>
+        <p:txBody>
+          <a:bodyPr/>
+          <a:lstStyle/>
+          <a:p>
+            <a:fld id="{D57F1E4F-1CFF-5643-939E-02111984F565}" type="slidenum">
+              <a:rPr lang="en-US" smtClean="0"/>
+              <a:t>18</a:t>
+            </a:fld>
+            <a:endParaRPr lang="en-US" dirty="0"/>
+          </a:p>
+        </p:txBody>
+      </p:sp>
+    </p:spTree>
+    <p:extLst>
+      <p:ext uri="{BB962C8B-B14F-4D97-AF65-F5344CB8AC3E}">
+        <p14:creationId xmlns:p14="http://schemas.microsoft.com/office/powerpoint/2010/main" val="3521777765"/>
+      </p:ext>
+    </p:extLst>
+  </p:cSld>
+  <p:clrMapOvr>
+    <a:masterClrMapping/>
+  </p:clrMapOvr>
+</p:sld>
+</file>
+
+<file path=ppt/slides/slide19.xml><?xml version="1.0" encoding="utf-8"?>
+<p:sld xmlns:a="http://schemas.openxmlformats.org/drawingml/2006/main" xmlns:r="http://schemas.openxmlformats.org/officeDocument/2006/relationships" xmlns:p="http://schemas.openxmlformats.org/presentationml/2006/main">
+  <p:cSld>
+    <p:spTree>
+      <p:nvGrpSpPr>
+        <p:cNvPr id="1" name=""/>
+        <p:cNvGrpSpPr/>
+        <p:nvPr/>
+      </p:nvGrpSpPr>
+      <p:grpSpPr>
+        <a:xfrm>
+          <a:off x="0" y="0"/>
+          <a:ext cx="0" cy="0"/>
+          <a:chOff x="0" y="0"/>
+          <a:chExt cx="0" cy="0"/>
+        </a:xfrm>
+      </p:grpSpPr>
+      <p:sp>
+        <p:nvSpPr>
+          <p:cNvPr id="2" name="Title 1">
+            <a:extLst>
+              <a:ext uri="{FF2B5EF4-FFF2-40B4-BE49-F238E27FC236}">
+                <a16:creationId xmlns:a16="http://schemas.microsoft.com/office/drawing/2014/main" id="{D1BF0482-6913-4A5E-A533-479864CB5349}"/>
+              </a:ext>
+            </a:extLst>
+          </p:cNvPr>
+          <p:cNvSpPr>
+            <a:spLocks noGrp="1"/>
+          </p:cNvSpPr>
+          <p:nvPr>
+            <p:ph type="title"/>
+          </p:nvPr>
+        </p:nvSpPr>
+        <p:spPr/>
+        <p:txBody>
+          <a:bodyPr/>
+          <a:lstStyle/>
+          <a:p>
+            <a:r>
+              <a:rPr lang="en-US" dirty="0"/>
+              <a:t>PLAYING AROUND WITH ARIMA</a:t>
+            </a:r>
+          </a:p>
+        </p:txBody>
+      </p:sp>
+      <p:sp>
+        <p:nvSpPr>
+          <p:cNvPr id="3" name="Content Placeholder 2">
+            <a:extLst>
+              <a:ext uri="{FF2B5EF4-FFF2-40B4-BE49-F238E27FC236}">
+                <a16:creationId xmlns:a16="http://schemas.microsoft.com/office/drawing/2014/main" id="{D48271C9-2790-46C9-B80B-52D215430CB8}"/>
+              </a:ext>
+            </a:extLst>
+          </p:cNvPr>
+          <p:cNvSpPr>
+            <a:spLocks noGrp="1"/>
+          </p:cNvSpPr>
+          <p:nvPr>
+            <p:ph idx="1"/>
+          </p:nvPr>
+        </p:nvSpPr>
+        <p:spPr/>
+        <p:txBody>
+          <a:bodyPr/>
+          <a:lstStyle/>
+          <a:p>
+            <a:endParaRPr lang="en-US"/>
+          </a:p>
+        </p:txBody>
+      </p:sp>
+      <p:sp>
+        <p:nvSpPr>
+          <p:cNvPr id="4" name="Date Placeholder 3">
+            <a:extLst>
+              <a:ext uri="{FF2B5EF4-FFF2-40B4-BE49-F238E27FC236}">
+                <a16:creationId xmlns:a16="http://schemas.microsoft.com/office/drawing/2014/main" id="{B23DAF35-209C-48FA-AAAB-F69E14183A91}"/>
+              </a:ext>
+            </a:extLst>
+          </p:cNvPr>
+          <p:cNvSpPr>
+            <a:spLocks noGrp="1"/>
+          </p:cNvSpPr>
+          <p:nvPr>
+            <p:ph type="dt" sz="half" idx="10"/>
+          </p:nvPr>
+        </p:nvSpPr>
+        <p:spPr/>
+        <p:txBody>
+          <a:bodyPr/>
+          <a:lstStyle/>
+          <a:p>
+            <a:fld id="{8AAE40A0-A7D8-4DC3-BC9E-BADA32DA2004}" type="datetime4">
+              <a:rPr lang="en-US" smtClean="0"/>
+              <a:t>July 17, 2019</a:t>
+            </a:fld>
+            <a:endParaRPr lang="en-US" dirty="0"/>
+          </a:p>
+        </p:txBody>
+      </p:sp>
+      <p:sp>
+        <p:nvSpPr>
+          <p:cNvPr id="5" name="Footer Placeholder 4">
+            <a:extLst>
+              <a:ext uri="{FF2B5EF4-FFF2-40B4-BE49-F238E27FC236}">
+                <a16:creationId xmlns:a16="http://schemas.microsoft.com/office/drawing/2014/main" id="{3D8E22A6-180D-41CF-9959-4347A11F2AD1}"/>
+              </a:ext>
+            </a:extLst>
+          </p:cNvPr>
+          <p:cNvSpPr>
+            <a:spLocks noGrp="1"/>
+          </p:cNvSpPr>
+          <p:nvPr>
+            <p:ph type="ftr" sz="quarter" idx="11"/>
+          </p:nvPr>
+        </p:nvSpPr>
+        <p:spPr/>
+        <p:txBody>
+          <a:bodyPr/>
+          <a:lstStyle/>
+          <a:p>
+            <a:r>
+              <a:rPr lang="en-US"/>
+              <a:t>Digital Scholarship Services </a:t>
+            </a:r>
+            <a:r>
+              <a:rPr lang="en-US">
+                <a:solidFill>
+                  <a:schemeClr val="accent1">
+                    <a:lumMod val="50000"/>
+                  </a:schemeClr>
+                </a:solidFill>
+              </a:rPr>
+              <a:t>| Email</a:t>
+            </a:r>
+            <a:r>
+              <a:rPr lang="en-US"/>
+              <a:t> cf24@rice.edu </a:t>
+            </a:r>
+            <a:r>
+              <a:rPr lang="en-US">
+                <a:solidFill>
+                  <a:schemeClr val="accent1">
+                    <a:lumMod val="50000"/>
+                  </a:schemeClr>
+                </a:solidFill>
+              </a:rPr>
+              <a:t>|</a:t>
+            </a:r>
+            <a:r>
+              <a:rPr lang="en-US"/>
+              <a:t> library.rice.edu/dss</a:t>
+            </a:r>
+            <a:endParaRPr lang="en-US" dirty="0"/>
+          </a:p>
+        </p:txBody>
+      </p:sp>
+      <p:sp>
+        <p:nvSpPr>
+          <p:cNvPr id="6" name="Slide Number Placeholder 5">
+            <a:extLst>
+              <a:ext uri="{FF2B5EF4-FFF2-40B4-BE49-F238E27FC236}">
+                <a16:creationId xmlns:a16="http://schemas.microsoft.com/office/drawing/2014/main" id="{CECE3146-0C2B-4CC7-BC7C-FD23AAF7ECAE}"/>
+              </a:ext>
+            </a:extLst>
+          </p:cNvPr>
+          <p:cNvSpPr>
+            <a:spLocks noGrp="1"/>
+          </p:cNvSpPr>
+          <p:nvPr>
+            <p:ph type="sldNum" sz="quarter" idx="12"/>
+          </p:nvPr>
+        </p:nvSpPr>
+        <p:spPr/>
+        <p:txBody>
+          <a:bodyPr/>
+          <a:lstStyle/>
+          <a:p>
+            <a:fld id="{D57F1E4F-1CFF-5643-939E-02111984F565}" type="slidenum">
+              <a:rPr lang="en-US" smtClean="0"/>
+              <a:t>19</a:t>
+            </a:fld>
+            <a:endParaRPr lang="en-US" dirty="0"/>
+          </a:p>
+        </p:txBody>
+      </p:sp>
+    </p:spTree>
+    <p:extLst>
+      <p:ext uri="{BB962C8B-B14F-4D97-AF65-F5344CB8AC3E}">
+        <p14:creationId xmlns:p14="http://schemas.microsoft.com/office/powerpoint/2010/main" val="3624540971"/>
+      </p:ext>
+    </p:extLst>
+  </p:cSld>
+  <p:clrMapOvr>
+    <a:masterClrMapping/>
+  </p:clrMapOvr>
+</p:sld>
+</file>
+
 <file path=ppt/slides/slide2.xml><?xml version="1.0" encoding="utf-8"?>
 <p:sld xmlns:a="http://schemas.openxmlformats.org/drawingml/2006/main" xmlns:r="http://schemas.openxmlformats.org/officeDocument/2006/relationships" xmlns:p="http://schemas.openxmlformats.org/presentationml/2006/main">
   <p:cSld>
@@ -3924,7 +5933,7 @@
           <a:p>
             <a:fld id="{3686C9ED-58DA-41A6-B894-9B830C59600E}" type="datetime4">
               <a:rPr lang="en-US" smtClean="0"/>
-              <a:t>June 22, 2019</a:t>
+              <a:t>July 17, 2019</a:t>
             </a:fld>
             <a:endParaRPr lang="en-US" dirty="0"/>
           </a:p>
@@ -3982,6 +5991,204 @@
     <p:extLst>
       <p:ext uri="{BB962C8B-B14F-4D97-AF65-F5344CB8AC3E}">
         <p14:creationId xmlns:p14="http://schemas.microsoft.com/office/powerpoint/2010/main" val="999144808"/>
+      </p:ext>
+    </p:extLst>
+  </p:cSld>
+  <p:clrMapOvr>
+    <a:masterClrMapping/>
+  </p:clrMapOvr>
+</p:sld>
+</file>
+
+<file path=ppt/slides/slide20.xml><?xml version="1.0" encoding="utf-8"?>
+<p:sld xmlns:a="http://schemas.openxmlformats.org/drawingml/2006/main" xmlns:r="http://schemas.openxmlformats.org/officeDocument/2006/relationships" xmlns:p="http://schemas.openxmlformats.org/presentationml/2006/main">
+  <p:cSld>
+    <p:spTree>
+      <p:nvGrpSpPr>
+        <p:cNvPr id="1" name=""/>
+        <p:cNvGrpSpPr/>
+        <p:nvPr/>
+      </p:nvGrpSpPr>
+      <p:grpSpPr>
+        <a:xfrm>
+          <a:off x="0" y="0"/>
+          <a:ext cx="0" cy="0"/>
+          <a:chOff x="0" y="0"/>
+          <a:chExt cx="0" cy="0"/>
+        </a:xfrm>
+      </p:grpSpPr>
+      <p:sp>
+        <p:nvSpPr>
+          <p:cNvPr id="7" name="Title 6">
+            <a:extLst>
+              <a:ext uri="{FF2B5EF4-FFF2-40B4-BE49-F238E27FC236}">
+                <a16:creationId xmlns:a16="http://schemas.microsoft.com/office/drawing/2014/main" id="{495B4BC0-844B-4414-A623-BEF78AAC1BA1}"/>
+              </a:ext>
+            </a:extLst>
+          </p:cNvPr>
+          <p:cNvSpPr>
+            <a:spLocks noGrp="1"/>
+          </p:cNvSpPr>
+          <p:nvPr>
+            <p:ph type="title"/>
+          </p:nvPr>
+        </p:nvSpPr>
+        <p:spPr/>
+        <p:txBody>
+          <a:bodyPr/>
+          <a:lstStyle/>
+          <a:p>
+            <a:r>
+              <a:rPr lang="en-US" dirty="0"/>
+              <a:t>ACKNOWLEDGMENTS</a:t>
+            </a:r>
+          </a:p>
+        </p:txBody>
+      </p:sp>
+      <p:sp>
+        <p:nvSpPr>
+          <p:cNvPr id="8" name="Content Placeholder 7">
+            <a:extLst>
+              <a:ext uri="{FF2B5EF4-FFF2-40B4-BE49-F238E27FC236}">
+                <a16:creationId xmlns:a16="http://schemas.microsoft.com/office/drawing/2014/main" id="{2BED3EB3-7E98-4A82-8335-7321D9E37B16}"/>
+              </a:ext>
+            </a:extLst>
+          </p:cNvPr>
+          <p:cNvSpPr>
+            <a:spLocks noGrp="1"/>
+          </p:cNvSpPr>
+          <p:nvPr>
+            <p:ph idx="1"/>
+          </p:nvPr>
+        </p:nvSpPr>
+        <p:spPr/>
+        <p:txBody>
+          <a:bodyPr/>
+          <a:lstStyle/>
+          <a:p>
+            <a:endParaRPr lang="en-US"/>
+          </a:p>
+        </p:txBody>
+      </p:sp>
+      <p:sp>
+        <p:nvSpPr>
+          <p:cNvPr id="4" name="Date Placeholder 3">
+            <a:extLst>
+              <a:ext uri="{FF2B5EF4-FFF2-40B4-BE49-F238E27FC236}">
+                <a16:creationId xmlns:a16="http://schemas.microsoft.com/office/drawing/2014/main" id="{540F37F1-4F33-429F-A568-1A3ADC499E54}"/>
+              </a:ext>
+            </a:extLst>
+          </p:cNvPr>
+          <p:cNvSpPr>
+            <a:spLocks noGrp="1"/>
+          </p:cNvSpPr>
+          <p:nvPr>
+            <p:ph type="dt" sz="half" idx="10"/>
+          </p:nvPr>
+        </p:nvSpPr>
+        <p:spPr/>
+        <p:txBody>
+          <a:bodyPr/>
+          <a:lstStyle/>
+          <a:p>
+            <a:fld id="{B08FEED8-D7D4-44E9-BFBC-ED06B5996D94}" type="datetime4">
+              <a:rPr lang="en-US" smtClean="0"/>
+              <a:t>July 17, 2019</a:t>
+            </a:fld>
+            <a:endParaRPr lang="en-US" dirty="0"/>
+          </a:p>
+        </p:txBody>
+      </p:sp>
+      <p:sp>
+        <p:nvSpPr>
+          <p:cNvPr id="5" name="Footer Placeholder 4">
+            <a:extLst>
+              <a:ext uri="{FF2B5EF4-FFF2-40B4-BE49-F238E27FC236}">
+                <a16:creationId xmlns:a16="http://schemas.microsoft.com/office/drawing/2014/main" id="{673FFA57-C126-4795-A5F6-DD33AAC5ACBD}"/>
+              </a:ext>
+            </a:extLst>
+          </p:cNvPr>
+          <p:cNvSpPr>
+            <a:spLocks noGrp="1"/>
+          </p:cNvSpPr>
+          <p:nvPr>
+            <p:ph type="ftr" sz="quarter" idx="11"/>
+          </p:nvPr>
+        </p:nvSpPr>
+        <p:spPr/>
+        <p:txBody>
+          <a:bodyPr/>
+          <a:lstStyle/>
+          <a:p>
+            <a:r>
+              <a:rPr lang="en-US"/>
+              <a:t>Digital Scholarship Services </a:t>
+            </a:r>
+            <a:r>
+              <a:rPr lang="en-US">
+                <a:solidFill>
+                  <a:schemeClr val="accent1">
+                    <a:lumMod val="50000"/>
+                  </a:schemeClr>
+                </a:solidFill>
+              </a:rPr>
+              <a:t>| Email</a:t>
+            </a:r>
+            <a:r>
+              <a:rPr lang="en-US"/>
+              <a:t> cf24@rice.edu </a:t>
+            </a:r>
+            <a:r>
+              <a:rPr lang="en-US">
+                <a:solidFill>
+                  <a:schemeClr val="accent1">
+                    <a:lumMod val="50000"/>
+                  </a:schemeClr>
+                </a:solidFill>
+              </a:rPr>
+              <a:t>|</a:t>
+            </a:r>
+            <a:r>
+              <a:rPr lang="en-US"/>
+              <a:t> library.rice.edu/dss</a:t>
+            </a:r>
+            <a:endParaRPr lang="en-US" dirty="0"/>
+          </a:p>
+        </p:txBody>
+      </p:sp>
+      <p:sp>
+        <p:nvSpPr>
+          <p:cNvPr id="6" name="Slide Number Placeholder 5">
+            <a:extLst>
+              <a:ext uri="{FF2B5EF4-FFF2-40B4-BE49-F238E27FC236}">
+                <a16:creationId xmlns:a16="http://schemas.microsoft.com/office/drawing/2014/main" id="{2FA49567-BB70-4798-8746-D0B522CCEE20}"/>
+              </a:ext>
+            </a:extLst>
+          </p:cNvPr>
+          <p:cNvSpPr>
+            <a:spLocks noGrp="1"/>
+          </p:cNvSpPr>
+          <p:nvPr>
+            <p:ph type="sldNum" sz="quarter" idx="12"/>
+          </p:nvPr>
+        </p:nvSpPr>
+        <p:spPr/>
+        <p:txBody>
+          <a:bodyPr/>
+          <a:lstStyle/>
+          <a:p>
+            <a:fld id="{D57F1E4F-1CFF-5643-939E-02111984F565}" type="slidenum">
+              <a:rPr lang="en-US" smtClean="0"/>
+              <a:t>20</a:t>
+            </a:fld>
+            <a:endParaRPr lang="en-US" dirty="0"/>
+          </a:p>
+        </p:txBody>
+      </p:sp>
+    </p:spTree>
+    <p:extLst>
+      <p:ext uri="{BB962C8B-B14F-4D97-AF65-F5344CB8AC3E}">
+        <p14:creationId xmlns:p14="http://schemas.microsoft.com/office/powerpoint/2010/main" val="1585568494"/>
       </p:ext>
     </p:extLst>
   </p:cSld>
@@ -4010,10 +6217,10 @@
       </p:grpSpPr>
       <p:sp>
         <p:nvSpPr>
-          <p:cNvPr id="7" name="Title 6">
-            <a:extLst>
-              <a:ext uri="{FF2B5EF4-FFF2-40B4-BE49-F238E27FC236}">
-                <a16:creationId xmlns:a16="http://schemas.microsoft.com/office/drawing/2014/main" id="{184E2338-1026-45D4-9455-B21A88F18B28}"/>
+          <p:cNvPr id="2" name="Title 1">
+            <a:extLst>
+              <a:ext uri="{FF2B5EF4-FFF2-40B4-BE49-F238E27FC236}">
+                <a16:creationId xmlns:a16="http://schemas.microsoft.com/office/drawing/2014/main" id="{BBEB1736-8933-4842-81FB-C5DCC7C07C68}"/>
               </a:ext>
             </a:extLst>
           </p:cNvPr>
@@ -4031,43 +6238,33 @@
           <a:p>
             <a:r>
               <a:rPr lang="en-US" dirty="0"/>
-              <a:t>TRENDS AND</a:t>
-            </a:r>
-            <a:br>
-              <a:rPr lang="en-US" dirty="0"/>
-            </a:br>
-            <a:r>
-              <a:rPr lang="en-US" dirty="0"/>
-              <a:t>SEASONALITY</a:t>
-            </a:r>
-          </a:p>
-        </p:txBody>
-      </p:sp>
-      <p:sp>
-        <p:nvSpPr>
-          <p:cNvPr id="8" name="Text Placeholder 7">
-            <a:extLst>
-              <a:ext uri="{FF2B5EF4-FFF2-40B4-BE49-F238E27FC236}">
-                <a16:creationId xmlns:a16="http://schemas.microsoft.com/office/drawing/2014/main" id="{DB42CCAB-C8E2-48A8-A9DF-EB0383A8B33C}"/>
-              </a:ext>
-            </a:extLst>
-          </p:cNvPr>
-          <p:cNvSpPr>
-            <a:spLocks noGrp="1"/>
-          </p:cNvSpPr>
-          <p:nvPr>
-            <p:ph type="body" idx="1"/>
-          </p:nvPr>
-        </p:nvSpPr>
-        <p:spPr/>
-        <p:txBody>
-          <a:bodyPr/>
-          <a:lstStyle/>
-          <a:p>
-            <a:r>
-              <a:rPr lang="en-US" dirty="0"/>
-              <a:t>How to filter out the noise and model what really matters</a:t>
-            </a:r>
+              <a:t>WHAT’S SO SPECIAL ABOUT TIME?</a:t>
+            </a:r>
+          </a:p>
+        </p:txBody>
+      </p:sp>
+      <p:sp>
+        <p:nvSpPr>
+          <p:cNvPr id="3" name="Content Placeholder 2">
+            <a:extLst>
+              <a:ext uri="{FF2B5EF4-FFF2-40B4-BE49-F238E27FC236}">
+                <a16:creationId xmlns:a16="http://schemas.microsoft.com/office/drawing/2014/main" id="{84C2C4E3-F71B-4C6F-8570-4ECA72D77DC3}"/>
+              </a:ext>
+            </a:extLst>
+          </p:cNvPr>
+          <p:cNvSpPr>
+            <a:spLocks noGrp="1"/>
+          </p:cNvSpPr>
+          <p:nvPr>
+            <p:ph idx="1"/>
+          </p:nvPr>
+        </p:nvSpPr>
+        <p:spPr/>
+        <p:txBody>
+          <a:bodyPr/>
+          <a:lstStyle/>
+          <a:p>
+            <a:endParaRPr lang="en-US"/>
           </a:p>
         </p:txBody>
       </p:sp>
@@ -4076,7 +6273,7 @@
           <p:cNvPr id="4" name="Date Placeholder 3">
             <a:extLst>
               <a:ext uri="{FF2B5EF4-FFF2-40B4-BE49-F238E27FC236}">
-                <a16:creationId xmlns:a16="http://schemas.microsoft.com/office/drawing/2014/main" id="{1CA94ACB-62A5-4F09-8C21-F0CE9BFB1606}"/>
+                <a16:creationId xmlns:a16="http://schemas.microsoft.com/office/drawing/2014/main" id="{C81D5B6F-54DE-49BD-B70E-94836B9B8A8B}"/>
               </a:ext>
             </a:extLst>
           </p:cNvPr>
@@ -4094,7 +6291,7 @@
           <a:p>
             <a:fld id="{8AAE40A0-A7D8-4DC3-BC9E-BADA32DA2004}" type="datetime4">
               <a:rPr lang="en-US" smtClean="0"/>
-              <a:t>June 22, 2019</a:t>
+              <a:t>July 17, 2019</a:t>
             </a:fld>
             <a:endParaRPr lang="en-US" dirty="0"/>
           </a:p>
@@ -4105,7 +6302,7 @@
           <p:cNvPr id="5" name="Footer Placeholder 4">
             <a:extLst>
               <a:ext uri="{FF2B5EF4-FFF2-40B4-BE49-F238E27FC236}">
-                <a16:creationId xmlns:a16="http://schemas.microsoft.com/office/drawing/2014/main" id="{D20B02B0-893D-4696-B6F7-A126B8D18E99}"/>
+                <a16:creationId xmlns:a16="http://schemas.microsoft.com/office/drawing/2014/main" id="{A788BEBC-3FBD-4574-BD63-2697EB2420B4}"/>
               </a:ext>
             </a:extLst>
           </p:cNvPr>
@@ -4162,7 +6359,7 @@
           <p:cNvPr id="6" name="Slide Number Placeholder 5">
             <a:extLst>
               <a:ext uri="{FF2B5EF4-FFF2-40B4-BE49-F238E27FC236}">
-                <a16:creationId xmlns:a16="http://schemas.microsoft.com/office/drawing/2014/main" id="{1CFDA495-0063-4571-8969-0DD770DB39E0}"/>
+                <a16:creationId xmlns:a16="http://schemas.microsoft.com/office/drawing/2014/main" id="{2DD21C00-87BF-4A7C-B66E-67269A15B560}"/>
               </a:ext>
             </a:extLst>
           </p:cNvPr>
@@ -4189,7 +6386,7 @@
     </p:spTree>
     <p:extLst>
       <p:ext uri="{BB962C8B-B14F-4D97-AF65-F5344CB8AC3E}">
-        <p14:creationId xmlns:p14="http://schemas.microsoft.com/office/powerpoint/2010/main" val="2581962988"/>
+        <p14:creationId xmlns:p14="http://schemas.microsoft.com/office/powerpoint/2010/main" val="3077278940"/>
       </p:ext>
     </p:extLst>
   </p:cSld>
@@ -4218,10 +6415,10 @@
       </p:grpSpPr>
       <p:sp>
         <p:nvSpPr>
-          <p:cNvPr id="7" name="Title 6">
-            <a:extLst>
-              <a:ext uri="{FF2B5EF4-FFF2-40B4-BE49-F238E27FC236}">
-                <a16:creationId xmlns:a16="http://schemas.microsoft.com/office/drawing/2014/main" id="{495B4BC0-844B-4414-A623-BEF78AAC1BA1}"/>
+          <p:cNvPr id="2" name="Title 1">
+            <a:extLst>
+              <a:ext uri="{FF2B5EF4-FFF2-40B4-BE49-F238E27FC236}">
+                <a16:creationId xmlns:a16="http://schemas.microsoft.com/office/drawing/2014/main" id="{BBEB1736-8933-4842-81FB-C5DCC7C07C68}"/>
               </a:ext>
             </a:extLst>
           </p:cNvPr>
@@ -4239,17 +6436,17 @@
           <a:p>
             <a:r>
               <a:rPr lang="en-US" dirty="0"/>
-              <a:t>ACKNOWLEDGMENTS</a:t>
-            </a:r>
-          </a:p>
-        </p:txBody>
-      </p:sp>
-      <p:sp>
-        <p:nvSpPr>
-          <p:cNvPr id="8" name="Content Placeholder 7">
-            <a:extLst>
-              <a:ext uri="{FF2B5EF4-FFF2-40B4-BE49-F238E27FC236}">
-                <a16:creationId xmlns:a16="http://schemas.microsoft.com/office/drawing/2014/main" id="{2BED3EB3-7E98-4A82-8335-7321D9E37B16}"/>
+              <a:t>WHY IS THIS IMPORTANT?</a:t>
+            </a:r>
+          </a:p>
+        </p:txBody>
+      </p:sp>
+      <p:sp>
+        <p:nvSpPr>
+          <p:cNvPr id="3" name="Content Placeholder 2">
+            <a:extLst>
+              <a:ext uri="{FF2B5EF4-FFF2-40B4-BE49-F238E27FC236}">
+                <a16:creationId xmlns:a16="http://schemas.microsoft.com/office/drawing/2014/main" id="{84C2C4E3-F71B-4C6F-8570-4ECA72D77DC3}"/>
               </a:ext>
             </a:extLst>
           </p:cNvPr>
@@ -4265,7 +6462,7 @@
           <a:bodyPr/>
           <a:lstStyle/>
           <a:p>
-            <a:endParaRPr lang="en-US"/>
+            <a:endParaRPr lang="en-US" dirty="0"/>
           </a:p>
         </p:txBody>
       </p:sp>
@@ -4274,7 +6471,7 @@
           <p:cNvPr id="4" name="Date Placeholder 3">
             <a:extLst>
               <a:ext uri="{FF2B5EF4-FFF2-40B4-BE49-F238E27FC236}">
-                <a16:creationId xmlns:a16="http://schemas.microsoft.com/office/drawing/2014/main" id="{540F37F1-4F33-429F-A568-1A3ADC499E54}"/>
+                <a16:creationId xmlns:a16="http://schemas.microsoft.com/office/drawing/2014/main" id="{C81D5B6F-54DE-49BD-B70E-94836B9B8A8B}"/>
               </a:ext>
             </a:extLst>
           </p:cNvPr>
@@ -4290,9 +6487,9 @@
           <a:bodyPr/>
           <a:lstStyle/>
           <a:p>
-            <a:fld id="{B08FEED8-D7D4-44E9-BFBC-ED06B5996D94}" type="datetime4">
+            <a:fld id="{8AAE40A0-A7D8-4DC3-BC9E-BADA32DA2004}" type="datetime4">
               <a:rPr lang="en-US" smtClean="0"/>
-              <a:t>June 22, 2019</a:t>
+              <a:t>July 17, 2019</a:t>
             </a:fld>
             <a:endParaRPr lang="en-US" dirty="0"/>
           </a:p>
@@ -4303,7 +6500,7 @@
           <p:cNvPr id="5" name="Footer Placeholder 4">
             <a:extLst>
               <a:ext uri="{FF2B5EF4-FFF2-40B4-BE49-F238E27FC236}">
-                <a16:creationId xmlns:a16="http://schemas.microsoft.com/office/drawing/2014/main" id="{673FFA57-C126-4795-A5F6-DD33AAC5ACBD}"/>
+                <a16:creationId xmlns:a16="http://schemas.microsoft.com/office/drawing/2014/main" id="{A788BEBC-3FBD-4574-BD63-2697EB2420B4}"/>
               </a:ext>
             </a:extLst>
           </p:cNvPr>
@@ -4360,7 +6557,7 @@
           <p:cNvPr id="6" name="Slide Number Placeholder 5">
             <a:extLst>
               <a:ext uri="{FF2B5EF4-FFF2-40B4-BE49-F238E27FC236}">
-                <a16:creationId xmlns:a16="http://schemas.microsoft.com/office/drawing/2014/main" id="{2FA49567-BB70-4798-8746-D0B522CCEE20}"/>
+                <a16:creationId xmlns:a16="http://schemas.microsoft.com/office/drawing/2014/main" id="{2DD21C00-87BF-4A7C-B66E-67269A15B560}"/>
               </a:ext>
             </a:extLst>
           </p:cNvPr>
@@ -4387,7 +6584,1007 @@
     </p:spTree>
     <p:extLst>
       <p:ext uri="{BB962C8B-B14F-4D97-AF65-F5344CB8AC3E}">
-        <p14:creationId xmlns:p14="http://schemas.microsoft.com/office/powerpoint/2010/main" val="1585568494"/>
+        <p14:creationId xmlns:p14="http://schemas.microsoft.com/office/powerpoint/2010/main" val="2280924979"/>
+      </p:ext>
+    </p:extLst>
+  </p:cSld>
+  <p:clrMapOvr>
+    <a:masterClrMapping/>
+  </p:clrMapOvr>
+</p:sld>
+</file>
+
+<file path=ppt/slides/slide5.xml><?xml version="1.0" encoding="utf-8"?>
+<p:sld xmlns:a="http://schemas.openxmlformats.org/drawingml/2006/main" xmlns:r="http://schemas.openxmlformats.org/officeDocument/2006/relationships" xmlns:p="http://schemas.openxmlformats.org/presentationml/2006/main">
+  <p:cSld>
+    <p:spTree>
+      <p:nvGrpSpPr>
+        <p:cNvPr id="1" name=""/>
+        <p:cNvGrpSpPr/>
+        <p:nvPr/>
+      </p:nvGrpSpPr>
+      <p:grpSpPr>
+        <a:xfrm>
+          <a:off x="0" y="0"/>
+          <a:ext cx="0" cy="0"/>
+          <a:chOff x="0" y="0"/>
+          <a:chExt cx="0" cy="0"/>
+        </a:xfrm>
+      </p:grpSpPr>
+      <p:sp>
+        <p:nvSpPr>
+          <p:cNvPr id="7" name="Title 6">
+            <a:extLst>
+              <a:ext uri="{FF2B5EF4-FFF2-40B4-BE49-F238E27FC236}">
+                <a16:creationId xmlns:a16="http://schemas.microsoft.com/office/drawing/2014/main" id="{184E2338-1026-45D4-9455-B21A88F18B28}"/>
+              </a:ext>
+            </a:extLst>
+          </p:cNvPr>
+          <p:cNvSpPr>
+            <a:spLocks noGrp="1"/>
+          </p:cNvSpPr>
+          <p:nvPr>
+            <p:ph type="title"/>
+          </p:nvPr>
+        </p:nvSpPr>
+        <p:spPr/>
+        <p:txBody>
+          <a:bodyPr/>
+          <a:lstStyle/>
+          <a:p>
+            <a:r>
+              <a:rPr lang="en-US" dirty="0"/>
+              <a:t>TRENDS AND</a:t>
+            </a:r>
+            <a:br>
+              <a:rPr lang="en-US" dirty="0"/>
+            </a:br>
+            <a:r>
+              <a:rPr lang="en-US" dirty="0"/>
+              <a:t>SEASONALITY</a:t>
+            </a:r>
+          </a:p>
+        </p:txBody>
+      </p:sp>
+      <p:sp>
+        <p:nvSpPr>
+          <p:cNvPr id="8" name="Text Placeholder 7">
+            <a:extLst>
+              <a:ext uri="{FF2B5EF4-FFF2-40B4-BE49-F238E27FC236}">
+                <a16:creationId xmlns:a16="http://schemas.microsoft.com/office/drawing/2014/main" id="{DB42CCAB-C8E2-48A8-A9DF-EB0383A8B33C}"/>
+              </a:ext>
+            </a:extLst>
+          </p:cNvPr>
+          <p:cNvSpPr>
+            <a:spLocks noGrp="1"/>
+          </p:cNvSpPr>
+          <p:nvPr>
+            <p:ph type="body" idx="1"/>
+          </p:nvPr>
+        </p:nvSpPr>
+        <p:spPr/>
+        <p:txBody>
+          <a:bodyPr/>
+          <a:lstStyle/>
+          <a:p>
+            <a:r>
+              <a:rPr lang="en-US" dirty="0"/>
+              <a:t>How to filter out the noise and model what really matters</a:t>
+            </a:r>
+          </a:p>
+        </p:txBody>
+      </p:sp>
+      <p:sp>
+        <p:nvSpPr>
+          <p:cNvPr id="4" name="Date Placeholder 3">
+            <a:extLst>
+              <a:ext uri="{FF2B5EF4-FFF2-40B4-BE49-F238E27FC236}">
+                <a16:creationId xmlns:a16="http://schemas.microsoft.com/office/drawing/2014/main" id="{1CA94ACB-62A5-4F09-8C21-F0CE9BFB1606}"/>
+              </a:ext>
+            </a:extLst>
+          </p:cNvPr>
+          <p:cNvSpPr>
+            <a:spLocks noGrp="1"/>
+          </p:cNvSpPr>
+          <p:nvPr>
+            <p:ph type="dt" sz="half" idx="10"/>
+          </p:nvPr>
+        </p:nvSpPr>
+        <p:spPr/>
+        <p:txBody>
+          <a:bodyPr/>
+          <a:lstStyle/>
+          <a:p>
+            <a:fld id="{8AAE40A0-A7D8-4DC3-BC9E-BADA32DA2004}" type="datetime4">
+              <a:rPr lang="en-US" smtClean="0"/>
+              <a:t>July 17, 2019</a:t>
+            </a:fld>
+            <a:endParaRPr lang="en-US" dirty="0"/>
+          </a:p>
+        </p:txBody>
+      </p:sp>
+      <p:sp>
+        <p:nvSpPr>
+          <p:cNvPr id="5" name="Footer Placeholder 4">
+            <a:extLst>
+              <a:ext uri="{FF2B5EF4-FFF2-40B4-BE49-F238E27FC236}">
+                <a16:creationId xmlns:a16="http://schemas.microsoft.com/office/drawing/2014/main" id="{D20B02B0-893D-4696-B6F7-A126B8D18E99}"/>
+              </a:ext>
+            </a:extLst>
+          </p:cNvPr>
+          <p:cNvSpPr>
+            <a:spLocks noGrp="1"/>
+          </p:cNvSpPr>
+          <p:nvPr>
+            <p:ph type="ftr" sz="quarter" idx="11"/>
+          </p:nvPr>
+        </p:nvSpPr>
+        <p:spPr/>
+        <p:txBody>
+          <a:bodyPr/>
+          <a:lstStyle/>
+          <a:p>
+            <a:r>
+              <a:rPr lang="en-US"/>
+              <a:t>Digital Scholarship Services </a:t>
+            </a:r>
+            <a:r>
+              <a:rPr lang="en-US">
+                <a:solidFill>
+                  <a:schemeClr val="accent1">
+                    <a:lumMod val="50000"/>
+                  </a:schemeClr>
+                </a:solidFill>
+              </a:rPr>
+              <a:t>| Email</a:t>
+            </a:r>
+            <a:r>
+              <a:rPr lang="en-US"/>
+              <a:t> cf24@rice.edu </a:t>
+            </a:r>
+            <a:r>
+              <a:rPr lang="en-US">
+                <a:solidFill>
+                  <a:schemeClr val="accent1">
+                    <a:lumMod val="50000"/>
+                  </a:schemeClr>
+                </a:solidFill>
+              </a:rPr>
+              <a:t>|</a:t>
+            </a:r>
+            <a:r>
+              <a:rPr lang="en-US"/>
+              <a:t> library.rice.edu/dss</a:t>
+            </a:r>
+            <a:endParaRPr lang="en-US" dirty="0"/>
+          </a:p>
+        </p:txBody>
+      </p:sp>
+      <p:sp>
+        <p:nvSpPr>
+          <p:cNvPr id="6" name="Slide Number Placeholder 5">
+            <a:extLst>
+              <a:ext uri="{FF2B5EF4-FFF2-40B4-BE49-F238E27FC236}">
+                <a16:creationId xmlns:a16="http://schemas.microsoft.com/office/drawing/2014/main" id="{1CFDA495-0063-4571-8969-0DD770DB39E0}"/>
+              </a:ext>
+            </a:extLst>
+          </p:cNvPr>
+          <p:cNvSpPr>
+            <a:spLocks noGrp="1"/>
+          </p:cNvSpPr>
+          <p:nvPr>
+            <p:ph type="sldNum" sz="quarter" idx="12"/>
+          </p:nvPr>
+        </p:nvSpPr>
+        <p:spPr/>
+        <p:txBody>
+          <a:bodyPr/>
+          <a:lstStyle/>
+          <a:p>
+            <a:fld id="{D57F1E4F-1CFF-5643-939E-02111984F565}" type="slidenum">
+              <a:rPr lang="en-US" smtClean="0"/>
+              <a:t>5</a:t>
+            </a:fld>
+            <a:endParaRPr lang="en-US" dirty="0"/>
+          </a:p>
+        </p:txBody>
+      </p:sp>
+    </p:spTree>
+    <p:extLst>
+      <p:ext uri="{BB962C8B-B14F-4D97-AF65-F5344CB8AC3E}">
+        <p14:creationId xmlns:p14="http://schemas.microsoft.com/office/powerpoint/2010/main" val="2581962988"/>
+      </p:ext>
+    </p:extLst>
+  </p:cSld>
+  <p:clrMapOvr>
+    <a:masterClrMapping/>
+  </p:clrMapOvr>
+</p:sld>
+</file>
+
+<file path=ppt/slides/slide6.xml><?xml version="1.0" encoding="utf-8"?>
+<p:sld xmlns:a="http://schemas.openxmlformats.org/drawingml/2006/main" xmlns:r="http://schemas.openxmlformats.org/officeDocument/2006/relationships" xmlns:p="http://schemas.openxmlformats.org/presentationml/2006/main">
+  <p:cSld>
+    <p:spTree>
+      <p:nvGrpSpPr>
+        <p:cNvPr id="1" name=""/>
+        <p:cNvGrpSpPr/>
+        <p:nvPr/>
+      </p:nvGrpSpPr>
+      <p:grpSpPr>
+        <a:xfrm>
+          <a:off x="0" y="0"/>
+          <a:ext cx="0" cy="0"/>
+          <a:chOff x="0" y="0"/>
+          <a:chExt cx="0" cy="0"/>
+        </a:xfrm>
+      </p:grpSpPr>
+      <p:sp>
+        <p:nvSpPr>
+          <p:cNvPr id="7" name="Title 6">
+            <a:extLst>
+              <a:ext uri="{FF2B5EF4-FFF2-40B4-BE49-F238E27FC236}">
+                <a16:creationId xmlns:a16="http://schemas.microsoft.com/office/drawing/2014/main" id="{495B4BC0-844B-4414-A623-BEF78AAC1BA1}"/>
+              </a:ext>
+            </a:extLst>
+          </p:cNvPr>
+          <p:cNvSpPr>
+            <a:spLocks noGrp="1"/>
+          </p:cNvSpPr>
+          <p:nvPr>
+            <p:ph type="title"/>
+          </p:nvPr>
+        </p:nvSpPr>
+        <p:spPr/>
+        <p:txBody>
+          <a:bodyPr/>
+          <a:lstStyle/>
+          <a:p>
+            <a:r>
+              <a:rPr lang="en-US" dirty="0"/>
+              <a:t>TRENDS</a:t>
+            </a:r>
+          </a:p>
+        </p:txBody>
+      </p:sp>
+      <p:sp>
+        <p:nvSpPr>
+          <p:cNvPr id="8" name="Content Placeholder 7">
+            <a:extLst>
+              <a:ext uri="{FF2B5EF4-FFF2-40B4-BE49-F238E27FC236}">
+                <a16:creationId xmlns:a16="http://schemas.microsoft.com/office/drawing/2014/main" id="{2BED3EB3-7E98-4A82-8335-7321D9E37B16}"/>
+              </a:ext>
+            </a:extLst>
+          </p:cNvPr>
+          <p:cNvSpPr>
+            <a:spLocks noGrp="1"/>
+          </p:cNvSpPr>
+          <p:nvPr>
+            <p:ph idx="1"/>
+          </p:nvPr>
+        </p:nvSpPr>
+        <p:spPr/>
+        <p:txBody>
+          <a:bodyPr/>
+          <a:lstStyle/>
+          <a:p>
+            <a:endParaRPr lang="en-US"/>
+          </a:p>
+        </p:txBody>
+      </p:sp>
+      <p:sp>
+        <p:nvSpPr>
+          <p:cNvPr id="4" name="Date Placeholder 3">
+            <a:extLst>
+              <a:ext uri="{FF2B5EF4-FFF2-40B4-BE49-F238E27FC236}">
+                <a16:creationId xmlns:a16="http://schemas.microsoft.com/office/drawing/2014/main" id="{540F37F1-4F33-429F-A568-1A3ADC499E54}"/>
+              </a:ext>
+            </a:extLst>
+          </p:cNvPr>
+          <p:cNvSpPr>
+            <a:spLocks noGrp="1"/>
+          </p:cNvSpPr>
+          <p:nvPr>
+            <p:ph type="dt" sz="half" idx="10"/>
+          </p:nvPr>
+        </p:nvSpPr>
+        <p:spPr/>
+        <p:txBody>
+          <a:bodyPr/>
+          <a:lstStyle/>
+          <a:p>
+            <a:fld id="{B08FEED8-D7D4-44E9-BFBC-ED06B5996D94}" type="datetime4">
+              <a:rPr lang="en-US" smtClean="0"/>
+              <a:t>July 17, 2019</a:t>
+            </a:fld>
+            <a:endParaRPr lang="en-US" dirty="0"/>
+          </a:p>
+        </p:txBody>
+      </p:sp>
+      <p:sp>
+        <p:nvSpPr>
+          <p:cNvPr id="5" name="Footer Placeholder 4">
+            <a:extLst>
+              <a:ext uri="{FF2B5EF4-FFF2-40B4-BE49-F238E27FC236}">
+                <a16:creationId xmlns:a16="http://schemas.microsoft.com/office/drawing/2014/main" id="{673FFA57-C126-4795-A5F6-DD33AAC5ACBD}"/>
+              </a:ext>
+            </a:extLst>
+          </p:cNvPr>
+          <p:cNvSpPr>
+            <a:spLocks noGrp="1"/>
+          </p:cNvSpPr>
+          <p:nvPr>
+            <p:ph type="ftr" sz="quarter" idx="11"/>
+          </p:nvPr>
+        </p:nvSpPr>
+        <p:spPr/>
+        <p:txBody>
+          <a:bodyPr/>
+          <a:lstStyle/>
+          <a:p>
+            <a:r>
+              <a:rPr lang="en-US"/>
+              <a:t>Digital Scholarship Services </a:t>
+            </a:r>
+            <a:r>
+              <a:rPr lang="en-US">
+                <a:solidFill>
+                  <a:schemeClr val="accent1">
+                    <a:lumMod val="50000"/>
+                  </a:schemeClr>
+                </a:solidFill>
+              </a:rPr>
+              <a:t>| Email</a:t>
+            </a:r>
+            <a:r>
+              <a:rPr lang="en-US"/>
+              <a:t> cf24@rice.edu </a:t>
+            </a:r>
+            <a:r>
+              <a:rPr lang="en-US">
+                <a:solidFill>
+                  <a:schemeClr val="accent1">
+                    <a:lumMod val="50000"/>
+                  </a:schemeClr>
+                </a:solidFill>
+              </a:rPr>
+              <a:t>|</a:t>
+            </a:r>
+            <a:r>
+              <a:rPr lang="en-US"/>
+              <a:t> library.rice.edu/dss</a:t>
+            </a:r>
+            <a:endParaRPr lang="en-US" dirty="0"/>
+          </a:p>
+        </p:txBody>
+      </p:sp>
+      <p:sp>
+        <p:nvSpPr>
+          <p:cNvPr id="6" name="Slide Number Placeholder 5">
+            <a:extLst>
+              <a:ext uri="{FF2B5EF4-FFF2-40B4-BE49-F238E27FC236}">
+                <a16:creationId xmlns:a16="http://schemas.microsoft.com/office/drawing/2014/main" id="{2FA49567-BB70-4798-8746-D0B522CCEE20}"/>
+              </a:ext>
+            </a:extLst>
+          </p:cNvPr>
+          <p:cNvSpPr>
+            <a:spLocks noGrp="1"/>
+          </p:cNvSpPr>
+          <p:nvPr>
+            <p:ph type="sldNum" sz="quarter" idx="12"/>
+          </p:nvPr>
+        </p:nvSpPr>
+        <p:spPr/>
+        <p:txBody>
+          <a:bodyPr/>
+          <a:lstStyle/>
+          <a:p>
+            <a:fld id="{D57F1E4F-1CFF-5643-939E-02111984F565}" type="slidenum">
+              <a:rPr lang="en-US" smtClean="0"/>
+              <a:t>6</a:t>
+            </a:fld>
+            <a:endParaRPr lang="en-US" dirty="0"/>
+          </a:p>
+        </p:txBody>
+      </p:sp>
+    </p:spTree>
+    <p:extLst>
+      <p:ext uri="{BB962C8B-B14F-4D97-AF65-F5344CB8AC3E}">
+        <p14:creationId xmlns:p14="http://schemas.microsoft.com/office/powerpoint/2010/main" val="528821766"/>
+      </p:ext>
+    </p:extLst>
+  </p:cSld>
+  <p:clrMapOvr>
+    <a:masterClrMapping/>
+  </p:clrMapOvr>
+</p:sld>
+</file>
+
+<file path=ppt/slides/slide7.xml><?xml version="1.0" encoding="utf-8"?>
+<p:sld xmlns:a="http://schemas.openxmlformats.org/drawingml/2006/main" xmlns:r="http://schemas.openxmlformats.org/officeDocument/2006/relationships" xmlns:p="http://schemas.openxmlformats.org/presentationml/2006/main">
+  <p:cSld>
+    <p:spTree>
+      <p:nvGrpSpPr>
+        <p:cNvPr id="1" name=""/>
+        <p:cNvGrpSpPr/>
+        <p:nvPr/>
+      </p:nvGrpSpPr>
+      <p:grpSpPr>
+        <a:xfrm>
+          <a:off x="0" y="0"/>
+          <a:ext cx="0" cy="0"/>
+          <a:chOff x="0" y="0"/>
+          <a:chExt cx="0" cy="0"/>
+        </a:xfrm>
+      </p:grpSpPr>
+      <p:sp>
+        <p:nvSpPr>
+          <p:cNvPr id="7" name="Title 6">
+            <a:extLst>
+              <a:ext uri="{FF2B5EF4-FFF2-40B4-BE49-F238E27FC236}">
+                <a16:creationId xmlns:a16="http://schemas.microsoft.com/office/drawing/2014/main" id="{495B4BC0-844B-4414-A623-BEF78AAC1BA1}"/>
+              </a:ext>
+            </a:extLst>
+          </p:cNvPr>
+          <p:cNvSpPr>
+            <a:spLocks noGrp="1"/>
+          </p:cNvSpPr>
+          <p:nvPr>
+            <p:ph type="title"/>
+          </p:nvPr>
+        </p:nvSpPr>
+        <p:spPr/>
+        <p:txBody>
+          <a:bodyPr/>
+          <a:lstStyle/>
+          <a:p>
+            <a:r>
+              <a:rPr lang="en-US" dirty="0"/>
+              <a:t>PERIODIC COMPONENTS</a:t>
+            </a:r>
+          </a:p>
+        </p:txBody>
+      </p:sp>
+      <p:sp>
+        <p:nvSpPr>
+          <p:cNvPr id="8" name="Content Placeholder 7">
+            <a:extLst>
+              <a:ext uri="{FF2B5EF4-FFF2-40B4-BE49-F238E27FC236}">
+                <a16:creationId xmlns:a16="http://schemas.microsoft.com/office/drawing/2014/main" id="{2BED3EB3-7E98-4A82-8335-7321D9E37B16}"/>
+              </a:ext>
+            </a:extLst>
+          </p:cNvPr>
+          <p:cNvSpPr>
+            <a:spLocks noGrp="1"/>
+          </p:cNvSpPr>
+          <p:nvPr>
+            <p:ph idx="1"/>
+          </p:nvPr>
+        </p:nvSpPr>
+        <p:spPr/>
+        <p:txBody>
+          <a:bodyPr/>
+          <a:lstStyle/>
+          <a:p>
+            <a:endParaRPr lang="en-US" dirty="0"/>
+          </a:p>
+        </p:txBody>
+      </p:sp>
+      <p:sp>
+        <p:nvSpPr>
+          <p:cNvPr id="4" name="Date Placeholder 3">
+            <a:extLst>
+              <a:ext uri="{FF2B5EF4-FFF2-40B4-BE49-F238E27FC236}">
+                <a16:creationId xmlns:a16="http://schemas.microsoft.com/office/drawing/2014/main" id="{540F37F1-4F33-429F-A568-1A3ADC499E54}"/>
+              </a:ext>
+            </a:extLst>
+          </p:cNvPr>
+          <p:cNvSpPr>
+            <a:spLocks noGrp="1"/>
+          </p:cNvSpPr>
+          <p:nvPr>
+            <p:ph type="dt" sz="half" idx="10"/>
+          </p:nvPr>
+        </p:nvSpPr>
+        <p:spPr/>
+        <p:txBody>
+          <a:bodyPr/>
+          <a:lstStyle/>
+          <a:p>
+            <a:fld id="{B08FEED8-D7D4-44E9-BFBC-ED06B5996D94}" type="datetime4">
+              <a:rPr lang="en-US" smtClean="0"/>
+              <a:t>July 17, 2019</a:t>
+            </a:fld>
+            <a:endParaRPr lang="en-US" dirty="0"/>
+          </a:p>
+        </p:txBody>
+      </p:sp>
+      <p:sp>
+        <p:nvSpPr>
+          <p:cNvPr id="5" name="Footer Placeholder 4">
+            <a:extLst>
+              <a:ext uri="{FF2B5EF4-FFF2-40B4-BE49-F238E27FC236}">
+                <a16:creationId xmlns:a16="http://schemas.microsoft.com/office/drawing/2014/main" id="{673FFA57-C126-4795-A5F6-DD33AAC5ACBD}"/>
+              </a:ext>
+            </a:extLst>
+          </p:cNvPr>
+          <p:cNvSpPr>
+            <a:spLocks noGrp="1"/>
+          </p:cNvSpPr>
+          <p:nvPr>
+            <p:ph type="ftr" sz="quarter" idx="11"/>
+          </p:nvPr>
+        </p:nvSpPr>
+        <p:spPr/>
+        <p:txBody>
+          <a:bodyPr/>
+          <a:lstStyle/>
+          <a:p>
+            <a:r>
+              <a:rPr lang="en-US"/>
+              <a:t>Digital Scholarship Services </a:t>
+            </a:r>
+            <a:r>
+              <a:rPr lang="en-US">
+                <a:solidFill>
+                  <a:schemeClr val="accent1">
+                    <a:lumMod val="50000"/>
+                  </a:schemeClr>
+                </a:solidFill>
+              </a:rPr>
+              <a:t>| Email</a:t>
+            </a:r>
+            <a:r>
+              <a:rPr lang="en-US"/>
+              <a:t> cf24@rice.edu </a:t>
+            </a:r>
+            <a:r>
+              <a:rPr lang="en-US">
+                <a:solidFill>
+                  <a:schemeClr val="accent1">
+                    <a:lumMod val="50000"/>
+                  </a:schemeClr>
+                </a:solidFill>
+              </a:rPr>
+              <a:t>|</a:t>
+            </a:r>
+            <a:r>
+              <a:rPr lang="en-US"/>
+              <a:t> library.rice.edu/dss</a:t>
+            </a:r>
+            <a:endParaRPr lang="en-US" dirty="0"/>
+          </a:p>
+        </p:txBody>
+      </p:sp>
+      <p:sp>
+        <p:nvSpPr>
+          <p:cNvPr id="6" name="Slide Number Placeholder 5">
+            <a:extLst>
+              <a:ext uri="{FF2B5EF4-FFF2-40B4-BE49-F238E27FC236}">
+                <a16:creationId xmlns:a16="http://schemas.microsoft.com/office/drawing/2014/main" id="{2FA49567-BB70-4798-8746-D0B522CCEE20}"/>
+              </a:ext>
+            </a:extLst>
+          </p:cNvPr>
+          <p:cNvSpPr>
+            <a:spLocks noGrp="1"/>
+          </p:cNvSpPr>
+          <p:nvPr>
+            <p:ph type="sldNum" sz="quarter" idx="12"/>
+          </p:nvPr>
+        </p:nvSpPr>
+        <p:spPr/>
+        <p:txBody>
+          <a:bodyPr/>
+          <a:lstStyle/>
+          <a:p>
+            <a:fld id="{D57F1E4F-1CFF-5643-939E-02111984F565}" type="slidenum">
+              <a:rPr lang="en-US" smtClean="0"/>
+              <a:t>7</a:t>
+            </a:fld>
+            <a:endParaRPr lang="en-US" dirty="0"/>
+          </a:p>
+        </p:txBody>
+      </p:sp>
+    </p:spTree>
+    <p:extLst>
+      <p:ext uri="{BB962C8B-B14F-4D97-AF65-F5344CB8AC3E}">
+        <p14:creationId xmlns:p14="http://schemas.microsoft.com/office/powerpoint/2010/main" val="2609791034"/>
+      </p:ext>
+    </p:extLst>
+  </p:cSld>
+  <p:clrMapOvr>
+    <a:masterClrMapping/>
+  </p:clrMapOvr>
+</p:sld>
+</file>
+
+<file path=ppt/slides/slide8.xml><?xml version="1.0" encoding="utf-8"?>
+<p:sld xmlns:a="http://schemas.openxmlformats.org/drawingml/2006/main" xmlns:r="http://schemas.openxmlformats.org/officeDocument/2006/relationships" xmlns:p="http://schemas.openxmlformats.org/presentationml/2006/main">
+  <p:cSld>
+    <p:spTree>
+      <p:nvGrpSpPr>
+        <p:cNvPr id="1" name=""/>
+        <p:cNvGrpSpPr/>
+        <p:nvPr/>
+      </p:nvGrpSpPr>
+      <p:grpSpPr>
+        <a:xfrm>
+          <a:off x="0" y="0"/>
+          <a:ext cx="0" cy="0"/>
+          <a:chOff x="0" y="0"/>
+          <a:chExt cx="0" cy="0"/>
+        </a:xfrm>
+      </p:grpSpPr>
+      <p:sp>
+        <p:nvSpPr>
+          <p:cNvPr id="7" name="Title 6">
+            <a:extLst>
+              <a:ext uri="{FF2B5EF4-FFF2-40B4-BE49-F238E27FC236}">
+                <a16:creationId xmlns:a16="http://schemas.microsoft.com/office/drawing/2014/main" id="{495B4BC0-844B-4414-A623-BEF78AAC1BA1}"/>
+              </a:ext>
+            </a:extLst>
+          </p:cNvPr>
+          <p:cNvSpPr>
+            <a:spLocks noGrp="1"/>
+          </p:cNvSpPr>
+          <p:nvPr>
+            <p:ph type="title"/>
+          </p:nvPr>
+        </p:nvSpPr>
+        <p:spPr/>
+        <p:txBody>
+          <a:bodyPr/>
+          <a:lstStyle/>
+          <a:p>
+            <a:r>
+              <a:rPr lang="en-US" dirty="0"/>
+              <a:t>HOLIDAYS</a:t>
+            </a:r>
+          </a:p>
+        </p:txBody>
+      </p:sp>
+      <p:sp>
+        <p:nvSpPr>
+          <p:cNvPr id="8" name="Content Placeholder 7">
+            <a:extLst>
+              <a:ext uri="{FF2B5EF4-FFF2-40B4-BE49-F238E27FC236}">
+                <a16:creationId xmlns:a16="http://schemas.microsoft.com/office/drawing/2014/main" id="{2BED3EB3-7E98-4A82-8335-7321D9E37B16}"/>
+              </a:ext>
+            </a:extLst>
+          </p:cNvPr>
+          <p:cNvSpPr>
+            <a:spLocks noGrp="1"/>
+          </p:cNvSpPr>
+          <p:nvPr>
+            <p:ph idx="1"/>
+          </p:nvPr>
+        </p:nvSpPr>
+        <p:spPr/>
+        <p:txBody>
+          <a:bodyPr/>
+          <a:lstStyle/>
+          <a:p>
+            <a:endParaRPr lang="en-US" dirty="0"/>
+          </a:p>
+        </p:txBody>
+      </p:sp>
+      <p:sp>
+        <p:nvSpPr>
+          <p:cNvPr id="4" name="Date Placeholder 3">
+            <a:extLst>
+              <a:ext uri="{FF2B5EF4-FFF2-40B4-BE49-F238E27FC236}">
+                <a16:creationId xmlns:a16="http://schemas.microsoft.com/office/drawing/2014/main" id="{540F37F1-4F33-429F-A568-1A3ADC499E54}"/>
+              </a:ext>
+            </a:extLst>
+          </p:cNvPr>
+          <p:cNvSpPr>
+            <a:spLocks noGrp="1"/>
+          </p:cNvSpPr>
+          <p:nvPr>
+            <p:ph type="dt" sz="half" idx="10"/>
+          </p:nvPr>
+        </p:nvSpPr>
+        <p:spPr/>
+        <p:txBody>
+          <a:bodyPr/>
+          <a:lstStyle/>
+          <a:p>
+            <a:fld id="{B08FEED8-D7D4-44E9-BFBC-ED06B5996D94}" type="datetime4">
+              <a:rPr lang="en-US" smtClean="0"/>
+              <a:t>July 17, 2019</a:t>
+            </a:fld>
+            <a:endParaRPr lang="en-US" dirty="0"/>
+          </a:p>
+        </p:txBody>
+      </p:sp>
+      <p:sp>
+        <p:nvSpPr>
+          <p:cNvPr id="5" name="Footer Placeholder 4">
+            <a:extLst>
+              <a:ext uri="{FF2B5EF4-FFF2-40B4-BE49-F238E27FC236}">
+                <a16:creationId xmlns:a16="http://schemas.microsoft.com/office/drawing/2014/main" id="{673FFA57-C126-4795-A5F6-DD33AAC5ACBD}"/>
+              </a:ext>
+            </a:extLst>
+          </p:cNvPr>
+          <p:cNvSpPr>
+            <a:spLocks noGrp="1"/>
+          </p:cNvSpPr>
+          <p:nvPr>
+            <p:ph type="ftr" sz="quarter" idx="11"/>
+          </p:nvPr>
+        </p:nvSpPr>
+        <p:spPr/>
+        <p:txBody>
+          <a:bodyPr/>
+          <a:lstStyle/>
+          <a:p>
+            <a:r>
+              <a:rPr lang="en-US"/>
+              <a:t>Digital Scholarship Services </a:t>
+            </a:r>
+            <a:r>
+              <a:rPr lang="en-US">
+                <a:solidFill>
+                  <a:schemeClr val="accent1">
+                    <a:lumMod val="50000"/>
+                  </a:schemeClr>
+                </a:solidFill>
+              </a:rPr>
+              <a:t>| Email</a:t>
+            </a:r>
+            <a:r>
+              <a:rPr lang="en-US"/>
+              <a:t> cf24@rice.edu </a:t>
+            </a:r>
+            <a:r>
+              <a:rPr lang="en-US">
+                <a:solidFill>
+                  <a:schemeClr val="accent1">
+                    <a:lumMod val="50000"/>
+                  </a:schemeClr>
+                </a:solidFill>
+              </a:rPr>
+              <a:t>|</a:t>
+            </a:r>
+            <a:r>
+              <a:rPr lang="en-US"/>
+              <a:t> library.rice.edu/dss</a:t>
+            </a:r>
+            <a:endParaRPr lang="en-US" dirty="0"/>
+          </a:p>
+        </p:txBody>
+      </p:sp>
+      <p:sp>
+        <p:nvSpPr>
+          <p:cNvPr id="6" name="Slide Number Placeholder 5">
+            <a:extLst>
+              <a:ext uri="{FF2B5EF4-FFF2-40B4-BE49-F238E27FC236}">
+                <a16:creationId xmlns:a16="http://schemas.microsoft.com/office/drawing/2014/main" id="{2FA49567-BB70-4798-8746-D0B522CCEE20}"/>
+              </a:ext>
+            </a:extLst>
+          </p:cNvPr>
+          <p:cNvSpPr>
+            <a:spLocks noGrp="1"/>
+          </p:cNvSpPr>
+          <p:nvPr>
+            <p:ph type="sldNum" sz="quarter" idx="12"/>
+          </p:nvPr>
+        </p:nvSpPr>
+        <p:spPr/>
+        <p:txBody>
+          <a:bodyPr/>
+          <a:lstStyle/>
+          <a:p>
+            <a:fld id="{D57F1E4F-1CFF-5643-939E-02111984F565}" type="slidenum">
+              <a:rPr lang="en-US" smtClean="0"/>
+              <a:t>8</a:t>
+            </a:fld>
+            <a:endParaRPr lang="en-US" dirty="0"/>
+          </a:p>
+        </p:txBody>
+      </p:sp>
+    </p:spTree>
+    <p:extLst>
+      <p:ext uri="{BB962C8B-B14F-4D97-AF65-F5344CB8AC3E}">
+        <p14:creationId xmlns:p14="http://schemas.microsoft.com/office/powerpoint/2010/main" val="391148097"/>
+      </p:ext>
+    </p:extLst>
+  </p:cSld>
+  <p:clrMapOvr>
+    <a:masterClrMapping/>
+  </p:clrMapOvr>
+</p:sld>
+</file>
+
+<file path=ppt/slides/slide9.xml><?xml version="1.0" encoding="utf-8"?>
+<p:sld xmlns:a="http://schemas.openxmlformats.org/drawingml/2006/main" xmlns:r="http://schemas.openxmlformats.org/officeDocument/2006/relationships" xmlns:p="http://schemas.openxmlformats.org/presentationml/2006/main">
+  <p:cSld>
+    <p:spTree>
+      <p:nvGrpSpPr>
+        <p:cNvPr id="1" name=""/>
+        <p:cNvGrpSpPr/>
+        <p:nvPr/>
+      </p:nvGrpSpPr>
+      <p:grpSpPr>
+        <a:xfrm>
+          <a:off x="0" y="0"/>
+          <a:ext cx="0" cy="0"/>
+          <a:chOff x="0" y="0"/>
+          <a:chExt cx="0" cy="0"/>
+        </a:xfrm>
+      </p:grpSpPr>
+      <p:sp>
+        <p:nvSpPr>
+          <p:cNvPr id="7" name="Title 6">
+            <a:extLst>
+              <a:ext uri="{FF2B5EF4-FFF2-40B4-BE49-F238E27FC236}">
+                <a16:creationId xmlns:a16="http://schemas.microsoft.com/office/drawing/2014/main" id="{495B4BC0-844B-4414-A623-BEF78AAC1BA1}"/>
+              </a:ext>
+            </a:extLst>
+          </p:cNvPr>
+          <p:cNvSpPr>
+            <a:spLocks noGrp="1"/>
+          </p:cNvSpPr>
+          <p:nvPr>
+            <p:ph type="title"/>
+          </p:nvPr>
+        </p:nvSpPr>
+        <p:spPr/>
+        <p:txBody>
+          <a:bodyPr/>
+          <a:lstStyle/>
+          <a:p>
+            <a:r>
+              <a:rPr lang="en-US" dirty="0"/>
+              <a:t>WHITE NOISE</a:t>
+            </a:r>
+          </a:p>
+        </p:txBody>
+      </p:sp>
+      <p:sp>
+        <p:nvSpPr>
+          <p:cNvPr id="8" name="Content Placeholder 7">
+            <a:extLst>
+              <a:ext uri="{FF2B5EF4-FFF2-40B4-BE49-F238E27FC236}">
+                <a16:creationId xmlns:a16="http://schemas.microsoft.com/office/drawing/2014/main" id="{2BED3EB3-7E98-4A82-8335-7321D9E37B16}"/>
+              </a:ext>
+            </a:extLst>
+          </p:cNvPr>
+          <p:cNvSpPr>
+            <a:spLocks noGrp="1"/>
+          </p:cNvSpPr>
+          <p:nvPr>
+            <p:ph idx="1"/>
+          </p:nvPr>
+        </p:nvSpPr>
+        <p:spPr/>
+        <p:txBody>
+          <a:bodyPr/>
+          <a:lstStyle/>
+          <a:p>
+            <a:endParaRPr lang="en-US" dirty="0"/>
+          </a:p>
+        </p:txBody>
+      </p:sp>
+      <p:sp>
+        <p:nvSpPr>
+          <p:cNvPr id="4" name="Date Placeholder 3">
+            <a:extLst>
+              <a:ext uri="{FF2B5EF4-FFF2-40B4-BE49-F238E27FC236}">
+                <a16:creationId xmlns:a16="http://schemas.microsoft.com/office/drawing/2014/main" id="{540F37F1-4F33-429F-A568-1A3ADC499E54}"/>
+              </a:ext>
+            </a:extLst>
+          </p:cNvPr>
+          <p:cNvSpPr>
+            <a:spLocks noGrp="1"/>
+          </p:cNvSpPr>
+          <p:nvPr>
+            <p:ph type="dt" sz="half" idx="10"/>
+          </p:nvPr>
+        </p:nvSpPr>
+        <p:spPr/>
+        <p:txBody>
+          <a:bodyPr/>
+          <a:lstStyle/>
+          <a:p>
+            <a:fld id="{B08FEED8-D7D4-44E9-BFBC-ED06B5996D94}" type="datetime4">
+              <a:rPr lang="en-US" smtClean="0"/>
+              <a:t>July 17, 2019</a:t>
+            </a:fld>
+            <a:endParaRPr lang="en-US" dirty="0"/>
+          </a:p>
+        </p:txBody>
+      </p:sp>
+      <p:sp>
+        <p:nvSpPr>
+          <p:cNvPr id="5" name="Footer Placeholder 4">
+            <a:extLst>
+              <a:ext uri="{FF2B5EF4-FFF2-40B4-BE49-F238E27FC236}">
+                <a16:creationId xmlns:a16="http://schemas.microsoft.com/office/drawing/2014/main" id="{673FFA57-C126-4795-A5F6-DD33AAC5ACBD}"/>
+              </a:ext>
+            </a:extLst>
+          </p:cNvPr>
+          <p:cNvSpPr>
+            <a:spLocks noGrp="1"/>
+          </p:cNvSpPr>
+          <p:nvPr>
+            <p:ph type="ftr" sz="quarter" idx="11"/>
+          </p:nvPr>
+        </p:nvSpPr>
+        <p:spPr/>
+        <p:txBody>
+          <a:bodyPr/>
+          <a:lstStyle/>
+          <a:p>
+            <a:r>
+              <a:rPr lang="en-US"/>
+              <a:t>Digital Scholarship Services </a:t>
+            </a:r>
+            <a:r>
+              <a:rPr lang="en-US">
+                <a:solidFill>
+                  <a:schemeClr val="accent1">
+                    <a:lumMod val="50000"/>
+                  </a:schemeClr>
+                </a:solidFill>
+              </a:rPr>
+              <a:t>| Email</a:t>
+            </a:r>
+            <a:r>
+              <a:rPr lang="en-US"/>
+              <a:t> cf24@rice.edu </a:t>
+            </a:r>
+            <a:r>
+              <a:rPr lang="en-US">
+                <a:solidFill>
+                  <a:schemeClr val="accent1">
+                    <a:lumMod val="50000"/>
+                  </a:schemeClr>
+                </a:solidFill>
+              </a:rPr>
+              <a:t>|</a:t>
+            </a:r>
+            <a:r>
+              <a:rPr lang="en-US"/>
+              <a:t> library.rice.edu/dss</a:t>
+            </a:r>
+            <a:endParaRPr lang="en-US" dirty="0"/>
+          </a:p>
+        </p:txBody>
+      </p:sp>
+      <p:sp>
+        <p:nvSpPr>
+          <p:cNvPr id="6" name="Slide Number Placeholder 5">
+            <a:extLst>
+              <a:ext uri="{FF2B5EF4-FFF2-40B4-BE49-F238E27FC236}">
+                <a16:creationId xmlns:a16="http://schemas.microsoft.com/office/drawing/2014/main" id="{2FA49567-BB70-4798-8746-D0B522CCEE20}"/>
+              </a:ext>
+            </a:extLst>
+          </p:cNvPr>
+          <p:cNvSpPr>
+            <a:spLocks noGrp="1"/>
+          </p:cNvSpPr>
+          <p:nvPr>
+            <p:ph type="sldNum" sz="quarter" idx="12"/>
+          </p:nvPr>
+        </p:nvSpPr>
+        <p:spPr/>
+        <p:txBody>
+          <a:bodyPr/>
+          <a:lstStyle/>
+          <a:p>
+            <a:fld id="{D57F1E4F-1CFF-5643-939E-02111984F565}" type="slidenum">
+              <a:rPr lang="en-US" smtClean="0"/>
+              <a:t>9</a:t>
+            </a:fld>
+            <a:endParaRPr lang="en-US" dirty="0"/>
+          </a:p>
+        </p:txBody>
+      </p:sp>
+    </p:spTree>
+    <p:extLst>
+      <p:ext uri="{BB962C8B-B14F-4D97-AF65-F5344CB8AC3E}">
+        <p14:creationId xmlns:p14="http://schemas.microsoft.com/office/powerpoint/2010/main" val="4091772932"/>
       </p:ext>
     </p:extLst>
   </p:cSld>

</xml_diff>

<commit_message>
added a few lines
</commit_message>
<xml_diff>
--- a/tsa/Introduction to Time Series Analysis.pptx
+++ b/tsa/Introduction to Time Series Analysis.pptx
@@ -5,29 +5,30 @@
     <p:sldMasterId id="2147483707" r:id="rId1"/>
   </p:sldMasterIdLst>
   <p:notesMasterIdLst>
-    <p:notesMasterId r:id="rId22"/>
+    <p:notesMasterId r:id="rId23"/>
   </p:notesMasterIdLst>
   <p:sldIdLst>
     <p:sldId id="266" r:id="rId2"/>
     <p:sldId id="264" r:id="rId3"/>
     <p:sldId id="269" r:id="rId4"/>
-    <p:sldId id="278" r:id="rId5"/>
-    <p:sldId id="267" r:id="rId6"/>
-    <p:sldId id="270" r:id="rId7"/>
-    <p:sldId id="272" r:id="rId8"/>
-    <p:sldId id="277" r:id="rId9"/>
-    <p:sldId id="276" r:id="rId10"/>
-    <p:sldId id="273" r:id="rId11"/>
-    <p:sldId id="274" r:id="rId12"/>
-    <p:sldId id="275" r:id="rId13"/>
-    <p:sldId id="279" r:id="rId14"/>
-    <p:sldId id="280" r:id="rId15"/>
-    <p:sldId id="281" r:id="rId16"/>
-    <p:sldId id="282" r:id="rId17"/>
-    <p:sldId id="283" r:id="rId18"/>
-    <p:sldId id="284" r:id="rId19"/>
-    <p:sldId id="285" r:id="rId20"/>
-    <p:sldId id="268" r:id="rId21"/>
+    <p:sldId id="286" r:id="rId5"/>
+    <p:sldId id="278" r:id="rId6"/>
+    <p:sldId id="267" r:id="rId7"/>
+    <p:sldId id="270" r:id="rId8"/>
+    <p:sldId id="272" r:id="rId9"/>
+    <p:sldId id="277" r:id="rId10"/>
+    <p:sldId id="276" r:id="rId11"/>
+    <p:sldId id="273" r:id="rId12"/>
+    <p:sldId id="274" r:id="rId13"/>
+    <p:sldId id="275" r:id="rId14"/>
+    <p:sldId id="279" r:id="rId15"/>
+    <p:sldId id="280" r:id="rId16"/>
+    <p:sldId id="281" r:id="rId17"/>
+    <p:sldId id="282" r:id="rId18"/>
+    <p:sldId id="283" r:id="rId19"/>
+    <p:sldId id="284" r:id="rId20"/>
+    <p:sldId id="285" r:id="rId21"/>
+    <p:sldId id="268" r:id="rId22"/>
   </p:sldIdLst>
   <p:sldSz cx="12192000" cy="6858000"/>
   <p:notesSz cx="6858000" cy="9144000"/>
@@ -216,7 +217,7 @@
           <a:p>
             <a:fld id="{D46E3B93-8523-4DBC-8FC5-65A9B9CDE5EE}" type="datetimeFigureOut">
               <a:rPr lang="en-US" smtClean="0"/>
-              <a:t>7/17/2019</a:t>
+              <a:t>7/27/2019</a:t>
             </a:fld>
             <a:endParaRPr lang="en-US"/>
           </a:p>
@@ -612,7 +613,7 @@
           <a:p>
             <a:fld id="{CE8F6EB4-B6EF-44F6-BBD1-CD5E279CFAE2}" type="datetime4">
               <a:rPr lang="en-US" smtClean="0"/>
-              <a:t>July 17, 2019</a:t>
+              <a:t>July 27, 2019</a:t>
             </a:fld>
             <a:endParaRPr lang="en-US" dirty="0"/>
           </a:p>
@@ -784,7 +785,7 @@
           <a:p>
             <a:fld id="{8A405AA7-4C18-4A99-8AAA-8677C1976FC9}" type="datetime4">
               <a:rPr lang="en-US" smtClean="0"/>
-              <a:t>July 17, 2019</a:t>
+              <a:t>July 27, 2019</a:t>
             </a:fld>
             <a:endParaRPr lang="en-US" dirty="0"/>
           </a:p>
@@ -966,7 +967,7 @@
           <a:p>
             <a:fld id="{4EA0D668-33DD-41B9-B668-7E7FF430C345}" type="datetime4">
               <a:rPr lang="en-US" smtClean="0"/>
-              <a:t>July 17, 2019</a:t>
+              <a:t>July 27, 2019</a:t>
             </a:fld>
             <a:endParaRPr lang="en-US" dirty="0"/>
           </a:p>
@@ -1149,7 +1150,7 @@
           <a:p>
             <a:fld id="{8AAE40A0-A7D8-4DC3-BC9E-BADA32DA2004}" type="datetime4">
               <a:rPr lang="en-US" smtClean="0"/>
-              <a:t>July 17, 2019</a:t>
+              <a:t>July 27, 2019</a:t>
             </a:fld>
             <a:endParaRPr lang="en-US" dirty="0"/>
           </a:p>
@@ -1476,7 +1477,7 @@
           <a:p>
             <a:fld id="{B08FEED8-D7D4-44E9-BFBC-ED06B5996D94}" type="datetime4">
               <a:rPr lang="en-US" smtClean="0"/>
-              <a:t>July 17, 2019</a:t>
+              <a:t>July 27, 2019</a:t>
             </a:fld>
             <a:endParaRPr lang="en-US" dirty="0"/>
           </a:p>
@@ -1786,7 +1787,7 @@
           <a:p>
             <a:fld id="{A143C325-9442-4629-8CC6-5CAC69736C93}" type="datetime4">
               <a:rPr lang="en-US" smtClean="0"/>
-              <a:t>July 17, 2019</a:t>
+              <a:t>July 27, 2019</a:t>
             </a:fld>
             <a:endParaRPr lang="en-US" dirty="0"/>
           </a:p>
@@ -2154,7 +2155,7 @@
           <a:p>
             <a:fld id="{EEDAFACB-3FED-4607-9FDD-34A82581A119}" type="datetime4">
               <a:rPr lang="en-US" smtClean="0"/>
-              <a:t>July 17, 2019</a:t>
+              <a:t>July 27, 2019</a:t>
             </a:fld>
             <a:endParaRPr lang="en-US" dirty="0"/>
           </a:p>
@@ -2275,7 +2276,7 @@
           <a:p>
             <a:fld id="{EC2805D6-2E3E-42F7-ABBA-DCD51C704328}" type="datetime4">
               <a:rPr lang="en-US" smtClean="0"/>
-              <a:t>July 17, 2019</a:t>
+              <a:t>July 27, 2019</a:t>
             </a:fld>
             <a:endParaRPr lang="en-US" dirty="0"/>
           </a:p>
@@ -2374,7 +2375,7 @@
           <a:p>
             <a:fld id="{7A745AAB-8888-45FB-8C4E-B86AF9A05200}" type="datetime4">
               <a:rPr lang="en-US" smtClean="0"/>
-              <a:t>July 17, 2019</a:t>
+              <a:t>July 27, 2019</a:t>
             </a:fld>
             <a:endParaRPr lang="en-US" dirty="0"/>
           </a:p>
@@ -2653,7 +2654,7 @@
           <a:p>
             <a:fld id="{9F896CED-8AFA-412F-B61A-472E6093CDBA}" type="datetime4">
               <a:rPr lang="en-US" smtClean="0"/>
-              <a:t>July 17, 2019</a:t>
+              <a:t>July 27, 2019</a:t>
             </a:fld>
             <a:endParaRPr lang="en-US" dirty="0"/>
           </a:p>
@@ -2912,7 +2913,7 @@
           <a:p>
             <a:fld id="{61078AB2-2970-444D-B1FF-A9F37FC020F5}" type="datetime4">
               <a:rPr lang="en-US" smtClean="0"/>
-              <a:t>July 17, 2019</a:t>
+              <a:t>July 27, 2019</a:t>
             </a:fld>
             <a:endParaRPr lang="en-US" dirty="0"/>
           </a:p>
@@ -3130,7 +3131,7 @@
           <a:p>
             <a:fld id="{1148AE1E-D441-45CD-8192-49B13802301D}" type="datetime4">
               <a:rPr lang="en-US" smtClean="0"/>
-              <a:t>July 17, 2019</a:t>
+              <a:t>July 27, 2019</a:t>
             </a:fld>
             <a:endParaRPr lang="en-US" dirty="0"/>
           </a:p>
@@ -3881,7 +3882,7 @@
           <p:cNvPr id="7" name="Title 6">
             <a:extLst>
               <a:ext uri="{FF2B5EF4-FFF2-40B4-BE49-F238E27FC236}">
-                <a16:creationId xmlns:a16="http://schemas.microsoft.com/office/drawing/2014/main" id="{184E2338-1026-45D4-9455-B21A88F18B28}"/>
+                <a16:creationId xmlns:a16="http://schemas.microsoft.com/office/drawing/2014/main" id="{495B4BC0-844B-4414-A623-BEF78AAC1BA1}"/>
               </a:ext>
             </a:extLst>
           </p:cNvPr>
@@ -3899,43 +3900,33 @@
           <a:p>
             <a:r>
               <a:rPr lang="en-US" dirty="0"/>
-              <a:t>HOW TO MAKE YOUR</a:t>
-            </a:r>
-            <a:br>
-              <a:rPr lang="en-US" dirty="0"/>
-            </a:br>
-            <a:r>
-              <a:rPr lang="en-US" dirty="0"/>
-              <a:t>DATA STATIONARY</a:t>
-            </a:r>
-          </a:p>
-        </p:txBody>
-      </p:sp>
-      <p:sp>
-        <p:nvSpPr>
-          <p:cNvPr id="8" name="Text Placeholder 7">
-            <a:extLst>
-              <a:ext uri="{FF2B5EF4-FFF2-40B4-BE49-F238E27FC236}">
-                <a16:creationId xmlns:a16="http://schemas.microsoft.com/office/drawing/2014/main" id="{DB42CCAB-C8E2-48A8-A9DF-EB0383A8B33C}"/>
-              </a:ext>
-            </a:extLst>
-          </p:cNvPr>
-          <p:cNvSpPr>
-            <a:spLocks noGrp="1"/>
-          </p:cNvSpPr>
-          <p:nvPr>
-            <p:ph type="body" idx="1"/>
-          </p:nvPr>
-        </p:nvSpPr>
-        <p:spPr/>
-        <p:txBody>
-          <a:bodyPr/>
-          <a:lstStyle/>
-          <a:p>
-            <a:r>
-              <a:rPr lang="en-US" dirty="0"/>
-              <a:t>Make your data appetizing for modeling</a:t>
-            </a:r>
+              <a:t>WHITE NOISE</a:t>
+            </a:r>
+          </a:p>
+        </p:txBody>
+      </p:sp>
+      <p:sp>
+        <p:nvSpPr>
+          <p:cNvPr id="8" name="Content Placeholder 7">
+            <a:extLst>
+              <a:ext uri="{FF2B5EF4-FFF2-40B4-BE49-F238E27FC236}">
+                <a16:creationId xmlns:a16="http://schemas.microsoft.com/office/drawing/2014/main" id="{2BED3EB3-7E98-4A82-8335-7321D9E37B16}"/>
+              </a:ext>
+            </a:extLst>
+          </p:cNvPr>
+          <p:cNvSpPr>
+            <a:spLocks noGrp="1"/>
+          </p:cNvSpPr>
+          <p:nvPr>
+            <p:ph idx="1"/>
+          </p:nvPr>
+        </p:nvSpPr>
+        <p:spPr/>
+        <p:txBody>
+          <a:bodyPr/>
+          <a:lstStyle/>
+          <a:p>
+            <a:endParaRPr lang="en-US" dirty="0"/>
           </a:p>
         </p:txBody>
       </p:sp>
@@ -3944,7 +3935,7 @@
           <p:cNvPr id="4" name="Date Placeholder 3">
             <a:extLst>
               <a:ext uri="{FF2B5EF4-FFF2-40B4-BE49-F238E27FC236}">
-                <a16:creationId xmlns:a16="http://schemas.microsoft.com/office/drawing/2014/main" id="{1CA94ACB-62A5-4F09-8C21-F0CE9BFB1606}"/>
+                <a16:creationId xmlns:a16="http://schemas.microsoft.com/office/drawing/2014/main" id="{540F37F1-4F33-429F-A568-1A3ADC499E54}"/>
               </a:ext>
             </a:extLst>
           </p:cNvPr>
@@ -3960,9 +3951,9 @@
           <a:bodyPr/>
           <a:lstStyle/>
           <a:p>
-            <a:fld id="{8AAE40A0-A7D8-4DC3-BC9E-BADA32DA2004}" type="datetime4">
+            <a:fld id="{B08FEED8-D7D4-44E9-BFBC-ED06B5996D94}" type="datetime4">
               <a:rPr lang="en-US" smtClean="0"/>
-              <a:t>July 17, 2019</a:t>
+              <a:t>July 27, 2019</a:t>
             </a:fld>
             <a:endParaRPr lang="en-US" dirty="0"/>
           </a:p>
@@ -3973,7 +3964,7 @@
           <p:cNvPr id="5" name="Footer Placeholder 4">
             <a:extLst>
               <a:ext uri="{FF2B5EF4-FFF2-40B4-BE49-F238E27FC236}">
-                <a16:creationId xmlns:a16="http://schemas.microsoft.com/office/drawing/2014/main" id="{D20B02B0-893D-4696-B6F7-A126B8D18E99}"/>
+                <a16:creationId xmlns:a16="http://schemas.microsoft.com/office/drawing/2014/main" id="{673FFA57-C126-4795-A5F6-DD33AAC5ACBD}"/>
               </a:ext>
             </a:extLst>
           </p:cNvPr>
@@ -4030,7 +4021,7 @@
           <p:cNvPr id="6" name="Slide Number Placeholder 5">
             <a:extLst>
               <a:ext uri="{FF2B5EF4-FFF2-40B4-BE49-F238E27FC236}">
-                <a16:creationId xmlns:a16="http://schemas.microsoft.com/office/drawing/2014/main" id="{1CFDA495-0063-4571-8969-0DD770DB39E0}"/>
+                <a16:creationId xmlns:a16="http://schemas.microsoft.com/office/drawing/2014/main" id="{2FA49567-BB70-4798-8746-D0B522CCEE20}"/>
               </a:ext>
             </a:extLst>
           </p:cNvPr>
@@ -4057,7 +4048,7 @@
     </p:spTree>
     <p:extLst>
       <p:ext uri="{BB962C8B-B14F-4D97-AF65-F5344CB8AC3E}">
-        <p14:creationId xmlns:p14="http://schemas.microsoft.com/office/powerpoint/2010/main" val="3850339889"/>
+        <p14:creationId xmlns:p14="http://schemas.microsoft.com/office/powerpoint/2010/main" val="4091772932"/>
       </p:ext>
     </p:extLst>
   </p:cSld>
@@ -4089,7 +4080,7 @@
           <p:cNvPr id="7" name="Title 6">
             <a:extLst>
               <a:ext uri="{FF2B5EF4-FFF2-40B4-BE49-F238E27FC236}">
-                <a16:creationId xmlns:a16="http://schemas.microsoft.com/office/drawing/2014/main" id="{495B4BC0-844B-4414-A623-BEF78AAC1BA1}"/>
+                <a16:creationId xmlns:a16="http://schemas.microsoft.com/office/drawing/2014/main" id="{184E2338-1026-45D4-9455-B21A88F18B28}"/>
               </a:ext>
             </a:extLst>
           </p:cNvPr>
@@ -4107,33 +4098,43 @@
           <a:p>
             <a:r>
               <a:rPr lang="en-US" dirty="0"/>
-              <a:t>STATIONARITY</a:t>
-            </a:r>
-          </a:p>
-        </p:txBody>
-      </p:sp>
-      <p:sp>
-        <p:nvSpPr>
-          <p:cNvPr id="8" name="Content Placeholder 7">
-            <a:extLst>
-              <a:ext uri="{FF2B5EF4-FFF2-40B4-BE49-F238E27FC236}">
-                <a16:creationId xmlns:a16="http://schemas.microsoft.com/office/drawing/2014/main" id="{2BED3EB3-7E98-4A82-8335-7321D9E37B16}"/>
-              </a:ext>
-            </a:extLst>
-          </p:cNvPr>
-          <p:cNvSpPr>
-            <a:spLocks noGrp="1"/>
-          </p:cNvSpPr>
-          <p:nvPr>
-            <p:ph idx="1"/>
-          </p:nvPr>
-        </p:nvSpPr>
-        <p:spPr/>
-        <p:txBody>
-          <a:bodyPr/>
-          <a:lstStyle/>
-          <a:p>
-            <a:endParaRPr lang="en-US" dirty="0"/>
+              <a:t>HOW TO MAKE YOUR</a:t>
+            </a:r>
+            <a:br>
+              <a:rPr lang="en-US" dirty="0"/>
+            </a:br>
+            <a:r>
+              <a:rPr lang="en-US" dirty="0"/>
+              <a:t>DATA STATIONARY</a:t>
+            </a:r>
+          </a:p>
+        </p:txBody>
+      </p:sp>
+      <p:sp>
+        <p:nvSpPr>
+          <p:cNvPr id="8" name="Text Placeholder 7">
+            <a:extLst>
+              <a:ext uri="{FF2B5EF4-FFF2-40B4-BE49-F238E27FC236}">
+                <a16:creationId xmlns:a16="http://schemas.microsoft.com/office/drawing/2014/main" id="{DB42CCAB-C8E2-48A8-A9DF-EB0383A8B33C}"/>
+              </a:ext>
+            </a:extLst>
+          </p:cNvPr>
+          <p:cNvSpPr>
+            <a:spLocks noGrp="1"/>
+          </p:cNvSpPr>
+          <p:nvPr>
+            <p:ph type="body" idx="1"/>
+          </p:nvPr>
+        </p:nvSpPr>
+        <p:spPr/>
+        <p:txBody>
+          <a:bodyPr/>
+          <a:lstStyle/>
+          <a:p>
+            <a:r>
+              <a:rPr lang="en-US" dirty="0"/>
+              <a:t>Make your data appetizing for modeling</a:t>
+            </a:r>
           </a:p>
         </p:txBody>
       </p:sp>
@@ -4142,7 +4143,7 @@
           <p:cNvPr id="4" name="Date Placeholder 3">
             <a:extLst>
               <a:ext uri="{FF2B5EF4-FFF2-40B4-BE49-F238E27FC236}">
-                <a16:creationId xmlns:a16="http://schemas.microsoft.com/office/drawing/2014/main" id="{540F37F1-4F33-429F-A568-1A3ADC499E54}"/>
+                <a16:creationId xmlns:a16="http://schemas.microsoft.com/office/drawing/2014/main" id="{1CA94ACB-62A5-4F09-8C21-F0CE9BFB1606}"/>
               </a:ext>
             </a:extLst>
           </p:cNvPr>
@@ -4158,9 +4159,9 @@
           <a:bodyPr/>
           <a:lstStyle/>
           <a:p>
-            <a:fld id="{B08FEED8-D7D4-44E9-BFBC-ED06B5996D94}" type="datetime4">
+            <a:fld id="{8AAE40A0-A7D8-4DC3-BC9E-BADA32DA2004}" type="datetime4">
               <a:rPr lang="en-US" smtClean="0"/>
-              <a:t>July 17, 2019</a:t>
+              <a:t>July 27, 2019</a:t>
             </a:fld>
             <a:endParaRPr lang="en-US" dirty="0"/>
           </a:p>
@@ -4171,7 +4172,7 @@
           <p:cNvPr id="5" name="Footer Placeholder 4">
             <a:extLst>
               <a:ext uri="{FF2B5EF4-FFF2-40B4-BE49-F238E27FC236}">
-                <a16:creationId xmlns:a16="http://schemas.microsoft.com/office/drawing/2014/main" id="{673FFA57-C126-4795-A5F6-DD33AAC5ACBD}"/>
+                <a16:creationId xmlns:a16="http://schemas.microsoft.com/office/drawing/2014/main" id="{D20B02B0-893D-4696-B6F7-A126B8D18E99}"/>
               </a:ext>
             </a:extLst>
           </p:cNvPr>
@@ -4228,7 +4229,7 @@
           <p:cNvPr id="6" name="Slide Number Placeholder 5">
             <a:extLst>
               <a:ext uri="{FF2B5EF4-FFF2-40B4-BE49-F238E27FC236}">
-                <a16:creationId xmlns:a16="http://schemas.microsoft.com/office/drawing/2014/main" id="{2FA49567-BB70-4798-8746-D0B522CCEE20}"/>
+                <a16:creationId xmlns:a16="http://schemas.microsoft.com/office/drawing/2014/main" id="{1CFDA495-0063-4571-8969-0DD770DB39E0}"/>
               </a:ext>
             </a:extLst>
           </p:cNvPr>
@@ -4255,7 +4256,7 @@
     </p:spTree>
     <p:extLst>
       <p:ext uri="{BB962C8B-B14F-4D97-AF65-F5344CB8AC3E}">
-        <p14:creationId xmlns:p14="http://schemas.microsoft.com/office/powerpoint/2010/main" val="3590493067"/>
+        <p14:creationId xmlns:p14="http://schemas.microsoft.com/office/powerpoint/2010/main" val="3850339889"/>
       </p:ext>
     </p:extLst>
   </p:cSld>
@@ -4305,7 +4306,7 @@
           <a:p>
             <a:r>
               <a:rPr lang="en-US" dirty="0"/>
-              <a:t>DETRENDING</a:t>
+              <a:t>STATIONARITY</a:t>
             </a:r>
           </a:p>
         </p:txBody>
@@ -4358,7 +4359,7 @@
           <a:p>
             <a:fld id="{B08FEED8-D7D4-44E9-BFBC-ED06B5996D94}" type="datetime4">
               <a:rPr lang="en-US" smtClean="0"/>
-              <a:t>July 17, 2019</a:t>
+              <a:t>July 27, 2019</a:t>
             </a:fld>
             <a:endParaRPr lang="en-US" dirty="0"/>
           </a:p>
@@ -4453,7 +4454,7 @@
     </p:spTree>
     <p:extLst>
       <p:ext uri="{BB962C8B-B14F-4D97-AF65-F5344CB8AC3E}">
-        <p14:creationId xmlns:p14="http://schemas.microsoft.com/office/powerpoint/2010/main" val="4109370477"/>
+        <p14:creationId xmlns:p14="http://schemas.microsoft.com/office/powerpoint/2010/main" val="3590493067"/>
       </p:ext>
     </p:extLst>
   </p:cSld>
@@ -4482,10 +4483,10 @@
       </p:grpSpPr>
       <p:sp>
         <p:nvSpPr>
-          <p:cNvPr id="2" name="Title 1">
-            <a:extLst>
-              <a:ext uri="{FF2B5EF4-FFF2-40B4-BE49-F238E27FC236}">
-                <a16:creationId xmlns:a16="http://schemas.microsoft.com/office/drawing/2014/main" id="{A694862C-8B28-4EF5-9C6F-0187B05C2B03}"/>
+          <p:cNvPr id="7" name="Title 6">
+            <a:extLst>
+              <a:ext uri="{FF2B5EF4-FFF2-40B4-BE49-F238E27FC236}">
+                <a16:creationId xmlns:a16="http://schemas.microsoft.com/office/drawing/2014/main" id="{495B4BC0-844B-4414-A623-BEF78AAC1BA1}"/>
               </a:ext>
             </a:extLst>
           </p:cNvPr>
@@ -4503,17 +4504,17 @@
           <a:p>
             <a:r>
               <a:rPr lang="en-US" dirty="0"/>
-              <a:t>LAGGING</a:t>
-            </a:r>
-          </a:p>
-        </p:txBody>
-      </p:sp>
-      <p:sp>
-        <p:nvSpPr>
-          <p:cNvPr id="3" name="Content Placeholder 2">
-            <a:extLst>
-              <a:ext uri="{FF2B5EF4-FFF2-40B4-BE49-F238E27FC236}">
-                <a16:creationId xmlns:a16="http://schemas.microsoft.com/office/drawing/2014/main" id="{5DFC40A6-4344-46B7-89C4-4E16031C9B39}"/>
+              <a:t>DETRENDING</a:t>
+            </a:r>
+          </a:p>
+        </p:txBody>
+      </p:sp>
+      <p:sp>
+        <p:nvSpPr>
+          <p:cNvPr id="8" name="Content Placeholder 7">
+            <a:extLst>
+              <a:ext uri="{FF2B5EF4-FFF2-40B4-BE49-F238E27FC236}">
+                <a16:creationId xmlns:a16="http://schemas.microsoft.com/office/drawing/2014/main" id="{2BED3EB3-7E98-4A82-8335-7321D9E37B16}"/>
               </a:ext>
             </a:extLst>
           </p:cNvPr>
@@ -4529,7 +4530,7 @@
           <a:bodyPr/>
           <a:lstStyle/>
           <a:p>
-            <a:endParaRPr lang="en-US"/>
+            <a:endParaRPr lang="en-US" dirty="0"/>
           </a:p>
         </p:txBody>
       </p:sp>
@@ -4538,7 +4539,7 @@
           <p:cNvPr id="4" name="Date Placeholder 3">
             <a:extLst>
               <a:ext uri="{FF2B5EF4-FFF2-40B4-BE49-F238E27FC236}">
-                <a16:creationId xmlns:a16="http://schemas.microsoft.com/office/drawing/2014/main" id="{ADEE79BB-4734-4439-A76F-2976CABC29C1}"/>
+                <a16:creationId xmlns:a16="http://schemas.microsoft.com/office/drawing/2014/main" id="{540F37F1-4F33-429F-A568-1A3ADC499E54}"/>
               </a:ext>
             </a:extLst>
           </p:cNvPr>
@@ -4554,9 +4555,9 @@
           <a:bodyPr/>
           <a:lstStyle/>
           <a:p>
-            <a:fld id="{8AAE40A0-A7D8-4DC3-BC9E-BADA32DA2004}" type="datetime4">
+            <a:fld id="{B08FEED8-D7D4-44E9-BFBC-ED06B5996D94}" type="datetime4">
               <a:rPr lang="en-US" smtClean="0"/>
-              <a:t>July 17, 2019</a:t>
+              <a:t>July 27, 2019</a:t>
             </a:fld>
             <a:endParaRPr lang="en-US" dirty="0"/>
           </a:p>
@@ -4567,7 +4568,7 @@
           <p:cNvPr id="5" name="Footer Placeholder 4">
             <a:extLst>
               <a:ext uri="{FF2B5EF4-FFF2-40B4-BE49-F238E27FC236}">
-                <a16:creationId xmlns:a16="http://schemas.microsoft.com/office/drawing/2014/main" id="{14093F74-35B5-4B3E-BE77-B47F35290D05}"/>
+                <a16:creationId xmlns:a16="http://schemas.microsoft.com/office/drawing/2014/main" id="{673FFA57-C126-4795-A5F6-DD33AAC5ACBD}"/>
               </a:ext>
             </a:extLst>
           </p:cNvPr>
@@ -4624,7 +4625,7 @@
           <p:cNvPr id="6" name="Slide Number Placeholder 5">
             <a:extLst>
               <a:ext uri="{FF2B5EF4-FFF2-40B4-BE49-F238E27FC236}">
-                <a16:creationId xmlns:a16="http://schemas.microsoft.com/office/drawing/2014/main" id="{76F6E8AA-9A3E-467A-A16A-CED9E58CFA80}"/>
+                <a16:creationId xmlns:a16="http://schemas.microsoft.com/office/drawing/2014/main" id="{2FA49567-BB70-4798-8746-D0B522CCEE20}"/>
               </a:ext>
             </a:extLst>
           </p:cNvPr>
@@ -4651,7 +4652,7 @@
     </p:spTree>
     <p:extLst>
       <p:ext uri="{BB962C8B-B14F-4D97-AF65-F5344CB8AC3E}">
-        <p14:creationId xmlns:p14="http://schemas.microsoft.com/office/powerpoint/2010/main" val="3805551099"/>
+        <p14:creationId xmlns:p14="http://schemas.microsoft.com/office/powerpoint/2010/main" val="4109370477"/>
       </p:ext>
     </p:extLst>
   </p:cSld>
@@ -4683,7 +4684,7 @@
           <p:cNvPr id="2" name="Title 1">
             <a:extLst>
               <a:ext uri="{FF2B5EF4-FFF2-40B4-BE49-F238E27FC236}">
-                <a16:creationId xmlns:a16="http://schemas.microsoft.com/office/drawing/2014/main" id="{84FE5820-4288-4CB6-888A-5CBF5468888C}"/>
+                <a16:creationId xmlns:a16="http://schemas.microsoft.com/office/drawing/2014/main" id="{A694862C-8B28-4EF5-9C6F-0187B05C2B03}"/>
               </a:ext>
             </a:extLst>
           </p:cNvPr>
@@ -4701,7 +4702,7 @@
           <a:p>
             <a:r>
               <a:rPr lang="en-US" dirty="0"/>
-              <a:t>LAGGED SCATTERPLOTS</a:t>
+              <a:t>LAGGING</a:t>
             </a:r>
           </a:p>
         </p:txBody>
@@ -4711,7 +4712,7 @@
           <p:cNvPr id="3" name="Content Placeholder 2">
             <a:extLst>
               <a:ext uri="{FF2B5EF4-FFF2-40B4-BE49-F238E27FC236}">
-                <a16:creationId xmlns:a16="http://schemas.microsoft.com/office/drawing/2014/main" id="{2952943F-FC31-4BE3-AB00-BAB4B12957BE}"/>
+                <a16:creationId xmlns:a16="http://schemas.microsoft.com/office/drawing/2014/main" id="{5DFC40A6-4344-46B7-89C4-4E16031C9B39}"/>
               </a:ext>
             </a:extLst>
           </p:cNvPr>
@@ -4727,7 +4728,7 @@
           <a:bodyPr/>
           <a:lstStyle/>
           <a:p>
-            <a:endParaRPr lang="en-US" dirty="0"/>
+            <a:endParaRPr lang="en-US"/>
           </a:p>
         </p:txBody>
       </p:sp>
@@ -4736,7 +4737,7 @@
           <p:cNvPr id="4" name="Date Placeholder 3">
             <a:extLst>
               <a:ext uri="{FF2B5EF4-FFF2-40B4-BE49-F238E27FC236}">
-                <a16:creationId xmlns:a16="http://schemas.microsoft.com/office/drawing/2014/main" id="{F716348B-D7FE-46ED-8C48-CF5A55FF31CF}"/>
+                <a16:creationId xmlns:a16="http://schemas.microsoft.com/office/drawing/2014/main" id="{ADEE79BB-4734-4439-A76F-2976CABC29C1}"/>
               </a:ext>
             </a:extLst>
           </p:cNvPr>
@@ -4754,7 +4755,7 @@
           <a:p>
             <a:fld id="{8AAE40A0-A7D8-4DC3-BC9E-BADA32DA2004}" type="datetime4">
               <a:rPr lang="en-US" smtClean="0"/>
-              <a:t>July 17, 2019</a:t>
+              <a:t>July 27, 2019</a:t>
             </a:fld>
             <a:endParaRPr lang="en-US" dirty="0"/>
           </a:p>
@@ -4765,7 +4766,7 @@
           <p:cNvPr id="5" name="Footer Placeholder 4">
             <a:extLst>
               <a:ext uri="{FF2B5EF4-FFF2-40B4-BE49-F238E27FC236}">
-                <a16:creationId xmlns:a16="http://schemas.microsoft.com/office/drawing/2014/main" id="{34059279-A1E7-4F19-B4BF-8C6B59A4CEFF}"/>
+                <a16:creationId xmlns:a16="http://schemas.microsoft.com/office/drawing/2014/main" id="{14093F74-35B5-4B3E-BE77-B47F35290D05}"/>
               </a:ext>
             </a:extLst>
           </p:cNvPr>
@@ -4822,7 +4823,7 @@
           <p:cNvPr id="6" name="Slide Number Placeholder 5">
             <a:extLst>
               <a:ext uri="{FF2B5EF4-FFF2-40B4-BE49-F238E27FC236}">
-                <a16:creationId xmlns:a16="http://schemas.microsoft.com/office/drawing/2014/main" id="{DE722C41-7366-4DE2-9AF4-E75E189A7733}"/>
+                <a16:creationId xmlns:a16="http://schemas.microsoft.com/office/drawing/2014/main" id="{76F6E8AA-9A3E-467A-A16A-CED9E58CFA80}"/>
               </a:ext>
             </a:extLst>
           </p:cNvPr>
@@ -4849,7 +4850,7 @@
     </p:spTree>
     <p:extLst>
       <p:ext uri="{BB962C8B-B14F-4D97-AF65-F5344CB8AC3E}">
-        <p14:creationId xmlns:p14="http://schemas.microsoft.com/office/powerpoint/2010/main" val="2399367561"/>
+        <p14:creationId xmlns:p14="http://schemas.microsoft.com/office/powerpoint/2010/main" val="3805551099"/>
       </p:ext>
     </p:extLst>
   </p:cSld>
@@ -4878,10 +4879,10 @@
       </p:grpSpPr>
       <p:sp>
         <p:nvSpPr>
-          <p:cNvPr id="7" name="Title 6">
-            <a:extLst>
-              <a:ext uri="{FF2B5EF4-FFF2-40B4-BE49-F238E27FC236}">
-                <a16:creationId xmlns:a16="http://schemas.microsoft.com/office/drawing/2014/main" id="{7802FB34-7510-47BC-8952-A1FE9728B0BF}"/>
+          <p:cNvPr id="2" name="Title 1">
+            <a:extLst>
+              <a:ext uri="{FF2B5EF4-FFF2-40B4-BE49-F238E27FC236}">
+                <a16:creationId xmlns:a16="http://schemas.microsoft.com/office/drawing/2014/main" id="{84FE5820-4288-4CB6-888A-5CBF5468888C}"/>
               </a:ext>
             </a:extLst>
           </p:cNvPr>
@@ -4899,36 +4900,33 @@
           <a:p>
             <a:r>
               <a:rPr lang="en-US" dirty="0"/>
-              <a:t>ARIMA MODELS</a:t>
-            </a:r>
-          </a:p>
-        </p:txBody>
-      </p:sp>
-      <p:sp>
-        <p:nvSpPr>
-          <p:cNvPr id="8" name="Text Placeholder 7">
-            <a:extLst>
-              <a:ext uri="{FF2B5EF4-FFF2-40B4-BE49-F238E27FC236}">
-                <a16:creationId xmlns:a16="http://schemas.microsoft.com/office/drawing/2014/main" id="{FCA70F1A-579E-4144-AE97-14FFC08FF0F5}"/>
-              </a:ext>
-            </a:extLst>
-          </p:cNvPr>
-          <p:cNvSpPr>
-            <a:spLocks noGrp="1"/>
-          </p:cNvSpPr>
-          <p:nvPr>
-            <p:ph type="body" idx="1"/>
-          </p:nvPr>
-        </p:nvSpPr>
-        <p:spPr/>
-        <p:txBody>
-          <a:bodyPr/>
-          <a:lstStyle/>
-          <a:p>
-            <a:r>
-              <a:rPr lang="en-US" dirty="0"/>
-              <a:t>Interpretable, simple and speedy time series modeling</a:t>
-            </a:r>
+              <a:t>LAGGED SCATTERPLOTS</a:t>
+            </a:r>
+          </a:p>
+        </p:txBody>
+      </p:sp>
+      <p:sp>
+        <p:nvSpPr>
+          <p:cNvPr id="3" name="Content Placeholder 2">
+            <a:extLst>
+              <a:ext uri="{FF2B5EF4-FFF2-40B4-BE49-F238E27FC236}">
+                <a16:creationId xmlns:a16="http://schemas.microsoft.com/office/drawing/2014/main" id="{2952943F-FC31-4BE3-AB00-BAB4B12957BE}"/>
+              </a:ext>
+            </a:extLst>
+          </p:cNvPr>
+          <p:cNvSpPr>
+            <a:spLocks noGrp="1"/>
+          </p:cNvSpPr>
+          <p:nvPr>
+            <p:ph idx="1"/>
+          </p:nvPr>
+        </p:nvSpPr>
+        <p:spPr/>
+        <p:txBody>
+          <a:bodyPr/>
+          <a:lstStyle/>
+          <a:p>
+            <a:endParaRPr lang="en-US" dirty="0"/>
           </a:p>
         </p:txBody>
       </p:sp>
@@ -4937,7 +4935,7 @@
           <p:cNvPr id="4" name="Date Placeholder 3">
             <a:extLst>
               <a:ext uri="{FF2B5EF4-FFF2-40B4-BE49-F238E27FC236}">
-                <a16:creationId xmlns:a16="http://schemas.microsoft.com/office/drawing/2014/main" id="{3AD929EF-0967-4B34-81B8-24D9EF91892E}"/>
+                <a16:creationId xmlns:a16="http://schemas.microsoft.com/office/drawing/2014/main" id="{F716348B-D7FE-46ED-8C48-CF5A55FF31CF}"/>
               </a:ext>
             </a:extLst>
           </p:cNvPr>
@@ -4955,7 +4953,7 @@
           <a:p>
             <a:fld id="{8AAE40A0-A7D8-4DC3-BC9E-BADA32DA2004}" type="datetime4">
               <a:rPr lang="en-US" smtClean="0"/>
-              <a:t>July 17, 2019</a:t>
+              <a:t>July 27, 2019</a:t>
             </a:fld>
             <a:endParaRPr lang="en-US" dirty="0"/>
           </a:p>
@@ -4966,7 +4964,7 @@
           <p:cNvPr id="5" name="Footer Placeholder 4">
             <a:extLst>
               <a:ext uri="{FF2B5EF4-FFF2-40B4-BE49-F238E27FC236}">
-                <a16:creationId xmlns:a16="http://schemas.microsoft.com/office/drawing/2014/main" id="{3B5B35DD-F2EA-40D3-8039-8CD3802B2612}"/>
+                <a16:creationId xmlns:a16="http://schemas.microsoft.com/office/drawing/2014/main" id="{34059279-A1E7-4F19-B4BF-8C6B59A4CEFF}"/>
               </a:ext>
             </a:extLst>
           </p:cNvPr>
@@ -5023,7 +5021,7 @@
           <p:cNvPr id="6" name="Slide Number Placeholder 5">
             <a:extLst>
               <a:ext uri="{FF2B5EF4-FFF2-40B4-BE49-F238E27FC236}">
-                <a16:creationId xmlns:a16="http://schemas.microsoft.com/office/drawing/2014/main" id="{C3EB9A57-323C-47F5-867F-693F95A15FA4}"/>
+                <a16:creationId xmlns:a16="http://schemas.microsoft.com/office/drawing/2014/main" id="{DE722C41-7366-4DE2-9AF4-E75E189A7733}"/>
               </a:ext>
             </a:extLst>
           </p:cNvPr>
@@ -5050,7 +5048,7 @@
     </p:spTree>
     <p:extLst>
       <p:ext uri="{BB962C8B-B14F-4D97-AF65-F5344CB8AC3E}">
-        <p14:creationId xmlns:p14="http://schemas.microsoft.com/office/powerpoint/2010/main" val="107865345"/>
+        <p14:creationId xmlns:p14="http://schemas.microsoft.com/office/powerpoint/2010/main" val="2399367561"/>
       </p:ext>
     </p:extLst>
   </p:cSld>
@@ -5082,7 +5080,7 @@
           <p:cNvPr id="7" name="Title 6">
             <a:extLst>
               <a:ext uri="{FF2B5EF4-FFF2-40B4-BE49-F238E27FC236}">
-                <a16:creationId xmlns:a16="http://schemas.microsoft.com/office/drawing/2014/main" id="{75C0DCD3-95F8-4E1F-BF1A-5FAAB84A40A3}"/>
+                <a16:creationId xmlns:a16="http://schemas.microsoft.com/office/drawing/2014/main" id="{7802FB34-7510-47BC-8952-A1FE9728B0BF}"/>
               </a:ext>
             </a:extLst>
           </p:cNvPr>
@@ -5100,33 +5098,36 @@
           <a:p>
             <a:r>
               <a:rPr lang="en-US" dirty="0"/>
-              <a:t>ARIMA</a:t>
-            </a:r>
-          </a:p>
-        </p:txBody>
-      </p:sp>
-      <p:sp>
-        <p:nvSpPr>
-          <p:cNvPr id="8" name="Content Placeholder 7">
-            <a:extLst>
-              <a:ext uri="{FF2B5EF4-FFF2-40B4-BE49-F238E27FC236}">
-                <a16:creationId xmlns:a16="http://schemas.microsoft.com/office/drawing/2014/main" id="{52BB1FAB-BB61-4B66-A4EA-A0EABC2B3ECA}"/>
-              </a:ext>
-            </a:extLst>
-          </p:cNvPr>
-          <p:cNvSpPr>
-            <a:spLocks noGrp="1"/>
-          </p:cNvSpPr>
-          <p:nvPr>
-            <p:ph idx="1"/>
-          </p:nvPr>
-        </p:nvSpPr>
-        <p:spPr/>
-        <p:txBody>
-          <a:bodyPr/>
-          <a:lstStyle/>
-          <a:p>
-            <a:endParaRPr lang="en-US"/>
+              <a:t>ARIMA MODELS</a:t>
+            </a:r>
+          </a:p>
+        </p:txBody>
+      </p:sp>
+      <p:sp>
+        <p:nvSpPr>
+          <p:cNvPr id="8" name="Text Placeholder 7">
+            <a:extLst>
+              <a:ext uri="{FF2B5EF4-FFF2-40B4-BE49-F238E27FC236}">
+                <a16:creationId xmlns:a16="http://schemas.microsoft.com/office/drawing/2014/main" id="{FCA70F1A-579E-4144-AE97-14FFC08FF0F5}"/>
+              </a:ext>
+            </a:extLst>
+          </p:cNvPr>
+          <p:cNvSpPr>
+            <a:spLocks noGrp="1"/>
+          </p:cNvSpPr>
+          <p:nvPr>
+            <p:ph type="body" idx="1"/>
+          </p:nvPr>
+        </p:nvSpPr>
+        <p:spPr/>
+        <p:txBody>
+          <a:bodyPr/>
+          <a:lstStyle/>
+          <a:p>
+            <a:r>
+              <a:rPr lang="en-US" dirty="0"/>
+              <a:t>Interpretable, simple and speedy time series modeling</a:t>
+            </a:r>
           </a:p>
         </p:txBody>
       </p:sp>
@@ -5135,7 +5136,7 @@
           <p:cNvPr id="4" name="Date Placeholder 3">
             <a:extLst>
               <a:ext uri="{FF2B5EF4-FFF2-40B4-BE49-F238E27FC236}">
-                <a16:creationId xmlns:a16="http://schemas.microsoft.com/office/drawing/2014/main" id="{02256D86-7CE0-416E-B2A3-402D20EE9E90}"/>
+                <a16:creationId xmlns:a16="http://schemas.microsoft.com/office/drawing/2014/main" id="{3AD929EF-0967-4B34-81B8-24D9EF91892E}"/>
               </a:ext>
             </a:extLst>
           </p:cNvPr>
@@ -5151,9 +5152,9 @@
           <a:bodyPr/>
           <a:lstStyle/>
           <a:p>
-            <a:fld id="{B08FEED8-D7D4-44E9-BFBC-ED06B5996D94}" type="datetime4">
+            <a:fld id="{8AAE40A0-A7D8-4DC3-BC9E-BADA32DA2004}" type="datetime4">
               <a:rPr lang="en-US" smtClean="0"/>
-              <a:t>July 17, 2019</a:t>
+              <a:t>July 27, 2019</a:t>
             </a:fld>
             <a:endParaRPr lang="en-US" dirty="0"/>
           </a:p>
@@ -5164,7 +5165,7 @@
           <p:cNvPr id="5" name="Footer Placeholder 4">
             <a:extLst>
               <a:ext uri="{FF2B5EF4-FFF2-40B4-BE49-F238E27FC236}">
-                <a16:creationId xmlns:a16="http://schemas.microsoft.com/office/drawing/2014/main" id="{1D4ED112-7CF4-4BB9-B46E-B366A5054A9A}"/>
+                <a16:creationId xmlns:a16="http://schemas.microsoft.com/office/drawing/2014/main" id="{3B5B35DD-F2EA-40D3-8039-8CD3802B2612}"/>
               </a:ext>
             </a:extLst>
           </p:cNvPr>
@@ -5221,7 +5222,7 @@
           <p:cNvPr id="6" name="Slide Number Placeholder 5">
             <a:extLst>
               <a:ext uri="{FF2B5EF4-FFF2-40B4-BE49-F238E27FC236}">
-                <a16:creationId xmlns:a16="http://schemas.microsoft.com/office/drawing/2014/main" id="{8CC75551-85BF-4C9F-8893-AA28ECA8A6B5}"/>
+                <a16:creationId xmlns:a16="http://schemas.microsoft.com/office/drawing/2014/main" id="{C3EB9A57-323C-47F5-867F-693F95A15FA4}"/>
               </a:ext>
             </a:extLst>
           </p:cNvPr>
@@ -5248,7 +5249,7 @@
     </p:spTree>
     <p:extLst>
       <p:ext uri="{BB962C8B-B14F-4D97-AF65-F5344CB8AC3E}">
-        <p14:creationId xmlns:p14="http://schemas.microsoft.com/office/powerpoint/2010/main" val="1065550565"/>
+        <p14:creationId xmlns:p14="http://schemas.microsoft.com/office/powerpoint/2010/main" val="107865345"/>
       </p:ext>
     </p:extLst>
   </p:cSld>
@@ -5298,7 +5299,7 @@
           <a:p>
             <a:r>
               <a:rPr lang="en-US" dirty="0"/>
-              <a:t>AUTOREGRESSIVE</a:t>
+              <a:t>ARIMA</a:t>
             </a:r>
           </a:p>
         </p:txBody>
@@ -5351,7 +5352,7 @@
           <a:p>
             <a:fld id="{B08FEED8-D7D4-44E9-BFBC-ED06B5996D94}" type="datetime4">
               <a:rPr lang="en-US" smtClean="0"/>
-              <a:t>July 17, 2019</a:t>
+              <a:t>July 27, 2019</a:t>
             </a:fld>
             <a:endParaRPr lang="en-US" dirty="0"/>
           </a:p>
@@ -5446,7 +5447,7 @@
     </p:spTree>
     <p:extLst>
       <p:ext uri="{BB962C8B-B14F-4D97-AF65-F5344CB8AC3E}">
-        <p14:creationId xmlns:p14="http://schemas.microsoft.com/office/powerpoint/2010/main" val="4066560549"/>
+        <p14:creationId xmlns:p14="http://schemas.microsoft.com/office/powerpoint/2010/main" val="1065550565"/>
       </p:ext>
     </p:extLst>
   </p:cSld>
@@ -5475,10 +5476,10 @@
       </p:grpSpPr>
       <p:sp>
         <p:nvSpPr>
-          <p:cNvPr id="2" name="Title 1">
-            <a:extLst>
-              <a:ext uri="{FF2B5EF4-FFF2-40B4-BE49-F238E27FC236}">
-                <a16:creationId xmlns:a16="http://schemas.microsoft.com/office/drawing/2014/main" id="{D7EACF90-3E7B-4978-AB0C-ED5165419D19}"/>
+          <p:cNvPr id="7" name="Title 6">
+            <a:extLst>
+              <a:ext uri="{FF2B5EF4-FFF2-40B4-BE49-F238E27FC236}">
+                <a16:creationId xmlns:a16="http://schemas.microsoft.com/office/drawing/2014/main" id="{75C0DCD3-95F8-4E1F-BF1A-5FAAB84A40A3}"/>
               </a:ext>
             </a:extLst>
           </p:cNvPr>
@@ -5496,17 +5497,17 @@
           <a:p>
             <a:r>
               <a:rPr lang="en-US" dirty="0"/>
-              <a:t>MOVING AVERAGE</a:t>
-            </a:r>
-          </a:p>
-        </p:txBody>
-      </p:sp>
-      <p:sp>
-        <p:nvSpPr>
-          <p:cNvPr id="3" name="Content Placeholder 2">
-            <a:extLst>
-              <a:ext uri="{FF2B5EF4-FFF2-40B4-BE49-F238E27FC236}">
-                <a16:creationId xmlns:a16="http://schemas.microsoft.com/office/drawing/2014/main" id="{A7CEFEF5-E74A-4EFE-9368-8FD74B059E10}"/>
+              <a:t>AUTOREGRESSIVE</a:t>
+            </a:r>
+          </a:p>
+        </p:txBody>
+      </p:sp>
+      <p:sp>
+        <p:nvSpPr>
+          <p:cNvPr id="8" name="Content Placeholder 7">
+            <a:extLst>
+              <a:ext uri="{FF2B5EF4-FFF2-40B4-BE49-F238E27FC236}">
+                <a16:creationId xmlns:a16="http://schemas.microsoft.com/office/drawing/2014/main" id="{52BB1FAB-BB61-4B66-A4EA-A0EABC2B3ECA}"/>
               </a:ext>
             </a:extLst>
           </p:cNvPr>
@@ -5531,7 +5532,7 @@
           <p:cNvPr id="4" name="Date Placeholder 3">
             <a:extLst>
               <a:ext uri="{FF2B5EF4-FFF2-40B4-BE49-F238E27FC236}">
-                <a16:creationId xmlns:a16="http://schemas.microsoft.com/office/drawing/2014/main" id="{64E0A09F-EC7A-4EF6-AB3A-0DC48B1B7271}"/>
+                <a16:creationId xmlns:a16="http://schemas.microsoft.com/office/drawing/2014/main" id="{02256D86-7CE0-416E-B2A3-402D20EE9E90}"/>
               </a:ext>
             </a:extLst>
           </p:cNvPr>
@@ -5547,9 +5548,9 @@
           <a:bodyPr/>
           <a:lstStyle/>
           <a:p>
-            <a:fld id="{8AAE40A0-A7D8-4DC3-BC9E-BADA32DA2004}" type="datetime4">
+            <a:fld id="{B08FEED8-D7D4-44E9-BFBC-ED06B5996D94}" type="datetime4">
               <a:rPr lang="en-US" smtClean="0"/>
-              <a:t>July 17, 2019</a:t>
+              <a:t>July 27, 2019</a:t>
             </a:fld>
             <a:endParaRPr lang="en-US" dirty="0"/>
           </a:p>
@@ -5560,7 +5561,7 @@
           <p:cNvPr id="5" name="Footer Placeholder 4">
             <a:extLst>
               <a:ext uri="{FF2B5EF4-FFF2-40B4-BE49-F238E27FC236}">
-                <a16:creationId xmlns:a16="http://schemas.microsoft.com/office/drawing/2014/main" id="{9D8B7F07-2C50-4473-BABC-57C52FDD38D2}"/>
+                <a16:creationId xmlns:a16="http://schemas.microsoft.com/office/drawing/2014/main" id="{1D4ED112-7CF4-4BB9-B46E-B366A5054A9A}"/>
               </a:ext>
             </a:extLst>
           </p:cNvPr>
@@ -5617,7 +5618,7 @@
           <p:cNvPr id="6" name="Slide Number Placeholder 5">
             <a:extLst>
               <a:ext uri="{FF2B5EF4-FFF2-40B4-BE49-F238E27FC236}">
-                <a16:creationId xmlns:a16="http://schemas.microsoft.com/office/drawing/2014/main" id="{6BE5E43E-0696-4C60-A72C-BBB5B4448760}"/>
+                <a16:creationId xmlns:a16="http://schemas.microsoft.com/office/drawing/2014/main" id="{8CC75551-85BF-4C9F-8893-AA28ECA8A6B5}"/>
               </a:ext>
             </a:extLst>
           </p:cNvPr>
@@ -5644,7 +5645,7 @@
     </p:spTree>
     <p:extLst>
       <p:ext uri="{BB962C8B-B14F-4D97-AF65-F5344CB8AC3E}">
-        <p14:creationId xmlns:p14="http://schemas.microsoft.com/office/powerpoint/2010/main" val="3521777765"/>
+        <p14:creationId xmlns:p14="http://schemas.microsoft.com/office/powerpoint/2010/main" val="4066560549"/>
       </p:ext>
     </p:extLst>
   </p:cSld>
@@ -5676,7 +5677,7 @@
           <p:cNvPr id="2" name="Title 1">
             <a:extLst>
               <a:ext uri="{FF2B5EF4-FFF2-40B4-BE49-F238E27FC236}">
-                <a16:creationId xmlns:a16="http://schemas.microsoft.com/office/drawing/2014/main" id="{D1BF0482-6913-4A5E-A533-479864CB5349}"/>
+                <a16:creationId xmlns:a16="http://schemas.microsoft.com/office/drawing/2014/main" id="{D7EACF90-3E7B-4978-AB0C-ED5165419D19}"/>
               </a:ext>
             </a:extLst>
           </p:cNvPr>
@@ -5694,7 +5695,7 @@
           <a:p>
             <a:r>
               <a:rPr lang="en-US" dirty="0"/>
-              <a:t>PLAYING AROUND WITH ARIMA</a:t>
+              <a:t>MOVING AVERAGE</a:t>
             </a:r>
           </a:p>
         </p:txBody>
@@ -5704,7 +5705,7 @@
           <p:cNvPr id="3" name="Content Placeholder 2">
             <a:extLst>
               <a:ext uri="{FF2B5EF4-FFF2-40B4-BE49-F238E27FC236}">
-                <a16:creationId xmlns:a16="http://schemas.microsoft.com/office/drawing/2014/main" id="{D48271C9-2790-46C9-B80B-52D215430CB8}"/>
+                <a16:creationId xmlns:a16="http://schemas.microsoft.com/office/drawing/2014/main" id="{A7CEFEF5-E74A-4EFE-9368-8FD74B059E10}"/>
               </a:ext>
             </a:extLst>
           </p:cNvPr>
@@ -5729,7 +5730,7 @@
           <p:cNvPr id="4" name="Date Placeholder 3">
             <a:extLst>
               <a:ext uri="{FF2B5EF4-FFF2-40B4-BE49-F238E27FC236}">
-                <a16:creationId xmlns:a16="http://schemas.microsoft.com/office/drawing/2014/main" id="{B23DAF35-209C-48FA-AAAB-F69E14183A91}"/>
+                <a16:creationId xmlns:a16="http://schemas.microsoft.com/office/drawing/2014/main" id="{64E0A09F-EC7A-4EF6-AB3A-0DC48B1B7271}"/>
               </a:ext>
             </a:extLst>
           </p:cNvPr>
@@ -5747,7 +5748,7 @@
           <a:p>
             <a:fld id="{8AAE40A0-A7D8-4DC3-BC9E-BADA32DA2004}" type="datetime4">
               <a:rPr lang="en-US" smtClean="0"/>
-              <a:t>July 17, 2019</a:t>
+              <a:t>July 27, 2019</a:t>
             </a:fld>
             <a:endParaRPr lang="en-US" dirty="0"/>
           </a:p>
@@ -5758,7 +5759,7 @@
           <p:cNvPr id="5" name="Footer Placeholder 4">
             <a:extLst>
               <a:ext uri="{FF2B5EF4-FFF2-40B4-BE49-F238E27FC236}">
-                <a16:creationId xmlns:a16="http://schemas.microsoft.com/office/drawing/2014/main" id="{3D8E22A6-180D-41CF-9959-4347A11F2AD1}"/>
+                <a16:creationId xmlns:a16="http://schemas.microsoft.com/office/drawing/2014/main" id="{9D8B7F07-2C50-4473-BABC-57C52FDD38D2}"/>
               </a:ext>
             </a:extLst>
           </p:cNvPr>
@@ -5815,7 +5816,7 @@
           <p:cNvPr id="6" name="Slide Number Placeholder 5">
             <a:extLst>
               <a:ext uri="{FF2B5EF4-FFF2-40B4-BE49-F238E27FC236}">
-                <a16:creationId xmlns:a16="http://schemas.microsoft.com/office/drawing/2014/main" id="{CECE3146-0C2B-4CC7-BC7C-FD23AAF7ECAE}"/>
+                <a16:creationId xmlns:a16="http://schemas.microsoft.com/office/drawing/2014/main" id="{6BE5E43E-0696-4C60-A72C-BBB5B4448760}"/>
               </a:ext>
             </a:extLst>
           </p:cNvPr>
@@ -5842,7 +5843,7 @@
     </p:spTree>
     <p:extLst>
       <p:ext uri="{BB962C8B-B14F-4D97-AF65-F5344CB8AC3E}">
-        <p14:creationId xmlns:p14="http://schemas.microsoft.com/office/powerpoint/2010/main" val="3624540971"/>
+        <p14:creationId xmlns:p14="http://schemas.microsoft.com/office/powerpoint/2010/main" val="3521777765"/>
       </p:ext>
     </p:extLst>
   </p:cSld>
@@ -5933,7 +5934,7 @@
           <a:p>
             <a:fld id="{3686C9ED-58DA-41A6-B894-9B830C59600E}" type="datetime4">
               <a:rPr lang="en-US" smtClean="0"/>
-              <a:t>July 17, 2019</a:t>
+              <a:t>July 27, 2019</a:t>
             </a:fld>
             <a:endParaRPr lang="en-US" dirty="0"/>
           </a:p>
@@ -5983,7 +5984,22 @@
           <a:bodyPr/>
           <a:lstStyle/>
           <a:p>
-            <a:endParaRPr lang="en-US"/>
+            <a:r>
+              <a:rPr lang="en-US" dirty="0"/>
+              <a:t>Simply, data that are collected in a certain order</a:t>
+            </a:r>
+          </a:p>
+          <a:p>
+            <a:r>
+              <a:rPr lang="en-US" dirty="0"/>
+              <a:t>Evenly or unevenly spaced</a:t>
+            </a:r>
+          </a:p>
+          <a:p>
+            <a:r>
+              <a:rPr lang="en-US" dirty="0"/>
+              <a:t>Any number of variables</a:t>
+            </a:r>
           </a:p>
         </p:txBody>
       </p:sp>
@@ -6019,10 +6035,10 @@
       </p:grpSpPr>
       <p:sp>
         <p:nvSpPr>
-          <p:cNvPr id="7" name="Title 6">
-            <a:extLst>
-              <a:ext uri="{FF2B5EF4-FFF2-40B4-BE49-F238E27FC236}">
-                <a16:creationId xmlns:a16="http://schemas.microsoft.com/office/drawing/2014/main" id="{495B4BC0-844B-4414-A623-BEF78AAC1BA1}"/>
+          <p:cNvPr id="2" name="Title 1">
+            <a:extLst>
+              <a:ext uri="{FF2B5EF4-FFF2-40B4-BE49-F238E27FC236}">
+                <a16:creationId xmlns:a16="http://schemas.microsoft.com/office/drawing/2014/main" id="{D1BF0482-6913-4A5E-A533-479864CB5349}"/>
               </a:ext>
             </a:extLst>
           </p:cNvPr>
@@ -6040,17 +6056,17 @@
           <a:p>
             <a:r>
               <a:rPr lang="en-US" dirty="0"/>
-              <a:t>ACKNOWLEDGMENTS</a:t>
-            </a:r>
-          </a:p>
-        </p:txBody>
-      </p:sp>
-      <p:sp>
-        <p:nvSpPr>
-          <p:cNvPr id="8" name="Content Placeholder 7">
-            <a:extLst>
-              <a:ext uri="{FF2B5EF4-FFF2-40B4-BE49-F238E27FC236}">
-                <a16:creationId xmlns:a16="http://schemas.microsoft.com/office/drawing/2014/main" id="{2BED3EB3-7E98-4A82-8335-7321D9E37B16}"/>
+              <a:t>PLAYING AROUND WITH ARIMA</a:t>
+            </a:r>
+          </a:p>
+        </p:txBody>
+      </p:sp>
+      <p:sp>
+        <p:nvSpPr>
+          <p:cNvPr id="3" name="Content Placeholder 2">
+            <a:extLst>
+              <a:ext uri="{FF2B5EF4-FFF2-40B4-BE49-F238E27FC236}">
+                <a16:creationId xmlns:a16="http://schemas.microsoft.com/office/drawing/2014/main" id="{D48271C9-2790-46C9-B80B-52D215430CB8}"/>
               </a:ext>
             </a:extLst>
           </p:cNvPr>
@@ -6075,7 +6091,7 @@
           <p:cNvPr id="4" name="Date Placeholder 3">
             <a:extLst>
               <a:ext uri="{FF2B5EF4-FFF2-40B4-BE49-F238E27FC236}">
-                <a16:creationId xmlns:a16="http://schemas.microsoft.com/office/drawing/2014/main" id="{540F37F1-4F33-429F-A568-1A3ADC499E54}"/>
+                <a16:creationId xmlns:a16="http://schemas.microsoft.com/office/drawing/2014/main" id="{B23DAF35-209C-48FA-AAAB-F69E14183A91}"/>
               </a:ext>
             </a:extLst>
           </p:cNvPr>
@@ -6091,9 +6107,9 @@
           <a:bodyPr/>
           <a:lstStyle/>
           <a:p>
-            <a:fld id="{B08FEED8-D7D4-44E9-BFBC-ED06B5996D94}" type="datetime4">
+            <a:fld id="{8AAE40A0-A7D8-4DC3-BC9E-BADA32DA2004}" type="datetime4">
               <a:rPr lang="en-US" smtClean="0"/>
-              <a:t>July 17, 2019</a:t>
+              <a:t>July 27, 2019</a:t>
             </a:fld>
             <a:endParaRPr lang="en-US" dirty="0"/>
           </a:p>
@@ -6104,7 +6120,7 @@
           <p:cNvPr id="5" name="Footer Placeholder 4">
             <a:extLst>
               <a:ext uri="{FF2B5EF4-FFF2-40B4-BE49-F238E27FC236}">
-                <a16:creationId xmlns:a16="http://schemas.microsoft.com/office/drawing/2014/main" id="{673FFA57-C126-4795-A5F6-DD33AAC5ACBD}"/>
+                <a16:creationId xmlns:a16="http://schemas.microsoft.com/office/drawing/2014/main" id="{3D8E22A6-180D-41CF-9959-4347A11F2AD1}"/>
               </a:ext>
             </a:extLst>
           </p:cNvPr>
@@ -6161,7 +6177,7 @@
           <p:cNvPr id="6" name="Slide Number Placeholder 5">
             <a:extLst>
               <a:ext uri="{FF2B5EF4-FFF2-40B4-BE49-F238E27FC236}">
-                <a16:creationId xmlns:a16="http://schemas.microsoft.com/office/drawing/2014/main" id="{2FA49567-BB70-4798-8746-D0B522CCEE20}"/>
+                <a16:creationId xmlns:a16="http://schemas.microsoft.com/office/drawing/2014/main" id="{CECE3146-0C2B-4CC7-BC7C-FD23AAF7ECAE}"/>
               </a:ext>
             </a:extLst>
           </p:cNvPr>
@@ -6180,6 +6196,204 @@
             <a:fld id="{D57F1E4F-1CFF-5643-939E-02111984F565}" type="slidenum">
               <a:rPr lang="en-US" smtClean="0"/>
               <a:t>20</a:t>
+            </a:fld>
+            <a:endParaRPr lang="en-US" dirty="0"/>
+          </a:p>
+        </p:txBody>
+      </p:sp>
+    </p:spTree>
+    <p:extLst>
+      <p:ext uri="{BB962C8B-B14F-4D97-AF65-F5344CB8AC3E}">
+        <p14:creationId xmlns:p14="http://schemas.microsoft.com/office/powerpoint/2010/main" val="3624540971"/>
+      </p:ext>
+    </p:extLst>
+  </p:cSld>
+  <p:clrMapOvr>
+    <a:masterClrMapping/>
+  </p:clrMapOvr>
+</p:sld>
+</file>
+
+<file path=ppt/slides/slide21.xml><?xml version="1.0" encoding="utf-8"?>
+<p:sld xmlns:a="http://schemas.openxmlformats.org/drawingml/2006/main" xmlns:r="http://schemas.openxmlformats.org/officeDocument/2006/relationships" xmlns:p="http://schemas.openxmlformats.org/presentationml/2006/main">
+  <p:cSld>
+    <p:spTree>
+      <p:nvGrpSpPr>
+        <p:cNvPr id="1" name=""/>
+        <p:cNvGrpSpPr/>
+        <p:nvPr/>
+      </p:nvGrpSpPr>
+      <p:grpSpPr>
+        <a:xfrm>
+          <a:off x="0" y="0"/>
+          <a:ext cx="0" cy="0"/>
+          <a:chOff x="0" y="0"/>
+          <a:chExt cx="0" cy="0"/>
+        </a:xfrm>
+      </p:grpSpPr>
+      <p:sp>
+        <p:nvSpPr>
+          <p:cNvPr id="7" name="Title 6">
+            <a:extLst>
+              <a:ext uri="{FF2B5EF4-FFF2-40B4-BE49-F238E27FC236}">
+                <a16:creationId xmlns:a16="http://schemas.microsoft.com/office/drawing/2014/main" id="{495B4BC0-844B-4414-A623-BEF78AAC1BA1}"/>
+              </a:ext>
+            </a:extLst>
+          </p:cNvPr>
+          <p:cNvSpPr>
+            <a:spLocks noGrp="1"/>
+          </p:cNvSpPr>
+          <p:nvPr>
+            <p:ph type="title"/>
+          </p:nvPr>
+        </p:nvSpPr>
+        <p:spPr/>
+        <p:txBody>
+          <a:bodyPr/>
+          <a:lstStyle/>
+          <a:p>
+            <a:r>
+              <a:rPr lang="en-US" dirty="0"/>
+              <a:t>ACKNOWLEDGMENTS</a:t>
+            </a:r>
+          </a:p>
+        </p:txBody>
+      </p:sp>
+      <p:sp>
+        <p:nvSpPr>
+          <p:cNvPr id="8" name="Content Placeholder 7">
+            <a:extLst>
+              <a:ext uri="{FF2B5EF4-FFF2-40B4-BE49-F238E27FC236}">
+                <a16:creationId xmlns:a16="http://schemas.microsoft.com/office/drawing/2014/main" id="{2BED3EB3-7E98-4A82-8335-7321D9E37B16}"/>
+              </a:ext>
+            </a:extLst>
+          </p:cNvPr>
+          <p:cNvSpPr>
+            <a:spLocks noGrp="1"/>
+          </p:cNvSpPr>
+          <p:nvPr>
+            <p:ph idx="1"/>
+          </p:nvPr>
+        </p:nvSpPr>
+        <p:spPr/>
+        <p:txBody>
+          <a:bodyPr/>
+          <a:lstStyle/>
+          <a:p>
+            <a:endParaRPr lang="en-US"/>
+          </a:p>
+        </p:txBody>
+      </p:sp>
+      <p:sp>
+        <p:nvSpPr>
+          <p:cNvPr id="4" name="Date Placeholder 3">
+            <a:extLst>
+              <a:ext uri="{FF2B5EF4-FFF2-40B4-BE49-F238E27FC236}">
+                <a16:creationId xmlns:a16="http://schemas.microsoft.com/office/drawing/2014/main" id="{540F37F1-4F33-429F-A568-1A3ADC499E54}"/>
+              </a:ext>
+            </a:extLst>
+          </p:cNvPr>
+          <p:cNvSpPr>
+            <a:spLocks noGrp="1"/>
+          </p:cNvSpPr>
+          <p:nvPr>
+            <p:ph type="dt" sz="half" idx="10"/>
+          </p:nvPr>
+        </p:nvSpPr>
+        <p:spPr/>
+        <p:txBody>
+          <a:bodyPr/>
+          <a:lstStyle/>
+          <a:p>
+            <a:fld id="{B08FEED8-D7D4-44E9-BFBC-ED06B5996D94}" type="datetime4">
+              <a:rPr lang="en-US" smtClean="0"/>
+              <a:t>July 27, 2019</a:t>
+            </a:fld>
+            <a:endParaRPr lang="en-US" dirty="0"/>
+          </a:p>
+        </p:txBody>
+      </p:sp>
+      <p:sp>
+        <p:nvSpPr>
+          <p:cNvPr id="5" name="Footer Placeholder 4">
+            <a:extLst>
+              <a:ext uri="{FF2B5EF4-FFF2-40B4-BE49-F238E27FC236}">
+                <a16:creationId xmlns:a16="http://schemas.microsoft.com/office/drawing/2014/main" id="{673FFA57-C126-4795-A5F6-DD33AAC5ACBD}"/>
+              </a:ext>
+            </a:extLst>
+          </p:cNvPr>
+          <p:cNvSpPr>
+            <a:spLocks noGrp="1"/>
+          </p:cNvSpPr>
+          <p:nvPr>
+            <p:ph type="ftr" sz="quarter" idx="11"/>
+          </p:nvPr>
+        </p:nvSpPr>
+        <p:spPr/>
+        <p:txBody>
+          <a:bodyPr/>
+          <a:lstStyle/>
+          <a:p>
+            <a:r>
+              <a:rPr lang="en-US"/>
+              <a:t>Digital Scholarship Services </a:t>
+            </a:r>
+            <a:r>
+              <a:rPr lang="en-US">
+                <a:solidFill>
+                  <a:schemeClr val="accent1">
+                    <a:lumMod val="50000"/>
+                  </a:schemeClr>
+                </a:solidFill>
+              </a:rPr>
+              <a:t>| Email</a:t>
+            </a:r>
+            <a:r>
+              <a:rPr lang="en-US"/>
+              <a:t> cf24@rice.edu </a:t>
+            </a:r>
+            <a:r>
+              <a:rPr lang="en-US">
+                <a:solidFill>
+                  <a:schemeClr val="accent1">
+                    <a:lumMod val="50000"/>
+                  </a:schemeClr>
+                </a:solidFill>
+              </a:rPr>
+              <a:t>|</a:t>
+            </a:r>
+            <a:r>
+              <a:rPr lang="en-US"/>
+              <a:t> library.rice.edu/dss</a:t>
+            </a:r>
+            <a:endParaRPr lang="en-US" dirty="0"/>
+          </a:p>
+        </p:txBody>
+      </p:sp>
+      <p:sp>
+        <p:nvSpPr>
+          <p:cNvPr id="6" name="Slide Number Placeholder 5">
+            <a:extLst>
+              <a:ext uri="{FF2B5EF4-FFF2-40B4-BE49-F238E27FC236}">
+                <a16:creationId xmlns:a16="http://schemas.microsoft.com/office/drawing/2014/main" id="{2FA49567-BB70-4798-8746-D0B522CCEE20}"/>
+              </a:ext>
+            </a:extLst>
+          </p:cNvPr>
+          <p:cNvSpPr>
+            <a:spLocks noGrp="1"/>
+          </p:cNvSpPr>
+          <p:nvPr>
+            <p:ph type="sldNum" sz="quarter" idx="12"/>
+          </p:nvPr>
+        </p:nvSpPr>
+        <p:spPr/>
+        <p:txBody>
+          <a:bodyPr/>
+          <a:lstStyle/>
+          <a:p>
+            <a:fld id="{D57F1E4F-1CFF-5643-939E-02111984F565}" type="slidenum">
+              <a:rPr lang="en-US" smtClean="0"/>
+              <a:t>21</a:t>
             </a:fld>
             <a:endParaRPr lang="en-US" dirty="0"/>
           </a:p>
@@ -6264,7 +6478,43 @@
           <a:bodyPr/>
           <a:lstStyle/>
           <a:p>
-            <a:endParaRPr lang="en-US"/>
+            <a:r>
+              <a:rPr lang="en-US" dirty="0"/>
+              <a:t>Many statistical models depend upon data points being independent</a:t>
+            </a:r>
+          </a:p>
+          <a:p>
+            <a:pPr lvl="1"/>
+            <a:r>
+              <a:rPr lang="en-US" dirty="0"/>
+              <a:t>Linear Regression</a:t>
+            </a:r>
+          </a:p>
+          <a:p>
+            <a:pPr lvl="1"/>
+            <a:r>
+              <a:rPr lang="en-US" dirty="0"/>
+              <a:t>Logistic Regression</a:t>
+            </a:r>
+          </a:p>
+          <a:p>
+            <a:pPr lvl="1"/>
+            <a:r>
+              <a:rPr lang="en-US" dirty="0"/>
+              <a:t>Many more!</a:t>
+            </a:r>
+          </a:p>
+          <a:p>
+            <a:r>
+              <a:rPr lang="en-US" dirty="0"/>
+              <a:t>With time series, this basic assumption underlying the entire model can be wrong!</a:t>
+            </a:r>
+          </a:p>
+          <a:p>
+            <a:r>
+              <a:rPr lang="en-US" dirty="0"/>
+              <a:t>Disastrous results</a:t>
+            </a:r>
           </a:p>
         </p:txBody>
       </p:sp>
@@ -6291,7 +6541,7 @@
           <a:p>
             <a:fld id="{8AAE40A0-A7D8-4DC3-BC9E-BADA32DA2004}" type="datetime4">
               <a:rPr lang="en-US" smtClean="0"/>
-              <a:t>July 17, 2019</a:t>
+              <a:t>July 27, 2019</a:t>
             </a:fld>
             <a:endParaRPr lang="en-US" dirty="0"/>
           </a:p>
@@ -6462,7 +6712,44 @@
           <a:bodyPr/>
           <a:lstStyle/>
           <a:p>
-            <a:endParaRPr lang="en-US" dirty="0"/>
+            <a:r>
+              <a:rPr lang="en-US" dirty="0"/>
+              <a:t>Time series are extremely useful for forecasting</a:t>
+            </a:r>
+          </a:p>
+          <a:p>
+            <a:pPr lvl="1"/>
+            <a:r>
+              <a:rPr lang="en-US" dirty="0"/>
+              <a:t>Weather</a:t>
+            </a:r>
+          </a:p>
+          <a:p>
+            <a:pPr lvl="1"/>
+            <a:r>
+              <a:rPr lang="en-US" dirty="0"/>
+              <a:t>Stocks (although this is very hard!)</a:t>
+            </a:r>
+          </a:p>
+          <a:p>
+            <a:pPr lvl="1"/>
+            <a:r>
+              <a:rPr lang="en-US" dirty="0"/>
+              <a:t>Sports predictions</a:t>
+            </a:r>
+          </a:p>
+          <a:p>
+            <a:pPr lvl="1"/>
+            <a:r>
+              <a:rPr lang="en-US" dirty="0"/>
+              <a:t>Election predictions</a:t>
+            </a:r>
+          </a:p>
+          <a:p>
+            <a:r>
+              <a:rPr lang="en-US" dirty="0"/>
+              <a:t>Well suited to a wide class of problems</a:t>
+            </a:r>
           </a:p>
         </p:txBody>
       </p:sp>
@@ -6489,7 +6776,7 @@
           <a:p>
             <a:fld id="{8AAE40A0-A7D8-4DC3-BC9E-BADA32DA2004}" type="datetime4">
               <a:rPr lang="en-US" smtClean="0"/>
-              <a:t>July 17, 2019</a:t>
+              <a:t>July 27, 2019</a:t>
             </a:fld>
             <a:endParaRPr lang="en-US" dirty="0"/>
           </a:p>
@@ -6584,7 +6871,7 @@
     </p:spTree>
     <p:extLst>
       <p:ext uri="{BB962C8B-B14F-4D97-AF65-F5344CB8AC3E}">
-        <p14:creationId xmlns:p14="http://schemas.microsoft.com/office/powerpoint/2010/main" val="2280924979"/>
+        <p14:creationId xmlns:p14="http://schemas.microsoft.com/office/powerpoint/2010/main" val="1017541021"/>
       </p:ext>
     </p:extLst>
   </p:cSld>
@@ -6613,10 +6900,10 @@
       </p:grpSpPr>
       <p:sp>
         <p:nvSpPr>
-          <p:cNvPr id="7" name="Title 6">
-            <a:extLst>
-              <a:ext uri="{FF2B5EF4-FFF2-40B4-BE49-F238E27FC236}">
-                <a16:creationId xmlns:a16="http://schemas.microsoft.com/office/drawing/2014/main" id="{184E2338-1026-45D4-9455-B21A88F18B28}"/>
+          <p:cNvPr id="2" name="Title 1">
+            <a:extLst>
+              <a:ext uri="{FF2B5EF4-FFF2-40B4-BE49-F238E27FC236}">
+                <a16:creationId xmlns:a16="http://schemas.microsoft.com/office/drawing/2014/main" id="{BBEB1736-8933-4842-81FB-C5DCC7C07C68}"/>
               </a:ext>
             </a:extLst>
           </p:cNvPr>
@@ -6634,42 +6921,35 @@
           <a:p>
             <a:r>
               <a:rPr lang="en-US" dirty="0"/>
-              <a:t>TRENDS AND</a:t>
-            </a:r>
-            <a:br>
+              <a:t>ONE QUICK EXAMPLE</a:t>
+            </a:r>
+          </a:p>
+        </p:txBody>
+      </p:sp>
+      <p:sp>
+        <p:nvSpPr>
+          <p:cNvPr id="3" name="Content Placeholder 2">
+            <a:extLst>
+              <a:ext uri="{FF2B5EF4-FFF2-40B4-BE49-F238E27FC236}">
+                <a16:creationId xmlns:a16="http://schemas.microsoft.com/office/drawing/2014/main" id="{84C2C4E3-F71B-4C6F-8570-4ECA72D77DC3}"/>
+              </a:ext>
+            </a:extLst>
+          </p:cNvPr>
+          <p:cNvSpPr>
+            <a:spLocks noGrp="1"/>
+          </p:cNvSpPr>
+          <p:nvPr>
+            <p:ph idx="1"/>
+          </p:nvPr>
+        </p:nvSpPr>
+        <p:spPr/>
+        <p:txBody>
+          <a:bodyPr/>
+          <a:lstStyle/>
+          <a:p>
+            <a:r>
               <a:rPr lang="en-US" dirty="0"/>
-            </a:br>
-            <a:r>
-              <a:rPr lang="en-US" dirty="0"/>
-              <a:t>SEASONALITY</a:t>
-            </a:r>
-          </a:p>
-        </p:txBody>
-      </p:sp>
-      <p:sp>
-        <p:nvSpPr>
-          <p:cNvPr id="8" name="Text Placeholder 7">
-            <a:extLst>
-              <a:ext uri="{FF2B5EF4-FFF2-40B4-BE49-F238E27FC236}">
-                <a16:creationId xmlns:a16="http://schemas.microsoft.com/office/drawing/2014/main" id="{DB42CCAB-C8E2-48A8-A9DF-EB0383A8B33C}"/>
-              </a:ext>
-            </a:extLst>
-          </p:cNvPr>
-          <p:cNvSpPr>
-            <a:spLocks noGrp="1"/>
-          </p:cNvSpPr>
-          <p:nvPr>
-            <p:ph type="body" idx="1"/>
-          </p:nvPr>
-        </p:nvSpPr>
-        <p:spPr/>
-        <p:txBody>
-          <a:bodyPr/>
-          <a:lstStyle/>
-          <a:p>
-            <a:r>
-              <a:rPr lang="en-US" dirty="0"/>
-              <a:t>How to filter out the noise and model what really matters</a:t>
+              <a:t>Simple Linear Regression vs. a Time Series Model (ARIMA)</a:t>
             </a:r>
           </a:p>
         </p:txBody>
@@ -6679,7 +6959,7 @@
           <p:cNvPr id="4" name="Date Placeholder 3">
             <a:extLst>
               <a:ext uri="{FF2B5EF4-FFF2-40B4-BE49-F238E27FC236}">
-                <a16:creationId xmlns:a16="http://schemas.microsoft.com/office/drawing/2014/main" id="{1CA94ACB-62A5-4F09-8C21-F0CE9BFB1606}"/>
+                <a16:creationId xmlns:a16="http://schemas.microsoft.com/office/drawing/2014/main" id="{C81D5B6F-54DE-49BD-B70E-94836B9B8A8B}"/>
               </a:ext>
             </a:extLst>
           </p:cNvPr>
@@ -6697,7 +6977,7 @@
           <a:p>
             <a:fld id="{8AAE40A0-A7D8-4DC3-BC9E-BADA32DA2004}" type="datetime4">
               <a:rPr lang="en-US" smtClean="0"/>
-              <a:t>July 17, 2019</a:t>
+              <a:t>July 27, 2019</a:t>
             </a:fld>
             <a:endParaRPr lang="en-US" dirty="0"/>
           </a:p>
@@ -6708,7 +6988,7 @@
           <p:cNvPr id="5" name="Footer Placeholder 4">
             <a:extLst>
               <a:ext uri="{FF2B5EF4-FFF2-40B4-BE49-F238E27FC236}">
-                <a16:creationId xmlns:a16="http://schemas.microsoft.com/office/drawing/2014/main" id="{D20B02B0-893D-4696-B6F7-A126B8D18E99}"/>
+                <a16:creationId xmlns:a16="http://schemas.microsoft.com/office/drawing/2014/main" id="{A788BEBC-3FBD-4574-BD63-2697EB2420B4}"/>
               </a:ext>
             </a:extLst>
           </p:cNvPr>
@@ -6765,7 +7045,7 @@
           <p:cNvPr id="6" name="Slide Number Placeholder 5">
             <a:extLst>
               <a:ext uri="{FF2B5EF4-FFF2-40B4-BE49-F238E27FC236}">
-                <a16:creationId xmlns:a16="http://schemas.microsoft.com/office/drawing/2014/main" id="{1CFDA495-0063-4571-8969-0DD770DB39E0}"/>
+                <a16:creationId xmlns:a16="http://schemas.microsoft.com/office/drawing/2014/main" id="{2DD21C00-87BF-4A7C-B66E-67269A15B560}"/>
               </a:ext>
             </a:extLst>
           </p:cNvPr>
@@ -6792,7 +7072,7 @@
     </p:spTree>
     <p:extLst>
       <p:ext uri="{BB962C8B-B14F-4D97-AF65-F5344CB8AC3E}">
-        <p14:creationId xmlns:p14="http://schemas.microsoft.com/office/powerpoint/2010/main" val="2581962988"/>
+        <p14:creationId xmlns:p14="http://schemas.microsoft.com/office/powerpoint/2010/main" val="2280924979"/>
       </p:ext>
     </p:extLst>
   </p:cSld>
@@ -6824,7 +7104,7 @@
           <p:cNvPr id="7" name="Title 6">
             <a:extLst>
               <a:ext uri="{FF2B5EF4-FFF2-40B4-BE49-F238E27FC236}">
-                <a16:creationId xmlns:a16="http://schemas.microsoft.com/office/drawing/2014/main" id="{495B4BC0-844B-4414-A623-BEF78AAC1BA1}"/>
+                <a16:creationId xmlns:a16="http://schemas.microsoft.com/office/drawing/2014/main" id="{184E2338-1026-45D4-9455-B21A88F18B28}"/>
               </a:ext>
             </a:extLst>
           </p:cNvPr>
@@ -6842,33 +7122,43 @@
           <a:p>
             <a:r>
               <a:rPr lang="en-US" dirty="0"/>
-              <a:t>TRENDS</a:t>
-            </a:r>
-          </a:p>
-        </p:txBody>
-      </p:sp>
-      <p:sp>
-        <p:nvSpPr>
-          <p:cNvPr id="8" name="Content Placeholder 7">
-            <a:extLst>
-              <a:ext uri="{FF2B5EF4-FFF2-40B4-BE49-F238E27FC236}">
-                <a16:creationId xmlns:a16="http://schemas.microsoft.com/office/drawing/2014/main" id="{2BED3EB3-7E98-4A82-8335-7321D9E37B16}"/>
-              </a:ext>
-            </a:extLst>
-          </p:cNvPr>
-          <p:cNvSpPr>
-            <a:spLocks noGrp="1"/>
-          </p:cNvSpPr>
-          <p:nvPr>
-            <p:ph idx="1"/>
-          </p:nvPr>
-        </p:nvSpPr>
-        <p:spPr/>
-        <p:txBody>
-          <a:bodyPr/>
-          <a:lstStyle/>
-          <a:p>
-            <a:endParaRPr lang="en-US"/>
+              <a:t>TRENDS AND</a:t>
+            </a:r>
+            <a:br>
+              <a:rPr lang="en-US" dirty="0"/>
+            </a:br>
+            <a:r>
+              <a:rPr lang="en-US" dirty="0"/>
+              <a:t>SEASONALITY</a:t>
+            </a:r>
+          </a:p>
+        </p:txBody>
+      </p:sp>
+      <p:sp>
+        <p:nvSpPr>
+          <p:cNvPr id="8" name="Text Placeholder 7">
+            <a:extLst>
+              <a:ext uri="{FF2B5EF4-FFF2-40B4-BE49-F238E27FC236}">
+                <a16:creationId xmlns:a16="http://schemas.microsoft.com/office/drawing/2014/main" id="{DB42CCAB-C8E2-48A8-A9DF-EB0383A8B33C}"/>
+              </a:ext>
+            </a:extLst>
+          </p:cNvPr>
+          <p:cNvSpPr>
+            <a:spLocks noGrp="1"/>
+          </p:cNvSpPr>
+          <p:nvPr>
+            <p:ph type="body" idx="1"/>
+          </p:nvPr>
+        </p:nvSpPr>
+        <p:spPr/>
+        <p:txBody>
+          <a:bodyPr/>
+          <a:lstStyle/>
+          <a:p>
+            <a:r>
+              <a:rPr lang="en-US" dirty="0"/>
+              <a:t>How to filter out the noise and model what really matters</a:t>
+            </a:r>
           </a:p>
         </p:txBody>
       </p:sp>
@@ -6877,7 +7167,7 @@
           <p:cNvPr id="4" name="Date Placeholder 3">
             <a:extLst>
               <a:ext uri="{FF2B5EF4-FFF2-40B4-BE49-F238E27FC236}">
-                <a16:creationId xmlns:a16="http://schemas.microsoft.com/office/drawing/2014/main" id="{540F37F1-4F33-429F-A568-1A3ADC499E54}"/>
+                <a16:creationId xmlns:a16="http://schemas.microsoft.com/office/drawing/2014/main" id="{1CA94ACB-62A5-4F09-8C21-F0CE9BFB1606}"/>
               </a:ext>
             </a:extLst>
           </p:cNvPr>
@@ -6893,9 +7183,9 @@
           <a:bodyPr/>
           <a:lstStyle/>
           <a:p>
-            <a:fld id="{B08FEED8-D7D4-44E9-BFBC-ED06B5996D94}" type="datetime4">
+            <a:fld id="{8AAE40A0-A7D8-4DC3-BC9E-BADA32DA2004}" type="datetime4">
               <a:rPr lang="en-US" smtClean="0"/>
-              <a:t>July 17, 2019</a:t>
+              <a:t>July 27, 2019</a:t>
             </a:fld>
             <a:endParaRPr lang="en-US" dirty="0"/>
           </a:p>
@@ -6906,7 +7196,7 @@
           <p:cNvPr id="5" name="Footer Placeholder 4">
             <a:extLst>
               <a:ext uri="{FF2B5EF4-FFF2-40B4-BE49-F238E27FC236}">
-                <a16:creationId xmlns:a16="http://schemas.microsoft.com/office/drawing/2014/main" id="{673FFA57-C126-4795-A5F6-DD33AAC5ACBD}"/>
+                <a16:creationId xmlns:a16="http://schemas.microsoft.com/office/drawing/2014/main" id="{D20B02B0-893D-4696-B6F7-A126B8D18E99}"/>
               </a:ext>
             </a:extLst>
           </p:cNvPr>
@@ -6963,7 +7253,7 @@
           <p:cNvPr id="6" name="Slide Number Placeholder 5">
             <a:extLst>
               <a:ext uri="{FF2B5EF4-FFF2-40B4-BE49-F238E27FC236}">
-                <a16:creationId xmlns:a16="http://schemas.microsoft.com/office/drawing/2014/main" id="{2FA49567-BB70-4798-8746-D0B522CCEE20}"/>
+                <a16:creationId xmlns:a16="http://schemas.microsoft.com/office/drawing/2014/main" id="{1CFDA495-0063-4571-8969-0DD770DB39E0}"/>
               </a:ext>
             </a:extLst>
           </p:cNvPr>
@@ -6990,7 +7280,7 @@
     </p:spTree>
     <p:extLst>
       <p:ext uri="{BB962C8B-B14F-4D97-AF65-F5344CB8AC3E}">
-        <p14:creationId xmlns:p14="http://schemas.microsoft.com/office/powerpoint/2010/main" val="528821766"/>
+        <p14:creationId xmlns:p14="http://schemas.microsoft.com/office/powerpoint/2010/main" val="2581962988"/>
       </p:ext>
     </p:extLst>
   </p:cSld>
@@ -7040,7 +7330,7 @@
           <a:p>
             <a:r>
               <a:rPr lang="en-US" dirty="0"/>
-              <a:t>PERIODIC COMPONENTS</a:t>
+              <a:t>TRENDS</a:t>
             </a:r>
           </a:p>
         </p:txBody>
@@ -7066,7 +7356,7 @@
           <a:bodyPr/>
           <a:lstStyle/>
           <a:p>
-            <a:endParaRPr lang="en-US" dirty="0"/>
+            <a:endParaRPr lang="en-US"/>
           </a:p>
         </p:txBody>
       </p:sp>
@@ -7093,7 +7383,7 @@
           <a:p>
             <a:fld id="{B08FEED8-D7D4-44E9-BFBC-ED06B5996D94}" type="datetime4">
               <a:rPr lang="en-US" smtClean="0"/>
-              <a:t>July 17, 2019</a:t>
+              <a:t>July 27, 2019</a:t>
             </a:fld>
             <a:endParaRPr lang="en-US" dirty="0"/>
           </a:p>
@@ -7188,7 +7478,7 @@
     </p:spTree>
     <p:extLst>
       <p:ext uri="{BB962C8B-B14F-4D97-AF65-F5344CB8AC3E}">
-        <p14:creationId xmlns:p14="http://schemas.microsoft.com/office/powerpoint/2010/main" val="2609791034"/>
+        <p14:creationId xmlns:p14="http://schemas.microsoft.com/office/powerpoint/2010/main" val="528821766"/>
       </p:ext>
     </p:extLst>
   </p:cSld>
@@ -7238,7 +7528,7 @@
           <a:p>
             <a:r>
               <a:rPr lang="en-US" dirty="0"/>
-              <a:t>HOLIDAYS</a:t>
+              <a:t>PERIODIC COMPONENTS</a:t>
             </a:r>
           </a:p>
         </p:txBody>
@@ -7291,7 +7581,7 @@
           <a:p>
             <a:fld id="{B08FEED8-D7D4-44E9-BFBC-ED06B5996D94}" type="datetime4">
               <a:rPr lang="en-US" smtClean="0"/>
-              <a:t>July 17, 2019</a:t>
+              <a:t>July 27, 2019</a:t>
             </a:fld>
             <a:endParaRPr lang="en-US" dirty="0"/>
           </a:p>
@@ -7386,7 +7676,7 @@
     </p:spTree>
     <p:extLst>
       <p:ext uri="{BB962C8B-B14F-4D97-AF65-F5344CB8AC3E}">
-        <p14:creationId xmlns:p14="http://schemas.microsoft.com/office/powerpoint/2010/main" val="391148097"/>
+        <p14:creationId xmlns:p14="http://schemas.microsoft.com/office/powerpoint/2010/main" val="2609791034"/>
       </p:ext>
     </p:extLst>
   </p:cSld>
@@ -7436,7 +7726,7 @@
           <a:p>
             <a:r>
               <a:rPr lang="en-US" dirty="0"/>
-              <a:t>WHITE NOISE</a:t>
+              <a:t>HOLIDAYS</a:t>
             </a:r>
           </a:p>
         </p:txBody>
@@ -7489,7 +7779,7 @@
           <a:p>
             <a:fld id="{B08FEED8-D7D4-44E9-BFBC-ED06B5996D94}" type="datetime4">
               <a:rPr lang="en-US" smtClean="0"/>
-              <a:t>July 17, 2019</a:t>
+              <a:t>July 27, 2019</a:t>
             </a:fld>
             <a:endParaRPr lang="en-US" dirty="0"/>
           </a:p>
@@ -7584,7 +7874,7 @@
     </p:spTree>
     <p:extLst>
       <p:ext uri="{BB962C8B-B14F-4D97-AF65-F5344CB8AC3E}">
-        <p14:creationId xmlns:p14="http://schemas.microsoft.com/office/powerpoint/2010/main" val="4091772932"/>
+        <p14:creationId xmlns:p14="http://schemas.microsoft.com/office/powerpoint/2010/main" val="391148097"/>
       </p:ext>
     </p:extLst>
   </p:cSld>

</xml_diff>

<commit_message>
added visualizations to ppt
</commit_message>
<xml_diff>
--- a/tsa/Introduction to Time Series Analysis.pptx
+++ b/tsa/Introduction to Time Series Analysis.pptx
@@ -5,7 +5,7 @@
     <p:sldMasterId id="2147483707" r:id="rId1"/>
   </p:sldMasterIdLst>
   <p:notesMasterIdLst>
-    <p:notesMasterId r:id="rId24"/>
+    <p:notesMasterId r:id="rId28"/>
   </p:notesMasterIdLst>
   <p:sldIdLst>
     <p:sldId id="266" r:id="rId2"/>
@@ -15,21 +15,25 @@
     <p:sldId id="278" r:id="rId6"/>
     <p:sldId id="288" r:id="rId7"/>
     <p:sldId id="267" r:id="rId8"/>
-    <p:sldId id="270" r:id="rId9"/>
-    <p:sldId id="272" r:id="rId10"/>
-    <p:sldId id="277" r:id="rId11"/>
-    <p:sldId id="276" r:id="rId12"/>
-    <p:sldId id="273" r:id="rId13"/>
-    <p:sldId id="274" r:id="rId14"/>
-    <p:sldId id="275" r:id="rId15"/>
-    <p:sldId id="279" r:id="rId16"/>
-    <p:sldId id="280" r:id="rId17"/>
-    <p:sldId id="281" r:id="rId18"/>
-    <p:sldId id="282" r:id="rId19"/>
-    <p:sldId id="283" r:id="rId20"/>
-    <p:sldId id="284" r:id="rId21"/>
-    <p:sldId id="285" r:id="rId22"/>
-    <p:sldId id="268" r:id="rId23"/>
+    <p:sldId id="289" r:id="rId9"/>
+    <p:sldId id="270" r:id="rId10"/>
+    <p:sldId id="272" r:id="rId11"/>
+    <p:sldId id="292" r:id="rId12"/>
+    <p:sldId id="294" r:id="rId13"/>
+    <p:sldId id="295" r:id="rId14"/>
+    <p:sldId id="277" r:id="rId15"/>
+    <p:sldId id="276" r:id="rId16"/>
+    <p:sldId id="273" r:id="rId17"/>
+    <p:sldId id="274" r:id="rId18"/>
+    <p:sldId id="275" r:id="rId19"/>
+    <p:sldId id="279" r:id="rId20"/>
+    <p:sldId id="280" r:id="rId21"/>
+    <p:sldId id="281" r:id="rId22"/>
+    <p:sldId id="282" r:id="rId23"/>
+    <p:sldId id="283" r:id="rId24"/>
+    <p:sldId id="284" r:id="rId25"/>
+    <p:sldId id="285" r:id="rId26"/>
+    <p:sldId id="268" r:id="rId27"/>
   </p:sldIdLst>
   <p:sldSz cx="12192000" cy="6858000"/>
   <p:notesSz cx="6858000" cy="9144000"/>
@@ -3901,7 +3905,7 @@
           <a:p>
             <a:r>
               <a:rPr lang="en-US" dirty="0"/>
-              <a:t>HOLIDAYS</a:t>
+              <a:t>PERIODIC COMPONENTS</a:t>
             </a:r>
           </a:p>
         </p:txBody>
@@ -3927,7 +3931,16 @@
           <a:bodyPr/>
           <a:lstStyle/>
           <a:p>
-            <a:endParaRPr lang="en-US" dirty="0"/>
+            <a:r>
+              <a:rPr lang="en-US" dirty="0"/>
+              <a:t>Cycles that repeat</a:t>
+            </a:r>
+          </a:p>
+          <a:p>
+            <a:r>
+              <a:rPr lang="en-US" dirty="0"/>
+              <a:t>Commonly by month, day of week, day of year, etc.</a:t>
+            </a:r>
           </a:p>
         </p:txBody>
       </p:sp>
@@ -4049,7 +4062,7 @@
     </p:spTree>
     <p:extLst>
       <p:ext uri="{BB962C8B-B14F-4D97-AF65-F5344CB8AC3E}">
-        <p14:creationId xmlns:p14="http://schemas.microsoft.com/office/powerpoint/2010/main" val="391148097"/>
+        <p14:creationId xmlns:p14="http://schemas.microsoft.com/office/powerpoint/2010/main" val="2609791034"/>
       </p:ext>
     </p:extLst>
   </p:cSld>
@@ -4099,33 +4112,8 @@
           <a:p>
             <a:r>
               <a:rPr lang="en-US" dirty="0"/>
-              <a:t>WHITE NOISE</a:t>
-            </a:r>
-          </a:p>
-        </p:txBody>
-      </p:sp>
-      <p:sp>
-        <p:nvSpPr>
-          <p:cNvPr id="8" name="Content Placeholder 7">
-            <a:extLst>
-              <a:ext uri="{FF2B5EF4-FFF2-40B4-BE49-F238E27FC236}">
-                <a16:creationId xmlns:a16="http://schemas.microsoft.com/office/drawing/2014/main" id="{2BED3EB3-7E98-4A82-8335-7321D9E37B16}"/>
-              </a:ext>
-            </a:extLst>
-          </p:cNvPr>
-          <p:cNvSpPr>
-            <a:spLocks noGrp="1"/>
-          </p:cNvSpPr>
-          <p:nvPr>
-            <p:ph idx="1"/>
-          </p:nvPr>
-        </p:nvSpPr>
-        <p:spPr/>
-        <p:txBody>
-          <a:bodyPr/>
-          <a:lstStyle/>
-          <a:p>
-            <a:endParaRPr lang="en-US" dirty="0"/>
+              <a:t>BY HOUR OF DAY</a:t>
+            </a:r>
           </a:p>
         </p:txBody>
       </p:sp>
@@ -4244,10 +4232,40 @@
           </a:p>
         </p:txBody>
       </p:sp>
+      <p:pic>
+        <p:nvPicPr>
+          <p:cNvPr id="3" name="Picture 2" descr="A picture containing wall, photo&#10;&#10;Description automatically generated">
+            <a:extLst>
+              <a:ext uri="{FF2B5EF4-FFF2-40B4-BE49-F238E27FC236}">
+                <a16:creationId xmlns:a16="http://schemas.microsoft.com/office/drawing/2014/main" id="{EBB4BA44-0590-403D-983E-E588E89747FB}"/>
+              </a:ext>
+            </a:extLst>
+          </p:cNvPr>
+          <p:cNvPicPr>
+            <a:picLocks noChangeAspect="1"/>
+          </p:cNvPicPr>
+          <p:nvPr/>
+        </p:nvPicPr>
+        <p:blipFill>
+          <a:blip r:embed="rId2"/>
+          <a:stretch>
+            <a:fillRect/>
+          </a:stretch>
+        </p:blipFill>
+        <p:spPr>
+          <a:xfrm>
+            <a:off x="2318836" y="1605064"/>
+            <a:ext cx="6761123" cy="4507415"/>
+          </a:xfrm>
+          <a:prstGeom prst="rect">
+            <a:avLst/>
+          </a:prstGeom>
+        </p:spPr>
+      </p:pic>
     </p:spTree>
     <p:extLst>
       <p:ext uri="{BB962C8B-B14F-4D97-AF65-F5344CB8AC3E}">
-        <p14:creationId xmlns:p14="http://schemas.microsoft.com/office/powerpoint/2010/main" val="4091772932"/>
+        <p14:creationId xmlns:p14="http://schemas.microsoft.com/office/powerpoint/2010/main" val="52814363"/>
       </p:ext>
     </p:extLst>
   </p:cSld>
@@ -4279,7 +4297,7 @@
           <p:cNvPr id="7" name="Title 6">
             <a:extLst>
               <a:ext uri="{FF2B5EF4-FFF2-40B4-BE49-F238E27FC236}">
-                <a16:creationId xmlns:a16="http://schemas.microsoft.com/office/drawing/2014/main" id="{184E2338-1026-45D4-9455-B21A88F18B28}"/>
+                <a16:creationId xmlns:a16="http://schemas.microsoft.com/office/drawing/2014/main" id="{495B4BC0-844B-4414-A623-BEF78AAC1BA1}"/>
               </a:ext>
             </a:extLst>
           </p:cNvPr>
@@ -4297,42 +4315,7 @@
           <a:p>
             <a:r>
               <a:rPr lang="en-US" dirty="0"/>
-              <a:t>HOW TO MAKE YOUR</a:t>
-            </a:r>
-            <a:br>
-              <a:rPr lang="en-US" dirty="0"/>
-            </a:br>
-            <a:r>
-              <a:rPr lang="en-US" dirty="0"/>
-              <a:t>DATA STATIONARY</a:t>
-            </a:r>
-          </a:p>
-        </p:txBody>
-      </p:sp>
-      <p:sp>
-        <p:nvSpPr>
-          <p:cNvPr id="8" name="Text Placeholder 7">
-            <a:extLst>
-              <a:ext uri="{FF2B5EF4-FFF2-40B4-BE49-F238E27FC236}">
-                <a16:creationId xmlns:a16="http://schemas.microsoft.com/office/drawing/2014/main" id="{DB42CCAB-C8E2-48A8-A9DF-EB0383A8B33C}"/>
-              </a:ext>
-            </a:extLst>
-          </p:cNvPr>
-          <p:cNvSpPr>
-            <a:spLocks noGrp="1"/>
-          </p:cNvSpPr>
-          <p:nvPr>
-            <p:ph type="body" idx="1"/>
-          </p:nvPr>
-        </p:nvSpPr>
-        <p:spPr/>
-        <p:txBody>
-          <a:bodyPr/>
-          <a:lstStyle/>
-          <a:p>
-            <a:r>
-              <a:rPr lang="en-US" dirty="0"/>
-              <a:t>Make your data appetizing for modeling</a:t>
+              <a:t>BY DAY OF MONTH</a:t>
             </a:r>
           </a:p>
         </p:txBody>
@@ -4342,7 +4325,7 @@
           <p:cNvPr id="4" name="Date Placeholder 3">
             <a:extLst>
               <a:ext uri="{FF2B5EF4-FFF2-40B4-BE49-F238E27FC236}">
-                <a16:creationId xmlns:a16="http://schemas.microsoft.com/office/drawing/2014/main" id="{1CA94ACB-62A5-4F09-8C21-F0CE9BFB1606}"/>
+                <a16:creationId xmlns:a16="http://schemas.microsoft.com/office/drawing/2014/main" id="{540F37F1-4F33-429F-A568-1A3ADC499E54}"/>
               </a:ext>
             </a:extLst>
           </p:cNvPr>
@@ -4358,7 +4341,7 @@
           <a:bodyPr/>
           <a:lstStyle/>
           <a:p>
-            <a:fld id="{8AAE40A0-A7D8-4DC3-BC9E-BADA32DA2004}" type="datetime4">
+            <a:fld id="{B08FEED8-D7D4-44E9-BFBC-ED06B5996D94}" type="datetime4">
               <a:rPr lang="en-US" smtClean="0"/>
               <a:t>July 29, 2019</a:t>
             </a:fld>
@@ -4371,7 +4354,7 @@
           <p:cNvPr id="5" name="Footer Placeholder 4">
             <a:extLst>
               <a:ext uri="{FF2B5EF4-FFF2-40B4-BE49-F238E27FC236}">
-                <a16:creationId xmlns:a16="http://schemas.microsoft.com/office/drawing/2014/main" id="{D20B02B0-893D-4696-B6F7-A126B8D18E99}"/>
+                <a16:creationId xmlns:a16="http://schemas.microsoft.com/office/drawing/2014/main" id="{673FFA57-C126-4795-A5F6-DD33AAC5ACBD}"/>
               </a:ext>
             </a:extLst>
           </p:cNvPr>
@@ -4428,7 +4411,7 @@
           <p:cNvPr id="6" name="Slide Number Placeholder 5">
             <a:extLst>
               <a:ext uri="{FF2B5EF4-FFF2-40B4-BE49-F238E27FC236}">
-                <a16:creationId xmlns:a16="http://schemas.microsoft.com/office/drawing/2014/main" id="{1CFDA495-0063-4571-8969-0DD770DB39E0}"/>
+                <a16:creationId xmlns:a16="http://schemas.microsoft.com/office/drawing/2014/main" id="{2FA49567-BB70-4798-8746-D0B522CCEE20}"/>
               </a:ext>
             </a:extLst>
           </p:cNvPr>
@@ -4452,10 +4435,39 @@
           </a:p>
         </p:txBody>
       </p:sp>
+      <p:pic>
+        <p:nvPicPr>
+          <p:cNvPr id="3" name="Picture 2">
+            <a:extLst>
+              <a:ext uri="{FF2B5EF4-FFF2-40B4-BE49-F238E27FC236}">
+                <a16:creationId xmlns:a16="http://schemas.microsoft.com/office/drawing/2014/main" id="{EBB4BA44-0590-403D-983E-E588E89747FB}"/>
+              </a:ext>
+            </a:extLst>
+          </p:cNvPr>
+          <p:cNvPicPr>
+            <a:picLocks noChangeAspect="1"/>
+          </p:cNvPicPr>
+          <p:nvPr/>
+        </p:nvPicPr>
+        <p:blipFill>
+          <a:blip r:embed="rId2"/>
+          <a:srcRect/>
+          <a:stretch/>
+        </p:blipFill>
+        <p:spPr>
+          <a:xfrm>
+            <a:off x="2333427" y="1605064"/>
+            <a:ext cx="6761122" cy="4507415"/>
+          </a:xfrm>
+          <a:prstGeom prst="rect">
+            <a:avLst/>
+          </a:prstGeom>
+        </p:spPr>
+      </p:pic>
     </p:spTree>
     <p:extLst>
       <p:ext uri="{BB962C8B-B14F-4D97-AF65-F5344CB8AC3E}">
-        <p14:creationId xmlns:p14="http://schemas.microsoft.com/office/powerpoint/2010/main" val="3850339889"/>
+        <p14:creationId xmlns:p14="http://schemas.microsoft.com/office/powerpoint/2010/main" val="346064355"/>
       </p:ext>
     </p:extLst>
   </p:cSld>
@@ -4505,33 +4517,8 @@
           <a:p>
             <a:r>
               <a:rPr lang="en-US" dirty="0"/>
-              <a:t>STATIONARITY</a:t>
-            </a:r>
-          </a:p>
-        </p:txBody>
-      </p:sp>
-      <p:sp>
-        <p:nvSpPr>
-          <p:cNvPr id="8" name="Content Placeholder 7">
-            <a:extLst>
-              <a:ext uri="{FF2B5EF4-FFF2-40B4-BE49-F238E27FC236}">
-                <a16:creationId xmlns:a16="http://schemas.microsoft.com/office/drawing/2014/main" id="{2BED3EB3-7E98-4A82-8335-7321D9E37B16}"/>
-              </a:ext>
-            </a:extLst>
-          </p:cNvPr>
-          <p:cNvSpPr>
-            <a:spLocks noGrp="1"/>
-          </p:cNvSpPr>
-          <p:nvPr>
-            <p:ph idx="1"/>
-          </p:nvPr>
-        </p:nvSpPr>
-        <p:spPr/>
-        <p:txBody>
-          <a:bodyPr/>
-          <a:lstStyle/>
-          <a:p>
-            <a:endParaRPr lang="en-US" dirty="0"/>
+              <a:t>BY MONTH</a:t>
+            </a:r>
           </a:p>
         </p:txBody>
       </p:sp>
@@ -4650,10 +4637,39 @@
           </a:p>
         </p:txBody>
       </p:sp>
+      <p:pic>
+        <p:nvPicPr>
+          <p:cNvPr id="3" name="Picture 2">
+            <a:extLst>
+              <a:ext uri="{FF2B5EF4-FFF2-40B4-BE49-F238E27FC236}">
+                <a16:creationId xmlns:a16="http://schemas.microsoft.com/office/drawing/2014/main" id="{EBB4BA44-0590-403D-983E-E588E89747FB}"/>
+              </a:ext>
+            </a:extLst>
+          </p:cNvPr>
+          <p:cNvPicPr>
+            <a:picLocks noChangeAspect="1"/>
+          </p:cNvPicPr>
+          <p:nvPr/>
+        </p:nvPicPr>
+        <p:blipFill>
+          <a:blip r:embed="rId2"/>
+          <a:srcRect/>
+          <a:stretch/>
+        </p:blipFill>
+        <p:spPr>
+          <a:xfrm>
+            <a:off x="2333427" y="1605064"/>
+            <a:ext cx="6761122" cy="4507414"/>
+          </a:xfrm>
+          <a:prstGeom prst="rect">
+            <a:avLst/>
+          </a:prstGeom>
+        </p:spPr>
+      </p:pic>
     </p:spTree>
     <p:extLst>
       <p:ext uri="{BB962C8B-B14F-4D97-AF65-F5344CB8AC3E}">
-        <p14:creationId xmlns:p14="http://schemas.microsoft.com/office/powerpoint/2010/main" val="3590493067"/>
+        <p14:creationId xmlns:p14="http://schemas.microsoft.com/office/powerpoint/2010/main" val="1634378516"/>
       </p:ext>
     </p:extLst>
   </p:cSld>
@@ -4703,7 +4719,7 @@
           <a:p>
             <a:r>
               <a:rPr lang="en-US" dirty="0"/>
-              <a:t>DETRENDING</a:t>
+              <a:t>HOLIDAYS</a:t>
             </a:r>
           </a:p>
         </p:txBody>
@@ -4851,7 +4867,7 @@
     </p:spTree>
     <p:extLst>
       <p:ext uri="{BB962C8B-B14F-4D97-AF65-F5344CB8AC3E}">
-        <p14:creationId xmlns:p14="http://schemas.microsoft.com/office/powerpoint/2010/main" val="4109370477"/>
+        <p14:creationId xmlns:p14="http://schemas.microsoft.com/office/powerpoint/2010/main" val="391148097"/>
       </p:ext>
     </p:extLst>
   </p:cSld>
@@ -4880,10 +4896,10 @@
       </p:grpSpPr>
       <p:sp>
         <p:nvSpPr>
-          <p:cNvPr id="2" name="Title 1">
-            <a:extLst>
-              <a:ext uri="{FF2B5EF4-FFF2-40B4-BE49-F238E27FC236}">
-                <a16:creationId xmlns:a16="http://schemas.microsoft.com/office/drawing/2014/main" id="{A694862C-8B28-4EF5-9C6F-0187B05C2B03}"/>
+          <p:cNvPr id="7" name="Title 6">
+            <a:extLst>
+              <a:ext uri="{FF2B5EF4-FFF2-40B4-BE49-F238E27FC236}">
+                <a16:creationId xmlns:a16="http://schemas.microsoft.com/office/drawing/2014/main" id="{495B4BC0-844B-4414-A623-BEF78AAC1BA1}"/>
               </a:ext>
             </a:extLst>
           </p:cNvPr>
@@ -4901,17 +4917,17 @@
           <a:p>
             <a:r>
               <a:rPr lang="en-US" dirty="0"/>
-              <a:t>LAGGING</a:t>
-            </a:r>
-          </a:p>
-        </p:txBody>
-      </p:sp>
-      <p:sp>
-        <p:nvSpPr>
-          <p:cNvPr id="3" name="Content Placeholder 2">
-            <a:extLst>
-              <a:ext uri="{FF2B5EF4-FFF2-40B4-BE49-F238E27FC236}">
-                <a16:creationId xmlns:a16="http://schemas.microsoft.com/office/drawing/2014/main" id="{5DFC40A6-4344-46B7-89C4-4E16031C9B39}"/>
+              <a:t>WHITE NOISE</a:t>
+            </a:r>
+          </a:p>
+        </p:txBody>
+      </p:sp>
+      <p:sp>
+        <p:nvSpPr>
+          <p:cNvPr id="8" name="Content Placeholder 7">
+            <a:extLst>
+              <a:ext uri="{FF2B5EF4-FFF2-40B4-BE49-F238E27FC236}">
+                <a16:creationId xmlns:a16="http://schemas.microsoft.com/office/drawing/2014/main" id="{2BED3EB3-7E98-4A82-8335-7321D9E37B16}"/>
               </a:ext>
             </a:extLst>
           </p:cNvPr>
@@ -4927,7 +4943,7 @@
           <a:bodyPr/>
           <a:lstStyle/>
           <a:p>
-            <a:endParaRPr lang="en-US"/>
+            <a:endParaRPr lang="en-US" dirty="0"/>
           </a:p>
         </p:txBody>
       </p:sp>
@@ -4936,7 +4952,7 @@
           <p:cNvPr id="4" name="Date Placeholder 3">
             <a:extLst>
               <a:ext uri="{FF2B5EF4-FFF2-40B4-BE49-F238E27FC236}">
-                <a16:creationId xmlns:a16="http://schemas.microsoft.com/office/drawing/2014/main" id="{ADEE79BB-4734-4439-A76F-2976CABC29C1}"/>
+                <a16:creationId xmlns:a16="http://schemas.microsoft.com/office/drawing/2014/main" id="{540F37F1-4F33-429F-A568-1A3ADC499E54}"/>
               </a:ext>
             </a:extLst>
           </p:cNvPr>
@@ -4952,7 +4968,7 @@
           <a:bodyPr/>
           <a:lstStyle/>
           <a:p>
-            <a:fld id="{8AAE40A0-A7D8-4DC3-BC9E-BADA32DA2004}" type="datetime4">
+            <a:fld id="{B08FEED8-D7D4-44E9-BFBC-ED06B5996D94}" type="datetime4">
               <a:rPr lang="en-US" smtClean="0"/>
               <a:t>July 29, 2019</a:t>
             </a:fld>
@@ -4965,7 +4981,7 @@
           <p:cNvPr id="5" name="Footer Placeholder 4">
             <a:extLst>
               <a:ext uri="{FF2B5EF4-FFF2-40B4-BE49-F238E27FC236}">
-                <a16:creationId xmlns:a16="http://schemas.microsoft.com/office/drawing/2014/main" id="{14093F74-35B5-4B3E-BE77-B47F35290D05}"/>
+                <a16:creationId xmlns:a16="http://schemas.microsoft.com/office/drawing/2014/main" id="{673FFA57-C126-4795-A5F6-DD33AAC5ACBD}"/>
               </a:ext>
             </a:extLst>
           </p:cNvPr>
@@ -5022,7 +5038,7 @@
           <p:cNvPr id="6" name="Slide Number Placeholder 5">
             <a:extLst>
               <a:ext uri="{FF2B5EF4-FFF2-40B4-BE49-F238E27FC236}">
-                <a16:creationId xmlns:a16="http://schemas.microsoft.com/office/drawing/2014/main" id="{76F6E8AA-9A3E-467A-A16A-CED9E58CFA80}"/>
+                <a16:creationId xmlns:a16="http://schemas.microsoft.com/office/drawing/2014/main" id="{2FA49567-BB70-4798-8746-D0B522CCEE20}"/>
               </a:ext>
             </a:extLst>
           </p:cNvPr>
@@ -5049,7 +5065,7 @@
     </p:spTree>
     <p:extLst>
       <p:ext uri="{BB962C8B-B14F-4D97-AF65-F5344CB8AC3E}">
-        <p14:creationId xmlns:p14="http://schemas.microsoft.com/office/powerpoint/2010/main" val="3805551099"/>
+        <p14:creationId xmlns:p14="http://schemas.microsoft.com/office/powerpoint/2010/main" val="4091772932"/>
       </p:ext>
     </p:extLst>
   </p:cSld>
@@ -5078,10 +5094,10 @@
       </p:grpSpPr>
       <p:sp>
         <p:nvSpPr>
-          <p:cNvPr id="2" name="Title 1">
-            <a:extLst>
-              <a:ext uri="{FF2B5EF4-FFF2-40B4-BE49-F238E27FC236}">
-                <a16:creationId xmlns:a16="http://schemas.microsoft.com/office/drawing/2014/main" id="{84FE5820-4288-4CB6-888A-5CBF5468888C}"/>
+          <p:cNvPr id="7" name="Title 6">
+            <a:extLst>
+              <a:ext uri="{FF2B5EF4-FFF2-40B4-BE49-F238E27FC236}">
+                <a16:creationId xmlns:a16="http://schemas.microsoft.com/office/drawing/2014/main" id="{184E2338-1026-45D4-9455-B21A88F18B28}"/>
               </a:ext>
             </a:extLst>
           </p:cNvPr>
@@ -5099,33 +5115,43 @@
           <a:p>
             <a:r>
               <a:rPr lang="en-US" dirty="0"/>
-              <a:t>LAGGED SCATTERPLOTS</a:t>
-            </a:r>
-          </a:p>
-        </p:txBody>
-      </p:sp>
-      <p:sp>
-        <p:nvSpPr>
-          <p:cNvPr id="3" name="Content Placeholder 2">
-            <a:extLst>
-              <a:ext uri="{FF2B5EF4-FFF2-40B4-BE49-F238E27FC236}">
-                <a16:creationId xmlns:a16="http://schemas.microsoft.com/office/drawing/2014/main" id="{2952943F-FC31-4BE3-AB00-BAB4B12957BE}"/>
-              </a:ext>
-            </a:extLst>
-          </p:cNvPr>
-          <p:cNvSpPr>
-            <a:spLocks noGrp="1"/>
-          </p:cNvSpPr>
-          <p:nvPr>
-            <p:ph idx="1"/>
-          </p:nvPr>
-        </p:nvSpPr>
-        <p:spPr/>
-        <p:txBody>
-          <a:bodyPr/>
-          <a:lstStyle/>
-          <a:p>
-            <a:endParaRPr lang="en-US" dirty="0"/>
+              <a:t>HOW TO MAKE YOUR</a:t>
+            </a:r>
+            <a:br>
+              <a:rPr lang="en-US" dirty="0"/>
+            </a:br>
+            <a:r>
+              <a:rPr lang="en-US" dirty="0"/>
+              <a:t>DATA STATIONARY</a:t>
+            </a:r>
+          </a:p>
+        </p:txBody>
+      </p:sp>
+      <p:sp>
+        <p:nvSpPr>
+          <p:cNvPr id="8" name="Text Placeholder 7">
+            <a:extLst>
+              <a:ext uri="{FF2B5EF4-FFF2-40B4-BE49-F238E27FC236}">
+                <a16:creationId xmlns:a16="http://schemas.microsoft.com/office/drawing/2014/main" id="{DB42CCAB-C8E2-48A8-A9DF-EB0383A8B33C}"/>
+              </a:ext>
+            </a:extLst>
+          </p:cNvPr>
+          <p:cNvSpPr>
+            <a:spLocks noGrp="1"/>
+          </p:cNvSpPr>
+          <p:nvPr>
+            <p:ph type="body" idx="1"/>
+          </p:nvPr>
+        </p:nvSpPr>
+        <p:spPr/>
+        <p:txBody>
+          <a:bodyPr/>
+          <a:lstStyle/>
+          <a:p>
+            <a:r>
+              <a:rPr lang="en-US" dirty="0"/>
+              <a:t>Make your data appetizing for modeling</a:t>
+            </a:r>
           </a:p>
         </p:txBody>
       </p:sp>
@@ -5134,7 +5160,7 @@
           <p:cNvPr id="4" name="Date Placeholder 3">
             <a:extLst>
               <a:ext uri="{FF2B5EF4-FFF2-40B4-BE49-F238E27FC236}">
-                <a16:creationId xmlns:a16="http://schemas.microsoft.com/office/drawing/2014/main" id="{F716348B-D7FE-46ED-8C48-CF5A55FF31CF}"/>
+                <a16:creationId xmlns:a16="http://schemas.microsoft.com/office/drawing/2014/main" id="{1CA94ACB-62A5-4F09-8C21-F0CE9BFB1606}"/>
               </a:ext>
             </a:extLst>
           </p:cNvPr>
@@ -5163,7 +5189,7 @@
           <p:cNvPr id="5" name="Footer Placeholder 4">
             <a:extLst>
               <a:ext uri="{FF2B5EF4-FFF2-40B4-BE49-F238E27FC236}">
-                <a16:creationId xmlns:a16="http://schemas.microsoft.com/office/drawing/2014/main" id="{34059279-A1E7-4F19-B4BF-8C6B59A4CEFF}"/>
+                <a16:creationId xmlns:a16="http://schemas.microsoft.com/office/drawing/2014/main" id="{D20B02B0-893D-4696-B6F7-A126B8D18E99}"/>
               </a:ext>
             </a:extLst>
           </p:cNvPr>
@@ -5220,7 +5246,7 @@
           <p:cNvPr id="6" name="Slide Number Placeholder 5">
             <a:extLst>
               <a:ext uri="{FF2B5EF4-FFF2-40B4-BE49-F238E27FC236}">
-                <a16:creationId xmlns:a16="http://schemas.microsoft.com/office/drawing/2014/main" id="{DE722C41-7366-4DE2-9AF4-E75E189A7733}"/>
+                <a16:creationId xmlns:a16="http://schemas.microsoft.com/office/drawing/2014/main" id="{1CFDA495-0063-4571-8969-0DD770DB39E0}"/>
               </a:ext>
             </a:extLst>
           </p:cNvPr>
@@ -5247,7 +5273,7 @@
     </p:spTree>
     <p:extLst>
       <p:ext uri="{BB962C8B-B14F-4D97-AF65-F5344CB8AC3E}">
-        <p14:creationId xmlns:p14="http://schemas.microsoft.com/office/powerpoint/2010/main" val="2399367561"/>
+        <p14:creationId xmlns:p14="http://schemas.microsoft.com/office/powerpoint/2010/main" val="3850339889"/>
       </p:ext>
     </p:extLst>
   </p:cSld>
@@ -5279,7 +5305,7 @@
           <p:cNvPr id="7" name="Title 6">
             <a:extLst>
               <a:ext uri="{FF2B5EF4-FFF2-40B4-BE49-F238E27FC236}">
-                <a16:creationId xmlns:a16="http://schemas.microsoft.com/office/drawing/2014/main" id="{7802FB34-7510-47BC-8952-A1FE9728B0BF}"/>
+                <a16:creationId xmlns:a16="http://schemas.microsoft.com/office/drawing/2014/main" id="{495B4BC0-844B-4414-A623-BEF78AAC1BA1}"/>
               </a:ext>
             </a:extLst>
           </p:cNvPr>
@@ -5297,36 +5323,33 @@
           <a:p>
             <a:r>
               <a:rPr lang="en-US" dirty="0"/>
-              <a:t>ARIMA MODELS</a:t>
-            </a:r>
-          </a:p>
-        </p:txBody>
-      </p:sp>
-      <p:sp>
-        <p:nvSpPr>
-          <p:cNvPr id="8" name="Text Placeholder 7">
-            <a:extLst>
-              <a:ext uri="{FF2B5EF4-FFF2-40B4-BE49-F238E27FC236}">
-                <a16:creationId xmlns:a16="http://schemas.microsoft.com/office/drawing/2014/main" id="{FCA70F1A-579E-4144-AE97-14FFC08FF0F5}"/>
-              </a:ext>
-            </a:extLst>
-          </p:cNvPr>
-          <p:cNvSpPr>
-            <a:spLocks noGrp="1"/>
-          </p:cNvSpPr>
-          <p:nvPr>
-            <p:ph type="body" idx="1"/>
-          </p:nvPr>
-        </p:nvSpPr>
-        <p:spPr/>
-        <p:txBody>
-          <a:bodyPr/>
-          <a:lstStyle/>
-          <a:p>
-            <a:r>
-              <a:rPr lang="en-US" dirty="0"/>
-              <a:t>Interpretable, simple and speedy time series modeling</a:t>
-            </a:r>
+              <a:t>STATIONARITY</a:t>
+            </a:r>
+          </a:p>
+        </p:txBody>
+      </p:sp>
+      <p:sp>
+        <p:nvSpPr>
+          <p:cNvPr id="8" name="Content Placeholder 7">
+            <a:extLst>
+              <a:ext uri="{FF2B5EF4-FFF2-40B4-BE49-F238E27FC236}">
+                <a16:creationId xmlns:a16="http://schemas.microsoft.com/office/drawing/2014/main" id="{2BED3EB3-7E98-4A82-8335-7321D9E37B16}"/>
+              </a:ext>
+            </a:extLst>
+          </p:cNvPr>
+          <p:cNvSpPr>
+            <a:spLocks noGrp="1"/>
+          </p:cNvSpPr>
+          <p:nvPr>
+            <p:ph idx="1"/>
+          </p:nvPr>
+        </p:nvSpPr>
+        <p:spPr/>
+        <p:txBody>
+          <a:bodyPr/>
+          <a:lstStyle/>
+          <a:p>
+            <a:endParaRPr lang="en-US" dirty="0"/>
           </a:p>
         </p:txBody>
       </p:sp>
@@ -5335,7 +5358,7 @@
           <p:cNvPr id="4" name="Date Placeholder 3">
             <a:extLst>
               <a:ext uri="{FF2B5EF4-FFF2-40B4-BE49-F238E27FC236}">
-                <a16:creationId xmlns:a16="http://schemas.microsoft.com/office/drawing/2014/main" id="{3AD929EF-0967-4B34-81B8-24D9EF91892E}"/>
+                <a16:creationId xmlns:a16="http://schemas.microsoft.com/office/drawing/2014/main" id="{540F37F1-4F33-429F-A568-1A3ADC499E54}"/>
               </a:ext>
             </a:extLst>
           </p:cNvPr>
@@ -5351,7 +5374,7 @@
           <a:bodyPr/>
           <a:lstStyle/>
           <a:p>
-            <a:fld id="{8AAE40A0-A7D8-4DC3-BC9E-BADA32DA2004}" type="datetime4">
+            <a:fld id="{B08FEED8-D7D4-44E9-BFBC-ED06B5996D94}" type="datetime4">
               <a:rPr lang="en-US" smtClean="0"/>
               <a:t>July 29, 2019</a:t>
             </a:fld>
@@ -5364,7 +5387,7 @@
           <p:cNvPr id="5" name="Footer Placeholder 4">
             <a:extLst>
               <a:ext uri="{FF2B5EF4-FFF2-40B4-BE49-F238E27FC236}">
-                <a16:creationId xmlns:a16="http://schemas.microsoft.com/office/drawing/2014/main" id="{3B5B35DD-F2EA-40D3-8039-8CD3802B2612}"/>
+                <a16:creationId xmlns:a16="http://schemas.microsoft.com/office/drawing/2014/main" id="{673FFA57-C126-4795-A5F6-DD33AAC5ACBD}"/>
               </a:ext>
             </a:extLst>
           </p:cNvPr>
@@ -5421,7 +5444,7 @@
           <p:cNvPr id="6" name="Slide Number Placeholder 5">
             <a:extLst>
               <a:ext uri="{FF2B5EF4-FFF2-40B4-BE49-F238E27FC236}">
-                <a16:creationId xmlns:a16="http://schemas.microsoft.com/office/drawing/2014/main" id="{C3EB9A57-323C-47F5-867F-693F95A15FA4}"/>
+                <a16:creationId xmlns:a16="http://schemas.microsoft.com/office/drawing/2014/main" id="{2FA49567-BB70-4798-8746-D0B522CCEE20}"/>
               </a:ext>
             </a:extLst>
           </p:cNvPr>
@@ -5448,7 +5471,7 @@
     </p:spTree>
     <p:extLst>
       <p:ext uri="{BB962C8B-B14F-4D97-AF65-F5344CB8AC3E}">
-        <p14:creationId xmlns:p14="http://schemas.microsoft.com/office/powerpoint/2010/main" val="107865345"/>
+        <p14:creationId xmlns:p14="http://schemas.microsoft.com/office/powerpoint/2010/main" val="3590493067"/>
       </p:ext>
     </p:extLst>
   </p:cSld>
@@ -5480,7 +5503,7 @@
           <p:cNvPr id="7" name="Title 6">
             <a:extLst>
               <a:ext uri="{FF2B5EF4-FFF2-40B4-BE49-F238E27FC236}">
-                <a16:creationId xmlns:a16="http://schemas.microsoft.com/office/drawing/2014/main" id="{75C0DCD3-95F8-4E1F-BF1A-5FAAB84A40A3}"/>
+                <a16:creationId xmlns:a16="http://schemas.microsoft.com/office/drawing/2014/main" id="{495B4BC0-844B-4414-A623-BEF78AAC1BA1}"/>
               </a:ext>
             </a:extLst>
           </p:cNvPr>
@@ -5498,7 +5521,7 @@
           <a:p>
             <a:r>
               <a:rPr lang="en-US" dirty="0"/>
-              <a:t>ARIMA</a:t>
+              <a:t>DETRENDING</a:t>
             </a:r>
           </a:p>
         </p:txBody>
@@ -5508,7 +5531,7 @@
           <p:cNvPr id="8" name="Content Placeholder 7">
             <a:extLst>
               <a:ext uri="{FF2B5EF4-FFF2-40B4-BE49-F238E27FC236}">
-                <a16:creationId xmlns:a16="http://schemas.microsoft.com/office/drawing/2014/main" id="{52BB1FAB-BB61-4B66-A4EA-A0EABC2B3ECA}"/>
+                <a16:creationId xmlns:a16="http://schemas.microsoft.com/office/drawing/2014/main" id="{2BED3EB3-7E98-4A82-8335-7321D9E37B16}"/>
               </a:ext>
             </a:extLst>
           </p:cNvPr>
@@ -5524,7 +5547,7 @@
           <a:bodyPr/>
           <a:lstStyle/>
           <a:p>
-            <a:endParaRPr lang="en-US"/>
+            <a:endParaRPr lang="en-US" dirty="0"/>
           </a:p>
         </p:txBody>
       </p:sp>
@@ -5533,7 +5556,7 @@
           <p:cNvPr id="4" name="Date Placeholder 3">
             <a:extLst>
               <a:ext uri="{FF2B5EF4-FFF2-40B4-BE49-F238E27FC236}">
-                <a16:creationId xmlns:a16="http://schemas.microsoft.com/office/drawing/2014/main" id="{02256D86-7CE0-416E-B2A3-402D20EE9E90}"/>
+                <a16:creationId xmlns:a16="http://schemas.microsoft.com/office/drawing/2014/main" id="{540F37F1-4F33-429F-A568-1A3ADC499E54}"/>
               </a:ext>
             </a:extLst>
           </p:cNvPr>
@@ -5562,7 +5585,7 @@
           <p:cNvPr id="5" name="Footer Placeholder 4">
             <a:extLst>
               <a:ext uri="{FF2B5EF4-FFF2-40B4-BE49-F238E27FC236}">
-                <a16:creationId xmlns:a16="http://schemas.microsoft.com/office/drawing/2014/main" id="{1D4ED112-7CF4-4BB9-B46E-B366A5054A9A}"/>
+                <a16:creationId xmlns:a16="http://schemas.microsoft.com/office/drawing/2014/main" id="{673FFA57-C126-4795-A5F6-DD33AAC5ACBD}"/>
               </a:ext>
             </a:extLst>
           </p:cNvPr>
@@ -5619,7 +5642,7 @@
           <p:cNvPr id="6" name="Slide Number Placeholder 5">
             <a:extLst>
               <a:ext uri="{FF2B5EF4-FFF2-40B4-BE49-F238E27FC236}">
-                <a16:creationId xmlns:a16="http://schemas.microsoft.com/office/drawing/2014/main" id="{8CC75551-85BF-4C9F-8893-AA28ECA8A6B5}"/>
+                <a16:creationId xmlns:a16="http://schemas.microsoft.com/office/drawing/2014/main" id="{2FA49567-BB70-4798-8746-D0B522CCEE20}"/>
               </a:ext>
             </a:extLst>
           </p:cNvPr>
@@ -5646,7 +5669,7 @@
     </p:spTree>
     <p:extLst>
       <p:ext uri="{BB962C8B-B14F-4D97-AF65-F5344CB8AC3E}">
-        <p14:creationId xmlns:p14="http://schemas.microsoft.com/office/powerpoint/2010/main" val="1065550565"/>
+        <p14:creationId xmlns:p14="http://schemas.microsoft.com/office/powerpoint/2010/main" val="4109370477"/>
       </p:ext>
     </p:extLst>
   </p:cSld>
@@ -5675,10 +5698,10 @@
       </p:grpSpPr>
       <p:sp>
         <p:nvSpPr>
-          <p:cNvPr id="7" name="Title 6">
-            <a:extLst>
-              <a:ext uri="{FF2B5EF4-FFF2-40B4-BE49-F238E27FC236}">
-                <a16:creationId xmlns:a16="http://schemas.microsoft.com/office/drawing/2014/main" id="{75C0DCD3-95F8-4E1F-BF1A-5FAAB84A40A3}"/>
+          <p:cNvPr id="2" name="Title 1">
+            <a:extLst>
+              <a:ext uri="{FF2B5EF4-FFF2-40B4-BE49-F238E27FC236}">
+                <a16:creationId xmlns:a16="http://schemas.microsoft.com/office/drawing/2014/main" id="{A694862C-8B28-4EF5-9C6F-0187B05C2B03}"/>
               </a:ext>
             </a:extLst>
           </p:cNvPr>
@@ -5696,17 +5719,17 @@
           <a:p>
             <a:r>
               <a:rPr lang="en-US" dirty="0"/>
-              <a:t>AUTOREGRESSIVE</a:t>
-            </a:r>
-          </a:p>
-        </p:txBody>
-      </p:sp>
-      <p:sp>
-        <p:nvSpPr>
-          <p:cNvPr id="8" name="Content Placeholder 7">
-            <a:extLst>
-              <a:ext uri="{FF2B5EF4-FFF2-40B4-BE49-F238E27FC236}">
-                <a16:creationId xmlns:a16="http://schemas.microsoft.com/office/drawing/2014/main" id="{52BB1FAB-BB61-4B66-A4EA-A0EABC2B3ECA}"/>
+              <a:t>LAGGING</a:t>
+            </a:r>
+          </a:p>
+        </p:txBody>
+      </p:sp>
+      <p:sp>
+        <p:nvSpPr>
+          <p:cNvPr id="3" name="Content Placeholder 2">
+            <a:extLst>
+              <a:ext uri="{FF2B5EF4-FFF2-40B4-BE49-F238E27FC236}">
+                <a16:creationId xmlns:a16="http://schemas.microsoft.com/office/drawing/2014/main" id="{5DFC40A6-4344-46B7-89C4-4E16031C9B39}"/>
               </a:ext>
             </a:extLst>
           </p:cNvPr>
@@ -5731,7 +5754,7 @@
           <p:cNvPr id="4" name="Date Placeholder 3">
             <a:extLst>
               <a:ext uri="{FF2B5EF4-FFF2-40B4-BE49-F238E27FC236}">
-                <a16:creationId xmlns:a16="http://schemas.microsoft.com/office/drawing/2014/main" id="{02256D86-7CE0-416E-B2A3-402D20EE9E90}"/>
+                <a16:creationId xmlns:a16="http://schemas.microsoft.com/office/drawing/2014/main" id="{ADEE79BB-4734-4439-A76F-2976CABC29C1}"/>
               </a:ext>
             </a:extLst>
           </p:cNvPr>
@@ -5747,7 +5770,7 @@
           <a:bodyPr/>
           <a:lstStyle/>
           <a:p>
-            <a:fld id="{B08FEED8-D7D4-44E9-BFBC-ED06B5996D94}" type="datetime4">
+            <a:fld id="{8AAE40A0-A7D8-4DC3-BC9E-BADA32DA2004}" type="datetime4">
               <a:rPr lang="en-US" smtClean="0"/>
               <a:t>July 29, 2019</a:t>
             </a:fld>
@@ -5760,7 +5783,7 @@
           <p:cNvPr id="5" name="Footer Placeholder 4">
             <a:extLst>
               <a:ext uri="{FF2B5EF4-FFF2-40B4-BE49-F238E27FC236}">
-                <a16:creationId xmlns:a16="http://schemas.microsoft.com/office/drawing/2014/main" id="{1D4ED112-7CF4-4BB9-B46E-B366A5054A9A}"/>
+                <a16:creationId xmlns:a16="http://schemas.microsoft.com/office/drawing/2014/main" id="{14093F74-35B5-4B3E-BE77-B47F35290D05}"/>
               </a:ext>
             </a:extLst>
           </p:cNvPr>
@@ -5817,7 +5840,7 @@
           <p:cNvPr id="6" name="Slide Number Placeholder 5">
             <a:extLst>
               <a:ext uri="{FF2B5EF4-FFF2-40B4-BE49-F238E27FC236}">
-                <a16:creationId xmlns:a16="http://schemas.microsoft.com/office/drawing/2014/main" id="{8CC75551-85BF-4C9F-8893-AA28ECA8A6B5}"/>
+                <a16:creationId xmlns:a16="http://schemas.microsoft.com/office/drawing/2014/main" id="{76F6E8AA-9A3E-467A-A16A-CED9E58CFA80}"/>
               </a:ext>
             </a:extLst>
           </p:cNvPr>
@@ -5844,7 +5867,7 @@
     </p:spTree>
     <p:extLst>
       <p:ext uri="{BB962C8B-B14F-4D97-AF65-F5344CB8AC3E}">
-        <p14:creationId xmlns:p14="http://schemas.microsoft.com/office/powerpoint/2010/main" val="4066560549"/>
+        <p14:creationId xmlns:p14="http://schemas.microsoft.com/office/powerpoint/2010/main" val="3805551099"/>
       </p:ext>
     </p:extLst>
   </p:cSld>
@@ -6039,7 +6062,7 @@
           <p:cNvPr id="2" name="Title 1">
             <a:extLst>
               <a:ext uri="{FF2B5EF4-FFF2-40B4-BE49-F238E27FC236}">
-                <a16:creationId xmlns:a16="http://schemas.microsoft.com/office/drawing/2014/main" id="{D7EACF90-3E7B-4978-AB0C-ED5165419D19}"/>
+                <a16:creationId xmlns:a16="http://schemas.microsoft.com/office/drawing/2014/main" id="{84FE5820-4288-4CB6-888A-5CBF5468888C}"/>
               </a:ext>
             </a:extLst>
           </p:cNvPr>
@@ -6057,7 +6080,7 @@
           <a:p>
             <a:r>
               <a:rPr lang="en-US" dirty="0"/>
-              <a:t>MOVING AVERAGE</a:t>
+              <a:t>LAGGED SCATTERPLOTS</a:t>
             </a:r>
           </a:p>
         </p:txBody>
@@ -6067,7 +6090,7 @@
           <p:cNvPr id="3" name="Content Placeholder 2">
             <a:extLst>
               <a:ext uri="{FF2B5EF4-FFF2-40B4-BE49-F238E27FC236}">
-                <a16:creationId xmlns:a16="http://schemas.microsoft.com/office/drawing/2014/main" id="{A7CEFEF5-E74A-4EFE-9368-8FD74B059E10}"/>
+                <a16:creationId xmlns:a16="http://schemas.microsoft.com/office/drawing/2014/main" id="{2952943F-FC31-4BE3-AB00-BAB4B12957BE}"/>
               </a:ext>
             </a:extLst>
           </p:cNvPr>
@@ -6083,7 +6106,7 @@
           <a:bodyPr/>
           <a:lstStyle/>
           <a:p>
-            <a:endParaRPr lang="en-US"/>
+            <a:endParaRPr lang="en-US" dirty="0"/>
           </a:p>
         </p:txBody>
       </p:sp>
@@ -6092,7 +6115,7 @@
           <p:cNvPr id="4" name="Date Placeholder 3">
             <a:extLst>
               <a:ext uri="{FF2B5EF4-FFF2-40B4-BE49-F238E27FC236}">
-                <a16:creationId xmlns:a16="http://schemas.microsoft.com/office/drawing/2014/main" id="{64E0A09F-EC7A-4EF6-AB3A-0DC48B1B7271}"/>
+                <a16:creationId xmlns:a16="http://schemas.microsoft.com/office/drawing/2014/main" id="{F716348B-D7FE-46ED-8C48-CF5A55FF31CF}"/>
               </a:ext>
             </a:extLst>
           </p:cNvPr>
@@ -6121,7 +6144,7 @@
           <p:cNvPr id="5" name="Footer Placeholder 4">
             <a:extLst>
               <a:ext uri="{FF2B5EF4-FFF2-40B4-BE49-F238E27FC236}">
-                <a16:creationId xmlns:a16="http://schemas.microsoft.com/office/drawing/2014/main" id="{9D8B7F07-2C50-4473-BABC-57C52FDD38D2}"/>
+                <a16:creationId xmlns:a16="http://schemas.microsoft.com/office/drawing/2014/main" id="{34059279-A1E7-4F19-B4BF-8C6B59A4CEFF}"/>
               </a:ext>
             </a:extLst>
           </p:cNvPr>
@@ -6178,7 +6201,7 @@
           <p:cNvPr id="6" name="Slide Number Placeholder 5">
             <a:extLst>
               <a:ext uri="{FF2B5EF4-FFF2-40B4-BE49-F238E27FC236}">
-                <a16:creationId xmlns:a16="http://schemas.microsoft.com/office/drawing/2014/main" id="{6BE5E43E-0696-4C60-A72C-BBB5B4448760}"/>
+                <a16:creationId xmlns:a16="http://schemas.microsoft.com/office/drawing/2014/main" id="{DE722C41-7366-4DE2-9AF4-E75E189A7733}"/>
               </a:ext>
             </a:extLst>
           </p:cNvPr>
@@ -6205,7 +6228,7 @@
     </p:spTree>
     <p:extLst>
       <p:ext uri="{BB962C8B-B14F-4D97-AF65-F5344CB8AC3E}">
-        <p14:creationId xmlns:p14="http://schemas.microsoft.com/office/powerpoint/2010/main" val="3521777765"/>
+        <p14:creationId xmlns:p14="http://schemas.microsoft.com/office/powerpoint/2010/main" val="2399367561"/>
       </p:ext>
     </p:extLst>
   </p:cSld>
@@ -6234,10 +6257,10 @@
       </p:grpSpPr>
       <p:sp>
         <p:nvSpPr>
-          <p:cNvPr id="2" name="Title 1">
-            <a:extLst>
-              <a:ext uri="{FF2B5EF4-FFF2-40B4-BE49-F238E27FC236}">
-                <a16:creationId xmlns:a16="http://schemas.microsoft.com/office/drawing/2014/main" id="{D1BF0482-6913-4A5E-A533-479864CB5349}"/>
+          <p:cNvPr id="7" name="Title 6">
+            <a:extLst>
+              <a:ext uri="{FF2B5EF4-FFF2-40B4-BE49-F238E27FC236}">
+                <a16:creationId xmlns:a16="http://schemas.microsoft.com/office/drawing/2014/main" id="{7802FB34-7510-47BC-8952-A1FE9728B0BF}"/>
               </a:ext>
             </a:extLst>
           </p:cNvPr>
@@ -6255,33 +6278,36 @@
           <a:p>
             <a:r>
               <a:rPr lang="en-US" dirty="0"/>
-              <a:t>PLAYING AROUND WITH ARIMA</a:t>
-            </a:r>
-          </a:p>
-        </p:txBody>
-      </p:sp>
-      <p:sp>
-        <p:nvSpPr>
-          <p:cNvPr id="3" name="Content Placeholder 2">
-            <a:extLst>
-              <a:ext uri="{FF2B5EF4-FFF2-40B4-BE49-F238E27FC236}">
-                <a16:creationId xmlns:a16="http://schemas.microsoft.com/office/drawing/2014/main" id="{D48271C9-2790-46C9-B80B-52D215430CB8}"/>
-              </a:ext>
-            </a:extLst>
-          </p:cNvPr>
-          <p:cNvSpPr>
-            <a:spLocks noGrp="1"/>
-          </p:cNvSpPr>
-          <p:nvPr>
-            <p:ph idx="1"/>
-          </p:nvPr>
-        </p:nvSpPr>
-        <p:spPr/>
-        <p:txBody>
-          <a:bodyPr/>
-          <a:lstStyle/>
-          <a:p>
-            <a:endParaRPr lang="en-US"/>
+              <a:t>ARIMA MODELS</a:t>
+            </a:r>
+          </a:p>
+        </p:txBody>
+      </p:sp>
+      <p:sp>
+        <p:nvSpPr>
+          <p:cNvPr id="8" name="Text Placeholder 7">
+            <a:extLst>
+              <a:ext uri="{FF2B5EF4-FFF2-40B4-BE49-F238E27FC236}">
+                <a16:creationId xmlns:a16="http://schemas.microsoft.com/office/drawing/2014/main" id="{FCA70F1A-579E-4144-AE97-14FFC08FF0F5}"/>
+              </a:ext>
+            </a:extLst>
+          </p:cNvPr>
+          <p:cNvSpPr>
+            <a:spLocks noGrp="1"/>
+          </p:cNvSpPr>
+          <p:nvPr>
+            <p:ph type="body" idx="1"/>
+          </p:nvPr>
+        </p:nvSpPr>
+        <p:spPr/>
+        <p:txBody>
+          <a:bodyPr/>
+          <a:lstStyle/>
+          <a:p>
+            <a:r>
+              <a:rPr lang="en-US" dirty="0"/>
+              <a:t>Interpretable, simple and speedy time series modeling</a:t>
+            </a:r>
           </a:p>
         </p:txBody>
       </p:sp>
@@ -6290,7 +6316,7 @@
           <p:cNvPr id="4" name="Date Placeholder 3">
             <a:extLst>
               <a:ext uri="{FF2B5EF4-FFF2-40B4-BE49-F238E27FC236}">
-                <a16:creationId xmlns:a16="http://schemas.microsoft.com/office/drawing/2014/main" id="{B23DAF35-209C-48FA-AAAB-F69E14183A91}"/>
+                <a16:creationId xmlns:a16="http://schemas.microsoft.com/office/drawing/2014/main" id="{3AD929EF-0967-4B34-81B8-24D9EF91892E}"/>
               </a:ext>
             </a:extLst>
           </p:cNvPr>
@@ -6319,7 +6345,7 @@
           <p:cNvPr id="5" name="Footer Placeholder 4">
             <a:extLst>
               <a:ext uri="{FF2B5EF4-FFF2-40B4-BE49-F238E27FC236}">
-                <a16:creationId xmlns:a16="http://schemas.microsoft.com/office/drawing/2014/main" id="{3D8E22A6-180D-41CF-9959-4347A11F2AD1}"/>
+                <a16:creationId xmlns:a16="http://schemas.microsoft.com/office/drawing/2014/main" id="{3B5B35DD-F2EA-40D3-8039-8CD3802B2612}"/>
               </a:ext>
             </a:extLst>
           </p:cNvPr>
@@ -6376,7 +6402,7 @@
           <p:cNvPr id="6" name="Slide Number Placeholder 5">
             <a:extLst>
               <a:ext uri="{FF2B5EF4-FFF2-40B4-BE49-F238E27FC236}">
-                <a16:creationId xmlns:a16="http://schemas.microsoft.com/office/drawing/2014/main" id="{CECE3146-0C2B-4CC7-BC7C-FD23AAF7ECAE}"/>
+                <a16:creationId xmlns:a16="http://schemas.microsoft.com/office/drawing/2014/main" id="{C3EB9A57-323C-47F5-867F-693F95A15FA4}"/>
               </a:ext>
             </a:extLst>
           </p:cNvPr>
@@ -6403,7 +6429,7 @@
     </p:spTree>
     <p:extLst>
       <p:ext uri="{BB962C8B-B14F-4D97-AF65-F5344CB8AC3E}">
-        <p14:creationId xmlns:p14="http://schemas.microsoft.com/office/powerpoint/2010/main" val="3624540971"/>
+        <p14:creationId xmlns:p14="http://schemas.microsoft.com/office/powerpoint/2010/main" val="107865345"/>
       </p:ext>
     </p:extLst>
   </p:cSld>
@@ -6435,7 +6461,7 @@
           <p:cNvPr id="7" name="Title 6">
             <a:extLst>
               <a:ext uri="{FF2B5EF4-FFF2-40B4-BE49-F238E27FC236}">
-                <a16:creationId xmlns:a16="http://schemas.microsoft.com/office/drawing/2014/main" id="{495B4BC0-844B-4414-A623-BEF78AAC1BA1}"/>
+                <a16:creationId xmlns:a16="http://schemas.microsoft.com/office/drawing/2014/main" id="{75C0DCD3-95F8-4E1F-BF1A-5FAAB84A40A3}"/>
               </a:ext>
             </a:extLst>
           </p:cNvPr>
@@ -6453,7 +6479,7 @@
           <a:p>
             <a:r>
               <a:rPr lang="en-US" dirty="0"/>
-              <a:t>ACKNOWLEDGMENTS</a:t>
+              <a:t>ARIMA</a:t>
             </a:r>
           </a:p>
         </p:txBody>
@@ -6463,7 +6489,7 @@
           <p:cNvPr id="8" name="Content Placeholder 7">
             <a:extLst>
               <a:ext uri="{FF2B5EF4-FFF2-40B4-BE49-F238E27FC236}">
-                <a16:creationId xmlns:a16="http://schemas.microsoft.com/office/drawing/2014/main" id="{2BED3EB3-7E98-4A82-8335-7321D9E37B16}"/>
+                <a16:creationId xmlns:a16="http://schemas.microsoft.com/office/drawing/2014/main" id="{52BB1FAB-BB61-4B66-A4EA-A0EABC2B3ECA}"/>
               </a:ext>
             </a:extLst>
           </p:cNvPr>
@@ -6488,7 +6514,7 @@
           <p:cNvPr id="4" name="Date Placeholder 3">
             <a:extLst>
               <a:ext uri="{FF2B5EF4-FFF2-40B4-BE49-F238E27FC236}">
-                <a16:creationId xmlns:a16="http://schemas.microsoft.com/office/drawing/2014/main" id="{540F37F1-4F33-429F-A568-1A3ADC499E54}"/>
+                <a16:creationId xmlns:a16="http://schemas.microsoft.com/office/drawing/2014/main" id="{02256D86-7CE0-416E-B2A3-402D20EE9E90}"/>
               </a:ext>
             </a:extLst>
           </p:cNvPr>
@@ -6517,7 +6543,7 @@
           <p:cNvPr id="5" name="Footer Placeholder 4">
             <a:extLst>
               <a:ext uri="{FF2B5EF4-FFF2-40B4-BE49-F238E27FC236}">
-                <a16:creationId xmlns:a16="http://schemas.microsoft.com/office/drawing/2014/main" id="{673FFA57-C126-4795-A5F6-DD33AAC5ACBD}"/>
+                <a16:creationId xmlns:a16="http://schemas.microsoft.com/office/drawing/2014/main" id="{1D4ED112-7CF4-4BB9-B46E-B366A5054A9A}"/>
               </a:ext>
             </a:extLst>
           </p:cNvPr>
@@ -6574,7 +6600,7 @@
           <p:cNvPr id="6" name="Slide Number Placeholder 5">
             <a:extLst>
               <a:ext uri="{FF2B5EF4-FFF2-40B4-BE49-F238E27FC236}">
-                <a16:creationId xmlns:a16="http://schemas.microsoft.com/office/drawing/2014/main" id="{2FA49567-BB70-4798-8746-D0B522CCEE20}"/>
+                <a16:creationId xmlns:a16="http://schemas.microsoft.com/office/drawing/2014/main" id="{8CC75551-85BF-4C9F-8893-AA28ECA8A6B5}"/>
               </a:ext>
             </a:extLst>
           </p:cNvPr>
@@ -6593,6 +6619,798 @@
             <a:fld id="{D57F1E4F-1CFF-5643-939E-02111984F565}" type="slidenum">
               <a:rPr lang="en-US" smtClean="0"/>
               <a:t>22</a:t>
+            </a:fld>
+            <a:endParaRPr lang="en-US" dirty="0"/>
+          </a:p>
+        </p:txBody>
+      </p:sp>
+    </p:spTree>
+    <p:extLst>
+      <p:ext uri="{BB962C8B-B14F-4D97-AF65-F5344CB8AC3E}">
+        <p14:creationId xmlns:p14="http://schemas.microsoft.com/office/powerpoint/2010/main" val="1065550565"/>
+      </p:ext>
+    </p:extLst>
+  </p:cSld>
+  <p:clrMapOvr>
+    <a:masterClrMapping/>
+  </p:clrMapOvr>
+</p:sld>
+</file>
+
+<file path=ppt/slides/slide23.xml><?xml version="1.0" encoding="utf-8"?>
+<p:sld xmlns:a="http://schemas.openxmlformats.org/drawingml/2006/main" xmlns:r="http://schemas.openxmlformats.org/officeDocument/2006/relationships" xmlns:p="http://schemas.openxmlformats.org/presentationml/2006/main">
+  <p:cSld>
+    <p:spTree>
+      <p:nvGrpSpPr>
+        <p:cNvPr id="1" name=""/>
+        <p:cNvGrpSpPr/>
+        <p:nvPr/>
+      </p:nvGrpSpPr>
+      <p:grpSpPr>
+        <a:xfrm>
+          <a:off x="0" y="0"/>
+          <a:ext cx="0" cy="0"/>
+          <a:chOff x="0" y="0"/>
+          <a:chExt cx="0" cy="0"/>
+        </a:xfrm>
+      </p:grpSpPr>
+      <p:sp>
+        <p:nvSpPr>
+          <p:cNvPr id="7" name="Title 6">
+            <a:extLst>
+              <a:ext uri="{FF2B5EF4-FFF2-40B4-BE49-F238E27FC236}">
+                <a16:creationId xmlns:a16="http://schemas.microsoft.com/office/drawing/2014/main" id="{75C0DCD3-95F8-4E1F-BF1A-5FAAB84A40A3}"/>
+              </a:ext>
+            </a:extLst>
+          </p:cNvPr>
+          <p:cNvSpPr>
+            <a:spLocks noGrp="1"/>
+          </p:cNvSpPr>
+          <p:nvPr>
+            <p:ph type="title"/>
+          </p:nvPr>
+        </p:nvSpPr>
+        <p:spPr/>
+        <p:txBody>
+          <a:bodyPr/>
+          <a:lstStyle/>
+          <a:p>
+            <a:r>
+              <a:rPr lang="en-US" dirty="0"/>
+              <a:t>AUTOREGRESSIVE</a:t>
+            </a:r>
+          </a:p>
+        </p:txBody>
+      </p:sp>
+      <p:sp>
+        <p:nvSpPr>
+          <p:cNvPr id="8" name="Content Placeholder 7">
+            <a:extLst>
+              <a:ext uri="{FF2B5EF4-FFF2-40B4-BE49-F238E27FC236}">
+                <a16:creationId xmlns:a16="http://schemas.microsoft.com/office/drawing/2014/main" id="{52BB1FAB-BB61-4B66-A4EA-A0EABC2B3ECA}"/>
+              </a:ext>
+            </a:extLst>
+          </p:cNvPr>
+          <p:cNvSpPr>
+            <a:spLocks noGrp="1"/>
+          </p:cNvSpPr>
+          <p:nvPr>
+            <p:ph idx="1"/>
+          </p:nvPr>
+        </p:nvSpPr>
+        <p:spPr/>
+        <p:txBody>
+          <a:bodyPr/>
+          <a:lstStyle/>
+          <a:p>
+            <a:endParaRPr lang="en-US"/>
+          </a:p>
+        </p:txBody>
+      </p:sp>
+      <p:sp>
+        <p:nvSpPr>
+          <p:cNvPr id="4" name="Date Placeholder 3">
+            <a:extLst>
+              <a:ext uri="{FF2B5EF4-FFF2-40B4-BE49-F238E27FC236}">
+                <a16:creationId xmlns:a16="http://schemas.microsoft.com/office/drawing/2014/main" id="{02256D86-7CE0-416E-B2A3-402D20EE9E90}"/>
+              </a:ext>
+            </a:extLst>
+          </p:cNvPr>
+          <p:cNvSpPr>
+            <a:spLocks noGrp="1"/>
+          </p:cNvSpPr>
+          <p:nvPr>
+            <p:ph type="dt" sz="half" idx="10"/>
+          </p:nvPr>
+        </p:nvSpPr>
+        <p:spPr/>
+        <p:txBody>
+          <a:bodyPr/>
+          <a:lstStyle/>
+          <a:p>
+            <a:fld id="{B08FEED8-D7D4-44E9-BFBC-ED06B5996D94}" type="datetime4">
+              <a:rPr lang="en-US" smtClean="0"/>
+              <a:t>July 29, 2019</a:t>
+            </a:fld>
+            <a:endParaRPr lang="en-US" dirty="0"/>
+          </a:p>
+        </p:txBody>
+      </p:sp>
+      <p:sp>
+        <p:nvSpPr>
+          <p:cNvPr id="5" name="Footer Placeholder 4">
+            <a:extLst>
+              <a:ext uri="{FF2B5EF4-FFF2-40B4-BE49-F238E27FC236}">
+                <a16:creationId xmlns:a16="http://schemas.microsoft.com/office/drawing/2014/main" id="{1D4ED112-7CF4-4BB9-B46E-B366A5054A9A}"/>
+              </a:ext>
+            </a:extLst>
+          </p:cNvPr>
+          <p:cNvSpPr>
+            <a:spLocks noGrp="1"/>
+          </p:cNvSpPr>
+          <p:nvPr>
+            <p:ph type="ftr" sz="quarter" idx="11"/>
+          </p:nvPr>
+        </p:nvSpPr>
+        <p:spPr/>
+        <p:txBody>
+          <a:bodyPr/>
+          <a:lstStyle/>
+          <a:p>
+            <a:r>
+              <a:rPr lang="en-US"/>
+              <a:t>Digital Scholarship Services </a:t>
+            </a:r>
+            <a:r>
+              <a:rPr lang="en-US">
+                <a:solidFill>
+                  <a:schemeClr val="accent1">
+                    <a:lumMod val="50000"/>
+                  </a:schemeClr>
+                </a:solidFill>
+              </a:rPr>
+              <a:t>| Email</a:t>
+            </a:r>
+            <a:r>
+              <a:rPr lang="en-US"/>
+              <a:t> cf24@rice.edu </a:t>
+            </a:r>
+            <a:r>
+              <a:rPr lang="en-US">
+                <a:solidFill>
+                  <a:schemeClr val="accent1">
+                    <a:lumMod val="50000"/>
+                  </a:schemeClr>
+                </a:solidFill>
+              </a:rPr>
+              <a:t>|</a:t>
+            </a:r>
+            <a:r>
+              <a:rPr lang="en-US"/>
+              <a:t> library.rice.edu/dss</a:t>
+            </a:r>
+            <a:endParaRPr lang="en-US" dirty="0"/>
+          </a:p>
+        </p:txBody>
+      </p:sp>
+      <p:sp>
+        <p:nvSpPr>
+          <p:cNvPr id="6" name="Slide Number Placeholder 5">
+            <a:extLst>
+              <a:ext uri="{FF2B5EF4-FFF2-40B4-BE49-F238E27FC236}">
+                <a16:creationId xmlns:a16="http://schemas.microsoft.com/office/drawing/2014/main" id="{8CC75551-85BF-4C9F-8893-AA28ECA8A6B5}"/>
+              </a:ext>
+            </a:extLst>
+          </p:cNvPr>
+          <p:cNvSpPr>
+            <a:spLocks noGrp="1"/>
+          </p:cNvSpPr>
+          <p:nvPr>
+            <p:ph type="sldNum" sz="quarter" idx="12"/>
+          </p:nvPr>
+        </p:nvSpPr>
+        <p:spPr/>
+        <p:txBody>
+          <a:bodyPr/>
+          <a:lstStyle/>
+          <a:p>
+            <a:fld id="{D57F1E4F-1CFF-5643-939E-02111984F565}" type="slidenum">
+              <a:rPr lang="en-US" smtClean="0"/>
+              <a:t>23</a:t>
+            </a:fld>
+            <a:endParaRPr lang="en-US" dirty="0"/>
+          </a:p>
+        </p:txBody>
+      </p:sp>
+    </p:spTree>
+    <p:extLst>
+      <p:ext uri="{BB962C8B-B14F-4D97-AF65-F5344CB8AC3E}">
+        <p14:creationId xmlns:p14="http://schemas.microsoft.com/office/powerpoint/2010/main" val="4066560549"/>
+      </p:ext>
+    </p:extLst>
+  </p:cSld>
+  <p:clrMapOvr>
+    <a:masterClrMapping/>
+  </p:clrMapOvr>
+</p:sld>
+</file>
+
+<file path=ppt/slides/slide24.xml><?xml version="1.0" encoding="utf-8"?>
+<p:sld xmlns:a="http://schemas.openxmlformats.org/drawingml/2006/main" xmlns:r="http://schemas.openxmlformats.org/officeDocument/2006/relationships" xmlns:p="http://schemas.openxmlformats.org/presentationml/2006/main">
+  <p:cSld>
+    <p:spTree>
+      <p:nvGrpSpPr>
+        <p:cNvPr id="1" name=""/>
+        <p:cNvGrpSpPr/>
+        <p:nvPr/>
+      </p:nvGrpSpPr>
+      <p:grpSpPr>
+        <a:xfrm>
+          <a:off x="0" y="0"/>
+          <a:ext cx="0" cy="0"/>
+          <a:chOff x="0" y="0"/>
+          <a:chExt cx="0" cy="0"/>
+        </a:xfrm>
+      </p:grpSpPr>
+      <p:sp>
+        <p:nvSpPr>
+          <p:cNvPr id="2" name="Title 1">
+            <a:extLst>
+              <a:ext uri="{FF2B5EF4-FFF2-40B4-BE49-F238E27FC236}">
+                <a16:creationId xmlns:a16="http://schemas.microsoft.com/office/drawing/2014/main" id="{D7EACF90-3E7B-4978-AB0C-ED5165419D19}"/>
+              </a:ext>
+            </a:extLst>
+          </p:cNvPr>
+          <p:cNvSpPr>
+            <a:spLocks noGrp="1"/>
+          </p:cNvSpPr>
+          <p:nvPr>
+            <p:ph type="title"/>
+          </p:nvPr>
+        </p:nvSpPr>
+        <p:spPr/>
+        <p:txBody>
+          <a:bodyPr/>
+          <a:lstStyle/>
+          <a:p>
+            <a:r>
+              <a:rPr lang="en-US" dirty="0"/>
+              <a:t>MOVING AVERAGE</a:t>
+            </a:r>
+          </a:p>
+        </p:txBody>
+      </p:sp>
+      <p:sp>
+        <p:nvSpPr>
+          <p:cNvPr id="3" name="Content Placeholder 2">
+            <a:extLst>
+              <a:ext uri="{FF2B5EF4-FFF2-40B4-BE49-F238E27FC236}">
+                <a16:creationId xmlns:a16="http://schemas.microsoft.com/office/drawing/2014/main" id="{A7CEFEF5-E74A-4EFE-9368-8FD74B059E10}"/>
+              </a:ext>
+            </a:extLst>
+          </p:cNvPr>
+          <p:cNvSpPr>
+            <a:spLocks noGrp="1"/>
+          </p:cNvSpPr>
+          <p:nvPr>
+            <p:ph idx="1"/>
+          </p:nvPr>
+        </p:nvSpPr>
+        <p:spPr/>
+        <p:txBody>
+          <a:bodyPr/>
+          <a:lstStyle/>
+          <a:p>
+            <a:endParaRPr lang="en-US"/>
+          </a:p>
+        </p:txBody>
+      </p:sp>
+      <p:sp>
+        <p:nvSpPr>
+          <p:cNvPr id="4" name="Date Placeholder 3">
+            <a:extLst>
+              <a:ext uri="{FF2B5EF4-FFF2-40B4-BE49-F238E27FC236}">
+                <a16:creationId xmlns:a16="http://schemas.microsoft.com/office/drawing/2014/main" id="{64E0A09F-EC7A-4EF6-AB3A-0DC48B1B7271}"/>
+              </a:ext>
+            </a:extLst>
+          </p:cNvPr>
+          <p:cNvSpPr>
+            <a:spLocks noGrp="1"/>
+          </p:cNvSpPr>
+          <p:nvPr>
+            <p:ph type="dt" sz="half" idx="10"/>
+          </p:nvPr>
+        </p:nvSpPr>
+        <p:spPr/>
+        <p:txBody>
+          <a:bodyPr/>
+          <a:lstStyle/>
+          <a:p>
+            <a:fld id="{8AAE40A0-A7D8-4DC3-BC9E-BADA32DA2004}" type="datetime4">
+              <a:rPr lang="en-US" smtClean="0"/>
+              <a:t>July 29, 2019</a:t>
+            </a:fld>
+            <a:endParaRPr lang="en-US" dirty="0"/>
+          </a:p>
+        </p:txBody>
+      </p:sp>
+      <p:sp>
+        <p:nvSpPr>
+          <p:cNvPr id="5" name="Footer Placeholder 4">
+            <a:extLst>
+              <a:ext uri="{FF2B5EF4-FFF2-40B4-BE49-F238E27FC236}">
+                <a16:creationId xmlns:a16="http://schemas.microsoft.com/office/drawing/2014/main" id="{9D8B7F07-2C50-4473-BABC-57C52FDD38D2}"/>
+              </a:ext>
+            </a:extLst>
+          </p:cNvPr>
+          <p:cNvSpPr>
+            <a:spLocks noGrp="1"/>
+          </p:cNvSpPr>
+          <p:nvPr>
+            <p:ph type="ftr" sz="quarter" idx="11"/>
+          </p:nvPr>
+        </p:nvSpPr>
+        <p:spPr/>
+        <p:txBody>
+          <a:bodyPr/>
+          <a:lstStyle/>
+          <a:p>
+            <a:r>
+              <a:rPr lang="en-US"/>
+              <a:t>Digital Scholarship Services </a:t>
+            </a:r>
+            <a:r>
+              <a:rPr lang="en-US">
+                <a:solidFill>
+                  <a:schemeClr val="accent1">
+                    <a:lumMod val="50000"/>
+                  </a:schemeClr>
+                </a:solidFill>
+              </a:rPr>
+              <a:t>| Email</a:t>
+            </a:r>
+            <a:r>
+              <a:rPr lang="en-US"/>
+              <a:t> cf24@rice.edu </a:t>
+            </a:r>
+            <a:r>
+              <a:rPr lang="en-US">
+                <a:solidFill>
+                  <a:schemeClr val="accent1">
+                    <a:lumMod val="50000"/>
+                  </a:schemeClr>
+                </a:solidFill>
+              </a:rPr>
+              <a:t>|</a:t>
+            </a:r>
+            <a:r>
+              <a:rPr lang="en-US"/>
+              <a:t> library.rice.edu/dss</a:t>
+            </a:r>
+            <a:endParaRPr lang="en-US" dirty="0"/>
+          </a:p>
+        </p:txBody>
+      </p:sp>
+      <p:sp>
+        <p:nvSpPr>
+          <p:cNvPr id="6" name="Slide Number Placeholder 5">
+            <a:extLst>
+              <a:ext uri="{FF2B5EF4-FFF2-40B4-BE49-F238E27FC236}">
+                <a16:creationId xmlns:a16="http://schemas.microsoft.com/office/drawing/2014/main" id="{6BE5E43E-0696-4C60-A72C-BBB5B4448760}"/>
+              </a:ext>
+            </a:extLst>
+          </p:cNvPr>
+          <p:cNvSpPr>
+            <a:spLocks noGrp="1"/>
+          </p:cNvSpPr>
+          <p:nvPr>
+            <p:ph type="sldNum" sz="quarter" idx="12"/>
+          </p:nvPr>
+        </p:nvSpPr>
+        <p:spPr/>
+        <p:txBody>
+          <a:bodyPr/>
+          <a:lstStyle/>
+          <a:p>
+            <a:fld id="{D57F1E4F-1CFF-5643-939E-02111984F565}" type="slidenum">
+              <a:rPr lang="en-US" smtClean="0"/>
+              <a:t>24</a:t>
+            </a:fld>
+            <a:endParaRPr lang="en-US" dirty="0"/>
+          </a:p>
+        </p:txBody>
+      </p:sp>
+    </p:spTree>
+    <p:extLst>
+      <p:ext uri="{BB962C8B-B14F-4D97-AF65-F5344CB8AC3E}">
+        <p14:creationId xmlns:p14="http://schemas.microsoft.com/office/powerpoint/2010/main" val="3521777765"/>
+      </p:ext>
+    </p:extLst>
+  </p:cSld>
+  <p:clrMapOvr>
+    <a:masterClrMapping/>
+  </p:clrMapOvr>
+</p:sld>
+</file>
+
+<file path=ppt/slides/slide25.xml><?xml version="1.0" encoding="utf-8"?>
+<p:sld xmlns:a="http://schemas.openxmlformats.org/drawingml/2006/main" xmlns:r="http://schemas.openxmlformats.org/officeDocument/2006/relationships" xmlns:p="http://schemas.openxmlformats.org/presentationml/2006/main">
+  <p:cSld>
+    <p:spTree>
+      <p:nvGrpSpPr>
+        <p:cNvPr id="1" name=""/>
+        <p:cNvGrpSpPr/>
+        <p:nvPr/>
+      </p:nvGrpSpPr>
+      <p:grpSpPr>
+        <a:xfrm>
+          <a:off x="0" y="0"/>
+          <a:ext cx="0" cy="0"/>
+          <a:chOff x="0" y="0"/>
+          <a:chExt cx="0" cy="0"/>
+        </a:xfrm>
+      </p:grpSpPr>
+      <p:sp>
+        <p:nvSpPr>
+          <p:cNvPr id="2" name="Title 1">
+            <a:extLst>
+              <a:ext uri="{FF2B5EF4-FFF2-40B4-BE49-F238E27FC236}">
+                <a16:creationId xmlns:a16="http://schemas.microsoft.com/office/drawing/2014/main" id="{D1BF0482-6913-4A5E-A533-479864CB5349}"/>
+              </a:ext>
+            </a:extLst>
+          </p:cNvPr>
+          <p:cNvSpPr>
+            <a:spLocks noGrp="1"/>
+          </p:cNvSpPr>
+          <p:nvPr>
+            <p:ph type="title"/>
+          </p:nvPr>
+        </p:nvSpPr>
+        <p:spPr/>
+        <p:txBody>
+          <a:bodyPr/>
+          <a:lstStyle/>
+          <a:p>
+            <a:r>
+              <a:rPr lang="en-US" dirty="0"/>
+              <a:t>PLAYING AROUND WITH ARIMA</a:t>
+            </a:r>
+          </a:p>
+        </p:txBody>
+      </p:sp>
+      <p:sp>
+        <p:nvSpPr>
+          <p:cNvPr id="3" name="Content Placeholder 2">
+            <a:extLst>
+              <a:ext uri="{FF2B5EF4-FFF2-40B4-BE49-F238E27FC236}">
+                <a16:creationId xmlns:a16="http://schemas.microsoft.com/office/drawing/2014/main" id="{D48271C9-2790-46C9-B80B-52D215430CB8}"/>
+              </a:ext>
+            </a:extLst>
+          </p:cNvPr>
+          <p:cNvSpPr>
+            <a:spLocks noGrp="1"/>
+          </p:cNvSpPr>
+          <p:nvPr>
+            <p:ph idx="1"/>
+          </p:nvPr>
+        </p:nvSpPr>
+        <p:spPr/>
+        <p:txBody>
+          <a:bodyPr/>
+          <a:lstStyle/>
+          <a:p>
+            <a:endParaRPr lang="en-US"/>
+          </a:p>
+        </p:txBody>
+      </p:sp>
+      <p:sp>
+        <p:nvSpPr>
+          <p:cNvPr id="4" name="Date Placeholder 3">
+            <a:extLst>
+              <a:ext uri="{FF2B5EF4-FFF2-40B4-BE49-F238E27FC236}">
+                <a16:creationId xmlns:a16="http://schemas.microsoft.com/office/drawing/2014/main" id="{B23DAF35-209C-48FA-AAAB-F69E14183A91}"/>
+              </a:ext>
+            </a:extLst>
+          </p:cNvPr>
+          <p:cNvSpPr>
+            <a:spLocks noGrp="1"/>
+          </p:cNvSpPr>
+          <p:nvPr>
+            <p:ph type="dt" sz="half" idx="10"/>
+          </p:nvPr>
+        </p:nvSpPr>
+        <p:spPr/>
+        <p:txBody>
+          <a:bodyPr/>
+          <a:lstStyle/>
+          <a:p>
+            <a:fld id="{8AAE40A0-A7D8-4DC3-BC9E-BADA32DA2004}" type="datetime4">
+              <a:rPr lang="en-US" smtClean="0"/>
+              <a:t>July 29, 2019</a:t>
+            </a:fld>
+            <a:endParaRPr lang="en-US" dirty="0"/>
+          </a:p>
+        </p:txBody>
+      </p:sp>
+      <p:sp>
+        <p:nvSpPr>
+          <p:cNvPr id="5" name="Footer Placeholder 4">
+            <a:extLst>
+              <a:ext uri="{FF2B5EF4-FFF2-40B4-BE49-F238E27FC236}">
+                <a16:creationId xmlns:a16="http://schemas.microsoft.com/office/drawing/2014/main" id="{3D8E22A6-180D-41CF-9959-4347A11F2AD1}"/>
+              </a:ext>
+            </a:extLst>
+          </p:cNvPr>
+          <p:cNvSpPr>
+            <a:spLocks noGrp="1"/>
+          </p:cNvSpPr>
+          <p:nvPr>
+            <p:ph type="ftr" sz="quarter" idx="11"/>
+          </p:nvPr>
+        </p:nvSpPr>
+        <p:spPr/>
+        <p:txBody>
+          <a:bodyPr/>
+          <a:lstStyle/>
+          <a:p>
+            <a:r>
+              <a:rPr lang="en-US"/>
+              <a:t>Digital Scholarship Services </a:t>
+            </a:r>
+            <a:r>
+              <a:rPr lang="en-US">
+                <a:solidFill>
+                  <a:schemeClr val="accent1">
+                    <a:lumMod val="50000"/>
+                  </a:schemeClr>
+                </a:solidFill>
+              </a:rPr>
+              <a:t>| Email</a:t>
+            </a:r>
+            <a:r>
+              <a:rPr lang="en-US"/>
+              <a:t> cf24@rice.edu </a:t>
+            </a:r>
+            <a:r>
+              <a:rPr lang="en-US">
+                <a:solidFill>
+                  <a:schemeClr val="accent1">
+                    <a:lumMod val="50000"/>
+                  </a:schemeClr>
+                </a:solidFill>
+              </a:rPr>
+              <a:t>|</a:t>
+            </a:r>
+            <a:r>
+              <a:rPr lang="en-US"/>
+              <a:t> library.rice.edu/dss</a:t>
+            </a:r>
+            <a:endParaRPr lang="en-US" dirty="0"/>
+          </a:p>
+        </p:txBody>
+      </p:sp>
+      <p:sp>
+        <p:nvSpPr>
+          <p:cNvPr id="6" name="Slide Number Placeholder 5">
+            <a:extLst>
+              <a:ext uri="{FF2B5EF4-FFF2-40B4-BE49-F238E27FC236}">
+                <a16:creationId xmlns:a16="http://schemas.microsoft.com/office/drawing/2014/main" id="{CECE3146-0C2B-4CC7-BC7C-FD23AAF7ECAE}"/>
+              </a:ext>
+            </a:extLst>
+          </p:cNvPr>
+          <p:cNvSpPr>
+            <a:spLocks noGrp="1"/>
+          </p:cNvSpPr>
+          <p:nvPr>
+            <p:ph type="sldNum" sz="quarter" idx="12"/>
+          </p:nvPr>
+        </p:nvSpPr>
+        <p:spPr/>
+        <p:txBody>
+          <a:bodyPr/>
+          <a:lstStyle/>
+          <a:p>
+            <a:fld id="{D57F1E4F-1CFF-5643-939E-02111984F565}" type="slidenum">
+              <a:rPr lang="en-US" smtClean="0"/>
+              <a:t>25</a:t>
+            </a:fld>
+            <a:endParaRPr lang="en-US" dirty="0"/>
+          </a:p>
+        </p:txBody>
+      </p:sp>
+    </p:spTree>
+    <p:extLst>
+      <p:ext uri="{BB962C8B-B14F-4D97-AF65-F5344CB8AC3E}">
+        <p14:creationId xmlns:p14="http://schemas.microsoft.com/office/powerpoint/2010/main" val="3624540971"/>
+      </p:ext>
+    </p:extLst>
+  </p:cSld>
+  <p:clrMapOvr>
+    <a:masterClrMapping/>
+  </p:clrMapOvr>
+</p:sld>
+</file>
+
+<file path=ppt/slides/slide26.xml><?xml version="1.0" encoding="utf-8"?>
+<p:sld xmlns:a="http://schemas.openxmlformats.org/drawingml/2006/main" xmlns:r="http://schemas.openxmlformats.org/officeDocument/2006/relationships" xmlns:p="http://schemas.openxmlformats.org/presentationml/2006/main">
+  <p:cSld>
+    <p:spTree>
+      <p:nvGrpSpPr>
+        <p:cNvPr id="1" name=""/>
+        <p:cNvGrpSpPr/>
+        <p:nvPr/>
+      </p:nvGrpSpPr>
+      <p:grpSpPr>
+        <a:xfrm>
+          <a:off x="0" y="0"/>
+          <a:ext cx="0" cy="0"/>
+          <a:chOff x="0" y="0"/>
+          <a:chExt cx="0" cy="0"/>
+        </a:xfrm>
+      </p:grpSpPr>
+      <p:sp>
+        <p:nvSpPr>
+          <p:cNvPr id="7" name="Title 6">
+            <a:extLst>
+              <a:ext uri="{FF2B5EF4-FFF2-40B4-BE49-F238E27FC236}">
+                <a16:creationId xmlns:a16="http://schemas.microsoft.com/office/drawing/2014/main" id="{495B4BC0-844B-4414-A623-BEF78AAC1BA1}"/>
+              </a:ext>
+            </a:extLst>
+          </p:cNvPr>
+          <p:cNvSpPr>
+            <a:spLocks noGrp="1"/>
+          </p:cNvSpPr>
+          <p:nvPr>
+            <p:ph type="title"/>
+          </p:nvPr>
+        </p:nvSpPr>
+        <p:spPr/>
+        <p:txBody>
+          <a:bodyPr/>
+          <a:lstStyle/>
+          <a:p>
+            <a:r>
+              <a:rPr lang="en-US" dirty="0"/>
+              <a:t>ACKNOWLEDGMENTS</a:t>
+            </a:r>
+          </a:p>
+        </p:txBody>
+      </p:sp>
+      <p:sp>
+        <p:nvSpPr>
+          <p:cNvPr id="8" name="Content Placeholder 7">
+            <a:extLst>
+              <a:ext uri="{FF2B5EF4-FFF2-40B4-BE49-F238E27FC236}">
+                <a16:creationId xmlns:a16="http://schemas.microsoft.com/office/drawing/2014/main" id="{2BED3EB3-7E98-4A82-8335-7321D9E37B16}"/>
+              </a:ext>
+            </a:extLst>
+          </p:cNvPr>
+          <p:cNvSpPr>
+            <a:spLocks noGrp="1"/>
+          </p:cNvSpPr>
+          <p:nvPr>
+            <p:ph idx="1"/>
+          </p:nvPr>
+        </p:nvSpPr>
+        <p:spPr/>
+        <p:txBody>
+          <a:bodyPr/>
+          <a:lstStyle/>
+          <a:p>
+            <a:endParaRPr lang="en-US"/>
+          </a:p>
+        </p:txBody>
+      </p:sp>
+      <p:sp>
+        <p:nvSpPr>
+          <p:cNvPr id="4" name="Date Placeholder 3">
+            <a:extLst>
+              <a:ext uri="{FF2B5EF4-FFF2-40B4-BE49-F238E27FC236}">
+                <a16:creationId xmlns:a16="http://schemas.microsoft.com/office/drawing/2014/main" id="{540F37F1-4F33-429F-A568-1A3ADC499E54}"/>
+              </a:ext>
+            </a:extLst>
+          </p:cNvPr>
+          <p:cNvSpPr>
+            <a:spLocks noGrp="1"/>
+          </p:cNvSpPr>
+          <p:nvPr>
+            <p:ph type="dt" sz="half" idx="10"/>
+          </p:nvPr>
+        </p:nvSpPr>
+        <p:spPr/>
+        <p:txBody>
+          <a:bodyPr/>
+          <a:lstStyle/>
+          <a:p>
+            <a:fld id="{B08FEED8-D7D4-44E9-BFBC-ED06B5996D94}" type="datetime4">
+              <a:rPr lang="en-US" smtClean="0"/>
+              <a:t>July 29, 2019</a:t>
+            </a:fld>
+            <a:endParaRPr lang="en-US" dirty="0"/>
+          </a:p>
+        </p:txBody>
+      </p:sp>
+      <p:sp>
+        <p:nvSpPr>
+          <p:cNvPr id="5" name="Footer Placeholder 4">
+            <a:extLst>
+              <a:ext uri="{FF2B5EF4-FFF2-40B4-BE49-F238E27FC236}">
+                <a16:creationId xmlns:a16="http://schemas.microsoft.com/office/drawing/2014/main" id="{673FFA57-C126-4795-A5F6-DD33AAC5ACBD}"/>
+              </a:ext>
+            </a:extLst>
+          </p:cNvPr>
+          <p:cNvSpPr>
+            <a:spLocks noGrp="1"/>
+          </p:cNvSpPr>
+          <p:nvPr>
+            <p:ph type="ftr" sz="quarter" idx="11"/>
+          </p:nvPr>
+        </p:nvSpPr>
+        <p:spPr/>
+        <p:txBody>
+          <a:bodyPr/>
+          <a:lstStyle/>
+          <a:p>
+            <a:r>
+              <a:rPr lang="en-US"/>
+              <a:t>Digital Scholarship Services </a:t>
+            </a:r>
+            <a:r>
+              <a:rPr lang="en-US">
+                <a:solidFill>
+                  <a:schemeClr val="accent1">
+                    <a:lumMod val="50000"/>
+                  </a:schemeClr>
+                </a:solidFill>
+              </a:rPr>
+              <a:t>| Email</a:t>
+            </a:r>
+            <a:r>
+              <a:rPr lang="en-US"/>
+              <a:t> cf24@rice.edu </a:t>
+            </a:r>
+            <a:r>
+              <a:rPr lang="en-US">
+                <a:solidFill>
+                  <a:schemeClr val="accent1">
+                    <a:lumMod val="50000"/>
+                  </a:schemeClr>
+                </a:solidFill>
+              </a:rPr>
+              <a:t>|</a:t>
+            </a:r>
+            <a:r>
+              <a:rPr lang="en-US"/>
+              <a:t> library.rice.edu/dss</a:t>
+            </a:r>
+            <a:endParaRPr lang="en-US" dirty="0"/>
+          </a:p>
+        </p:txBody>
+      </p:sp>
+      <p:sp>
+        <p:nvSpPr>
+          <p:cNvPr id="6" name="Slide Number Placeholder 5">
+            <a:extLst>
+              <a:ext uri="{FF2B5EF4-FFF2-40B4-BE49-F238E27FC236}">
+                <a16:creationId xmlns:a16="http://schemas.microsoft.com/office/drawing/2014/main" id="{2FA49567-BB70-4798-8746-D0B522CCEE20}"/>
+              </a:ext>
+            </a:extLst>
+          </p:cNvPr>
+          <p:cNvSpPr>
+            <a:spLocks noGrp="1"/>
+          </p:cNvSpPr>
+          <p:nvPr>
+            <p:ph type="sldNum" sz="quarter" idx="12"/>
+          </p:nvPr>
+        </p:nvSpPr>
+        <p:spPr/>
+        <p:txBody>
+          <a:bodyPr/>
+          <a:lstStyle/>
+          <a:p>
+            <a:fld id="{D57F1E4F-1CFF-5643-939E-02111984F565}" type="slidenum">
+              <a:rPr lang="en-US" smtClean="0"/>
+              <a:t>26</a:t>
             </a:fld>
             <a:endParaRPr lang="en-US" dirty="0"/>
           </a:p>
@@ -7794,33 +8612,8 @@
           <a:p>
             <a:r>
               <a:rPr lang="en-US" dirty="0"/>
-              <a:t>TRENDS</a:t>
-            </a:r>
-          </a:p>
-        </p:txBody>
-      </p:sp>
-      <p:sp>
-        <p:nvSpPr>
-          <p:cNvPr id="8" name="Content Placeholder 7">
-            <a:extLst>
-              <a:ext uri="{FF2B5EF4-FFF2-40B4-BE49-F238E27FC236}">
-                <a16:creationId xmlns:a16="http://schemas.microsoft.com/office/drawing/2014/main" id="{2BED3EB3-7E98-4A82-8335-7321D9E37B16}"/>
-              </a:ext>
-            </a:extLst>
-          </p:cNvPr>
-          <p:cNvSpPr>
-            <a:spLocks noGrp="1"/>
-          </p:cNvSpPr>
-          <p:nvPr>
-            <p:ph idx="1"/>
-          </p:nvPr>
-        </p:nvSpPr>
-        <p:spPr/>
-        <p:txBody>
-          <a:bodyPr/>
-          <a:lstStyle/>
-          <a:p>
-            <a:endParaRPr lang="en-US"/>
+              <a:t>A SAMPLE TIME SERIES</a:t>
+            </a:r>
           </a:p>
         </p:txBody>
       </p:sp>
@@ -7939,10 +8732,39 @@
           </a:p>
         </p:txBody>
       </p:sp>
+      <p:pic>
+        <p:nvPicPr>
+          <p:cNvPr id="10" name="Picture 9">
+            <a:extLst>
+              <a:ext uri="{FF2B5EF4-FFF2-40B4-BE49-F238E27FC236}">
+                <a16:creationId xmlns:a16="http://schemas.microsoft.com/office/drawing/2014/main" id="{33772C99-D8A9-48D3-AA08-A12DBDE89821}"/>
+              </a:ext>
+            </a:extLst>
+          </p:cNvPr>
+          <p:cNvPicPr>
+            <a:picLocks noChangeAspect="1"/>
+          </p:cNvPicPr>
+          <p:nvPr/>
+        </p:nvPicPr>
+        <p:blipFill>
+          <a:blip r:embed="rId2"/>
+          <a:srcRect/>
+          <a:stretch/>
+        </p:blipFill>
+        <p:spPr>
+          <a:xfrm>
+            <a:off x="2766309" y="1653161"/>
+            <a:ext cx="6732750" cy="4488500"/>
+          </a:xfrm>
+          <a:prstGeom prst="rect">
+            <a:avLst/>
+          </a:prstGeom>
+        </p:spPr>
+      </p:pic>
     </p:spTree>
     <p:extLst>
       <p:ext uri="{BB962C8B-B14F-4D97-AF65-F5344CB8AC3E}">
-        <p14:creationId xmlns:p14="http://schemas.microsoft.com/office/powerpoint/2010/main" val="528821766"/>
+        <p14:creationId xmlns:p14="http://schemas.microsoft.com/office/powerpoint/2010/main" val="3350964736"/>
       </p:ext>
     </p:extLst>
   </p:cSld>
@@ -7992,33 +8814,8 @@
           <a:p>
             <a:r>
               <a:rPr lang="en-US" dirty="0"/>
-              <a:t>PERIODIC COMPONENTS</a:t>
-            </a:r>
-          </a:p>
-        </p:txBody>
-      </p:sp>
-      <p:sp>
-        <p:nvSpPr>
-          <p:cNvPr id="8" name="Content Placeholder 7">
-            <a:extLst>
-              <a:ext uri="{FF2B5EF4-FFF2-40B4-BE49-F238E27FC236}">
-                <a16:creationId xmlns:a16="http://schemas.microsoft.com/office/drawing/2014/main" id="{2BED3EB3-7E98-4A82-8335-7321D9E37B16}"/>
-              </a:ext>
-            </a:extLst>
-          </p:cNvPr>
-          <p:cNvSpPr>
-            <a:spLocks noGrp="1"/>
-          </p:cNvSpPr>
-          <p:nvPr>
-            <p:ph idx="1"/>
-          </p:nvPr>
-        </p:nvSpPr>
-        <p:spPr/>
-        <p:txBody>
-          <a:bodyPr/>
-          <a:lstStyle/>
-          <a:p>
-            <a:endParaRPr lang="en-US" dirty="0"/>
+              <a:t>TRENDS</a:t>
+            </a:r>
           </a:p>
         </p:txBody>
       </p:sp>
@@ -8137,10 +8934,40 @@
           </a:p>
         </p:txBody>
       </p:sp>
+      <p:pic>
+        <p:nvPicPr>
+          <p:cNvPr id="9" name="Picture 8" descr="A picture containing object, wall&#10;&#10;Description automatically generated">
+            <a:extLst>
+              <a:ext uri="{FF2B5EF4-FFF2-40B4-BE49-F238E27FC236}">
+                <a16:creationId xmlns:a16="http://schemas.microsoft.com/office/drawing/2014/main" id="{D1F54434-5FE9-421C-937F-45796FA60BC5}"/>
+              </a:ext>
+            </a:extLst>
+          </p:cNvPr>
+          <p:cNvPicPr>
+            <a:picLocks noChangeAspect="1"/>
+          </p:cNvPicPr>
+          <p:nvPr/>
+        </p:nvPicPr>
+        <p:blipFill>
+          <a:blip r:embed="rId2"/>
+          <a:stretch>
+            <a:fillRect/>
+          </a:stretch>
+        </p:blipFill>
+        <p:spPr>
+          <a:xfrm>
+            <a:off x="2766309" y="1653161"/>
+            <a:ext cx="6732750" cy="4488500"/>
+          </a:xfrm>
+          <a:prstGeom prst="rect">
+            <a:avLst/>
+          </a:prstGeom>
+        </p:spPr>
+      </p:pic>
     </p:spTree>
     <p:extLst>
       <p:ext uri="{BB962C8B-B14F-4D97-AF65-F5344CB8AC3E}">
-        <p14:creationId xmlns:p14="http://schemas.microsoft.com/office/powerpoint/2010/main" val="2609791034"/>
+        <p14:creationId xmlns:p14="http://schemas.microsoft.com/office/powerpoint/2010/main" val="528821766"/>
       </p:ext>
     </p:extLst>
   </p:cSld>

</xml_diff>

<commit_message>
added plots for now, pretty pictures
</commit_message>
<xml_diff>
--- a/tsa/Introduction to Time Series Analysis.pptx
+++ b/tsa/Introduction to Time Series Analysis.pptx
@@ -5,7 +5,7 @@
     <p:sldMasterId id="2147483707" r:id="rId1"/>
   </p:sldMasterIdLst>
   <p:notesMasterIdLst>
-    <p:notesMasterId r:id="rId28"/>
+    <p:notesMasterId r:id="rId29"/>
   </p:notesMasterIdLst>
   <p:sldIdLst>
     <p:sldId id="266" r:id="rId2"/>
@@ -22,18 +22,19 @@
     <p:sldId id="294" r:id="rId13"/>
     <p:sldId id="295" r:id="rId14"/>
     <p:sldId id="277" r:id="rId15"/>
-    <p:sldId id="276" r:id="rId16"/>
-    <p:sldId id="273" r:id="rId17"/>
-    <p:sldId id="274" r:id="rId18"/>
-    <p:sldId id="275" r:id="rId19"/>
-    <p:sldId id="279" r:id="rId20"/>
-    <p:sldId id="280" r:id="rId21"/>
-    <p:sldId id="281" r:id="rId22"/>
-    <p:sldId id="282" r:id="rId23"/>
-    <p:sldId id="283" r:id="rId24"/>
-    <p:sldId id="284" r:id="rId25"/>
-    <p:sldId id="285" r:id="rId26"/>
-    <p:sldId id="268" r:id="rId27"/>
+    <p:sldId id="296" r:id="rId16"/>
+    <p:sldId id="276" r:id="rId17"/>
+    <p:sldId id="273" r:id="rId18"/>
+    <p:sldId id="274" r:id="rId19"/>
+    <p:sldId id="275" r:id="rId20"/>
+    <p:sldId id="279" r:id="rId21"/>
+    <p:sldId id="280" r:id="rId22"/>
+    <p:sldId id="281" r:id="rId23"/>
+    <p:sldId id="282" r:id="rId24"/>
+    <p:sldId id="283" r:id="rId25"/>
+    <p:sldId id="284" r:id="rId26"/>
+    <p:sldId id="285" r:id="rId27"/>
+    <p:sldId id="268" r:id="rId28"/>
   </p:sldIdLst>
   <p:sldSz cx="12192000" cy="6858000"/>
   <p:notesSz cx="6858000" cy="9144000"/>
@@ -4724,31 +4725,35 @@
           </a:p>
         </p:txBody>
       </p:sp>
-      <p:sp>
-        <p:nvSpPr>
-          <p:cNvPr id="8" name="Content Placeholder 7">
-            <a:extLst>
-              <a:ext uri="{FF2B5EF4-FFF2-40B4-BE49-F238E27FC236}">
-                <a16:creationId xmlns:a16="http://schemas.microsoft.com/office/drawing/2014/main" id="{2BED3EB3-7E98-4A82-8335-7321D9E37B16}"/>
-              </a:ext>
-            </a:extLst>
-          </p:cNvPr>
-          <p:cNvSpPr>
-            <a:spLocks noGrp="1"/>
-          </p:cNvSpPr>
+      <p:pic>
+        <p:nvPicPr>
+          <p:cNvPr id="3" name="Content Placeholder 2" descr="A screenshot of a cell phone&#10;&#10;Description automatically generated">
+            <a:extLst>
+              <a:ext uri="{FF2B5EF4-FFF2-40B4-BE49-F238E27FC236}">
+                <a16:creationId xmlns:a16="http://schemas.microsoft.com/office/drawing/2014/main" id="{E1134249-FB42-45A5-8E66-082581C5131C}"/>
+              </a:ext>
+            </a:extLst>
+          </p:cNvPr>
+          <p:cNvPicPr>
+            <a:picLocks noGrp="1" noChangeAspect="1"/>
+          </p:cNvPicPr>
           <p:nvPr>
             <p:ph idx="1"/>
           </p:nvPr>
-        </p:nvSpPr>
-        <p:spPr/>
-        <p:txBody>
-          <a:bodyPr/>
-          <a:lstStyle/>
-          <a:p>
-            <a:endParaRPr lang="en-US" dirty="0"/>
-          </a:p>
-        </p:txBody>
-      </p:sp>
+        </p:nvPicPr>
+        <p:blipFill>
+          <a:blip r:embed="rId2"/>
+          <a:stretch>
+            <a:fillRect/>
+          </a:stretch>
+        </p:blipFill>
+        <p:spPr>
+          <a:xfrm>
+            <a:off x="4355465" y="1825625"/>
+            <a:ext cx="3481070" cy="4351338"/>
+          </a:xfrm>
+        </p:spPr>
+      </p:pic>
       <p:sp>
         <p:nvSpPr>
           <p:cNvPr id="4" name="Date Placeholder 3">
@@ -4917,33 +4922,8 @@
           <a:p>
             <a:r>
               <a:rPr lang="en-US" dirty="0"/>
-              <a:t>WHITE NOISE</a:t>
-            </a:r>
-          </a:p>
-        </p:txBody>
-      </p:sp>
-      <p:sp>
-        <p:nvSpPr>
-          <p:cNvPr id="8" name="Content Placeholder 7">
-            <a:extLst>
-              <a:ext uri="{FF2B5EF4-FFF2-40B4-BE49-F238E27FC236}">
-                <a16:creationId xmlns:a16="http://schemas.microsoft.com/office/drawing/2014/main" id="{2BED3EB3-7E98-4A82-8335-7321D9E37B16}"/>
-              </a:ext>
-            </a:extLst>
-          </p:cNvPr>
-          <p:cNvSpPr>
-            <a:spLocks noGrp="1"/>
-          </p:cNvSpPr>
-          <p:nvPr>
-            <p:ph idx="1"/>
-          </p:nvPr>
-        </p:nvSpPr>
-        <p:spPr/>
-        <p:txBody>
-          <a:bodyPr/>
-          <a:lstStyle/>
-          <a:p>
-            <a:endParaRPr lang="en-US" dirty="0"/>
+              <a:t>LOOKING BACK AT IT</a:t>
+            </a:r>
           </a:p>
         </p:txBody>
       </p:sp>
@@ -5062,10 +5042,39 @@
           </a:p>
         </p:txBody>
       </p:sp>
+      <p:pic>
+        <p:nvPicPr>
+          <p:cNvPr id="10" name="Picture 9">
+            <a:extLst>
+              <a:ext uri="{FF2B5EF4-FFF2-40B4-BE49-F238E27FC236}">
+                <a16:creationId xmlns:a16="http://schemas.microsoft.com/office/drawing/2014/main" id="{33772C99-D8A9-48D3-AA08-A12DBDE89821}"/>
+              </a:ext>
+            </a:extLst>
+          </p:cNvPr>
+          <p:cNvPicPr>
+            <a:picLocks noChangeAspect="1"/>
+          </p:cNvPicPr>
+          <p:nvPr/>
+        </p:nvPicPr>
+        <p:blipFill>
+          <a:blip r:embed="rId2"/>
+          <a:srcRect/>
+          <a:stretch/>
+        </p:blipFill>
+        <p:spPr>
+          <a:xfrm>
+            <a:off x="2766309" y="1653161"/>
+            <a:ext cx="6732750" cy="4488500"/>
+          </a:xfrm>
+          <a:prstGeom prst="rect">
+            <a:avLst/>
+          </a:prstGeom>
+        </p:spPr>
+      </p:pic>
     </p:spTree>
     <p:extLst>
       <p:ext uri="{BB962C8B-B14F-4D97-AF65-F5344CB8AC3E}">
-        <p14:creationId xmlns:p14="http://schemas.microsoft.com/office/powerpoint/2010/main" val="4091772932"/>
+        <p14:creationId xmlns:p14="http://schemas.microsoft.com/office/powerpoint/2010/main" val="2868716087"/>
       </p:ext>
     </p:extLst>
   </p:cSld>
@@ -5097,7 +5106,7 @@
           <p:cNvPr id="7" name="Title 6">
             <a:extLst>
               <a:ext uri="{FF2B5EF4-FFF2-40B4-BE49-F238E27FC236}">
-                <a16:creationId xmlns:a16="http://schemas.microsoft.com/office/drawing/2014/main" id="{184E2338-1026-45D4-9455-B21A88F18B28}"/>
+                <a16:creationId xmlns:a16="http://schemas.microsoft.com/office/drawing/2014/main" id="{495B4BC0-844B-4414-A623-BEF78AAC1BA1}"/>
               </a:ext>
             </a:extLst>
           </p:cNvPr>
@@ -5115,42 +5124,41 @@
           <a:p>
             <a:r>
               <a:rPr lang="en-US" dirty="0"/>
-              <a:t>HOW TO MAKE YOUR</a:t>
-            </a:r>
-            <a:br>
+              <a:t>WHITE NOISE</a:t>
+            </a:r>
+          </a:p>
+        </p:txBody>
+      </p:sp>
+      <p:sp>
+        <p:nvSpPr>
+          <p:cNvPr id="8" name="Content Placeholder 7">
+            <a:extLst>
+              <a:ext uri="{FF2B5EF4-FFF2-40B4-BE49-F238E27FC236}">
+                <a16:creationId xmlns:a16="http://schemas.microsoft.com/office/drawing/2014/main" id="{2BED3EB3-7E98-4A82-8335-7321D9E37B16}"/>
+              </a:ext>
+            </a:extLst>
+          </p:cNvPr>
+          <p:cNvSpPr>
+            <a:spLocks noGrp="1"/>
+          </p:cNvSpPr>
+          <p:nvPr>
+            <p:ph idx="1"/>
+          </p:nvPr>
+        </p:nvSpPr>
+        <p:spPr/>
+        <p:txBody>
+          <a:bodyPr/>
+          <a:lstStyle/>
+          <a:p>
+            <a:r>
               <a:rPr lang="en-US" dirty="0"/>
-            </a:br>
+              <a:t>Not very easy to quantify, but the assumption is that there is some randomness we haven’t accounted for</a:t>
+            </a:r>
+          </a:p>
+          <a:p>
             <a:r>
               <a:rPr lang="en-US" dirty="0"/>
-              <a:t>DATA STATIONARY</a:t>
-            </a:r>
-          </a:p>
-        </p:txBody>
-      </p:sp>
-      <p:sp>
-        <p:nvSpPr>
-          <p:cNvPr id="8" name="Text Placeholder 7">
-            <a:extLst>
-              <a:ext uri="{FF2B5EF4-FFF2-40B4-BE49-F238E27FC236}">
-                <a16:creationId xmlns:a16="http://schemas.microsoft.com/office/drawing/2014/main" id="{DB42CCAB-C8E2-48A8-A9DF-EB0383A8B33C}"/>
-              </a:ext>
-            </a:extLst>
-          </p:cNvPr>
-          <p:cNvSpPr>
-            <a:spLocks noGrp="1"/>
-          </p:cNvSpPr>
-          <p:nvPr>
-            <p:ph type="body" idx="1"/>
-          </p:nvPr>
-        </p:nvSpPr>
-        <p:spPr/>
-        <p:txBody>
-          <a:bodyPr/>
-          <a:lstStyle/>
-          <a:p>
-            <a:r>
-              <a:rPr lang="en-US" dirty="0"/>
-              <a:t>Make your data appetizing for modeling</a:t>
+              <a:t>The statistician’s approach: assume this randomness behaves nicely so we can build some great models!</a:t>
             </a:r>
           </a:p>
         </p:txBody>
@@ -5160,7 +5168,7 @@
           <p:cNvPr id="4" name="Date Placeholder 3">
             <a:extLst>
               <a:ext uri="{FF2B5EF4-FFF2-40B4-BE49-F238E27FC236}">
-                <a16:creationId xmlns:a16="http://schemas.microsoft.com/office/drawing/2014/main" id="{1CA94ACB-62A5-4F09-8C21-F0CE9BFB1606}"/>
+                <a16:creationId xmlns:a16="http://schemas.microsoft.com/office/drawing/2014/main" id="{540F37F1-4F33-429F-A568-1A3ADC499E54}"/>
               </a:ext>
             </a:extLst>
           </p:cNvPr>
@@ -5176,7 +5184,7 @@
           <a:bodyPr/>
           <a:lstStyle/>
           <a:p>
-            <a:fld id="{8AAE40A0-A7D8-4DC3-BC9E-BADA32DA2004}" type="datetime4">
+            <a:fld id="{B08FEED8-D7D4-44E9-BFBC-ED06B5996D94}" type="datetime4">
               <a:rPr lang="en-US" smtClean="0"/>
               <a:t>July 29, 2019</a:t>
             </a:fld>
@@ -5189,7 +5197,7 @@
           <p:cNvPr id="5" name="Footer Placeholder 4">
             <a:extLst>
               <a:ext uri="{FF2B5EF4-FFF2-40B4-BE49-F238E27FC236}">
-                <a16:creationId xmlns:a16="http://schemas.microsoft.com/office/drawing/2014/main" id="{D20B02B0-893D-4696-B6F7-A126B8D18E99}"/>
+                <a16:creationId xmlns:a16="http://schemas.microsoft.com/office/drawing/2014/main" id="{673FFA57-C126-4795-A5F6-DD33AAC5ACBD}"/>
               </a:ext>
             </a:extLst>
           </p:cNvPr>
@@ -5246,7 +5254,7 @@
           <p:cNvPr id="6" name="Slide Number Placeholder 5">
             <a:extLst>
               <a:ext uri="{FF2B5EF4-FFF2-40B4-BE49-F238E27FC236}">
-                <a16:creationId xmlns:a16="http://schemas.microsoft.com/office/drawing/2014/main" id="{1CFDA495-0063-4571-8969-0DD770DB39E0}"/>
+                <a16:creationId xmlns:a16="http://schemas.microsoft.com/office/drawing/2014/main" id="{2FA49567-BB70-4798-8746-D0B522CCEE20}"/>
               </a:ext>
             </a:extLst>
           </p:cNvPr>
@@ -5273,7 +5281,7 @@
     </p:spTree>
     <p:extLst>
       <p:ext uri="{BB962C8B-B14F-4D97-AF65-F5344CB8AC3E}">
-        <p14:creationId xmlns:p14="http://schemas.microsoft.com/office/powerpoint/2010/main" val="3850339889"/>
+        <p14:creationId xmlns:p14="http://schemas.microsoft.com/office/powerpoint/2010/main" val="4091772932"/>
       </p:ext>
     </p:extLst>
   </p:cSld>
@@ -5305,7 +5313,7 @@
           <p:cNvPr id="7" name="Title 6">
             <a:extLst>
               <a:ext uri="{FF2B5EF4-FFF2-40B4-BE49-F238E27FC236}">
-                <a16:creationId xmlns:a16="http://schemas.microsoft.com/office/drawing/2014/main" id="{495B4BC0-844B-4414-A623-BEF78AAC1BA1}"/>
+                <a16:creationId xmlns:a16="http://schemas.microsoft.com/office/drawing/2014/main" id="{184E2338-1026-45D4-9455-B21A88F18B28}"/>
               </a:ext>
             </a:extLst>
           </p:cNvPr>
@@ -5323,33 +5331,43 @@
           <a:p>
             <a:r>
               <a:rPr lang="en-US" dirty="0"/>
-              <a:t>STATIONARITY</a:t>
-            </a:r>
-          </a:p>
-        </p:txBody>
-      </p:sp>
-      <p:sp>
-        <p:nvSpPr>
-          <p:cNvPr id="8" name="Content Placeholder 7">
-            <a:extLst>
-              <a:ext uri="{FF2B5EF4-FFF2-40B4-BE49-F238E27FC236}">
-                <a16:creationId xmlns:a16="http://schemas.microsoft.com/office/drawing/2014/main" id="{2BED3EB3-7E98-4A82-8335-7321D9E37B16}"/>
-              </a:ext>
-            </a:extLst>
-          </p:cNvPr>
-          <p:cNvSpPr>
-            <a:spLocks noGrp="1"/>
-          </p:cNvSpPr>
-          <p:nvPr>
-            <p:ph idx="1"/>
-          </p:nvPr>
-        </p:nvSpPr>
-        <p:spPr/>
-        <p:txBody>
-          <a:bodyPr/>
-          <a:lstStyle/>
-          <a:p>
-            <a:endParaRPr lang="en-US" dirty="0"/>
+              <a:t>HOW TO MAKE YOUR</a:t>
+            </a:r>
+            <a:br>
+              <a:rPr lang="en-US" dirty="0"/>
+            </a:br>
+            <a:r>
+              <a:rPr lang="en-US" dirty="0"/>
+              <a:t>DATA STATIONARY</a:t>
+            </a:r>
+          </a:p>
+        </p:txBody>
+      </p:sp>
+      <p:sp>
+        <p:nvSpPr>
+          <p:cNvPr id="8" name="Text Placeholder 7">
+            <a:extLst>
+              <a:ext uri="{FF2B5EF4-FFF2-40B4-BE49-F238E27FC236}">
+                <a16:creationId xmlns:a16="http://schemas.microsoft.com/office/drawing/2014/main" id="{DB42CCAB-C8E2-48A8-A9DF-EB0383A8B33C}"/>
+              </a:ext>
+            </a:extLst>
+          </p:cNvPr>
+          <p:cNvSpPr>
+            <a:spLocks noGrp="1"/>
+          </p:cNvSpPr>
+          <p:nvPr>
+            <p:ph type="body" idx="1"/>
+          </p:nvPr>
+        </p:nvSpPr>
+        <p:spPr/>
+        <p:txBody>
+          <a:bodyPr/>
+          <a:lstStyle/>
+          <a:p>
+            <a:r>
+              <a:rPr lang="en-US" dirty="0"/>
+              <a:t>Make your data appetizing for modeling</a:t>
+            </a:r>
           </a:p>
         </p:txBody>
       </p:sp>
@@ -5358,7 +5376,7 @@
           <p:cNvPr id="4" name="Date Placeholder 3">
             <a:extLst>
               <a:ext uri="{FF2B5EF4-FFF2-40B4-BE49-F238E27FC236}">
-                <a16:creationId xmlns:a16="http://schemas.microsoft.com/office/drawing/2014/main" id="{540F37F1-4F33-429F-A568-1A3ADC499E54}"/>
+                <a16:creationId xmlns:a16="http://schemas.microsoft.com/office/drawing/2014/main" id="{1CA94ACB-62A5-4F09-8C21-F0CE9BFB1606}"/>
               </a:ext>
             </a:extLst>
           </p:cNvPr>
@@ -5374,7 +5392,7 @@
           <a:bodyPr/>
           <a:lstStyle/>
           <a:p>
-            <a:fld id="{B08FEED8-D7D4-44E9-BFBC-ED06B5996D94}" type="datetime4">
+            <a:fld id="{8AAE40A0-A7D8-4DC3-BC9E-BADA32DA2004}" type="datetime4">
               <a:rPr lang="en-US" smtClean="0"/>
               <a:t>July 29, 2019</a:t>
             </a:fld>
@@ -5387,7 +5405,7 @@
           <p:cNvPr id="5" name="Footer Placeholder 4">
             <a:extLst>
               <a:ext uri="{FF2B5EF4-FFF2-40B4-BE49-F238E27FC236}">
-                <a16:creationId xmlns:a16="http://schemas.microsoft.com/office/drawing/2014/main" id="{673FFA57-C126-4795-A5F6-DD33AAC5ACBD}"/>
+                <a16:creationId xmlns:a16="http://schemas.microsoft.com/office/drawing/2014/main" id="{D20B02B0-893D-4696-B6F7-A126B8D18E99}"/>
               </a:ext>
             </a:extLst>
           </p:cNvPr>
@@ -5444,7 +5462,7 @@
           <p:cNvPr id="6" name="Slide Number Placeholder 5">
             <a:extLst>
               <a:ext uri="{FF2B5EF4-FFF2-40B4-BE49-F238E27FC236}">
-                <a16:creationId xmlns:a16="http://schemas.microsoft.com/office/drawing/2014/main" id="{2FA49567-BB70-4798-8746-D0B522CCEE20}"/>
+                <a16:creationId xmlns:a16="http://schemas.microsoft.com/office/drawing/2014/main" id="{1CFDA495-0063-4571-8969-0DD770DB39E0}"/>
               </a:ext>
             </a:extLst>
           </p:cNvPr>
@@ -5471,7 +5489,7 @@
     </p:spTree>
     <p:extLst>
       <p:ext uri="{BB962C8B-B14F-4D97-AF65-F5344CB8AC3E}">
-        <p14:creationId xmlns:p14="http://schemas.microsoft.com/office/powerpoint/2010/main" val="3590493067"/>
+        <p14:creationId xmlns:p14="http://schemas.microsoft.com/office/powerpoint/2010/main" val="3850339889"/>
       </p:ext>
     </p:extLst>
   </p:cSld>
@@ -5521,7 +5539,7 @@
           <a:p>
             <a:r>
               <a:rPr lang="en-US" dirty="0"/>
-              <a:t>DETRENDING</a:t>
+              <a:t>STATIONARITY</a:t>
             </a:r>
           </a:p>
         </p:txBody>
@@ -5669,7 +5687,7 @@
     </p:spTree>
     <p:extLst>
       <p:ext uri="{BB962C8B-B14F-4D97-AF65-F5344CB8AC3E}">
-        <p14:creationId xmlns:p14="http://schemas.microsoft.com/office/powerpoint/2010/main" val="4109370477"/>
+        <p14:creationId xmlns:p14="http://schemas.microsoft.com/office/powerpoint/2010/main" val="3590493067"/>
       </p:ext>
     </p:extLst>
   </p:cSld>
@@ -5698,10 +5716,10 @@
       </p:grpSpPr>
       <p:sp>
         <p:nvSpPr>
-          <p:cNvPr id="2" name="Title 1">
-            <a:extLst>
-              <a:ext uri="{FF2B5EF4-FFF2-40B4-BE49-F238E27FC236}">
-                <a16:creationId xmlns:a16="http://schemas.microsoft.com/office/drawing/2014/main" id="{A694862C-8B28-4EF5-9C6F-0187B05C2B03}"/>
+          <p:cNvPr id="7" name="Title 6">
+            <a:extLst>
+              <a:ext uri="{FF2B5EF4-FFF2-40B4-BE49-F238E27FC236}">
+                <a16:creationId xmlns:a16="http://schemas.microsoft.com/office/drawing/2014/main" id="{495B4BC0-844B-4414-A623-BEF78AAC1BA1}"/>
               </a:ext>
             </a:extLst>
           </p:cNvPr>
@@ -5719,17 +5737,17 @@
           <a:p>
             <a:r>
               <a:rPr lang="en-US" dirty="0"/>
-              <a:t>LAGGING</a:t>
-            </a:r>
-          </a:p>
-        </p:txBody>
-      </p:sp>
-      <p:sp>
-        <p:nvSpPr>
-          <p:cNvPr id="3" name="Content Placeholder 2">
-            <a:extLst>
-              <a:ext uri="{FF2B5EF4-FFF2-40B4-BE49-F238E27FC236}">
-                <a16:creationId xmlns:a16="http://schemas.microsoft.com/office/drawing/2014/main" id="{5DFC40A6-4344-46B7-89C4-4E16031C9B39}"/>
+              <a:t>DETRENDING</a:t>
+            </a:r>
+          </a:p>
+        </p:txBody>
+      </p:sp>
+      <p:sp>
+        <p:nvSpPr>
+          <p:cNvPr id="8" name="Content Placeholder 7">
+            <a:extLst>
+              <a:ext uri="{FF2B5EF4-FFF2-40B4-BE49-F238E27FC236}">
+                <a16:creationId xmlns:a16="http://schemas.microsoft.com/office/drawing/2014/main" id="{2BED3EB3-7E98-4A82-8335-7321D9E37B16}"/>
               </a:ext>
             </a:extLst>
           </p:cNvPr>
@@ -5745,7 +5763,7 @@
           <a:bodyPr/>
           <a:lstStyle/>
           <a:p>
-            <a:endParaRPr lang="en-US"/>
+            <a:endParaRPr lang="en-US" dirty="0"/>
           </a:p>
         </p:txBody>
       </p:sp>
@@ -5754,7 +5772,7 @@
           <p:cNvPr id="4" name="Date Placeholder 3">
             <a:extLst>
               <a:ext uri="{FF2B5EF4-FFF2-40B4-BE49-F238E27FC236}">
-                <a16:creationId xmlns:a16="http://schemas.microsoft.com/office/drawing/2014/main" id="{ADEE79BB-4734-4439-A76F-2976CABC29C1}"/>
+                <a16:creationId xmlns:a16="http://schemas.microsoft.com/office/drawing/2014/main" id="{540F37F1-4F33-429F-A568-1A3ADC499E54}"/>
               </a:ext>
             </a:extLst>
           </p:cNvPr>
@@ -5770,7 +5788,7 @@
           <a:bodyPr/>
           <a:lstStyle/>
           <a:p>
-            <a:fld id="{8AAE40A0-A7D8-4DC3-BC9E-BADA32DA2004}" type="datetime4">
+            <a:fld id="{B08FEED8-D7D4-44E9-BFBC-ED06B5996D94}" type="datetime4">
               <a:rPr lang="en-US" smtClean="0"/>
               <a:t>July 29, 2019</a:t>
             </a:fld>
@@ -5783,7 +5801,7 @@
           <p:cNvPr id="5" name="Footer Placeholder 4">
             <a:extLst>
               <a:ext uri="{FF2B5EF4-FFF2-40B4-BE49-F238E27FC236}">
-                <a16:creationId xmlns:a16="http://schemas.microsoft.com/office/drawing/2014/main" id="{14093F74-35B5-4B3E-BE77-B47F35290D05}"/>
+                <a16:creationId xmlns:a16="http://schemas.microsoft.com/office/drawing/2014/main" id="{673FFA57-C126-4795-A5F6-DD33AAC5ACBD}"/>
               </a:ext>
             </a:extLst>
           </p:cNvPr>
@@ -5840,7 +5858,7 @@
           <p:cNvPr id="6" name="Slide Number Placeholder 5">
             <a:extLst>
               <a:ext uri="{FF2B5EF4-FFF2-40B4-BE49-F238E27FC236}">
-                <a16:creationId xmlns:a16="http://schemas.microsoft.com/office/drawing/2014/main" id="{76F6E8AA-9A3E-467A-A16A-CED9E58CFA80}"/>
+                <a16:creationId xmlns:a16="http://schemas.microsoft.com/office/drawing/2014/main" id="{2FA49567-BB70-4798-8746-D0B522CCEE20}"/>
               </a:ext>
             </a:extLst>
           </p:cNvPr>
@@ -5867,7 +5885,7 @@
     </p:spTree>
     <p:extLst>
       <p:ext uri="{BB962C8B-B14F-4D97-AF65-F5344CB8AC3E}">
-        <p14:creationId xmlns:p14="http://schemas.microsoft.com/office/powerpoint/2010/main" val="3805551099"/>
+        <p14:creationId xmlns:p14="http://schemas.microsoft.com/office/powerpoint/2010/main" val="4109370477"/>
       </p:ext>
     </p:extLst>
   </p:cSld>
@@ -6062,7 +6080,7 @@
           <p:cNvPr id="2" name="Title 1">
             <a:extLst>
               <a:ext uri="{FF2B5EF4-FFF2-40B4-BE49-F238E27FC236}">
-                <a16:creationId xmlns:a16="http://schemas.microsoft.com/office/drawing/2014/main" id="{84FE5820-4288-4CB6-888A-5CBF5468888C}"/>
+                <a16:creationId xmlns:a16="http://schemas.microsoft.com/office/drawing/2014/main" id="{A694862C-8B28-4EF5-9C6F-0187B05C2B03}"/>
               </a:ext>
             </a:extLst>
           </p:cNvPr>
@@ -6080,7 +6098,7 @@
           <a:p>
             <a:r>
               <a:rPr lang="en-US" dirty="0"/>
-              <a:t>LAGGED SCATTERPLOTS</a:t>
+              <a:t>LAGGING</a:t>
             </a:r>
           </a:p>
         </p:txBody>
@@ -6090,7 +6108,7 @@
           <p:cNvPr id="3" name="Content Placeholder 2">
             <a:extLst>
               <a:ext uri="{FF2B5EF4-FFF2-40B4-BE49-F238E27FC236}">
-                <a16:creationId xmlns:a16="http://schemas.microsoft.com/office/drawing/2014/main" id="{2952943F-FC31-4BE3-AB00-BAB4B12957BE}"/>
+                <a16:creationId xmlns:a16="http://schemas.microsoft.com/office/drawing/2014/main" id="{5DFC40A6-4344-46B7-89C4-4E16031C9B39}"/>
               </a:ext>
             </a:extLst>
           </p:cNvPr>
@@ -6106,7 +6124,7 @@
           <a:bodyPr/>
           <a:lstStyle/>
           <a:p>
-            <a:endParaRPr lang="en-US" dirty="0"/>
+            <a:endParaRPr lang="en-US"/>
           </a:p>
         </p:txBody>
       </p:sp>
@@ -6115,7 +6133,7 @@
           <p:cNvPr id="4" name="Date Placeholder 3">
             <a:extLst>
               <a:ext uri="{FF2B5EF4-FFF2-40B4-BE49-F238E27FC236}">
-                <a16:creationId xmlns:a16="http://schemas.microsoft.com/office/drawing/2014/main" id="{F716348B-D7FE-46ED-8C48-CF5A55FF31CF}"/>
+                <a16:creationId xmlns:a16="http://schemas.microsoft.com/office/drawing/2014/main" id="{ADEE79BB-4734-4439-A76F-2976CABC29C1}"/>
               </a:ext>
             </a:extLst>
           </p:cNvPr>
@@ -6144,7 +6162,7 @@
           <p:cNvPr id="5" name="Footer Placeholder 4">
             <a:extLst>
               <a:ext uri="{FF2B5EF4-FFF2-40B4-BE49-F238E27FC236}">
-                <a16:creationId xmlns:a16="http://schemas.microsoft.com/office/drawing/2014/main" id="{34059279-A1E7-4F19-B4BF-8C6B59A4CEFF}"/>
+                <a16:creationId xmlns:a16="http://schemas.microsoft.com/office/drawing/2014/main" id="{14093F74-35B5-4B3E-BE77-B47F35290D05}"/>
               </a:ext>
             </a:extLst>
           </p:cNvPr>
@@ -6201,7 +6219,7 @@
           <p:cNvPr id="6" name="Slide Number Placeholder 5">
             <a:extLst>
               <a:ext uri="{FF2B5EF4-FFF2-40B4-BE49-F238E27FC236}">
-                <a16:creationId xmlns:a16="http://schemas.microsoft.com/office/drawing/2014/main" id="{DE722C41-7366-4DE2-9AF4-E75E189A7733}"/>
+                <a16:creationId xmlns:a16="http://schemas.microsoft.com/office/drawing/2014/main" id="{76F6E8AA-9A3E-467A-A16A-CED9E58CFA80}"/>
               </a:ext>
             </a:extLst>
           </p:cNvPr>
@@ -6228,7 +6246,7 @@
     </p:spTree>
     <p:extLst>
       <p:ext uri="{BB962C8B-B14F-4D97-AF65-F5344CB8AC3E}">
-        <p14:creationId xmlns:p14="http://schemas.microsoft.com/office/powerpoint/2010/main" val="2399367561"/>
+        <p14:creationId xmlns:p14="http://schemas.microsoft.com/office/powerpoint/2010/main" val="3805551099"/>
       </p:ext>
     </p:extLst>
   </p:cSld>
@@ -6257,10 +6275,10 @@
       </p:grpSpPr>
       <p:sp>
         <p:nvSpPr>
-          <p:cNvPr id="7" name="Title 6">
-            <a:extLst>
-              <a:ext uri="{FF2B5EF4-FFF2-40B4-BE49-F238E27FC236}">
-                <a16:creationId xmlns:a16="http://schemas.microsoft.com/office/drawing/2014/main" id="{7802FB34-7510-47BC-8952-A1FE9728B0BF}"/>
+          <p:cNvPr id="2" name="Title 1">
+            <a:extLst>
+              <a:ext uri="{FF2B5EF4-FFF2-40B4-BE49-F238E27FC236}">
+                <a16:creationId xmlns:a16="http://schemas.microsoft.com/office/drawing/2014/main" id="{84FE5820-4288-4CB6-888A-5CBF5468888C}"/>
               </a:ext>
             </a:extLst>
           </p:cNvPr>
@@ -6278,36 +6296,33 @@
           <a:p>
             <a:r>
               <a:rPr lang="en-US" dirty="0"/>
-              <a:t>ARIMA MODELS</a:t>
-            </a:r>
-          </a:p>
-        </p:txBody>
-      </p:sp>
-      <p:sp>
-        <p:nvSpPr>
-          <p:cNvPr id="8" name="Text Placeholder 7">
-            <a:extLst>
-              <a:ext uri="{FF2B5EF4-FFF2-40B4-BE49-F238E27FC236}">
-                <a16:creationId xmlns:a16="http://schemas.microsoft.com/office/drawing/2014/main" id="{FCA70F1A-579E-4144-AE97-14FFC08FF0F5}"/>
-              </a:ext>
-            </a:extLst>
-          </p:cNvPr>
-          <p:cNvSpPr>
-            <a:spLocks noGrp="1"/>
-          </p:cNvSpPr>
-          <p:nvPr>
-            <p:ph type="body" idx="1"/>
-          </p:nvPr>
-        </p:nvSpPr>
-        <p:spPr/>
-        <p:txBody>
-          <a:bodyPr/>
-          <a:lstStyle/>
-          <a:p>
-            <a:r>
-              <a:rPr lang="en-US" dirty="0"/>
-              <a:t>Interpretable, simple and speedy time series modeling</a:t>
-            </a:r>
+              <a:t>LAGGED SCATTERPLOTS</a:t>
+            </a:r>
+          </a:p>
+        </p:txBody>
+      </p:sp>
+      <p:sp>
+        <p:nvSpPr>
+          <p:cNvPr id="3" name="Content Placeholder 2">
+            <a:extLst>
+              <a:ext uri="{FF2B5EF4-FFF2-40B4-BE49-F238E27FC236}">
+                <a16:creationId xmlns:a16="http://schemas.microsoft.com/office/drawing/2014/main" id="{2952943F-FC31-4BE3-AB00-BAB4B12957BE}"/>
+              </a:ext>
+            </a:extLst>
+          </p:cNvPr>
+          <p:cNvSpPr>
+            <a:spLocks noGrp="1"/>
+          </p:cNvSpPr>
+          <p:nvPr>
+            <p:ph idx="1"/>
+          </p:nvPr>
+        </p:nvSpPr>
+        <p:spPr/>
+        <p:txBody>
+          <a:bodyPr/>
+          <a:lstStyle/>
+          <a:p>
+            <a:endParaRPr lang="en-US" dirty="0"/>
           </a:p>
         </p:txBody>
       </p:sp>
@@ -6316,7 +6331,7 @@
           <p:cNvPr id="4" name="Date Placeholder 3">
             <a:extLst>
               <a:ext uri="{FF2B5EF4-FFF2-40B4-BE49-F238E27FC236}">
-                <a16:creationId xmlns:a16="http://schemas.microsoft.com/office/drawing/2014/main" id="{3AD929EF-0967-4B34-81B8-24D9EF91892E}"/>
+                <a16:creationId xmlns:a16="http://schemas.microsoft.com/office/drawing/2014/main" id="{F716348B-D7FE-46ED-8C48-CF5A55FF31CF}"/>
               </a:ext>
             </a:extLst>
           </p:cNvPr>
@@ -6345,7 +6360,7 @@
           <p:cNvPr id="5" name="Footer Placeholder 4">
             <a:extLst>
               <a:ext uri="{FF2B5EF4-FFF2-40B4-BE49-F238E27FC236}">
-                <a16:creationId xmlns:a16="http://schemas.microsoft.com/office/drawing/2014/main" id="{3B5B35DD-F2EA-40D3-8039-8CD3802B2612}"/>
+                <a16:creationId xmlns:a16="http://schemas.microsoft.com/office/drawing/2014/main" id="{34059279-A1E7-4F19-B4BF-8C6B59A4CEFF}"/>
               </a:ext>
             </a:extLst>
           </p:cNvPr>
@@ -6402,7 +6417,7 @@
           <p:cNvPr id="6" name="Slide Number Placeholder 5">
             <a:extLst>
               <a:ext uri="{FF2B5EF4-FFF2-40B4-BE49-F238E27FC236}">
-                <a16:creationId xmlns:a16="http://schemas.microsoft.com/office/drawing/2014/main" id="{C3EB9A57-323C-47F5-867F-693F95A15FA4}"/>
+                <a16:creationId xmlns:a16="http://schemas.microsoft.com/office/drawing/2014/main" id="{DE722C41-7366-4DE2-9AF4-E75E189A7733}"/>
               </a:ext>
             </a:extLst>
           </p:cNvPr>
@@ -6429,7 +6444,7 @@
     </p:spTree>
     <p:extLst>
       <p:ext uri="{BB962C8B-B14F-4D97-AF65-F5344CB8AC3E}">
-        <p14:creationId xmlns:p14="http://schemas.microsoft.com/office/powerpoint/2010/main" val="107865345"/>
+        <p14:creationId xmlns:p14="http://schemas.microsoft.com/office/powerpoint/2010/main" val="2399367561"/>
       </p:ext>
     </p:extLst>
   </p:cSld>
@@ -6461,7 +6476,7 @@
           <p:cNvPr id="7" name="Title 6">
             <a:extLst>
               <a:ext uri="{FF2B5EF4-FFF2-40B4-BE49-F238E27FC236}">
-                <a16:creationId xmlns:a16="http://schemas.microsoft.com/office/drawing/2014/main" id="{75C0DCD3-95F8-4E1F-BF1A-5FAAB84A40A3}"/>
+                <a16:creationId xmlns:a16="http://schemas.microsoft.com/office/drawing/2014/main" id="{7802FB34-7510-47BC-8952-A1FE9728B0BF}"/>
               </a:ext>
             </a:extLst>
           </p:cNvPr>
@@ -6479,33 +6494,36 @@
           <a:p>
             <a:r>
               <a:rPr lang="en-US" dirty="0"/>
-              <a:t>ARIMA</a:t>
-            </a:r>
-          </a:p>
-        </p:txBody>
-      </p:sp>
-      <p:sp>
-        <p:nvSpPr>
-          <p:cNvPr id="8" name="Content Placeholder 7">
-            <a:extLst>
-              <a:ext uri="{FF2B5EF4-FFF2-40B4-BE49-F238E27FC236}">
-                <a16:creationId xmlns:a16="http://schemas.microsoft.com/office/drawing/2014/main" id="{52BB1FAB-BB61-4B66-A4EA-A0EABC2B3ECA}"/>
-              </a:ext>
-            </a:extLst>
-          </p:cNvPr>
-          <p:cNvSpPr>
-            <a:spLocks noGrp="1"/>
-          </p:cNvSpPr>
-          <p:nvPr>
-            <p:ph idx="1"/>
-          </p:nvPr>
-        </p:nvSpPr>
-        <p:spPr/>
-        <p:txBody>
-          <a:bodyPr/>
-          <a:lstStyle/>
-          <a:p>
-            <a:endParaRPr lang="en-US"/>
+              <a:t>ARIMA MODELS</a:t>
+            </a:r>
+          </a:p>
+        </p:txBody>
+      </p:sp>
+      <p:sp>
+        <p:nvSpPr>
+          <p:cNvPr id="8" name="Text Placeholder 7">
+            <a:extLst>
+              <a:ext uri="{FF2B5EF4-FFF2-40B4-BE49-F238E27FC236}">
+                <a16:creationId xmlns:a16="http://schemas.microsoft.com/office/drawing/2014/main" id="{FCA70F1A-579E-4144-AE97-14FFC08FF0F5}"/>
+              </a:ext>
+            </a:extLst>
+          </p:cNvPr>
+          <p:cNvSpPr>
+            <a:spLocks noGrp="1"/>
+          </p:cNvSpPr>
+          <p:nvPr>
+            <p:ph type="body" idx="1"/>
+          </p:nvPr>
+        </p:nvSpPr>
+        <p:spPr/>
+        <p:txBody>
+          <a:bodyPr/>
+          <a:lstStyle/>
+          <a:p>
+            <a:r>
+              <a:rPr lang="en-US" dirty="0"/>
+              <a:t>Interpretable, simple and speedy time series modeling</a:t>
+            </a:r>
           </a:p>
         </p:txBody>
       </p:sp>
@@ -6514,7 +6532,7 @@
           <p:cNvPr id="4" name="Date Placeholder 3">
             <a:extLst>
               <a:ext uri="{FF2B5EF4-FFF2-40B4-BE49-F238E27FC236}">
-                <a16:creationId xmlns:a16="http://schemas.microsoft.com/office/drawing/2014/main" id="{02256D86-7CE0-416E-B2A3-402D20EE9E90}"/>
+                <a16:creationId xmlns:a16="http://schemas.microsoft.com/office/drawing/2014/main" id="{3AD929EF-0967-4B34-81B8-24D9EF91892E}"/>
               </a:ext>
             </a:extLst>
           </p:cNvPr>
@@ -6530,7 +6548,7 @@
           <a:bodyPr/>
           <a:lstStyle/>
           <a:p>
-            <a:fld id="{B08FEED8-D7D4-44E9-BFBC-ED06B5996D94}" type="datetime4">
+            <a:fld id="{8AAE40A0-A7D8-4DC3-BC9E-BADA32DA2004}" type="datetime4">
               <a:rPr lang="en-US" smtClean="0"/>
               <a:t>July 29, 2019</a:t>
             </a:fld>
@@ -6543,7 +6561,7 @@
           <p:cNvPr id="5" name="Footer Placeholder 4">
             <a:extLst>
               <a:ext uri="{FF2B5EF4-FFF2-40B4-BE49-F238E27FC236}">
-                <a16:creationId xmlns:a16="http://schemas.microsoft.com/office/drawing/2014/main" id="{1D4ED112-7CF4-4BB9-B46E-B366A5054A9A}"/>
+                <a16:creationId xmlns:a16="http://schemas.microsoft.com/office/drawing/2014/main" id="{3B5B35DD-F2EA-40D3-8039-8CD3802B2612}"/>
               </a:ext>
             </a:extLst>
           </p:cNvPr>
@@ -6600,7 +6618,7 @@
           <p:cNvPr id="6" name="Slide Number Placeholder 5">
             <a:extLst>
               <a:ext uri="{FF2B5EF4-FFF2-40B4-BE49-F238E27FC236}">
-                <a16:creationId xmlns:a16="http://schemas.microsoft.com/office/drawing/2014/main" id="{8CC75551-85BF-4C9F-8893-AA28ECA8A6B5}"/>
+                <a16:creationId xmlns:a16="http://schemas.microsoft.com/office/drawing/2014/main" id="{C3EB9A57-323C-47F5-867F-693F95A15FA4}"/>
               </a:ext>
             </a:extLst>
           </p:cNvPr>
@@ -6627,7 +6645,7 @@
     </p:spTree>
     <p:extLst>
       <p:ext uri="{BB962C8B-B14F-4D97-AF65-F5344CB8AC3E}">
-        <p14:creationId xmlns:p14="http://schemas.microsoft.com/office/powerpoint/2010/main" val="1065550565"/>
+        <p14:creationId xmlns:p14="http://schemas.microsoft.com/office/powerpoint/2010/main" val="107865345"/>
       </p:ext>
     </p:extLst>
   </p:cSld>
@@ -6677,7 +6695,7 @@
           <a:p>
             <a:r>
               <a:rPr lang="en-US" dirty="0"/>
-              <a:t>AUTOREGRESSIVE</a:t>
+              <a:t>ARIMA</a:t>
             </a:r>
           </a:p>
         </p:txBody>
@@ -6825,7 +6843,7 @@
     </p:spTree>
     <p:extLst>
       <p:ext uri="{BB962C8B-B14F-4D97-AF65-F5344CB8AC3E}">
-        <p14:creationId xmlns:p14="http://schemas.microsoft.com/office/powerpoint/2010/main" val="4066560549"/>
+        <p14:creationId xmlns:p14="http://schemas.microsoft.com/office/powerpoint/2010/main" val="1065550565"/>
       </p:ext>
     </p:extLst>
   </p:cSld>
@@ -6854,10 +6872,10 @@
       </p:grpSpPr>
       <p:sp>
         <p:nvSpPr>
-          <p:cNvPr id="2" name="Title 1">
-            <a:extLst>
-              <a:ext uri="{FF2B5EF4-FFF2-40B4-BE49-F238E27FC236}">
-                <a16:creationId xmlns:a16="http://schemas.microsoft.com/office/drawing/2014/main" id="{D7EACF90-3E7B-4978-AB0C-ED5165419D19}"/>
+          <p:cNvPr id="7" name="Title 6">
+            <a:extLst>
+              <a:ext uri="{FF2B5EF4-FFF2-40B4-BE49-F238E27FC236}">
+                <a16:creationId xmlns:a16="http://schemas.microsoft.com/office/drawing/2014/main" id="{75C0DCD3-95F8-4E1F-BF1A-5FAAB84A40A3}"/>
               </a:ext>
             </a:extLst>
           </p:cNvPr>
@@ -6875,17 +6893,17 @@
           <a:p>
             <a:r>
               <a:rPr lang="en-US" dirty="0"/>
-              <a:t>MOVING AVERAGE</a:t>
-            </a:r>
-          </a:p>
-        </p:txBody>
-      </p:sp>
-      <p:sp>
-        <p:nvSpPr>
-          <p:cNvPr id="3" name="Content Placeholder 2">
-            <a:extLst>
-              <a:ext uri="{FF2B5EF4-FFF2-40B4-BE49-F238E27FC236}">
-                <a16:creationId xmlns:a16="http://schemas.microsoft.com/office/drawing/2014/main" id="{A7CEFEF5-E74A-4EFE-9368-8FD74B059E10}"/>
+              <a:t>AUTOREGRESSIVE</a:t>
+            </a:r>
+          </a:p>
+        </p:txBody>
+      </p:sp>
+      <p:sp>
+        <p:nvSpPr>
+          <p:cNvPr id="8" name="Content Placeholder 7">
+            <a:extLst>
+              <a:ext uri="{FF2B5EF4-FFF2-40B4-BE49-F238E27FC236}">
+                <a16:creationId xmlns:a16="http://schemas.microsoft.com/office/drawing/2014/main" id="{52BB1FAB-BB61-4B66-A4EA-A0EABC2B3ECA}"/>
               </a:ext>
             </a:extLst>
           </p:cNvPr>
@@ -6910,7 +6928,7 @@
           <p:cNvPr id="4" name="Date Placeholder 3">
             <a:extLst>
               <a:ext uri="{FF2B5EF4-FFF2-40B4-BE49-F238E27FC236}">
-                <a16:creationId xmlns:a16="http://schemas.microsoft.com/office/drawing/2014/main" id="{64E0A09F-EC7A-4EF6-AB3A-0DC48B1B7271}"/>
+                <a16:creationId xmlns:a16="http://schemas.microsoft.com/office/drawing/2014/main" id="{02256D86-7CE0-416E-B2A3-402D20EE9E90}"/>
               </a:ext>
             </a:extLst>
           </p:cNvPr>
@@ -6926,7 +6944,7 @@
           <a:bodyPr/>
           <a:lstStyle/>
           <a:p>
-            <a:fld id="{8AAE40A0-A7D8-4DC3-BC9E-BADA32DA2004}" type="datetime4">
+            <a:fld id="{B08FEED8-D7D4-44E9-BFBC-ED06B5996D94}" type="datetime4">
               <a:rPr lang="en-US" smtClean="0"/>
               <a:t>July 29, 2019</a:t>
             </a:fld>
@@ -6939,7 +6957,7 @@
           <p:cNvPr id="5" name="Footer Placeholder 4">
             <a:extLst>
               <a:ext uri="{FF2B5EF4-FFF2-40B4-BE49-F238E27FC236}">
-                <a16:creationId xmlns:a16="http://schemas.microsoft.com/office/drawing/2014/main" id="{9D8B7F07-2C50-4473-BABC-57C52FDD38D2}"/>
+                <a16:creationId xmlns:a16="http://schemas.microsoft.com/office/drawing/2014/main" id="{1D4ED112-7CF4-4BB9-B46E-B366A5054A9A}"/>
               </a:ext>
             </a:extLst>
           </p:cNvPr>
@@ -6996,7 +7014,7 @@
           <p:cNvPr id="6" name="Slide Number Placeholder 5">
             <a:extLst>
               <a:ext uri="{FF2B5EF4-FFF2-40B4-BE49-F238E27FC236}">
-                <a16:creationId xmlns:a16="http://schemas.microsoft.com/office/drawing/2014/main" id="{6BE5E43E-0696-4C60-A72C-BBB5B4448760}"/>
+                <a16:creationId xmlns:a16="http://schemas.microsoft.com/office/drawing/2014/main" id="{8CC75551-85BF-4C9F-8893-AA28ECA8A6B5}"/>
               </a:ext>
             </a:extLst>
           </p:cNvPr>
@@ -7023,7 +7041,7 @@
     </p:spTree>
     <p:extLst>
       <p:ext uri="{BB962C8B-B14F-4D97-AF65-F5344CB8AC3E}">
-        <p14:creationId xmlns:p14="http://schemas.microsoft.com/office/powerpoint/2010/main" val="3521777765"/>
+        <p14:creationId xmlns:p14="http://schemas.microsoft.com/office/powerpoint/2010/main" val="4066560549"/>
       </p:ext>
     </p:extLst>
   </p:cSld>
@@ -7055,7 +7073,7 @@
           <p:cNvPr id="2" name="Title 1">
             <a:extLst>
               <a:ext uri="{FF2B5EF4-FFF2-40B4-BE49-F238E27FC236}">
-                <a16:creationId xmlns:a16="http://schemas.microsoft.com/office/drawing/2014/main" id="{D1BF0482-6913-4A5E-A533-479864CB5349}"/>
+                <a16:creationId xmlns:a16="http://schemas.microsoft.com/office/drawing/2014/main" id="{D7EACF90-3E7B-4978-AB0C-ED5165419D19}"/>
               </a:ext>
             </a:extLst>
           </p:cNvPr>
@@ -7073,7 +7091,7 @@
           <a:p>
             <a:r>
               <a:rPr lang="en-US" dirty="0"/>
-              <a:t>PLAYING AROUND WITH ARIMA</a:t>
+              <a:t>MOVING AVERAGE</a:t>
             </a:r>
           </a:p>
         </p:txBody>
@@ -7083,7 +7101,7 @@
           <p:cNvPr id="3" name="Content Placeholder 2">
             <a:extLst>
               <a:ext uri="{FF2B5EF4-FFF2-40B4-BE49-F238E27FC236}">
-                <a16:creationId xmlns:a16="http://schemas.microsoft.com/office/drawing/2014/main" id="{D48271C9-2790-46C9-B80B-52D215430CB8}"/>
+                <a16:creationId xmlns:a16="http://schemas.microsoft.com/office/drawing/2014/main" id="{A7CEFEF5-E74A-4EFE-9368-8FD74B059E10}"/>
               </a:ext>
             </a:extLst>
           </p:cNvPr>
@@ -7108,7 +7126,7 @@
           <p:cNvPr id="4" name="Date Placeholder 3">
             <a:extLst>
               <a:ext uri="{FF2B5EF4-FFF2-40B4-BE49-F238E27FC236}">
-                <a16:creationId xmlns:a16="http://schemas.microsoft.com/office/drawing/2014/main" id="{B23DAF35-209C-48FA-AAAB-F69E14183A91}"/>
+                <a16:creationId xmlns:a16="http://schemas.microsoft.com/office/drawing/2014/main" id="{64E0A09F-EC7A-4EF6-AB3A-0DC48B1B7271}"/>
               </a:ext>
             </a:extLst>
           </p:cNvPr>
@@ -7137,7 +7155,7 @@
           <p:cNvPr id="5" name="Footer Placeholder 4">
             <a:extLst>
               <a:ext uri="{FF2B5EF4-FFF2-40B4-BE49-F238E27FC236}">
-                <a16:creationId xmlns:a16="http://schemas.microsoft.com/office/drawing/2014/main" id="{3D8E22A6-180D-41CF-9959-4347A11F2AD1}"/>
+                <a16:creationId xmlns:a16="http://schemas.microsoft.com/office/drawing/2014/main" id="{9D8B7F07-2C50-4473-BABC-57C52FDD38D2}"/>
               </a:ext>
             </a:extLst>
           </p:cNvPr>
@@ -7194,7 +7212,7 @@
           <p:cNvPr id="6" name="Slide Number Placeholder 5">
             <a:extLst>
               <a:ext uri="{FF2B5EF4-FFF2-40B4-BE49-F238E27FC236}">
-                <a16:creationId xmlns:a16="http://schemas.microsoft.com/office/drawing/2014/main" id="{CECE3146-0C2B-4CC7-BC7C-FD23AAF7ECAE}"/>
+                <a16:creationId xmlns:a16="http://schemas.microsoft.com/office/drawing/2014/main" id="{6BE5E43E-0696-4C60-A72C-BBB5B4448760}"/>
               </a:ext>
             </a:extLst>
           </p:cNvPr>
@@ -7221,7 +7239,7 @@
     </p:spTree>
     <p:extLst>
       <p:ext uri="{BB962C8B-B14F-4D97-AF65-F5344CB8AC3E}">
-        <p14:creationId xmlns:p14="http://schemas.microsoft.com/office/powerpoint/2010/main" val="3624540971"/>
+        <p14:creationId xmlns:p14="http://schemas.microsoft.com/office/powerpoint/2010/main" val="3521777765"/>
       </p:ext>
     </p:extLst>
   </p:cSld>
@@ -7250,10 +7268,10 @@
       </p:grpSpPr>
       <p:sp>
         <p:nvSpPr>
-          <p:cNvPr id="7" name="Title 6">
-            <a:extLst>
-              <a:ext uri="{FF2B5EF4-FFF2-40B4-BE49-F238E27FC236}">
-                <a16:creationId xmlns:a16="http://schemas.microsoft.com/office/drawing/2014/main" id="{495B4BC0-844B-4414-A623-BEF78AAC1BA1}"/>
+          <p:cNvPr id="2" name="Title 1">
+            <a:extLst>
+              <a:ext uri="{FF2B5EF4-FFF2-40B4-BE49-F238E27FC236}">
+                <a16:creationId xmlns:a16="http://schemas.microsoft.com/office/drawing/2014/main" id="{D1BF0482-6913-4A5E-A533-479864CB5349}"/>
               </a:ext>
             </a:extLst>
           </p:cNvPr>
@@ -7271,17 +7289,17 @@
           <a:p>
             <a:r>
               <a:rPr lang="en-US" dirty="0"/>
-              <a:t>ACKNOWLEDGMENTS</a:t>
-            </a:r>
-          </a:p>
-        </p:txBody>
-      </p:sp>
-      <p:sp>
-        <p:nvSpPr>
-          <p:cNvPr id="8" name="Content Placeholder 7">
-            <a:extLst>
-              <a:ext uri="{FF2B5EF4-FFF2-40B4-BE49-F238E27FC236}">
-                <a16:creationId xmlns:a16="http://schemas.microsoft.com/office/drawing/2014/main" id="{2BED3EB3-7E98-4A82-8335-7321D9E37B16}"/>
+              <a:t>PLAYING AROUND WITH ARIMA</a:t>
+            </a:r>
+          </a:p>
+        </p:txBody>
+      </p:sp>
+      <p:sp>
+        <p:nvSpPr>
+          <p:cNvPr id="3" name="Content Placeholder 2">
+            <a:extLst>
+              <a:ext uri="{FF2B5EF4-FFF2-40B4-BE49-F238E27FC236}">
+                <a16:creationId xmlns:a16="http://schemas.microsoft.com/office/drawing/2014/main" id="{D48271C9-2790-46C9-B80B-52D215430CB8}"/>
               </a:ext>
             </a:extLst>
           </p:cNvPr>
@@ -7306,7 +7324,7 @@
           <p:cNvPr id="4" name="Date Placeholder 3">
             <a:extLst>
               <a:ext uri="{FF2B5EF4-FFF2-40B4-BE49-F238E27FC236}">
-                <a16:creationId xmlns:a16="http://schemas.microsoft.com/office/drawing/2014/main" id="{540F37F1-4F33-429F-A568-1A3ADC499E54}"/>
+                <a16:creationId xmlns:a16="http://schemas.microsoft.com/office/drawing/2014/main" id="{B23DAF35-209C-48FA-AAAB-F69E14183A91}"/>
               </a:ext>
             </a:extLst>
           </p:cNvPr>
@@ -7322,7 +7340,7 @@
           <a:bodyPr/>
           <a:lstStyle/>
           <a:p>
-            <a:fld id="{B08FEED8-D7D4-44E9-BFBC-ED06B5996D94}" type="datetime4">
+            <a:fld id="{8AAE40A0-A7D8-4DC3-BC9E-BADA32DA2004}" type="datetime4">
               <a:rPr lang="en-US" smtClean="0"/>
               <a:t>July 29, 2019</a:t>
             </a:fld>
@@ -7335,7 +7353,7 @@
           <p:cNvPr id="5" name="Footer Placeholder 4">
             <a:extLst>
               <a:ext uri="{FF2B5EF4-FFF2-40B4-BE49-F238E27FC236}">
-                <a16:creationId xmlns:a16="http://schemas.microsoft.com/office/drawing/2014/main" id="{673FFA57-C126-4795-A5F6-DD33AAC5ACBD}"/>
+                <a16:creationId xmlns:a16="http://schemas.microsoft.com/office/drawing/2014/main" id="{3D8E22A6-180D-41CF-9959-4347A11F2AD1}"/>
               </a:ext>
             </a:extLst>
           </p:cNvPr>
@@ -7392,7 +7410,7 @@
           <p:cNvPr id="6" name="Slide Number Placeholder 5">
             <a:extLst>
               <a:ext uri="{FF2B5EF4-FFF2-40B4-BE49-F238E27FC236}">
-                <a16:creationId xmlns:a16="http://schemas.microsoft.com/office/drawing/2014/main" id="{2FA49567-BB70-4798-8746-D0B522CCEE20}"/>
+                <a16:creationId xmlns:a16="http://schemas.microsoft.com/office/drawing/2014/main" id="{CECE3146-0C2B-4CC7-BC7C-FD23AAF7ECAE}"/>
               </a:ext>
             </a:extLst>
           </p:cNvPr>
@@ -7411,6 +7429,204 @@
             <a:fld id="{D57F1E4F-1CFF-5643-939E-02111984F565}" type="slidenum">
               <a:rPr lang="en-US" smtClean="0"/>
               <a:t>26</a:t>
+            </a:fld>
+            <a:endParaRPr lang="en-US" dirty="0"/>
+          </a:p>
+        </p:txBody>
+      </p:sp>
+    </p:spTree>
+    <p:extLst>
+      <p:ext uri="{BB962C8B-B14F-4D97-AF65-F5344CB8AC3E}">
+        <p14:creationId xmlns:p14="http://schemas.microsoft.com/office/powerpoint/2010/main" val="3624540971"/>
+      </p:ext>
+    </p:extLst>
+  </p:cSld>
+  <p:clrMapOvr>
+    <a:masterClrMapping/>
+  </p:clrMapOvr>
+</p:sld>
+</file>
+
+<file path=ppt/slides/slide27.xml><?xml version="1.0" encoding="utf-8"?>
+<p:sld xmlns:a="http://schemas.openxmlformats.org/drawingml/2006/main" xmlns:r="http://schemas.openxmlformats.org/officeDocument/2006/relationships" xmlns:p="http://schemas.openxmlformats.org/presentationml/2006/main">
+  <p:cSld>
+    <p:spTree>
+      <p:nvGrpSpPr>
+        <p:cNvPr id="1" name=""/>
+        <p:cNvGrpSpPr/>
+        <p:nvPr/>
+      </p:nvGrpSpPr>
+      <p:grpSpPr>
+        <a:xfrm>
+          <a:off x="0" y="0"/>
+          <a:ext cx="0" cy="0"/>
+          <a:chOff x="0" y="0"/>
+          <a:chExt cx="0" cy="0"/>
+        </a:xfrm>
+      </p:grpSpPr>
+      <p:sp>
+        <p:nvSpPr>
+          <p:cNvPr id="7" name="Title 6">
+            <a:extLst>
+              <a:ext uri="{FF2B5EF4-FFF2-40B4-BE49-F238E27FC236}">
+                <a16:creationId xmlns:a16="http://schemas.microsoft.com/office/drawing/2014/main" id="{495B4BC0-844B-4414-A623-BEF78AAC1BA1}"/>
+              </a:ext>
+            </a:extLst>
+          </p:cNvPr>
+          <p:cNvSpPr>
+            <a:spLocks noGrp="1"/>
+          </p:cNvSpPr>
+          <p:nvPr>
+            <p:ph type="title"/>
+          </p:nvPr>
+        </p:nvSpPr>
+        <p:spPr/>
+        <p:txBody>
+          <a:bodyPr/>
+          <a:lstStyle/>
+          <a:p>
+            <a:r>
+              <a:rPr lang="en-US" dirty="0"/>
+              <a:t>ACKNOWLEDGMENTS</a:t>
+            </a:r>
+          </a:p>
+        </p:txBody>
+      </p:sp>
+      <p:sp>
+        <p:nvSpPr>
+          <p:cNvPr id="8" name="Content Placeholder 7">
+            <a:extLst>
+              <a:ext uri="{FF2B5EF4-FFF2-40B4-BE49-F238E27FC236}">
+                <a16:creationId xmlns:a16="http://schemas.microsoft.com/office/drawing/2014/main" id="{2BED3EB3-7E98-4A82-8335-7321D9E37B16}"/>
+              </a:ext>
+            </a:extLst>
+          </p:cNvPr>
+          <p:cNvSpPr>
+            <a:spLocks noGrp="1"/>
+          </p:cNvSpPr>
+          <p:nvPr>
+            <p:ph idx="1"/>
+          </p:nvPr>
+        </p:nvSpPr>
+        <p:spPr/>
+        <p:txBody>
+          <a:bodyPr/>
+          <a:lstStyle/>
+          <a:p>
+            <a:endParaRPr lang="en-US"/>
+          </a:p>
+        </p:txBody>
+      </p:sp>
+      <p:sp>
+        <p:nvSpPr>
+          <p:cNvPr id="4" name="Date Placeholder 3">
+            <a:extLst>
+              <a:ext uri="{FF2B5EF4-FFF2-40B4-BE49-F238E27FC236}">
+                <a16:creationId xmlns:a16="http://schemas.microsoft.com/office/drawing/2014/main" id="{540F37F1-4F33-429F-A568-1A3ADC499E54}"/>
+              </a:ext>
+            </a:extLst>
+          </p:cNvPr>
+          <p:cNvSpPr>
+            <a:spLocks noGrp="1"/>
+          </p:cNvSpPr>
+          <p:nvPr>
+            <p:ph type="dt" sz="half" idx="10"/>
+          </p:nvPr>
+        </p:nvSpPr>
+        <p:spPr/>
+        <p:txBody>
+          <a:bodyPr/>
+          <a:lstStyle/>
+          <a:p>
+            <a:fld id="{B08FEED8-D7D4-44E9-BFBC-ED06B5996D94}" type="datetime4">
+              <a:rPr lang="en-US" smtClean="0"/>
+              <a:t>July 29, 2019</a:t>
+            </a:fld>
+            <a:endParaRPr lang="en-US" dirty="0"/>
+          </a:p>
+        </p:txBody>
+      </p:sp>
+      <p:sp>
+        <p:nvSpPr>
+          <p:cNvPr id="5" name="Footer Placeholder 4">
+            <a:extLst>
+              <a:ext uri="{FF2B5EF4-FFF2-40B4-BE49-F238E27FC236}">
+                <a16:creationId xmlns:a16="http://schemas.microsoft.com/office/drawing/2014/main" id="{673FFA57-C126-4795-A5F6-DD33AAC5ACBD}"/>
+              </a:ext>
+            </a:extLst>
+          </p:cNvPr>
+          <p:cNvSpPr>
+            <a:spLocks noGrp="1"/>
+          </p:cNvSpPr>
+          <p:nvPr>
+            <p:ph type="ftr" sz="quarter" idx="11"/>
+          </p:nvPr>
+        </p:nvSpPr>
+        <p:spPr/>
+        <p:txBody>
+          <a:bodyPr/>
+          <a:lstStyle/>
+          <a:p>
+            <a:r>
+              <a:rPr lang="en-US"/>
+              <a:t>Digital Scholarship Services </a:t>
+            </a:r>
+            <a:r>
+              <a:rPr lang="en-US">
+                <a:solidFill>
+                  <a:schemeClr val="accent1">
+                    <a:lumMod val="50000"/>
+                  </a:schemeClr>
+                </a:solidFill>
+              </a:rPr>
+              <a:t>| Email</a:t>
+            </a:r>
+            <a:r>
+              <a:rPr lang="en-US"/>
+              <a:t> cf24@rice.edu </a:t>
+            </a:r>
+            <a:r>
+              <a:rPr lang="en-US">
+                <a:solidFill>
+                  <a:schemeClr val="accent1">
+                    <a:lumMod val="50000"/>
+                  </a:schemeClr>
+                </a:solidFill>
+              </a:rPr>
+              <a:t>|</a:t>
+            </a:r>
+            <a:r>
+              <a:rPr lang="en-US"/>
+              <a:t> library.rice.edu/dss</a:t>
+            </a:r>
+            <a:endParaRPr lang="en-US" dirty="0"/>
+          </a:p>
+        </p:txBody>
+      </p:sp>
+      <p:sp>
+        <p:nvSpPr>
+          <p:cNvPr id="6" name="Slide Number Placeholder 5">
+            <a:extLst>
+              <a:ext uri="{FF2B5EF4-FFF2-40B4-BE49-F238E27FC236}">
+                <a16:creationId xmlns:a16="http://schemas.microsoft.com/office/drawing/2014/main" id="{2FA49567-BB70-4798-8746-D0B522CCEE20}"/>
+              </a:ext>
+            </a:extLst>
+          </p:cNvPr>
+          <p:cNvSpPr>
+            <a:spLocks noGrp="1"/>
+          </p:cNvSpPr>
+          <p:nvPr>
+            <p:ph type="sldNum" sz="quarter" idx="12"/>
+          </p:nvPr>
+        </p:nvSpPr>
+        <p:spPr/>
+        <p:txBody>
+          <a:bodyPr/>
+          <a:lstStyle/>
+          <a:p>
+            <a:fld id="{D57F1E4F-1CFF-5643-939E-02111984F565}" type="slidenum">
+              <a:rPr lang="en-US" smtClean="0"/>
+              <a:t>27</a:t>
             </a:fld>
             <a:endParaRPr lang="en-US" dirty="0"/>
           </a:p>

</xml_diff>

<commit_message>
added explanations of arima and pros/cons of models
</commit_message>
<xml_diff>
--- a/tsa/Introduction to Time Series Analysis.pptx
+++ b/tsa/Introduction to Time Series Analysis.pptx
@@ -5,7 +5,7 @@
     <p:sldMasterId id="2147483707" r:id="rId1"/>
   </p:sldMasterIdLst>
   <p:notesMasterIdLst>
-    <p:notesMasterId r:id="rId29"/>
+    <p:notesMasterId r:id="rId41"/>
   </p:notesMasterIdLst>
   <p:sldIdLst>
     <p:sldId id="266" r:id="rId2"/>
@@ -27,14 +27,26 @@
     <p:sldId id="273" r:id="rId18"/>
     <p:sldId id="274" r:id="rId19"/>
     <p:sldId id="275" r:id="rId20"/>
-    <p:sldId id="279" r:id="rId21"/>
-    <p:sldId id="280" r:id="rId22"/>
-    <p:sldId id="281" r:id="rId23"/>
-    <p:sldId id="282" r:id="rId24"/>
-    <p:sldId id="283" r:id="rId25"/>
-    <p:sldId id="284" r:id="rId26"/>
-    <p:sldId id="285" r:id="rId27"/>
-    <p:sldId id="268" r:id="rId28"/>
+    <p:sldId id="297" r:id="rId21"/>
+    <p:sldId id="298" r:id="rId22"/>
+    <p:sldId id="279" r:id="rId23"/>
+    <p:sldId id="301" r:id="rId24"/>
+    <p:sldId id="302" r:id="rId25"/>
+    <p:sldId id="303" r:id="rId26"/>
+    <p:sldId id="280" r:id="rId27"/>
+    <p:sldId id="304" r:id="rId28"/>
+    <p:sldId id="281" r:id="rId29"/>
+    <p:sldId id="282" r:id="rId30"/>
+    <p:sldId id="283" r:id="rId31"/>
+    <p:sldId id="284" r:id="rId32"/>
+    <p:sldId id="299" r:id="rId33"/>
+    <p:sldId id="300" r:id="rId34"/>
+    <p:sldId id="285" r:id="rId35"/>
+    <p:sldId id="305" r:id="rId36"/>
+    <p:sldId id="307" r:id="rId37"/>
+    <p:sldId id="306" r:id="rId38"/>
+    <p:sldId id="309" r:id="rId39"/>
+    <p:sldId id="268" r:id="rId40"/>
   </p:sldIdLst>
   <p:sldSz cx="12192000" cy="6858000"/>
   <p:notesSz cx="6858000" cy="9144000"/>
@@ -5539,7 +5551,7 @@
           <a:p>
             <a:r>
               <a:rPr lang="en-US" dirty="0"/>
-              <a:t>STATIONARITY</a:t>
+              <a:t>WHAT IS STATIONARY DATA?</a:t>
             </a:r>
           </a:p>
         </p:txBody>
@@ -5564,6 +5576,19 @@
         <p:txBody>
           <a:bodyPr/>
           <a:lstStyle/>
+          <a:p>
+            <a:r>
+              <a:rPr lang="en-US" dirty="0"/>
+              <a:t>Intuitively, it doesn’t matter where you are in the series</a:t>
+            </a:r>
+          </a:p>
+          <a:p>
+            <a:pPr lvl="1"/>
+            <a:r>
+              <a:rPr lang="en-US" dirty="0"/>
+              <a:t>If it’s Monday or Friday, you can model it the same way</a:t>
+            </a:r>
+          </a:p>
           <a:p>
             <a:endParaRPr lang="en-US" dirty="0"/>
           </a:p>
@@ -5763,7 +5788,10 @@
           <a:bodyPr/>
           <a:lstStyle/>
           <a:p>
-            <a:endParaRPr lang="en-US" dirty="0"/>
+            <a:r>
+              <a:rPr lang="en-US" dirty="0"/>
+              <a:t>Subtracting our estimate of the data looking at trend only</a:t>
+            </a:r>
           </a:p>
         </p:txBody>
       </p:sp>
@@ -6077,10 +6105,10 @@
       </p:grpSpPr>
       <p:sp>
         <p:nvSpPr>
-          <p:cNvPr id="2" name="Title 1">
-            <a:extLst>
-              <a:ext uri="{FF2B5EF4-FFF2-40B4-BE49-F238E27FC236}">
-                <a16:creationId xmlns:a16="http://schemas.microsoft.com/office/drawing/2014/main" id="{A694862C-8B28-4EF5-9C6F-0187B05C2B03}"/>
+          <p:cNvPr id="7" name="Title 6">
+            <a:extLst>
+              <a:ext uri="{FF2B5EF4-FFF2-40B4-BE49-F238E27FC236}">
+                <a16:creationId xmlns:a16="http://schemas.microsoft.com/office/drawing/2014/main" id="{495B4BC0-844B-4414-A623-BEF78AAC1BA1}"/>
               </a:ext>
             </a:extLst>
           </p:cNvPr>
@@ -6098,17 +6126,17 @@
           <a:p>
             <a:r>
               <a:rPr lang="en-US" dirty="0"/>
-              <a:t>LAGGING</a:t>
-            </a:r>
-          </a:p>
-        </p:txBody>
-      </p:sp>
-      <p:sp>
-        <p:nvSpPr>
-          <p:cNvPr id="3" name="Content Placeholder 2">
-            <a:extLst>
-              <a:ext uri="{FF2B5EF4-FFF2-40B4-BE49-F238E27FC236}">
-                <a16:creationId xmlns:a16="http://schemas.microsoft.com/office/drawing/2014/main" id="{5DFC40A6-4344-46B7-89C4-4E16031C9B39}"/>
+              <a:t>DETRENDING EXAMPLE</a:t>
+            </a:r>
+          </a:p>
+        </p:txBody>
+      </p:sp>
+      <p:sp>
+        <p:nvSpPr>
+          <p:cNvPr id="8" name="Content Placeholder 7">
+            <a:extLst>
+              <a:ext uri="{FF2B5EF4-FFF2-40B4-BE49-F238E27FC236}">
+                <a16:creationId xmlns:a16="http://schemas.microsoft.com/office/drawing/2014/main" id="{2BED3EB3-7E98-4A82-8335-7321D9E37B16}"/>
               </a:ext>
             </a:extLst>
           </p:cNvPr>
@@ -6124,7 +6152,10 @@
           <a:bodyPr/>
           <a:lstStyle/>
           <a:p>
-            <a:endParaRPr lang="en-US"/>
+            <a:r>
+              <a:rPr lang="en-US" dirty="0"/>
+              <a:t>Subtracting our estimate of the data looking at trend only</a:t>
+            </a:r>
           </a:p>
         </p:txBody>
       </p:sp>
@@ -6133,7 +6164,7 @@
           <p:cNvPr id="4" name="Date Placeholder 3">
             <a:extLst>
               <a:ext uri="{FF2B5EF4-FFF2-40B4-BE49-F238E27FC236}">
-                <a16:creationId xmlns:a16="http://schemas.microsoft.com/office/drawing/2014/main" id="{ADEE79BB-4734-4439-A76F-2976CABC29C1}"/>
+                <a16:creationId xmlns:a16="http://schemas.microsoft.com/office/drawing/2014/main" id="{540F37F1-4F33-429F-A568-1A3ADC499E54}"/>
               </a:ext>
             </a:extLst>
           </p:cNvPr>
@@ -6149,7 +6180,7 @@
           <a:bodyPr/>
           <a:lstStyle/>
           <a:p>
-            <a:fld id="{8AAE40A0-A7D8-4DC3-BC9E-BADA32DA2004}" type="datetime4">
+            <a:fld id="{B08FEED8-D7D4-44E9-BFBC-ED06B5996D94}" type="datetime4">
               <a:rPr lang="en-US" smtClean="0"/>
               <a:t>July 29, 2019</a:t>
             </a:fld>
@@ -6162,7 +6193,7 @@
           <p:cNvPr id="5" name="Footer Placeholder 4">
             <a:extLst>
               <a:ext uri="{FF2B5EF4-FFF2-40B4-BE49-F238E27FC236}">
-                <a16:creationId xmlns:a16="http://schemas.microsoft.com/office/drawing/2014/main" id="{14093F74-35B5-4B3E-BE77-B47F35290D05}"/>
+                <a16:creationId xmlns:a16="http://schemas.microsoft.com/office/drawing/2014/main" id="{673FFA57-C126-4795-A5F6-DD33AAC5ACBD}"/>
               </a:ext>
             </a:extLst>
           </p:cNvPr>
@@ -6219,7 +6250,7 @@
           <p:cNvPr id="6" name="Slide Number Placeholder 5">
             <a:extLst>
               <a:ext uri="{FF2B5EF4-FFF2-40B4-BE49-F238E27FC236}">
-                <a16:creationId xmlns:a16="http://schemas.microsoft.com/office/drawing/2014/main" id="{76F6E8AA-9A3E-467A-A16A-CED9E58CFA80}"/>
+                <a16:creationId xmlns:a16="http://schemas.microsoft.com/office/drawing/2014/main" id="{2FA49567-BB70-4798-8746-D0B522CCEE20}"/>
               </a:ext>
             </a:extLst>
           </p:cNvPr>
@@ -6243,10 +6274,70 @@
           </a:p>
         </p:txBody>
       </p:sp>
+      <p:pic>
+        <p:nvPicPr>
+          <p:cNvPr id="3" name="Picture 2" descr="A picture containing object, wall&#10;&#10;Description automatically generated">
+            <a:extLst>
+              <a:ext uri="{FF2B5EF4-FFF2-40B4-BE49-F238E27FC236}">
+                <a16:creationId xmlns:a16="http://schemas.microsoft.com/office/drawing/2014/main" id="{81D79DD3-1A23-4425-93AB-C2F4AD2C0EFE}"/>
+              </a:ext>
+            </a:extLst>
+          </p:cNvPr>
+          <p:cNvPicPr>
+            <a:picLocks noChangeAspect="1"/>
+          </p:cNvPicPr>
+          <p:nvPr/>
+        </p:nvPicPr>
+        <p:blipFill>
+          <a:blip r:embed="rId2"/>
+          <a:stretch>
+            <a:fillRect/>
+          </a:stretch>
+        </p:blipFill>
+        <p:spPr>
+          <a:xfrm>
+            <a:off x="6191250" y="2366431"/>
+            <a:ext cx="5715798" cy="3810532"/>
+          </a:xfrm>
+          <a:prstGeom prst="rect">
+            <a:avLst/>
+          </a:prstGeom>
+        </p:spPr>
+      </p:pic>
+      <p:pic>
+        <p:nvPicPr>
+          <p:cNvPr id="10" name="Picture 9" descr="A picture containing object, wall&#10;&#10;Description automatically generated">
+            <a:extLst>
+              <a:ext uri="{FF2B5EF4-FFF2-40B4-BE49-F238E27FC236}">
+                <a16:creationId xmlns:a16="http://schemas.microsoft.com/office/drawing/2014/main" id="{4DB675E2-5136-47EF-A8E1-1A96E56E602A}"/>
+              </a:ext>
+            </a:extLst>
+          </p:cNvPr>
+          <p:cNvPicPr>
+            <a:picLocks noChangeAspect="1"/>
+          </p:cNvPicPr>
+          <p:nvPr/>
+        </p:nvPicPr>
+        <p:blipFill>
+          <a:blip r:embed="rId3"/>
+          <a:stretch>
+            <a:fillRect/>
+          </a:stretch>
+        </p:blipFill>
+        <p:spPr>
+          <a:xfrm>
+            <a:off x="180975" y="2366431"/>
+            <a:ext cx="5715798" cy="3810532"/>
+          </a:xfrm>
+          <a:prstGeom prst="rect">
+            <a:avLst/>
+          </a:prstGeom>
+        </p:spPr>
+      </p:pic>
     </p:spTree>
     <p:extLst>
       <p:ext uri="{BB962C8B-B14F-4D97-AF65-F5344CB8AC3E}">
-        <p14:creationId xmlns:p14="http://schemas.microsoft.com/office/powerpoint/2010/main" val="3805551099"/>
+        <p14:creationId xmlns:p14="http://schemas.microsoft.com/office/powerpoint/2010/main" val="694590929"/>
       </p:ext>
     </p:extLst>
   </p:cSld>
@@ -6275,10 +6366,10 @@
       </p:grpSpPr>
       <p:sp>
         <p:nvSpPr>
-          <p:cNvPr id="2" name="Title 1">
-            <a:extLst>
-              <a:ext uri="{FF2B5EF4-FFF2-40B4-BE49-F238E27FC236}">
-                <a16:creationId xmlns:a16="http://schemas.microsoft.com/office/drawing/2014/main" id="{84FE5820-4288-4CB6-888A-5CBF5468888C}"/>
+          <p:cNvPr id="7" name="Title 6">
+            <a:extLst>
+              <a:ext uri="{FF2B5EF4-FFF2-40B4-BE49-F238E27FC236}">
+                <a16:creationId xmlns:a16="http://schemas.microsoft.com/office/drawing/2014/main" id="{495B4BC0-844B-4414-A623-BEF78AAC1BA1}"/>
               </a:ext>
             </a:extLst>
           </p:cNvPr>
@@ -6296,17 +6387,17 @@
           <a:p>
             <a:r>
               <a:rPr lang="en-US" dirty="0"/>
-              <a:t>LAGGED SCATTERPLOTS</a:t>
-            </a:r>
-          </a:p>
-        </p:txBody>
-      </p:sp>
-      <p:sp>
-        <p:nvSpPr>
-          <p:cNvPr id="3" name="Content Placeholder 2">
-            <a:extLst>
-              <a:ext uri="{FF2B5EF4-FFF2-40B4-BE49-F238E27FC236}">
-                <a16:creationId xmlns:a16="http://schemas.microsoft.com/office/drawing/2014/main" id="{2952943F-FC31-4BE3-AB00-BAB4B12957BE}"/>
+              <a:t>DETRENDING</a:t>
+            </a:r>
+          </a:p>
+        </p:txBody>
+      </p:sp>
+      <p:sp>
+        <p:nvSpPr>
+          <p:cNvPr id="8" name="Content Placeholder 7">
+            <a:extLst>
+              <a:ext uri="{FF2B5EF4-FFF2-40B4-BE49-F238E27FC236}">
+                <a16:creationId xmlns:a16="http://schemas.microsoft.com/office/drawing/2014/main" id="{2BED3EB3-7E98-4A82-8335-7321D9E37B16}"/>
               </a:ext>
             </a:extLst>
           </p:cNvPr>
@@ -6322,7 +6413,44 @@
           <a:bodyPr/>
           <a:lstStyle/>
           <a:p>
-            <a:endParaRPr lang="en-US" dirty="0"/>
+            <a:r>
+              <a:rPr lang="en-US" dirty="0"/>
+              <a:t>Subtracting our estimate of the data looking at trend only</a:t>
+            </a:r>
+          </a:p>
+          <a:p>
+            <a:r>
+              <a:rPr lang="en-US" dirty="0"/>
+              <a:t>But where do we get the trend from?</a:t>
+            </a:r>
+          </a:p>
+          <a:p>
+            <a:pPr lvl="1"/>
+            <a:r>
+              <a:rPr lang="en-US" dirty="0"/>
+              <a:t>We have to estimate it ourselves!</a:t>
+            </a:r>
+          </a:p>
+          <a:p>
+            <a:pPr lvl="1"/>
+            <a:r>
+              <a:rPr lang="en-US" dirty="0"/>
+              <a:t>What kind of trend is it? Trends don’t have to be linear!</a:t>
+            </a:r>
+          </a:p>
+          <a:p>
+            <a:pPr lvl="1"/>
+            <a:r>
+              <a:rPr lang="en-US" dirty="0"/>
+              <a:t>Something else that could go wrong…</a:t>
+            </a:r>
+          </a:p>
+          <a:p>
+            <a:pPr lvl="1"/>
+            <a:r>
+              <a:rPr lang="en-US" dirty="0"/>
+              <a:t>Can we do better?</a:t>
+            </a:r>
           </a:p>
         </p:txBody>
       </p:sp>
@@ -6331,7 +6459,7 @@
           <p:cNvPr id="4" name="Date Placeholder 3">
             <a:extLst>
               <a:ext uri="{FF2B5EF4-FFF2-40B4-BE49-F238E27FC236}">
-                <a16:creationId xmlns:a16="http://schemas.microsoft.com/office/drawing/2014/main" id="{F716348B-D7FE-46ED-8C48-CF5A55FF31CF}"/>
+                <a16:creationId xmlns:a16="http://schemas.microsoft.com/office/drawing/2014/main" id="{540F37F1-4F33-429F-A568-1A3ADC499E54}"/>
               </a:ext>
             </a:extLst>
           </p:cNvPr>
@@ -6347,7 +6475,7 @@
           <a:bodyPr/>
           <a:lstStyle/>
           <a:p>
-            <a:fld id="{8AAE40A0-A7D8-4DC3-BC9E-BADA32DA2004}" type="datetime4">
+            <a:fld id="{B08FEED8-D7D4-44E9-BFBC-ED06B5996D94}" type="datetime4">
               <a:rPr lang="en-US" smtClean="0"/>
               <a:t>July 29, 2019</a:t>
             </a:fld>
@@ -6360,7 +6488,7 @@
           <p:cNvPr id="5" name="Footer Placeholder 4">
             <a:extLst>
               <a:ext uri="{FF2B5EF4-FFF2-40B4-BE49-F238E27FC236}">
-                <a16:creationId xmlns:a16="http://schemas.microsoft.com/office/drawing/2014/main" id="{34059279-A1E7-4F19-B4BF-8C6B59A4CEFF}"/>
+                <a16:creationId xmlns:a16="http://schemas.microsoft.com/office/drawing/2014/main" id="{673FFA57-C126-4795-A5F6-DD33AAC5ACBD}"/>
               </a:ext>
             </a:extLst>
           </p:cNvPr>
@@ -6417,7 +6545,7 @@
           <p:cNvPr id="6" name="Slide Number Placeholder 5">
             <a:extLst>
               <a:ext uri="{FF2B5EF4-FFF2-40B4-BE49-F238E27FC236}">
-                <a16:creationId xmlns:a16="http://schemas.microsoft.com/office/drawing/2014/main" id="{DE722C41-7366-4DE2-9AF4-E75E189A7733}"/>
+                <a16:creationId xmlns:a16="http://schemas.microsoft.com/office/drawing/2014/main" id="{2FA49567-BB70-4798-8746-D0B522CCEE20}"/>
               </a:ext>
             </a:extLst>
           </p:cNvPr>
@@ -6444,7 +6572,7 @@
     </p:spTree>
     <p:extLst>
       <p:ext uri="{BB962C8B-B14F-4D97-AF65-F5344CB8AC3E}">
-        <p14:creationId xmlns:p14="http://schemas.microsoft.com/office/powerpoint/2010/main" val="2399367561"/>
+        <p14:creationId xmlns:p14="http://schemas.microsoft.com/office/powerpoint/2010/main" val="2882473015"/>
       </p:ext>
     </p:extLst>
   </p:cSld>
@@ -6473,10 +6601,10 @@
       </p:grpSpPr>
       <p:sp>
         <p:nvSpPr>
-          <p:cNvPr id="7" name="Title 6">
-            <a:extLst>
-              <a:ext uri="{FF2B5EF4-FFF2-40B4-BE49-F238E27FC236}">
-                <a16:creationId xmlns:a16="http://schemas.microsoft.com/office/drawing/2014/main" id="{7802FB34-7510-47BC-8952-A1FE9728B0BF}"/>
+          <p:cNvPr id="2" name="Title 1">
+            <a:extLst>
+              <a:ext uri="{FF2B5EF4-FFF2-40B4-BE49-F238E27FC236}">
+                <a16:creationId xmlns:a16="http://schemas.microsoft.com/office/drawing/2014/main" id="{A694862C-8B28-4EF5-9C6F-0187B05C2B03}"/>
               </a:ext>
             </a:extLst>
           </p:cNvPr>
@@ -6494,35 +6622,72 @@
           <a:p>
             <a:r>
               <a:rPr lang="en-US" dirty="0"/>
-              <a:t>ARIMA MODELS</a:t>
-            </a:r>
-          </a:p>
-        </p:txBody>
-      </p:sp>
-      <p:sp>
-        <p:nvSpPr>
-          <p:cNvPr id="8" name="Text Placeholder 7">
-            <a:extLst>
-              <a:ext uri="{FF2B5EF4-FFF2-40B4-BE49-F238E27FC236}">
-                <a16:creationId xmlns:a16="http://schemas.microsoft.com/office/drawing/2014/main" id="{FCA70F1A-579E-4144-AE97-14FFC08FF0F5}"/>
-              </a:ext>
-            </a:extLst>
-          </p:cNvPr>
-          <p:cNvSpPr>
-            <a:spLocks noGrp="1"/>
-          </p:cNvSpPr>
-          <p:nvPr>
-            <p:ph type="body" idx="1"/>
-          </p:nvPr>
-        </p:nvSpPr>
-        <p:spPr/>
-        <p:txBody>
-          <a:bodyPr/>
-          <a:lstStyle/>
-          <a:p>
-            <a:r>
-              <a:rPr lang="en-US" dirty="0"/>
-              <a:t>Interpretable, simple and speedy time series modeling</a:t>
+              <a:t>DIFFERENCING</a:t>
+            </a:r>
+          </a:p>
+        </p:txBody>
+      </p:sp>
+      <p:sp>
+        <p:nvSpPr>
+          <p:cNvPr id="3" name="Content Placeholder 2">
+            <a:extLst>
+              <a:ext uri="{FF2B5EF4-FFF2-40B4-BE49-F238E27FC236}">
+                <a16:creationId xmlns:a16="http://schemas.microsoft.com/office/drawing/2014/main" id="{5DFC40A6-4344-46B7-89C4-4E16031C9B39}"/>
+              </a:ext>
+            </a:extLst>
+          </p:cNvPr>
+          <p:cNvSpPr>
+            <a:spLocks noGrp="1"/>
+          </p:cNvSpPr>
+          <p:nvPr>
+            <p:ph idx="1"/>
+          </p:nvPr>
+        </p:nvSpPr>
+        <p:spPr/>
+        <p:txBody>
+          <a:bodyPr/>
+          <a:lstStyle/>
+          <a:p>
+            <a:r>
+              <a:rPr lang="en-US" dirty="0"/>
+              <a:t>Subtracting values separated by some constant value</a:t>
+            </a:r>
+          </a:p>
+          <a:p>
+            <a:r>
+              <a:rPr lang="en-US" dirty="0"/>
+              <a:t>If there’s a linear trend, first order differencing will get rid of it!</a:t>
+            </a:r>
+          </a:p>
+          <a:p>
+            <a:pPr lvl="1"/>
+            <a:r>
+              <a:rPr lang="en-US" dirty="0"/>
+              <a:t>You can do higher orders for quadratic trends, </a:t>
+            </a:r>
+            <a:r>
+              <a:rPr lang="en-US" dirty="0" err="1"/>
+              <a:t>etc</a:t>
+            </a:r>
+            <a:endParaRPr lang="en-US" dirty="0"/>
+          </a:p>
+          <a:p>
+            <a:r>
+              <a:rPr lang="en-US" dirty="0"/>
+              <a:t>Also, used for removing some cyclic effects</a:t>
+            </a:r>
+          </a:p>
+          <a:p>
+            <a:pPr lvl="1"/>
+            <a:r>
+              <a:rPr lang="en-US" dirty="0"/>
+              <a:t>Weekly cycle? Difference by 7!</a:t>
+            </a:r>
+          </a:p>
+          <a:p>
+            <a:r>
+              <a:rPr lang="en-US" dirty="0"/>
+              <a:t>Can do many of these at once</a:t>
             </a:r>
           </a:p>
         </p:txBody>
@@ -6532,7 +6697,7 @@
           <p:cNvPr id="4" name="Date Placeholder 3">
             <a:extLst>
               <a:ext uri="{FF2B5EF4-FFF2-40B4-BE49-F238E27FC236}">
-                <a16:creationId xmlns:a16="http://schemas.microsoft.com/office/drawing/2014/main" id="{3AD929EF-0967-4B34-81B8-24D9EF91892E}"/>
+                <a16:creationId xmlns:a16="http://schemas.microsoft.com/office/drawing/2014/main" id="{ADEE79BB-4734-4439-A76F-2976CABC29C1}"/>
               </a:ext>
             </a:extLst>
           </p:cNvPr>
@@ -6561,7 +6726,7 @@
           <p:cNvPr id="5" name="Footer Placeholder 4">
             <a:extLst>
               <a:ext uri="{FF2B5EF4-FFF2-40B4-BE49-F238E27FC236}">
-                <a16:creationId xmlns:a16="http://schemas.microsoft.com/office/drawing/2014/main" id="{3B5B35DD-F2EA-40D3-8039-8CD3802B2612}"/>
+                <a16:creationId xmlns:a16="http://schemas.microsoft.com/office/drawing/2014/main" id="{14093F74-35B5-4B3E-BE77-B47F35290D05}"/>
               </a:ext>
             </a:extLst>
           </p:cNvPr>
@@ -6618,7 +6783,7 @@
           <p:cNvPr id="6" name="Slide Number Placeholder 5">
             <a:extLst>
               <a:ext uri="{FF2B5EF4-FFF2-40B4-BE49-F238E27FC236}">
-                <a16:creationId xmlns:a16="http://schemas.microsoft.com/office/drawing/2014/main" id="{C3EB9A57-323C-47F5-867F-693F95A15FA4}"/>
+                <a16:creationId xmlns:a16="http://schemas.microsoft.com/office/drawing/2014/main" id="{76F6E8AA-9A3E-467A-A16A-CED9E58CFA80}"/>
               </a:ext>
             </a:extLst>
           </p:cNvPr>
@@ -6645,7 +6810,7 @@
     </p:spTree>
     <p:extLst>
       <p:ext uri="{BB962C8B-B14F-4D97-AF65-F5344CB8AC3E}">
-        <p14:creationId xmlns:p14="http://schemas.microsoft.com/office/powerpoint/2010/main" val="107865345"/>
+        <p14:creationId xmlns:p14="http://schemas.microsoft.com/office/powerpoint/2010/main" val="3805551099"/>
       </p:ext>
     </p:extLst>
   </p:cSld>
@@ -6674,10 +6839,10 @@
       </p:grpSpPr>
       <p:sp>
         <p:nvSpPr>
-          <p:cNvPr id="7" name="Title 6">
-            <a:extLst>
-              <a:ext uri="{FF2B5EF4-FFF2-40B4-BE49-F238E27FC236}">
-                <a16:creationId xmlns:a16="http://schemas.microsoft.com/office/drawing/2014/main" id="{75C0DCD3-95F8-4E1F-BF1A-5FAAB84A40A3}"/>
+          <p:cNvPr id="2" name="Title 1">
+            <a:extLst>
+              <a:ext uri="{FF2B5EF4-FFF2-40B4-BE49-F238E27FC236}">
+                <a16:creationId xmlns:a16="http://schemas.microsoft.com/office/drawing/2014/main" id="{A694862C-8B28-4EF5-9C6F-0187B05C2B03}"/>
               </a:ext>
             </a:extLst>
           </p:cNvPr>
@@ -6695,33 +6860,16 @@
           <a:p>
             <a:r>
               <a:rPr lang="en-US" dirty="0"/>
-              <a:t>ARIMA</a:t>
-            </a:r>
-          </a:p>
-        </p:txBody>
-      </p:sp>
-      <p:sp>
-        <p:nvSpPr>
-          <p:cNvPr id="8" name="Content Placeholder 7">
-            <a:extLst>
-              <a:ext uri="{FF2B5EF4-FFF2-40B4-BE49-F238E27FC236}">
-                <a16:creationId xmlns:a16="http://schemas.microsoft.com/office/drawing/2014/main" id="{52BB1FAB-BB61-4B66-A4EA-A0EABC2B3ECA}"/>
-              </a:ext>
-            </a:extLst>
-          </p:cNvPr>
-          <p:cNvSpPr>
-            <a:spLocks noGrp="1"/>
-          </p:cNvSpPr>
-          <p:nvPr>
-            <p:ph idx="1"/>
-          </p:nvPr>
-        </p:nvSpPr>
-        <p:spPr/>
-        <p:txBody>
-          <a:bodyPr/>
-          <a:lstStyle/>
-          <a:p>
-            <a:endParaRPr lang="en-US"/>
+              <a:t>DIFFERENCING EXAMPLE: 1</a:t>
+            </a:r>
+            <a:r>
+              <a:rPr lang="en-US" baseline="30000" dirty="0"/>
+              <a:t>st</a:t>
+            </a:r>
+            <a:r>
+              <a:rPr lang="en-US" dirty="0"/>
+              <a:t> ORDER</a:t>
+            </a:r>
           </a:p>
         </p:txBody>
       </p:sp>
@@ -6730,7 +6878,7 @@
           <p:cNvPr id="4" name="Date Placeholder 3">
             <a:extLst>
               <a:ext uri="{FF2B5EF4-FFF2-40B4-BE49-F238E27FC236}">
-                <a16:creationId xmlns:a16="http://schemas.microsoft.com/office/drawing/2014/main" id="{02256D86-7CE0-416E-B2A3-402D20EE9E90}"/>
+                <a16:creationId xmlns:a16="http://schemas.microsoft.com/office/drawing/2014/main" id="{ADEE79BB-4734-4439-A76F-2976CABC29C1}"/>
               </a:ext>
             </a:extLst>
           </p:cNvPr>
@@ -6746,7 +6894,7 @@
           <a:bodyPr/>
           <a:lstStyle/>
           <a:p>
-            <a:fld id="{B08FEED8-D7D4-44E9-BFBC-ED06B5996D94}" type="datetime4">
+            <a:fld id="{8AAE40A0-A7D8-4DC3-BC9E-BADA32DA2004}" type="datetime4">
               <a:rPr lang="en-US" smtClean="0"/>
               <a:t>July 29, 2019</a:t>
             </a:fld>
@@ -6759,7 +6907,7 @@
           <p:cNvPr id="5" name="Footer Placeholder 4">
             <a:extLst>
               <a:ext uri="{FF2B5EF4-FFF2-40B4-BE49-F238E27FC236}">
-                <a16:creationId xmlns:a16="http://schemas.microsoft.com/office/drawing/2014/main" id="{1D4ED112-7CF4-4BB9-B46E-B366A5054A9A}"/>
+                <a16:creationId xmlns:a16="http://schemas.microsoft.com/office/drawing/2014/main" id="{14093F74-35B5-4B3E-BE77-B47F35290D05}"/>
               </a:ext>
             </a:extLst>
           </p:cNvPr>
@@ -6816,7 +6964,7 @@
           <p:cNvPr id="6" name="Slide Number Placeholder 5">
             <a:extLst>
               <a:ext uri="{FF2B5EF4-FFF2-40B4-BE49-F238E27FC236}">
-                <a16:creationId xmlns:a16="http://schemas.microsoft.com/office/drawing/2014/main" id="{8CC75551-85BF-4C9F-8893-AA28ECA8A6B5}"/>
+                <a16:creationId xmlns:a16="http://schemas.microsoft.com/office/drawing/2014/main" id="{76F6E8AA-9A3E-467A-A16A-CED9E58CFA80}"/>
               </a:ext>
             </a:extLst>
           </p:cNvPr>
@@ -6840,10 +6988,70 @@
           </a:p>
         </p:txBody>
       </p:sp>
+      <p:pic>
+        <p:nvPicPr>
+          <p:cNvPr id="12" name="Picture 11" descr="A close up of an object&#10;&#10;Description automatically generated">
+            <a:extLst>
+              <a:ext uri="{FF2B5EF4-FFF2-40B4-BE49-F238E27FC236}">
+                <a16:creationId xmlns:a16="http://schemas.microsoft.com/office/drawing/2014/main" id="{AABDA63B-B698-427D-8F40-BBF7EE5F5B9F}"/>
+              </a:ext>
+            </a:extLst>
+          </p:cNvPr>
+          <p:cNvPicPr>
+            <a:picLocks noChangeAspect="1"/>
+          </p:cNvPicPr>
+          <p:nvPr/>
+        </p:nvPicPr>
+        <p:blipFill>
+          <a:blip r:embed="rId2"/>
+          <a:stretch>
+            <a:fillRect/>
+          </a:stretch>
+        </p:blipFill>
+        <p:spPr>
+          <a:xfrm>
+            <a:off x="6184803" y="1954613"/>
+            <a:ext cx="5715798" cy="3810532"/>
+          </a:xfrm>
+          <a:prstGeom prst="rect">
+            <a:avLst/>
+          </a:prstGeom>
+        </p:spPr>
+      </p:pic>
+      <p:pic>
+        <p:nvPicPr>
+          <p:cNvPr id="14" name="Picture 13" descr="A picture containing object&#10;&#10;Description automatically generated">
+            <a:extLst>
+              <a:ext uri="{FF2B5EF4-FFF2-40B4-BE49-F238E27FC236}">
+                <a16:creationId xmlns:a16="http://schemas.microsoft.com/office/drawing/2014/main" id="{7137C433-1CD0-43BC-9688-AF18563F703B}"/>
+              </a:ext>
+            </a:extLst>
+          </p:cNvPr>
+          <p:cNvPicPr>
+            <a:picLocks noChangeAspect="1"/>
+          </p:cNvPicPr>
+          <p:nvPr/>
+        </p:nvPicPr>
+        <p:blipFill>
+          <a:blip r:embed="rId3"/>
+          <a:stretch>
+            <a:fillRect/>
+          </a:stretch>
+        </p:blipFill>
+        <p:spPr>
+          <a:xfrm>
+            <a:off x="159297" y="1954613"/>
+            <a:ext cx="5715798" cy="3810532"/>
+          </a:xfrm>
+          <a:prstGeom prst="rect">
+            <a:avLst/>
+          </a:prstGeom>
+        </p:spPr>
+      </p:pic>
     </p:spTree>
     <p:extLst>
       <p:ext uri="{BB962C8B-B14F-4D97-AF65-F5344CB8AC3E}">
-        <p14:creationId xmlns:p14="http://schemas.microsoft.com/office/powerpoint/2010/main" val="1065550565"/>
+        <p14:creationId xmlns:p14="http://schemas.microsoft.com/office/powerpoint/2010/main" val="1381432352"/>
       </p:ext>
     </p:extLst>
   </p:cSld>
@@ -6872,10 +7080,10 @@
       </p:grpSpPr>
       <p:sp>
         <p:nvSpPr>
-          <p:cNvPr id="7" name="Title 6">
-            <a:extLst>
-              <a:ext uri="{FF2B5EF4-FFF2-40B4-BE49-F238E27FC236}">
-                <a16:creationId xmlns:a16="http://schemas.microsoft.com/office/drawing/2014/main" id="{75C0DCD3-95F8-4E1F-BF1A-5FAAB84A40A3}"/>
+          <p:cNvPr id="2" name="Title 1">
+            <a:extLst>
+              <a:ext uri="{FF2B5EF4-FFF2-40B4-BE49-F238E27FC236}">
+                <a16:creationId xmlns:a16="http://schemas.microsoft.com/office/drawing/2014/main" id="{A694862C-8B28-4EF5-9C6F-0187B05C2B03}"/>
               </a:ext>
             </a:extLst>
           </p:cNvPr>
@@ -6893,33 +7101,16 @@
           <a:p>
             <a:r>
               <a:rPr lang="en-US" dirty="0"/>
-              <a:t>AUTOREGRESSIVE</a:t>
-            </a:r>
-          </a:p>
-        </p:txBody>
-      </p:sp>
-      <p:sp>
-        <p:nvSpPr>
-          <p:cNvPr id="8" name="Content Placeholder 7">
-            <a:extLst>
-              <a:ext uri="{FF2B5EF4-FFF2-40B4-BE49-F238E27FC236}">
-                <a16:creationId xmlns:a16="http://schemas.microsoft.com/office/drawing/2014/main" id="{52BB1FAB-BB61-4B66-A4EA-A0EABC2B3ECA}"/>
-              </a:ext>
-            </a:extLst>
-          </p:cNvPr>
-          <p:cNvSpPr>
-            <a:spLocks noGrp="1"/>
-          </p:cNvSpPr>
-          <p:nvPr>
-            <p:ph idx="1"/>
-          </p:nvPr>
-        </p:nvSpPr>
-        <p:spPr/>
-        <p:txBody>
-          <a:bodyPr/>
-          <a:lstStyle/>
-          <a:p>
-            <a:endParaRPr lang="en-US"/>
+              <a:t>DIFFERENCING EXAMPLE: 7</a:t>
+            </a:r>
+            <a:r>
+              <a:rPr lang="en-US" baseline="30000" dirty="0"/>
+              <a:t>th</a:t>
+            </a:r>
+            <a:r>
+              <a:rPr lang="en-US" dirty="0"/>
+              <a:t> ORDER</a:t>
+            </a:r>
           </a:p>
         </p:txBody>
       </p:sp>
@@ -6928,7 +7119,7 @@
           <p:cNvPr id="4" name="Date Placeholder 3">
             <a:extLst>
               <a:ext uri="{FF2B5EF4-FFF2-40B4-BE49-F238E27FC236}">
-                <a16:creationId xmlns:a16="http://schemas.microsoft.com/office/drawing/2014/main" id="{02256D86-7CE0-416E-B2A3-402D20EE9E90}"/>
+                <a16:creationId xmlns:a16="http://schemas.microsoft.com/office/drawing/2014/main" id="{ADEE79BB-4734-4439-A76F-2976CABC29C1}"/>
               </a:ext>
             </a:extLst>
           </p:cNvPr>
@@ -6944,7 +7135,7 @@
           <a:bodyPr/>
           <a:lstStyle/>
           <a:p>
-            <a:fld id="{B08FEED8-D7D4-44E9-BFBC-ED06B5996D94}" type="datetime4">
+            <a:fld id="{8AAE40A0-A7D8-4DC3-BC9E-BADA32DA2004}" type="datetime4">
               <a:rPr lang="en-US" smtClean="0"/>
               <a:t>July 29, 2019</a:t>
             </a:fld>
@@ -6957,7 +7148,7 @@
           <p:cNvPr id="5" name="Footer Placeholder 4">
             <a:extLst>
               <a:ext uri="{FF2B5EF4-FFF2-40B4-BE49-F238E27FC236}">
-                <a16:creationId xmlns:a16="http://schemas.microsoft.com/office/drawing/2014/main" id="{1D4ED112-7CF4-4BB9-B46E-B366A5054A9A}"/>
+                <a16:creationId xmlns:a16="http://schemas.microsoft.com/office/drawing/2014/main" id="{14093F74-35B5-4B3E-BE77-B47F35290D05}"/>
               </a:ext>
             </a:extLst>
           </p:cNvPr>
@@ -7014,7 +7205,7 @@
           <p:cNvPr id="6" name="Slide Number Placeholder 5">
             <a:extLst>
               <a:ext uri="{FF2B5EF4-FFF2-40B4-BE49-F238E27FC236}">
-                <a16:creationId xmlns:a16="http://schemas.microsoft.com/office/drawing/2014/main" id="{8CC75551-85BF-4C9F-8893-AA28ECA8A6B5}"/>
+                <a16:creationId xmlns:a16="http://schemas.microsoft.com/office/drawing/2014/main" id="{76F6E8AA-9A3E-467A-A16A-CED9E58CFA80}"/>
               </a:ext>
             </a:extLst>
           </p:cNvPr>
@@ -7038,10 +7229,69 @@
           </a:p>
         </p:txBody>
       </p:sp>
+      <p:pic>
+        <p:nvPicPr>
+          <p:cNvPr id="12" name="Picture 11">
+            <a:extLst>
+              <a:ext uri="{FF2B5EF4-FFF2-40B4-BE49-F238E27FC236}">
+                <a16:creationId xmlns:a16="http://schemas.microsoft.com/office/drawing/2014/main" id="{AABDA63B-B698-427D-8F40-BBF7EE5F5B9F}"/>
+              </a:ext>
+            </a:extLst>
+          </p:cNvPr>
+          <p:cNvPicPr>
+            <a:picLocks noChangeAspect="1"/>
+          </p:cNvPicPr>
+          <p:nvPr/>
+        </p:nvPicPr>
+        <p:blipFill>
+          <a:blip r:embed="rId2"/>
+          <a:srcRect/>
+          <a:stretch/>
+        </p:blipFill>
+        <p:spPr>
+          <a:xfrm>
+            <a:off x="6184803" y="1954613"/>
+            <a:ext cx="5715798" cy="3810532"/>
+          </a:xfrm>
+          <a:prstGeom prst="rect">
+            <a:avLst/>
+          </a:prstGeom>
+        </p:spPr>
+      </p:pic>
+      <p:pic>
+        <p:nvPicPr>
+          <p:cNvPr id="14" name="Picture 13" descr="A picture containing object&#10;&#10;Description automatically generated">
+            <a:extLst>
+              <a:ext uri="{FF2B5EF4-FFF2-40B4-BE49-F238E27FC236}">
+                <a16:creationId xmlns:a16="http://schemas.microsoft.com/office/drawing/2014/main" id="{7137C433-1CD0-43BC-9688-AF18563F703B}"/>
+              </a:ext>
+            </a:extLst>
+          </p:cNvPr>
+          <p:cNvPicPr>
+            <a:picLocks noChangeAspect="1"/>
+          </p:cNvPicPr>
+          <p:nvPr/>
+        </p:nvPicPr>
+        <p:blipFill>
+          <a:blip r:embed="rId3"/>
+          <a:stretch>
+            <a:fillRect/>
+          </a:stretch>
+        </p:blipFill>
+        <p:spPr>
+          <a:xfrm>
+            <a:off x="159297" y="1954613"/>
+            <a:ext cx="5715798" cy="3810532"/>
+          </a:xfrm>
+          <a:prstGeom prst="rect">
+            <a:avLst/>
+          </a:prstGeom>
+        </p:spPr>
+      </p:pic>
     </p:spTree>
     <p:extLst>
       <p:ext uri="{BB962C8B-B14F-4D97-AF65-F5344CB8AC3E}">
-        <p14:creationId xmlns:p14="http://schemas.microsoft.com/office/powerpoint/2010/main" val="4066560549"/>
+        <p14:creationId xmlns:p14="http://schemas.microsoft.com/office/powerpoint/2010/main" val="3603679591"/>
       </p:ext>
     </p:extLst>
   </p:cSld>
@@ -7073,7 +7323,7 @@
           <p:cNvPr id="2" name="Title 1">
             <a:extLst>
               <a:ext uri="{FF2B5EF4-FFF2-40B4-BE49-F238E27FC236}">
-                <a16:creationId xmlns:a16="http://schemas.microsoft.com/office/drawing/2014/main" id="{D7EACF90-3E7B-4978-AB0C-ED5165419D19}"/>
+                <a16:creationId xmlns:a16="http://schemas.microsoft.com/office/drawing/2014/main" id="{A694862C-8B28-4EF5-9C6F-0187B05C2B03}"/>
               </a:ext>
             </a:extLst>
           </p:cNvPr>
@@ -7091,33 +7341,8 @@
           <a:p>
             <a:r>
               <a:rPr lang="en-US" dirty="0"/>
-              <a:t>MOVING AVERAGE</a:t>
-            </a:r>
-          </a:p>
-        </p:txBody>
-      </p:sp>
-      <p:sp>
-        <p:nvSpPr>
-          <p:cNvPr id="3" name="Content Placeholder 2">
-            <a:extLst>
-              <a:ext uri="{FF2B5EF4-FFF2-40B4-BE49-F238E27FC236}">
-                <a16:creationId xmlns:a16="http://schemas.microsoft.com/office/drawing/2014/main" id="{A7CEFEF5-E74A-4EFE-9368-8FD74B059E10}"/>
-              </a:ext>
-            </a:extLst>
-          </p:cNvPr>
-          <p:cNvSpPr>
-            <a:spLocks noGrp="1"/>
-          </p:cNvSpPr>
-          <p:nvPr>
-            <p:ph idx="1"/>
-          </p:nvPr>
-        </p:nvSpPr>
-        <p:spPr/>
-        <p:txBody>
-          <a:bodyPr/>
-          <a:lstStyle/>
-          <a:p>
-            <a:endParaRPr lang="en-US"/>
+              <a:t>DIFFERENCING EXAMPLE: BOTH!</a:t>
+            </a:r>
           </a:p>
         </p:txBody>
       </p:sp>
@@ -7126,7 +7351,7 @@
           <p:cNvPr id="4" name="Date Placeholder 3">
             <a:extLst>
               <a:ext uri="{FF2B5EF4-FFF2-40B4-BE49-F238E27FC236}">
-                <a16:creationId xmlns:a16="http://schemas.microsoft.com/office/drawing/2014/main" id="{64E0A09F-EC7A-4EF6-AB3A-0DC48B1B7271}"/>
+                <a16:creationId xmlns:a16="http://schemas.microsoft.com/office/drawing/2014/main" id="{ADEE79BB-4734-4439-A76F-2976CABC29C1}"/>
               </a:ext>
             </a:extLst>
           </p:cNvPr>
@@ -7155,7 +7380,7 @@
           <p:cNvPr id="5" name="Footer Placeholder 4">
             <a:extLst>
               <a:ext uri="{FF2B5EF4-FFF2-40B4-BE49-F238E27FC236}">
-                <a16:creationId xmlns:a16="http://schemas.microsoft.com/office/drawing/2014/main" id="{9D8B7F07-2C50-4473-BABC-57C52FDD38D2}"/>
+                <a16:creationId xmlns:a16="http://schemas.microsoft.com/office/drawing/2014/main" id="{14093F74-35B5-4B3E-BE77-B47F35290D05}"/>
               </a:ext>
             </a:extLst>
           </p:cNvPr>
@@ -7212,7 +7437,7 @@
           <p:cNvPr id="6" name="Slide Number Placeholder 5">
             <a:extLst>
               <a:ext uri="{FF2B5EF4-FFF2-40B4-BE49-F238E27FC236}">
-                <a16:creationId xmlns:a16="http://schemas.microsoft.com/office/drawing/2014/main" id="{6BE5E43E-0696-4C60-A72C-BBB5B4448760}"/>
+                <a16:creationId xmlns:a16="http://schemas.microsoft.com/office/drawing/2014/main" id="{76F6E8AA-9A3E-467A-A16A-CED9E58CFA80}"/>
               </a:ext>
             </a:extLst>
           </p:cNvPr>
@@ -7236,10 +7461,69 @@
           </a:p>
         </p:txBody>
       </p:sp>
+      <p:pic>
+        <p:nvPicPr>
+          <p:cNvPr id="12" name="Picture 11">
+            <a:extLst>
+              <a:ext uri="{FF2B5EF4-FFF2-40B4-BE49-F238E27FC236}">
+                <a16:creationId xmlns:a16="http://schemas.microsoft.com/office/drawing/2014/main" id="{AABDA63B-B698-427D-8F40-BBF7EE5F5B9F}"/>
+              </a:ext>
+            </a:extLst>
+          </p:cNvPr>
+          <p:cNvPicPr>
+            <a:picLocks noChangeAspect="1"/>
+          </p:cNvPicPr>
+          <p:nvPr/>
+        </p:nvPicPr>
+        <p:blipFill>
+          <a:blip r:embed="rId2"/>
+          <a:srcRect/>
+          <a:stretch/>
+        </p:blipFill>
+        <p:spPr>
+          <a:xfrm>
+            <a:off x="6184803" y="1954613"/>
+            <a:ext cx="5715798" cy="3810532"/>
+          </a:xfrm>
+          <a:prstGeom prst="rect">
+            <a:avLst/>
+          </a:prstGeom>
+        </p:spPr>
+      </p:pic>
+      <p:pic>
+        <p:nvPicPr>
+          <p:cNvPr id="14" name="Picture 13" descr="A picture containing object&#10;&#10;Description automatically generated">
+            <a:extLst>
+              <a:ext uri="{FF2B5EF4-FFF2-40B4-BE49-F238E27FC236}">
+                <a16:creationId xmlns:a16="http://schemas.microsoft.com/office/drawing/2014/main" id="{7137C433-1CD0-43BC-9688-AF18563F703B}"/>
+              </a:ext>
+            </a:extLst>
+          </p:cNvPr>
+          <p:cNvPicPr>
+            <a:picLocks noChangeAspect="1"/>
+          </p:cNvPicPr>
+          <p:nvPr/>
+        </p:nvPicPr>
+        <p:blipFill>
+          <a:blip r:embed="rId3"/>
+          <a:stretch>
+            <a:fillRect/>
+          </a:stretch>
+        </p:blipFill>
+        <p:spPr>
+          <a:xfrm>
+            <a:off x="159297" y="1954613"/>
+            <a:ext cx="5715798" cy="3810532"/>
+          </a:xfrm>
+          <a:prstGeom prst="rect">
+            <a:avLst/>
+          </a:prstGeom>
+        </p:spPr>
+      </p:pic>
     </p:spTree>
     <p:extLst>
       <p:ext uri="{BB962C8B-B14F-4D97-AF65-F5344CB8AC3E}">
-        <p14:creationId xmlns:p14="http://schemas.microsoft.com/office/powerpoint/2010/main" val="3521777765"/>
+        <p14:creationId xmlns:p14="http://schemas.microsoft.com/office/powerpoint/2010/main" val="705856288"/>
       </p:ext>
     </p:extLst>
   </p:cSld>
@@ -7271,7 +7555,7 @@
           <p:cNvPr id="2" name="Title 1">
             <a:extLst>
               <a:ext uri="{FF2B5EF4-FFF2-40B4-BE49-F238E27FC236}">
-                <a16:creationId xmlns:a16="http://schemas.microsoft.com/office/drawing/2014/main" id="{D1BF0482-6913-4A5E-A533-479864CB5349}"/>
+                <a16:creationId xmlns:a16="http://schemas.microsoft.com/office/drawing/2014/main" id="{84FE5820-4288-4CB6-888A-5CBF5468888C}"/>
               </a:ext>
             </a:extLst>
           </p:cNvPr>
@@ -7289,7 +7573,7 @@
           <a:p>
             <a:r>
               <a:rPr lang="en-US" dirty="0"/>
-              <a:t>PLAYING AROUND WITH ARIMA</a:t>
+              <a:t>LAGGED SCATTERPLOTS</a:t>
             </a:r>
           </a:p>
         </p:txBody>
@@ -7299,7 +7583,7 @@
           <p:cNvPr id="3" name="Content Placeholder 2">
             <a:extLst>
               <a:ext uri="{FF2B5EF4-FFF2-40B4-BE49-F238E27FC236}">
-                <a16:creationId xmlns:a16="http://schemas.microsoft.com/office/drawing/2014/main" id="{D48271C9-2790-46C9-B80B-52D215430CB8}"/>
+                <a16:creationId xmlns:a16="http://schemas.microsoft.com/office/drawing/2014/main" id="{2952943F-FC31-4BE3-AB00-BAB4B12957BE}"/>
               </a:ext>
             </a:extLst>
           </p:cNvPr>
@@ -7315,7 +7599,29 @@
           <a:bodyPr/>
           <a:lstStyle/>
           <a:p>
-            <a:endParaRPr lang="en-US"/>
+            <a:r>
+              <a:rPr lang="en-US" dirty="0"/>
+              <a:t>How do you know what orders are likely to help?</a:t>
+            </a:r>
+          </a:p>
+          <a:p>
+            <a:r>
+              <a:rPr lang="en-US" dirty="0"/>
+              <a:t>Lagged scatterplots!</a:t>
+            </a:r>
+          </a:p>
+          <a:p>
+            <a:pPr lvl="1"/>
+            <a:r>
+              <a:rPr lang="en-US" dirty="0"/>
+              <a:t>Essentially, plotting one point versus a previous point</a:t>
+            </a:r>
+          </a:p>
+          <a:p>
+            <a:r>
+              <a:rPr lang="en-US" dirty="0"/>
+              <a:t>If there’s an obvious trend (either positive or negative) it’s probably a good idea to try differencing!</a:t>
+            </a:r>
           </a:p>
         </p:txBody>
       </p:sp>
@@ -7324,7 +7630,7 @@
           <p:cNvPr id="4" name="Date Placeholder 3">
             <a:extLst>
               <a:ext uri="{FF2B5EF4-FFF2-40B4-BE49-F238E27FC236}">
-                <a16:creationId xmlns:a16="http://schemas.microsoft.com/office/drawing/2014/main" id="{B23DAF35-209C-48FA-AAAB-F69E14183A91}"/>
+                <a16:creationId xmlns:a16="http://schemas.microsoft.com/office/drawing/2014/main" id="{F716348B-D7FE-46ED-8C48-CF5A55FF31CF}"/>
               </a:ext>
             </a:extLst>
           </p:cNvPr>
@@ -7353,7 +7659,7 @@
           <p:cNvPr id="5" name="Footer Placeholder 4">
             <a:extLst>
               <a:ext uri="{FF2B5EF4-FFF2-40B4-BE49-F238E27FC236}">
-                <a16:creationId xmlns:a16="http://schemas.microsoft.com/office/drawing/2014/main" id="{3D8E22A6-180D-41CF-9959-4347A11F2AD1}"/>
+                <a16:creationId xmlns:a16="http://schemas.microsoft.com/office/drawing/2014/main" id="{34059279-A1E7-4F19-B4BF-8C6B59A4CEFF}"/>
               </a:ext>
             </a:extLst>
           </p:cNvPr>
@@ -7410,7 +7716,7 @@
           <p:cNvPr id="6" name="Slide Number Placeholder 5">
             <a:extLst>
               <a:ext uri="{FF2B5EF4-FFF2-40B4-BE49-F238E27FC236}">
-                <a16:creationId xmlns:a16="http://schemas.microsoft.com/office/drawing/2014/main" id="{CECE3146-0C2B-4CC7-BC7C-FD23AAF7ECAE}"/>
+                <a16:creationId xmlns:a16="http://schemas.microsoft.com/office/drawing/2014/main" id="{DE722C41-7366-4DE2-9AF4-E75E189A7733}"/>
               </a:ext>
             </a:extLst>
           </p:cNvPr>
@@ -7437,7 +7743,7 @@
     </p:spTree>
     <p:extLst>
       <p:ext uri="{BB962C8B-B14F-4D97-AF65-F5344CB8AC3E}">
-        <p14:creationId xmlns:p14="http://schemas.microsoft.com/office/powerpoint/2010/main" val="3624540971"/>
+        <p14:creationId xmlns:p14="http://schemas.microsoft.com/office/powerpoint/2010/main" val="2399367561"/>
       </p:ext>
     </p:extLst>
   </p:cSld>
@@ -7466,10 +7772,10 @@
       </p:grpSpPr>
       <p:sp>
         <p:nvSpPr>
-          <p:cNvPr id="7" name="Title 6">
-            <a:extLst>
-              <a:ext uri="{FF2B5EF4-FFF2-40B4-BE49-F238E27FC236}">
-                <a16:creationId xmlns:a16="http://schemas.microsoft.com/office/drawing/2014/main" id="{495B4BC0-844B-4414-A623-BEF78AAC1BA1}"/>
+          <p:cNvPr id="2" name="Title 1">
+            <a:extLst>
+              <a:ext uri="{FF2B5EF4-FFF2-40B4-BE49-F238E27FC236}">
+                <a16:creationId xmlns:a16="http://schemas.microsoft.com/office/drawing/2014/main" id="{84FE5820-4288-4CB6-888A-5CBF5468888C}"/>
               </a:ext>
             </a:extLst>
           </p:cNvPr>
@@ -7487,33 +7793,8 @@
           <a:p>
             <a:r>
               <a:rPr lang="en-US" dirty="0"/>
-              <a:t>ACKNOWLEDGMENTS</a:t>
-            </a:r>
-          </a:p>
-        </p:txBody>
-      </p:sp>
-      <p:sp>
-        <p:nvSpPr>
-          <p:cNvPr id="8" name="Content Placeholder 7">
-            <a:extLst>
-              <a:ext uri="{FF2B5EF4-FFF2-40B4-BE49-F238E27FC236}">
-                <a16:creationId xmlns:a16="http://schemas.microsoft.com/office/drawing/2014/main" id="{2BED3EB3-7E98-4A82-8335-7321D9E37B16}"/>
-              </a:ext>
-            </a:extLst>
-          </p:cNvPr>
-          <p:cNvSpPr>
-            <a:spLocks noGrp="1"/>
-          </p:cNvSpPr>
-          <p:nvPr>
-            <p:ph idx="1"/>
-          </p:nvPr>
-        </p:nvSpPr>
-        <p:spPr/>
-        <p:txBody>
-          <a:bodyPr/>
-          <a:lstStyle/>
-          <a:p>
-            <a:endParaRPr lang="en-US"/>
+              <a:t>LAGGED SCATTERPLOTS EXAMPLE</a:t>
+            </a:r>
           </a:p>
         </p:txBody>
       </p:sp>
@@ -7522,7 +7803,7 @@
           <p:cNvPr id="4" name="Date Placeholder 3">
             <a:extLst>
               <a:ext uri="{FF2B5EF4-FFF2-40B4-BE49-F238E27FC236}">
-                <a16:creationId xmlns:a16="http://schemas.microsoft.com/office/drawing/2014/main" id="{540F37F1-4F33-429F-A568-1A3ADC499E54}"/>
+                <a16:creationId xmlns:a16="http://schemas.microsoft.com/office/drawing/2014/main" id="{F716348B-D7FE-46ED-8C48-CF5A55FF31CF}"/>
               </a:ext>
             </a:extLst>
           </p:cNvPr>
@@ -7538,7 +7819,7 @@
           <a:bodyPr/>
           <a:lstStyle/>
           <a:p>
-            <a:fld id="{B08FEED8-D7D4-44E9-BFBC-ED06B5996D94}" type="datetime4">
+            <a:fld id="{8AAE40A0-A7D8-4DC3-BC9E-BADA32DA2004}" type="datetime4">
               <a:rPr lang="en-US" smtClean="0"/>
               <a:t>July 29, 2019</a:t>
             </a:fld>
@@ -7551,7 +7832,7 @@
           <p:cNvPr id="5" name="Footer Placeholder 4">
             <a:extLst>
               <a:ext uri="{FF2B5EF4-FFF2-40B4-BE49-F238E27FC236}">
-                <a16:creationId xmlns:a16="http://schemas.microsoft.com/office/drawing/2014/main" id="{673FFA57-C126-4795-A5F6-DD33AAC5ACBD}"/>
+                <a16:creationId xmlns:a16="http://schemas.microsoft.com/office/drawing/2014/main" id="{34059279-A1E7-4F19-B4BF-8C6B59A4CEFF}"/>
               </a:ext>
             </a:extLst>
           </p:cNvPr>
@@ -7608,7 +7889,7 @@
           <p:cNvPr id="6" name="Slide Number Placeholder 5">
             <a:extLst>
               <a:ext uri="{FF2B5EF4-FFF2-40B4-BE49-F238E27FC236}">
-                <a16:creationId xmlns:a16="http://schemas.microsoft.com/office/drawing/2014/main" id="{2FA49567-BB70-4798-8746-D0B522CCEE20}"/>
+                <a16:creationId xmlns:a16="http://schemas.microsoft.com/office/drawing/2014/main" id="{DE722C41-7366-4DE2-9AF4-E75E189A7733}"/>
               </a:ext>
             </a:extLst>
           </p:cNvPr>
@@ -7632,10 +7913,494 @@
           </a:p>
         </p:txBody>
       </p:sp>
+      <p:pic>
+        <p:nvPicPr>
+          <p:cNvPr id="10" name="Picture 9" descr="A screenshot of a cell phone&#10;&#10;Description automatically generated">
+            <a:extLst>
+              <a:ext uri="{FF2B5EF4-FFF2-40B4-BE49-F238E27FC236}">
+                <a16:creationId xmlns:a16="http://schemas.microsoft.com/office/drawing/2014/main" id="{F8BC82BB-F89F-4421-9F16-389C95C23715}"/>
+              </a:ext>
+            </a:extLst>
+          </p:cNvPr>
+          <p:cNvPicPr>
+            <a:picLocks noChangeAspect="1"/>
+          </p:cNvPicPr>
+          <p:nvPr/>
+        </p:nvPicPr>
+        <p:blipFill>
+          <a:blip r:embed="rId2"/>
+          <a:stretch>
+            <a:fillRect/>
+          </a:stretch>
+        </p:blipFill>
+        <p:spPr>
+          <a:xfrm>
+            <a:off x="3479258" y="1454284"/>
+            <a:ext cx="4946515" cy="4946515"/>
+          </a:xfrm>
+          <a:prstGeom prst="rect">
+            <a:avLst/>
+          </a:prstGeom>
+        </p:spPr>
+      </p:pic>
     </p:spTree>
     <p:extLst>
       <p:ext uri="{BB962C8B-B14F-4D97-AF65-F5344CB8AC3E}">
-        <p14:creationId xmlns:p14="http://schemas.microsoft.com/office/powerpoint/2010/main" val="1585568494"/>
+        <p14:creationId xmlns:p14="http://schemas.microsoft.com/office/powerpoint/2010/main" val="2285561951"/>
+      </p:ext>
+    </p:extLst>
+  </p:cSld>
+  <p:clrMapOvr>
+    <a:masterClrMapping/>
+  </p:clrMapOvr>
+</p:sld>
+</file>
+
+<file path=ppt/slides/slide28.xml><?xml version="1.0" encoding="utf-8"?>
+<p:sld xmlns:a="http://schemas.openxmlformats.org/drawingml/2006/main" xmlns:r="http://schemas.openxmlformats.org/officeDocument/2006/relationships" xmlns:p="http://schemas.openxmlformats.org/presentationml/2006/main">
+  <p:cSld>
+    <p:spTree>
+      <p:nvGrpSpPr>
+        <p:cNvPr id="1" name=""/>
+        <p:cNvGrpSpPr/>
+        <p:nvPr/>
+      </p:nvGrpSpPr>
+      <p:grpSpPr>
+        <a:xfrm>
+          <a:off x="0" y="0"/>
+          <a:ext cx="0" cy="0"/>
+          <a:chOff x="0" y="0"/>
+          <a:chExt cx="0" cy="0"/>
+        </a:xfrm>
+      </p:grpSpPr>
+      <p:sp>
+        <p:nvSpPr>
+          <p:cNvPr id="7" name="Title 6">
+            <a:extLst>
+              <a:ext uri="{FF2B5EF4-FFF2-40B4-BE49-F238E27FC236}">
+                <a16:creationId xmlns:a16="http://schemas.microsoft.com/office/drawing/2014/main" id="{7802FB34-7510-47BC-8952-A1FE9728B0BF}"/>
+              </a:ext>
+            </a:extLst>
+          </p:cNvPr>
+          <p:cNvSpPr>
+            <a:spLocks noGrp="1"/>
+          </p:cNvSpPr>
+          <p:nvPr>
+            <p:ph type="title"/>
+          </p:nvPr>
+        </p:nvSpPr>
+        <p:spPr/>
+        <p:txBody>
+          <a:bodyPr/>
+          <a:lstStyle/>
+          <a:p>
+            <a:r>
+              <a:rPr lang="en-US" dirty="0"/>
+              <a:t>ARIMA MODELS</a:t>
+            </a:r>
+          </a:p>
+        </p:txBody>
+      </p:sp>
+      <p:sp>
+        <p:nvSpPr>
+          <p:cNvPr id="8" name="Text Placeholder 7">
+            <a:extLst>
+              <a:ext uri="{FF2B5EF4-FFF2-40B4-BE49-F238E27FC236}">
+                <a16:creationId xmlns:a16="http://schemas.microsoft.com/office/drawing/2014/main" id="{FCA70F1A-579E-4144-AE97-14FFC08FF0F5}"/>
+              </a:ext>
+            </a:extLst>
+          </p:cNvPr>
+          <p:cNvSpPr>
+            <a:spLocks noGrp="1"/>
+          </p:cNvSpPr>
+          <p:nvPr>
+            <p:ph type="body" idx="1"/>
+          </p:nvPr>
+        </p:nvSpPr>
+        <p:spPr/>
+        <p:txBody>
+          <a:bodyPr/>
+          <a:lstStyle/>
+          <a:p>
+            <a:r>
+              <a:rPr lang="en-US" dirty="0"/>
+              <a:t>Interpretable, simple and speedy time series modeling</a:t>
+            </a:r>
+          </a:p>
+        </p:txBody>
+      </p:sp>
+      <p:sp>
+        <p:nvSpPr>
+          <p:cNvPr id="4" name="Date Placeholder 3">
+            <a:extLst>
+              <a:ext uri="{FF2B5EF4-FFF2-40B4-BE49-F238E27FC236}">
+                <a16:creationId xmlns:a16="http://schemas.microsoft.com/office/drawing/2014/main" id="{3AD929EF-0967-4B34-81B8-24D9EF91892E}"/>
+              </a:ext>
+            </a:extLst>
+          </p:cNvPr>
+          <p:cNvSpPr>
+            <a:spLocks noGrp="1"/>
+          </p:cNvSpPr>
+          <p:nvPr>
+            <p:ph type="dt" sz="half" idx="10"/>
+          </p:nvPr>
+        </p:nvSpPr>
+        <p:spPr/>
+        <p:txBody>
+          <a:bodyPr/>
+          <a:lstStyle/>
+          <a:p>
+            <a:fld id="{8AAE40A0-A7D8-4DC3-BC9E-BADA32DA2004}" type="datetime4">
+              <a:rPr lang="en-US" smtClean="0"/>
+              <a:t>July 29, 2019</a:t>
+            </a:fld>
+            <a:endParaRPr lang="en-US" dirty="0"/>
+          </a:p>
+        </p:txBody>
+      </p:sp>
+      <p:sp>
+        <p:nvSpPr>
+          <p:cNvPr id="5" name="Footer Placeholder 4">
+            <a:extLst>
+              <a:ext uri="{FF2B5EF4-FFF2-40B4-BE49-F238E27FC236}">
+                <a16:creationId xmlns:a16="http://schemas.microsoft.com/office/drawing/2014/main" id="{3B5B35DD-F2EA-40D3-8039-8CD3802B2612}"/>
+              </a:ext>
+            </a:extLst>
+          </p:cNvPr>
+          <p:cNvSpPr>
+            <a:spLocks noGrp="1"/>
+          </p:cNvSpPr>
+          <p:nvPr>
+            <p:ph type="ftr" sz="quarter" idx="11"/>
+          </p:nvPr>
+        </p:nvSpPr>
+        <p:spPr/>
+        <p:txBody>
+          <a:bodyPr/>
+          <a:lstStyle/>
+          <a:p>
+            <a:r>
+              <a:rPr lang="en-US"/>
+              <a:t>Digital Scholarship Services </a:t>
+            </a:r>
+            <a:r>
+              <a:rPr lang="en-US">
+                <a:solidFill>
+                  <a:schemeClr val="accent1">
+                    <a:lumMod val="50000"/>
+                  </a:schemeClr>
+                </a:solidFill>
+              </a:rPr>
+              <a:t>| Email</a:t>
+            </a:r>
+            <a:r>
+              <a:rPr lang="en-US"/>
+              <a:t> cf24@rice.edu </a:t>
+            </a:r>
+            <a:r>
+              <a:rPr lang="en-US">
+                <a:solidFill>
+                  <a:schemeClr val="accent1">
+                    <a:lumMod val="50000"/>
+                  </a:schemeClr>
+                </a:solidFill>
+              </a:rPr>
+              <a:t>|</a:t>
+            </a:r>
+            <a:r>
+              <a:rPr lang="en-US"/>
+              <a:t> library.rice.edu/dss</a:t>
+            </a:r>
+            <a:endParaRPr lang="en-US" dirty="0"/>
+          </a:p>
+        </p:txBody>
+      </p:sp>
+      <p:sp>
+        <p:nvSpPr>
+          <p:cNvPr id="6" name="Slide Number Placeholder 5">
+            <a:extLst>
+              <a:ext uri="{FF2B5EF4-FFF2-40B4-BE49-F238E27FC236}">
+                <a16:creationId xmlns:a16="http://schemas.microsoft.com/office/drawing/2014/main" id="{C3EB9A57-323C-47F5-867F-693F95A15FA4}"/>
+              </a:ext>
+            </a:extLst>
+          </p:cNvPr>
+          <p:cNvSpPr>
+            <a:spLocks noGrp="1"/>
+          </p:cNvSpPr>
+          <p:nvPr>
+            <p:ph type="sldNum" sz="quarter" idx="12"/>
+          </p:nvPr>
+        </p:nvSpPr>
+        <p:spPr/>
+        <p:txBody>
+          <a:bodyPr/>
+          <a:lstStyle/>
+          <a:p>
+            <a:fld id="{D57F1E4F-1CFF-5643-939E-02111984F565}" type="slidenum">
+              <a:rPr lang="en-US" smtClean="0"/>
+              <a:t>28</a:t>
+            </a:fld>
+            <a:endParaRPr lang="en-US" dirty="0"/>
+          </a:p>
+        </p:txBody>
+      </p:sp>
+    </p:spTree>
+    <p:extLst>
+      <p:ext uri="{BB962C8B-B14F-4D97-AF65-F5344CB8AC3E}">
+        <p14:creationId xmlns:p14="http://schemas.microsoft.com/office/powerpoint/2010/main" val="107865345"/>
+      </p:ext>
+    </p:extLst>
+  </p:cSld>
+  <p:clrMapOvr>
+    <a:masterClrMapping/>
+  </p:clrMapOvr>
+</p:sld>
+</file>
+
+<file path=ppt/slides/slide29.xml><?xml version="1.0" encoding="utf-8"?>
+<p:sld xmlns:a="http://schemas.openxmlformats.org/drawingml/2006/main" xmlns:r="http://schemas.openxmlformats.org/officeDocument/2006/relationships" xmlns:p="http://schemas.openxmlformats.org/presentationml/2006/main">
+  <p:cSld>
+    <p:spTree>
+      <p:nvGrpSpPr>
+        <p:cNvPr id="1" name=""/>
+        <p:cNvGrpSpPr/>
+        <p:nvPr/>
+      </p:nvGrpSpPr>
+      <p:grpSpPr>
+        <a:xfrm>
+          <a:off x="0" y="0"/>
+          <a:ext cx="0" cy="0"/>
+          <a:chOff x="0" y="0"/>
+          <a:chExt cx="0" cy="0"/>
+        </a:xfrm>
+      </p:grpSpPr>
+      <p:sp>
+        <p:nvSpPr>
+          <p:cNvPr id="7" name="Title 6">
+            <a:extLst>
+              <a:ext uri="{FF2B5EF4-FFF2-40B4-BE49-F238E27FC236}">
+                <a16:creationId xmlns:a16="http://schemas.microsoft.com/office/drawing/2014/main" id="{75C0DCD3-95F8-4E1F-BF1A-5FAAB84A40A3}"/>
+              </a:ext>
+            </a:extLst>
+          </p:cNvPr>
+          <p:cNvSpPr>
+            <a:spLocks noGrp="1"/>
+          </p:cNvSpPr>
+          <p:nvPr>
+            <p:ph type="title"/>
+          </p:nvPr>
+        </p:nvSpPr>
+        <p:spPr/>
+        <p:txBody>
+          <a:bodyPr/>
+          <a:lstStyle/>
+          <a:p>
+            <a:r>
+              <a:rPr lang="en-US" dirty="0"/>
+              <a:t>ARIMA MODELS</a:t>
+            </a:r>
+          </a:p>
+        </p:txBody>
+      </p:sp>
+      <p:sp>
+        <p:nvSpPr>
+          <p:cNvPr id="8" name="Content Placeholder 7">
+            <a:extLst>
+              <a:ext uri="{FF2B5EF4-FFF2-40B4-BE49-F238E27FC236}">
+                <a16:creationId xmlns:a16="http://schemas.microsoft.com/office/drawing/2014/main" id="{52BB1FAB-BB61-4B66-A4EA-A0EABC2B3ECA}"/>
+              </a:ext>
+            </a:extLst>
+          </p:cNvPr>
+          <p:cNvSpPr>
+            <a:spLocks noGrp="1"/>
+          </p:cNvSpPr>
+          <p:nvPr>
+            <p:ph idx="1"/>
+          </p:nvPr>
+        </p:nvSpPr>
+        <p:spPr/>
+        <p:txBody>
+          <a:bodyPr/>
+          <a:lstStyle/>
+          <a:p>
+            <a:r>
+              <a:rPr lang="en-US" dirty="0"/>
+              <a:t>Auto-Regressive Integrated Moving Average models</a:t>
+            </a:r>
+          </a:p>
+          <a:p>
+            <a:r>
+              <a:rPr lang="en-US" dirty="0"/>
+              <a:t>Pros:</a:t>
+            </a:r>
+          </a:p>
+          <a:p>
+            <a:pPr lvl="1"/>
+            <a:r>
+              <a:rPr lang="en-US" dirty="0"/>
+              <a:t>Great at producing flexible models, solid support of periodic behavior and trending</a:t>
+            </a:r>
+          </a:p>
+          <a:p>
+            <a:pPr lvl="1"/>
+            <a:r>
+              <a:rPr lang="en-US" dirty="0"/>
+              <a:t>Parameters are fairly easy to interpret</a:t>
+            </a:r>
+          </a:p>
+          <a:p>
+            <a:pPr lvl="1"/>
+            <a:r>
+              <a:rPr lang="en-US" dirty="0"/>
+              <a:t>Widely used and mathematically well-understood</a:t>
+            </a:r>
+          </a:p>
+          <a:p>
+            <a:r>
+              <a:rPr lang="en-US" dirty="0"/>
+              <a:t>Cons:</a:t>
+            </a:r>
+          </a:p>
+          <a:p>
+            <a:pPr lvl="1"/>
+            <a:r>
+              <a:rPr lang="en-US" dirty="0"/>
+              <a:t>Bit of a pain to figure out the right parameters</a:t>
+            </a:r>
+          </a:p>
+          <a:p>
+            <a:pPr lvl="1"/>
+            <a:r>
+              <a:rPr lang="en-US" dirty="0"/>
+              <a:t>Not great at dealing with holidays, </a:t>
+            </a:r>
+            <a:r>
+              <a:rPr lang="en-US" dirty="0" err="1"/>
+              <a:t>etc</a:t>
+            </a:r>
+            <a:endParaRPr lang="en-US" dirty="0"/>
+          </a:p>
+        </p:txBody>
+      </p:sp>
+      <p:sp>
+        <p:nvSpPr>
+          <p:cNvPr id="4" name="Date Placeholder 3">
+            <a:extLst>
+              <a:ext uri="{FF2B5EF4-FFF2-40B4-BE49-F238E27FC236}">
+                <a16:creationId xmlns:a16="http://schemas.microsoft.com/office/drawing/2014/main" id="{02256D86-7CE0-416E-B2A3-402D20EE9E90}"/>
+              </a:ext>
+            </a:extLst>
+          </p:cNvPr>
+          <p:cNvSpPr>
+            <a:spLocks noGrp="1"/>
+          </p:cNvSpPr>
+          <p:nvPr>
+            <p:ph type="dt" sz="half" idx="10"/>
+          </p:nvPr>
+        </p:nvSpPr>
+        <p:spPr/>
+        <p:txBody>
+          <a:bodyPr/>
+          <a:lstStyle/>
+          <a:p>
+            <a:fld id="{B08FEED8-D7D4-44E9-BFBC-ED06B5996D94}" type="datetime4">
+              <a:rPr lang="en-US" smtClean="0"/>
+              <a:t>July 29, 2019</a:t>
+            </a:fld>
+            <a:endParaRPr lang="en-US" dirty="0"/>
+          </a:p>
+        </p:txBody>
+      </p:sp>
+      <p:sp>
+        <p:nvSpPr>
+          <p:cNvPr id="5" name="Footer Placeholder 4">
+            <a:extLst>
+              <a:ext uri="{FF2B5EF4-FFF2-40B4-BE49-F238E27FC236}">
+                <a16:creationId xmlns:a16="http://schemas.microsoft.com/office/drawing/2014/main" id="{1D4ED112-7CF4-4BB9-B46E-B366A5054A9A}"/>
+              </a:ext>
+            </a:extLst>
+          </p:cNvPr>
+          <p:cNvSpPr>
+            <a:spLocks noGrp="1"/>
+          </p:cNvSpPr>
+          <p:nvPr>
+            <p:ph type="ftr" sz="quarter" idx="11"/>
+          </p:nvPr>
+        </p:nvSpPr>
+        <p:spPr/>
+        <p:txBody>
+          <a:bodyPr/>
+          <a:lstStyle/>
+          <a:p>
+            <a:r>
+              <a:rPr lang="en-US"/>
+              <a:t>Digital Scholarship Services </a:t>
+            </a:r>
+            <a:r>
+              <a:rPr lang="en-US">
+                <a:solidFill>
+                  <a:schemeClr val="accent1">
+                    <a:lumMod val="50000"/>
+                  </a:schemeClr>
+                </a:solidFill>
+              </a:rPr>
+              <a:t>| Email</a:t>
+            </a:r>
+            <a:r>
+              <a:rPr lang="en-US"/>
+              <a:t> cf24@rice.edu </a:t>
+            </a:r>
+            <a:r>
+              <a:rPr lang="en-US">
+                <a:solidFill>
+                  <a:schemeClr val="accent1">
+                    <a:lumMod val="50000"/>
+                  </a:schemeClr>
+                </a:solidFill>
+              </a:rPr>
+              <a:t>|</a:t>
+            </a:r>
+            <a:r>
+              <a:rPr lang="en-US"/>
+              <a:t> library.rice.edu/dss</a:t>
+            </a:r>
+            <a:endParaRPr lang="en-US" dirty="0"/>
+          </a:p>
+        </p:txBody>
+      </p:sp>
+      <p:sp>
+        <p:nvSpPr>
+          <p:cNvPr id="6" name="Slide Number Placeholder 5">
+            <a:extLst>
+              <a:ext uri="{FF2B5EF4-FFF2-40B4-BE49-F238E27FC236}">
+                <a16:creationId xmlns:a16="http://schemas.microsoft.com/office/drawing/2014/main" id="{8CC75551-85BF-4C9F-8893-AA28ECA8A6B5}"/>
+              </a:ext>
+            </a:extLst>
+          </p:cNvPr>
+          <p:cNvSpPr>
+            <a:spLocks noGrp="1"/>
+          </p:cNvSpPr>
+          <p:nvPr>
+            <p:ph type="sldNum" sz="quarter" idx="12"/>
+          </p:nvPr>
+        </p:nvSpPr>
+        <p:spPr/>
+        <p:txBody>
+          <a:bodyPr/>
+          <a:lstStyle/>
+          <a:p>
+            <a:fld id="{D57F1E4F-1CFF-5643-939E-02111984F565}" type="slidenum">
+              <a:rPr lang="en-US" smtClean="0"/>
+              <a:t>29</a:t>
+            </a:fld>
+            <a:endParaRPr lang="en-US" dirty="0"/>
+          </a:p>
+        </p:txBody>
+      </p:sp>
+    </p:spTree>
+    <p:extLst>
+      <p:ext uri="{BB962C8B-B14F-4D97-AF65-F5344CB8AC3E}">
+        <p14:creationId xmlns:p14="http://schemas.microsoft.com/office/powerpoint/2010/main" val="1065550565"/>
       </p:ext>
     </p:extLst>
   </p:cSld>
@@ -7870,6 +8635,2169 @@
     <p:extLst>
       <p:ext uri="{BB962C8B-B14F-4D97-AF65-F5344CB8AC3E}">
         <p14:creationId xmlns:p14="http://schemas.microsoft.com/office/powerpoint/2010/main" val="3077278940"/>
+      </p:ext>
+    </p:extLst>
+  </p:cSld>
+  <p:clrMapOvr>
+    <a:masterClrMapping/>
+  </p:clrMapOvr>
+</p:sld>
+</file>
+
+<file path=ppt/slides/slide30.xml><?xml version="1.0" encoding="utf-8"?>
+<p:sld xmlns:a="http://schemas.openxmlformats.org/drawingml/2006/main" xmlns:r="http://schemas.openxmlformats.org/officeDocument/2006/relationships" xmlns:p="http://schemas.openxmlformats.org/presentationml/2006/main">
+  <p:cSld>
+    <p:spTree>
+      <p:nvGrpSpPr>
+        <p:cNvPr id="1" name=""/>
+        <p:cNvGrpSpPr/>
+        <p:nvPr/>
+      </p:nvGrpSpPr>
+      <p:grpSpPr>
+        <a:xfrm>
+          <a:off x="0" y="0"/>
+          <a:ext cx="0" cy="0"/>
+          <a:chOff x="0" y="0"/>
+          <a:chExt cx="0" cy="0"/>
+        </a:xfrm>
+      </p:grpSpPr>
+      <p:sp>
+        <p:nvSpPr>
+          <p:cNvPr id="7" name="Title 6">
+            <a:extLst>
+              <a:ext uri="{FF2B5EF4-FFF2-40B4-BE49-F238E27FC236}">
+                <a16:creationId xmlns:a16="http://schemas.microsoft.com/office/drawing/2014/main" id="{75C0DCD3-95F8-4E1F-BF1A-5FAAB84A40A3}"/>
+              </a:ext>
+            </a:extLst>
+          </p:cNvPr>
+          <p:cNvSpPr>
+            <a:spLocks noGrp="1"/>
+          </p:cNvSpPr>
+          <p:nvPr>
+            <p:ph type="title"/>
+          </p:nvPr>
+        </p:nvSpPr>
+        <p:spPr/>
+        <p:txBody>
+          <a:bodyPr/>
+          <a:lstStyle/>
+          <a:p>
+            <a:r>
+              <a:rPr lang="en-US" dirty="0"/>
+              <a:t>AUTOREGRESSIVE</a:t>
+            </a:r>
+          </a:p>
+        </p:txBody>
+      </p:sp>
+      <p:sp>
+        <p:nvSpPr>
+          <p:cNvPr id="8" name="Content Placeholder 7">
+            <a:extLst>
+              <a:ext uri="{FF2B5EF4-FFF2-40B4-BE49-F238E27FC236}">
+                <a16:creationId xmlns:a16="http://schemas.microsoft.com/office/drawing/2014/main" id="{52BB1FAB-BB61-4B66-A4EA-A0EABC2B3ECA}"/>
+              </a:ext>
+            </a:extLst>
+          </p:cNvPr>
+          <p:cNvSpPr>
+            <a:spLocks noGrp="1"/>
+          </p:cNvSpPr>
+          <p:nvPr>
+            <p:ph idx="1"/>
+          </p:nvPr>
+        </p:nvSpPr>
+        <p:spPr/>
+        <p:txBody>
+          <a:bodyPr/>
+          <a:lstStyle/>
+          <a:p>
+            <a:endParaRPr lang="en-US"/>
+          </a:p>
+        </p:txBody>
+      </p:sp>
+      <p:sp>
+        <p:nvSpPr>
+          <p:cNvPr id="4" name="Date Placeholder 3">
+            <a:extLst>
+              <a:ext uri="{FF2B5EF4-FFF2-40B4-BE49-F238E27FC236}">
+                <a16:creationId xmlns:a16="http://schemas.microsoft.com/office/drawing/2014/main" id="{02256D86-7CE0-416E-B2A3-402D20EE9E90}"/>
+              </a:ext>
+            </a:extLst>
+          </p:cNvPr>
+          <p:cNvSpPr>
+            <a:spLocks noGrp="1"/>
+          </p:cNvSpPr>
+          <p:nvPr>
+            <p:ph type="dt" sz="half" idx="10"/>
+          </p:nvPr>
+        </p:nvSpPr>
+        <p:spPr/>
+        <p:txBody>
+          <a:bodyPr/>
+          <a:lstStyle/>
+          <a:p>
+            <a:fld id="{B08FEED8-D7D4-44E9-BFBC-ED06B5996D94}" type="datetime4">
+              <a:rPr lang="en-US" smtClean="0"/>
+              <a:t>July 29, 2019</a:t>
+            </a:fld>
+            <a:endParaRPr lang="en-US" dirty="0"/>
+          </a:p>
+        </p:txBody>
+      </p:sp>
+      <p:sp>
+        <p:nvSpPr>
+          <p:cNvPr id="5" name="Footer Placeholder 4">
+            <a:extLst>
+              <a:ext uri="{FF2B5EF4-FFF2-40B4-BE49-F238E27FC236}">
+                <a16:creationId xmlns:a16="http://schemas.microsoft.com/office/drawing/2014/main" id="{1D4ED112-7CF4-4BB9-B46E-B366A5054A9A}"/>
+              </a:ext>
+            </a:extLst>
+          </p:cNvPr>
+          <p:cNvSpPr>
+            <a:spLocks noGrp="1"/>
+          </p:cNvSpPr>
+          <p:nvPr>
+            <p:ph type="ftr" sz="quarter" idx="11"/>
+          </p:nvPr>
+        </p:nvSpPr>
+        <p:spPr/>
+        <p:txBody>
+          <a:bodyPr/>
+          <a:lstStyle/>
+          <a:p>
+            <a:r>
+              <a:rPr lang="en-US"/>
+              <a:t>Digital Scholarship Services </a:t>
+            </a:r>
+            <a:r>
+              <a:rPr lang="en-US">
+                <a:solidFill>
+                  <a:schemeClr val="accent1">
+                    <a:lumMod val="50000"/>
+                  </a:schemeClr>
+                </a:solidFill>
+              </a:rPr>
+              <a:t>| Email</a:t>
+            </a:r>
+            <a:r>
+              <a:rPr lang="en-US"/>
+              <a:t> cf24@rice.edu </a:t>
+            </a:r>
+            <a:r>
+              <a:rPr lang="en-US">
+                <a:solidFill>
+                  <a:schemeClr val="accent1">
+                    <a:lumMod val="50000"/>
+                  </a:schemeClr>
+                </a:solidFill>
+              </a:rPr>
+              <a:t>|</a:t>
+            </a:r>
+            <a:r>
+              <a:rPr lang="en-US"/>
+              <a:t> library.rice.edu/dss</a:t>
+            </a:r>
+            <a:endParaRPr lang="en-US" dirty="0"/>
+          </a:p>
+        </p:txBody>
+      </p:sp>
+      <p:sp>
+        <p:nvSpPr>
+          <p:cNvPr id="6" name="Slide Number Placeholder 5">
+            <a:extLst>
+              <a:ext uri="{FF2B5EF4-FFF2-40B4-BE49-F238E27FC236}">
+                <a16:creationId xmlns:a16="http://schemas.microsoft.com/office/drawing/2014/main" id="{8CC75551-85BF-4C9F-8893-AA28ECA8A6B5}"/>
+              </a:ext>
+            </a:extLst>
+          </p:cNvPr>
+          <p:cNvSpPr>
+            <a:spLocks noGrp="1"/>
+          </p:cNvSpPr>
+          <p:nvPr>
+            <p:ph type="sldNum" sz="quarter" idx="12"/>
+          </p:nvPr>
+        </p:nvSpPr>
+        <p:spPr/>
+        <p:txBody>
+          <a:bodyPr/>
+          <a:lstStyle/>
+          <a:p>
+            <a:fld id="{D57F1E4F-1CFF-5643-939E-02111984F565}" type="slidenum">
+              <a:rPr lang="en-US" smtClean="0"/>
+              <a:t>30</a:t>
+            </a:fld>
+            <a:endParaRPr lang="en-US" dirty="0"/>
+          </a:p>
+        </p:txBody>
+      </p:sp>
+    </p:spTree>
+    <p:extLst>
+      <p:ext uri="{BB962C8B-B14F-4D97-AF65-F5344CB8AC3E}">
+        <p14:creationId xmlns:p14="http://schemas.microsoft.com/office/powerpoint/2010/main" val="4066560549"/>
+      </p:ext>
+    </p:extLst>
+  </p:cSld>
+  <p:clrMapOvr>
+    <a:masterClrMapping/>
+  </p:clrMapOvr>
+</p:sld>
+</file>
+
+<file path=ppt/slides/slide31.xml><?xml version="1.0" encoding="utf-8"?>
+<p:sld xmlns:a="http://schemas.openxmlformats.org/drawingml/2006/main" xmlns:r="http://schemas.openxmlformats.org/officeDocument/2006/relationships" xmlns:p="http://schemas.openxmlformats.org/presentationml/2006/main">
+  <p:cSld>
+    <p:spTree>
+      <p:nvGrpSpPr>
+        <p:cNvPr id="1" name=""/>
+        <p:cNvGrpSpPr/>
+        <p:nvPr/>
+      </p:nvGrpSpPr>
+      <p:grpSpPr>
+        <a:xfrm>
+          <a:off x="0" y="0"/>
+          <a:ext cx="0" cy="0"/>
+          <a:chOff x="0" y="0"/>
+          <a:chExt cx="0" cy="0"/>
+        </a:xfrm>
+      </p:grpSpPr>
+      <p:sp>
+        <p:nvSpPr>
+          <p:cNvPr id="2" name="Title 1">
+            <a:extLst>
+              <a:ext uri="{FF2B5EF4-FFF2-40B4-BE49-F238E27FC236}">
+                <a16:creationId xmlns:a16="http://schemas.microsoft.com/office/drawing/2014/main" id="{D7EACF90-3E7B-4978-AB0C-ED5165419D19}"/>
+              </a:ext>
+            </a:extLst>
+          </p:cNvPr>
+          <p:cNvSpPr>
+            <a:spLocks noGrp="1"/>
+          </p:cNvSpPr>
+          <p:nvPr>
+            <p:ph type="title"/>
+          </p:nvPr>
+        </p:nvSpPr>
+        <p:spPr/>
+        <p:txBody>
+          <a:bodyPr/>
+          <a:lstStyle/>
+          <a:p>
+            <a:r>
+              <a:rPr lang="en-US" dirty="0"/>
+              <a:t>MOVING AVERAGE</a:t>
+            </a:r>
+          </a:p>
+        </p:txBody>
+      </p:sp>
+      <p:sp>
+        <p:nvSpPr>
+          <p:cNvPr id="3" name="Content Placeholder 2">
+            <a:extLst>
+              <a:ext uri="{FF2B5EF4-FFF2-40B4-BE49-F238E27FC236}">
+                <a16:creationId xmlns:a16="http://schemas.microsoft.com/office/drawing/2014/main" id="{A7CEFEF5-E74A-4EFE-9368-8FD74B059E10}"/>
+              </a:ext>
+            </a:extLst>
+          </p:cNvPr>
+          <p:cNvSpPr>
+            <a:spLocks noGrp="1"/>
+          </p:cNvSpPr>
+          <p:nvPr>
+            <p:ph idx="1"/>
+          </p:nvPr>
+        </p:nvSpPr>
+        <p:spPr/>
+        <p:txBody>
+          <a:bodyPr/>
+          <a:lstStyle/>
+          <a:p>
+            <a:endParaRPr lang="en-US"/>
+          </a:p>
+        </p:txBody>
+      </p:sp>
+      <p:sp>
+        <p:nvSpPr>
+          <p:cNvPr id="4" name="Date Placeholder 3">
+            <a:extLst>
+              <a:ext uri="{FF2B5EF4-FFF2-40B4-BE49-F238E27FC236}">
+                <a16:creationId xmlns:a16="http://schemas.microsoft.com/office/drawing/2014/main" id="{64E0A09F-EC7A-4EF6-AB3A-0DC48B1B7271}"/>
+              </a:ext>
+            </a:extLst>
+          </p:cNvPr>
+          <p:cNvSpPr>
+            <a:spLocks noGrp="1"/>
+          </p:cNvSpPr>
+          <p:nvPr>
+            <p:ph type="dt" sz="half" idx="10"/>
+          </p:nvPr>
+        </p:nvSpPr>
+        <p:spPr/>
+        <p:txBody>
+          <a:bodyPr/>
+          <a:lstStyle/>
+          <a:p>
+            <a:fld id="{8AAE40A0-A7D8-4DC3-BC9E-BADA32DA2004}" type="datetime4">
+              <a:rPr lang="en-US" smtClean="0"/>
+              <a:t>July 29, 2019</a:t>
+            </a:fld>
+            <a:endParaRPr lang="en-US" dirty="0"/>
+          </a:p>
+        </p:txBody>
+      </p:sp>
+      <p:sp>
+        <p:nvSpPr>
+          <p:cNvPr id="5" name="Footer Placeholder 4">
+            <a:extLst>
+              <a:ext uri="{FF2B5EF4-FFF2-40B4-BE49-F238E27FC236}">
+                <a16:creationId xmlns:a16="http://schemas.microsoft.com/office/drawing/2014/main" id="{9D8B7F07-2C50-4473-BABC-57C52FDD38D2}"/>
+              </a:ext>
+            </a:extLst>
+          </p:cNvPr>
+          <p:cNvSpPr>
+            <a:spLocks noGrp="1"/>
+          </p:cNvSpPr>
+          <p:nvPr>
+            <p:ph type="ftr" sz="quarter" idx="11"/>
+          </p:nvPr>
+        </p:nvSpPr>
+        <p:spPr/>
+        <p:txBody>
+          <a:bodyPr/>
+          <a:lstStyle/>
+          <a:p>
+            <a:r>
+              <a:rPr lang="en-US"/>
+              <a:t>Digital Scholarship Services </a:t>
+            </a:r>
+            <a:r>
+              <a:rPr lang="en-US">
+                <a:solidFill>
+                  <a:schemeClr val="accent1">
+                    <a:lumMod val="50000"/>
+                  </a:schemeClr>
+                </a:solidFill>
+              </a:rPr>
+              <a:t>| Email</a:t>
+            </a:r>
+            <a:r>
+              <a:rPr lang="en-US"/>
+              <a:t> cf24@rice.edu </a:t>
+            </a:r>
+            <a:r>
+              <a:rPr lang="en-US">
+                <a:solidFill>
+                  <a:schemeClr val="accent1">
+                    <a:lumMod val="50000"/>
+                  </a:schemeClr>
+                </a:solidFill>
+              </a:rPr>
+              <a:t>|</a:t>
+            </a:r>
+            <a:r>
+              <a:rPr lang="en-US"/>
+              <a:t> library.rice.edu/dss</a:t>
+            </a:r>
+            <a:endParaRPr lang="en-US" dirty="0"/>
+          </a:p>
+        </p:txBody>
+      </p:sp>
+      <p:sp>
+        <p:nvSpPr>
+          <p:cNvPr id="6" name="Slide Number Placeholder 5">
+            <a:extLst>
+              <a:ext uri="{FF2B5EF4-FFF2-40B4-BE49-F238E27FC236}">
+                <a16:creationId xmlns:a16="http://schemas.microsoft.com/office/drawing/2014/main" id="{6BE5E43E-0696-4C60-A72C-BBB5B4448760}"/>
+              </a:ext>
+            </a:extLst>
+          </p:cNvPr>
+          <p:cNvSpPr>
+            <a:spLocks noGrp="1"/>
+          </p:cNvSpPr>
+          <p:nvPr>
+            <p:ph type="sldNum" sz="quarter" idx="12"/>
+          </p:nvPr>
+        </p:nvSpPr>
+        <p:spPr/>
+        <p:txBody>
+          <a:bodyPr/>
+          <a:lstStyle/>
+          <a:p>
+            <a:fld id="{D57F1E4F-1CFF-5643-939E-02111984F565}" type="slidenum">
+              <a:rPr lang="en-US" smtClean="0"/>
+              <a:t>31</a:t>
+            </a:fld>
+            <a:endParaRPr lang="en-US" dirty="0"/>
+          </a:p>
+        </p:txBody>
+      </p:sp>
+    </p:spTree>
+    <p:extLst>
+      <p:ext uri="{BB962C8B-B14F-4D97-AF65-F5344CB8AC3E}">
+        <p14:creationId xmlns:p14="http://schemas.microsoft.com/office/powerpoint/2010/main" val="3521777765"/>
+      </p:ext>
+    </p:extLst>
+  </p:cSld>
+  <p:clrMapOvr>
+    <a:masterClrMapping/>
+  </p:clrMapOvr>
+</p:sld>
+</file>
+
+<file path=ppt/slides/slide32.xml><?xml version="1.0" encoding="utf-8"?>
+<p:sld xmlns:a="http://schemas.openxmlformats.org/drawingml/2006/main" xmlns:r="http://schemas.openxmlformats.org/officeDocument/2006/relationships" xmlns:p="http://schemas.openxmlformats.org/presentationml/2006/main">
+  <p:cSld>
+    <p:spTree>
+      <p:nvGrpSpPr>
+        <p:cNvPr id="1" name=""/>
+        <p:cNvGrpSpPr/>
+        <p:nvPr/>
+      </p:nvGrpSpPr>
+      <p:grpSpPr>
+        <a:xfrm>
+          <a:off x="0" y="0"/>
+          <a:ext cx="0" cy="0"/>
+          <a:chOff x="0" y="0"/>
+          <a:chExt cx="0" cy="0"/>
+        </a:xfrm>
+      </p:grpSpPr>
+      <p:sp>
+        <p:nvSpPr>
+          <p:cNvPr id="2" name="Title 1">
+            <a:extLst>
+              <a:ext uri="{FF2B5EF4-FFF2-40B4-BE49-F238E27FC236}">
+                <a16:creationId xmlns:a16="http://schemas.microsoft.com/office/drawing/2014/main" id="{84FE5820-4288-4CB6-888A-5CBF5468888C}"/>
+              </a:ext>
+            </a:extLst>
+          </p:cNvPr>
+          <p:cNvSpPr>
+            <a:spLocks noGrp="1"/>
+          </p:cNvSpPr>
+          <p:nvPr>
+            <p:ph type="title"/>
+          </p:nvPr>
+        </p:nvSpPr>
+        <p:spPr/>
+        <p:txBody>
+          <a:bodyPr/>
+          <a:lstStyle/>
+          <a:p>
+            <a:r>
+              <a:rPr lang="en-US" dirty="0"/>
+              <a:t>AUTOCORRELATION PLOTS</a:t>
+            </a:r>
+          </a:p>
+        </p:txBody>
+      </p:sp>
+      <p:sp>
+        <p:nvSpPr>
+          <p:cNvPr id="3" name="Content Placeholder 2">
+            <a:extLst>
+              <a:ext uri="{FF2B5EF4-FFF2-40B4-BE49-F238E27FC236}">
+                <a16:creationId xmlns:a16="http://schemas.microsoft.com/office/drawing/2014/main" id="{2952943F-FC31-4BE3-AB00-BAB4B12957BE}"/>
+              </a:ext>
+            </a:extLst>
+          </p:cNvPr>
+          <p:cNvSpPr>
+            <a:spLocks noGrp="1"/>
+          </p:cNvSpPr>
+          <p:nvPr>
+            <p:ph idx="1"/>
+          </p:nvPr>
+        </p:nvSpPr>
+        <p:spPr/>
+        <p:txBody>
+          <a:bodyPr/>
+          <a:lstStyle/>
+          <a:p>
+            <a:endParaRPr lang="en-US" dirty="0"/>
+          </a:p>
+        </p:txBody>
+      </p:sp>
+      <p:sp>
+        <p:nvSpPr>
+          <p:cNvPr id="4" name="Date Placeholder 3">
+            <a:extLst>
+              <a:ext uri="{FF2B5EF4-FFF2-40B4-BE49-F238E27FC236}">
+                <a16:creationId xmlns:a16="http://schemas.microsoft.com/office/drawing/2014/main" id="{F716348B-D7FE-46ED-8C48-CF5A55FF31CF}"/>
+              </a:ext>
+            </a:extLst>
+          </p:cNvPr>
+          <p:cNvSpPr>
+            <a:spLocks noGrp="1"/>
+          </p:cNvSpPr>
+          <p:nvPr>
+            <p:ph type="dt" sz="half" idx="10"/>
+          </p:nvPr>
+        </p:nvSpPr>
+        <p:spPr/>
+        <p:txBody>
+          <a:bodyPr/>
+          <a:lstStyle/>
+          <a:p>
+            <a:fld id="{8AAE40A0-A7D8-4DC3-BC9E-BADA32DA2004}" type="datetime4">
+              <a:rPr lang="en-US" smtClean="0"/>
+              <a:t>July 29, 2019</a:t>
+            </a:fld>
+            <a:endParaRPr lang="en-US" dirty="0"/>
+          </a:p>
+        </p:txBody>
+      </p:sp>
+      <p:sp>
+        <p:nvSpPr>
+          <p:cNvPr id="5" name="Footer Placeholder 4">
+            <a:extLst>
+              <a:ext uri="{FF2B5EF4-FFF2-40B4-BE49-F238E27FC236}">
+                <a16:creationId xmlns:a16="http://schemas.microsoft.com/office/drawing/2014/main" id="{34059279-A1E7-4F19-B4BF-8C6B59A4CEFF}"/>
+              </a:ext>
+            </a:extLst>
+          </p:cNvPr>
+          <p:cNvSpPr>
+            <a:spLocks noGrp="1"/>
+          </p:cNvSpPr>
+          <p:nvPr>
+            <p:ph type="ftr" sz="quarter" idx="11"/>
+          </p:nvPr>
+        </p:nvSpPr>
+        <p:spPr/>
+        <p:txBody>
+          <a:bodyPr/>
+          <a:lstStyle/>
+          <a:p>
+            <a:r>
+              <a:rPr lang="en-US"/>
+              <a:t>Digital Scholarship Services </a:t>
+            </a:r>
+            <a:r>
+              <a:rPr lang="en-US">
+                <a:solidFill>
+                  <a:schemeClr val="accent1">
+                    <a:lumMod val="50000"/>
+                  </a:schemeClr>
+                </a:solidFill>
+              </a:rPr>
+              <a:t>| Email</a:t>
+            </a:r>
+            <a:r>
+              <a:rPr lang="en-US"/>
+              <a:t> cf24@rice.edu </a:t>
+            </a:r>
+            <a:r>
+              <a:rPr lang="en-US">
+                <a:solidFill>
+                  <a:schemeClr val="accent1">
+                    <a:lumMod val="50000"/>
+                  </a:schemeClr>
+                </a:solidFill>
+              </a:rPr>
+              <a:t>|</a:t>
+            </a:r>
+            <a:r>
+              <a:rPr lang="en-US"/>
+              <a:t> library.rice.edu/dss</a:t>
+            </a:r>
+            <a:endParaRPr lang="en-US" dirty="0"/>
+          </a:p>
+        </p:txBody>
+      </p:sp>
+      <p:sp>
+        <p:nvSpPr>
+          <p:cNvPr id="6" name="Slide Number Placeholder 5">
+            <a:extLst>
+              <a:ext uri="{FF2B5EF4-FFF2-40B4-BE49-F238E27FC236}">
+                <a16:creationId xmlns:a16="http://schemas.microsoft.com/office/drawing/2014/main" id="{DE722C41-7366-4DE2-9AF4-E75E189A7733}"/>
+              </a:ext>
+            </a:extLst>
+          </p:cNvPr>
+          <p:cNvSpPr>
+            <a:spLocks noGrp="1"/>
+          </p:cNvSpPr>
+          <p:nvPr>
+            <p:ph type="sldNum" sz="quarter" idx="12"/>
+          </p:nvPr>
+        </p:nvSpPr>
+        <p:spPr/>
+        <p:txBody>
+          <a:bodyPr/>
+          <a:lstStyle/>
+          <a:p>
+            <a:fld id="{D57F1E4F-1CFF-5643-939E-02111984F565}" type="slidenum">
+              <a:rPr lang="en-US" smtClean="0"/>
+              <a:t>32</a:t>
+            </a:fld>
+            <a:endParaRPr lang="en-US" dirty="0"/>
+          </a:p>
+        </p:txBody>
+      </p:sp>
+    </p:spTree>
+    <p:extLst>
+      <p:ext uri="{BB962C8B-B14F-4D97-AF65-F5344CB8AC3E}">
+        <p14:creationId xmlns:p14="http://schemas.microsoft.com/office/powerpoint/2010/main" val="2546350057"/>
+      </p:ext>
+    </p:extLst>
+  </p:cSld>
+  <p:clrMapOvr>
+    <a:masterClrMapping/>
+  </p:clrMapOvr>
+</p:sld>
+</file>
+
+<file path=ppt/slides/slide33.xml><?xml version="1.0" encoding="utf-8"?>
+<p:sld xmlns:a="http://schemas.openxmlformats.org/drawingml/2006/main" xmlns:r="http://schemas.openxmlformats.org/officeDocument/2006/relationships" xmlns:p="http://schemas.openxmlformats.org/presentationml/2006/main">
+  <p:cSld>
+    <p:spTree>
+      <p:nvGrpSpPr>
+        <p:cNvPr id="1" name=""/>
+        <p:cNvGrpSpPr/>
+        <p:nvPr/>
+      </p:nvGrpSpPr>
+      <p:grpSpPr>
+        <a:xfrm>
+          <a:off x="0" y="0"/>
+          <a:ext cx="0" cy="0"/>
+          <a:chOff x="0" y="0"/>
+          <a:chExt cx="0" cy="0"/>
+        </a:xfrm>
+      </p:grpSpPr>
+      <p:sp>
+        <p:nvSpPr>
+          <p:cNvPr id="2" name="Title 1">
+            <a:extLst>
+              <a:ext uri="{FF2B5EF4-FFF2-40B4-BE49-F238E27FC236}">
+                <a16:creationId xmlns:a16="http://schemas.microsoft.com/office/drawing/2014/main" id="{84FE5820-4288-4CB6-888A-5CBF5468888C}"/>
+              </a:ext>
+            </a:extLst>
+          </p:cNvPr>
+          <p:cNvSpPr>
+            <a:spLocks noGrp="1"/>
+          </p:cNvSpPr>
+          <p:nvPr>
+            <p:ph type="title"/>
+          </p:nvPr>
+        </p:nvSpPr>
+        <p:spPr/>
+        <p:txBody>
+          <a:bodyPr/>
+          <a:lstStyle/>
+          <a:p>
+            <a:r>
+              <a:rPr lang="en-US" dirty="0"/>
+              <a:t>PARTIAL AUTOCORRELATION PLOTS</a:t>
+            </a:r>
+          </a:p>
+        </p:txBody>
+      </p:sp>
+      <p:sp>
+        <p:nvSpPr>
+          <p:cNvPr id="3" name="Content Placeholder 2">
+            <a:extLst>
+              <a:ext uri="{FF2B5EF4-FFF2-40B4-BE49-F238E27FC236}">
+                <a16:creationId xmlns:a16="http://schemas.microsoft.com/office/drawing/2014/main" id="{2952943F-FC31-4BE3-AB00-BAB4B12957BE}"/>
+              </a:ext>
+            </a:extLst>
+          </p:cNvPr>
+          <p:cNvSpPr>
+            <a:spLocks noGrp="1"/>
+          </p:cNvSpPr>
+          <p:nvPr>
+            <p:ph idx="1"/>
+          </p:nvPr>
+        </p:nvSpPr>
+        <p:spPr/>
+        <p:txBody>
+          <a:bodyPr/>
+          <a:lstStyle/>
+          <a:p>
+            <a:endParaRPr lang="en-US" dirty="0"/>
+          </a:p>
+        </p:txBody>
+      </p:sp>
+      <p:sp>
+        <p:nvSpPr>
+          <p:cNvPr id="4" name="Date Placeholder 3">
+            <a:extLst>
+              <a:ext uri="{FF2B5EF4-FFF2-40B4-BE49-F238E27FC236}">
+                <a16:creationId xmlns:a16="http://schemas.microsoft.com/office/drawing/2014/main" id="{F716348B-D7FE-46ED-8C48-CF5A55FF31CF}"/>
+              </a:ext>
+            </a:extLst>
+          </p:cNvPr>
+          <p:cNvSpPr>
+            <a:spLocks noGrp="1"/>
+          </p:cNvSpPr>
+          <p:nvPr>
+            <p:ph type="dt" sz="half" idx="10"/>
+          </p:nvPr>
+        </p:nvSpPr>
+        <p:spPr/>
+        <p:txBody>
+          <a:bodyPr/>
+          <a:lstStyle/>
+          <a:p>
+            <a:fld id="{8AAE40A0-A7D8-4DC3-BC9E-BADA32DA2004}" type="datetime4">
+              <a:rPr lang="en-US" smtClean="0"/>
+              <a:t>July 29, 2019</a:t>
+            </a:fld>
+            <a:endParaRPr lang="en-US" dirty="0"/>
+          </a:p>
+        </p:txBody>
+      </p:sp>
+      <p:sp>
+        <p:nvSpPr>
+          <p:cNvPr id="5" name="Footer Placeholder 4">
+            <a:extLst>
+              <a:ext uri="{FF2B5EF4-FFF2-40B4-BE49-F238E27FC236}">
+                <a16:creationId xmlns:a16="http://schemas.microsoft.com/office/drawing/2014/main" id="{34059279-A1E7-4F19-B4BF-8C6B59A4CEFF}"/>
+              </a:ext>
+            </a:extLst>
+          </p:cNvPr>
+          <p:cNvSpPr>
+            <a:spLocks noGrp="1"/>
+          </p:cNvSpPr>
+          <p:nvPr>
+            <p:ph type="ftr" sz="quarter" idx="11"/>
+          </p:nvPr>
+        </p:nvSpPr>
+        <p:spPr/>
+        <p:txBody>
+          <a:bodyPr/>
+          <a:lstStyle/>
+          <a:p>
+            <a:r>
+              <a:rPr lang="en-US"/>
+              <a:t>Digital Scholarship Services </a:t>
+            </a:r>
+            <a:r>
+              <a:rPr lang="en-US">
+                <a:solidFill>
+                  <a:schemeClr val="accent1">
+                    <a:lumMod val="50000"/>
+                  </a:schemeClr>
+                </a:solidFill>
+              </a:rPr>
+              <a:t>| Email</a:t>
+            </a:r>
+            <a:r>
+              <a:rPr lang="en-US"/>
+              <a:t> cf24@rice.edu </a:t>
+            </a:r>
+            <a:r>
+              <a:rPr lang="en-US">
+                <a:solidFill>
+                  <a:schemeClr val="accent1">
+                    <a:lumMod val="50000"/>
+                  </a:schemeClr>
+                </a:solidFill>
+              </a:rPr>
+              <a:t>|</a:t>
+            </a:r>
+            <a:r>
+              <a:rPr lang="en-US"/>
+              <a:t> library.rice.edu/dss</a:t>
+            </a:r>
+            <a:endParaRPr lang="en-US" dirty="0"/>
+          </a:p>
+        </p:txBody>
+      </p:sp>
+      <p:sp>
+        <p:nvSpPr>
+          <p:cNvPr id="6" name="Slide Number Placeholder 5">
+            <a:extLst>
+              <a:ext uri="{FF2B5EF4-FFF2-40B4-BE49-F238E27FC236}">
+                <a16:creationId xmlns:a16="http://schemas.microsoft.com/office/drawing/2014/main" id="{DE722C41-7366-4DE2-9AF4-E75E189A7733}"/>
+              </a:ext>
+            </a:extLst>
+          </p:cNvPr>
+          <p:cNvSpPr>
+            <a:spLocks noGrp="1"/>
+          </p:cNvSpPr>
+          <p:nvPr>
+            <p:ph type="sldNum" sz="quarter" idx="12"/>
+          </p:nvPr>
+        </p:nvSpPr>
+        <p:spPr/>
+        <p:txBody>
+          <a:bodyPr/>
+          <a:lstStyle/>
+          <a:p>
+            <a:fld id="{D57F1E4F-1CFF-5643-939E-02111984F565}" type="slidenum">
+              <a:rPr lang="en-US" smtClean="0"/>
+              <a:t>33</a:t>
+            </a:fld>
+            <a:endParaRPr lang="en-US" dirty="0"/>
+          </a:p>
+        </p:txBody>
+      </p:sp>
+    </p:spTree>
+    <p:extLst>
+      <p:ext uri="{BB962C8B-B14F-4D97-AF65-F5344CB8AC3E}">
+        <p14:creationId xmlns:p14="http://schemas.microsoft.com/office/powerpoint/2010/main" val="1481024644"/>
+      </p:ext>
+    </p:extLst>
+  </p:cSld>
+  <p:clrMapOvr>
+    <a:masterClrMapping/>
+  </p:clrMapOvr>
+</p:sld>
+</file>
+
+<file path=ppt/slides/slide34.xml><?xml version="1.0" encoding="utf-8"?>
+<p:sld xmlns:a="http://schemas.openxmlformats.org/drawingml/2006/main" xmlns:r="http://schemas.openxmlformats.org/officeDocument/2006/relationships" xmlns:p="http://schemas.openxmlformats.org/presentationml/2006/main">
+  <p:cSld>
+    <p:spTree>
+      <p:nvGrpSpPr>
+        <p:cNvPr id="1" name=""/>
+        <p:cNvGrpSpPr/>
+        <p:nvPr/>
+      </p:nvGrpSpPr>
+      <p:grpSpPr>
+        <a:xfrm>
+          <a:off x="0" y="0"/>
+          <a:ext cx="0" cy="0"/>
+          <a:chOff x="0" y="0"/>
+          <a:chExt cx="0" cy="0"/>
+        </a:xfrm>
+      </p:grpSpPr>
+      <p:sp>
+        <p:nvSpPr>
+          <p:cNvPr id="2" name="Title 1">
+            <a:extLst>
+              <a:ext uri="{FF2B5EF4-FFF2-40B4-BE49-F238E27FC236}">
+                <a16:creationId xmlns:a16="http://schemas.microsoft.com/office/drawing/2014/main" id="{D1BF0482-6913-4A5E-A533-479864CB5349}"/>
+              </a:ext>
+            </a:extLst>
+          </p:cNvPr>
+          <p:cNvSpPr>
+            <a:spLocks noGrp="1"/>
+          </p:cNvSpPr>
+          <p:nvPr>
+            <p:ph type="title"/>
+          </p:nvPr>
+        </p:nvSpPr>
+        <p:spPr/>
+        <p:txBody>
+          <a:bodyPr/>
+          <a:lstStyle/>
+          <a:p>
+            <a:r>
+              <a:rPr lang="en-US" dirty="0"/>
+              <a:t>PLAYING AROUND WITH ARIMA</a:t>
+            </a:r>
+          </a:p>
+        </p:txBody>
+      </p:sp>
+      <p:sp>
+        <p:nvSpPr>
+          <p:cNvPr id="3" name="Content Placeholder 2">
+            <a:extLst>
+              <a:ext uri="{FF2B5EF4-FFF2-40B4-BE49-F238E27FC236}">
+                <a16:creationId xmlns:a16="http://schemas.microsoft.com/office/drawing/2014/main" id="{D48271C9-2790-46C9-B80B-52D215430CB8}"/>
+              </a:ext>
+            </a:extLst>
+          </p:cNvPr>
+          <p:cNvSpPr>
+            <a:spLocks noGrp="1"/>
+          </p:cNvSpPr>
+          <p:nvPr>
+            <p:ph idx="1"/>
+          </p:nvPr>
+        </p:nvSpPr>
+        <p:spPr/>
+        <p:txBody>
+          <a:bodyPr/>
+          <a:lstStyle/>
+          <a:p>
+            <a:endParaRPr lang="en-US" dirty="0"/>
+          </a:p>
+        </p:txBody>
+      </p:sp>
+      <p:sp>
+        <p:nvSpPr>
+          <p:cNvPr id="4" name="Date Placeholder 3">
+            <a:extLst>
+              <a:ext uri="{FF2B5EF4-FFF2-40B4-BE49-F238E27FC236}">
+                <a16:creationId xmlns:a16="http://schemas.microsoft.com/office/drawing/2014/main" id="{B23DAF35-209C-48FA-AAAB-F69E14183A91}"/>
+              </a:ext>
+            </a:extLst>
+          </p:cNvPr>
+          <p:cNvSpPr>
+            <a:spLocks noGrp="1"/>
+          </p:cNvSpPr>
+          <p:nvPr>
+            <p:ph type="dt" sz="half" idx="10"/>
+          </p:nvPr>
+        </p:nvSpPr>
+        <p:spPr/>
+        <p:txBody>
+          <a:bodyPr/>
+          <a:lstStyle/>
+          <a:p>
+            <a:fld id="{8AAE40A0-A7D8-4DC3-BC9E-BADA32DA2004}" type="datetime4">
+              <a:rPr lang="en-US" smtClean="0"/>
+              <a:t>July 29, 2019</a:t>
+            </a:fld>
+            <a:endParaRPr lang="en-US" dirty="0"/>
+          </a:p>
+        </p:txBody>
+      </p:sp>
+      <p:sp>
+        <p:nvSpPr>
+          <p:cNvPr id="5" name="Footer Placeholder 4">
+            <a:extLst>
+              <a:ext uri="{FF2B5EF4-FFF2-40B4-BE49-F238E27FC236}">
+                <a16:creationId xmlns:a16="http://schemas.microsoft.com/office/drawing/2014/main" id="{3D8E22A6-180D-41CF-9959-4347A11F2AD1}"/>
+              </a:ext>
+            </a:extLst>
+          </p:cNvPr>
+          <p:cNvSpPr>
+            <a:spLocks noGrp="1"/>
+          </p:cNvSpPr>
+          <p:nvPr>
+            <p:ph type="ftr" sz="quarter" idx="11"/>
+          </p:nvPr>
+        </p:nvSpPr>
+        <p:spPr/>
+        <p:txBody>
+          <a:bodyPr/>
+          <a:lstStyle/>
+          <a:p>
+            <a:r>
+              <a:rPr lang="en-US"/>
+              <a:t>Digital Scholarship Services </a:t>
+            </a:r>
+            <a:r>
+              <a:rPr lang="en-US">
+                <a:solidFill>
+                  <a:schemeClr val="accent1">
+                    <a:lumMod val="50000"/>
+                  </a:schemeClr>
+                </a:solidFill>
+              </a:rPr>
+              <a:t>| Email</a:t>
+            </a:r>
+            <a:r>
+              <a:rPr lang="en-US"/>
+              <a:t> cf24@rice.edu </a:t>
+            </a:r>
+            <a:r>
+              <a:rPr lang="en-US">
+                <a:solidFill>
+                  <a:schemeClr val="accent1">
+                    <a:lumMod val="50000"/>
+                  </a:schemeClr>
+                </a:solidFill>
+              </a:rPr>
+              <a:t>|</a:t>
+            </a:r>
+            <a:r>
+              <a:rPr lang="en-US"/>
+              <a:t> library.rice.edu/dss</a:t>
+            </a:r>
+            <a:endParaRPr lang="en-US" dirty="0"/>
+          </a:p>
+        </p:txBody>
+      </p:sp>
+      <p:sp>
+        <p:nvSpPr>
+          <p:cNvPr id="6" name="Slide Number Placeholder 5">
+            <a:extLst>
+              <a:ext uri="{FF2B5EF4-FFF2-40B4-BE49-F238E27FC236}">
+                <a16:creationId xmlns:a16="http://schemas.microsoft.com/office/drawing/2014/main" id="{CECE3146-0C2B-4CC7-BC7C-FD23AAF7ECAE}"/>
+              </a:ext>
+            </a:extLst>
+          </p:cNvPr>
+          <p:cNvSpPr>
+            <a:spLocks noGrp="1"/>
+          </p:cNvSpPr>
+          <p:nvPr>
+            <p:ph type="sldNum" sz="quarter" idx="12"/>
+          </p:nvPr>
+        </p:nvSpPr>
+        <p:spPr/>
+        <p:txBody>
+          <a:bodyPr/>
+          <a:lstStyle/>
+          <a:p>
+            <a:fld id="{D57F1E4F-1CFF-5643-939E-02111984F565}" type="slidenum">
+              <a:rPr lang="en-US" smtClean="0"/>
+              <a:t>34</a:t>
+            </a:fld>
+            <a:endParaRPr lang="en-US" dirty="0"/>
+          </a:p>
+        </p:txBody>
+      </p:sp>
+    </p:spTree>
+    <p:extLst>
+      <p:ext uri="{BB962C8B-B14F-4D97-AF65-F5344CB8AC3E}">
+        <p14:creationId xmlns:p14="http://schemas.microsoft.com/office/powerpoint/2010/main" val="3624540971"/>
+      </p:ext>
+    </p:extLst>
+  </p:cSld>
+  <p:clrMapOvr>
+    <a:masterClrMapping/>
+  </p:clrMapOvr>
+</p:sld>
+</file>
+
+<file path=ppt/slides/slide35.xml><?xml version="1.0" encoding="utf-8"?>
+<p:sld xmlns:a="http://schemas.openxmlformats.org/drawingml/2006/main" xmlns:r="http://schemas.openxmlformats.org/officeDocument/2006/relationships" xmlns:p="http://schemas.openxmlformats.org/presentationml/2006/main">
+  <p:cSld>
+    <p:spTree>
+      <p:nvGrpSpPr>
+        <p:cNvPr id="1" name=""/>
+        <p:cNvGrpSpPr/>
+        <p:nvPr/>
+      </p:nvGrpSpPr>
+      <p:grpSpPr>
+        <a:xfrm>
+          <a:off x="0" y="0"/>
+          <a:ext cx="0" cy="0"/>
+          <a:chOff x="0" y="0"/>
+          <a:chExt cx="0" cy="0"/>
+        </a:xfrm>
+      </p:grpSpPr>
+      <p:sp>
+        <p:nvSpPr>
+          <p:cNvPr id="7" name="Title 6">
+            <a:extLst>
+              <a:ext uri="{FF2B5EF4-FFF2-40B4-BE49-F238E27FC236}">
+                <a16:creationId xmlns:a16="http://schemas.microsoft.com/office/drawing/2014/main" id="{7802FB34-7510-47BC-8952-A1FE9728B0BF}"/>
+              </a:ext>
+            </a:extLst>
+          </p:cNvPr>
+          <p:cNvSpPr>
+            <a:spLocks noGrp="1"/>
+          </p:cNvSpPr>
+          <p:nvPr>
+            <p:ph type="title"/>
+          </p:nvPr>
+        </p:nvSpPr>
+        <p:spPr/>
+        <p:txBody>
+          <a:bodyPr/>
+          <a:lstStyle/>
+          <a:p>
+            <a:r>
+              <a:rPr lang="en-US" dirty="0"/>
+              <a:t>PROPHET MODELS</a:t>
+            </a:r>
+          </a:p>
+        </p:txBody>
+      </p:sp>
+      <p:sp>
+        <p:nvSpPr>
+          <p:cNvPr id="8" name="Text Placeholder 7">
+            <a:extLst>
+              <a:ext uri="{FF2B5EF4-FFF2-40B4-BE49-F238E27FC236}">
+                <a16:creationId xmlns:a16="http://schemas.microsoft.com/office/drawing/2014/main" id="{FCA70F1A-579E-4144-AE97-14FFC08FF0F5}"/>
+              </a:ext>
+            </a:extLst>
+          </p:cNvPr>
+          <p:cNvSpPr>
+            <a:spLocks noGrp="1"/>
+          </p:cNvSpPr>
+          <p:nvPr>
+            <p:ph type="body" idx="1"/>
+          </p:nvPr>
+        </p:nvSpPr>
+        <p:spPr/>
+        <p:txBody>
+          <a:bodyPr/>
+          <a:lstStyle/>
+          <a:p>
+            <a:r>
+              <a:rPr lang="en-US" dirty="0"/>
+              <a:t>Facebook’s in-house forecasting tool</a:t>
+            </a:r>
+          </a:p>
+        </p:txBody>
+      </p:sp>
+      <p:sp>
+        <p:nvSpPr>
+          <p:cNvPr id="4" name="Date Placeholder 3">
+            <a:extLst>
+              <a:ext uri="{FF2B5EF4-FFF2-40B4-BE49-F238E27FC236}">
+                <a16:creationId xmlns:a16="http://schemas.microsoft.com/office/drawing/2014/main" id="{3AD929EF-0967-4B34-81B8-24D9EF91892E}"/>
+              </a:ext>
+            </a:extLst>
+          </p:cNvPr>
+          <p:cNvSpPr>
+            <a:spLocks noGrp="1"/>
+          </p:cNvSpPr>
+          <p:nvPr>
+            <p:ph type="dt" sz="half" idx="10"/>
+          </p:nvPr>
+        </p:nvSpPr>
+        <p:spPr/>
+        <p:txBody>
+          <a:bodyPr/>
+          <a:lstStyle/>
+          <a:p>
+            <a:fld id="{8AAE40A0-A7D8-4DC3-BC9E-BADA32DA2004}" type="datetime4">
+              <a:rPr lang="en-US" smtClean="0"/>
+              <a:t>July 29, 2019</a:t>
+            </a:fld>
+            <a:endParaRPr lang="en-US" dirty="0"/>
+          </a:p>
+        </p:txBody>
+      </p:sp>
+      <p:sp>
+        <p:nvSpPr>
+          <p:cNvPr id="5" name="Footer Placeholder 4">
+            <a:extLst>
+              <a:ext uri="{FF2B5EF4-FFF2-40B4-BE49-F238E27FC236}">
+                <a16:creationId xmlns:a16="http://schemas.microsoft.com/office/drawing/2014/main" id="{3B5B35DD-F2EA-40D3-8039-8CD3802B2612}"/>
+              </a:ext>
+            </a:extLst>
+          </p:cNvPr>
+          <p:cNvSpPr>
+            <a:spLocks noGrp="1"/>
+          </p:cNvSpPr>
+          <p:nvPr>
+            <p:ph type="ftr" sz="quarter" idx="11"/>
+          </p:nvPr>
+        </p:nvSpPr>
+        <p:spPr/>
+        <p:txBody>
+          <a:bodyPr/>
+          <a:lstStyle/>
+          <a:p>
+            <a:r>
+              <a:rPr lang="en-US"/>
+              <a:t>Digital Scholarship Services </a:t>
+            </a:r>
+            <a:r>
+              <a:rPr lang="en-US">
+                <a:solidFill>
+                  <a:schemeClr val="accent1">
+                    <a:lumMod val="50000"/>
+                  </a:schemeClr>
+                </a:solidFill>
+              </a:rPr>
+              <a:t>| Email</a:t>
+            </a:r>
+            <a:r>
+              <a:rPr lang="en-US"/>
+              <a:t> cf24@rice.edu </a:t>
+            </a:r>
+            <a:r>
+              <a:rPr lang="en-US">
+                <a:solidFill>
+                  <a:schemeClr val="accent1">
+                    <a:lumMod val="50000"/>
+                  </a:schemeClr>
+                </a:solidFill>
+              </a:rPr>
+              <a:t>|</a:t>
+            </a:r>
+            <a:r>
+              <a:rPr lang="en-US"/>
+              <a:t> library.rice.edu/dss</a:t>
+            </a:r>
+            <a:endParaRPr lang="en-US" dirty="0"/>
+          </a:p>
+        </p:txBody>
+      </p:sp>
+      <p:sp>
+        <p:nvSpPr>
+          <p:cNvPr id="6" name="Slide Number Placeholder 5">
+            <a:extLst>
+              <a:ext uri="{FF2B5EF4-FFF2-40B4-BE49-F238E27FC236}">
+                <a16:creationId xmlns:a16="http://schemas.microsoft.com/office/drawing/2014/main" id="{C3EB9A57-323C-47F5-867F-693F95A15FA4}"/>
+              </a:ext>
+            </a:extLst>
+          </p:cNvPr>
+          <p:cNvSpPr>
+            <a:spLocks noGrp="1"/>
+          </p:cNvSpPr>
+          <p:nvPr>
+            <p:ph type="sldNum" sz="quarter" idx="12"/>
+          </p:nvPr>
+        </p:nvSpPr>
+        <p:spPr/>
+        <p:txBody>
+          <a:bodyPr/>
+          <a:lstStyle/>
+          <a:p>
+            <a:fld id="{D57F1E4F-1CFF-5643-939E-02111984F565}" type="slidenum">
+              <a:rPr lang="en-US" smtClean="0"/>
+              <a:t>35</a:t>
+            </a:fld>
+            <a:endParaRPr lang="en-US" dirty="0"/>
+          </a:p>
+        </p:txBody>
+      </p:sp>
+    </p:spTree>
+    <p:extLst>
+      <p:ext uri="{BB962C8B-B14F-4D97-AF65-F5344CB8AC3E}">
+        <p14:creationId xmlns:p14="http://schemas.microsoft.com/office/powerpoint/2010/main" val="4082739096"/>
+      </p:ext>
+    </p:extLst>
+  </p:cSld>
+  <p:clrMapOvr>
+    <a:masterClrMapping/>
+  </p:clrMapOvr>
+</p:sld>
+</file>
+
+<file path=ppt/slides/slide36.xml><?xml version="1.0" encoding="utf-8"?>
+<p:sld xmlns:a="http://schemas.openxmlformats.org/drawingml/2006/main" xmlns:r="http://schemas.openxmlformats.org/officeDocument/2006/relationships" xmlns:p="http://schemas.openxmlformats.org/presentationml/2006/main">
+  <p:cSld>
+    <p:spTree>
+      <p:nvGrpSpPr>
+        <p:cNvPr id="1" name=""/>
+        <p:cNvGrpSpPr/>
+        <p:nvPr/>
+      </p:nvGrpSpPr>
+      <p:grpSpPr>
+        <a:xfrm>
+          <a:off x="0" y="0"/>
+          <a:ext cx="0" cy="0"/>
+          <a:chOff x="0" y="0"/>
+          <a:chExt cx="0" cy="0"/>
+        </a:xfrm>
+      </p:grpSpPr>
+      <p:sp>
+        <p:nvSpPr>
+          <p:cNvPr id="7" name="Title 6">
+            <a:extLst>
+              <a:ext uri="{FF2B5EF4-FFF2-40B4-BE49-F238E27FC236}">
+                <a16:creationId xmlns:a16="http://schemas.microsoft.com/office/drawing/2014/main" id="{75C0DCD3-95F8-4E1F-BF1A-5FAAB84A40A3}"/>
+              </a:ext>
+            </a:extLst>
+          </p:cNvPr>
+          <p:cNvSpPr>
+            <a:spLocks noGrp="1"/>
+          </p:cNvSpPr>
+          <p:nvPr>
+            <p:ph type="title"/>
+          </p:nvPr>
+        </p:nvSpPr>
+        <p:spPr/>
+        <p:txBody>
+          <a:bodyPr/>
+          <a:lstStyle/>
+          <a:p>
+            <a:r>
+              <a:rPr lang="en-US" dirty="0"/>
+              <a:t>PROPHET MODELS</a:t>
+            </a:r>
+          </a:p>
+        </p:txBody>
+      </p:sp>
+      <p:sp>
+        <p:nvSpPr>
+          <p:cNvPr id="8" name="Content Placeholder 7">
+            <a:extLst>
+              <a:ext uri="{FF2B5EF4-FFF2-40B4-BE49-F238E27FC236}">
+                <a16:creationId xmlns:a16="http://schemas.microsoft.com/office/drawing/2014/main" id="{52BB1FAB-BB61-4B66-A4EA-A0EABC2B3ECA}"/>
+              </a:ext>
+            </a:extLst>
+          </p:cNvPr>
+          <p:cNvSpPr>
+            <a:spLocks noGrp="1"/>
+          </p:cNvSpPr>
+          <p:nvPr>
+            <p:ph idx="1"/>
+          </p:nvPr>
+        </p:nvSpPr>
+        <p:spPr/>
+        <p:txBody>
+          <a:bodyPr/>
+          <a:lstStyle/>
+          <a:p>
+            <a:r>
+              <a:rPr lang="en-US" dirty="0"/>
+              <a:t>Cutting up a forecast</a:t>
+            </a:r>
+          </a:p>
+          <a:p>
+            <a:r>
+              <a:rPr lang="en-US" dirty="0"/>
+              <a:t>Pros:</a:t>
+            </a:r>
+          </a:p>
+          <a:p>
+            <a:pPr lvl="1"/>
+            <a:r>
+              <a:rPr lang="en-US" dirty="0"/>
+              <a:t>Fast and scalable</a:t>
+            </a:r>
+          </a:p>
+          <a:p>
+            <a:pPr lvl="1"/>
+            <a:r>
+              <a:rPr lang="en-US" dirty="0"/>
+              <a:t>Parameters are very easy to understand</a:t>
+            </a:r>
+          </a:p>
+          <a:p>
+            <a:pPr lvl="1"/>
+            <a:r>
+              <a:rPr lang="en-US" dirty="0"/>
+              <a:t>Deals with holidays very elegantly</a:t>
+            </a:r>
+          </a:p>
+          <a:p>
+            <a:pPr lvl="1"/>
+            <a:r>
+              <a:rPr lang="en-US" dirty="0"/>
+              <a:t>Splitting models up allows even more flexibility</a:t>
+            </a:r>
+          </a:p>
+          <a:p>
+            <a:pPr lvl="1"/>
+            <a:r>
+              <a:rPr lang="en-US" dirty="0"/>
+              <a:t>Performs quite well! Results often better than ARIMA</a:t>
+            </a:r>
+          </a:p>
+          <a:p>
+            <a:r>
+              <a:rPr lang="en-US" dirty="0"/>
+              <a:t>Cons:</a:t>
+            </a:r>
+          </a:p>
+          <a:p>
+            <a:pPr lvl="1"/>
+            <a:r>
+              <a:rPr lang="en-US" dirty="0"/>
+              <a:t>Not as widely used (released in Sept. 2017)!</a:t>
+            </a:r>
+          </a:p>
+          <a:p>
+            <a:pPr lvl="1"/>
+            <a:r>
+              <a:rPr lang="en-US" dirty="0"/>
+              <a:t>The jury’s still out on this one</a:t>
+            </a:r>
+          </a:p>
+        </p:txBody>
+      </p:sp>
+      <p:sp>
+        <p:nvSpPr>
+          <p:cNvPr id="4" name="Date Placeholder 3">
+            <a:extLst>
+              <a:ext uri="{FF2B5EF4-FFF2-40B4-BE49-F238E27FC236}">
+                <a16:creationId xmlns:a16="http://schemas.microsoft.com/office/drawing/2014/main" id="{02256D86-7CE0-416E-B2A3-402D20EE9E90}"/>
+              </a:ext>
+            </a:extLst>
+          </p:cNvPr>
+          <p:cNvSpPr>
+            <a:spLocks noGrp="1"/>
+          </p:cNvSpPr>
+          <p:nvPr>
+            <p:ph type="dt" sz="half" idx="10"/>
+          </p:nvPr>
+        </p:nvSpPr>
+        <p:spPr/>
+        <p:txBody>
+          <a:bodyPr/>
+          <a:lstStyle/>
+          <a:p>
+            <a:fld id="{B08FEED8-D7D4-44E9-BFBC-ED06B5996D94}" type="datetime4">
+              <a:rPr lang="en-US" smtClean="0"/>
+              <a:t>July 29, 2019</a:t>
+            </a:fld>
+            <a:endParaRPr lang="en-US" dirty="0"/>
+          </a:p>
+        </p:txBody>
+      </p:sp>
+      <p:sp>
+        <p:nvSpPr>
+          <p:cNvPr id="5" name="Footer Placeholder 4">
+            <a:extLst>
+              <a:ext uri="{FF2B5EF4-FFF2-40B4-BE49-F238E27FC236}">
+                <a16:creationId xmlns:a16="http://schemas.microsoft.com/office/drawing/2014/main" id="{1D4ED112-7CF4-4BB9-B46E-B366A5054A9A}"/>
+              </a:ext>
+            </a:extLst>
+          </p:cNvPr>
+          <p:cNvSpPr>
+            <a:spLocks noGrp="1"/>
+          </p:cNvSpPr>
+          <p:nvPr>
+            <p:ph type="ftr" sz="quarter" idx="11"/>
+          </p:nvPr>
+        </p:nvSpPr>
+        <p:spPr/>
+        <p:txBody>
+          <a:bodyPr/>
+          <a:lstStyle/>
+          <a:p>
+            <a:r>
+              <a:rPr lang="en-US"/>
+              <a:t>Digital Scholarship Services </a:t>
+            </a:r>
+            <a:r>
+              <a:rPr lang="en-US">
+                <a:solidFill>
+                  <a:schemeClr val="accent1">
+                    <a:lumMod val="50000"/>
+                  </a:schemeClr>
+                </a:solidFill>
+              </a:rPr>
+              <a:t>| Email</a:t>
+            </a:r>
+            <a:r>
+              <a:rPr lang="en-US"/>
+              <a:t> cf24@rice.edu </a:t>
+            </a:r>
+            <a:r>
+              <a:rPr lang="en-US">
+                <a:solidFill>
+                  <a:schemeClr val="accent1">
+                    <a:lumMod val="50000"/>
+                  </a:schemeClr>
+                </a:solidFill>
+              </a:rPr>
+              <a:t>|</a:t>
+            </a:r>
+            <a:r>
+              <a:rPr lang="en-US"/>
+              <a:t> library.rice.edu/dss</a:t>
+            </a:r>
+            <a:endParaRPr lang="en-US" dirty="0"/>
+          </a:p>
+        </p:txBody>
+      </p:sp>
+      <p:sp>
+        <p:nvSpPr>
+          <p:cNvPr id="6" name="Slide Number Placeholder 5">
+            <a:extLst>
+              <a:ext uri="{FF2B5EF4-FFF2-40B4-BE49-F238E27FC236}">
+                <a16:creationId xmlns:a16="http://schemas.microsoft.com/office/drawing/2014/main" id="{8CC75551-85BF-4C9F-8893-AA28ECA8A6B5}"/>
+              </a:ext>
+            </a:extLst>
+          </p:cNvPr>
+          <p:cNvSpPr>
+            <a:spLocks noGrp="1"/>
+          </p:cNvSpPr>
+          <p:nvPr>
+            <p:ph type="sldNum" sz="quarter" idx="12"/>
+          </p:nvPr>
+        </p:nvSpPr>
+        <p:spPr/>
+        <p:txBody>
+          <a:bodyPr/>
+          <a:lstStyle/>
+          <a:p>
+            <a:fld id="{D57F1E4F-1CFF-5643-939E-02111984F565}" type="slidenum">
+              <a:rPr lang="en-US" smtClean="0"/>
+              <a:t>36</a:t>
+            </a:fld>
+            <a:endParaRPr lang="en-US" dirty="0"/>
+          </a:p>
+        </p:txBody>
+      </p:sp>
+    </p:spTree>
+    <p:extLst>
+      <p:ext uri="{BB962C8B-B14F-4D97-AF65-F5344CB8AC3E}">
+        <p14:creationId xmlns:p14="http://schemas.microsoft.com/office/powerpoint/2010/main" val="3412561793"/>
+      </p:ext>
+    </p:extLst>
+  </p:cSld>
+  <p:clrMapOvr>
+    <a:masterClrMapping/>
+  </p:clrMapOvr>
+</p:sld>
+</file>
+
+<file path=ppt/slides/slide37.xml><?xml version="1.0" encoding="utf-8"?>
+<p:sld xmlns:a="http://schemas.openxmlformats.org/drawingml/2006/main" xmlns:r="http://schemas.openxmlformats.org/officeDocument/2006/relationships" xmlns:p="http://schemas.openxmlformats.org/presentationml/2006/main">
+  <p:cSld>
+    <p:spTree>
+      <p:nvGrpSpPr>
+        <p:cNvPr id="1" name=""/>
+        <p:cNvGrpSpPr/>
+        <p:nvPr/>
+      </p:nvGrpSpPr>
+      <p:grpSpPr>
+        <a:xfrm>
+          <a:off x="0" y="0"/>
+          <a:ext cx="0" cy="0"/>
+          <a:chOff x="0" y="0"/>
+          <a:chExt cx="0" cy="0"/>
+        </a:xfrm>
+      </p:grpSpPr>
+      <p:sp>
+        <p:nvSpPr>
+          <p:cNvPr id="7" name="Title 6">
+            <a:extLst>
+              <a:ext uri="{FF2B5EF4-FFF2-40B4-BE49-F238E27FC236}">
+                <a16:creationId xmlns:a16="http://schemas.microsoft.com/office/drawing/2014/main" id="{7802FB34-7510-47BC-8952-A1FE9728B0BF}"/>
+              </a:ext>
+            </a:extLst>
+          </p:cNvPr>
+          <p:cNvSpPr>
+            <a:spLocks noGrp="1"/>
+          </p:cNvSpPr>
+          <p:nvPr>
+            <p:ph type="title"/>
+          </p:nvPr>
+        </p:nvSpPr>
+        <p:spPr/>
+        <p:txBody>
+          <a:bodyPr/>
+          <a:lstStyle/>
+          <a:p>
+            <a:r>
+              <a:rPr lang="en-US" dirty="0"/>
+              <a:t>NEURAL NETWORK</a:t>
+            </a:r>
+            <a:br>
+              <a:rPr lang="en-US" dirty="0"/>
+            </a:br>
+            <a:r>
+              <a:rPr lang="en-US" dirty="0"/>
+              <a:t>APPROACHES</a:t>
+            </a:r>
+          </a:p>
+        </p:txBody>
+      </p:sp>
+      <p:sp>
+        <p:nvSpPr>
+          <p:cNvPr id="8" name="Text Placeholder 7">
+            <a:extLst>
+              <a:ext uri="{FF2B5EF4-FFF2-40B4-BE49-F238E27FC236}">
+                <a16:creationId xmlns:a16="http://schemas.microsoft.com/office/drawing/2014/main" id="{FCA70F1A-579E-4144-AE97-14FFC08FF0F5}"/>
+              </a:ext>
+            </a:extLst>
+          </p:cNvPr>
+          <p:cNvSpPr>
+            <a:spLocks noGrp="1"/>
+          </p:cNvSpPr>
+          <p:nvPr>
+            <p:ph type="body" idx="1"/>
+          </p:nvPr>
+        </p:nvSpPr>
+        <p:spPr/>
+        <p:txBody>
+          <a:bodyPr/>
+          <a:lstStyle/>
+          <a:p>
+            <a:r>
+              <a:rPr lang="en-US" dirty="0"/>
+              <a:t>Breaking out the big guns</a:t>
+            </a:r>
+          </a:p>
+        </p:txBody>
+      </p:sp>
+      <p:sp>
+        <p:nvSpPr>
+          <p:cNvPr id="4" name="Date Placeholder 3">
+            <a:extLst>
+              <a:ext uri="{FF2B5EF4-FFF2-40B4-BE49-F238E27FC236}">
+                <a16:creationId xmlns:a16="http://schemas.microsoft.com/office/drawing/2014/main" id="{3AD929EF-0967-4B34-81B8-24D9EF91892E}"/>
+              </a:ext>
+            </a:extLst>
+          </p:cNvPr>
+          <p:cNvSpPr>
+            <a:spLocks noGrp="1"/>
+          </p:cNvSpPr>
+          <p:nvPr>
+            <p:ph type="dt" sz="half" idx="10"/>
+          </p:nvPr>
+        </p:nvSpPr>
+        <p:spPr/>
+        <p:txBody>
+          <a:bodyPr/>
+          <a:lstStyle/>
+          <a:p>
+            <a:fld id="{8AAE40A0-A7D8-4DC3-BC9E-BADA32DA2004}" type="datetime4">
+              <a:rPr lang="en-US" smtClean="0"/>
+              <a:t>July 29, 2019</a:t>
+            </a:fld>
+            <a:endParaRPr lang="en-US" dirty="0"/>
+          </a:p>
+        </p:txBody>
+      </p:sp>
+      <p:sp>
+        <p:nvSpPr>
+          <p:cNvPr id="5" name="Footer Placeholder 4">
+            <a:extLst>
+              <a:ext uri="{FF2B5EF4-FFF2-40B4-BE49-F238E27FC236}">
+                <a16:creationId xmlns:a16="http://schemas.microsoft.com/office/drawing/2014/main" id="{3B5B35DD-F2EA-40D3-8039-8CD3802B2612}"/>
+              </a:ext>
+            </a:extLst>
+          </p:cNvPr>
+          <p:cNvSpPr>
+            <a:spLocks noGrp="1"/>
+          </p:cNvSpPr>
+          <p:nvPr>
+            <p:ph type="ftr" sz="quarter" idx="11"/>
+          </p:nvPr>
+        </p:nvSpPr>
+        <p:spPr/>
+        <p:txBody>
+          <a:bodyPr/>
+          <a:lstStyle/>
+          <a:p>
+            <a:r>
+              <a:rPr lang="en-US"/>
+              <a:t>Digital Scholarship Services </a:t>
+            </a:r>
+            <a:r>
+              <a:rPr lang="en-US">
+                <a:solidFill>
+                  <a:schemeClr val="accent1">
+                    <a:lumMod val="50000"/>
+                  </a:schemeClr>
+                </a:solidFill>
+              </a:rPr>
+              <a:t>| Email</a:t>
+            </a:r>
+            <a:r>
+              <a:rPr lang="en-US"/>
+              <a:t> cf24@rice.edu </a:t>
+            </a:r>
+            <a:r>
+              <a:rPr lang="en-US">
+                <a:solidFill>
+                  <a:schemeClr val="accent1">
+                    <a:lumMod val="50000"/>
+                  </a:schemeClr>
+                </a:solidFill>
+              </a:rPr>
+              <a:t>|</a:t>
+            </a:r>
+            <a:r>
+              <a:rPr lang="en-US"/>
+              <a:t> library.rice.edu/dss</a:t>
+            </a:r>
+            <a:endParaRPr lang="en-US" dirty="0"/>
+          </a:p>
+        </p:txBody>
+      </p:sp>
+      <p:sp>
+        <p:nvSpPr>
+          <p:cNvPr id="6" name="Slide Number Placeholder 5">
+            <a:extLst>
+              <a:ext uri="{FF2B5EF4-FFF2-40B4-BE49-F238E27FC236}">
+                <a16:creationId xmlns:a16="http://schemas.microsoft.com/office/drawing/2014/main" id="{C3EB9A57-323C-47F5-867F-693F95A15FA4}"/>
+              </a:ext>
+            </a:extLst>
+          </p:cNvPr>
+          <p:cNvSpPr>
+            <a:spLocks noGrp="1"/>
+          </p:cNvSpPr>
+          <p:nvPr>
+            <p:ph type="sldNum" sz="quarter" idx="12"/>
+          </p:nvPr>
+        </p:nvSpPr>
+        <p:spPr/>
+        <p:txBody>
+          <a:bodyPr/>
+          <a:lstStyle/>
+          <a:p>
+            <a:fld id="{D57F1E4F-1CFF-5643-939E-02111984F565}" type="slidenum">
+              <a:rPr lang="en-US" smtClean="0"/>
+              <a:t>37</a:t>
+            </a:fld>
+            <a:endParaRPr lang="en-US" dirty="0"/>
+          </a:p>
+        </p:txBody>
+      </p:sp>
+    </p:spTree>
+    <p:extLst>
+      <p:ext uri="{BB962C8B-B14F-4D97-AF65-F5344CB8AC3E}">
+        <p14:creationId xmlns:p14="http://schemas.microsoft.com/office/powerpoint/2010/main" val="1442732517"/>
+      </p:ext>
+    </p:extLst>
+  </p:cSld>
+  <p:clrMapOvr>
+    <a:masterClrMapping/>
+  </p:clrMapOvr>
+</p:sld>
+</file>
+
+<file path=ppt/slides/slide38.xml><?xml version="1.0" encoding="utf-8"?>
+<p:sld xmlns:a="http://schemas.openxmlformats.org/drawingml/2006/main" xmlns:r="http://schemas.openxmlformats.org/officeDocument/2006/relationships" xmlns:p="http://schemas.openxmlformats.org/presentationml/2006/main">
+  <p:cSld>
+    <p:spTree>
+      <p:nvGrpSpPr>
+        <p:cNvPr id="1" name=""/>
+        <p:cNvGrpSpPr/>
+        <p:nvPr/>
+      </p:nvGrpSpPr>
+      <p:grpSpPr>
+        <a:xfrm>
+          <a:off x="0" y="0"/>
+          <a:ext cx="0" cy="0"/>
+          <a:chOff x="0" y="0"/>
+          <a:chExt cx="0" cy="0"/>
+        </a:xfrm>
+      </p:grpSpPr>
+      <p:sp>
+        <p:nvSpPr>
+          <p:cNvPr id="7" name="Title 6">
+            <a:extLst>
+              <a:ext uri="{FF2B5EF4-FFF2-40B4-BE49-F238E27FC236}">
+                <a16:creationId xmlns:a16="http://schemas.microsoft.com/office/drawing/2014/main" id="{75C0DCD3-95F8-4E1F-BF1A-5FAAB84A40A3}"/>
+              </a:ext>
+            </a:extLst>
+          </p:cNvPr>
+          <p:cNvSpPr>
+            <a:spLocks noGrp="1"/>
+          </p:cNvSpPr>
+          <p:nvPr>
+            <p:ph type="title"/>
+          </p:nvPr>
+        </p:nvSpPr>
+        <p:spPr/>
+        <p:txBody>
+          <a:bodyPr/>
+          <a:lstStyle/>
+          <a:p>
+            <a:r>
+              <a:rPr lang="en-US" dirty="0"/>
+              <a:t>NEURAL NETWORK MODELS</a:t>
+            </a:r>
+          </a:p>
+        </p:txBody>
+      </p:sp>
+      <p:sp>
+        <p:nvSpPr>
+          <p:cNvPr id="8" name="Content Placeholder 7">
+            <a:extLst>
+              <a:ext uri="{FF2B5EF4-FFF2-40B4-BE49-F238E27FC236}">
+                <a16:creationId xmlns:a16="http://schemas.microsoft.com/office/drawing/2014/main" id="{52BB1FAB-BB61-4B66-A4EA-A0EABC2B3ECA}"/>
+              </a:ext>
+            </a:extLst>
+          </p:cNvPr>
+          <p:cNvSpPr>
+            <a:spLocks noGrp="1"/>
+          </p:cNvSpPr>
+          <p:nvPr>
+            <p:ph idx="1"/>
+          </p:nvPr>
+        </p:nvSpPr>
+        <p:spPr/>
+        <p:txBody>
+          <a:bodyPr>
+            <a:normAutofit/>
+          </a:bodyPr>
+          <a:lstStyle/>
+          <a:p>
+            <a:r>
+              <a:rPr lang="en-US" dirty="0"/>
+              <a:t>Incomprehensible but extremely powerful</a:t>
+            </a:r>
+          </a:p>
+          <a:p>
+            <a:r>
+              <a:rPr lang="en-US" dirty="0"/>
+              <a:t>Pros:</a:t>
+            </a:r>
+          </a:p>
+          <a:p>
+            <a:pPr lvl="1"/>
+            <a:r>
+              <a:rPr lang="en-US" dirty="0"/>
+              <a:t>Often extremely accurate</a:t>
+            </a:r>
+          </a:p>
+          <a:p>
+            <a:r>
+              <a:rPr lang="en-US" dirty="0"/>
+              <a:t>Cons:</a:t>
+            </a:r>
+          </a:p>
+          <a:p>
+            <a:pPr lvl="1"/>
+            <a:r>
+              <a:rPr lang="en-US" dirty="0"/>
+              <a:t>More or less impossible to understand what any of the parameters mean</a:t>
+            </a:r>
+          </a:p>
+          <a:p>
+            <a:pPr lvl="1"/>
+            <a:r>
+              <a:rPr lang="en-US" dirty="0"/>
+              <a:t>Can take a very long time to train the model</a:t>
+            </a:r>
+          </a:p>
+          <a:p>
+            <a:pPr lvl="1"/>
+            <a:r>
+              <a:rPr lang="en-US" dirty="0"/>
+              <a:t>Lots of moving parts and things that can go wrong</a:t>
+            </a:r>
+          </a:p>
+          <a:p>
+            <a:r>
+              <a:rPr lang="en-US" dirty="0"/>
+              <a:t>But perhaps here, </a:t>
+            </a:r>
+            <a:r>
+              <a:rPr lang="en-US"/>
+              <a:t>that one pro </a:t>
+            </a:r>
+            <a:r>
+              <a:rPr lang="en-US" dirty="0"/>
+              <a:t>may outweigh all the cons</a:t>
+            </a:r>
+          </a:p>
+        </p:txBody>
+      </p:sp>
+      <p:sp>
+        <p:nvSpPr>
+          <p:cNvPr id="4" name="Date Placeholder 3">
+            <a:extLst>
+              <a:ext uri="{FF2B5EF4-FFF2-40B4-BE49-F238E27FC236}">
+                <a16:creationId xmlns:a16="http://schemas.microsoft.com/office/drawing/2014/main" id="{02256D86-7CE0-416E-B2A3-402D20EE9E90}"/>
+              </a:ext>
+            </a:extLst>
+          </p:cNvPr>
+          <p:cNvSpPr>
+            <a:spLocks noGrp="1"/>
+          </p:cNvSpPr>
+          <p:nvPr>
+            <p:ph type="dt" sz="half" idx="10"/>
+          </p:nvPr>
+        </p:nvSpPr>
+        <p:spPr/>
+        <p:txBody>
+          <a:bodyPr/>
+          <a:lstStyle/>
+          <a:p>
+            <a:fld id="{B08FEED8-D7D4-44E9-BFBC-ED06B5996D94}" type="datetime4">
+              <a:rPr lang="en-US" smtClean="0"/>
+              <a:t>July 29, 2019</a:t>
+            </a:fld>
+            <a:endParaRPr lang="en-US" dirty="0"/>
+          </a:p>
+        </p:txBody>
+      </p:sp>
+      <p:sp>
+        <p:nvSpPr>
+          <p:cNvPr id="5" name="Footer Placeholder 4">
+            <a:extLst>
+              <a:ext uri="{FF2B5EF4-FFF2-40B4-BE49-F238E27FC236}">
+                <a16:creationId xmlns:a16="http://schemas.microsoft.com/office/drawing/2014/main" id="{1D4ED112-7CF4-4BB9-B46E-B366A5054A9A}"/>
+              </a:ext>
+            </a:extLst>
+          </p:cNvPr>
+          <p:cNvSpPr>
+            <a:spLocks noGrp="1"/>
+          </p:cNvSpPr>
+          <p:nvPr>
+            <p:ph type="ftr" sz="quarter" idx="11"/>
+          </p:nvPr>
+        </p:nvSpPr>
+        <p:spPr/>
+        <p:txBody>
+          <a:bodyPr/>
+          <a:lstStyle/>
+          <a:p>
+            <a:r>
+              <a:rPr lang="en-US"/>
+              <a:t>Digital Scholarship Services </a:t>
+            </a:r>
+            <a:r>
+              <a:rPr lang="en-US">
+                <a:solidFill>
+                  <a:schemeClr val="accent1">
+                    <a:lumMod val="50000"/>
+                  </a:schemeClr>
+                </a:solidFill>
+              </a:rPr>
+              <a:t>| Email</a:t>
+            </a:r>
+            <a:r>
+              <a:rPr lang="en-US"/>
+              <a:t> cf24@rice.edu </a:t>
+            </a:r>
+            <a:r>
+              <a:rPr lang="en-US">
+                <a:solidFill>
+                  <a:schemeClr val="accent1">
+                    <a:lumMod val="50000"/>
+                  </a:schemeClr>
+                </a:solidFill>
+              </a:rPr>
+              <a:t>|</a:t>
+            </a:r>
+            <a:r>
+              <a:rPr lang="en-US"/>
+              <a:t> library.rice.edu/dss</a:t>
+            </a:r>
+            <a:endParaRPr lang="en-US" dirty="0"/>
+          </a:p>
+        </p:txBody>
+      </p:sp>
+      <p:sp>
+        <p:nvSpPr>
+          <p:cNvPr id="6" name="Slide Number Placeholder 5">
+            <a:extLst>
+              <a:ext uri="{FF2B5EF4-FFF2-40B4-BE49-F238E27FC236}">
+                <a16:creationId xmlns:a16="http://schemas.microsoft.com/office/drawing/2014/main" id="{8CC75551-85BF-4C9F-8893-AA28ECA8A6B5}"/>
+              </a:ext>
+            </a:extLst>
+          </p:cNvPr>
+          <p:cNvSpPr>
+            <a:spLocks noGrp="1"/>
+          </p:cNvSpPr>
+          <p:nvPr>
+            <p:ph type="sldNum" sz="quarter" idx="12"/>
+          </p:nvPr>
+        </p:nvSpPr>
+        <p:spPr/>
+        <p:txBody>
+          <a:bodyPr/>
+          <a:lstStyle/>
+          <a:p>
+            <a:fld id="{D57F1E4F-1CFF-5643-939E-02111984F565}" type="slidenum">
+              <a:rPr lang="en-US" smtClean="0"/>
+              <a:t>38</a:t>
+            </a:fld>
+            <a:endParaRPr lang="en-US" dirty="0"/>
+          </a:p>
+        </p:txBody>
+      </p:sp>
+    </p:spTree>
+    <p:extLst>
+      <p:ext uri="{BB962C8B-B14F-4D97-AF65-F5344CB8AC3E}">
+        <p14:creationId xmlns:p14="http://schemas.microsoft.com/office/powerpoint/2010/main" val="4213654799"/>
+      </p:ext>
+    </p:extLst>
+  </p:cSld>
+  <p:clrMapOvr>
+    <a:masterClrMapping/>
+  </p:clrMapOvr>
+</p:sld>
+</file>
+
+<file path=ppt/slides/slide39.xml><?xml version="1.0" encoding="utf-8"?>
+<p:sld xmlns:a="http://schemas.openxmlformats.org/drawingml/2006/main" xmlns:r="http://schemas.openxmlformats.org/officeDocument/2006/relationships" xmlns:p="http://schemas.openxmlformats.org/presentationml/2006/main">
+  <p:cSld>
+    <p:spTree>
+      <p:nvGrpSpPr>
+        <p:cNvPr id="1" name=""/>
+        <p:cNvGrpSpPr/>
+        <p:nvPr/>
+      </p:nvGrpSpPr>
+      <p:grpSpPr>
+        <a:xfrm>
+          <a:off x="0" y="0"/>
+          <a:ext cx="0" cy="0"/>
+          <a:chOff x="0" y="0"/>
+          <a:chExt cx="0" cy="0"/>
+        </a:xfrm>
+      </p:grpSpPr>
+      <p:sp>
+        <p:nvSpPr>
+          <p:cNvPr id="7" name="Title 6">
+            <a:extLst>
+              <a:ext uri="{FF2B5EF4-FFF2-40B4-BE49-F238E27FC236}">
+                <a16:creationId xmlns:a16="http://schemas.microsoft.com/office/drawing/2014/main" id="{495B4BC0-844B-4414-A623-BEF78AAC1BA1}"/>
+              </a:ext>
+            </a:extLst>
+          </p:cNvPr>
+          <p:cNvSpPr>
+            <a:spLocks noGrp="1"/>
+          </p:cNvSpPr>
+          <p:nvPr>
+            <p:ph type="title"/>
+          </p:nvPr>
+        </p:nvSpPr>
+        <p:spPr/>
+        <p:txBody>
+          <a:bodyPr/>
+          <a:lstStyle/>
+          <a:p>
+            <a:r>
+              <a:rPr lang="en-US" dirty="0"/>
+              <a:t>ACKNOWLEDGMENTS</a:t>
+            </a:r>
+          </a:p>
+        </p:txBody>
+      </p:sp>
+      <p:sp>
+        <p:nvSpPr>
+          <p:cNvPr id="8" name="Content Placeholder 7">
+            <a:extLst>
+              <a:ext uri="{FF2B5EF4-FFF2-40B4-BE49-F238E27FC236}">
+                <a16:creationId xmlns:a16="http://schemas.microsoft.com/office/drawing/2014/main" id="{2BED3EB3-7E98-4A82-8335-7321D9E37B16}"/>
+              </a:ext>
+            </a:extLst>
+          </p:cNvPr>
+          <p:cNvSpPr>
+            <a:spLocks noGrp="1"/>
+          </p:cNvSpPr>
+          <p:nvPr>
+            <p:ph idx="1"/>
+          </p:nvPr>
+        </p:nvSpPr>
+        <p:spPr/>
+        <p:txBody>
+          <a:bodyPr/>
+          <a:lstStyle/>
+          <a:p>
+            <a:r>
+              <a:rPr lang="en-US" dirty="0"/>
+              <a:t>Plots were created using the ggplot2 package in R</a:t>
+            </a:r>
+          </a:p>
+          <a:p>
+            <a:r>
+              <a:rPr lang="en-US" dirty="0"/>
+              <a:t>Shumway and </a:t>
+            </a:r>
+            <a:r>
+              <a:rPr lang="en-US" dirty="0" err="1"/>
+              <a:t>Stoffer’s</a:t>
+            </a:r>
+            <a:r>
+              <a:rPr lang="en-US" dirty="0"/>
+              <a:t> </a:t>
+            </a:r>
+            <a:r>
+              <a:rPr lang="en-US" i="1" dirty="0"/>
+              <a:t>Time Series Analysis and Its Applications With R Examples, Fourth Edition </a:t>
+            </a:r>
+            <a:r>
+              <a:rPr lang="en-US" dirty="0"/>
+              <a:t>published by Springer was used as the main reference for the ARIMA section</a:t>
+            </a:r>
+          </a:p>
+          <a:p>
+            <a:r>
+              <a:rPr lang="en-US" i="1" dirty="0"/>
+              <a:t>Forecasting at Scale </a:t>
+            </a:r>
+            <a:r>
+              <a:rPr lang="en-US" dirty="0"/>
+              <a:t>by Sean J. Taylor and Benjamin </a:t>
+            </a:r>
+            <a:r>
+              <a:rPr lang="en-US" dirty="0" err="1"/>
+              <a:t>Letham</a:t>
+            </a:r>
+            <a:r>
+              <a:rPr lang="en-US" dirty="0"/>
+              <a:t> at Facebook was used as the main reference for the Prophet section</a:t>
+            </a:r>
+            <a:endParaRPr lang="en-US" i="1" dirty="0"/>
+          </a:p>
+          <a:p>
+            <a:endParaRPr lang="en-US" dirty="0"/>
+          </a:p>
+        </p:txBody>
+      </p:sp>
+      <p:sp>
+        <p:nvSpPr>
+          <p:cNvPr id="4" name="Date Placeholder 3">
+            <a:extLst>
+              <a:ext uri="{FF2B5EF4-FFF2-40B4-BE49-F238E27FC236}">
+                <a16:creationId xmlns:a16="http://schemas.microsoft.com/office/drawing/2014/main" id="{540F37F1-4F33-429F-A568-1A3ADC499E54}"/>
+              </a:ext>
+            </a:extLst>
+          </p:cNvPr>
+          <p:cNvSpPr>
+            <a:spLocks noGrp="1"/>
+          </p:cNvSpPr>
+          <p:nvPr>
+            <p:ph type="dt" sz="half" idx="10"/>
+          </p:nvPr>
+        </p:nvSpPr>
+        <p:spPr/>
+        <p:txBody>
+          <a:bodyPr/>
+          <a:lstStyle/>
+          <a:p>
+            <a:fld id="{B08FEED8-D7D4-44E9-BFBC-ED06B5996D94}" type="datetime4">
+              <a:rPr lang="en-US" smtClean="0"/>
+              <a:t>July 29, 2019</a:t>
+            </a:fld>
+            <a:endParaRPr lang="en-US" dirty="0"/>
+          </a:p>
+        </p:txBody>
+      </p:sp>
+      <p:sp>
+        <p:nvSpPr>
+          <p:cNvPr id="5" name="Footer Placeholder 4">
+            <a:extLst>
+              <a:ext uri="{FF2B5EF4-FFF2-40B4-BE49-F238E27FC236}">
+                <a16:creationId xmlns:a16="http://schemas.microsoft.com/office/drawing/2014/main" id="{673FFA57-C126-4795-A5F6-DD33AAC5ACBD}"/>
+              </a:ext>
+            </a:extLst>
+          </p:cNvPr>
+          <p:cNvSpPr>
+            <a:spLocks noGrp="1"/>
+          </p:cNvSpPr>
+          <p:nvPr>
+            <p:ph type="ftr" sz="quarter" idx="11"/>
+          </p:nvPr>
+        </p:nvSpPr>
+        <p:spPr/>
+        <p:txBody>
+          <a:bodyPr/>
+          <a:lstStyle/>
+          <a:p>
+            <a:r>
+              <a:rPr lang="en-US"/>
+              <a:t>Digital Scholarship Services </a:t>
+            </a:r>
+            <a:r>
+              <a:rPr lang="en-US">
+                <a:solidFill>
+                  <a:schemeClr val="accent1">
+                    <a:lumMod val="50000"/>
+                  </a:schemeClr>
+                </a:solidFill>
+              </a:rPr>
+              <a:t>| Email</a:t>
+            </a:r>
+            <a:r>
+              <a:rPr lang="en-US"/>
+              <a:t> cf24@rice.edu </a:t>
+            </a:r>
+            <a:r>
+              <a:rPr lang="en-US">
+                <a:solidFill>
+                  <a:schemeClr val="accent1">
+                    <a:lumMod val="50000"/>
+                  </a:schemeClr>
+                </a:solidFill>
+              </a:rPr>
+              <a:t>|</a:t>
+            </a:r>
+            <a:r>
+              <a:rPr lang="en-US"/>
+              <a:t> library.rice.edu/dss</a:t>
+            </a:r>
+            <a:endParaRPr lang="en-US" dirty="0"/>
+          </a:p>
+        </p:txBody>
+      </p:sp>
+      <p:sp>
+        <p:nvSpPr>
+          <p:cNvPr id="6" name="Slide Number Placeholder 5">
+            <a:extLst>
+              <a:ext uri="{FF2B5EF4-FFF2-40B4-BE49-F238E27FC236}">
+                <a16:creationId xmlns:a16="http://schemas.microsoft.com/office/drawing/2014/main" id="{2FA49567-BB70-4798-8746-D0B522CCEE20}"/>
+              </a:ext>
+            </a:extLst>
+          </p:cNvPr>
+          <p:cNvSpPr>
+            <a:spLocks noGrp="1"/>
+          </p:cNvSpPr>
+          <p:nvPr>
+            <p:ph type="sldNum" sz="quarter" idx="12"/>
+          </p:nvPr>
+        </p:nvSpPr>
+        <p:spPr/>
+        <p:txBody>
+          <a:bodyPr/>
+          <a:lstStyle/>
+          <a:p>
+            <a:fld id="{D57F1E4F-1CFF-5643-939E-02111984F565}" type="slidenum">
+              <a:rPr lang="en-US" smtClean="0"/>
+              <a:t>39</a:t>
+            </a:fld>
+            <a:endParaRPr lang="en-US" dirty="0"/>
+          </a:p>
+        </p:txBody>
+      </p:sp>
+    </p:spTree>
+    <p:extLst>
+      <p:ext uri="{BB962C8B-B14F-4D97-AF65-F5344CB8AC3E}">
+        <p14:creationId xmlns:p14="http://schemas.microsoft.com/office/powerpoint/2010/main" val="1585568494"/>
       </p:ext>
     </p:extLst>
   </p:cSld>

</xml_diff>

<commit_message>
added the cute lagged scatterplots
</commit_message>
<xml_diff>
--- a/tsa/Introduction to Time Series Analysis.pptx
+++ b/tsa/Introduction to Time Series Analysis.pptx
@@ -5,7 +5,7 @@
     <p:sldMasterId id="2147483707" r:id="rId1"/>
   </p:sldMasterIdLst>
   <p:notesMasterIdLst>
-    <p:notesMasterId r:id="rId41"/>
+    <p:notesMasterId r:id="rId43"/>
   </p:notesMasterIdLst>
   <p:sldIdLst>
     <p:sldId id="266" r:id="rId2"/>
@@ -35,18 +35,20 @@
     <p:sldId id="303" r:id="rId26"/>
     <p:sldId id="280" r:id="rId27"/>
     <p:sldId id="304" r:id="rId28"/>
-    <p:sldId id="281" r:id="rId29"/>
-    <p:sldId id="282" r:id="rId30"/>
-    <p:sldId id="283" r:id="rId31"/>
-    <p:sldId id="284" r:id="rId32"/>
-    <p:sldId id="299" r:id="rId33"/>
-    <p:sldId id="300" r:id="rId34"/>
-    <p:sldId id="285" r:id="rId35"/>
-    <p:sldId id="305" r:id="rId36"/>
-    <p:sldId id="307" r:id="rId37"/>
-    <p:sldId id="306" r:id="rId38"/>
-    <p:sldId id="309" r:id="rId39"/>
-    <p:sldId id="268" r:id="rId40"/>
+    <p:sldId id="310" r:id="rId29"/>
+    <p:sldId id="311" r:id="rId30"/>
+    <p:sldId id="281" r:id="rId31"/>
+    <p:sldId id="282" r:id="rId32"/>
+    <p:sldId id="283" r:id="rId33"/>
+    <p:sldId id="284" r:id="rId34"/>
+    <p:sldId id="299" r:id="rId35"/>
+    <p:sldId id="300" r:id="rId36"/>
+    <p:sldId id="285" r:id="rId37"/>
+    <p:sldId id="305" r:id="rId38"/>
+    <p:sldId id="307" r:id="rId39"/>
+    <p:sldId id="306" r:id="rId40"/>
+    <p:sldId id="309" r:id="rId41"/>
+    <p:sldId id="268" r:id="rId42"/>
   </p:sldIdLst>
   <p:sldSz cx="12192000" cy="6858000"/>
   <p:notesSz cx="6858000" cy="9144000"/>
@@ -7915,10 +7917,10 @@
       </p:sp>
       <p:pic>
         <p:nvPicPr>
-          <p:cNvPr id="10" name="Picture 9" descr="A screenshot of a cell phone&#10;&#10;Description automatically generated">
-            <a:extLst>
-              <a:ext uri="{FF2B5EF4-FFF2-40B4-BE49-F238E27FC236}">
-                <a16:creationId xmlns:a16="http://schemas.microsoft.com/office/drawing/2014/main" id="{F8BC82BB-F89F-4421-9F16-389C95C23715}"/>
+          <p:cNvPr id="36" name="Picture 35" descr="A close up of a map&#10;&#10;Description automatically generated">
+            <a:extLst>
+              <a:ext uri="{FF2B5EF4-FFF2-40B4-BE49-F238E27FC236}">
+                <a16:creationId xmlns:a16="http://schemas.microsoft.com/office/drawing/2014/main" id="{3C70D8D5-BE0B-4104-8E31-7985B77E8B77}"/>
               </a:ext>
             </a:extLst>
           </p:cNvPr>
@@ -7935,8 +7937,68 @@
         </p:blipFill>
         <p:spPr>
           <a:xfrm>
-            <a:off x="3479258" y="1454284"/>
-            <a:ext cx="4946515" cy="4946515"/>
+            <a:off x="215899" y="2194714"/>
+            <a:ext cx="3657607" cy="3657607"/>
+          </a:xfrm>
+          <a:prstGeom prst="rect">
+            <a:avLst/>
+          </a:prstGeom>
+        </p:spPr>
+      </p:pic>
+      <p:pic>
+        <p:nvPicPr>
+          <p:cNvPr id="38" name="Picture 37" descr="A close up of a map&#10;&#10;Description automatically generated">
+            <a:extLst>
+              <a:ext uri="{FF2B5EF4-FFF2-40B4-BE49-F238E27FC236}">
+                <a16:creationId xmlns:a16="http://schemas.microsoft.com/office/drawing/2014/main" id="{C19FC7B9-4121-4D6F-B103-D200D3CE939C}"/>
+              </a:ext>
+            </a:extLst>
+          </p:cNvPr>
+          <p:cNvPicPr>
+            <a:picLocks noChangeAspect="1"/>
+          </p:cNvPicPr>
+          <p:nvPr/>
+        </p:nvPicPr>
+        <p:blipFill>
+          <a:blip r:embed="rId3"/>
+          <a:stretch>
+            <a:fillRect/>
+          </a:stretch>
+        </p:blipFill>
+        <p:spPr>
+          <a:xfrm>
+            <a:off x="4267196" y="2194715"/>
+            <a:ext cx="3657607" cy="3657607"/>
+          </a:xfrm>
+          <a:prstGeom prst="rect">
+            <a:avLst/>
+          </a:prstGeom>
+        </p:spPr>
+      </p:pic>
+      <p:pic>
+        <p:nvPicPr>
+          <p:cNvPr id="40" name="Picture 39" descr="A screenshot of a cell phone&#10;&#10;Description automatically generated">
+            <a:extLst>
+              <a:ext uri="{FF2B5EF4-FFF2-40B4-BE49-F238E27FC236}">
+                <a16:creationId xmlns:a16="http://schemas.microsoft.com/office/drawing/2014/main" id="{241057DC-347E-448E-90C8-67AFC5721BB5}"/>
+              </a:ext>
+            </a:extLst>
+          </p:cNvPr>
+          <p:cNvPicPr>
+            <a:picLocks noChangeAspect="1"/>
+          </p:cNvPicPr>
+          <p:nvPr/>
+        </p:nvPicPr>
+        <p:blipFill>
+          <a:blip r:embed="rId4"/>
+          <a:stretch>
+            <a:fillRect/>
+          </a:stretch>
+        </p:blipFill>
+        <p:spPr>
+          <a:xfrm>
+            <a:off x="8318493" y="2194715"/>
+            <a:ext cx="3657607" cy="3657607"/>
           </a:xfrm>
           <a:prstGeom prst="rect">
             <a:avLst/>
@@ -7975,10 +8037,10 @@
       </p:grpSpPr>
       <p:sp>
         <p:nvSpPr>
-          <p:cNvPr id="7" name="Title 6">
-            <a:extLst>
-              <a:ext uri="{FF2B5EF4-FFF2-40B4-BE49-F238E27FC236}">
-                <a16:creationId xmlns:a16="http://schemas.microsoft.com/office/drawing/2014/main" id="{7802FB34-7510-47BC-8952-A1FE9728B0BF}"/>
+          <p:cNvPr id="2" name="Title 1">
+            <a:extLst>
+              <a:ext uri="{FF2B5EF4-FFF2-40B4-BE49-F238E27FC236}">
+                <a16:creationId xmlns:a16="http://schemas.microsoft.com/office/drawing/2014/main" id="{84FE5820-4288-4CB6-888A-5CBF5468888C}"/>
               </a:ext>
             </a:extLst>
           </p:cNvPr>
@@ -7996,35 +8058,7 @@
           <a:p>
             <a:r>
               <a:rPr lang="en-US" dirty="0"/>
-              <a:t>ARIMA MODELS</a:t>
-            </a:r>
-          </a:p>
-        </p:txBody>
-      </p:sp>
-      <p:sp>
-        <p:nvSpPr>
-          <p:cNvPr id="8" name="Text Placeholder 7">
-            <a:extLst>
-              <a:ext uri="{FF2B5EF4-FFF2-40B4-BE49-F238E27FC236}">
-                <a16:creationId xmlns:a16="http://schemas.microsoft.com/office/drawing/2014/main" id="{FCA70F1A-579E-4144-AE97-14FFC08FF0F5}"/>
-              </a:ext>
-            </a:extLst>
-          </p:cNvPr>
-          <p:cNvSpPr>
-            <a:spLocks noGrp="1"/>
-          </p:cNvSpPr>
-          <p:nvPr>
-            <p:ph type="body" idx="1"/>
-          </p:nvPr>
-        </p:nvSpPr>
-        <p:spPr/>
-        <p:txBody>
-          <a:bodyPr/>
-          <a:lstStyle/>
-          <a:p>
-            <a:r>
-              <a:rPr lang="en-US" dirty="0"/>
-              <a:t>Interpretable, simple and speedy time series modeling</a:t>
+              <a:t>LAGGED SCATTERPLOTS EXAMPLE</a:t>
             </a:r>
           </a:p>
         </p:txBody>
@@ -8034,7 +8068,7 @@
           <p:cNvPr id="4" name="Date Placeholder 3">
             <a:extLst>
               <a:ext uri="{FF2B5EF4-FFF2-40B4-BE49-F238E27FC236}">
-                <a16:creationId xmlns:a16="http://schemas.microsoft.com/office/drawing/2014/main" id="{3AD929EF-0967-4B34-81B8-24D9EF91892E}"/>
+                <a16:creationId xmlns:a16="http://schemas.microsoft.com/office/drawing/2014/main" id="{F716348B-D7FE-46ED-8C48-CF5A55FF31CF}"/>
               </a:ext>
             </a:extLst>
           </p:cNvPr>
@@ -8063,7 +8097,7 @@
           <p:cNvPr id="5" name="Footer Placeholder 4">
             <a:extLst>
               <a:ext uri="{FF2B5EF4-FFF2-40B4-BE49-F238E27FC236}">
-                <a16:creationId xmlns:a16="http://schemas.microsoft.com/office/drawing/2014/main" id="{3B5B35DD-F2EA-40D3-8039-8CD3802B2612}"/>
+                <a16:creationId xmlns:a16="http://schemas.microsoft.com/office/drawing/2014/main" id="{34059279-A1E7-4F19-B4BF-8C6B59A4CEFF}"/>
               </a:ext>
             </a:extLst>
           </p:cNvPr>
@@ -8120,7 +8154,7 @@
           <p:cNvPr id="6" name="Slide Number Placeholder 5">
             <a:extLst>
               <a:ext uri="{FF2B5EF4-FFF2-40B4-BE49-F238E27FC236}">
-                <a16:creationId xmlns:a16="http://schemas.microsoft.com/office/drawing/2014/main" id="{C3EB9A57-323C-47F5-867F-693F95A15FA4}"/>
+                <a16:creationId xmlns:a16="http://schemas.microsoft.com/office/drawing/2014/main" id="{DE722C41-7366-4DE2-9AF4-E75E189A7733}"/>
               </a:ext>
             </a:extLst>
           </p:cNvPr>
@@ -8144,10 +8178,97 @@
           </a:p>
         </p:txBody>
       </p:sp>
+      <p:pic>
+        <p:nvPicPr>
+          <p:cNvPr id="36" name="Picture 35">
+            <a:extLst>
+              <a:ext uri="{FF2B5EF4-FFF2-40B4-BE49-F238E27FC236}">
+                <a16:creationId xmlns:a16="http://schemas.microsoft.com/office/drawing/2014/main" id="{3C70D8D5-BE0B-4104-8E31-7985B77E8B77}"/>
+              </a:ext>
+            </a:extLst>
+          </p:cNvPr>
+          <p:cNvPicPr>
+            <a:picLocks noChangeAspect="1"/>
+          </p:cNvPicPr>
+          <p:nvPr/>
+        </p:nvPicPr>
+        <p:blipFill>
+          <a:blip r:embed="rId2"/>
+          <a:srcRect/>
+          <a:stretch/>
+        </p:blipFill>
+        <p:spPr>
+          <a:xfrm>
+            <a:off x="215899" y="2194714"/>
+            <a:ext cx="3657607" cy="3657607"/>
+          </a:xfrm>
+          <a:prstGeom prst="rect">
+            <a:avLst/>
+          </a:prstGeom>
+        </p:spPr>
+      </p:pic>
+      <p:pic>
+        <p:nvPicPr>
+          <p:cNvPr id="38" name="Picture 37">
+            <a:extLst>
+              <a:ext uri="{FF2B5EF4-FFF2-40B4-BE49-F238E27FC236}">
+                <a16:creationId xmlns:a16="http://schemas.microsoft.com/office/drawing/2014/main" id="{C19FC7B9-4121-4D6F-B103-D200D3CE939C}"/>
+              </a:ext>
+            </a:extLst>
+          </p:cNvPr>
+          <p:cNvPicPr>
+            <a:picLocks noChangeAspect="1"/>
+          </p:cNvPicPr>
+          <p:nvPr/>
+        </p:nvPicPr>
+        <p:blipFill>
+          <a:blip r:embed="rId3"/>
+          <a:srcRect/>
+          <a:stretch/>
+        </p:blipFill>
+        <p:spPr>
+          <a:xfrm>
+            <a:off x="4267196" y="2194715"/>
+            <a:ext cx="3657607" cy="3657607"/>
+          </a:xfrm>
+          <a:prstGeom prst="rect">
+            <a:avLst/>
+          </a:prstGeom>
+        </p:spPr>
+      </p:pic>
+      <p:pic>
+        <p:nvPicPr>
+          <p:cNvPr id="40" name="Picture 39">
+            <a:extLst>
+              <a:ext uri="{FF2B5EF4-FFF2-40B4-BE49-F238E27FC236}">
+                <a16:creationId xmlns:a16="http://schemas.microsoft.com/office/drawing/2014/main" id="{241057DC-347E-448E-90C8-67AFC5721BB5}"/>
+              </a:ext>
+            </a:extLst>
+          </p:cNvPr>
+          <p:cNvPicPr>
+            <a:picLocks noChangeAspect="1"/>
+          </p:cNvPicPr>
+          <p:nvPr/>
+        </p:nvPicPr>
+        <p:blipFill>
+          <a:blip r:embed="rId4"/>
+          <a:srcRect/>
+          <a:stretch/>
+        </p:blipFill>
+        <p:spPr>
+          <a:xfrm>
+            <a:off x="8318493" y="2194715"/>
+            <a:ext cx="3657607" cy="3657607"/>
+          </a:xfrm>
+          <a:prstGeom prst="rect">
+            <a:avLst/>
+          </a:prstGeom>
+        </p:spPr>
+      </p:pic>
     </p:spTree>
     <p:extLst>
       <p:ext uri="{BB962C8B-B14F-4D97-AF65-F5344CB8AC3E}">
-        <p14:creationId xmlns:p14="http://schemas.microsoft.com/office/powerpoint/2010/main" val="107865345"/>
+        <p14:creationId xmlns:p14="http://schemas.microsoft.com/office/powerpoint/2010/main" val="3430576475"/>
       </p:ext>
     </p:extLst>
   </p:cSld>
@@ -8176,10 +8297,10 @@
       </p:grpSpPr>
       <p:sp>
         <p:nvSpPr>
-          <p:cNvPr id="7" name="Title 6">
-            <a:extLst>
-              <a:ext uri="{FF2B5EF4-FFF2-40B4-BE49-F238E27FC236}">
-                <a16:creationId xmlns:a16="http://schemas.microsoft.com/office/drawing/2014/main" id="{75C0DCD3-95F8-4E1F-BF1A-5FAAB84A40A3}"/>
+          <p:cNvPr id="2" name="Title 1">
+            <a:extLst>
+              <a:ext uri="{FF2B5EF4-FFF2-40B4-BE49-F238E27FC236}">
+                <a16:creationId xmlns:a16="http://schemas.microsoft.com/office/drawing/2014/main" id="{84FE5820-4288-4CB6-888A-5CBF5468888C}"/>
               </a:ext>
             </a:extLst>
           </p:cNvPr>
@@ -8197,88 +8318,8 @@
           <a:p>
             <a:r>
               <a:rPr lang="en-US" dirty="0"/>
-              <a:t>ARIMA MODELS</a:t>
-            </a:r>
-          </a:p>
-        </p:txBody>
-      </p:sp>
-      <p:sp>
-        <p:nvSpPr>
-          <p:cNvPr id="8" name="Content Placeholder 7">
-            <a:extLst>
-              <a:ext uri="{FF2B5EF4-FFF2-40B4-BE49-F238E27FC236}">
-                <a16:creationId xmlns:a16="http://schemas.microsoft.com/office/drawing/2014/main" id="{52BB1FAB-BB61-4B66-A4EA-A0EABC2B3ECA}"/>
-              </a:ext>
-            </a:extLst>
-          </p:cNvPr>
-          <p:cNvSpPr>
-            <a:spLocks noGrp="1"/>
-          </p:cNvSpPr>
-          <p:nvPr>
-            <p:ph idx="1"/>
-          </p:nvPr>
-        </p:nvSpPr>
-        <p:spPr/>
-        <p:txBody>
-          <a:bodyPr/>
-          <a:lstStyle/>
-          <a:p>
-            <a:r>
-              <a:rPr lang="en-US" dirty="0"/>
-              <a:t>Auto-Regressive Integrated Moving Average models</a:t>
-            </a:r>
-          </a:p>
-          <a:p>
-            <a:r>
-              <a:rPr lang="en-US" dirty="0"/>
-              <a:t>Pros:</a:t>
-            </a:r>
-          </a:p>
-          <a:p>
-            <a:pPr lvl="1"/>
-            <a:r>
-              <a:rPr lang="en-US" dirty="0"/>
-              <a:t>Great at producing flexible models, solid support of periodic behavior and trending</a:t>
-            </a:r>
-          </a:p>
-          <a:p>
-            <a:pPr lvl="1"/>
-            <a:r>
-              <a:rPr lang="en-US" dirty="0"/>
-              <a:t>Parameters are fairly easy to interpret</a:t>
-            </a:r>
-          </a:p>
-          <a:p>
-            <a:pPr lvl="1"/>
-            <a:r>
-              <a:rPr lang="en-US" dirty="0"/>
-              <a:t>Widely used and mathematically well-understood</a:t>
-            </a:r>
-          </a:p>
-          <a:p>
-            <a:r>
-              <a:rPr lang="en-US" dirty="0"/>
-              <a:t>Cons:</a:t>
-            </a:r>
-          </a:p>
-          <a:p>
-            <a:pPr lvl="1"/>
-            <a:r>
-              <a:rPr lang="en-US" dirty="0"/>
-              <a:t>Bit of a pain to figure out the right parameters</a:t>
-            </a:r>
-          </a:p>
-          <a:p>
-            <a:pPr lvl="1"/>
-            <a:r>
-              <a:rPr lang="en-US" dirty="0"/>
-              <a:t>Not great at dealing with holidays, </a:t>
-            </a:r>
-            <a:r>
-              <a:rPr lang="en-US" dirty="0" err="1"/>
-              <a:t>etc</a:t>
-            </a:r>
-            <a:endParaRPr lang="en-US" dirty="0"/>
+              <a:t>LAGGED SCATTERPLOTS EXAMPLE</a:t>
+            </a:r>
           </a:p>
         </p:txBody>
       </p:sp>
@@ -8287,7 +8328,7 @@
           <p:cNvPr id="4" name="Date Placeholder 3">
             <a:extLst>
               <a:ext uri="{FF2B5EF4-FFF2-40B4-BE49-F238E27FC236}">
-                <a16:creationId xmlns:a16="http://schemas.microsoft.com/office/drawing/2014/main" id="{02256D86-7CE0-416E-B2A3-402D20EE9E90}"/>
+                <a16:creationId xmlns:a16="http://schemas.microsoft.com/office/drawing/2014/main" id="{F716348B-D7FE-46ED-8C48-CF5A55FF31CF}"/>
               </a:ext>
             </a:extLst>
           </p:cNvPr>
@@ -8303,7 +8344,7 @@
           <a:bodyPr/>
           <a:lstStyle/>
           <a:p>
-            <a:fld id="{B08FEED8-D7D4-44E9-BFBC-ED06B5996D94}" type="datetime4">
+            <a:fld id="{8AAE40A0-A7D8-4DC3-BC9E-BADA32DA2004}" type="datetime4">
               <a:rPr lang="en-US" smtClean="0"/>
               <a:t>July 29, 2019</a:t>
             </a:fld>
@@ -8316,7 +8357,7 @@
           <p:cNvPr id="5" name="Footer Placeholder 4">
             <a:extLst>
               <a:ext uri="{FF2B5EF4-FFF2-40B4-BE49-F238E27FC236}">
-                <a16:creationId xmlns:a16="http://schemas.microsoft.com/office/drawing/2014/main" id="{1D4ED112-7CF4-4BB9-B46E-B366A5054A9A}"/>
+                <a16:creationId xmlns:a16="http://schemas.microsoft.com/office/drawing/2014/main" id="{34059279-A1E7-4F19-B4BF-8C6B59A4CEFF}"/>
               </a:ext>
             </a:extLst>
           </p:cNvPr>
@@ -8373,7 +8414,7 @@
           <p:cNvPr id="6" name="Slide Number Placeholder 5">
             <a:extLst>
               <a:ext uri="{FF2B5EF4-FFF2-40B4-BE49-F238E27FC236}">
-                <a16:creationId xmlns:a16="http://schemas.microsoft.com/office/drawing/2014/main" id="{8CC75551-85BF-4C9F-8893-AA28ECA8A6B5}"/>
+                <a16:creationId xmlns:a16="http://schemas.microsoft.com/office/drawing/2014/main" id="{DE722C41-7366-4DE2-9AF4-E75E189A7733}"/>
               </a:ext>
             </a:extLst>
           </p:cNvPr>
@@ -8397,10 +8438,97 @@
           </a:p>
         </p:txBody>
       </p:sp>
+      <p:pic>
+        <p:nvPicPr>
+          <p:cNvPr id="36" name="Picture 35">
+            <a:extLst>
+              <a:ext uri="{FF2B5EF4-FFF2-40B4-BE49-F238E27FC236}">
+                <a16:creationId xmlns:a16="http://schemas.microsoft.com/office/drawing/2014/main" id="{3C70D8D5-BE0B-4104-8E31-7985B77E8B77}"/>
+              </a:ext>
+            </a:extLst>
+          </p:cNvPr>
+          <p:cNvPicPr>
+            <a:picLocks noChangeAspect="1"/>
+          </p:cNvPicPr>
+          <p:nvPr/>
+        </p:nvPicPr>
+        <p:blipFill>
+          <a:blip r:embed="rId2"/>
+          <a:srcRect/>
+          <a:stretch/>
+        </p:blipFill>
+        <p:spPr>
+          <a:xfrm>
+            <a:off x="215899" y="2194714"/>
+            <a:ext cx="3657607" cy="3657607"/>
+          </a:xfrm>
+          <a:prstGeom prst="rect">
+            <a:avLst/>
+          </a:prstGeom>
+        </p:spPr>
+      </p:pic>
+      <p:pic>
+        <p:nvPicPr>
+          <p:cNvPr id="38" name="Picture 37">
+            <a:extLst>
+              <a:ext uri="{FF2B5EF4-FFF2-40B4-BE49-F238E27FC236}">
+                <a16:creationId xmlns:a16="http://schemas.microsoft.com/office/drawing/2014/main" id="{C19FC7B9-4121-4D6F-B103-D200D3CE939C}"/>
+              </a:ext>
+            </a:extLst>
+          </p:cNvPr>
+          <p:cNvPicPr>
+            <a:picLocks noChangeAspect="1"/>
+          </p:cNvPicPr>
+          <p:nvPr/>
+        </p:nvPicPr>
+        <p:blipFill>
+          <a:blip r:embed="rId3"/>
+          <a:srcRect/>
+          <a:stretch/>
+        </p:blipFill>
+        <p:spPr>
+          <a:xfrm>
+            <a:off x="4267196" y="2194715"/>
+            <a:ext cx="3657607" cy="3657607"/>
+          </a:xfrm>
+          <a:prstGeom prst="rect">
+            <a:avLst/>
+          </a:prstGeom>
+        </p:spPr>
+      </p:pic>
+      <p:pic>
+        <p:nvPicPr>
+          <p:cNvPr id="40" name="Picture 39">
+            <a:extLst>
+              <a:ext uri="{FF2B5EF4-FFF2-40B4-BE49-F238E27FC236}">
+                <a16:creationId xmlns:a16="http://schemas.microsoft.com/office/drawing/2014/main" id="{241057DC-347E-448E-90C8-67AFC5721BB5}"/>
+              </a:ext>
+            </a:extLst>
+          </p:cNvPr>
+          <p:cNvPicPr>
+            <a:picLocks noChangeAspect="1"/>
+          </p:cNvPicPr>
+          <p:nvPr/>
+        </p:nvPicPr>
+        <p:blipFill>
+          <a:blip r:embed="rId4"/>
+          <a:srcRect/>
+          <a:stretch/>
+        </p:blipFill>
+        <p:spPr>
+          <a:xfrm>
+            <a:off x="8318493" y="2194715"/>
+            <a:ext cx="3657607" cy="3657607"/>
+          </a:xfrm>
+          <a:prstGeom prst="rect">
+            <a:avLst/>
+          </a:prstGeom>
+        </p:spPr>
+      </p:pic>
     </p:spTree>
     <p:extLst>
       <p:ext uri="{BB962C8B-B14F-4D97-AF65-F5344CB8AC3E}">
-        <p14:creationId xmlns:p14="http://schemas.microsoft.com/office/powerpoint/2010/main" val="1065550565"/>
+        <p14:creationId xmlns:p14="http://schemas.microsoft.com/office/powerpoint/2010/main" val="466019237"/>
       </p:ext>
     </p:extLst>
   </p:cSld>
@@ -8666,7 +8794,7 @@
           <p:cNvPr id="7" name="Title 6">
             <a:extLst>
               <a:ext uri="{FF2B5EF4-FFF2-40B4-BE49-F238E27FC236}">
-                <a16:creationId xmlns:a16="http://schemas.microsoft.com/office/drawing/2014/main" id="{75C0DCD3-95F8-4E1F-BF1A-5FAAB84A40A3}"/>
+                <a16:creationId xmlns:a16="http://schemas.microsoft.com/office/drawing/2014/main" id="{7802FB34-7510-47BC-8952-A1FE9728B0BF}"/>
               </a:ext>
             </a:extLst>
           </p:cNvPr>
@@ -8684,33 +8812,36 @@
           <a:p>
             <a:r>
               <a:rPr lang="en-US" dirty="0"/>
-              <a:t>AUTOREGRESSIVE</a:t>
-            </a:r>
-          </a:p>
-        </p:txBody>
-      </p:sp>
-      <p:sp>
-        <p:nvSpPr>
-          <p:cNvPr id="8" name="Content Placeholder 7">
-            <a:extLst>
-              <a:ext uri="{FF2B5EF4-FFF2-40B4-BE49-F238E27FC236}">
-                <a16:creationId xmlns:a16="http://schemas.microsoft.com/office/drawing/2014/main" id="{52BB1FAB-BB61-4B66-A4EA-A0EABC2B3ECA}"/>
-              </a:ext>
-            </a:extLst>
-          </p:cNvPr>
-          <p:cNvSpPr>
-            <a:spLocks noGrp="1"/>
-          </p:cNvSpPr>
-          <p:nvPr>
-            <p:ph idx="1"/>
-          </p:nvPr>
-        </p:nvSpPr>
-        <p:spPr/>
-        <p:txBody>
-          <a:bodyPr/>
-          <a:lstStyle/>
-          <a:p>
-            <a:endParaRPr lang="en-US"/>
+              <a:t>ARIMA MODELS</a:t>
+            </a:r>
+          </a:p>
+        </p:txBody>
+      </p:sp>
+      <p:sp>
+        <p:nvSpPr>
+          <p:cNvPr id="8" name="Text Placeholder 7">
+            <a:extLst>
+              <a:ext uri="{FF2B5EF4-FFF2-40B4-BE49-F238E27FC236}">
+                <a16:creationId xmlns:a16="http://schemas.microsoft.com/office/drawing/2014/main" id="{FCA70F1A-579E-4144-AE97-14FFC08FF0F5}"/>
+              </a:ext>
+            </a:extLst>
+          </p:cNvPr>
+          <p:cNvSpPr>
+            <a:spLocks noGrp="1"/>
+          </p:cNvSpPr>
+          <p:nvPr>
+            <p:ph type="body" idx="1"/>
+          </p:nvPr>
+        </p:nvSpPr>
+        <p:spPr/>
+        <p:txBody>
+          <a:bodyPr/>
+          <a:lstStyle/>
+          <a:p>
+            <a:r>
+              <a:rPr lang="en-US" dirty="0"/>
+              <a:t>Interpretable, simple and speedy time series modeling</a:t>
+            </a:r>
           </a:p>
         </p:txBody>
       </p:sp>
@@ -8719,7 +8850,7 @@
           <p:cNvPr id="4" name="Date Placeholder 3">
             <a:extLst>
               <a:ext uri="{FF2B5EF4-FFF2-40B4-BE49-F238E27FC236}">
-                <a16:creationId xmlns:a16="http://schemas.microsoft.com/office/drawing/2014/main" id="{02256D86-7CE0-416E-B2A3-402D20EE9E90}"/>
+                <a16:creationId xmlns:a16="http://schemas.microsoft.com/office/drawing/2014/main" id="{3AD929EF-0967-4B34-81B8-24D9EF91892E}"/>
               </a:ext>
             </a:extLst>
           </p:cNvPr>
@@ -8735,7 +8866,7 @@
           <a:bodyPr/>
           <a:lstStyle/>
           <a:p>
-            <a:fld id="{B08FEED8-D7D4-44E9-BFBC-ED06B5996D94}" type="datetime4">
+            <a:fld id="{8AAE40A0-A7D8-4DC3-BC9E-BADA32DA2004}" type="datetime4">
               <a:rPr lang="en-US" smtClean="0"/>
               <a:t>July 29, 2019</a:t>
             </a:fld>
@@ -8748,7 +8879,7 @@
           <p:cNvPr id="5" name="Footer Placeholder 4">
             <a:extLst>
               <a:ext uri="{FF2B5EF4-FFF2-40B4-BE49-F238E27FC236}">
-                <a16:creationId xmlns:a16="http://schemas.microsoft.com/office/drawing/2014/main" id="{1D4ED112-7CF4-4BB9-B46E-B366A5054A9A}"/>
+                <a16:creationId xmlns:a16="http://schemas.microsoft.com/office/drawing/2014/main" id="{3B5B35DD-F2EA-40D3-8039-8CD3802B2612}"/>
               </a:ext>
             </a:extLst>
           </p:cNvPr>
@@ -8805,7 +8936,7 @@
           <p:cNvPr id="6" name="Slide Number Placeholder 5">
             <a:extLst>
               <a:ext uri="{FF2B5EF4-FFF2-40B4-BE49-F238E27FC236}">
-                <a16:creationId xmlns:a16="http://schemas.microsoft.com/office/drawing/2014/main" id="{8CC75551-85BF-4C9F-8893-AA28ECA8A6B5}"/>
+                <a16:creationId xmlns:a16="http://schemas.microsoft.com/office/drawing/2014/main" id="{C3EB9A57-323C-47F5-867F-693F95A15FA4}"/>
               </a:ext>
             </a:extLst>
           </p:cNvPr>
@@ -8832,7 +8963,7 @@
     </p:spTree>
     <p:extLst>
       <p:ext uri="{BB962C8B-B14F-4D97-AF65-F5344CB8AC3E}">
-        <p14:creationId xmlns:p14="http://schemas.microsoft.com/office/powerpoint/2010/main" val="4066560549"/>
+        <p14:creationId xmlns:p14="http://schemas.microsoft.com/office/powerpoint/2010/main" val="107865345"/>
       </p:ext>
     </p:extLst>
   </p:cSld>
@@ -8861,10 +8992,10 @@
       </p:grpSpPr>
       <p:sp>
         <p:nvSpPr>
-          <p:cNvPr id="2" name="Title 1">
-            <a:extLst>
-              <a:ext uri="{FF2B5EF4-FFF2-40B4-BE49-F238E27FC236}">
-                <a16:creationId xmlns:a16="http://schemas.microsoft.com/office/drawing/2014/main" id="{D7EACF90-3E7B-4978-AB0C-ED5165419D19}"/>
+          <p:cNvPr id="7" name="Title 6">
+            <a:extLst>
+              <a:ext uri="{FF2B5EF4-FFF2-40B4-BE49-F238E27FC236}">
+                <a16:creationId xmlns:a16="http://schemas.microsoft.com/office/drawing/2014/main" id="{75C0DCD3-95F8-4E1F-BF1A-5FAAB84A40A3}"/>
               </a:ext>
             </a:extLst>
           </p:cNvPr>
@@ -8882,17 +9013,17 @@
           <a:p>
             <a:r>
               <a:rPr lang="en-US" dirty="0"/>
-              <a:t>MOVING AVERAGE</a:t>
-            </a:r>
-          </a:p>
-        </p:txBody>
-      </p:sp>
-      <p:sp>
-        <p:nvSpPr>
-          <p:cNvPr id="3" name="Content Placeholder 2">
-            <a:extLst>
-              <a:ext uri="{FF2B5EF4-FFF2-40B4-BE49-F238E27FC236}">
-                <a16:creationId xmlns:a16="http://schemas.microsoft.com/office/drawing/2014/main" id="{A7CEFEF5-E74A-4EFE-9368-8FD74B059E10}"/>
+              <a:t>ARIMA MODELS</a:t>
+            </a:r>
+          </a:p>
+        </p:txBody>
+      </p:sp>
+      <p:sp>
+        <p:nvSpPr>
+          <p:cNvPr id="8" name="Content Placeholder 7">
+            <a:extLst>
+              <a:ext uri="{FF2B5EF4-FFF2-40B4-BE49-F238E27FC236}">
+                <a16:creationId xmlns:a16="http://schemas.microsoft.com/office/drawing/2014/main" id="{52BB1FAB-BB61-4B66-A4EA-A0EABC2B3ECA}"/>
               </a:ext>
             </a:extLst>
           </p:cNvPr>
@@ -8908,7 +9039,62 @@
           <a:bodyPr/>
           <a:lstStyle/>
           <a:p>
-            <a:endParaRPr lang="en-US"/>
+            <a:r>
+              <a:rPr lang="en-US" dirty="0"/>
+              <a:t>Auto-Regressive Integrated Moving Average models</a:t>
+            </a:r>
+          </a:p>
+          <a:p>
+            <a:r>
+              <a:rPr lang="en-US" dirty="0"/>
+              <a:t>Pros:</a:t>
+            </a:r>
+          </a:p>
+          <a:p>
+            <a:pPr lvl="1"/>
+            <a:r>
+              <a:rPr lang="en-US" dirty="0"/>
+              <a:t>Great at producing flexible models, solid support of periodic behavior and trending</a:t>
+            </a:r>
+          </a:p>
+          <a:p>
+            <a:pPr lvl="1"/>
+            <a:r>
+              <a:rPr lang="en-US" dirty="0"/>
+              <a:t>Parameters are fairly easy to interpret</a:t>
+            </a:r>
+          </a:p>
+          <a:p>
+            <a:pPr lvl="1"/>
+            <a:r>
+              <a:rPr lang="en-US" dirty="0"/>
+              <a:t>Widely used and mathematically well-understood</a:t>
+            </a:r>
+          </a:p>
+          <a:p>
+            <a:r>
+              <a:rPr lang="en-US" dirty="0"/>
+              <a:t>Cons:</a:t>
+            </a:r>
+          </a:p>
+          <a:p>
+            <a:pPr lvl="1"/>
+            <a:r>
+              <a:rPr lang="en-US" dirty="0"/>
+              <a:t>Bit of a pain to figure out the right parameters</a:t>
+            </a:r>
+          </a:p>
+          <a:p>
+            <a:pPr lvl="1"/>
+            <a:r>
+              <a:rPr lang="en-US" dirty="0"/>
+              <a:t>Not great at dealing with holidays, </a:t>
+            </a:r>
+            <a:r>
+              <a:rPr lang="en-US" dirty="0" err="1"/>
+              <a:t>etc</a:t>
+            </a:r>
+            <a:endParaRPr lang="en-US" dirty="0"/>
           </a:p>
         </p:txBody>
       </p:sp>
@@ -8917,7 +9103,7 @@
           <p:cNvPr id="4" name="Date Placeholder 3">
             <a:extLst>
               <a:ext uri="{FF2B5EF4-FFF2-40B4-BE49-F238E27FC236}">
-                <a16:creationId xmlns:a16="http://schemas.microsoft.com/office/drawing/2014/main" id="{64E0A09F-EC7A-4EF6-AB3A-0DC48B1B7271}"/>
+                <a16:creationId xmlns:a16="http://schemas.microsoft.com/office/drawing/2014/main" id="{02256D86-7CE0-416E-B2A3-402D20EE9E90}"/>
               </a:ext>
             </a:extLst>
           </p:cNvPr>
@@ -8933,7 +9119,7 @@
           <a:bodyPr/>
           <a:lstStyle/>
           <a:p>
-            <a:fld id="{8AAE40A0-A7D8-4DC3-BC9E-BADA32DA2004}" type="datetime4">
+            <a:fld id="{B08FEED8-D7D4-44E9-BFBC-ED06B5996D94}" type="datetime4">
               <a:rPr lang="en-US" smtClean="0"/>
               <a:t>July 29, 2019</a:t>
             </a:fld>
@@ -8946,7 +9132,7 @@
           <p:cNvPr id="5" name="Footer Placeholder 4">
             <a:extLst>
               <a:ext uri="{FF2B5EF4-FFF2-40B4-BE49-F238E27FC236}">
-                <a16:creationId xmlns:a16="http://schemas.microsoft.com/office/drawing/2014/main" id="{9D8B7F07-2C50-4473-BABC-57C52FDD38D2}"/>
+                <a16:creationId xmlns:a16="http://schemas.microsoft.com/office/drawing/2014/main" id="{1D4ED112-7CF4-4BB9-B46E-B366A5054A9A}"/>
               </a:ext>
             </a:extLst>
           </p:cNvPr>
@@ -9003,7 +9189,7 @@
           <p:cNvPr id="6" name="Slide Number Placeholder 5">
             <a:extLst>
               <a:ext uri="{FF2B5EF4-FFF2-40B4-BE49-F238E27FC236}">
-                <a16:creationId xmlns:a16="http://schemas.microsoft.com/office/drawing/2014/main" id="{6BE5E43E-0696-4C60-A72C-BBB5B4448760}"/>
+                <a16:creationId xmlns:a16="http://schemas.microsoft.com/office/drawing/2014/main" id="{8CC75551-85BF-4C9F-8893-AA28ECA8A6B5}"/>
               </a:ext>
             </a:extLst>
           </p:cNvPr>
@@ -9030,7 +9216,7 @@
     </p:spTree>
     <p:extLst>
       <p:ext uri="{BB962C8B-B14F-4D97-AF65-F5344CB8AC3E}">
-        <p14:creationId xmlns:p14="http://schemas.microsoft.com/office/powerpoint/2010/main" val="3521777765"/>
+        <p14:creationId xmlns:p14="http://schemas.microsoft.com/office/powerpoint/2010/main" val="1065550565"/>
       </p:ext>
     </p:extLst>
   </p:cSld>
@@ -9059,10 +9245,10 @@
       </p:grpSpPr>
       <p:sp>
         <p:nvSpPr>
-          <p:cNvPr id="2" name="Title 1">
-            <a:extLst>
-              <a:ext uri="{FF2B5EF4-FFF2-40B4-BE49-F238E27FC236}">
-                <a16:creationId xmlns:a16="http://schemas.microsoft.com/office/drawing/2014/main" id="{84FE5820-4288-4CB6-888A-5CBF5468888C}"/>
+          <p:cNvPr id="7" name="Title 6">
+            <a:extLst>
+              <a:ext uri="{FF2B5EF4-FFF2-40B4-BE49-F238E27FC236}">
+                <a16:creationId xmlns:a16="http://schemas.microsoft.com/office/drawing/2014/main" id="{75C0DCD3-95F8-4E1F-BF1A-5FAAB84A40A3}"/>
               </a:ext>
             </a:extLst>
           </p:cNvPr>
@@ -9080,17 +9266,17 @@
           <a:p>
             <a:r>
               <a:rPr lang="en-US" dirty="0"/>
-              <a:t>AUTOCORRELATION PLOTS</a:t>
-            </a:r>
-          </a:p>
-        </p:txBody>
-      </p:sp>
-      <p:sp>
-        <p:nvSpPr>
-          <p:cNvPr id="3" name="Content Placeholder 2">
-            <a:extLst>
-              <a:ext uri="{FF2B5EF4-FFF2-40B4-BE49-F238E27FC236}">
-                <a16:creationId xmlns:a16="http://schemas.microsoft.com/office/drawing/2014/main" id="{2952943F-FC31-4BE3-AB00-BAB4B12957BE}"/>
+              <a:t>AUTOREGRESSIVE</a:t>
+            </a:r>
+          </a:p>
+        </p:txBody>
+      </p:sp>
+      <p:sp>
+        <p:nvSpPr>
+          <p:cNvPr id="8" name="Content Placeholder 7">
+            <a:extLst>
+              <a:ext uri="{FF2B5EF4-FFF2-40B4-BE49-F238E27FC236}">
+                <a16:creationId xmlns:a16="http://schemas.microsoft.com/office/drawing/2014/main" id="{52BB1FAB-BB61-4B66-A4EA-A0EABC2B3ECA}"/>
               </a:ext>
             </a:extLst>
           </p:cNvPr>
@@ -9106,7 +9292,7 @@
           <a:bodyPr/>
           <a:lstStyle/>
           <a:p>
-            <a:endParaRPr lang="en-US" dirty="0"/>
+            <a:endParaRPr lang="en-US"/>
           </a:p>
         </p:txBody>
       </p:sp>
@@ -9115,7 +9301,7 @@
           <p:cNvPr id="4" name="Date Placeholder 3">
             <a:extLst>
               <a:ext uri="{FF2B5EF4-FFF2-40B4-BE49-F238E27FC236}">
-                <a16:creationId xmlns:a16="http://schemas.microsoft.com/office/drawing/2014/main" id="{F716348B-D7FE-46ED-8C48-CF5A55FF31CF}"/>
+                <a16:creationId xmlns:a16="http://schemas.microsoft.com/office/drawing/2014/main" id="{02256D86-7CE0-416E-B2A3-402D20EE9E90}"/>
               </a:ext>
             </a:extLst>
           </p:cNvPr>
@@ -9131,7 +9317,7 @@
           <a:bodyPr/>
           <a:lstStyle/>
           <a:p>
-            <a:fld id="{8AAE40A0-A7D8-4DC3-BC9E-BADA32DA2004}" type="datetime4">
+            <a:fld id="{B08FEED8-D7D4-44E9-BFBC-ED06B5996D94}" type="datetime4">
               <a:rPr lang="en-US" smtClean="0"/>
               <a:t>July 29, 2019</a:t>
             </a:fld>
@@ -9144,7 +9330,7 @@
           <p:cNvPr id="5" name="Footer Placeholder 4">
             <a:extLst>
               <a:ext uri="{FF2B5EF4-FFF2-40B4-BE49-F238E27FC236}">
-                <a16:creationId xmlns:a16="http://schemas.microsoft.com/office/drawing/2014/main" id="{34059279-A1E7-4F19-B4BF-8C6B59A4CEFF}"/>
+                <a16:creationId xmlns:a16="http://schemas.microsoft.com/office/drawing/2014/main" id="{1D4ED112-7CF4-4BB9-B46E-B366A5054A9A}"/>
               </a:ext>
             </a:extLst>
           </p:cNvPr>
@@ -9201,7 +9387,7 @@
           <p:cNvPr id="6" name="Slide Number Placeholder 5">
             <a:extLst>
               <a:ext uri="{FF2B5EF4-FFF2-40B4-BE49-F238E27FC236}">
-                <a16:creationId xmlns:a16="http://schemas.microsoft.com/office/drawing/2014/main" id="{DE722C41-7366-4DE2-9AF4-E75E189A7733}"/>
+                <a16:creationId xmlns:a16="http://schemas.microsoft.com/office/drawing/2014/main" id="{8CC75551-85BF-4C9F-8893-AA28ECA8A6B5}"/>
               </a:ext>
             </a:extLst>
           </p:cNvPr>
@@ -9228,7 +9414,7 @@
     </p:spTree>
     <p:extLst>
       <p:ext uri="{BB962C8B-B14F-4D97-AF65-F5344CB8AC3E}">
-        <p14:creationId xmlns:p14="http://schemas.microsoft.com/office/powerpoint/2010/main" val="2546350057"/>
+        <p14:creationId xmlns:p14="http://schemas.microsoft.com/office/powerpoint/2010/main" val="4066560549"/>
       </p:ext>
     </p:extLst>
   </p:cSld>
@@ -9260,7 +9446,7 @@
           <p:cNvPr id="2" name="Title 1">
             <a:extLst>
               <a:ext uri="{FF2B5EF4-FFF2-40B4-BE49-F238E27FC236}">
-                <a16:creationId xmlns:a16="http://schemas.microsoft.com/office/drawing/2014/main" id="{84FE5820-4288-4CB6-888A-5CBF5468888C}"/>
+                <a16:creationId xmlns:a16="http://schemas.microsoft.com/office/drawing/2014/main" id="{D7EACF90-3E7B-4978-AB0C-ED5165419D19}"/>
               </a:ext>
             </a:extLst>
           </p:cNvPr>
@@ -9278,7 +9464,7 @@
           <a:p>
             <a:r>
               <a:rPr lang="en-US" dirty="0"/>
-              <a:t>PARTIAL AUTOCORRELATION PLOTS</a:t>
+              <a:t>MOVING AVERAGE</a:t>
             </a:r>
           </a:p>
         </p:txBody>
@@ -9288,7 +9474,7 @@
           <p:cNvPr id="3" name="Content Placeholder 2">
             <a:extLst>
               <a:ext uri="{FF2B5EF4-FFF2-40B4-BE49-F238E27FC236}">
-                <a16:creationId xmlns:a16="http://schemas.microsoft.com/office/drawing/2014/main" id="{2952943F-FC31-4BE3-AB00-BAB4B12957BE}"/>
+                <a16:creationId xmlns:a16="http://schemas.microsoft.com/office/drawing/2014/main" id="{A7CEFEF5-E74A-4EFE-9368-8FD74B059E10}"/>
               </a:ext>
             </a:extLst>
           </p:cNvPr>
@@ -9304,7 +9490,7 @@
           <a:bodyPr/>
           <a:lstStyle/>
           <a:p>
-            <a:endParaRPr lang="en-US" dirty="0"/>
+            <a:endParaRPr lang="en-US"/>
           </a:p>
         </p:txBody>
       </p:sp>
@@ -9313,7 +9499,7 @@
           <p:cNvPr id="4" name="Date Placeholder 3">
             <a:extLst>
               <a:ext uri="{FF2B5EF4-FFF2-40B4-BE49-F238E27FC236}">
-                <a16:creationId xmlns:a16="http://schemas.microsoft.com/office/drawing/2014/main" id="{F716348B-D7FE-46ED-8C48-CF5A55FF31CF}"/>
+                <a16:creationId xmlns:a16="http://schemas.microsoft.com/office/drawing/2014/main" id="{64E0A09F-EC7A-4EF6-AB3A-0DC48B1B7271}"/>
               </a:ext>
             </a:extLst>
           </p:cNvPr>
@@ -9342,7 +9528,7 @@
           <p:cNvPr id="5" name="Footer Placeholder 4">
             <a:extLst>
               <a:ext uri="{FF2B5EF4-FFF2-40B4-BE49-F238E27FC236}">
-                <a16:creationId xmlns:a16="http://schemas.microsoft.com/office/drawing/2014/main" id="{34059279-A1E7-4F19-B4BF-8C6B59A4CEFF}"/>
+                <a16:creationId xmlns:a16="http://schemas.microsoft.com/office/drawing/2014/main" id="{9D8B7F07-2C50-4473-BABC-57C52FDD38D2}"/>
               </a:ext>
             </a:extLst>
           </p:cNvPr>
@@ -9399,7 +9585,7 @@
           <p:cNvPr id="6" name="Slide Number Placeholder 5">
             <a:extLst>
               <a:ext uri="{FF2B5EF4-FFF2-40B4-BE49-F238E27FC236}">
-                <a16:creationId xmlns:a16="http://schemas.microsoft.com/office/drawing/2014/main" id="{DE722C41-7366-4DE2-9AF4-E75E189A7733}"/>
+                <a16:creationId xmlns:a16="http://schemas.microsoft.com/office/drawing/2014/main" id="{6BE5E43E-0696-4C60-A72C-BBB5B4448760}"/>
               </a:ext>
             </a:extLst>
           </p:cNvPr>
@@ -9426,7 +9612,7 @@
     </p:spTree>
     <p:extLst>
       <p:ext uri="{BB962C8B-B14F-4D97-AF65-F5344CB8AC3E}">
-        <p14:creationId xmlns:p14="http://schemas.microsoft.com/office/powerpoint/2010/main" val="1481024644"/>
+        <p14:creationId xmlns:p14="http://schemas.microsoft.com/office/powerpoint/2010/main" val="3521777765"/>
       </p:ext>
     </p:extLst>
   </p:cSld>
@@ -9458,7 +9644,7 @@
           <p:cNvPr id="2" name="Title 1">
             <a:extLst>
               <a:ext uri="{FF2B5EF4-FFF2-40B4-BE49-F238E27FC236}">
-                <a16:creationId xmlns:a16="http://schemas.microsoft.com/office/drawing/2014/main" id="{D1BF0482-6913-4A5E-A533-479864CB5349}"/>
+                <a16:creationId xmlns:a16="http://schemas.microsoft.com/office/drawing/2014/main" id="{84FE5820-4288-4CB6-888A-5CBF5468888C}"/>
               </a:ext>
             </a:extLst>
           </p:cNvPr>
@@ -9476,7 +9662,7 @@
           <a:p>
             <a:r>
               <a:rPr lang="en-US" dirty="0"/>
-              <a:t>PLAYING AROUND WITH ARIMA</a:t>
+              <a:t>AUTOCORRELATION PLOTS</a:t>
             </a:r>
           </a:p>
         </p:txBody>
@@ -9486,7 +9672,7 @@
           <p:cNvPr id="3" name="Content Placeholder 2">
             <a:extLst>
               <a:ext uri="{FF2B5EF4-FFF2-40B4-BE49-F238E27FC236}">
-                <a16:creationId xmlns:a16="http://schemas.microsoft.com/office/drawing/2014/main" id="{D48271C9-2790-46C9-B80B-52D215430CB8}"/>
+                <a16:creationId xmlns:a16="http://schemas.microsoft.com/office/drawing/2014/main" id="{2952943F-FC31-4BE3-AB00-BAB4B12957BE}"/>
               </a:ext>
             </a:extLst>
           </p:cNvPr>
@@ -9511,7 +9697,7 @@
           <p:cNvPr id="4" name="Date Placeholder 3">
             <a:extLst>
               <a:ext uri="{FF2B5EF4-FFF2-40B4-BE49-F238E27FC236}">
-                <a16:creationId xmlns:a16="http://schemas.microsoft.com/office/drawing/2014/main" id="{B23DAF35-209C-48FA-AAAB-F69E14183A91}"/>
+                <a16:creationId xmlns:a16="http://schemas.microsoft.com/office/drawing/2014/main" id="{F716348B-D7FE-46ED-8C48-CF5A55FF31CF}"/>
               </a:ext>
             </a:extLst>
           </p:cNvPr>
@@ -9540,7 +9726,7 @@
           <p:cNvPr id="5" name="Footer Placeholder 4">
             <a:extLst>
               <a:ext uri="{FF2B5EF4-FFF2-40B4-BE49-F238E27FC236}">
-                <a16:creationId xmlns:a16="http://schemas.microsoft.com/office/drawing/2014/main" id="{3D8E22A6-180D-41CF-9959-4347A11F2AD1}"/>
+                <a16:creationId xmlns:a16="http://schemas.microsoft.com/office/drawing/2014/main" id="{34059279-A1E7-4F19-B4BF-8C6B59A4CEFF}"/>
               </a:ext>
             </a:extLst>
           </p:cNvPr>
@@ -9597,7 +9783,7 @@
           <p:cNvPr id="6" name="Slide Number Placeholder 5">
             <a:extLst>
               <a:ext uri="{FF2B5EF4-FFF2-40B4-BE49-F238E27FC236}">
-                <a16:creationId xmlns:a16="http://schemas.microsoft.com/office/drawing/2014/main" id="{CECE3146-0C2B-4CC7-BC7C-FD23AAF7ECAE}"/>
+                <a16:creationId xmlns:a16="http://schemas.microsoft.com/office/drawing/2014/main" id="{DE722C41-7366-4DE2-9AF4-E75E189A7733}"/>
               </a:ext>
             </a:extLst>
           </p:cNvPr>
@@ -9624,7 +9810,7 @@
     </p:spTree>
     <p:extLst>
       <p:ext uri="{BB962C8B-B14F-4D97-AF65-F5344CB8AC3E}">
-        <p14:creationId xmlns:p14="http://schemas.microsoft.com/office/powerpoint/2010/main" val="3624540971"/>
+        <p14:creationId xmlns:p14="http://schemas.microsoft.com/office/powerpoint/2010/main" val="2546350057"/>
       </p:ext>
     </p:extLst>
   </p:cSld>
@@ -9653,10 +9839,10 @@
       </p:grpSpPr>
       <p:sp>
         <p:nvSpPr>
-          <p:cNvPr id="7" name="Title 6">
-            <a:extLst>
-              <a:ext uri="{FF2B5EF4-FFF2-40B4-BE49-F238E27FC236}">
-                <a16:creationId xmlns:a16="http://schemas.microsoft.com/office/drawing/2014/main" id="{7802FB34-7510-47BC-8952-A1FE9728B0BF}"/>
+          <p:cNvPr id="2" name="Title 1">
+            <a:extLst>
+              <a:ext uri="{FF2B5EF4-FFF2-40B4-BE49-F238E27FC236}">
+                <a16:creationId xmlns:a16="http://schemas.microsoft.com/office/drawing/2014/main" id="{84FE5820-4288-4CB6-888A-5CBF5468888C}"/>
               </a:ext>
             </a:extLst>
           </p:cNvPr>
@@ -9674,36 +9860,33 @@
           <a:p>
             <a:r>
               <a:rPr lang="en-US" dirty="0"/>
-              <a:t>PROPHET MODELS</a:t>
-            </a:r>
-          </a:p>
-        </p:txBody>
-      </p:sp>
-      <p:sp>
-        <p:nvSpPr>
-          <p:cNvPr id="8" name="Text Placeholder 7">
-            <a:extLst>
-              <a:ext uri="{FF2B5EF4-FFF2-40B4-BE49-F238E27FC236}">
-                <a16:creationId xmlns:a16="http://schemas.microsoft.com/office/drawing/2014/main" id="{FCA70F1A-579E-4144-AE97-14FFC08FF0F5}"/>
-              </a:ext>
-            </a:extLst>
-          </p:cNvPr>
-          <p:cNvSpPr>
-            <a:spLocks noGrp="1"/>
-          </p:cNvSpPr>
-          <p:nvPr>
-            <p:ph type="body" idx="1"/>
-          </p:nvPr>
-        </p:nvSpPr>
-        <p:spPr/>
-        <p:txBody>
-          <a:bodyPr/>
-          <a:lstStyle/>
-          <a:p>
-            <a:r>
-              <a:rPr lang="en-US" dirty="0"/>
-              <a:t>Facebook’s in-house forecasting tool</a:t>
-            </a:r>
+              <a:t>PARTIAL AUTOCORRELATION PLOTS</a:t>
+            </a:r>
+          </a:p>
+        </p:txBody>
+      </p:sp>
+      <p:sp>
+        <p:nvSpPr>
+          <p:cNvPr id="3" name="Content Placeholder 2">
+            <a:extLst>
+              <a:ext uri="{FF2B5EF4-FFF2-40B4-BE49-F238E27FC236}">
+                <a16:creationId xmlns:a16="http://schemas.microsoft.com/office/drawing/2014/main" id="{2952943F-FC31-4BE3-AB00-BAB4B12957BE}"/>
+              </a:ext>
+            </a:extLst>
+          </p:cNvPr>
+          <p:cNvSpPr>
+            <a:spLocks noGrp="1"/>
+          </p:cNvSpPr>
+          <p:nvPr>
+            <p:ph idx="1"/>
+          </p:nvPr>
+        </p:nvSpPr>
+        <p:spPr/>
+        <p:txBody>
+          <a:bodyPr/>
+          <a:lstStyle/>
+          <a:p>
+            <a:endParaRPr lang="en-US" dirty="0"/>
           </a:p>
         </p:txBody>
       </p:sp>
@@ -9712,7 +9895,7 @@
           <p:cNvPr id="4" name="Date Placeholder 3">
             <a:extLst>
               <a:ext uri="{FF2B5EF4-FFF2-40B4-BE49-F238E27FC236}">
-                <a16:creationId xmlns:a16="http://schemas.microsoft.com/office/drawing/2014/main" id="{3AD929EF-0967-4B34-81B8-24D9EF91892E}"/>
+                <a16:creationId xmlns:a16="http://schemas.microsoft.com/office/drawing/2014/main" id="{F716348B-D7FE-46ED-8C48-CF5A55FF31CF}"/>
               </a:ext>
             </a:extLst>
           </p:cNvPr>
@@ -9741,7 +9924,7 @@
           <p:cNvPr id="5" name="Footer Placeholder 4">
             <a:extLst>
               <a:ext uri="{FF2B5EF4-FFF2-40B4-BE49-F238E27FC236}">
-                <a16:creationId xmlns:a16="http://schemas.microsoft.com/office/drawing/2014/main" id="{3B5B35DD-F2EA-40D3-8039-8CD3802B2612}"/>
+                <a16:creationId xmlns:a16="http://schemas.microsoft.com/office/drawing/2014/main" id="{34059279-A1E7-4F19-B4BF-8C6B59A4CEFF}"/>
               </a:ext>
             </a:extLst>
           </p:cNvPr>
@@ -9798,7 +9981,7 @@
           <p:cNvPr id="6" name="Slide Number Placeholder 5">
             <a:extLst>
               <a:ext uri="{FF2B5EF4-FFF2-40B4-BE49-F238E27FC236}">
-                <a16:creationId xmlns:a16="http://schemas.microsoft.com/office/drawing/2014/main" id="{C3EB9A57-323C-47F5-867F-693F95A15FA4}"/>
+                <a16:creationId xmlns:a16="http://schemas.microsoft.com/office/drawing/2014/main" id="{DE722C41-7366-4DE2-9AF4-E75E189A7733}"/>
               </a:ext>
             </a:extLst>
           </p:cNvPr>
@@ -9825,7 +10008,7 @@
     </p:spTree>
     <p:extLst>
       <p:ext uri="{BB962C8B-B14F-4D97-AF65-F5344CB8AC3E}">
-        <p14:creationId xmlns:p14="http://schemas.microsoft.com/office/powerpoint/2010/main" val="4082739096"/>
+        <p14:creationId xmlns:p14="http://schemas.microsoft.com/office/powerpoint/2010/main" val="1481024644"/>
       </p:ext>
     </p:extLst>
   </p:cSld>
@@ -9854,10 +10037,10 @@
       </p:grpSpPr>
       <p:sp>
         <p:nvSpPr>
-          <p:cNvPr id="7" name="Title 6">
-            <a:extLst>
-              <a:ext uri="{FF2B5EF4-FFF2-40B4-BE49-F238E27FC236}">
-                <a16:creationId xmlns:a16="http://schemas.microsoft.com/office/drawing/2014/main" id="{75C0DCD3-95F8-4E1F-BF1A-5FAAB84A40A3}"/>
+          <p:cNvPr id="2" name="Title 1">
+            <a:extLst>
+              <a:ext uri="{FF2B5EF4-FFF2-40B4-BE49-F238E27FC236}">
+                <a16:creationId xmlns:a16="http://schemas.microsoft.com/office/drawing/2014/main" id="{D1BF0482-6913-4A5E-A533-479864CB5349}"/>
               </a:ext>
             </a:extLst>
           </p:cNvPr>
@@ -9875,17 +10058,17 @@
           <a:p>
             <a:r>
               <a:rPr lang="en-US" dirty="0"/>
-              <a:t>PROPHET MODELS</a:t>
-            </a:r>
-          </a:p>
-        </p:txBody>
-      </p:sp>
-      <p:sp>
-        <p:nvSpPr>
-          <p:cNvPr id="8" name="Content Placeholder 7">
-            <a:extLst>
-              <a:ext uri="{FF2B5EF4-FFF2-40B4-BE49-F238E27FC236}">
-                <a16:creationId xmlns:a16="http://schemas.microsoft.com/office/drawing/2014/main" id="{52BB1FAB-BB61-4B66-A4EA-A0EABC2B3ECA}"/>
+              <a:t>PLAYING AROUND WITH ARIMA</a:t>
+            </a:r>
+          </a:p>
+        </p:txBody>
+      </p:sp>
+      <p:sp>
+        <p:nvSpPr>
+          <p:cNvPr id="3" name="Content Placeholder 2">
+            <a:extLst>
+              <a:ext uri="{FF2B5EF4-FFF2-40B4-BE49-F238E27FC236}">
+                <a16:creationId xmlns:a16="http://schemas.microsoft.com/office/drawing/2014/main" id="{D48271C9-2790-46C9-B80B-52D215430CB8}"/>
               </a:ext>
             </a:extLst>
           </p:cNvPr>
@@ -9901,71 +10084,7 @@
           <a:bodyPr/>
           <a:lstStyle/>
           <a:p>
-            <a:r>
-              <a:rPr lang="en-US" dirty="0"/>
-              <a:t>Cutting up a forecast</a:t>
-            </a:r>
-          </a:p>
-          <a:p>
-            <a:r>
-              <a:rPr lang="en-US" dirty="0"/>
-              <a:t>Pros:</a:t>
-            </a:r>
-          </a:p>
-          <a:p>
-            <a:pPr lvl="1"/>
-            <a:r>
-              <a:rPr lang="en-US" dirty="0"/>
-              <a:t>Fast and scalable</a:t>
-            </a:r>
-          </a:p>
-          <a:p>
-            <a:pPr lvl="1"/>
-            <a:r>
-              <a:rPr lang="en-US" dirty="0"/>
-              <a:t>Parameters are very easy to understand</a:t>
-            </a:r>
-          </a:p>
-          <a:p>
-            <a:pPr lvl="1"/>
-            <a:r>
-              <a:rPr lang="en-US" dirty="0"/>
-              <a:t>Deals with holidays very elegantly</a:t>
-            </a:r>
-          </a:p>
-          <a:p>
-            <a:pPr lvl="1"/>
-            <a:r>
-              <a:rPr lang="en-US" dirty="0"/>
-              <a:t>Splitting models up allows even more flexibility</a:t>
-            </a:r>
-          </a:p>
-          <a:p>
-            <a:pPr lvl="1"/>
-            <a:r>
-              <a:rPr lang="en-US" dirty="0"/>
-              <a:t>Performs quite well! Results often better than ARIMA</a:t>
-            </a:r>
-          </a:p>
-          <a:p>
-            <a:r>
-              <a:rPr lang="en-US" dirty="0"/>
-              <a:t>Cons:</a:t>
-            </a:r>
-          </a:p>
-          <a:p>
-            <a:pPr lvl="1"/>
-            <a:r>
-              <a:rPr lang="en-US" dirty="0"/>
-              <a:t>Not as widely used (released in Sept. 2017)!</a:t>
-            </a:r>
-          </a:p>
-          <a:p>
-            <a:pPr lvl="1"/>
-            <a:r>
-              <a:rPr lang="en-US" dirty="0"/>
-              <a:t>The jury’s still out on this one</a:t>
-            </a:r>
+            <a:endParaRPr lang="en-US" dirty="0"/>
           </a:p>
         </p:txBody>
       </p:sp>
@@ -9974,7 +10093,7 @@
           <p:cNvPr id="4" name="Date Placeholder 3">
             <a:extLst>
               <a:ext uri="{FF2B5EF4-FFF2-40B4-BE49-F238E27FC236}">
-                <a16:creationId xmlns:a16="http://schemas.microsoft.com/office/drawing/2014/main" id="{02256D86-7CE0-416E-B2A3-402D20EE9E90}"/>
+                <a16:creationId xmlns:a16="http://schemas.microsoft.com/office/drawing/2014/main" id="{B23DAF35-209C-48FA-AAAB-F69E14183A91}"/>
               </a:ext>
             </a:extLst>
           </p:cNvPr>
@@ -9990,7 +10109,7 @@
           <a:bodyPr/>
           <a:lstStyle/>
           <a:p>
-            <a:fld id="{B08FEED8-D7D4-44E9-BFBC-ED06B5996D94}" type="datetime4">
+            <a:fld id="{8AAE40A0-A7D8-4DC3-BC9E-BADA32DA2004}" type="datetime4">
               <a:rPr lang="en-US" smtClean="0"/>
               <a:t>July 29, 2019</a:t>
             </a:fld>
@@ -10003,7 +10122,7 @@
           <p:cNvPr id="5" name="Footer Placeholder 4">
             <a:extLst>
               <a:ext uri="{FF2B5EF4-FFF2-40B4-BE49-F238E27FC236}">
-                <a16:creationId xmlns:a16="http://schemas.microsoft.com/office/drawing/2014/main" id="{1D4ED112-7CF4-4BB9-B46E-B366A5054A9A}"/>
+                <a16:creationId xmlns:a16="http://schemas.microsoft.com/office/drawing/2014/main" id="{3D8E22A6-180D-41CF-9959-4347A11F2AD1}"/>
               </a:ext>
             </a:extLst>
           </p:cNvPr>
@@ -10060,7 +10179,7 @@
           <p:cNvPr id="6" name="Slide Number Placeholder 5">
             <a:extLst>
               <a:ext uri="{FF2B5EF4-FFF2-40B4-BE49-F238E27FC236}">
-                <a16:creationId xmlns:a16="http://schemas.microsoft.com/office/drawing/2014/main" id="{8CC75551-85BF-4C9F-8893-AA28ECA8A6B5}"/>
+                <a16:creationId xmlns:a16="http://schemas.microsoft.com/office/drawing/2014/main" id="{CECE3146-0C2B-4CC7-BC7C-FD23AAF7ECAE}"/>
               </a:ext>
             </a:extLst>
           </p:cNvPr>
@@ -10087,7 +10206,7 @@
     </p:spTree>
     <p:extLst>
       <p:ext uri="{BB962C8B-B14F-4D97-AF65-F5344CB8AC3E}">
-        <p14:creationId xmlns:p14="http://schemas.microsoft.com/office/powerpoint/2010/main" val="3412561793"/>
+        <p14:creationId xmlns:p14="http://schemas.microsoft.com/office/powerpoint/2010/main" val="3624540971"/>
       </p:ext>
     </p:extLst>
   </p:cSld>
@@ -10137,14 +10256,7 @@
           <a:p>
             <a:r>
               <a:rPr lang="en-US" dirty="0"/>
-              <a:t>NEURAL NETWORK</a:t>
-            </a:r>
-            <a:br>
-              <a:rPr lang="en-US" dirty="0"/>
-            </a:br>
-            <a:r>
-              <a:rPr lang="en-US" dirty="0"/>
-              <a:t>APPROACHES</a:t>
+              <a:t>PROPHET MODELS</a:t>
             </a:r>
           </a:p>
         </p:txBody>
@@ -10172,7 +10284,7 @@
           <a:p>
             <a:r>
               <a:rPr lang="en-US" dirty="0"/>
-              <a:t>Breaking out the big guns</a:t>
+              <a:t>Facebook’s in-house forecasting tool</a:t>
             </a:r>
           </a:p>
         </p:txBody>
@@ -10295,7 +10407,7 @@
     </p:spTree>
     <p:extLst>
       <p:ext uri="{BB962C8B-B14F-4D97-AF65-F5344CB8AC3E}">
-        <p14:creationId xmlns:p14="http://schemas.microsoft.com/office/powerpoint/2010/main" val="1442732517"/>
+        <p14:creationId xmlns:p14="http://schemas.microsoft.com/office/powerpoint/2010/main" val="4082739096"/>
       </p:ext>
     </p:extLst>
   </p:cSld>
@@ -10345,7 +10457,7 @@
           <a:p>
             <a:r>
               <a:rPr lang="en-US" dirty="0"/>
-              <a:t>NEURAL NETWORK MODELS</a:t>
+              <a:t>PROPHET MODELS</a:t>
             </a:r>
           </a:p>
         </p:txBody>
@@ -10368,14 +10480,12 @@
         </p:nvSpPr>
         <p:spPr/>
         <p:txBody>
-          <a:bodyPr>
-            <a:normAutofit/>
-          </a:bodyPr>
-          <a:lstStyle/>
-          <a:p>
-            <a:r>
-              <a:rPr lang="en-US" dirty="0"/>
-              <a:t>Incomprehensible but extremely powerful</a:t>
+          <a:bodyPr/>
+          <a:lstStyle/>
+          <a:p>
+            <a:r>
+              <a:rPr lang="en-US" dirty="0"/>
+              <a:t>Cutting up a forecast</a:t>
             </a:r>
           </a:p>
           <a:p>
@@ -10388,7 +10498,35 @@
             <a:pPr lvl="1"/>
             <a:r>
               <a:rPr lang="en-US" dirty="0"/>
-              <a:t>Often extremely accurate</a:t>
+              <a:t>Fast and scalable</a:t>
+            </a:r>
+          </a:p>
+          <a:p>
+            <a:pPr lvl="1"/>
+            <a:r>
+              <a:rPr lang="en-US" dirty="0"/>
+              <a:t>Parameters are very easy to understand</a:t>
+            </a:r>
+          </a:p>
+          <a:p>
+            <a:pPr lvl="1"/>
+            <a:r>
+              <a:rPr lang="en-US" dirty="0"/>
+              <a:t>Deals with holidays very elegantly</a:t>
+            </a:r>
+          </a:p>
+          <a:p>
+            <a:pPr lvl="1"/>
+            <a:r>
+              <a:rPr lang="en-US" dirty="0"/>
+              <a:t>Splitting models up allows even more flexibility</a:t>
+            </a:r>
+          </a:p>
+          <a:p>
+            <a:pPr lvl="1"/>
+            <a:r>
+              <a:rPr lang="en-US" dirty="0"/>
+              <a:t>Performs quite well! Results often better than ARIMA</a:t>
             </a:r>
           </a:p>
           <a:p>
@@ -10401,35 +10539,14 @@
             <a:pPr lvl="1"/>
             <a:r>
               <a:rPr lang="en-US" dirty="0"/>
-              <a:t>More or less impossible to understand what any of the parameters mean</a:t>
+              <a:t>Not as widely used (released in Sept. 2017)!</a:t>
             </a:r>
           </a:p>
           <a:p>
             <a:pPr lvl="1"/>
             <a:r>
               <a:rPr lang="en-US" dirty="0"/>
-              <a:t>Can take a very long time to train the model</a:t>
-            </a:r>
-          </a:p>
-          <a:p>
-            <a:pPr lvl="1"/>
-            <a:r>
-              <a:rPr lang="en-US" dirty="0"/>
-              <a:t>Lots of moving parts and things that can go wrong</a:t>
-            </a:r>
-          </a:p>
-          <a:p>
-            <a:r>
-              <a:rPr lang="en-US" dirty="0"/>
-              <a:t>But perhaps here, </a:t>
-            </a:r>
-            <a:r>
-              <a:rPr lang="en-US"/>
-              <a:t>that one pro </a:t>
-            </a:r>
-            <a:r>
-              <a:rPr lang="en-US" dirty="0"/>
-              <a:t>may outweigh all the cons</a:t>
+              <a:t>The jury’s still out on this one</a:t>
             </a:r>
           </a:p>
         </p:txBody>
@@ -10552,7 +10669,7 @@
     </p:spTree>
     <p:extLst>
       <p:ext uri="{BB962C8B-B14F-4D97-AF65-F5344CB8AC3E}">
-        <p14:creationId xmlns:p14="http://schemas.microsoft.com/office/powerpoint/2010/main" val="4213654799"/>
+        <p14:creationId xmlns:p14="http://schemas.microsoft.com/office/powerpoint/2010/main" val="3412561793"/>
       </p:ext>
     </p:extLst>
   </p:cSld>
@@ -10584,7 +10701,7 @@
           <p:cNvPr id="7" name="Title 6">
             <a:extLst>
               <a:ext uri="{FF2B5EF4-FFF2-40B4-BE49-F238E27FC236}">
-                <a16:creationId xmlns:a16="http://schemas.microsoft.com/office/drawing/2014/main" id="{495B4BC0-844B-4414-A623-BEF78AAC1BA1}"/>
+                <a16:creationId xmlns:a16="http://schemas.microsoft.com/office/drawing/2014/main" id="{7802FB34-7510-47BC-8952-A1FE9728B0BF}"/>
               </a:ext>
             </a:extLst>
           </p:cNvPr>
@@ -10602,80 +10719,43 @@
           <a:p>
             <a:r>
               <a:rPr lang="en-US" dirty="0"/>
-              <a:t>ACKNOWLEDGMENTS</a:t>
-            </a:r>
-          </a:p>
-        </p:txBody>
-      </p:sp>
-      <p:sp>
-        <p:nvSpPr>
-          <p:cNvPr id="8" name="Content Placeholder 7">
-            <a:extLst>
-              <a:ext uri="{FF2B5EF4-FFF2-40B4-BE49-F238E27FC236}">
-                <a16:creationId xmlns:a16="http://schemas.microsoft.com/office/drawing/2014/main" id="{2BED3EB3-7E98-4A82-8335-7321D9E37B16}"/>
-              </a:ext>
-            </a:extLst>
-          </p:cNvPr>
-          <p:cNvSpPr>
-            <a:spLocks noGrp="1"/>
-          </p:cNvSpPr>
-          <p:nvPr>
-            <p:ph idx="1"/>
-          </p:nvPr>
-        </p:nvSpPr>
-        <p:spPr/>
-        <p:txBody>
-          <a:bodyPr/>
-          <a:lstStyle/>
-          <a:p>
-            <a:r>
-              <a:rPr lang="en-US" dirty="0"/>
-              <a:t>Plots were created using the ggplot2 package in R</a:t>
-            </a:r>
-          </a:p>
-          <a:p>
-            <a:r>
-              <a:rPr lang="en-US" dirty="0"/>
-              <a:t>Shumway and </a:t>
-            </a:r>
-            <a:r>
-              <a:rPr lang="en-US" dirty="0" err="1"/>
-              <a:t>Stoffer’s</a:t>
-            </a:r>
-            <a:r>
-              <a:rPr lang="en-US" dirty="0"/>
-              <a:t> </a:t>
-            </a:r>
-            <a:r>
-              <a:rPr lang="en-US" i="1" dirty="0"/>
-              <a:t>Time Series Analysis and Its Applications With R Examples, Fourth Edition </a:t>
-            </a:r>
-            <a:r>
-              <a:rPr lang="en-US" dirty="0"/>
-              <a:t>published by Springer was used as the main reference for the ARIMA section</a:t>
-            </a:r>
-          </a:p>
-          <a:p>
-            <a:r>
-              <a:rPr lang="en-US" i="1" dirty="0"/>
-              <a:t>Forecasting at Scale </a:t>
-            </a:r>
-            <a:r>
-              <a:rPr lang="en-US" dirty="0"/>
-              <a:t>by Sean J. Taylor and Benjamin </a:t>
-            </a:r>
-            <a:r>
-              <a:rPr lang="en-US" dirty="0" err="1"/>
-              <a:t>Letham</a:t>
-            </a:r>
-            <a:r>
-              <a:rPr lang="en-US" dirty="0"/>
-              <a:t> at Facebook was used as the main reference for the Prophet section</a:t>
-            </a:r>
-            <a:endParaRPr lang="en-US" i="1" dirty="0"/>
-          </a:p>
-          <a:p>
-            <a:endParaRPr lang="en-US" dirty="0"/>
+              <a:t>NEURAL NETWORK</a:t>
+            </a:r>
+            <a:br>
+              <a:rPr lang="en-US" dirty="0"/>
+            </a:br>
+            <a:r>
+              <a:rPr lang="en-US" dirty="0"/>
+              <a:t>APPROACHES</a:t>
+            </a:r>
+          </a:p>
+        </p:txBody>
+      </p:sp>
+      <p:sp>
+        <p:nvSpPr>
+          <p:cNvPr id="8" name="Text Placeholder 7">
+            <a:extLst>
+              <a:ext uri="{FF2B5EF4-FFF2-40B4-BE49-F238E27FC236}">
+                <a16:creationId xmlns:a16="http://schemas.microsoft.com/office/drawing/2014/main" id="{FCA70F1A-579E-4144-AE97-14FFC08FF0F5}"/>
+              </a:ext>
+            </a:extLst>
+          </p:cNvPr>
+          <p:cNvSpPr>
+            <a:spLocks noGrp="1"/>
+          </p:cNvSpPr>
+          <p:nvPr>
+            <p:ph type="body" idx="1"/>
+          </p:nvPr>
+        </p:nvSpPr>
+        <p:spPr/>
+        <p:txBody>
+          <a:bodyPr/>
+          <a:lstStyle/>
+          <a:p>
+            <a:r>
+              <a:rPr lang="en-US" dirty="0"/>
+              <a:t>Breaking out the big guns</a:t>
+            </a:r>
           </a:p>
         </p:txBody>
       </p:sp>
@@ -10684,7 +10764,7 @@
           <p:cNvPr id="4" name="Date Placeholder 3">
             <a:extLst>
               <a:ext uri="{FF2B5EF4-FFF2-40B4-BE49-F238E27FC236}">
-                <a16:creationId xmlns:a16="http://schemas.microsoft.com/office/drawing/2014/main" id="{540F37F1-4F33-429F-A568-1A3ADC499E54}"/>
+                <a16:creationId xmlns:a16="http://schemas.microsoft.com/office/drawing/2014/main" id="{3AD929EF-0967-4B34-81B8-24D9EF91892E}"/>
               </a:ext>
             </a:extLst>
           </p:cNvPr>
@@ -10700,7 +10780,7 @@
           <a:bodyPr/>
           <a:lstStyle/>
           <a:p>
-            <a:fld id="{B08FEED8-D7D4-44E9-BFBC-ED06B5996D94}" type="datetime4">
+            <a:fld id="{8AAE40A0-A7D8-4DC3-BC9E-BADA32DA2004}" type="datetime4">
               <a:rPr lang="en-US" smtClean="0"/>
               <a:t>July 29, 2019</a:t>
             </a:fld>
@@ -10713,7 +10793,7 @@
           <p:cNvPr id="5" name="Footer Placeholder 4">
             <a:extLst>
               <a:ext uri="{FF2B5EF4-FFF2-40B4-BE49-F238E27FC236}">
-                <a16:creationId xmlns:a16="http://schemas.microsoft.com/office/drawing/2014/main" id="{673FFA57-C126-4795-A5F6-DD33AAC5ACBD}"/>
+                <a16:creationId xmlns:a16="http://schemas.microsoft.com/office/drawing/2014/main" id="{3B5B35DD-F2EA-40D3-8039-8CD3802B2612}"/>
               </a:ext>
             </a:extLst>
           </p:cNvPr>
@@ -10770,7 +10850,7 @@
           <p:cNvPr id="6" name="Slide Number Placeholder 5">
             <a:extLst>
               <a:ext uri="{FF2B5EF4-FFF2-40B4-BE49-F238E27FC236}">
-                <a16:creationId xmlns:a16="http://schemas.microsoft.com/office/drawing/2014/main" id="{2FA49567-BB70-4798-8746-D0B522CCEE20}"/>
+                <a16:creationId xmlns:a16="http://schemas.microsoft.com/office/drawing/2014/main" id="{C3EB9A57-323C-47F5-867F-693F95A15FA4}"/>
               </a:ext>
             </a:extLst>
           </p:cNvPr>
@@ -10797,7 +10877,7 @@
     </p:spTree>
     <p:extLst>
       <p:ext uri="{BB962C8B-B14F-4D97-AF65-F5344CB8AC3E}">
-        <p14:creationId xmlns:p14="http://schemas.microsoft.com/office/powerpoint/2010/main" val="1585568494"/>
+        <p14:creationId xmlns:p14="http://schemas.microsoft.com/office/powerpoint/2010/main" val="1442732517"/>
       </p:ext>
     </p:extLst>
   </p:cSld>
@@ -11033,6 +11113,500 @@
     <p:extLst>
       <p:ext uri="{BB962C8B-B14F-4D97-AF65-F5344CB8AC3E}">
         <p14:creationId xmlns:p14="http://schemas.microsoft.com/office/powerpoint/2010/main" val="1017541021"/>
+      </p:ext>
+    </p:extLst>
+  </p:cSld>
+  <p:clrMapOvr>
+    <a:masterClrMapping/>
+  </p:clrMapOvr>
+</p:sld>
+</file>
+
+<file path=ppt/slides/slide40.xml><?xml version="1.0" encoding="utf-8"?>
+<p:sld xmlns:a="http://schemas.openxmlformats.org/drawingml/2006/main" xmlns:r="http://schemas.openxmlformats.org/officeDocument/2006/relationships" xmlns:p="http://schemas.openxmlformats.org/presentationml/2006/main">
+  <p:cSld>
+    <p:spTree>
+      <p:nvGrpSpPr>
+        <p:cNvPr id="1" name=""/>
+        <p:cNvGrpSpPr/>
+        <p:nvPr/>
+      </p:nvGrpSpPr>
+      <p:grpSpPr>
+        <a:xfrm>
+          <a:off x="0" y="0"/>
+          <a:ext cx="0" cy="0"/>
+          <a:chOff x="0" y="0"/>
+          <a:chExt cx="0" cy="0"/>
+        </a:xfrm>
+      </p:grpSpPr>
+      <p:sp>
+        <p:nvSpPr>
+          <p:cNvPr id="7" name="Title 6">
+            <a:extLst>
+              <a:ext uri="{FF2B5EF4-FFF2-40B4-BE49-F238E27FC236}">
+                <a16:creationId xmlns:a16="http://schemas.microsoft.com/office/drawing/2014/main" id="{75C0DCD3-95F8-4E1F-BF1A-5FAAB84A40A3}"/>
+              </a:ext>
+            </a:extLst>
+          </p:cNvPr>
+          <p:cNvSpPr>
+            <a:spLocks noGrp="1"/>
+          </p:cNvSpPr>
+          <p:nvPr>
+            <p:ph type="title"/>
+          </p:nvPr>
+        </p:nvSpPr>
+        <p:spPr/>
+        <p:txBody>
+          <a:bodyPr/>
+          <a:lstStyle/>
+          <a:p>
+            <a:r>
+              <a:rPr lang="en-US" dirty="0"/>
+              <a:t>NEURAL NETWORK MODELS</a:t>
+            </a:r>
+          </a:p>
+        </p:txBody>
+      </p:sp>
+      <p:sp>
+        <p:nvSpPr>
+          <p:cNvPr id="8" name="Content Placeholder 7">
+            <a:extLst>
+              <a:ext uri="{FF2B5EF4-FFF2-40B4-BE49-F238E27FC236}">
+                <a16:creationId xmlns:a16="http://schemas.microsoft.com/office/drawing/2014/main" id="{52BB1FAB-BB61-4B66-A4EA-A0EABC2B3ECA}"/>
+              </a:ext>
+            </a:extLst>
+          </p:cNvPr>
+          <p:cNvSpPr>
+            <a:spLocks noGrp="1"/>
+          </p:cNvSpPr>
+          <p:nvPr>
+            <p:ph idx="1"/>
+          </p:nvPr>
+        </p:nvSpPr>
+        <p:spPr/>
+        <p:txBody>
+          <a:bodyPr>
+            <a:normAutofit/>
+          </a:bodyPr>
+          <a:lstStyle/>
+          <a:p>
+            <a:r>
+              <a:rPr lang="en-US" dirty="0"/>
+              <a:t>Incomprehensible but extremely powerful</a:t>
+            </a:r>
+          </a:p>
+          <a:p>
+            <a:r>
+              <a:rPr lang="en-US" dirty="0"/>
+              <a:t>Pros:</a:t>
+            </a:r>
+          </a:p>
+          <a:p>
+            <a:pPr lvl="1"/>
+            <a:r>
+              <a:rPr lang="en-US" dirty="0"/>
+              <a:t>Often extremely accurate</a:t>
+            </a:r>
+          </a:p>
+          <a:p>
+            <a:r>
+              <a:rPr lang="en-US" dirty="0"/>
+              <a:t>Cons:</a:t>
+            </a:r>
+          </a:p>
+          <a:p>
+            <a:pPr lvl="1"/>
+            <a:r>
+              <a:rPr lang="en-US" dirty="0"/>
+              <a:t>More or less impossible to understand what any of the parameters mean</a:t>
+            </a:r>
+          </a:p>
+          <a:p>
+            <a:pPr lvl="1"/>
+            <a:r>
+              <a:rPr lang="en-US" dirty="0"/>
+              <a:t>Can take a very long time to train the model</a:t>
+            </a:r>
+          </a:p>
+          <a:p>
+            <a:pPr lvl="1"/>
+            <a:r>
+              <a:rPr lang="en-US" dirty="0"/>
+              <a:t>Lots of moving parts and things that can go wrong</a:t>
+            </a:r>
+          </a:p>
+          <a:p>
+            <a:r>
+              <a:rPr lang="en-US" dirty="0"/>
+              <a:t>But depending on the problem, that one pro may outweigh all the cons</a:t>
+            </a:r>
+          </a:p>
+        </p:txBody>
+      </p:sp>
+      <p:sp>
+        <p:nvSpPr>
+          <p:cNvPr id="4" name="Date Placeholder 3">
+            <a:extLst>
+              <a:ext uri="{FF2B5EF4-FFF2-40B4-BE49-F238E27FC236}">
+                <a16:creationId xmlns:a16="http://schemas.microsoft.com/office/drawing/2014/main" id="{02256D86-7CE0-416E-B2A3-402D20EE9E90}"/>
+              </a:ext>
+            </a:extLst>
+          </p:cNvPr>
+          <p:cNvSpPr>
+            <a:spLocks noGrp="1"/>
+          </p:cNvSpPr>
+          <p:nvPr>
+            <p:ph type="dt" sz="half" idx="10"/>
+          </p:nvPr>
+        </p:nvSpPr>
+        <p:spPr/>
+        <p:txBody>
+          <a:bodyPr/>
+          <a:lstStyle/>
+          <a:p>
+            <a:fld id="{B08FEED8-D7D4-44E9-BFBC-ED06B5996D94}" type="datetime4">
+              <a:rPr lang="en-US" smtClean="0"/>
+              <a:t>July 29, 2019</a:t>
+            </a:fld>
+            <a:endParaRPr lang="en-US" dirty="0"/>
+          </a:p>
+        </p:txBody>
+      </p:sp>
+      <p:sp>
+        <p:nvSpPr>
+          <p:cNvPr id="5" name="Footer Placeholder 4">
+            <a:extLst>
+              <a:ext uri="{FF2B5EF4-FFF2-40B4-BE49-F238E27FC236}">
+                <a16:creationId xmlns:a16="http://schemas.microsoft.com/office/drawing/2014/main" id="{1D4ED112-7CF4-4BB9-B46E-B366A5054A9A}"/>
+              </a:ext>
+            </a:extLst>
+          </p:cNvPr>
+          <p:cNvSpPr>
+            <a:spLocks noGrp="1"/>
+          </p:cNvSpPr>
+          <p:nvPr>
+            <p:ph type="ftr" sz="quarter" idx="11"/>
+          </p:nvPr>
+        </p:nvSpPr>
+        <p:spPr/>
+        <p:txBody>
+          <a:bodyPr/>
+          <a:lstStyle/>
+          <a:p>
+            <a:r>
+              <a:rPr lang="en-US"/>
+              <a:t>Digital Scholarship Services </a:t>
+            </a:r>
+            <a:r>
+              <a:rPr lang="en-US">
+                <a:solidFill>
+                  <a:schemeClr val="accent1">
+                    <a:lumMod val="50000"/>
+                  </a:schemeClr>
+                </a:solidFill>
+              </a:rPr>
+              <a:t>| Email</a:t>
+            </a:r>
+            <a:r>
+              <a:rPr lang="en-US"/>
+              <a:t> cf24@rice.edu </a:t>
+            </a:r>
+            <a:r>
+              <a:rPr lang="en-US">
+                <a:solidFill>
+                  <a:schemeClr val="accent1">
+                    <a:lumMod val="50000"/>
+                  </a:schemeClr>
+                </a:solidFill>
+              </a:rPr>
+              <a:t>|</a:t>
+            </a:r>
+            <a:r>
+              <a:rPr lang="en-US"/>
+              <a:t> library.rice.edu/dss</a:t>
+            </a:r>
+            <a:endParaRPr lang="en-US" dirty="0"/>
+          </a:p>
+        </p:txBody>
+      </p:sp>
+      <p:sp>
+        <p:nvSpPr>
+          <p:cNvPr id="6" name="Slide Number Placeholder 5">
+            <a:extLst>
+              <a:ext uri="{FF2B5EF4-FFF2-40B4-BE49-F238E27FC236}">
+                <a16:creationId xmlns:a16="http://schemas.microsoft.com/office/drawing/2014/main" id="{8CC75551-85BF-4C9F-8893-AA28ECA8A6B5}"/>
+              </a:ext>
+            </a:extLst>
+          </p:cNvPr>
+          <p:cNvSpPr>
+            <a:spLocks noGrp="1"/>
+          </p:cNvSpPr>
+          <p:nvPr>
+            <p:ph type="sldNum" sz="quarter" idx="12"/>
+          </p:nvPr>
+        </p:nvSpPr>
+        <p:spPr/>
+        <p:txBody>
+          <a:bodyPr/>
+          <a:lstStyle/>
+          <a:p>
+            <a:fld id="{D57F1E4F-1CFF-5643-939E-02111984F565}" type="slidenum">
+              <a:rPr lang="en-US" smtClean="0"/>
+              <a:t>40</a:t>
+            </a:fld>
+            <a:endParaRPr lang="en-US" dirty="0"/>
+          </a:p>
+        </p:txBody>
+      </p:sp>
+    </p:spTree>
+    <p:extLst>
+      <p:ext uri="{BB962C8B-B14F-4D97-AF65-F5344CB8AC3E}">
+        <p14:creationId xmlns:p14="http://schemas.microsoft.com/office/powerpoint/2010/main" val="4213654799"/>
+      </p:ext>
+    </p:extLst>
+  </p:cSld>
+  <p:clrMapOvr>
+    <a:masterClrMapping/>
+  </p:clrMapOvr>
+</p:sld>
+</file>
+
+<file path=ppt/slides/slide41.xml><?xml version="1.0" encoding="utf-8"?>
+<p:sld xmlns:a="http://schemas.openxmlformats.org/drawingml/2006/main" xmlns:r="http://schemas.openxmlformats.org/officeDocument/2006/relationships" xmlns:p="http://schemas.openxmlformats.org/presentationml/2006/main">
+  <p:cSld>
+    <p:spTree>
+      <p:nvGrpSpPr>
+        <p:cNvPr id="1" name=""/>
+        <p:cNvGrpSpPr/>
+        <p:nvPr/>
+      </p:nvGrpSpPr>
+      <p:grpSpPr>
+        <a:xfrm>
+          <a:off x="0" y="0"/>
+          <a:ext cx="0" cy="0"/>
+          <a:chOff x="0" y="0"/>
+          <a:chExt cx="0" cy="0"/>
+        </a:xfrm>
+      </p:grpSpPr>
+      <p:sp>
+        <p:nvSpPr>
+          <p:cNvPr id="7" name="Title 6">
+            <a:extLst>
+              <a:ext uri="{FF2B5EF4-FFF2-40B4-BE49-F238E27FC236}">
+                <a16:creationId xmlns:a16="http://schemas.microsoft.com/office/drawing/2014/main" id="{495B4BC0-844B-4414-A623-BEF78AAC1BA1}"/>
+              </a:ext>
+            </a:extLst>
+          </p:cNvPr>
+          <p:cNvSpPr>
+            <a:spLocks noGrp="1"/>
+          </p:cNvSpPr>
+          <p:nvPr>
+            <p:ph type="title"/>
+          </p:nvPr>
+        </p:nvSpPr>
+        <p:spPr/>
+        <p:txBody>
+          <a:bodyPr/>
+          <a:lstStyle/>
+          <a:p>
+            <a:r>
+              <a:rPr lang="en-US" dirty="0"/>
+              <a:t>ACKNOWLEDGMENTS</a:t>
+            </a:r>
+          </a:p>
+        </p:txBody>
+      </p:sp>
+      <p:sp>
+        <p:nvSpPr>
+          <p:cNvPr id="8" name="Content Placeholder 7">
+            <a:extLst>
+              <a:ext uri="{FF2B5EF4-FFF2-40B4-BE49-F238E27FC236}">
+                <a16:creationId xmlns:a16="http://schemas.microsoft.com/office/drawing/2014/main" id="{2BED3EB3-7E98-4A82-8335-7321D9E37B16}"/>
+              </a:ext>
+            </a:extLst>
+          </p:cNvPr>
+          <p:cNvSpPr>
+            <a:spLocks noGrp="1"/>
+          </p:cNvSpPr>
+          <p:nvPr>
+            <p:ph idx="1"/>
+          </p:nvPr>
+        </p:nvSpPr>
+        <p:spPr/>
+        <p:txBody>
+          <a:bodyPr/>
+          <a:lstStyle/>
+          <a:p>
+            <a:r>
+              <a:rPr lang="en-US" dirty="0"/>
+              <a:t>Plots were created using the ggplot2 package in R</a:t>
+            </a:r>
+          </a:p>
+          <a:p>
+            <a:r>
+              <a:rPr lang="en-US" dirty="0"/>
+              <a:t>Shumway and </a:t>
+            </a:r>
+            <a:r>
+              <a:rPr lang="en-US" dirty="0" err="1"/>
+              <a:t>Stoffer’s</a:t>
+            </a:r>
+            <a:r>
+              <a:rPr lang="en-US" dirty="0"/>
+              <a:t> </a:t>
+            </a:r>
+            <a:r>
+              <a:rPr lang="en-US" i="1" dirty="0"/>
+              <a:t>Time Series Analysis and Its Applications With R Examples, Fourth Edition </a:t>
+            </a:r>
+            <a:r>
+              <a:rPr lang="en-US" dirty="0"/>
+              <a:t>published by Springer was used as the main reference for the ARIMA section</a:t>
+            </a:r>
+          </a:p>
+          <a:p>
+            <a:r>
+              <a:rPr lang="en-US" i="1" dirty="0"/>
+              <a:t>Forecasting at Scale </a:t>
+            </a:r>
+            <a:r>
+              <a:rPr lang="en-US" dirty="0"/>
+              <a:t>by Sean J. Taylor and Benjamin </a:t>
+            </a:r>
+            <a:r>
+              <a:rPr lang="en-US" dirty="0" err="1"/>
+              <a:t>Letham</a:t>
+            </a:r>
+            <a:r>
+              <a:rPr lang="en-US" dirty="0"/>
+              <a:t> at Facebook was used as the main reference for the Prophet section</a:t>
+            </a:r>
+            <a:endParaRPr lang="en-US" i="1" dirty="0"/>
+          </a:p>
+          <a:p>
+            <a:endParaRPr lang="en-US" dirty="0"/>
+          </a:p>
+        </p:txBody>
+      </p:sp>
+      <p:sp>
+        <p:nvSpPr>
+          <p:cNvPr id="4" name="Date Placeholder 3">
+            <a:extLst>
+              <a:ext uri="{FF2B5EF4-FFF2-40B4-BE49-F238E27FC236}">
+                <a16:creationId xmlns:a16="http://schemas.microsoft.com/office/drawing/2014/main" id="{540F37F1-4F33-429F-A568-1A3ADC499E54}"/>
+              </a:ext>
+            </a:extLst>
+          </p:cNvPr>
+          <p:cNvSpPr>
+            <a:spLocks noGrp="1"/>
+          </p:cNvSpPr>
+          <p:nvPr>
+            <p:ph type="dt" sz="half" idx="10"/>
+          </p:nvPr>
+        </p:nvSpPr>
+        <p:spPr/>
+        <p:txBody>
+          <a:bodyPr/>
+          <a:lstStyle/>
+          <a:p>
+            <a:fld id="{B08FEED8-D7D4-44E9-BFBC-ED06B5996D94}" type="datetime4">
+              <a:rPr lang="en-US" smtClean="0"/>
+              <a:t>July 29, 2019</a:t>
+            </a:fld>
+            <a:endParaRPr lang="en-US" dirty="0"/>
+          </a:p>
+        </p:txBody>
+      </p:sp>
+      <p:sp>
+        <p:nvSpPr>
+          <p:cNvPr id="5" name="Footer Placeholder 4">
+            <a:extLst>
+              <a:ext uri="{FF2B5EF4-FFF2-40B4-BE49-F238E27FC236}">
+                <a16:creationId xmlns:a16="http://schemas.microsoft.com/office/drawing/2014/main" id="{673FFA57-C126-4795-A5F6-DD33AAC5ACBD}"/>
+              </a:ext>
+            </a:extLst>
+          </p:cNvPr>
+          <p:cNvSpPr>
+            <a:spLocks noGrp="1"/>
+          </p:cNvSpPr>
+          <p:nvPr>
+            <p:ph type="ftr" sz="quarter" idx="11"/>
+          </p:nvPr>
+        </p:nvSpPr>
+        <p:spPr/>
+        <p:txBody>
+          <a:bodyPr/>
+          <a:lstStyle/>
+          <a:p>
+            <a:r>
+              <a:rPr lang="en-US"/>
+              <a:t>Digital Scholarship Services </a:t>
+            </a:r>
+            <a:r>
+              <a:rPr lang="en-US">
+                <a:solidFill>
+                  <a:schemeClr val="accent1">
+                    <a:lumMod val="50000"/>
+                  </a:schemeClr>
+                </a:solidFill>
+              </a:rPr>
+              <a:t>| Email</a:t>
+            </a:r>
+            <a:r>
+              <a:rPr lang="en-US"/>
+              <a:t> cf24@rice.edu </a:t>
+            </a:r>
+            <a:r>
+              <a:rPr lang="en-US">
+                <a:solidFill>
+                  <a:schemeClr val="accent1">
+                    <a:lumMod val="50000"/>
+                  </a:schemeClr>
+                </a:solidFill>
+              </a:rPr>
+              <a:t>|</a:t>
+            </a:r>
+            <a:r>
+              <a:rPr lang="en-US"/>
+              <a:t> library.rice.edu/dss</a:t>
+            </a:r>
+            <a:endParaRPr lang="en-US" dirty="0"/>
+          </a:p>
+        </p:txBody>
+      </p:sp>
+      <p:sp>
+        <p:nvSpPr>
+          <p:cNvPr id="6" name="Slide Number Placeholder 5">
+            <a:extLst>
+              <a:ext uri="{FF2B5EF4-FFF2-40B4-BE49-F238E27FC236}">
+                <a16:creationId xmlns:a16="http://schemas.microsoft.com/office/drawing/2014/main" id="{2FA49567-BB70-4798-8746-D0B522CCEE20}"/>
+              </a:ext>
+            </a:extLst>
+          </p:cNvPr>
+          <p:cNvSpPr>
+            <a:spLocks noGrp="1"/>
+          </p:cNvSpPr>
+          <p:nvPr>
+            <p:ph type="sldNum" sz="quarter" idx="12"/>
+          </p:nvPr>
+        </p:nvSpPr>
+        <p:spPr/>
+        <p:txBody>
+          <a:bodyPr/>
+          <a:lstStyle/>
+          <a:p>
+            <a:fld id="{D57F1E4F-1CFF-5643-939E-02111984F565}" type="slidenum">
+              <a:rPr lang="en-US" smtClean="0"/>
+              <a:t>41</a:t>
+            </a:fld>
+            <a:endParaRPr lang="en-US" dirty="0"/>
+          </a:p>
+        </p:txBody>
+      </p:sp>
+    </p:spTree>
+    <p:extLst>
+      <p:ext uri="{BB962C8B-B14F-4D97-AF65-F5344CB8AC3E}">
+        <p14:creationId xmlns:p14="http://schemas.microsoft.com/office/powerpoint/2010/main" val="1585568494"/>
       </p:ext>
     </p:extLst>
   </p:cSld>

</xml_diff>

<commit_message>
integrate new plots, summary, extensions
</commit_message>
<xml_diff>
--- a/tsa/Introduction to Time Series Analysis.pptx
+++ b/tsa/Introduction to Time Series Analysis.pptx
@@ -5,7 +5,7 @@
     <p:sldMasterId id="2147483707" r:id="rId1"/>
   </p:sldMasterIdLst>
   <p:notesMasterIdLst>
-    <p:notesMasterId r:id="rId52"/>
+    <p:notesMasterId r:id="rId55"/>
   </p:notesMasterIdLst>
   <p:sldIdLst>
     <p:sldId id="266" r:id="rId2"/>
@@ -51,13 +51,16 @@
     <p:sldId id="314" r:id="rId42"/>
     <p:sldId id="315" r:id="rId43"/>
     <p:sldId id="285" r:id="rId44"/>
-    <p:sldId id="305" r:id="rId45"/>
-    <p:sldId id="307" r:id="rId46"/>
-    <p:sldId id="312" r:id="rId47"/>
-    <p:sldId id="313" r:id="rId48"/>
-    <p:sldId id="306" r:id="rId49"/>
-    <p:sldId id="309" r:id="rId50"/>
-    <p:sldId id="268" r:id="rId51"/>
+    <p:sldId id="322" r:id="rId45"/>
+    <p:sldId id="323" r:id="rId46"/>
+    <p:sldId id="324" r:id="rId47"/>
+    <p:sldId id="305" r:id="rId48"/>
+    <p:sldId id="307" r:id="rId49"/>
+    <p:sldId id="312" r:id="rId50"/>
+    <p:sldId id="313" r:id="rId51"/>
+    <p:sldId id="306" r:id="rId52"/>
+    <p:sldId id="309" r:id="rId53"/>
+    <p:sldId id="268" r:id="rId54"/>
   </p:sldIdLst>
   <p:sldSz cx="12192000" cy="6858000"/>
   <p:notesSz cx="6858000" cy="9144000"/>
@@ -4258,7 +4261,7 @@
       </p:sp>
       <p:pic>
         <p:nvPicPr>
-          <p:cNvPr id="3" name="Picture 2" descr="A picture containing wall, photo&#10;&#10;Description automatically generated">
+          <p:cNvPr id="3" name="Picture 2">
             <a:extLst>
               <a:ext uri="{FF2B5EF4-FFF2-40B4-BE49-F238E27FC236}">
                 <a16:creationId xmlns:a16="http://schemas.microsoft.com/office/drawing/2014/main" id="{EBB4BA44-0590-403D-983E-E588E89747FB}"/>
@@ -4272,14 +4275,13 @@
         </p:nvPicPr>
         <p:blipFill>
           <a:blip r:embed="rId2"/>
-          <a:stretch>
-            <a:fillRect/>
-          </a:stretch>
+          <a:srcRect/>
+          <a:stretch/>
         </p:blipFill>
         <p:spPr>
           <a:xfrm>
             <a:off x="2318836" y="1605064"/>
-            <a:ext cx="6761123" cy="4507415"/>
+            <a:ext cx="6761122" cy="4507415"/>
           </a:xfrm>
           <a:prstGeom prst="rect">
             <a:avLst/>
@@ -4481,7 +4483,7 @@
         <p:spPr>
           <a:xfrm>
             <a:off x="2333427" y="1605064"/>
-            <a:ext cx="6761122" cy="4507415"/>
+            <a:ext cx="6761122" cy="4507414"/>
           </a:xfrm>
           <a:prstGeom prst="rect">
             <a:avLst/>
@@ -4683,7 +4685,7 @@
         <p:spPr>
           <a:xfrm>
             <a:off x="2333427" y="1605064"/>
-            <a:ext cx="6761122" cy="4507414"/>
+            <a:ext cx="6761121" cy="4507414"/>
           </a:xfrm>
           <a:prstGeom prst="rect">
             <a:avLst/>
@@ -6327,7 +6329,7 @@
       </p:sp>
       <p:pic>
         <p:nvPicPr>
-          <p:cNvPr id="3" name="Picture 2" descr="A picture containing object, wall&#10;&#10;Description automatically generated">
+          <p:cNvPr id="3" name="Picture 2">
             <a:extLst>
               <a:ext uri="{FF2B5EF4-FFF2-40B4-BE49-F238E27FC236}">
                 <a16:creationId xmlns:a16="http://schemas.microsoft.com/office/drawing/2014/main" id="{81D79DD3-1A23-4425-93AB-C2F4AD2C0EFE}"/>
@@ -6341,9 +6343,8 @@
         </p:nvPicPr>
         <p:blipFill>
           <a:blip r:embed="rId2"/>
-          <a:stretch>
-            <a:fillRect/>
-          </a:stretch>
+          <a:srcRect/>
+          <a:stretch/>
         </p:blipFill>
         <p:spPr>
           <a:xfrm>
@@ -6357,7 +6358,7 @@
       </p:pic>
       <p:pic>
         <p:nvPicPr>
-          <p:cNvPr id="10" name="Picture 9" descr="A picture containing object, wall&#10;&#10;Description automatically generated">
+          <p:cNvPr id="10" name="Picture 9">
             <a:extLst>
               <a:ext uri="{FF2B5EF4-FFF2-40B4-BE49-F238E27FC236}">
                 <a16:creationId xmlns:a16="http://schemas.microsoft.com/office/drawing/2014/main" id="{4DB675E2-5136-47EF-A8E1-1A96E56E602A}"/>
@@ -6371,9 +6372,8 @@
         </p:nvPicPr>
         <p:blipFill>
           <a:blip r:embed="rId3"/>
-          <a:stretch>
-            <a:fillRect/>
-          </a:stretch>
+          <a:srcRect/>
+          <a:stretch/>
         </p:blipFill>
         <p:spPr>
           <a:xfrm>
@@ -6461,7 +6461,9 @@
         </p:nvSpPr>
         <p:spPr/>
         <p:txBody>
-          <a:bodyPr/>
+          <a:bodyPr>
+            <a:normAutofit lnSpcReduction="10000"/>
+          </a:bodyPr>
           <a:lstStyle/>
           <a:p>
             <a:r>
@@ -6472,6 +6474,33 @@
           <a:p>
             <a:r>
               <a:rPr lang="en-US" dirty="0"/>
+              <a:t>Say we have a list of 1, 7, 10, 13, and 2</a:t>
+            </a:r>
+          </a:p>
+          <a:p>
+            <a:pPr lvl="1"/>
+            <a:r>
+              <a:rPr lang="en-US" dirty="0"/>
+              <a:t>First order difference: 7-1, 10-7, 13-10, 2-13</a:t>
+            </a:r>
+          </a:p>
+          <a:p>
+            <a:pPr lvl="1"/>
+            <a:r>
+              <a:rPr lang="en-US" dirty="0"/>
+              <a:t>Third order difference: 13-1, 2-7</a:t>
+            </a:r>
+          </a:p>
+          <a:p>
+            <a:pPr lvl="1"/>
+            <a:r>
+              <a:rPr lang="en-US" dirty="0"/>
+              <a:t>Losing data at the start!</a:t>
+            </a:r>
+          </a:p>
+          <a:p>
+            <a:r>
+              <a:rPr lang="en-US" dirty="0"/>
               <a:t>If there’s a linear trend, first order differencing will get rid of it!</a:t>
             </a:r>
           </a:p>
@@ -6479,18 +6508,13 @@
             <a:pPr lvl="1"/>
             <a:r>
               <a:rPr lang="en-US" dirty="0"/>
-              <a:t>You can do higher orders for quadratic trends, </a:t>
-            </a:r>
-            <a:r>
-              <a:rPr lang="en-US" dirty="0" err="1"/>
-              <a:t>etc</a:t>
-            </a:r>
-            <a:endParaRPr lang="en-US" dirty="0"/>
-          </a:p>
-          <a:p>
-            <a:r>
-              <a:rPr lang="en-US" dirty="0"/>
-              <a:t>Also, used for removing some cyclic effects</a:t>
+              <a:t>You can do higher orders for quadratic trends, etc.</a:t>
+            </a:r>
+          </a:p>
+          <a:p>
+            <a:r>
+              <a:rPr lang="en-US" dirty="0"/>
+              <a:t>Also used for removing some cyclic effects</a:t>
             </a:r>
           </a:p>
           <a:p>
@@ -6806,7 +6830,7 @@
       </p:sp>
       <p:pic>
         <p:nvPicPr>
-          <p:cNvPr id="12" name="Picture 11" descr="A close up of an object&#10;&#10;Description automatically generated">
+          <p:cNvPr id="12" name="Picture 11">
             <a:extLst>
               <a:ext uri="{FF2B5EF4-FFF2-40B4-BE49-F238E27FC236}">
                 <a16:creationId xmlns:a16="http://schemas.microsoft.com/office/drawing/2014/main" id="{AABDA63B-B698-427D-8F40-BBF7EE5F5B9F}"/>
@@ -6820,9 +6844,8 @@
         </p:nvPicPr>
         <p:blipFill>
           <a:blip r:embed="rId2"/>
-          <a:stretch>
-            <a:fillRect/>
-          </a:stretch>
+          <a:srcRect/>
+          <a:stretch/>
         </p:blipFill>
         <p:spPr>
           <a:xfrm>
@@ -6836,7 +6859,7 @@
       </p:pic>
       <p:pic>
         <p:nvPicPr>
-          <p:cNvPr id="14" name="Picture 13" descr="A picture containing object&#10;&#10;Description automatically generated">
+          <p:cNvPr id="14" name="Picture 13">
             <a:extLst>
               <a:ext uri="{FF2B5EF4-FFF2-40B4-BE49-F238E27FC236}">
                 <a16:creationId xmlns:a16="http://schemas.microsoft.com/office/drawing/2014/main" id="{7137C433-1CD0-43BC-9688-AF18563F703B}"/>
@@ -6850,9 +6873,8 @@
         </p:nvPicPr>
         <p:blipFill>
           <a:blip r:embed="rId3"/>
-          <a:stretch>
-            <a:fillRect/>
-          </a:stretch>
+          <a:srcRect/>
+          <a:stretch/>
         </p:blipFill>
         <p:spPr>
           <a:xfrm>
@@ -7076,7 +7098,7 @@
       </p:pic>
       <p:pic>
         <p:nvPicPr>
-          <p:cNvPr id="14" name="Picture 13" descr="A picture containing object&#10;&#10;Description automatically generated">
+          <p:cNvPr id="14" name="Picture 13">
             <a:extLst>
               <a:ext uri="{FF2B5EF4-FFF2-40B4-BE49-F238E27FC236}">
                 <a16:creationId xmlns:a16="http://schemas.microsoft.com/office/drawing/2014/main" id="{7137C433-1CD0-43BC-9688-AF18563F703B}"/>
@@ -7090,9 +7112,8 @@
         </p:nvPicPr>
         <p:blipFill>
           <a:blip r:embed="rId3"/>
-          <a:stretch>
-            <a:fillRect/>
-          </a:stretch>
+          <a:srcRect/>
+          <a:stretch/>
         </p:blipFill>
         <p:spPr>
           <a:xfrm>
@@ -7308,7 +7329,7 @@
       </p:pic>
       <p:pic>
         <p:nvPicPr>
-          <p:cNvPr id="14" name="Picture 13" descr="A picture containing object&#10;&#10;Description automatically generated">
+          <p:cNvPr id="14" name="Picture 13">
             <a:extLst>
               <a:ext uri="{FF2B5EF4-FFF2-40B4-BE49-F238E27FC236}">
                 <a16:creationId xmlns:a16="http://schemas.microsoft.com/office/drawing/2014/main" id="{7137C433-1CD0-43BC-9688-AF18563F703B}"/>
@@ -7322,9 +7343,8 @@
         </p:nvPicPr>
         <p:blipFill>
           <a:blip r:embed="rId3"/>
-          <a:stretch>
-            <a:fillRect/>
-          </a:stretch>
+          <a:srcRect/>
+          <a:stretch/>
         </p:blipFill>
         <p:spPr>
           <a:xfrm>
@@ -8434,7 +8454,7 @@
             <a:pPr lvl="1"/>
             <a:r>
               <a:rPr lang="en-US" dirty="0"/>
-              <a:t>If you have less than ~0.5, you’re all set to model!</a:t>
+              <a:t>If you have less than ~0.05, you’re all set to model!</a:t>
             </a:r>
           </a:p>
           <a:p>
@@ -10006,6 +10026,36 @@
           </a:p>
         </p:txBody>
       </p:sp>
+      <p:pic>
+        <p:nvPicPr>
+          <p:cNvPr id="3" name="Picture 2" descr="A picture containing object&#10;&#10;Description automatically generated">
+            <a:extLst>
+              <a:ext uri="{FF2B5EF4-FFF2-40B4-BE49-F238E27FC236}">
+                <a16:creationId xmlns:a16="http://schemas.microsoft.com/office/drawing/2014/main" id="{31A1B247-4314-4A59-A10F-CCA14BE5A304}"/>
+              </a:ext>
+            </a:extLst>
+          </p:cNvPr>
+          <p:cNvPicPr>
+            <a:picLocks noChangeAspect="1"/>
+          </p:cNvPicPr>
+          <p:nvPr/>
+        </p:nvPicPr>
+        <p:blipFill>
+          <a:blip r:embed="rId2"/>
+          <a:stretch>
+            <a:fillRect/>
+          </a:stretch>
+        </p:blipFill>
+        <p:spPr>
+          <a:xfrm>
+            <a:off x="5952118" y="2029572"/>
+            <a:ext cx="5715798" cy="3810532"/>
+          </a:xfrm>
+          <a:prstGeom prst="rect">
+            <a:avLst/>
+          </a:prstGeom>
+        </p:spPr>
+      </p:pic>
     </p:spTree>
     <p:extLst>
       <p:ext uri="{BB962C8B-B14F-4D97-AF65-F5344CB8AC3E}">
@@ -10988,7 +11038,12 @@
             <p:ph idx="1"/>
           </p:nvPr>
         </p:nvSpPr>
-        <p:spPr/>
+        <p:spPr>
+          <a:xfrm>
+            <a:off x="838200" y="1825625"/>
+            <a:ext cx="5299953" cy="4351338"/>
+          </a:xfrm>
+        </p:spPr>
         <p:txBody>
           <a:bodyPr/>
           <a:lstStyle/>
@@ -11128,6 +11183,36 @@
           </a:p>
         </p:txBody>
       </p:sp>
+      <p:pic>
+        <p:nvPicPr>
+          <p:cNvPr id="8" name="Picture 7">
+            <a:extLst>
+              <a:ext uri="{FF2B5EF4-FFF2-40B4-BE49-F238E27FC236}">
+                <a16:creationId xmlns:a16="http://schemas.microsoft.com/office/drawing/2014/main" id="{435435D2-7683-439E-AE85-96980180FAB4}"/>
+              </a:ext>
+            </a:extLst>
+          </p:cNvPr>
+          <p:cNvPicPr>
+            <a:picLocks noChangeAspect="1"/>
+          </p:cNvPicPr>
+          <p:nvPr/>
+        </p:nvPicPr>
+        <p:blipFill>
+          <a:blip r:embed="rId2"/>
+          <a:stretch>
+            <a:fillRect/>
+          </a:stretch>
+        </p:blipFill>
+        <p:spPr>
+          <a:xfrm>
+            <a:off x="6138153" y="2096028"/>
+            <a:ext cx="5715798" cy="3810532"/>
+          </a:xfrm>
+          <a:prstGeom prst="rect">
+            <a:avLst/>
+          </a:prstGeom>
+        </p:spPr>
+      </p:pic>
     </p:spTree>
     <p:extLst>
       <p:ext uri="{BB962C8B-B14F-4D97-AF65-F5344CB8AC3E}">
@@ -11437,7 +11522,12 @@
             <p:ph idx="1"/>
           </p:nvPr>
         </p:nvSpPr>
-        <p:spPr/>
+        <p:spPr>
+          <a:xfrm>
+            <a:off x="838200" y="1825625"/>
+            <a:ext cx="5257800" cy="4351338"/>
+          </a:xfrm>
+        </p:spPr>
         <p:txBody>
           <a:bodyPr/>
           <a:lstStyle/>
@@ -11586,6 +11676,36 @@
           </a:p>
         </p:txBody>
       </p:sp>
+      <p:pic>
+        <p:nvPicPr>
+          <p:cNvPr id="8" name="Picture 7">
+            <a:extLst>
+              <a:ext uri="{FF2B5EF4-FFF2-40B4-BE49-F238E27FC236}">
+                <a16:creationId xmlns:a16="http://schemas.microsoft.com/office/drawing/2014/main" id="{6403D5D9-449B-4709-8421-C49A28D99594}"/>
+              </a:ext>
+            </a:extLst>
+          </p:cNvPr>
+          <p:cNvPicPr>
+            <a:picLocks noChangeAspect="1"/>
+          </p:cNvPicPr>
+          <p:nvPr/>
+        </p:nvPicPr>
+        <p:blipFill>
+          <a:blip r:embed="rId2"/>
+          <a:stretch>
+            <a:fillRect/>
+          </a:stretch>
+        </p:blipFill>
+        <p:spPr>
+          <a:xfrm>
+            <a:off x="6096000" y="2096028"/>
+            <a:ext cx="5715798" cy="3810532"/>
+          </a:xfrm>
+          <a:prstGeom prst="rect">
+            <a:avLst/>
+          </a:prstGeom>
+        </p:spPr>
+      </p:pic>
     </p:spTree>
     <p:extLst>
       <p:ext uri="{BB962C8B-B14F-4D97-AF65-F5344CB8AC3E}">
@@ -12537,10 +12657,10 @@
       </p:grpSpPr>
       <p:sp>
         <p:nvSpPr>
-          <p:cNvPr id="7" name="Title 6">
-            <a:extLst>
-              <a:ext uri="{FF2B5EF4-FFF2-40B4-BE49-F238E27FC236}">
-                <a16:creationId xmlns:a16="http://schemas.microsoft.com/office/drawing/2014/main" id="{7802FB34-7510-47BC-8952-A1FE9728B0BF}"/>
+          <p:cNvPr id="2" name="Title 1">
+            <a:extLst>
+              <a:ext uri="{FF2B5EF4-FFF2-40B4-BE49-F238E27FC236}">
+                <a16:creationId xmlns:a16="http://schemas.microsoft.com/office/drawing/2014/main" id="{D1BF0482-6913-4A5E-A533-479864CB5349}"/>
               </a:ext>
             </a:extLst>
           </p:cNvPr>
@@ -12558,35 +12678,7 @@
           <a:p>
             <a:r>
               <a:rPr lang="en-US" dirty="0"/>
-              <a:t>PROPHET MODELS</a:t>
-            </a:r>
-          </a:p>
-        </p:txBody>
-      </p:sp>
-      <p:sp>
-        <p:nvSpPr>
-          <p:cNvPr id="8" name="Text Placeholder 7">
-            <a:extLst>
-              <a:ext uri="{FF2B5EF4-FFF2-40B4-BE49-F238E27FC236}">
-                <a16:creationId xmlns:a16="http://schemas.microsoft.com/office/drawing/2014/main" id="{FCA70F1A-579E-4144-AE97-14FFC08FF0F5}"/>
-              </a:ext>
-            </a:extLst>
-          </p:cNvPr>
-          <p:cNvSpPr>
-            <a:spLocks noGrp="1"/>
-          </p:cNvSpPr>
-          <p:nvPr>
-            <p:ph type="body" idx="1"/>
-          </p:nvPr>
-        </p:nvSpPr>
-        <p:spPr/>
-        <p:txBody>
-          <a:bodyPr/>
-          <a:lstStyle/>
-          <a:p>
-            <a:r>
-              <a:rPr lang="en-US" dirty="0"/>
-              <a:t>Facebook’s in-house forecasting tool</a:t>
+              <a:t>AN ARIMA MODEL</a:t>
             </a:r>
           </a:p>
         </p:txBody>
@@ -12596,7 +12688,7 @@
           <p:cNvPr id="4" name="Date Placeholder 3">
             <a:extLst>
               <a:ext uri="{FF2B5EF4-FFF2-40B4-BE49-F238E27FC236}">
-                <a16:creationId xmlns:a16="http://schemas.microsoft.com/office/drawing/2014/main" id="{3AD929EF-0967-4B34-81B8-24D9EF91892E}"/>
+                <a16:creationId xmlns:a16="http://schemas.microsoft.com/office/drawing/2014/main" id="{B23DAF35-209C-48FA-AAAB-F69E14183A91}"/>
               </a:ext>
             </a:extLst>
           </p:cNvPr>
@@ -12625,7 +12717,7 @@
           <p:cNvPr id="5" name="Footer Placeholder 4">
             <a:extLst>
               <a:ext uri="{FF2B5EF4-FFF2-40B4-BE49-F238E27FC236}">
-                <a16:creationId xmlns:a16="http://schemas.microsoft.com/office/drawing/2014/main" id="{3B5B35DD-F2EA-40D3-8039-8CD3802B2612}"/>
+                <a16:creationId xmlns:a16="http://schemas.microsoft.com/office/drawing/2014/main" id="{3D8E22A6-180D-41CF-9959-4347A11F2AD1}"/>
               </a:ext>
             </a:extLst>
           </p:cNvPr>
@@ -12682,7 +12774,7 @@
           <p:cNvPr id="6" name="Slide Number Placeholder 5">
             <a:extLst>
               <a:ext uri="{FF2B5EF4-FFF2-40B4-BE49-F238E27FC236}">
-                <a16:creationId xmlns:a16="http://schemas.microsoft.com/office/drawing/2014/main" id="{C3EB9A57-323C-47F5-867F-693F95A15FA4}"/>
+                <a16:creationId xmlns:a16="http://schemas.microsoft.com/office/drawing/2014/main" id="{CECE3146-0C2B-4CC7-BC7C-FD23AAF7ECAE}"/>
               </a:ext>
             </a:extLst>
           </p:cNvPr>
@@ -12706,10 +12798,86 @@
           </a:p>
         </p:txBody>
       </p:sp>
+      <p:sp>
+        <p:nvSpPr>
+          <p:cNvPr id="8" name="Content Placeholder 7">
+            <a:extLst>
+              <a:ext uri="{FF2B5EF4-FFF2-40B4-BE49-F238E27FC236}">
+                <a16:creationId xmlns:a16="http://schemas.microsoft.com/office/drawing/2014/main" id="{30C259F3-048F-4C4B-AC8C-24699B6ABD42}"/>
+              </a:ext>
+            </a:extLst>
+          </p:cNvPr>
+          <p:cNvSpPr>
+            <a:spLocks noGrp="1"/>
+          </p:cNvSpPr>
+          <p:nvPr>
+            <p:ph idx="1"/>
+          </p:nvPr>
+        </p:nvSpPr>
+        <p:spPr>
+          <a:xfrm>
+            <a:off x="838200" y="1825625"/>
+            <a:ext cx="5257800" cy="4351338"/>
+          </a:xfrm>
+        </p:spPr>
+        <p:txBody>
+          <a:bodyPr/>
+          <a:lstStyle/>
+          <a:p>
+            <a:r>
+              <a:rPr lang="en-US" dirty="0"/>
+              <a:t>Mean Relative Error: </a:t>
+            </a:r>
+          </a:p>
+          <a:p>
+            <a:r>
+              <a:rPr lang="en-US" dirty="0"/>
+              <a:t>Follows peaks nicely!</a:t>
+            </a:r>
+          </a:p>
+          <a:p>
+            <a:pPr lvl="1"/>
+            <a:r>
+              <a:rPr lang="en-US" dirty="0"/>
+              <a:t>Only major miss is the huge spike</a:t>
+            </a:r>
+          </a:p>
+        </p:txBody>
+      </p:sp>
+      <p:pic>
+        <p:nvPicPr>
+          <p:cNvPr id="10" name="Picture 9" descr="A picture containing object&#10;&#10;Description automatically generated">
+            <a:extLst>
+              <a:ext uri="{FF2B5EF4-FFF2-40B4-BE49-F238E27FC236}">
+                <a16:creationId xmlns:a16="http://schemas.microsoft.com/office/drawing/2014/main" id="{64B67945-AF39-4BB8-86D4-3E74D0B6AE5C}"/>
+              </a:ext>
+            </a:extLst>
+          </p:cNvPr>
+          <p:cNvPicPr>
+            <a:picLocks noChangeAspect="1"/>
+          </p:cNvPicPr>
+          <p:nvPr/>
+        </p:nvPicPr>
+        <p:blipFill>
+          <a:blip r:embed="rId2"/>
+          <a:stretch>
+            <a:fillRect/>
+          </a:stretch>
+        </p:blipFill>
+        <p:spPr>
+          <a:xfrm>
+            <a:off x="6096000" y="2096028"/>
+            <a:ext cx="5715798" cy="3810532"/>
+          </a:xfrm>
+          <a:prstGeom prst="rect">
+            <a:avLst/>
+          </a:prstGeom>
+        </p:spPr>
+      </p:pic>
     </p:spTree>
     <p:extLst>
       <p:ext uri="{BB962C8B-B14F-4D97-AF65-F5344CB8AC3E}">
-        <p14:creationId xmlns:p14="http://schemas.microsoft.com/office/powerpoint/2010/main" val="4082739096"/>
+        <p14:creationId xmlns:p14="http://schemas.microsoft.com/office/powerpoint/2010/main" val="1162269647"/>
       </p:ext>
     </p:extLst>
   </p:cSld>
@@ -12738,10 +12906,10 @@
       </p:grpSpPr>
       <p:sp>
         <p:nvSpPr>
-          <p:cNvPr id="7" name="Title 6">
-            <a:extLst>
-              <a:ext uri="{FF2B5EF4-FFF2-40B4-BE49-F238E27FC236}">
-                <a16:creationId xmlns:a16="http://schemas.microsoft.com/office/drawing/2014/main" id="{75C0DCD3-95F8-4E1F-BF1A-5FAAB84A40A3}"/>
+          <p:cNvPr id="2" name="Title 1">
+            <a:extLst>
+              <a:ext uri="{FF2B5EF4-FFF2-40B4-BE49-F238E27FC236}">
+                <a16:creationId xmlns:a16="http://schemas.microsoft.com/office/drawing/2014/main" id="{D1BF0482-6913-4A5E-A533-479864CB5349}"/>
               </a:ext>
             </a:extLst>
           </p:cNvPr>
@@ -12759,96 +12927,7 @@
           <a:p>
             <a:r>
               <a:rPr lang="en-US" dirty="0"/>
-              <a:t>PROPHET MODELS</a:t>
-            </a:r>
-          </a:p>
-        </p:txBody>
-      </p:sp>
-      <p:sp>
-        <p:nvSpPr>
-          <p:cNvPr id="8" name="Content Placeholder 7">
-            <a:extLst>
-              <a:ext uri="{FF2B5EF4-FFF2-40B4-BE49-F238E27FC236}">
-                <a16:creationId xmlns:a16="http://schemas.microsoft.com/office/drawing/2014/main" id="{52BB1FAB-BB61-4B66-A4EA-A0EABC2B3ECA}"/>
-              </a:ext>
-            </a:extLst>
-          </p:cNvPr>
-          <p:cNvSpPr>
-            <a:spLocks noGrp="1"/>
-          </p:cNvSpPr>
-          <p:nvPr>
-            <p:ph idx="1"/>
-          </p:nvPr>
-        </p:nvSpPr>
-        <p:spPr/>
-        <p:txBody>
-          <a:bodyPr/>
-          <a:lstStyle/>
-          <a:p>
-            <a:r>
-              <a:rPr lang="en-US" dirty="0"/>
-              <a:t>Cutting up a forecast</a:t>
-            </a:r>
-          </a:p>
-          <a:p>
-            <a:r>
-              <a:rPr lang="en-US" dirty="0"/>
-              <a:t>Pros:</a:t>
-            </a:r>
-          </a:p>
-          <a:p>
-            <a:pPr lvl="1"/>
-            <a:r>
-              <a:rPr lang="en-US" dirty="0"/>
-              <a:t>Fast and scalable</a:t>
-            </a:r>
-          </a:p>
-          <a:p>
-            <a:pPr lvl="1"/>
-            <a:r>
-              <a:rPr lang="en-US" dirty="0"/>
-              <a:t>Parameters are very easy to understand</a:t>
-            </a:r>
-          </a:p>
-          <a:p>
-            <a:pPr lvl="1"/>
-            <a:r>
-              <a:rPr lang="en-US" dirty="0"/>
-              <a:t>Deals with holidays very elegantly</a:t>
-            </a:r>
-          </a:p>
-          <a:p>
-            <a:pPr lvl="1"/>
-            <a:r>
-              <a:rPr lang="en-US" dirty="0"/>
-              <a:t>Splitting models up allows even more flexibility</a:t>
-            </a:r>
-          </a:p>
-          <a:p>
-            <a:pPr lvl="1"/>
-            <a:r>
-              <a:rPr lang="en-US" dirty="0"/>
-              <a:t>Performs quite well! Results often better than ARIMA</a:t>
-            </a:r>
-          </a:p>
-          <a:p>
-            <a:r>
-              <a:rPr lang="en-US" dirty="0"/>
-              <a:t>Cons:</a:t>
-            </a:r>
-          </a:p>
-          <a:p>
-            <a:pPr lvl="1"/>
-            <a:r>
-              <a:rPr lang="en-US" dirty="0"/>
-              <a:t>Not as widely used (released in Sept. 2017)!</a:t>
-            </a:r>
-          </a:p>
-          <a:p>
-            <a:pPr lvl="1"/>
-            <a:r>
-              <a:rPr lang="en-US" dirty="0"/>
-              <a:t>The jury’s still out on this one</a:t>
+              <a:t>ARIMA IN SUMMARY</a:t>
             </a:r>
           </a:p>
         </p:txBody>
@@ -12858,7 +12937,7 @@
           <p:cNvPr id="4" name="Date Placeholder 3">
             <a:extLst>
               <a:ext uri="{FF2B5EF4-FFF2-40B4-BE49-F238E27FC236}">
-                <a16:creationId xmlns:a16="http://schemas.microsoft.com/office/drawing/2014/main" id="{02256D86-7CE0-416E-B2A3-402D20EE9E90}"/>
+                <a16:creationId xmlns:a16="http://schemas.microsoft.com/office/drawing/2014/main" id="{B23DAF35-209C-48FA-AAAB-F69E14183A91}"/>
               </a:ext>
             </a:extLst>
           </p:cNvPr>
@@ -12874,7 +12953,7 @@
           <a:bodyPr/>
           <a:lstStyle/>
           <a:p>
-            <a:fld id="{B08FEED8-D7D4-44E9-BFBC-ED06B5996D94}" type="datetime4">
+            <a:fld id="{8AAE40A0-A7D8-4DC3-BC9E-BADA32DA2004}" type="datetime4">
               <a:rPr lang="en-US" smtClean="0"/>
               <a:t>July 30, 2019</a:t>
             </a:fld>
@@ -12887,7 +12966,7 @@
           <p:cNvPr id="5" name="Footer Placeholder 4">
             <a:extLst>
               <a:ext uri="{FF2B5EF4-FFF2-40B4-BE49-F238E27FC236}">
-                <a16:creationId xmlns:a16="http://schemas.microsoft.com/office/drawing/2014/main" id="{1D4ED112-7CF4-4BB9-B46E-B366A5054A9A}"/>
+                <a16:creationId xmlns:a16="http://schemas.microsoft.com/office/drawing/2014/main" id="{3D8E22A6-180D-41CF-9959-4347A11F2AD1}"/>
               </a:ext>
             </a:extLst>
           </p:cNvPr>
@@ -12944,7 +13023,7 @@
           <p:cNvPr id="6" name="Slide Number Placeholder 5">
             <a:extLst>
               <a:ext uri="{FF2B5EF4-FFF2-40B4-BE49-F238E27FC236}">
-                <a16:creationId xmlns:a16="http://schemas.microsoft.com/office/drawing/2014/main" id="{8CC75551-85BF-4C9F-8893-AA28ECA8A6B5}"/>
+                <a16:creationId xmlns:a16="http://schemas.microsoft.com/office/drawing/2014/main" id="{CECE3146-0C2B-4CC7-BC7C-FD23AAF7ECAE}"/>
               </a:ext>
             </a:extLst>
           </p:cNvPr>
@@ -12968,10 +13047,97 @@
           </a:p>
         </p:txBody>
       </p:sp>
+      <p:sp>
+        <p:nvSpPr>
+          <p:cNvPr id="8" name="Content Placeholder 7">
+            <a:extLst>
+              <a:ext uri="{FF2B5EF4-FFF2-40B4-BE49-F238E27FC236}">
+                <a16:creationId xmlns:a16="http://schemas.microsoft.com/office/drawing/2014/main" id="{30C259F3-048F-4C4B-AC8C-24699B6ABD42}"/>
+              </a:ext>
+            </a:extLst>
+          </p:cNvPr>
+          <p:cNvSpPr>
+            <a:spLocks noGrp="1"/>
+          </p:cNvSpPr>
+          <p:nvPr>
+            <p:ph idx="1"/>
+          </p:nvPr>
+        </p:nvSpPr>
+        <p:spPr>
+          <a:xfrm>
+            <a:off x="838199" y="1825625"/>
+            <a:ext cx="10515599" cy="4351338"/>
+          </a:xfrm>
+        </p:spPr>
+        <p:txBody>
+          <a:bodyPr/>
+          <a:lstStyle/>
+          <a:p>
+            <a:r>
+              <a:rPr lang="en-US" dirty="0"/>
+              <a:t>Explore your data with plots</a:t>
+            </a:r>
+          </a:p>
+          <a:p>
+            <a:pPr lvl="1"/>
+            <a:r>
+              <a:rPr lang="en-US" dirty="0"/>
+              <a:t>Plot by day, day of week, day of month, month, hour, minute, etc.</a:t>
+            </a:r>
+          </a:p>
+          <a:p>
+            <a:pPr lvl="2"/>
+            <a:r>
+              <a:rPr lang="en-US" dirty="0"/>
+              <a:t>This will help you get a feel for the data</a:t>
+            </a:r>
+          </a:p>
+          <a:p>
+            <a:pPr lvl="1"/>
+            <a:r>
+              <a:rPr lang="en-US" dirty="0"/>
+              <a:t>Try out some lags, moving averages, and detrending</a:t>
+            </a:r>
+          </a:p>
+          <a:p>
+            <a:pPr lvl="1"/>
+            <a:r>
+              <a:rPr lang="en-US" dirty="0"/>
+              <a:t>If you can get a stationary data series, remember what you did to get there!</a:t>
+            </a:r>
+          </a:p>
+          <a:p>
+            <a:r>
+              <a:rPr lang="en-US" dirty="0"/>
+              <a:t>Estimate parameters</a:t>
+            </a:r>
+          </a:p>
+          <a:p>
+            <a:pPr lvl="1"/>
+            <a:r>
+              <a:rPr lang="en-US" dirty="0"/>
+              <a:t>Use (partial)autocorrelation function to figure out the order of moving average and autoregressive components</a:t>
+            </a:r>
+          </a:p>
+          <a:p>
+            <a:pPr lvl="1"/>
+            <a:r>
+              <a:rPr lang="en-US" dirty="0"/>
+              <a:t>Use lagged scatterplots to deal with </a:t>
+            </a:r>
+          </a:p>
+          <a:p>
+            <a:r>
+              <a:rPr lang="en-US" dirty="0"/>
+              <a:t>Model, forecast, and repeat!</a:t>
+            </a:r>
+          </a:p>
+        </p:txBody>
+      </p:sp>
     </p:spTree>
     <p:extLst>
       <p:ext uri="{BB962C8B-B14F-4D97-AF65-F5344CB8AC3E}">
-        <p14:creationId xmlns:p14="http://schemas.microsoft.com/office/powerpoint/2010/main" val="3412561793"/>
+        <p14:creationId xmlns:p14="http://schemas.microsoft.com/office/powerpoint/2010/main" val="3756464233"/>
       </p:ext>
     </p:extLst>
   </p:cSld>
@@ -13000,10 +13166,10 @@
       </p:grpSpPr>
       <p:sp>
         <p:nvSpPr>
-          <p:cNvPr id="7" name="Title 6">
-            <a:extLst>
-              <a:ext uri="{FF2B5EF4-FFF2-40B4-BE49-F238E27FC236}">
-                <a16:creationId xmlns:a16="http://schemas.microsoft.com/office/drawing/2014/main" id="{7802FB34-7510-47BC-8952-A1FE9728B0BF}"/>
+          <p:cNvPr id="2" name="Title 1">
+            <a:extLst>
+              <a:ext uri="{FF2B5EF4-FFF2-40B4-BE49-F238E27FC236}">
+                <a16:creationId xmlns:a16="http://schemas.microsoft.com/office/drawing/2014/main" id="{D1BF0482-6913-4A5E-A533-479864CB5349}"/>
               </a:ext>
             </a:extLst>
           </p:cNvPr>
@@ -13021,35 +13187,7 @@
           <a:p>
             <a:r>
               <a:rPr lang="en-US" dirty="0"/>
-              <a:t>MARKOV CHAIN MODELS</a:t>
-            </a:r>
-          </a:p>
-        </p:txBody>
-      </p:sp>
-      <p:sp>
-        <p:nvSpPr>
-          <p:cNvPr id="8" name="Text Placeholder 7">
-            <a:extLst>
-              <a:ext uri="{FF2B5EF4-FFF2-40B4-BE49-F238E27FC236}">
-                <a16:creationId xmlns:a16="http://schemas.microsoft.com/office/drawing/2014/main" id="{FCA70F1A-579E-4144-AE97-14FFC08FF0F5}"/>
-              </a:ext>
-            </a:extLst>
-          </p:cNvPr>
-          <p:cNvSpPr>
-            <a:spLocks noGrp="1"/>
-          </p:cNvSpPr>
-          <p:nvPr>
-            <p:ph type="body" idx="1"/>
-          </p:nvPr>
-        </p:nvSpPr>
-        <p:spPr/>
-        <p:txBody>
-          <a:bodyPr/>
-          <a:lstStyle/>
-          <a:p>
-            <a:r>
-              <a:rPr lang="en-US" dirty="0"/>
-              <a:t>Inferring sequences of states</a:t>
+              <a:t>ARIMA EXTENSIONS</a:t>
             </a:r>
           </a:p>
         </p:txBody>
@@ -13059,7 +13197,7 @@
           <p:cNvPr id="4" name="Date Placeholder 3">
             <a:extLst>
               <a:ext uri="{FF2B5EF4-FFF2-40B4-BE49-F238E27FC236}">
-                <a16:creationId xmlns:a16="http://schemas.microsoft.com/office/drawing/2014/main" id="{3AD929EF-0967-4B34-81B8-24D9EF91892E}"/>
+                <a16:creationId xmlns:a16="http://schemas.microsoft.com/office/drawing/2014/main" id="{B23DAF35-209C-48FA-AAAB-F69E14183A91}"/>
               </a:ext>
             </a:extLst>
           </p:cNvPr>
@@ -13088,7 +13226,7 @@
           <p:cNvPr id="5" name="Footer Placeholder 4">
             <a:extLst>
               <a:ext uri="{FF2B5EF4-FFF2-40B4-BE49-F238E27FC236}">
-                <a16:creationId xmlns:a16="http://schemas.microsoft.com/office/drawing/2014/main" id="{3B5B35DD-F2EA-40D3-8039-8CD3802B2612}"/>
+                <a16:creationId xmlns:a16="http://schemas.microsoft.com/office/drawing/2014/main" id="{3D8E22A6-180D-41CF-9959-4347A11F2AD1}"/>
               </a:ext>
             </a:extLst>
           </p:cNvPr>
@@ -13145,7 +13283,7 @@
           <p:cNvPr id="6" name="Slide Number Placeholder 5">
             <a:extLst>
               <a:ext uri="{FF2B5EF4-FFF2-40B4-BE49-F238E27FC236}">
-                <a16:creationId xmlns:a16="http://schemas.microsoft.com/office/drawing/2014/main" id="{C3EB9A57-323C-47F5-867F-693F95A15FA4}"/>
+                <a16:creationId xmlns:a16="http://schemas.microsoft.com/office/drawing/2014/main" id="{CECE3146-0C2B-4CC7-BC7C-FD23AAF7ECAE}"/>
               </a:ext>
             </a:extLst>
           </p:cNvPr>
@@ -13169,10 +13307,76 @@
           </a:p>
         </p:txBody>
       </p:sp>
+      <p:sp>
+        <p:nvSpPr>
+          <p:cNvPr id="8" name="Content Placeholder 7">
+            <a:extLst>
+              <a:ext uri="{FF2B5EF4-FFF2-40B4-BE49-F238E27FC236}">
+                <a16:creationId xmlns:a16="http://schemas.microsoft.com/office/drawing/2014/main" id="{30C259F3-048F-4C4B-AC8C-24699B6ABD42}"/>
+              </a:ext>
+            </a:extLst>
+          </p:cNvPr>
+          <p:cNvSpPr>
+            <a:spLocks noGrp="1"/>
+          </p:cNvSpPr>
+          <p:nvPr>
+            <p:ph idx="1"/>
+          </p:nvPr>
+        </p:nvSpPr>
+        <p:spPr>
+          <a:xfrm>
+            <a:off x="838199" y="1825625"/>
+            <a:ext cx="10515599" cy="4351338"/>
+          </a:xfrm>
+        </p:spPr>
+        <p:txBody>
+          <a:bodyPr/>
+          <a:lstStyle/>
+          <a:p>
+            <a:r>
+              <a:rPr lang="en-US" dirty="0"/>
+              <a:t>Won’t explore these here</a:t>
+            </a:r>
+          </a:p>
+          <a:p>
+            <a:r>
+              <a:rPr lang="en-US" dirty="0"/>
+              <a:t>Seasonal ARIMA: better support for seasonal cycles (longer range)</a:t>
+            </a:r>
+          </a:p>
+          <a:p>
+            <a:pPr lvl="1"/>
+            <a:r>
+              <a:rPr lang="en-US" dirty="0"/>
+              <a:t>Even more parameters to figure out</a:t>
+            </a:r>
+          </a:p>
+          <a:p>
+            <a:r>
+              <a:rPr lang="en-US" dirty="0"/>
+              <a:t>ARIMAX: use external variables to help prediction</a:t>
+            </a:r>
+          </a:p>
+          <a:p>
+            <a:pPr lvl="1"/>
+            <a:r>
+              <a:rPr lang="en-US" dirty="0"/>
+              <a:t>Maybe if we knew the unemployment rate, that would help us predict inflation</a:t>
+            </a:r>
+          </a:p>
+          <a:p>
+            <a:pPr lvl="1"/>
+            <a:r>
+              <a:rPr lang="en-US" dirty="0"/>
+              <a:t>Usually pretty simple</a:t>
+            </a:r>
+          </a:p>
+        </p:txBody>
+      </p:sp>
     </p:spTree>
     <p:extLst>
       <p:ext uri="{BB962C8B-B14F-4D97-AF65-F5344CB8AC3E}">
-        <p14:creationId xmlns:p14="http://schemas.microsoft.com/office/powerpoint/2010/main" val="948205976"/>
+        <p14:creationId xmlns:p14="http://schemas.microsoft.com/office/powerpoint/2010/main" val="2228218145"/>
       </p:ext>
     </p:extLst>
   </p:cSld>
@@ -13204,7 +13408,7 @@
           <p:cNvPr id="7" name="Title 6">
             <a:extLst>
               <a:ext uri="{FF2B5EF4-FFF2-40B4-BE49-F238E27FC236}">
-                <a16:creationId xmlns:a16="http://schemas.microsoft.com/office/drawing/2014/main" id="{75C0DCD3-95F8-4E1F-BF1A-5FAAB84A40A3}"/>
+                <a16:creationId xmlns:a16="http://schemas.microsoft.com/office/drawing/2014/main" id="{7802FB34-7510-47BC-8952-A1FE9728B0BF}"/>
               </a:ext>
             </a:extLst>
           </p:cNvPr>
@@ -13222,75 +13426,35 @@
           <a:p>
             <a:r>
               <a:rPr lang="en-US" dirty="0"/>
-              <a:t>MARKOV CHAIN MODELS</a:t>
-            </a:r>
-          </a:p>
-        </p:txBody>
-      </p:sp>
-      <p:sp>
-        <p:nvSpPr>
-          <p:cNvPr id="8" name="Content Placeholder 7">
-            <a:extLst>
-              <a:ext uri="{FF2B5EF4-FFF2-40B4-BE49-F238E27FC236}">
-                <a16:creationId xmlns:a16="http://schemas.microsoft.com/office/drawing/2014/main" id="{52BB1FAB-BB61-4B66-A4EA-A0EABC2B3ECA}"/>
-              </a:ext>
-            </a:extLst>
-          </p:cNvPr>
-          <p:cNvSpPr>
-            <a:spLocks noGrp="1"/>
-          </p:cNvSpPr>
-          <p:nvPr>
-            <p:ph idx="1"/>
-          </p:nvPr>
-        </p:nvSpPr>
-        <p:spPr/>
-        <p:txBody>
-          <a:bodyPr/>
-          <a:lstStyle/>
-          <a:p>
-            <a:r>
-              <a:rPr lang="en-US" dirty="0"/>
-              <a:t>Modeling</a:t>
-            </a:r>
-          </a:p>
-          <a:p>
-            <a:r>
-              <a:rPr lang="en-US" dirty="0"/>
-              <a:t>Pros:</a:t>
-            </a:r>
-          </a:p>
-          <a:p>
-            <a:pPr lvl="1"/>
-            <a:r>
-              <a:rPr lang="en-US" dirty="0"/>
-              <a:t>Fast and scalable</a:t>
-            </a:r>
-          </a:p>
-          <a:p>
-            <a:pPr lvl="1"/>
-            <a:r>
-              <a:rPr lang="en-US" dirty="0"/>
-              <a:t>A great choice if you have some domain knowledge that lets you know that there are some ‘states’ in question</a:t>
-            </a:r>
-          </a:p>
-          <a:p>
-            <a:r>
-              <a:rPr lang="en-US" dirty="0"/>
-              <a:t>Cons:</a:t>
-            </a:r>
-          </a:p>
-          <a:p>
-            <a:pPr lvl="1"/>
-            <a:r>
-              <a:rPr lang="en-US" dirty="0"/>
-              <a:t>Not always easy to apply</a:t>
-            </a:r>
-          </a:p>
-          <a:p>
-            <a:pPr lvl="1"/>
-            <a:r>
-              <a:rPr lang="en-US" dirty="0"/>
-              <a:t>Not always easy to interpret</a:t>
+              <a:t>PROPHET MODELS</a:t>
+            </a:r>
+          </a:p>
+        </p:txBody>
+      </p:sp>
+      <p:sp>
+        <p:nvSpPr>
+          <p:cNvPr id="8" name="Text Placeholder 7">
+            <a:extLst>
+              <a:ext uri="{FF2B5EF4-FFF2-40B4-BE49-F238E27FC236}">
+                <a16:creationId xmlns:a16="http://schemas.microsoft.com/office/drawing/2014/main" id="{FCA70F1A-579E-4144-AE97-14FFC08FF0F5}"/>
+              </a:ext>
+            </a:extLst>
+          </p:cNvPr>
+          <p:cNvSpPr>
+            <a:spLocks noGrp="1"/>
+          </p:cNvSpPr>
+          <p:nvPr>
+            <p:ph type="body" idx="1"/>
+          </p:nvPr>
+        </p:nvSpPr>
+        <p:spPr/>
+        <p:txBody>
+          <a:bodyPr/>
+          <a:lstStyle/>
+          <a:p>
+            <a:r>
+              <a:rPr lang="en-US" dirty="0"/>
+              <a:t>Facebook’s in-house forecasting tool</a:t>
             </a:r>
           </a:p>
         </p:txBody>
@@ -13300,7 +13464,7 @@
           <p:cNvPr id="4" name="Date Placeholder 3">
             <a:extLst>
               <a:ext uri="{FF2B5EF4-FFF2-40B4-BE49-F238E27FC236}">
-                <a16:creationId xmlns:a16="http://schemas.microsoft.com/office/drawing/2014/main" id="{02256D86-7CE0-416E-B2A3-402D20EE9E90}"/>
+                <a16:creationId xmlns:a16="http://schemas.microsoft.com/office/drawing/2014/main" id="{3AD929EF-0967-4B34-81B8-24D9EF91892E}"/>
               </a:ext>
             </a:extLst>
           </p:cNvPr>
@@ -13316,7 +13480,7 @@
           <a:bodyPr/>
           <a:lstStyle/>
           <a:p>
-            <a:fld id="{B08FEED8-D7D4-44E9-BFBC-ED06B5996D94}" type="datetime4">
+            <a:fld id="{8AAE40A0-A7D8-4DC3-BC9E-BADA32DA2004}" type="datetime4">
               <a:rPr lang="en-US" smtClean="0"/>
               <a:t>July 30, 2019</a:t>
             </a:fld>
@@ -13329,7 +13493,7 @@
           <p:cNvPr id="5" name="Footer Placeholder 4">
             <a:extLst>
               <a:ext uri="{FF2B5EF4-FFF2-40B4-BE49-F238E27FC236}">
-                <a16:creationId xmlns:a16="http://schemas.microsoft.com/office/drawing/2014/main" id="{1D4ED112-7CF4-4BB9-B46E-B366A5054A9A}"/>
+                <a16:creationId xmlns:a16="http://schemas.microsoft.com/office/drawing/2014/main" id="{3B5B35DD-F2EA-40D3-8039-8CD3802B2612}"/>
               </a:ext>
             </a:extLst>
           </p:cNvPr>
@@ -13386,7 +13550,7 @@
           <p:cNvPr id="6" name="Slide Number Placeholder 5">
             <a:extLst>
               <a:ext uri="{FF2B5EF4-FFF2-40B4-BE49-F238E27FC236}">
-                <a16:creationId xmlns:a16="http://schemas.microsoft.com/office/drawing/2014/main" id="{8CC75551-85BF-4C9F-8893-AA28ECA8A6B5}"/>
+                <a16:creationId xmlns:a16="http://schemas.microsoft.com/office/drawing/2014/main" id="{C3EB9A57-323C-47F5-867F-693F95A15FA4}"/>
               </a:ext>
             </a:extLst>
           </p:cNvPr>
@@ -13413,7 +13577,7 @@
     </p:spTree>
     <p:extLst>
       <p:ext uri="{BB962C8B-B14F-4D97-AF65-F5344CB8AC3E}">
-        <p14:creationId xmlns:p14="http://schemas.microsoft.com/office/powerpoint/2010/main" val="1370387550"/>
+        <p14:creationId xmlns:p14="http://schemas.microsoft.com/office/powerpoint/2010/main" val="4082739096"/>
       </p:ext>
     </p:extLst>
   </p:cSld>
@@ -13445,7 +13609,7 @@
           <p:cNvPr id="7" name="Title 6">
             <a:extLst>
               <a:ext uri="{FF2B5EF4-FFF2-40B4-BE49-F238E27FC236}">
-                <a16:creationId xmlns:a16="http://schemas.microsoft.com/office/drawing/2014/main" id="{7802FB34-7510-47BC-8952-A1FE9728B0BF}"/>
+                <a16:creationId xmlns:a16="http://schemas.microsoft.com/office/drawing/2014/main" id="{75C0DCD3-95F8-4E1F-BF1A-5FAAB84A40A3}"/>
               </a:ext>
             </a:extLst>
           </p:cNvPr>
@@ -13463,42 +13627,96 @@
           <a:p>
             <a:r>
               <a:rPr lang="en-US" dirty="0"/>
-              <a:t>NEURAL NETWORK</a:t>
-            </a:r>
-            <a:br>
-              <a:rPr lang="en-US" dirty="0"/>
-            </a:br>
-            <a:r>
-              <a:rPr lang="en-US" dirty="0"/>
-              <a:t>APPROACHES</a:t>
-            </a:r>
-          </a:p>
-        </p:txBody>
-      </p:sp>
-      <p:sp>
-        <p:nvSpPr>
-          <p:cNvPr id="8" name="Text Placeholder 7">
-            <a:extLst>
-              <a:ext uri="{FF2B5EF4-FFF2-40B4-BE49-F238E27FC236}">
-                <a16:creationId xmlns:a16="http://schemas.microsoft.com/office/drawing/2014/main" id="{FCA70F1A-579E-4144-AE97-14FFC08FF0F5}"/>
-              </a:ext>
-            </a:extLst>
-          </p:cNvPr>
-          <p:cNvSpPr>
-            <a:spLocks noGrp="1"/>
-          </p:cNvSpPr>
-          <p:nvPr>
-            <p:ph type="body" idx="1"/>
-          </p:nvPr>
-        </p:nvSpPr>
-        <p:spPr/>
-        <p:txBody>
-          <a:bodyPr/>
-          <a:lstStyle/>
-          <a:p>
-            <a:r>
-              <a:rPr lang="en-US" dirty="0"/>
-              <a:t>Breaking out the big guns</a:t>
+              <a:t>PROPHET MODELS</a:t>
+            </a:r>
+          </a:p>
+        </p:txBody>
+      </p:sp>
+      <p:sp>
+        <p:nvSpPr>
+          <p:cNvPr id="8" name="Content Placeholder 7">
+            <a:extLst>
+              <a:ext uri="{FF2B5EF4-FFF2-40B4-BE49-F238E27FC236}">
+                <a16:creationId xmlns:a16="http://schemas.microsoft.com/office/drawing/2014/main" id="{52BB1FAB-BB61-4B66-A4EA-A0EABC2B3ECA}"/>
+              </a:ext>
+            </a:extLst>
+          </p:cNvPr>
+          <p:cNvSpPr>
+            <a:spLocks noGrp="1"/>
+          </p:cNvSpPr>
+          <p:nvPr>
+            <p:ph idx="1"/>
+          </p:nvPr>
+        </p:nvSpPr>
+        <p:spPr/>
+        <p:txBody>
+          <a:bodyPr/>
+          <a:lstStyle/>
+          <a:p>
+            <a:r>
+              <a:rPr lang="en-US" dirty="0"/>
+              <a:t>Cutting up a forecast</a:t>
+            </a:r>
+          </a:p>
+          <a:p>
+            <a:r>
+              <a:rPr lang="en-US" dirty="0"/>
+              <a:t>Pros:</a:t>
+            </a:r>
+          </a:p>
+          <a:p>
+            <a:pPr lvl="1"/>
+            <a:r>
+              <a:rPr lang="en-US" dirty="0"/>
+              <a:t>Fast and scalable</a:t>
+            </a:r>
+          </a:p>
+          <a:p>
+            <a:pPr lvl="1"/>
+            <a:r>
+              <a:rPr lang="en-US" dirty="0"/>
+              <a:t>Parameters are very easy to understand</a:t>
+            </a:r>
+          </a:p>
+          <a:p>
+            <a:pPr lvl="1"/>
+            <a:r>
+              <a:rPr lang="en-US" dirty="0"/>
+              <a:t>Deals with holidays very elegantly</a:t>
+            </a:r>
+          </a:p>
+          <a:p>
+            <a:pPr lvl="1"/>
+            <a:r>
+              <a:rPr lang="en-US" dirty="0"/>
+              <a:t>Splitting models up allows even more flexibility</a:t>
+            </a:r>
+          </a:p>
+          <a:p>
+            <a:pPr lvl="1"/>
+            <a:r>
+              <a:rPr lang="en-US" dirty="0"/>
+              <a:t>Performs quite well! Results often better than ARIMA</a:t>
+            </a:r>
+          </a:p>
+          <a:p>
+            <a:r>
+              <a:rPr lang="en-US" dirty="0"/>
+              <a:t>Cons:</a:t>
+            </a:r>
+          </a:p>
+          <a:p>
+            <a:pPr lvl="1"/>
+            <a:r>
+              <a:rPr lang="en-US" dirty="0"/>
+              <a:t>Not as widely used (released in Sept. 2017)!</a:t>
+            </a:r>
+          </a:p>
+          <a:p>
+            <a:pPr lvl="1"/>
+            <a:r>
+              <a:rPr lang="en-US" dirty="0"/>
+              <a:t>The jury’s still out on this one</a:t>
             </a:r>
           </a:p>
         </p:txBody>
@@ -13508,7 +13726,7 @@
           <p:cNvPr id="4" name="Date Placeholder 3">
             <a:extLst>
               <a:ext uri="{FF2B5EF4-FFF2-40B4-BE49-F238E27FC236}">
-                <a16:creationId xmlns:a16="http://schemas.microsoft.com/office/drawing/2014/main" id="{3AD929EF-0967-4B34-81B8-24D9EF91892E}"/>
+                <a16:creationId xmlns:a16="http://schemas.microsoft.com/office/drawing/2014/main" id="{02256D86-7CE0-416E-B2A3-402D20EE9E90}"/>
               </a:ext>
             </a:extLst>
           </p:cNvPr>
@@ -13524,7 +13742,7 @@
           <a:bodyPr/>
           <a:lstStyle/>
           <a:p>
-            <a:fld id="{8AAE40A0-A7D8-4DC3-BC9E-BADA32DA2004}" type="datetime4">
+            <a:fld id="{B08FEED8-D7D4-44E9-BFBC-ED06B5996D94}" type="datetime4">
               <a:rPr lang="en-US" smtClean="0"/>
               <a:t>July 30, 2019</a:t>
             </a:fld>
@@ -13537,7 +13755,7 @@
           <p:cNvPr id="5" name="Footer Placeholder 4">
             <a:extLst>
               <a:ext uri="{FF2B5EF4-FFF2-40B4-BE49-F238E27FC236}">
-                <a16:creationId xmlns:a16="http://schemas.microsoft.com/office/drawing/2014/main" id="{3B5B35DD-F2EA-40D3-8039-8CD3802B2612}"/>
+                <a16:creationId xmlns:a16="http://schemas.microsoft.com/office/drawing/2014/main" id="{1D4ED112-7CF4-4BB9-B46E-B366A5054A9A}"/>
               </a:ext>
             </a:extLst>
           </p:cNvPr>
@@ -13594,7 +13812,7 @@
           <p:cNvPr id="6" name="Slide Number Placeholder 5">
             <a:extLst>
               <a:ext uri="{FF2B5EF4-FFF2-40B4-BE49-F238E27FC236}">
-                <a16:creationId xmlns:a16="http://schemas.microsoft.com/office/drawing/2014/main" id="{C3EB9A57-323C-47F5-867F-693F95A15FA4}"/>
+                <a16:creationId xmlns:a16="http://schemas.microsoft.com/office/drawing/2014/main" id="{8CC75551-85BF-4C9F-8893-AA28ECA8A6B5}"/>
               </a:ext>
             </a:extLst>
           </p:cNvPr>
@@ -13621,7 +13839,7 @@
     </p:spTree>
     <p:extLst>
       <p:ext uri="{BB962C8B-B14F-4D97-AF65-F5344CB8AC3E}">
-        <p14:creationId xmlns:p14="http://schemas.microsoft.com/office/powerpoint/2010/main" val="1442732517"/>
+        <p14:creationId xmlns:p14="http://schemas.microsoft.com/office/powerpoint/2010/main" val="3412561793"/>
       </p:ext>
     </p:extLst>
   </p:cSld>
@@ -13653,7 +13871,7 @@
           <p:cNvPr id="7" name="Title 6">
             <a:extLst>
               <a:ext uri="{FF2B5EF4-FFF2-40B4-BE49-F238E27FC236}">
-                <a16:creationId xmlns:a16="http://schemas.microsoft.com/office/drawing/2014/main" id="{75C0DCD3-95F8-4E1F-BF1A-5FAAB84A40A3}"/>
+                <a16:creationId xmlns:a16="http://schemas.microsoft.com/office/drawing/2014/main" id="{7802FB34-7510-47BC-8952-A1FE9728B0BF}"/>
               </a:ext>
             </a:extLst>
           </p:cNvPr>
@@ -13671,83 +13889,35 @@
           <a:p>
             <a:r>
               <a:rPr lang="en-US" dirty="0"/>
-              <a:t>NEURAL NETWORK MODELS</a:t>
-            </a:r>
-          </a:p>
-        </p:txBody>
-      </p:sp>
-      <p:sp>
-        <p:nvSpPr>
-          <p:cNvPr id="8" name="Content Placeholder 7">
-            <a:extLst>
-              <a:ext uri="{FF2B5EF4-FFF2-40B4-BE49-F238E27FC236}">
-                <a16:creationId xmlns:a16="http://schemas.microsoft.com/office/drawing/2014/main" id="{52BB1FAB-BB61-4B66-A4EA-A0EABC2B3ECA}"/>
-              </a:ext>
-            </a:extLst>
-          </p:cNvPr>
-          <p:cNvSpPr>
-            <a:spLocks noGrp="1"/>
-          </p:cNvSpPr>
-          <p:nvPr>
-            <p:ph idx="1"/>
-          </p:nvPr>
-        </p:nvSpPr>
-        <p:spPr/>
-        <p:txBody>
-          <a:bodyPr>
-            <a:normAutofit/>
-          </a:bodyPr>
-          <a:lstStyle/>
-          <a:p>
-            <a:r>
-              <a:rPr lang="en-US" dirty="0"/>
-              <a:t>Incomprehensible but extremely powerful</a:t>
-            </a:r>
-          </a:p>
-          <a:p>
-            <a:r>
-              <a:rPr lang="en-US" dirty="0"/>
-              <a:t>Pros:</a:t>
-            </a:r>
-          </a:p>
-          <a:p>
-            <a:pPr lvl="1"/>
-            <a:r>
-              <a:rPr lang="en-US" dirty="0"/>
-              <a:t>Often extremely accurate</a:t>
-            </a:r>
-          </a:p>
-          <a:p>
-            <a:r>
-              <a:rPr lang="en-US" dirty="0"/>
-              <a:t>Cons:</a:t>
-            </a:r>
-          </a:p>
-          <a:p>
-            <a:pPr lvl="1"/>
-            <a:r>
-              <a:rPr lang="en-US" dirty="0"/>
-              <a:t>More or less impossible to understand what any of the parameters mean</a:t>
-            </a:r>
-          </a:p>
-          <a:p>
-            <a:pPr lvl="1"/>
-            <a:r>
-              <a:rPr lang="en-US" dirty="0"/>
-              <a:t>Can take a very long time to train the model</a:t>
-            </a:r>
-          </a:p>
-          <a:p>
-            <a:pPr lvl="1"/>
-            <a:r>
-              <a:rPr lang="en-US" dirty="0"/>
-              <a:t>Lots of moving parts and things that can go wrong</a:t>
-            </a:r>
-          </a:p>
-          <a:p>
-            <a:r>
-              <a:rPr lang="en-US" dirty="0"/>
-              <a:t>But depending on the problem, that one pro may outweigh all the cons</a:t>
+              <a:t>MARKOV CHAIN MODELS</a:t>
+            </a:r>
+          </a:p>
+        </p:txBody>
+      </p:sp>
+      <p:sp>
+        <p:nvSpPr>
+          <p:cNvPr id="8" name="Text Placeholder 7">
+            <a:extLst>
+              <a:ext uri="{FF2B5EF4-FFF2-40B4-BE49-F238E27FC236}">
+                <a16:creationId xmlns:a16="http://schemas.microsoft.com/office/drawing/2014/main" id="{FCA70F1A-579E-4144-AE97-14FFC08FF0F5}"/>
+              </a:ext>
+            </a:extLst>
+          </p:cNvPr>
+          <p:cNvSpPr>
+            <a:spLocks noGrp="1"/>
+          </p:cNvSpPr>
+          <p:nvPr>
+            <p:ph type="body" idx="1"/>
+          </p:nvPr>
+        </p:nvSpPr>
+        <p:spPr/>
+        <p:txBody>
+          <a:bodyPr/>
+          <a:lstStyle/>
+          <a:p>
+            <a:r>
+              <a:rPr lang="en-US" dirty="0"/>
+              <a:t>Inferring sequences of states</a:t>
             </a:r>
           </a:p>
         </p:txBody>
@@ -13757,7 +13927,7 @@
           <p:cNvPr id="4" name="Date Placeholder 3">
             <a:extLst>
               <a:ext uri="{FF2B5EF4-FFF2-40B4-BE49-F238E27FC236}">
-                <a16:creationId xmlns:a16="http://schemas.microsoft.com/office/drawing/2014/main" id="{02256D86-7CE0-416E-B2A3-402D20EE9E90}"/>
+                <a16:creationId xmlns:a16="http://schemas.microsoft.com/office/drawing/2014/main" id="{3AD929EF-0967-4B34-81B8-24D9EF91892E}"/>
               </a:ext>
             </a:extLst>
           </p:cNvPr>
@@ -13773,7 +13943,7 @@
           <a:bodyPr/>
           <a:lstStyle/>
           <a:p>
-            <a:fld id="{B08FEED8-D7D4-44E9-BFBC-ED06B5996D94}" type="datetime4">
+            <a:fld id="{8AAE40A0-A7D8-4DC3-BC9E-BADA32DA2004}" type="datetime4">
               <a:rPr lang="en-US" smtClean="0"/>
               <a:t>July 30, 2019</a:t>
             </a:fld>
@@ -13786,7 +13956,7 @@
           <p:cNvPr id="5" name="Footer Placeholder 4">
             <a:extLst>
               <a:ext uri="{FF2B5EF4-FFF2-40B4-BE49-F238E27FC236}">
-                <a16:creationId xmlns:a16="http://schemas.microsoft.com/office/drawing/2014/main" id="{1D4ED112-7CF4-4BB9-B46E-B366A5054A9A}"/>
+                <a16:creationId xmlns:a16="http://schemas.microsoft.com/office/drawing/2014/main" id="{3B5B35DD-F2EA-40D3-8039-8CD3802B2612}"/>
               </a:ext>
             </a:extLst>
           </p:cNvPr>
@@ -13843,7 +14013,7 @@
           <p:cNvPr id="6" name="Slide Number Placeholder 5">
             <a:extLst>
               <a:ext uri="{FF2B5EF4-FFF2-40B4-BE49-F238E27FC236}">
-                <a16:creationId xmlns:a16="http://schemas.microsoft.com/office/drawing/2014/main" id="{8CC75551-85BF-4C9F-8893-AA28ECA8A6B5}"/>
+                <a16:creationId xmlns:a16="http://schemas.microsoft.com/office/drawing/2014/main" id="{C3EB9A57-323C-47F5-867F-693F95A15FA4}"/>
               </a:ext>
             </a:extLst>
           </p:cNvPr>
@@ -13870,7 +14040,7 @@
     </p:spTree>
     <p:extLst>
       <p:ext uri="{BB962C8B-B14F-4D97-AF65-F5344CB8AC3E}">
-        <p14:creationId xmlns:p14="http://schemas.microsoft.com/office/powerpoint/2010/main" val="4213654799"/>
+        <p14:creationId xmlns:p14="http://schemas.microsoft.com/office/powerpoint/2010/main" val="948205976"/>
       </p:ext>
     </p:extLst>
   </p:cSld>
@@ -14135,7 +14305,7 @@
           <p:cNvPr id="7" name="Title 6">
             <a:extLst>
               <a:ext uri="{FF2B5EF4-FFF2-40B4-BE49-F238E27FC236}">
-                <a16:creationId xmlns:a16="http://schemas.microsoft.com/office/drawing/2014/main" id="{495B4BC0-844B-4414-A623-BEF78AAC1BA1}"/>
+                <a16:creationId xmlns:a16="http://schemas.microsoft.com/office/drawing/2014/main" id="{75C0DCD3-95F8-4E1F-BF1A-5FAAB84A40A3}"/>
               </a:ext>
             </a:extLst>
           </p:cNvPr>
@@ -14153,7 +14323,7 @@
           <a:p>
             <a:r>
               <a:rPr lang="en-US" dirty="0"/>
-              <a:t>ACKNOWLEDGMENTS</a:t>
+              <a:t>MARKOV CHAIN MODELS</a:t>
             </a:r>
           </a:p>
         </p:txBody>
@@ -14163,7 +14333,7 @@
           <p:cNvPr id="8" name="Content Placeholder 7">
             <a:extLst>
               <a:ext uri="{FF2B5EF4-FFF2-40B4-BE49-F238E27FC236}">
-                <a16:creationId xmlns:a16="http://schemas.microsoft.com/office/drawing/2014/main" id="{2BED3EB3-7E98-4A82-8335-7321D9E37B16}"/>
+                <a16:creationId xmlns:a16="http://schemas.microsoft.com/office/drawing/2014/main" id="{52BB1FAB-BB61-4B66-A4EA-A0EABC2B3ECA}"/>
               </a:ext>
             </a:extLst>
           </p:cNvPr>
@@ -14181,52 +14351,48 @@
           <a:p>
             <a:r>
               <a:rPr lang="en-US" dirty="0"/>
-              <a:t>Plots were created using the ggplot2 package in R</a:t>
-            </a:r>
-          </a:p>
-          <a:p>
-            <a:r>
-              <a:rPr lang="en-US" dirty="0"/>
-              <a:t>Shumway and </a:t>
-            </a:r>
-            <a:r>
-              <a:rPr lang="en-US" dirty="0" err="1"/>
-              <a:t>Stoffer’s</a:t>
-            </a:r>
-            <a:r>
-              <a:rPr lang="en-US" dirty="0"/>
-              <a:t> </a:t>
-            </a:r>
-            <a:r>
-              <a:rPr lang="en-US" i="1" dirty="0"/>
-              <a:t>Time Series Analysis and Its Applications With R Examples, Fourth Edition </a:t>
-            </a:r>
-            <a:r>
-              <a:rPr lang="en-US" dirty="0"/>
-              <a:t>published by Springer was used as the main reference for the ARIMA section</a:t>
-            </a:r>
-          </a:p>
-          <a:p>
-            <a:r>
-              <a:rPr lang="en-US" i="1" dirty="0"/>
-              <a:t>Forecasting at Scale </a:t>
-            </a:r>
-            <a:r>
-              <a:rPr lang="en-US" dirty="0"/>
-              <a:t>by Sean J. Taylor and Benjamin </a:t>
-            </a:r>
-            <a:r>
-              <a:rPr lang="en-US" dirty="0" err="1"/>
-              <a:t>Letham</a:t>
-            </a:r>
-            <a:r>
-              <a:rPr lang="en-US" dirty="0"/>
-              <a:t> at Facebook was used as the main reference for the Prophet section</a:t>
-            </a:r>
-            <a:endParaRPr lang="en-US" i="1" dirty="0"/>
-          </a:p>
-          <a:p>
-            <a:endParaRPr lang="en-US" dirty="0"/>
+              <a:t>Modeling</a:t>
+            </a:r>
+          </a:p>
+          <a:p>
+            <a:r>
+              <a:rPr lang="en-US" dirty="0"/>
+              <a:t>Pros:</a:t>
+            </a:r>
+          </a:p>
+          <a:p>
+            <a:pPr lvl="1"/>
+            <a:r>
+              <a:rPr lang="en-US" dirty="0"/>
+              <a:t>Fast and scalable</a:t>
+            </a:r>
+          </a:p>
+          <a:p>
+            <a:pPr lvl="1"/>
+            <a:r>
+              <a:rPr lang="en-US" dirty="0"/>
+              <a:t>A great choice if you have some domain knowledge that lets you know that there are some ‘states’ in question</a:t>
+            </a:r>
+          </a:p>
+          <a:p>
+            <a:r>
+              <a:rPr lang="en-US" dirty="0"/>
+              <a:t>Cons:</a:t>
+            </a:r>
+          </a:p>
+          <a:p>
+            <a:pPr lvl="1"/>
+            <a:r>
+              <a:rPr lang="en-US" dirty="0"/>
+              <a:t>Not always easy to apply</a:t>
+            </a:r>
+          </a:p>
+          <a:p>
+            <a:pPr lvl="1"/>
+            <a:r>
+              <a:rPr lang="en-US" dirty="0"/>
+              <a:t>Not always easy to interpret</a:t>
+            </a:r>
           </a:p>
         </p:txBody>
       </p:sp>
@@ -14235,7 +14401,7 @@
           <p:cNvPr id="4" name="Date Placeholder 3">
             <a:extLst>
               <a:ext uri="{FF2B5EF4-FFF2-40B4-BE49-F238E27FC236}">
-                <a16:creationId xmlns:a16="http://schemas.microsoft.com/office/drawing/2014/main" id="{540F37F1-4F33-429F-A568-1A3ADC499E54}"/>
+                <a16:creationId xmlns:a16="http://schemas.microsoft.com/office/drawing/2014/main" id="{02256D86-7CE0-416E-B2A3-402D20EE9E90}"/>
               </a:ext>
             </a:extLst>
           </p:cNvPr>
@@ -14264,7 +14430,7 @@
           <p:cNvPr id="5" name="Footer Placeholder 4">
             <a:extLst>
               <a:ext uri="{FF2B5EF4-FFF2-40B4-BE49-F238E27FC236}">
-                <a16:creationId xmlns:a16="http://schemas.microsoft.com/office/drawing/2014/main" id="{673FFA57-C126-4795-A5F6-DD33AAC5ACBD}"/>
+                <a16:creationId xmlns:a16="http://schemas.microsoft.com/office/drawing/2014/main" id="{1D4ED112-7CF4-4BB9-B46E-B366A5054A9A}"/>
               </a:ext>
             </a:extLst>
           </p:cNvPr>
@@ -14321,7 +14487,7 @@
           <p:cNvPr id="6" name="Slide Number Placeholder 5">
             <a:extLst>
               <a:ext uri="{FF2B5EF4-FFF2-40B4-BE49-F238E27FC236}">
-                <a16:creationId xmlns:a16="http://schemas.microsoft.com/office/drawing/2014/main" id="{2FA49567-BB70-4798-8746-D0B522CCEE20}"/>
+                <a16:creationId xmlns:a16="http://schemas.microsoft.com/office/drawing/2014/main" id="{8CC75551-85BF-4C9F-8893-AA28ECA8A6B5}"/>
               </a:ext>
             </a:extLst>
           </p:cNvPr>
@@ -14340,6 +14506,708 @@
             <a:fld id="{D57F1E4F-1CFF-5643-939E-02111984F565}" type="slidenum">
               <a:rPr lang="en-US" smtClean="0"/>
               <a:t>50</a:t>
+            </a:fld>
+            <a:endParaRPr lang="en-US" dirty="0"/>
+          </a:p>
+        </p:txBody>
+      </p:sp>
+    </p:spTree>
+    <p:extLst>
+      <p:ext uri="{BB962C8B-B14F-4D97-AF65-F5344CB8AC3E}">
+        <p14:creationId xmlns:p14="http://schemas.microsoft.com/office/powerpoint/2010/main" val="1370387550"/>
+      </p:ext>
+    </p:extLst>
+  </p:cSld>
+  <p:clrMapOvr>
+    <a:masterClrMapping/>
+  </p:clrMapOvr>
+</p:sld>
+</file>
+
+<file path=ppt/slides/slide51.xml><?xml version="1.0" encoding="utf-8"?>
+<p:sld xmlns:a="http://schemas.openxmlformats.org/drawingml/2006/main" xmlns:r="http://schemas.openxmlformats.org/officeDocument/2006/relationships" xmlns:p="http://schemas.openxmlformats.org/presentationml/2006/main">
+  <p:cSld>
+    <p:spTree>
+      <p:nvGrpSpPr>
+        <p:cNvPr id="1" name=""/>
+        <p:cNvGrpSpPr/>
+        <p:nvPr/>
+      </p:nvGrpSpPr>
+      <p:grpSpPr>
+        <a:xfrm>
+          <a:off x="0" y="0"/>
+          <a:ext cx="0" cy="0"/>
+          <a:chOff x="0" y="0"/>
+          <a:chExt cx="0" cy="0"/>
+        </a:xfrm>
+      </p:grpSpPr>
+      <p:sp>
+        <p:nvSpPr>
+          <p:cNvPr id="7" name="Title 6">
+            <a:extLst>
+              <a:ext uri="{FF2B5EF4-FFF2-40B4-BE49-F238E27FC236}">
+                <a16:creationId xmlns:a16="http://schemas.microsoft.com/office/drawing/2014/main" id="{7802FB34-7510-47BC-8952-A1FE9728B0BF}"/>
+              </a:ext>
+            </a:extLst>
+          </p:cNvPr>
+          <p:cNvSpPr>
+            <a:spLocks noGrp="1"/>
+          </p:cNvSpPr>
+          <p:nvPr>
+            <p:ph type="title"/>
+          </p:nvPr>
+        </p:nvSpPr>
+        <p:spPr/>
+        <p:txBody>
+          <a:bodyPr/>
+          <a:lstStyle/>
+          <a:p>
+            <a:r>
+              <a:rPr lang="en-US" dirty="0"/>
+              <a:t>NEURAL NETWORK</a:t>
+            </a:r>
+            <a:br>
+              <a:rPr lang="en-US" dirty="0"/>
+            </a:br>
+            <a:r>
+              <a:rPr lang="en-US" dirty="0"/>
+              <a:t>APPROACHES</a:t>
+            </a:r>
+          </a:p>
+        </p:txBody>
+      </p:sp>
+      <p:sp>
+        <p:nvSpPr>
+          <p:cNvPr id="8" name="Text Placeholder 7">
+            <a:extLst>
+              <a:ext uri="{FF2B5EF4-FFF2-40B4-BE49-F238E27FC236}">
+                <a16:creationId xmlns:a16="http://schemas.microsoft.com/office/drawing/2014/main" id="{FCA70F1A-579E-4144-AE97-14FFC08FF0F5}"/>
+              </a:ext>
+            </a:extLst>
+          </p:cNvPr>
+          <p:cNvSpPr>
+            <a:spLocks noGrp="1"/>
+          </p:cNvSpPr>
+          <p:nvPr>
+            <p:ph type="body" idx="1"/>
+          </p:nvPr>
+        </p:nvSpPr>
+        <p:spPr/>
+        <p:txBody>
+          <a:bodyPr/>
+          <a:lstStyle/>
+          <a:p>
+            <a:r>
+              <a:rPr lang="en-US" dirty="0"/>
+              <a:t>Breaking out the big guns</a:t>
+            </a:r>
+          </a:p>
+        </p:txBody>
+      </p:sp>
+      <p:sp>
+        <p:nvSpPr>
+          <p:cNvPr id="4" name="Date Placeholder 3">
+            <a:extLst>
+              <a:ext uri="{FF2B5EF4-FFF2-40B4-BE49-F238E27FC236}">
+                <a16:creationId xmlns:a16="http://schemas.microsoft.com/office/drawing/2014/main" id="{3AD929EF-0967-4B34-81B8-24D9EF91892E}"/>
+              </a:ext>
+            </a:extLst>
+          </p:cNvPr>
+          <p:cNvSpPr>
+            <a:spLocks noGrp="1"/>
+          </p:cNvSpPr>
+          <p:nvPr>
+            <p:ph type="dt" sz="half" idx="10"/>
+          </p:nvPr>
+        </p:nvSpPr>
+        <p:spPr/>
+        <p:txBody>
+          <a:bodyPr/>
+          <a:lstStyle/>
+          <a:p>
+            <a:fld id="{8AAE40A0-A7D8-4DC3-BC9E-BADA32DA2004}" type="datetime4">
+              <a:rPr lang="en-US" smtClean="0"/>
+              <a:t>July 30, 2019</a:t>
+            </a:fld>
+            <a:endParaRPr lang="en-US" dirty="0"/>
+          </a:p>
+        </p:txBody>
+      </p:sp>
+      <p:sp>
+        <p:nvSpPr>
+          <p:cNvPr id="5" name="Footer Placeholder 4">
+            <a:extLst>
+              <a:ext uri="{FF2B5EF4-FFF2-40B4-BE49-F238E27FC236}">
+                <a16:creationId xmlns:a16="http://schemas.microsoft.com/office/drawing/2014/main" id="{3B5B35DD-F2EA-40D3-8039-8CD3802B2612}"/>
+              </a:ext>
+            </a:extLst>
+          </p:cNvPr>
+          <p:cNvSpPr>
+            <a:spLocks noGrp="1"/>
+          </p:cNvSpPr>
+          <p:nvPr>
+            <p:ph type="ftr" sz="quarter" idx="11"/>
+          </p:nvPr>
+        </p:nvSpPr>
+        <p:spPr/>
+        <p:txBody>
+          <a:bodyPr/>
+          <a:lstStyle/>
+          <a:p>
+            <a:r>
+              <a:rPr lang="en-US"/>
+              <a:t>Digital Scholarship Services </a:t>
+            </a:r>
+            <a:r>
+              <a:rPr lang="en-US">
+                <a:solidFill>
+                  <a:schemeClr val="accent1">
+                    <a:lumMod val="50000"/>
+                  </a:schemeClr>
+                </a:solidFill>
+              </a:rPr>
+              <a:t>| Email</a:t>
+            </a:r>
+            <a:r>
+              <a:rPr lang="en-US"/>
+              <a:t> cf24@rice.edu </a:t>
+            </a:r>
+            <a:r>
+              <a:rPr lang="en-US">
+                <a:solidFill>
+                  <a:schemeClr val="accent1">
+                    <a:lumMod val="50000"/>
+                  </a:schemeClr>
+                </a:solidFill>
+              </a:rPr>
+              <a:t>|</a:t>
+            </a:r>
+            <a:r>
+              <a:rPr lang="en-US"/>
+              <a:t> library.rice.edu/dss</a:t>
+            </a:r>
+            <a:endParaRPr lang="en-US" dirty="0"/>
+          </a:p>
+        </p:txBody>
+      </p:sp>
+      <p:sp>
+        <p:nvSpPr>
+          <p:cNvPr id="6" name="Slide Number Placeholder 5">
+            <a:extLst>
+              <a:ext uri="{FF2B5EF4-FFF2-40B4-BE49-F238E27FC236}">
+                <a16:creationId xmlns:a16="http://schemas.microsoft.com/office/drawing/2014/main" id="{C3EB9A57-323C-47F5-867F-693F95A15FA4}"/>
+              </a:ext>
+            </a:extLst>
+          </p:cNvPr>
+          <p:cNvSpPr>
+            <a:spLocks noGrp="1"/>
+          </p:cNvSpPr>
+          <p:nvPr>
+            <p:ph type="sldNum" sz="quarter" idx="12"/>
+          </p:nvPr>
+        </p:nvSpPr>
+        <p:spPr/>
+        <p:txBody>
+          <a:bodyPr/>
+          <a:lstStyle/>
+          <a:p>
+            <a:fld id="{D57F1E4F-1CFF-5643-939E-02111984F565}" type="slidenum">
+              <a:rPr lang="en-US" smtClean="0"/>
+              <a:t>51</a:t>
+            </a:fld>
+            <a:endParaRPr lang="en-US" dirty="0"/>
+          </a:p>
+        </p:txBody>
+      </p:sp>
+    </p:spTree>
+    <p:extLst>
+      <p:ext uri="{BB962C8B-B14F-4D97-AF65-F5344CB8AC3E}">
+        <p14:creationId xmlns:p14="http://schemas.microsoft.com/office/powerpoint/2010/main" val="1442732517"/>
+      </p:ext>
+    </p:extLst>
+  </p:cSld>
+  <p:clrMapOvr>
+    <a:masterClrMapping/>
+  </p:clrMapOvr>
+</p:sld>
+</file>
+
+<file path=ppt/slides/slide52.xml><?xml version="1.0" encoding="utf-8"?>
+<p:sld xmlns:a="http://schemas.openxmlformats.org/drawingml/2006/main" xmlns:r="http://schemas.openxmlformats.org/officeDocument/2006/relationships" xmlns:p="http://schemas.openxmlformats.org/presentationml/2006/main">
+  <p:cSld>
+    <p:spTree>
+      <p:nvGrpSpPr>
+        <p:cNvPr id="1" name=""/>
+        <p:cNvGrpSpPr/>
+        <p:nvPr/>
+      </p:nvGrpSpPr>
+      <p:grpSpPr>
+        <a:xfrm>
+          <a:off x="0" y="0"/>
+          <a:ext cx="0" cy="0"/>
+          <a:chOff x="0" y="0"/>
+          <a:chExt cx="0" cy="0"/>
+        </a:xfrm>
+      </p:grpSpPr>
+      <p:sp>
+        <p:nvSpPr>
+          <p:cNvPr id="7" name="Title 6">
+            <a:extLst>
+              <a:ext uri="{FF2B5EF4-FFF2-40B4-BE49-F238E27FC236}">
+                <a16:creationId xmlns:a16="http://schemas.microsoft.com/office/drawing/2014/main" id="{75C0DCD3-95F8-4E1F-BF1A-5FAAB84A40A3}"/>
+              </a:ext>
+            </a:extLst>
+          </p:cNvPr>
+          <p:cNvSpPr>
+            <a:spLocks noGrp="1"/>
+          </p:cNvSpPr>
+          <p:nvPr>
+            <p:ph type="title"/>
+          </p:nvPr>
+        </p:nvSpPr>
+        <p:spPr/>
+        <p:txBody>
+          <a:bodyPr/>
+          <a:lstStyle/>
+          <a:p>
+            <a:r>
+              <a:rPr lang="en-US" dirty="0"/>
+              <a:t>NEURAL NETWORK MODELS</a:t>
+            </a:r>
+          </a:p>
+        </p:txBody>
+      </p:sp>
+      <p:sp>
+        <p:nvSpPr>
+          <p:cNvPr id="8" name="Content Placeholder 7">
+            <a:extLst>
+              <a:ext uri="{FF2B5EF4-FFF2-40B4-BE49-F238E27FC236}">
+                <a16:creationId xmlns:a16="http://schemas.microsoft.com/office/drawing/2014/main" id="{52BB1FAB-BB61-4B66-A4EA-A0EABC2B3ECA}"/>
+              </a:ext>
+            </a:extLst>
+          </p:cNvPr>
+          <p:cNvSpPr>
+            <a:spLocks noGrp="1"/>
+          </p:cNvSpPr>
+          <p:nvPr>
+            <p:ph idx="1"/>
+          </p:nvPr>
+        </p:nvSpPr>
+        <p:spPr/>
+        <p:txBody>
+          <a:bodyPr>
+            <a:normAutofit/>
+          </a:bodyPr>
+          <a:lstStyle/>
+          <a:p>
+            <a:r>
+              <a:rPr lang="en-US" dirty="0"/>
+              <a:t>Incomprehensible but extremely powerful</a:t>
+            </a:r>
+          </a:p>
+          <a:p>
+            <a:r>
+              <a:rPr lang="en-US" dirty="0"/>
+              <a:t>Pros:</a:t>
+            </a:r>
+          </a:p>
+          <a:p>
+            <a:pPr lvl="1"/>
+            <a:r>
+              <a:rPr lang="en-US" dirty="0"/>
+              <a:t>Often extremely accurate</a:t>
+            </a:r>
+          </a:p>
+          <a:p>
+            <a:r>
+              <a:rPr lang="en-US" dirty="0"/>
+              <a:t>Cons:</a:t>
+            </a:r>
+          </a:p>
+          <a:p>
+            <a:pPr lvl="1"/>
+            <a:r>
+              <a:rPr lang="en-US" dirty="0"/>
+              <a:t>More or less impossible to understand what any of the parameters mean</a:t>
+            </a:r>
+          </a:p>
+          <a:p>
+            <a:pPr lvl="1"/>
+            <a:r>
+              <a:rPr lang="en-US" dirty="0"/>
+              <a:t>Can take a very long time to train the model</a:t>
+            </a:r>
+          </a:p>
+          <a:p>
+            <a:pPr lvl="1"/>
+            <a:r>
+              <a:rPr lang="en-US" dirty="0"/>
+              <a:t>Lots of moving parts and things that can go wrong</a:t>
+            </a:r>
+          </a:p>
+          <a:p>
+            <a:r>
+              <a:rPr lang="en-US" dirty="0"/>
+              <a:t>But depending on the problem, that one pro may outweigh all the cons</a:t>
+            </a:r>
+          </a:p>
+        </p:txBody>
+      </p:sp>
+      <p:sp>
+        <p:nvSpPr>
+          <p:cNvPr id="4" name="Date Placeholder 3">
+            <a:extLst>
+              <a:ext uri="{FF2B5EF4-FFF2-40B4-BE49-F238E27FC236}">
+                <a16:creationId xmlns:a16="http://schemas.microsoft.com/office/drawing/2014/main" id="{02256D86-7CE0-416E-B2A3-402D20EE9E90}"/>
+              </a:ext>
+            </a:extLst>
+          </p:cNvPr>
+          <p:cNvSpPr>
+            <a:spLocks noGrp="1"/>
+          </p:cNvSpPr>
+          <p:nvPr>
+            <p:ph type="dt" sz="half" idx="10"/>
+          </p:nvPr>
+        </p:nvSpPr>
+        <p:spPr/>
+        <p:txBody>
+          <a:bodyPr/>
+          <a:lstStyle/>
+          <a:p>
+            <a:fld id="{B08FEED8-D7D4-44E9-BFBC-ED06B5996D94}" type="datetime4">
+              <a:rPr lang="en-US" smtClean="0"/>
+              <a:t>July 30, 2019</a:t>
+            </a:fld>
+            <a:endParaRPr lang="en-US" dirty="0"/>
+          </a:p>
+        </p:txBody>
+      </p:sp>
+      <p:sp>
+        <p:nvSpPr>
+          <p:cNvPr id="5" name="Footer Placeholder 4">
+            <a:extLst>
+              <a:ext uri="{FF2B5EF4-FFF2-40B4-BE49-F238E27FC236}">
+                <a16:creationId xmlns:a16="http://schemas.microsoft.com/office/drawing/2014/main" id="{1D4ED112-7CF4-4BB9-B46E-B366A5054A9A}"/>
+              </a:ext>
+            </a:extLst>
+          </p:cNvPr>
+          <p:cNvSpPr>
+            <a:spLocks noGrp="1"/>
+          </p:cNvSpPr>
+          <p:nvPr>
+            <p:ph type="ftr" sz="quarter" idx="11"/>
+          </p:nvPr>
+        </p:nvSpPr>
+        <p:spPr/>
+        <p:txBody>
+          <a:bodyPr/>
+          <a:lstStyle/>
+          <a:p>
+            <a:r>
+              <a:rPr lang="en-US"/>
+              <a:t>Digital Scholarship Services </a:t>
+            </a:r>
+            <a:r>
+              <a:rPr lang="en-US">
+                <a:solidFill>
+                  <a:schemeClr val="accent1">
+                    <a:lumMod val="50000"/>
+                  </a:schemeClr>
+                </a:solidFill>
+              </a:rPr>
+              <a:t>| Email</a:t>
+            </a:r>
+            <a:r>
+              <a:rPr lang="en-US"/>
+              <a:t> cf24@rice.edu </a:t>
+            </a:r>
+            <a:r>
+              <a:rPr lang="en-US">
+                <a:solidFill>
+                  <a:schemeClr val="accent1">
+                    <a:lumMod val="50000"/>
+                  </a:schemeClr>
+                </a:solidFill>
+              </a:rPr>
+              <a:t>|</a:t>
+            </a:r>
+            <a:r>
+              <a:rPr lang="en-US"/>
+              <a:t> library.rice.edu/dss</a:t>
+            </a:r>
+            <a:endParaRPr lang="en-US" dirty="0"/>
+          </a:p>
+        </p:txBody>
+      </p:sp>
+      <p:sp>
+        <p:nvSpPr>
+          <p:cNvPr id="6" name="Slide Number Placeholder 5">
+            <a:extLst>
+              <a:ext uri="{FF2B5EF4-FFF2-40B4-BE49-F238E27FC236}">
+                <a16:creationId xmlns:a16="http://schemas.microsoft.com/office/drawing/2014/main" id="{8CC75551-85BF-4C9F-8893-AA28ECA8A6B5}"/>
+              </a:ext>
+            </a:extLst>
+          </p:cNvPr>
+          <p:cNvSpPr>
+            <a:spLocks noGrp="1"/>
+          </p:cNvSpPr>
+          <p:nvPr>
+            <p:ph type="sldNum" sz="quarter" idx="12"/>
+          </p:nvPr>
+        </p:nvSpPr>
+        <p:spPr/>
+        <p:txBody>
+          <a:bodyPr/>
+          <a:lstStyle/>
+          <a:p>
+            <a:fld id="{D57F1E4F-1CFF-5643-939E-02111984F565}" type="slidenum">
+              <a:rPr lang="en-US" smtClean="0"/>
+              <a:t>52</a:t>
+            </a:fld>
+            <a:endParaRPr lang="en-US" dirty="0"/>
+          </a:p>
+        </p:txBody>
+      </p:sp>
+    </p:spTree>
+    <p:extLst>
+      <p:ext uri="{BB962C8B-B14F-4D97-AF65-F5344CB8AC3E}">
+        <p14:creationId xmlns:p14="http://schemas.microsoft.com/office/powerpoint/2010/main" val="4213654799"/>
+      </p:ext>
+    </p:extLst>
+  </p:cSld>
+  <p:clrMapOvr>
+    <a:masterClrMapping/>
+  </p:clrMapOvr>
+</p:sld>
+</file>
+
+<file path=ppt/slides/slide53.xml><?xml version="1.0" encoding="utf-8"?>
+<p:sld xmlns:a="http://schemas.openxmlformats.org/drawingml/2006/main" xmlns:r="http://schemas.openxmlformats.org/officeDocument/2006/relationships" xmlns:p="http://schemas.openxmlformats.org/presentationml/2006/main">
+  <p:cSld>
+    <p:spTree>
+      <p:nvGrpSpPr>
+        <p:cNvPr id="1" name=""/>
+        <p:cNvGrpSpPr/>
+        <p:nvPr/>
+      </p:nvGrpSpPr>
+      <p:grpSpPr>
+        <a:xfrm>
+          <a:off x="0" y="0"/>
+          <a:ext cx="0" cy="0"/>
+          <a:chOff x="0" y="0"/>
+          <a:chExt cx="0" cy="0"/>
+        </a:xfrm>
+      </p:grpSpPr>
+      <p:sp>
+        <p:nvSpPr>
+          <p:cNvPr id="7" name="Title 6">
+            <a:extLst>
+              <a:ext uri="{FF2B5EF4-FFF2-40B4-BE49-F238E27FC236}">
+                <a16:creationId xmlns:a16="http://schemas.microsoft.com/office/drawing/2014/main" id="{495B4BC0-844B-4414-A623-BEF78AAC1BA1}"/>
+              </a:ext>
+            </a:extLst>
+          </p:cNvPr>
+          <p:cNvSpPr>
+            <a:spLocks noGrp="1"/>
+          </p:cNvSpPr>
+          <p:nvPr>
+            <p:ph type="title"/>
+          </p:nvPr>
+        </p:nvSpPr>
+        <p:spPr/>
+        <p:txBody>
+          <a:bodyPr/>
+          <a:lstStyle/>
+          <a:p>
+            <a:r>
+              <a:rPr lang="en-US" dirty="0"/>
+              <a:t>ACKNOWLEDGMENTS</a:t>
+            </a:r>
+          </a:p>
+        </p:txBody>
+      </p:sp>
+      <p:sp>
+        <p:nvSpPr>
+          <p:cNvPr id="8" name="Content Placeholder 7">
+            <a:extLst>
+              <a:ext uri="{FF2B5EF4-FFF2-40B4-BE49-F238E27FC236}">
+                <a16:creationId xmlns:a16="http://schemas.microsoft.com/office/drawing/2014/main" id="{2BED3EB3-7E98-4A82-8335-7321D9E37B16}"/>
+              </a:ext>
+            </a:extLst>
+          </p:cNvPr>
+          <p:cNvSpPr>
+            <a:spLocks noGrp="1"/>
+          </p:cNvSpPr>
+          <p:nvPr>
+            <p:ph idx="1"/>
+          </p:nvPr>
+        </p:nvSpPr>
+        <p:spPr/>
+        <p:txBody>
+          <a:bodyPr/>
+          <a:lstStyle/>
+          <a:p>
+            <a:r>
+              <a:rPr lang="en-US" dirty="0"/>
+              <a:t>Plots were created using the ggplot2 package in R</a:t>
+            </a:r>
+          </a:p>
+          <a:p>
+            <a:r>
+              <a:rPr lang="en-US" dirty="0"/>
+              <a:t>Shumway and </a:t>
+            </a:r>
+            <a:r>
+              <a:rPr lang="en-US" dirty="0" err="1"/>
+              <a:t>Stoffer’s</a:t>
+            </a:r>
+            <a:r>
+              <a:rPr lang="en-US" dirty="0"/>
+              <a:t> </a:t>
+            </a:r>
+            <a:r>
+              <a:rPr lang="en-US" i="1" dirty="0"/>
+              <a:t>Time Series Analysis and Its Applications With R Examples, Fourth Edition </a:t>
+            </a:r>
+            <a:r>
+              <a:rPr lang="en-US" dirty="0"/>
+              <a:t>published by Springer was used as the main reference for the ARIMA section</a:t>
+            </a:r>
+          </a:p>
+          <a:p>
+            <a:r>
+              <a:rPr lang="en-US" i="1" dirty="0"/>
+              <a:t>Forecasting at Scale </a:t>
+            </a:r>
+            <a:r>
+              <a:rPr lang="en-US" dirty="0"/>
+              <a:t>by Sean J. Taylor and Benjamin </a:t>
+            </a:r>
+            <a:r>
+              <a:rPr lang="en-US" dirty="0" err="1"/>
+              <a:t>Letham</a:t>
+            </a:r>
+            <a:r>
+              <a:rPr lang="en-US" dirty="0"/>
+              <a:t> at Facebook was used as the main reference for the Prophet section</a:t>
+            </a:r>
+            <a:endParaRPr lang="en-US" i="1" dirty="0"/>
+          </a:p>
+          <a:p>
+            <a:endParaRPr lang="en-US" dirty="0"/>
+          </a:p>
+        </p:txBody>
+      </p:sp>
+      <p:sp>
+        <p:nvSpPr>
+          <p:cNvPr id="4" name="Date Placeholder 3">
+            <a:extLst>
+              <a:ext uri="{FF2B5EF4-FFF2-40B4-BE49-F238E27FC236}">
+                <a16:creationId xmlns:a16="http://schemas.microsoft.com/office/drawing/2014/main" id="{540F37F1-4F33-429F-A568-1A3ADC499E54}"/>
+              </a:ext>
+            </a:extLst>
+          </p:cNvPr>
+          <p:cNvSpPr>
+            <a:spLocks noGrp="1"/>
+          </p:cNvSpPr>
+          <p:nvPr>
+            <p:ph type="dt" sz="half" idx="10"/>
+          </p:nvPr>
+        </p:nvSpPr>
+        <p:spPr/>
+        <p:txBody>
+          <a:bodyPr/>
+          <a:lstStyle/>
+          <a:p>
+            <a:fld id="{B08FEED8-D7D4-44E9-BFBC-ED06B5996D94}" type="datetime4">
+              <a:rPr lang="en-US" smtClean="0"/>
+              <a:t>July 30, 2019</a:t>
+            </a:fld>
+            <a:endParaRPr lang="en-US" dirty="0"/>
+          </a:p>
+        </p:txBody>
+      </p:sp>
+      <p:sp>
+        <p:nvSpPr>
+          <p:cNvPr id="5" name="Footer Placeholder 4">
+            <a:extLst>
+              <a:ext uri="{FF2B5EF4-FFF2-40B4-BE49-F238E27FC236}">
+                <a16:creationId xmlns:a16="http://schemas.microsoft.com/office/drawing/2014/main" id="{673FFA57-C126-4795-A5F6-DD33AAC5ACBD}"/>
+              </a:ext>
+            </a:extLst>
+          </p:cNvPr>
+          <p:cNvSpPr>
+            <a:spLocks noGrp="1"/>
+          </p:cNvSpPr>
+          <p:nvPr>
+            <p:ph type="ftr" sz="quarter" idx="11"/>
+          </p:nvPr>
+        </p:nvSpPr>
+        <p:spPr/>
+        <p:txBody>
+          <a:bodyPr/>
+          <a:lstStyle/>
+          <a:p>
+            <a:r>
+              <a:rPr lang="en-US"/>
+              <a:t>Digital Scholarship Services </a:t>
+            </a:r>
+            <a:r>
+              <a:rPr lang="en-US">
+                <a:solidFill>
+                  <a:schemeClr val="accent1">
+                    <a:lumMod val="50000"/>
+                  </a:schemeClr>
+                </a:solidFill>
+              </a:rPr>
+              <a:t>| Email</a:t>
+            </a:r>
+            <a:r>
+              <a:rPr lang="en-US"/>
+              <a:t> cf24@rice.edu </a:t>
+            </a:r>
+            <a:r>
+              <a:rPr lang="en-US">
+                <a:solidFill>
+                  <a:schemeClr val="accent1">
+                    <a:lumMod val="50000"/>
+                  </a:schemeClr>
+                </a:solidFill>
+              </a:rPr>
+              <a:t>|</a:t>
+            </a:r>
+            <a:r>
+              <a:rPr lang="en-US"/>
+              <a:t> library.rice.edu/dss</a:t>
+            </a:r>
+            <a:endParaRPr lang="en-US" dirty="0"/>
+          </a:p>
+        </p:txBody>
+      </p:sp>
+      <p:sp>
+        <p:nvSpPr>
+          <p:cNvPr id="6" name="Slide Number Placeholder 5">
+            <a:extLst>
+              <a:ext uri="{FF2B5EF4-FFF2-40B4-BE49-F238E27FC236}">
+                <a16:creationId xmlns:a16="http://schemas.microsoft.com/office/drawing/2014/main" id="{2FA49567-BB70-4798-8746-D0B522CCEE20}"/>
+              </a:ext>
+            </a:extLst>
+          </p:cNvPr>
+          <p:cNvSpPr>
+            <a:spLocks noGrp="1"/>
+          </p:cNvSpPr>
+          <p:nvPr>
+            <p:ph type="sldNum" sz="quarter" idx="12"/>
+          </p:nvPr>
+        </p:nvSpPr>
+        <p:spPr/>
+        <p:txBody>
+          <a:bodyPr/>
+          <a:lstStyle/>
+          <a:p>
+            <a:fld id="{D57F1E4F-1CFF-5643-939E-02111984F565}" type="slidenum">
+              <a:rPr lang="en-US" smtClean="0"/>
+              <a:t>53</a:t>
             </a:fld>
             <a:endParaRPr lang="en-US" dirty="0"/>
           </a:p>

</xml_diff>

<commit_message>
added neural net outline
</commit_message>
<xml_diff>
--- a/tsa/Introduction to Time Series Analysis.pptx
+++ b/tsa/Introduction to Time Series Analysis.pptx
@@ -5,7 +5,7 @@
     <p:sldMasterId id="2147483707" r:id="rId1"/>
   </p:sldMasterIdLst>
   <p:notesMasterIdLst>
-    <p:notesMasterId r:id="rId60"/>
+    <p:notesMasterId r:id="rId67"/>
   </p:notesMasterIdLst>
   <p:sldIdLst>
     <p:sldId id="266" r:id="rId2"/>
@@ -65,7 +65,14 @@
     <p:sldId id="331" r:id="rId56"/>
     <p:sldId id="306" r:id="rId57"/>
     <p:sldId id="309" r:id="rId58"/>
-    <p:sldId id="268" r:id="rId59"/>
+    <p:sldId id="332" r:id="rId59"/>
+    <p:sldId id="333" r:id="rId60"/>
+    <p:sldId id="335" r:id="rId61"/>
+    <p:sldId id="336" r:id="rId62"/>
+    <p:sldId id="337" r:id="rId63"/>
+    <p:sldId id="338" r:id="rId64"/>
+    <p:sldId id="339" r:id="rId65"/>
+    <p:sldId id="268" r:id="rId66"/>
   </p:sldIdLst>
   <p:sldSz cx="12192000" cy="6858000"/>
   <p:notesSz cx="6858000" cy="9144000"/>
@@ -16334,7 +16341,7 @@
           <p:cNvPr id="7" name="Title 6">
             <a:extLst>
               <a:ext uri="{FF2B5EF4-FFF2-40B4-BE49-F238E27FC236}">
-                <a16:creationId xmlns:a16="http://schemas.microsoft.com/office/drawing/2014/main" id="{495B4BC0-844B-4414-A623-BEF78AAC1BA1}"/>
+                <a16:creationId xmlns:a16="http://schemas.microsoft.com/office/drawing/2014/main" id="{75C0DCD3-95F8-4E1F-BF1A-5FAAB84A40A3}"/>
               </a:ext>
             </a:extLst>
           </p:cNvPr>
@@ -16352,7 +16359,7 @@
           <a:p>
             <a:r>
               <a:rPr lang="en-US" dirty="0"/>
-              <a:t>ACKNOWLEDGMENTS</a:t>
+              <a:t>RECURRENT NEURAL NETWORKS</a:t>
             </a:r>
           </a:p>
         </p:txBody>
@@ -16362,7 +16369,7 @@
           <p:cNvPr id="8" name="Content Placeholder 7">
             <a:extLst>
               <a:ext uri="{FF2B5EF4-FFF2-40B4-BE49-F238E27FC236}">
-                <a16:creationId xmlns:a16="http://schemas.microsoft.com/office/drawing/2014/main" id="{2BED3EB3-7E98-4A82-8335-7321D9E37B16}"/>
+                <a16:creationId xmlns:a16="http://schemas.microsoft.com/office/drawing/2014/main" id="{52BB1FAB-BB61-4B66-A4EA-A0EABC2B3ECA}"/>
               </a:ext>
             </a:extLst>
           </p:cNvPr>
@@ -16375,55 +16382,10 @@
         </p:nvSpPr>
         <p:spPr/>
         <p:txBody>
-          <a:bodyPr/>
-          <a:lstStyle/>
-          <a:p>
-            <a:r>
-              <a:rPr lang="en-US" dirty="0"/>
-              <a:t>Plots were created using the ggplot2 package in R</a:t>
-            </a:r>
-          </a:p>
-          <a:p>
-            <a:r>
-              <a:rPr lang="en-US" dirty="0"/>
-              <a:t>Shumway and </a:t>
-            </a:r>
-            <a:r>
-              <a:rPr lang="en-US" dirty="0" err="1"/>
-              <a:t>Stoffer’s</a:t>
-            </a:r>
-            <a:r>
-              <a:rPr lang="en-US" dirty="0"/>
-              <a:t> </a:t>
-            </a:r>
-            <a:r>
-              <a:rPr lang="en-US" i="1" dirty="0"/>
-              <a:t>Time Series Analysis and Its Applications With R Examples, Fourth Edition </a:t>
-            </a:r>
-            <a:r>
-              <a:rPr lang="en-US" dirty="0"/>
-              <a:t>published by Springer was used as the main reference for the ARIMA section</a:t>
-            </a:r>
-          </a:p>
-          <a:p>
-            <a:r>
-              <a:rPr lang="en-US" i="1" dirty="0"/>
-              <a:t>Forecasting at Scale </a:t>
-            </a:r>
-            <a:r>
-              <a:rPr lang="en-US" dirty="0"/>
-              <a:t>by Sean J. Taylor and Benjamin </a:t>
-            </a:r>
-            <a:r>
-              <a:rPr lang="en-US" dirty="0" err="1"/>
-              <a:t>Letham</a:t>
-            </a:r>
-            <a:r>
-              <a:rPr lang="en-US" dirty="0"/>
-              <a:t> at Facebook was used as the main reference for the Prophet section</a:t>
-            </a:r>
-            <a:endParaRPr lang="en-US" i="1" dirty="0"/>
-          </a:p>
+          <a:bodyPr>
+            <a:normAutofit/>
+          </a:bodyPr>
+          <a:lstStyle/>
           <a:p>
             <a:endParaRPr lang="en-US" dirty="0"/>
           </a:p>
@@ -16434,7 +16396,7 @@
           <p:cNvPr id="4" name="Date Placeholder 3">
             <a:extLst>
               <a:ext uri="{FF2B5EF4-FFF2-40B4-BE49-F238E27FC236}">
-                <a16:creationId xmlns:a16="http://schemas.microsoft.com/office/drawing/2014/main" id="{540F37F1-4F33-429F-A568-1A3ADC499E54}"/>
+                <a16:creationId xmlns:a16="http://schemas.microsoft.com/office/drawing/2014/main" id="{02256D86-7CE0-416E-B2A3-402D20EE9E90}"/>
               </a:ext>
             </a:extLst>
           </p:cNvPr>
@@ -16463,7 +16425,7 @@
           <p:cNvPr id="5" name="Footer Placeholder 4">
             <a:extLst>
               <a:ext uri="{FF2B5EF4-FFF2-40B4-BE49-F238E27FC236}">
-                <a16:creationId xmlns:a16="http://schemas.microsoft.com/office/drawing/2014/main" id="{673FFA57-C126-4795-A5F6-DD33AAC5ACBD}"/>
+                <a16:creationId xmlns:a16="http://schemas.microsoft.com/office/drawing/2014/main" id="{1D4ED112-7CF4-4BB9-B46E-B366A5054A9A}"/>
               </a:ext>
             </a:extLst>
           </p:cNvPr>
@@ -16520,7 +16482,7 @@
           <p:cNvPr id="6" name="Slide Number Placeholder 5">
             <a:extLst>
               <a:ext uri="{FF2B5EF4-FFF2-40B4-BE49-F238E27FC236}">
-                <a16:creationId xmlns:a16="http://schemas.microsoft.com/office/drawing/2014/main" id="{2FA49567-BB70-4798-8746-D0B522CCEE20}"/>
+                <a16:creationId xmlns:a16="http://schemas.microsoft.com/office/drawing/2014/main" id="{8CC75551-85BF-4C9F-8893-AA28ECA8A6B5}"/>
               </a:ext>
             </a:extLst>
           </p:cNvPr>
@@ -16547,7 +16509,207 @@
     </p:spTree>
     <p:extLst>
       <p:ext uri="{BB962C8B-B14F-4D97-AF65-F5344CB8AC3E}">
-        <p14:creationId xmlns:p14="http://schemas.microsoft.com/office/powerpoint/2010/main" val="1585568494"/>
+        <p14:creationId xmlns:p14="http://schemas.microsoft.com/office/powerpoint/2010/main" val="3928184137"/>
+      </p:ext>
+    </p:extLst>
+  </p:cSld>
+  <p:clrMapOvr>
+    <a:masterClrMapping/>
+  </p:clrMapOvr>
+</p:sld>
+</file>
+
+<file path=ppt/slides/slide59.xml><?xml version="1.0" encoding="utf-8"?>
+<p:sld xmlns:a="http://schemas.openxmlformats.org/drawingml/2006/main" xmlns:r="http://schemas.openxmlformats.org/officeDocument/2006/relationships" xmlns:p="http://schemas.openxmlformats.org/presentationml/2006/main">
+  <p:cSld>
+    <p:spTree>
+      <p:nvGrpSpPr>
+        <p:cNvPr id="1" name=""/>
+        <p:cNvGrpSpPr/>
+        <p:nvPr/>
+      </p:nvGrpSpPr>
+      <p:grpSpPr>
+        <a:xfrm>
+          <a:off x="0" y="0"/>
+          <a:ext cx="0" cy="0"/>
+          <a:chOff x="0" y="0"/>
+          <a:chExt cx="0" cy="0"/>
+        </a:xfrm>
+      </p:grpSpPr>
+      <p:sp>
+        <p:nvSpPr>
+          <p:cNvPr id="7" name="Title 6">
+            <a:extLst>
+              <a:ext uri="{FF2B5EF4-FFF2-40B4-BE49-F238E27FC236}">
+                <a16:creationId xmlns:a16="http://schemas.microsoft.com/office/drawing/2014/main" id="{75C0DCD3-95F8-4E1F-BF1A-5FAAB84A40A3}"/>
+              </a:ext>
+            </a:extLst>
+          </p:cNvPr>
+          <p:cNvSpPr>
+            <a:spLocks noGrp="1"/>
+          </p:cNvSpPr>
+          <p:nvPr>
+            <p:ph type="title"/>
+          </p:nvPr>
+        </p:nvSpPr>
+        <p:spPr/>
+        <p:txBody>
+          <a:bodyPr/>
+          <a:lstStyle/>
+          <a:p>
+            <a:r>
+              <a:rPr lang="en-US" dirty="0"/>
+              <a:t>LONG SHORT-TERM MEMORY</a:t>
+            </a:r>
+          </a:p>
+        </p:txBody>
+      </p:sp>
+      <p:sp>
+        <p:nvSpPr>
+          <p:cNvPr id="8" name="Content Placeholder 7">
+            <a:extLst>
+              <a:ext uri="{FF2B5EF4-FFF2-40B4-BE49-F238E27FC236}">
+                <a16:creationId xmlns:a16="http://schemas.microsoft.com/office/drawing/2014/main" id="{52BB1FAB-BB61-4B66-A4EA-A0EABC2B3ECA}"/>
+              </a:ext>
+            </a:extLst>
+          </p:cNvPr>
+          <p:cNvSpPr>
+            <a:spLocks noGrp="1"/>
+          </p:cNvSpPr>
+          <p:nvPr>
+            <p:ph idx="1"/>
+          </p:nvPr>
+        </p:nvSpPr>
+        <p:spPr/>
+        <p:txBody>
+          <a:bodyPr>
+            <a:normAutofit/>
+          </a:bodyPr>
+          <a:lstStyle/>
+          <a:p>
+            <a:endParaRPr lang="en-US" dirty="0"/>
+          </a:p>
+        </p:txBody>
+      </p:sp>
+      <p:sp>
+        <p:nvSpPr>
+          <p:cNvPr id="4" name="Date Placeholder 3">
+            <a:extLst>
+              <a:ext uri="{FF2B5EF4-FFF2-40B4-BE49-F238E27FC236}">
+                <a16:creationId xmlns:a16="http://schemas.microsoft.com/office/drawing/2014/main" id="{02256D86-7CE0-416E-B2A3-402D20EE9E90}"/>
+              </a:ext>
+            </a:extLst>
+          </p:cNvPr>
+          <p:cNvSpPr>
+            <a:spLocks noGrp="1"/>
+          </p:cNvSpPr>
+          <p:nvPr>
+            <p:ph type="dt" sz="half" idx="10"/>
+          </p:nvPr>
+        </p:nvSpPr>
+        <p:spPr/>
+        <p:txBody>
+          <a:bodyPr/>
+          <a:lstStyle/>
+          <a:p>
+            <a:fld id="{B08FEED8-D7D4-44E9-BFBC-ED06B5996D94}" type="datetime4">
+              <a:rPr lang="en-US" smtClean="0"/>
+              <a:t>July 30, 2019</a:t>
+            </a:fld>
+            <a:endParaRPr lang="en-US" dirty="0"/>
+          </a:p>
+        </p:txBody>
+      </p:sp>
+      <p:sp>
+        <p:nvSpPr>
+          <p:cNvPr id="5" name="Footer Placeholder 4">
+            <a:extLst>
+              <a:ext uri="{FF2B5EF4-FFF2-40B4-BE49-F238E27FC236}">
+                <a16:creationId xmlns:a16="http://schemas.microsoft.com/office/drawing/2014/main" id="{1D4ED112-7CF4-4BB9-B46E-B366A5054A9A}"/>
+              </a:ext>
+            </a:extLst>
+          </p:cNvPr>
+          <p:cNvSpPr>
+            <a:spLocks noGrp="1"/>
+          </p:cNvSpPr>
+          <p:nvPr>
+            <p:ph type="ftr" sz="quarter" idx="11"/>
+          </p:nvPr>
+        </p:nvSpPr>
+        <p:spPr/>
+        <p:txBody>
+          <a:bodyPr/>
+          <a:lstStyle/>
+          <a:p>
+            <a:r>
+              <a:rPr lang="en-US"/>
+              <a:t>Digital Scholarship Services </a:t>
+            </a:r>
+            <a:r>
+              <a:rPr lang="en-US">
+                <a:solidFill>
+                  <a:schemeClr val="accent1">
+                    <a:lumMod val="50000"/>
+                  </a:schemeClr>
+                </a:solidFill>
+              </a:rPr>
+              <a:t>| Email</a:t>
+            </a:r>
+            <a:r>
+              <a:rPr lang="en-US"/>
+              <a:t> cf24@rice.edu </a:t>
+            </a:r>
+            <a:r>
+              <a:rPr lang="en-US">
+                <a:solidFill>
+                  <a:schemeClr val="accent1">
+                    <a:lumMod val="50000"/>
+                  </a:schemeClr>
+                </a:solidFill>
+              </a:rPr>
+              <a:t>|</a:t>
+            </a:r>
+            <a:r>
+              <a:rPr lang="en-US"/>
+              <a:t> library.rice.edu/dss</a:t>
+            </a:r>
+            <a:endParaRPr lang="en-US" dirty="0"/>
+          </a:p>
+        </p:txBody>
+      </p:sp>
+      <p:sp>
+        <p:nvSpPr>
+          <p:cNvPr id="6" name="Slide Number Placeholder 5">
+            <a:extLst>
+              <a:ext uri="{FF2B5EF4-FFF2-40B4-BE49-F238E27FC236}">
+                <a16:creationId xmlns:a16="http://schemas.microsoft.com/office/drawing/2014/main" id="{8CC75551-85BF-4C9F-8893-AA28ECA8A6B5}"/>
+              </a:ext>
+            </a:extLst>
+          </p:cNvPr>
+          <p:cNvSpPr>
+            <a:spLocks noGrp="1"/>
+          </p:cNvSpPr>
+          <p:nvPr>
+            <p:ph type="sldNum" sz="quarter" idx="12"/>
+          </p:nvPr>
+        </p:nvSpPr>
+        <p:spPr/>
+        <p:txBody>
+          <a:bodyPr/>
+          <a:lstStyle/>
+          <a:p>
+            <a:fld id="{D57F1E4F-1CFF-5643-939E-02111984F565}" type="slidenum">
+              <a:rPr lang="en-US" smtClean="0"/>
+              <a:t>59</a:t>
+            </a:fld>
+            <a:endParaRPr lang="en-US" dirty="0"/>
+          </a:p>
+        </p:txBody>
+      </p:sp>
+    </p:spTree>
+    <p:extLst>
+      <p:ext uri="{BB962C8B-B14F-4D97-AF65-F5344CB8AC3E}">
+        <p14:creationId xmlns:p14="http://schemas.microsoft.com/office/powerpoint/2010/main" val="669531222"/>
       </p:ext>
     </p:extLst>
   </p:cSld>
@@ -16781,6 +16943,1479 @@
     <p:extLst>
       <p:ext uri="{BB962C8B-B14F-4D97-AF65-F5344CB8AC3E}">
         <p14:creationId xmlns:p14="http://schemas.microsoft.com/office/powerpoint/2010/main" val="610566329"/>
+      </p:ext>
+    </p:extLst>
+  </p:cSld>
+  <p:clrMapOvr>
+    <a:masterClrMapping/>
+  </p:clrMapOvr>
+</p:sld>
+</file>
+
+<file path=ppt/slides/slide60.xml><?xml version="1.0" encoding="utf-8"?>
+<p:sld xmlns:a="http://schemas.openxmlformats.org/drawingml/2006/main" xmlns:r="http://schemas.openxmlformats.org/officeDocument/2006/relationships" xmlns:p="http://schemas.openxmlformats.org/presentationml/2006/main">
+  <p:cSld>
+    <p:spTree>
+      <p:nvGrpSpPr>
+        <p:cNvPr id="1" name=""/>
+        <p:cNvGrpSpPr/>
+        <p:nvPr/>
+      </p:nvGrpSpPr>
+      <p:grpSpPr>
+        <a:xfrm>
+          <a:off x="0" y="0"/>
+          <a:ext cx="0" cy="0"/>
+          <a:chOff x="0" y="0"/>
+          <a:chExt cx="0" cy="0"/>
+        </a:xfrm>
+      </p:grpSpPr>
+      <p:sp>
+        <p:nvSpPr>
+          <p:cNvPr id="7" name="Title 6">
+            <a:extLst>
+              <a:ext uri="{FF2B5EF4-FFF2-40B4-BE49-F238E27FC236}">
+                <a16:creationId xmlns:a16="http://schemas.microsoft.com/office/drawing/2014/main" id="{75C0DCD3-95F8-4E1F-BF1A-5FAAB84A40A3}"/>
+              </a:ext>
+            </a:extLst>
+          </p:cNvPr>
+          <p:cNvSpPr>
+            <a:spLocks noGrp="1"/>
+          </p:cNvSpPr>
+          <p:nvPr>
+            <p:ph type="title"/>
+          </p:nvPr>
+        </p:nvSpPr>
+        <p:spPr/>
+        <p:txBody>
+          <a:bodyPr/>
+          <a:lstStyle/>
+          <a:p>
+            <a:r>
+              <a:rPr lang="en-US" dirty="0"/>
+              <a:t>BUILDING AN RNN MODEL</a:t>
+            </a:r>
+          </a:p>
+        </p:txBody>
+      </p:sp>
+      <p:sp>
+        <p:nvSpPr>
+          <p:cNvPr id="8" name="Content Placeholder 7">
+            <a:extLst>
+              <a:ext uri="{FF2B5EF4-FFF2-40B4-BE49-F238E27FC236}">
+                <a16:creationId xmlns:a16="http://schemas.microsoft.com/office/drawing/2014/main" id="{52BB1FAB-BB61-4B66-A4EA-A0EABC2B3ECA}"/>
+              </a:ext>
+            </a:extLst>
+          </p:cNvPr>
+          <p:cNvSpPr>
+            <a:spLocks noGrp="1"/>
+          </p:cNvSpPr>
+          <p:nvPr>
+            <p:ph idx="1"/>
+          </p:nvPr>
+        </p:nvSpPr>
+        <p:spPr/>
+        <p:txBody>
+          <a:bodyPr/>
+          <a:lstStyle/>
+          <a:p>
+            <a:r>
+              <a:rPr lang="en-US" dirty="0"/>
+              <a:t>R</a:t>
+            </a:r>
+          </a:p>
+          <a:p>
+            <a:pPr marL="0" indent="0">
+              <a:buNone/>
+            </a:pPr>
+            <a:r>
+              <a:rPr lang="en-US" dirty="0">
+                <a:latin typeface="Courier New" panose="02070309020205020404" pitchFamily="49" charset="0"/>
+                <a:cs typeface="Courier New" panose="02070309020205020404" pitchFamily="49" charset="0"/>
+              </a:rPr>
+              <a:t>library(</a:t>
+            </a:r>
+            <a:r>
+              <a:rPr lang="en-US" dirty="0" err="1">
+                <a:latin typeface="Courier New" panose="02070309020205020404" pitchFamily="49" charset="0"/>
+                <a:cs typeface="Courier New" panose="02070309020205020404" pitchFamily="49" charset="0"/>
+              </a:rPr>
+              <a:t>keras</a:t>
+            </a:r>
+            <a:r>
+              <a:rPr lang="en-US" dirty="0">
+                <a:latin typeface="Courier New" panose="02070309020205020404" pitchFamily="49" charset="0"/>
+                <a:cs typeface="Courier New" panose="02070309020205020404" pitchFamily="49" charset="0"/>
+              </a:rPr>
+              <a:t>)</a:t>
+            </a:r>
+          </a:p>
+          <a:p>
+            <a:r>
+              <a:rPr lang="en-US" dirty="0"/>
+              <a:t>Python</a:t>
+            </a:r>
+          </a:p>
+          <a:p>
+            <a:pPr marL="0" indent="0">
+              <a:buNone/>
+            </a:pPr>
+            <a:r>
+              <a:rPr lang="en-US" dirty="0">
+                <a:latin typeface="Courier New" panose="02070309020205020404" pitchFamily="49" charset="0"/>
+                <a:cs typeface="Courier New" panose="02070309020205020404" pitchFamily="49" charset="0"/>
+              </a:rPr>
+              <a:t>import </a:t>
+            </a:r>
+            <a:r>
+              <a:rPr lang="en-US" dirty="0" err="1">
+                <a:latin typeface="Courier New" panose="02070309020205020404" pitchFamily="49" charset="0"/>
+                <a:cs typeface="Courier New" panose="02070309020205020404" pitchFamily="49" charset="0"/>
+              </a:rPr>
+              <a:t>keras</a:t>
+            </a:r>
+            <a:endParaRPr lang="en-US" dirty="0"/>
+          </a:p>
+          <a:p>
+            <a:endParaRPr lang="en-US" dirty="0"/>
+          </a:p>
+        </p:txBody>
+      </p:sp>
+      <p:sp>
+        <p:nvSpPr>
+          <p:cNvPr id="4" name="Date Placeholder 3">
+            <a:extLst>
+              <a:ext uri="{FF2B5EF4-FFF2-40B4-BE49-F238E27FC236}">
+                <a16:creationId xmlns:a16="http://schemas.microsoft.com/office/drawing/2014/main" id="{02256D86-7CE0-416E-B2A3-402D20EE9E90}"/>
+              </a:ext>
+            </a:extLst>
+          </p:cNvPr>
+          <p:cNvSpPr>
+            <a:spLocks noGrp="1"/>
+          </p:cNvSpPr>
+          <p:nvPr>
+            <p:ph type="dt" sz="half" idx="10"/>
+          </p:nvPr>
+        </p:nvSpPr>
+        <p:spPr/>
+        <p:txBody>
+          <a:bodyPr/>
+          <a:lstStyle/>
+          <a:p>
+            <a:fld id="{B08FEED8-D7D4-44E9-BFBC-ED06B5996D94}" type="datetime4">
+              <a:rPr lang="en-US" smtClean="0"/>
+              <a:t>July 30, 2019</a:t>
+            </a:fld>
+            <a:endParaRPr lang="en-US" dirty="0"/>
+          </a:p>
+        </p:txBody>
+      </p:sp>
+      <p:sp>
+        <p:nvSpPr>
+          <p:cNvPr id="5" name="Footer Placeholder 4">
+            <a:extLst>
+              <a:ext uri="{FF2B5EF4-FFF2-40B4-BE49-F238E27FC236}">
+                <a16:creationId xmlns:a16="http://schemas.microsoft.com/office/drawing/2014/main" id="{1D4ED112-7CF4-4BB9-B46E-B366A5054A9A}"/>
+              </a:ext>
+            </a:extLst>
+          </p:cNvPr>
+          <p:cNvSpPr>
+            <a:spLocks noGrp="1"/>
+          </p:cNvSpPr>
+          <p:nvPr>
+            <p:ph type="ftr" sz="quarter" idx="11"/>
+          </p:nvPr>
+        </p:nvSpPr>
+        <p:spPr/>
+        <p:txBody>
+          <a:bodyPr/>
+          <a:lstStyle/>
+          <a:p>
+            <a:r>
+              <a:rPr lang="en-US"/>
+              <a:t>Digital Scholarship Services </a:t>
+            </a:r>
+            <a:r>
+              <a:rPr lang="en-US">
+                <a:solidFill>
+                  <a:schemeClr val="accent1">
+                    <a:lumMod val="50000"/>
+                  </a:schemeClr>
+                </a:solidFill>
+              </a:rPr>
+              <a:t>| Email</a:t>
+            </a:r>
+            <a:r>
+              <a:rPr lang="en-US"/>
+              <a:t> cf24@rice.edu </a:t>
+            </a:r>
+            <a:r>
+              <a:rPr lang="en-US">
+                <a:solidFill>
+                  <a:schemeClr val="accent1">
+                    <a:lumMod val="50000"/>
+                  </a:schemeClr>
+                </a:solidFill>
+              </a:rPr>
+              <a:t>|</a:t>
+            </a:r>
+            <a:r>
+              <a:rPr lang="en-US"/>
+              <a:t> library.rice.edu/dss</a:t>
+            </a:r>
+            <a:endParaRPr lang="en-US" dirty="0"/>
+          </a:p>
+        </p:txBody>
+      </p:sp>
+      <p:sp>
+        <p:nvSpPr>
+          <p:cNvPr id="6" name="Slide Number Placeholder 5">
+            <a:extLst>
+              <a:ext uri="{FF2B5EF4-FFF2-40B4-BE49-F238E27FC236}">
+                <a16:creationId xmlns:a16="http://schemas.microsoft.com/office/drawing/2014/main" id="{8CC75551-85BF-4C9F-8893-AA28ECA8A6B5}"/>
+              </a:ext>
+            </a:extLst>
+          </p:cNvPr>
+          <p:cNvSpPr>
+            <a:spLocks noGrp="1"/>
+          </p:cNvSpPr>
+          <p:nvPr>
+            <p:ph type="sldNum" sz="quarter" idx="12"/>
+          </p:nvPr>
+        </p:nvSpPr>
+        <p:spPr/>
+        <p:txBody>
+          <a:bodyPr/>
+          <a:lstStyle/>
+          <a:p>
+            <a:fld id="{D57F1E4F-1CFF-5643-939E-02111984F565}" type="slidenum">
+              <a:rPr lang="en-US" smtClean="0"/>
+              <a:t>60</a:t>
+            </a:fld>
+            <a:endParaRPr lang="en-US" dirty="0"/>
+          </a:p>
+        </p:txBody>
+      </p:sp>
+    </p:spTree>
+    <p:extLst>
+      <p:ext uri="{BB962C8B-B14F-4D97-AF65-F5344CB8AC3E}">
+        <p14:creationId xmlns:p14="http://schemas.microsoft.com/office/powerpoint/2010/main" val="2723958197"/>
+      </p:ext>
+    </p:extLst>
+  </p:cSld>
+  <p:clrMapOvr>
+    <a:masterClrMapping/>
+  </p:clrMapOvr>
+</p:sld>
+</file>
+
+<file path=ppt/slides/slide61.xml><?xml version="1.0" encoding="utf-8"?>
+<p:sld xmlns:a="http://schemas.openxmlformats.org/drawingml/2006/main" xmlns:r="http://schemas.openxmlformats.org/officeDocument/2006/relationships" xmlns:p="http://schemas.openxmlformats.org/presentationml/2006/main">
+  <p:cSld>
+    <p:spTree>
+      <p:nvGrpSpPr>
+        <p:cNvPr id="1" name=""/>
+        <p:cNvGrpSpPr/>
+        <p:nvPr/>
+      </p:nvGrpSpPr>
+      <p:grpSpPr>
+        <a:xfrm>
+          <a:off x="0" y="0"/>
+          <a:ext cx="0" cy="0"/>
+          <a:chOff x="0" y="0"/>
+          <a:chExt cx="0" cy="0"/>
+        </a:xfrm>
+      </p:grpSpPr>
+      <p:sp>
+        <p:nvSpPr>
+          <p:cNvPr id="2" name="Title 1">
+            <a:extLst>
+              <a:ext uri="{FF2B5EF4-FFF2-40B4-BE49-F238E27FC236}">
+                <a16:creationId xmlns:a16="http://schemas.microsoft.com/office/drawing/2014/main" id="{D1BF0482-6913-4A5E-A533-479864CB5349}"/>
+              </a:ext>
+            </a:extLst>
+          </p:cNvPr>
+          <p:cNvSpPr>
+            <a:spLocks noGrp="1"/>
+          </p:cNvSpPr>
+          <p:nvPr>
+            <p:ph type="title"/>
+          </p:nvPr>
+        </p:nvSpPr>
+        <p:spPr/>
+        <p:txBody>
+          <a:bodyPr/>
+          <a:lstStyle/>
+          <a:p>
+            <a:r>
+              <a:rPr lang="en-US" dirty="0"/>
+              <a:t>AN RNN MODEL</a:t>
+            </a:r>
+          </a:p>
+        </p:txBody>
+      </p:sp>
+      <p:sp>
+        <p:nvSpPr>
+          <p:cNvPr id="4" name="Date Placeholder 3">
+            <a:extLst>
+              <a:ext uri="{FF2B5EF4-FFF2-40B4-BE49-F238E27FC236}">
+                <a16:creationId xmlns:a16="http://schemas.microsoft.com/office/drawing/2014/main" id="{B23DAF35-209C-48FA-AAAB-F69E14183A91}"/>
+              </a:ext>
+            </a:extLst>
+          </p:cNvPr>
+          <p:cNvSpPr>
+            <a:spLocks noGrp="1"/>
+          </p:cNvSpPr>
+          <p:nvPr>
+            <p:ph type="dt" sz="half" idx="10"/>
+          </p:nvPr>
+        </p:nvSpPr>
+        <p:spPr/>
+        <p:txBody>
+          <a:bodyPr/>
+          <a:lstStyle/>
+          <a:p>
+            <a:fld id="{8AAE40A0-A7D8-4DC3-BC9E-BADA32DA2004}" type="datetime4">
+              <a:rPr lang="en-US" smtClean="0"/>
+              <a:t>July 30, 2019</a:t>
+            </a:fld>
+            <a:endParaRPr lang="en-US" dirty="0"/>
+          </a:p>
+        </p:txBody>
+      </p:sp>
+      <p:sp>
+        <p:nvSpPr>
+          <p:cNvPr id="5" name="Footer Placeholder 4">
+            <a:extLst>
+              <a:ext uri="{FF2B5EF4-FFF2-40B4-BE49-F238E27FC236}">
+                <a16:creationId xmlns:a16="http://schemas.microsoft.com/office/drawing/2014/main" id="{3D8E22A6-180D-41CF-9959-4347A11F2AD1}"/>
+              </a:ext>
+            </a:extLst>
+          </p:cNvPr>
+          <p:cNvSpPr>
+            <a:spLocks noGrp="1"/>
+          </p:cNvSpPr>
+          <p:nvPr>
+            <p:ph type="ftr" sz="quarter" idx="11"/>
+          </p:nvPr>
+        </p:nvSpPr>
+        <p:spPr/>
+        <p:txBody>
+          <a:bodyPr/>
+          <a:lstStyle/>
+          <a:p>
+            <a:r>
+              <a:rPr lang="en-US"/>
+              <a:t>Digital Scholarship Services </a:t>
+            </a:r>
+            <a:r>
+              <a:rPr lang="en-US">
+                <a:solidFill>
+                  <a:schemeClr val="accent1">
+                    <a:lumMod val="50000"/>
+                  </a:schemeClr>
+                </a:solidFill>
+              </a:rPr>
+              <a:t>| Email</a:t>
+            </a:r>
+            <a:r>
+              <a:rPr lang="en-US"/>
+              <a:t> cf24@rice.edu </a:t>
+            </a:r>
+            <a:r>
+              <a:rPr lang="en-US">
+                <a:solidFill>
+                  <a:schemeClr val="accent1">
+                    <a:lumMod val="50000"/>
+                  </a:schemeClr>
+                </a:solidFill>
+              </a:rPr>
+              <a:t>|</a:t>
+            </a:r>
+            <a:r>
+              <a:rPr lang="en-US"/>
+              <a:t> library.rice.edu/dss</a:t>
+            </a:r>
+            <a:endParaRPr lang="en-US" dirty="0"/>
+          </a:p>
+        </p:txBody>
+      </p:sp>
+      <p:sp>
+        <p:nvSpPr>
+          <p:cNvPr id="6" name="Slide Number Placeholder 5">
+            <a:extLst>
+              <a:ext uri="{FF2B5EF4-FFF2-40B4-BE49-F238E27FC236}">
+                <a16:creationId xmlns:a16="http://schemas.microsoft.com/office/drawing/2014/main" id="{CECE3146-0C2B-4CC7-BC7C-FD23AAF7ECAE}"/>
+              </a:ext>
+            </a:extLst>
+          </p:cNvPr>
+          <p:cNvSpPr>
+            <a:spLocks noGrp="1"/>
+          </p:cNvSpPr>
+          <p:nvPr>
+            <p:ph type="sldNum" sz="quarter" idx="12"/>
+          </p:nvPr>
+        </p:nvSpPr>
+        <p:spPr/>
+        <p:txBody>
+          <a:bodyPr/>
+          <a:lstStyle/>
+          <a:p>
+            <a:fld id="{D57F1E4F-1CFF-5643-939E-02111984F565}" type="slidenum">
+              <a:rPr lang="en-US" smtClean="0"/>
+              <a:t>61</a:t>
+            </a:fld>
+            <a:endParaRPr lang="en-US" dirty="0"/>
+          </a:p>
+        </p:txBody>
+      </p:sp>
+      <p:sp>
+        <p:nvSpPr>
+          <p:cNvPr id="8" name="Content Placeholder 7">
+            <a:extLst>
+              <a:ext uri="{FF2B5EF4-FFF2-40B4-BE49-F238E27FC236}">
+                <a16:creationId xmlns:a16="http://schemas.microsoft.com/office/drawing/2014/main" id="{30C259F3-048F-4C4B-AC8C-24699B6ABD42}"/>
+              </a:ext>
+            </a:extLst>
+          </p:cNvPr>
+          <p:cNvSpPr>
+            <a:spLocks noGrp="1"/>
+          </p:cNvSpPr>
+          <p:nvPr>
+            <p:ph idx="1"/>
+          </p:nvPr>
+        </p:nvSpPr>
+        <p:spPr>
+          <a:xfrm>
+            <a:off x="838200" y="1825625"/>
+            <a:ext cx="5257800" cy="4351338"/>
+          </a:xfrm>
+        </p:spPr>
+        <p:txBody>
+          <a:bodyPr/>
+          <a:lstStyle/>
+          <a:p>
+            <a:r>
+              <a:rPr lang="en-US" dirty="0"/>
+              <a:t>Mean Relative Error: 7.4%</a:t>
+            </a:r>
+          </a:p>
+          <a:p>
+            <a:r>
+              <a:rPr lang="en-US" dirty="0"/>
+              <a:t>Very interested in cycles</a:t>
+            </a:r>
+          </a:p>
+          <a:p>
+            <a:r>
+              <a:rPr lang="en-US" dirty="0"/>
+              <a:t>Not bad, but slightly worse than ARIMA</a:t>
+            </a:r>
+          </a:p>
+          <a:p>
+            <a:pPr lvl="1"/>
+            <a:r>
+              <a:rPr lang="en-US" dirty="0"/>
+              <a:t>Much faster, though</a:t>
+            </a:r>
+          </a:p>
+        </p:txBody>
+      </p:sp>
+      <p:pic>
+        <p:nvPicPr>
+          <p:cNvPr id="10" name="Picture 9">
+            <a:extLst>
+              <a:ext uri="{FF2B5EF4-FFF2-40B4-BE49-F238E27FC236}">
+                <a16:creationId xmlns:a16="http://schemas.microsoft.com/office/drawing/2014/main" id="{64B67945-AF39-4BB8-86D4-3E74D0B6AE5C}"/>
+              </a:ext>
+            </a:extLst>
+          </p:cNvPr>
+          <p:cNvPicPr>
+            <a:picLocks noChangeAspect="1"/>
+          </p:cNvPicPr>
+          <p:nvPr/>
+        </p:nvPicPr>
+        <p:blipFill>
+          <a:blip r:embed="rId2"/>
+          <a:srcRect/>
+          <a:stretch/>
+        </p:blipFill>
+        <p:spPr>
+          <a:xfrm>
+            <a:off x="6096000" y="2096028"/>
+            <a:ext cx="5715798" cy="3810532"/>
+          </a:xfrm>
+          <a:prstGeom prst="rect">
+            <a:avLst/>
+          </a:prstGeom>
+        </p:spPr>
+      </p:pic>
+    </p:spTree>
+    <p:extLst>
+      <p:ext uri="{BB962C8B-B14F-4D97-AF65-F5344CB8AC3E}">
+        <p14:creationId xmlns:p14="http://schemas.microsoft.com/office/powerpoint/2010/main" val="126566451"/>
+      </p:ext>
+    </p:extLst>
+  </p:cSld>
+  <p:clrMapOvr>
+    <a:masterClrMapping/>
+  </p:clrMapOvr>
+</p:sld>
+</file>
+
+<file path=ppt/slides/slide62.xml><?xml version="1.0" encoding="utf-8"?>
+<p:sld xmlns:a="http://schemas.openxmlformats.org/drawingml/2006/main" xmlns:r="http://schemas.openxmlformats.org/officeDocument/2006/relationships" xmlns:p="http://schemas.openxmlformats.org/presentationml/2006/main">
+  <p:cSld>
+    <p:spTree>
+      <p:nvGrpSpPr>
+        <p:cNvPr id="1" name=""/>
+        <p:cNvGrpSpPr/>
+        <p:nvPr/>
+      </p:nvGrpSpPr>
+      <p:grpSpPr>
+        <a:xfrm>
+          <a:off x="0" y="0"/>
+          <a:ext cx="0" cy="0"/>
+          <a:chOff x="0" y="0"/>
+          <a:chExt cx="0" cy="0"/>
+        </a:xfrm>
+      </p:grpSpPr>
+      <p:sp>
+        <p:nvSpPr>
+          <p:cNvPr id="7" name="Title 6">
+            <a:extLst>
+              <a:ext uri="{FF2B5EF4-FFF2-40B4-BE49-F238E27FC236}">
+                <a16:creationId xmlns:a16="http://schemas.microsoft.com/office/drawing/2014/main" id="{75C0DCD3-95F8-4E1F-BF1A-5FAAB84A40A3}"/>
+              </a:ext>
+            </a:extLst>
+          </p:cNvPr>
+          <p:cNvSpPr>
+            <a:spLocks noGrp="1"/>
+          </p:cNvSpPr>
+          <p:nvPr>
+            <p:ph type="title"/>
+          </p:nvPr>
+        </p:nvSpPr>
+        <p:spPr/>
+        <p:txBody>
+          <a:bodyPr/>
+          <a:lstStyle/>
+          <a:p>
+            <a:r>
+              <a:rPr lang="en-US" dirty="0"/>
+              <a:t>BUILDING AN LSTM MODEL</a:t>
+            </a:r>
+          </a:p>
+        </p:txBody>
+      </p:sp>
+      <p:sp>
+        <p:nvSpPr>
+          <p:cNvPr id="8" name="Content Placeholder 7">
+            <a:extLst>
+              <a:ext uri="{FF2B5EF4-FFF2-40B4-BE49-F238E27FC236}">
+                <a16:creationId xmlns:a16="http://schemas.microsoft.com/office/drawing/2014/main" id="{52BB1FAB-BB61-4B66-A4EA-A0EABC2B3ECA}"/>
+              </a:ext>
+            </a:extLst>
+          </p:cNvPr>
+          <p:cNvSpPr>
+            <a:spLocks noGrp="1"/>
+          </p:cNvSpPr>
+          <p:nvPr>
+            <p:ph idx="1"/>
+          </p:nvPr>
+        </p:nvSpPr>
+        <p:spPr/>
+        <p:txBody>
+          <a:bodyPr/>
+          <a:lstStyle/>
+          <a:p>
+            <a:r>
+              <a:rPr lang="en-US" dirty="0"/>
+              <a:t>R</a:t>
+            </a:r>
+          </a:p>
+          <a:p>
+            <a:pPr marL="0" indent="0">
+              <a:buNone/>
+            </a:pPr>
+            <a:r>
+              <a:rPr lang="en-US" dirty="0">
+                <a:latin typeface="Courier New" panose="02070309020205020404" pitchFamily="49" charset="0"/>
+                <a:cs typeface="Courier New" panose="02070309020205020404" pitchFamily="49" charset="0"/>
+              </a:rPr>
+              <a:t>library(</a:t>
+            </a:r>
+            <a:r>
+              <a:rPr lang="en-US" dirty="0" err="1">
+                <a:latin typeface="Courier New" panose="02070309020205020404" pitchFamily="49" charset="0"/>
+                <a:cs typeface="Courier New" panose="02070309020205020404" pitchFamily="49" charset="0"/>
+              </a:rPr>
+              <a:t>keras</a:t>
+            </a:r>
+            <a:r>
+              <a:rPr lang="en-US" dirty="0">
+                <a:latin typeface="Courier New" panose="02070309020205020404" pitchFamily="49" charset="0"/>
+                <a:cs typeface="Courier New" panose="02070309020205020404" pitchFamily="49" charset="0"/>
+              </a:rPr>
+              <a:t>)</a:t>
+            </a:r>
+          </a:p>
+          <a:p>
+            <a:r>
+              <a:rPr lang="en-US" dirty="0"/>
+              <a:t>Python</a:t>
+            </a:r>
+          </a:p>
+          <a:p>
+            <a:pPr marL="0" indent="0">
+              <a:buNone/>
+            </a:pPr>
+            <a:r>
+              <a:rPr lang="en-US" dirty="0">
+                <a:latin typeface="Courier New" panose="02070309020205020404" pitchFamily="49" charset="0"/>
+                <a:cs typeface="Courier New" panose="02070309020205020404" pitchFamily="49" charset="0"/>
+              </a:rPr>
+              <a:t>import </a:t>
+            </a:r>
+            <a:r>
+              <a:rPr lang="en-US">
+                <a:latin typeface="Courier New" panose="02070309020205020404" pitchFamily="49" charset="0"/>
+                <a:cs typeface="Courier New" panose="02070309020205020404" pitchFamily="49" charset="0"/>
+              </a:rPr>
+              <a:t>keras</a:t>
+            </a:r>
+            <a:endParaRPr lang="en-US" dirty="0">
+              <a:latin typeface="Courier New" panose="02070309020205020404" pitchFamily="49" charset="0"/>
+              <a:cs typeface="Courier New" panose="02070309020205020404" pitchFamily="49" charset="0"/>
+            </a:endParaRPr>
+          </a:p>
+        </p:txBody>
+      </p:sp>
+      <p:sp>
+        <p:nvSpPr>
+          <p:cNvPr id="4" name="Date Placeholder 3">
+            <a:extLst>
+              <a:ext uri="{FF2B5EF4-FFF2-40B4-BE49-F238E27FC236}">
+                <a16:creationId xmlns:a16="http://schemas.microsoft.com/office/drawing/2014/main" id="{02256D86-7CE0-416E-B2A3-402D20EE9E90}"/>
+              </a:ext>
+            </a:extLst>
+          </p:cNvPr>
+          <p:cNvSpPr>
+            <a:spLocks noGrp="1"/>
+          </p:cNvSpPr>
+          <p:nvPr>
+            <p:ph type="dt" sz="half" idx="10"/>
+          </p:nvPr>
+        </p:nvSpPr>
+        <p:spPr/>
+        <p:txBody>
+          <a:bodyPr/>
+          <a:lstStyle/>
+          <a:p>
+            <a:fld id="{B08FEED8-D7D4-44E9-BFBC-ED06B5996D94}" type="datetime4">
+              <a:rPr lang="en-US" smtClean="0"/>
+              <a:t>July 30, 2019</a:t>
+            </a:fld>
+            <a:endParaRPr lang="en-US" dirty="0"/>
+          </a:p>
+        </p:txBody>
+      </p:sp>
+      <p:sp>
+        <p:nvSpPr>
+          <p:cNvPr id="5" name="Footer Placeholder 4">
+            <a:extLst>
+              <a:ext uri="{FF2B5EF4-FFF2-40B4-BE49-F238E27FC236}">
+                <a16:creationId xmlns:a16="http://schemas.microsoft.com/office/drawing/2014/main" id="{1D4ED112-7CF4-4BB9-B46E-B366A5054A9A}"/>
+              </a:ext>
+            </a:extLst>
+          </p:cNvPr>
+          <p:cNvSpPr>
+            <a:spLocks noGrp="1"/>
+          </p:cNvSpPr>
+          <p:nvPr>
+            <p:ph type="ftr" sz="quarter" idx="11"/>
+          </p:nvPr>
+        </p:nvSpPr>
+        <p:spPr/>
+        <p:txBody>
+          <a:bodyPr/>
+          <a:lstStyle/>
+          <a:p>
+            <a:r>
+              <a:rPr lang="en-US"/>
+              <a:t>Digital Scholarship Services </a:t>
+            </a:r>
+            <a:r>
+              <a:rPr lang="en-US">
+                <a:solidFill>
+                  <a:schemeClr val="accent1">
+                    <a:lumMod val="50000"/>
+                  </a:schemeClr>
+                </a:solidFill>
+              </a:rPr>
+              <a:t>| Email</a:t>
+            </a:r>
+            <a:r>
+              <a:rPr lang="en-US"/>
+              <a:t> cf24@rice.edu </a:t>
+            </a:r>
+            <a:r>
+              <a:rPr lang="en-US">
+                <a:solidFill>
+                  <a:schemeClr val="accent1">
+                    <a:lumMod val="50000"/>
+                  </a:schemeClr>
+                </a:solidFill>
+              </a:rPr>
+              <a:t>|</a:t>
+            </a:r>
+            <a:r>
+              <a:rPr lang="en-US"/>
+              <a:t> library.rice.edu/dss</a:t>
+            </a:r>
+            <a:endParaRPr lang="en-US" dirty="0"/>
+          </a:p>
+        </p:txBody>
+      </p:sp>
+      <p:sp>
+        <p:nvSpPr>
+          <p:cNvPr id="6" name="Slide Number Placeholder 5">
+            <a:extLst>
+              <a:ext uri="{FF2B5EF4-FFF2-40B4-BE49-F238E27FC236}">
+                <a16:creationId xmlns:a16="http://schemas.microsoft.com/office/drawing/2014/main" id="{8CC75551-85BF-4C9F-8893-AA28ECA8A6B5}"/>
+              </a:ext>
+            </a:extLst>
+          </p:cNvPr>
+          <p:cNvSpPr>
+            <a:spLocks noGrp="1"/>
+          </p:cNvSpPr>
+          <p:nvPr>
+            <p:ph type="sldNum" sz="quarter" idx="12"/>
+          </p:nvPr>
+        </p:nvSpPr>
+        <p:spPr/>
+        <p:txBody>
+          <a:bodyPr/>
+          <a:lstStyle/>
+          <a:p>
+            <a:fld id="{D57F1E4F-1CFF-5643-939E-02111984F565}" type="slidenum">
+              <a:rPr lang="en-US" smtClean="0"/>
+              <a:t>62</a:t>
+            </a:fld>
+            <a:endParaRPr lang="en-US" dirty="0"/>
+          </a:p>
+        </p:txBody>
+      </p:sp>
+    </p:spTree>
+    <p:extLst>
+      <p:ext uri="{BB962C8B-B14F-4D97-AF65-F5344CB8AC3E}">
+        <p14:creationId xmlns:p14="http://schemas.microsoft.com/office/powerpoint/2010/main" val="3436625262"/>
+      </p:ext>
+    </p:extLst>
+  </p:cSld>
+  <p:clrMapOvr>
+    <a:masterClrMapping/>
+  </p:clrMapOvr>
+</p:sld>
+</file>
+
+<file path=ppt/slides/slide63.xml><?xml version="1.0" encoding="utf-8"?>
+<p:sld xmlns:a="http://schemas.openxmlformats.org/drawingml/2006/main" xmlns:r="http://schemas.openxmlformats.org/officeDocument/2006/relationships" xmlns:p="http://schemas.openxmlformats.org/presentationml/2006/main">
+  <p:cSld>
+    <p:spTree>
+      <p:nvGrpSpPr>
+        <p:cNvPr id="1" name=""/>
+        <p:cNvGrpSpPr/>
+        <p:nvPr/>
+      </p:nvGrpSpPr>
+      <p:grpSpPr>
+        <a:xfrm>
+          <a:off x="0" y="0"/>
+          <a:ext cx="0" cy="0"/>
+          <a:chOff x="0" y="0"/>
+          <a:chExt cx="0" cy="0"/>
+        </a:xfrm>
+      </p:grpSpPr>
+      <p:sp>
+        <p:nvSpPr>
+          <p:cNvPr id="2" name="Title 1">
+            <a:extLst>
+              <a:ext uri="{FF2B5EF4-FFF2-40B4-BE49-F238E27FC236}">
+                <a16:creationId xmlns:a16="http://schemas.microsoft.com/office/drawing/2014/main" id="{D1BF0482-6913-4A5E-A533-479864CB5349}"/>
+              </a:ext>
+            </a:extLst>
+          </p:cNvPr>
+          <p:cNvSpPr>
+            <a:spLocks noGrp="1"/>
+          </p:cNvSpPr>
+          <p:nvPr>
+            <p:ph type="title"/>
+          </p:nvPr>
+        </p:nvSpPr>
+        <p:spPr/>
+        <p:txBody>
+          <a:bodyPr/>
+          <a:lstStyle/>
+          <a:p>
+            <a:r>
+              <a:rPr lang="en-US" dirty="0"/>
+              <a:t>AN LSTM MODEL</a:t>
+            </a:r>
+          </a:p>
+        </p:txBody>
+      </p:sp>
+      <p:sp>
+        <p:nvSpPr>
+          <p:cNvPr id="4" name="Date Placeholder 3">
+            <a:extLst>
+              <a:ext uri="{FF2B5EF4-FFF2-40B4-BE49-F238E27FC236}">
+                <a16:creationId xmlns:a16="http://schemas.microsoft.com/office/drawing/2014/main" id="{B23DAF35-209C-48FA-AAAB-F69E14183A91}"/>
+              </a:ext>
+            </a:extLst>
+          </p:cNvPr>
+          <p:cNvSpPr>
+            <a:spLocks noGrp="1"/>
+          </p:cNvSpPr>
+          <p:nvPr>
+            <p:ph type="dt" sz="half" idx="10"/>
+          </p:nvPr>
+        </p:nvSpPr>
+        <p:spPr/>
+        <p:txBody>
+          <a:bodyPr/>
+          <a:lstStyle/>
+          <a:p>
+            <a:fld id="{8AAE40A0-A7D8-4DC3-BC9E-BADA32DA2004}" type="datetime4">
+              <a:rPr lang="en-US" smtClean="0"/>
+              <a:t>July 30, 2019</a:t>
+            </a:fld>
+            <a:endParaRPr lang="en-US" dirty="0"/>
+          </a:p>
+        </p:txBody>
+      </p:sp>
+      <p:sp>
+        <p:nvSpPr>
+          <p:cNvPr id="5" name="Footer Placeholder 4">
+            <a:extLst>
+              <a:ext uri="{FF2B5EF4-FFF2-40B4-BE49-F238E27FC236}">
+                <a16:creationId xmlns:a16="http://schemas.microsoft.com/office/drawing/2014/main" id="{3D8E22A6-180D-41CF-9959-4347A11F2AD1}"/>
+              </a:ext>
+            </a:extLst>
+          </p:cNvPr>
+          <p:cNvSpPr>
+            <a:spLocks noGrp="1"/>
+          </p:cNvSpPr>
+          <p:nvPr>
+            <p:ph type="ftr" sz="quarter" idx="11"/>
+          </p:nvPr>
+        </p:nvSpPr>
+        <p:spPr/>
+        <p:txBody>
+          <a:bodyPr/>
+          <a:lstStyle/>
+          <a:p>
+            <a:r>
+              <a:rPr lang="en-US"/>
+              <a:t>Digital Scholarship Services </a:t>
+            </a:r>
+            <a:r>
+              <a:rPr lang="en-US">
+                <a:solidFill>
+                  <a:schemeClr val="accent1">
+                    <a:lumMod val="50000"/>
+                  </a:schemeClr>
+                </a:solidFill>
+              </a:rPr>
+              <a:t>| Email</a:t>
+            </a:r>
+            <a:r>
+              <a:rPr lang="en-US"/>
+              <a:t> cf24@rice.edu </a:t>
+            </a:r>
+            <a:r>
+              <a:rPr lang="en-US">
+                <a:solidFill>
+                  <a:schemeClr val="accent1">
+                    <a:lumMod val="50000"/>
+                  </a:schemeClr>
+                </a:solidFill>
+              </a:rPr>
+              <a:t>|</a:t>
+            </a:r>
+            <a:r>
+              <a:rPr lang="en-US"/>
+              <a:t> library.rice.edu/dss</a:t>
+            </a:r>
+            <a:endParaRPr lang="en-US" dirty="0"/>
+          </a:p>
+        </p:txBody>
+      </p:sp>
+      <p:sp>
+        <p:nvSpPr>
+          <p:cNvPr id="6" name="Slide Number Placeholder 5">
+            <a:extLst>
+              <a:ext uri="{FF2B5EF4-FFF2-40B4-BE49-F238E27FC236}">
+                <a16:creationId xmlns:a16="http://schemas.microsoft.com/office/drawing/2014/main" id="{CECE3146-0C2B-4CC7-BC7C-FD23AAF7ECAE}"/>
+              </a:ext>
+            </a:extLst>
+          </p:cNvPr>
+          <p:cNvSpPr>
+            <a:spLocks noGrp="1"/>
+          </p:cNvSpPr>
+          <p:nvPr>
+            <p:ph type="sldNum" sz="quarter" idx="12"/>
+          </p:nvPr>
+        </p:nvSpPr>
+        <p:spPr/>
+        <p:txBody>
+          <a:bodyPr/>
+          <a:lstStyle/>
+          <a:p>
+            <a:fld id="{D57F1E4F-1CFF-5643-939E-02111984F565}" type="slidenum">
+              <a:rPr lang="en-US" smtClean="0"/>
+              <a:t>63</a:t>
+            </a:fld>
+            <a:endParaRPr lang="en-US" dirty="0"/>
+          </a:p>
+        </p:txBody>
+      </p:sp>
+      <p:sp>
+        <p:nvSpPr>
+          <p:cNvPr id="8" name="Content Placeholder 7">
+            <a:extLst>
+              <a:ext uri="{FF2B5EF4-FFF2-40B4-BE49-F238E27FC236}">
+                <a16:creationId xmlns:a16="http://schemas.microsoft.com/office/drawing/2014/main" id="{30C259F3-048F-4C4B-AC8C-24699B6ABD42}"/>
+              </a:ext>
+            </a:extLst>
+          </p:cNvPr>
+          <p:cNvSpPr>
+            <a:spLocks noGrp="1"/>
+          </p:cNvSpPr>
+          <p:nvPr>
+            <p:ph idx="1"/>
+          </p:nvPr>
+        </p:nvSpPr>
+        <p:spPr>
+          <a:xfrm>
+            <a:off x="838200" y="1825625"/>
+            <a:ext cx="5257800" cy="4351338"/>
+          </a:xfrm>
+        </p:spPr>
+        <p:txBody>
+          <a:bodyPr/>
+          <a:lstStyle/>
+          <a:p>
+            <a:r>
+              <a:rPr lang="en-US" dirty="0"/>
+              <a:t>Mean Relative Error: 7.4%</a:t>
+            </a:r>
+          </a:p>
+          <a:p>
+            <a:r>
+              <a:rPr lang="en-US" dirty="0"/>
+              <a:t>Very interested in cycles</a:t>
+            </a:r>
+          </a:p>
+          <a:p>
+            <a:r>
+              <a:rPr lang="en-US" dirty="0"/>
+              <a:t>Not bad, but slightly worse than ARIMA</a:t>
+            </a:r>
+          </a:p>
+          <a:p>
+            <a:pPr lvl="1"/>
+            <a:r>
+              <a:rPr lang="en-US" dirty="0"/>
+              <a:t>Much faster, though</a:t>
+            </a:r>
+          </a:p>
+        </p:txBody>
+      </p:sp>
+      <p:pic>
+        <p:nvPicPr>
+          <p:cNvPr id="10" name="Picture 9">
+            <a:extLst>
+              <a:ext uri="{FF2B5EF4-FFF2-40B4-BE49-F238E27FC236}">
+                <a16:creationId xmlns:a16="http://schemas.microsoft.com/office/drawing/2014/main" id="{64B67945-AF39-4BB8-86D4-3E74D0B6AE5C}"/>
+              </a:ext>
+            </a:extLst>
+          </p:cNvPr>
+          <p:cNvPicPr>
+            <a:picLocks noChangeAspect="1"/>
+          </p:cNvPicPr>
+          <p:nvPr/>
+        </p:nvPicPr>
+        <p:blipFill>
+          <a:blip r:embed="rId2"/>
+          <a:srcRect/>
+          <a:stretch/>
+        </p:blipFill>
+        <p:spPr>
+          <a:xfrm>
+            <a:off x="6096000" y="2096028"/>
+            <a:ext cx="5715798" cy="3810532"/>
+          </a:xfrm>
+          <a:prstGeom prst="rect">
+            <a:avLst/>
+          </a:prstGeom>
+        </p:spPr>
+      </p:pic>
+    </p:spTree>
+    <p:extLst>
+      <p:ext uri="{BB962C8B-B14F-4D97-AF65-F5344CB8AC3E}">
+        <p14:creationId xmlns:p14="http://schemas.microsoft.com/office/powerpoint/2010/main" val="3102886213"/>
+      </p:ext>
+    </p:extLst>
+  </p:cSld>
+  <p:clrMapOvr>
+    <a:masterClrMapping/>
+  </p:clrMapOvr>
+</p:sld>
+</file>
+
+<file path=ppt/slides/slide64.xml><?xml version="1.0" encoding="utf-8"?>
+<p:sld xmlns:a="http://schemas.openxmlformats.org/drawingml/2006/main" xmlns:r="http://schemas.openxmlformats.org/officeDocument/2006/relationships" xmlns:p="http://schemas.openxmlformats.org/presentationml/2006/main">
+  <p:cSld>
+    <p:spTree>
+      <p:nvGrpSpPr>
+        <p:cNvPr id="1" name=""/>
+        <p:cNvGrpSpPr/>
+        <p:nvPr/>
+      </p:nvGrpSpPr>
+      <p:grpSpPr>
+        <a:xfrm>
+          <a:off x="0" y="0"/>
+          <a:ext cx="0" cy="0"/>
+          <a:chOff x="0" y="0"/>
+          <a:chExt cx="0" cy="0"/>
+        </a:xfrm>
+      </p:grpSpPr>
+      <p:sp>
+        <p:nvSpPr>
+          <p:cNvPr id="7" name="Title 6">
+            <a:extLst>
+              <a:ext uri="{FF2B5EF4-FFF2-40B4-BE49-F238E27FC236}">
+                <a16:creationId xmlns:a16="http://schemas.microsoft.com/office/drawing/2014/main" id="{104472AF-9F8F-4DDB-87F2-C7E7CE4538C8}"/>
+              </a:ext>
+            </a:extLst>
+          </p:cNvPr>
+          <p:cNvSpPr>
+            <a:spLocks noGrp="1"/>
+          </p:cNvSpPr>
+          <p:nvPr>
+            <p:ph type="title"/>
+          </p:nvPr>
+        </p:nvSpPr>
+        <p:spPr/>
+        <p:txBody>
+          <a:bodyPr/>
+          <a:lstStyle/>
+          <a:p>
+            <a:r>
+              <a:rPr lang="en-US" dirty="0"/>
+              <a:t>COMPARISON AND</a:t>
+            </a:r>
+            <a:br>
+              <a:rPr lang="en-US" dirty="0"/>
+            </a:br>
+            <a:r>
+              <a:rPr lang="en-US" dirty="0"/>
+              <a:t>SUMMARY</a:t>
+            </a:r>
+          </a:p>
+        </p:txBody>
+      </p:sp>
+      <p:sp>
+        <p:nvSpPr>
+          <p:cNvPr id="8" name="Text Placeholder 7">
+            <a:extLst>
+              <a:ext uri="{FF2B5EF4-FFF2-40B4-BE49-F238E27FC236}">
+                <a16:creationId xmlns:a16="http://schemas.microsoft.com/office/drawing/2014/main" id="{DD688F21-A860-408B-AB59-DE6ECA0510A7}"/>
+              </a:ext>
+            </a:extLst>
+          </p:cNvPr>
+          <p:cNvSpPr>
+            <a:spLocks noGrp="1"/>
+          </p:cNvSpPr>
+          <p:nvPr>
+            <p:ph type="body" idx="1"/>
+          </p:nvPr>
+        </p:nvSpPr>
+        <p:spPr/>
+        <p:txBody>
+          <a:bodyPr/>
+          <a:lstStyle/>
+          <a:p>
+            <a:r>
+              <a:rPr lang="en-US" dirty="0"/>
+              <a:t>A look back at our models</a:t>
+            </a:r>
+          </a:p>
+        </p:txBody>
+      </p:sp>
+      <p:sp>
+        <p:nvSpPr>
+          <p:cNvPr id="4" name="Date Placeholder 3">
+            <a:extLst>
+              <a:ext uri="{FF2B5EF4-FFF2-40B4-BE49-F238E27FC236}">
+                <a16:creationId xmlns:a16="http://schemas.microsoft.com/office/drawing/2014/main" id="{2BDFDE93-390C-49C9-82C5-E17C875CFB35}"/>
+              </a:ext>
+            </a:extLst>
+          </p:cNvPr>
+          <p:cNvSpPr>
+            <a:spLocks noGrp="1"/>
+          </p:cNvSpPr>
+          <p:nvPr>
+            <p:ph type="dt" sz="half" idx="10"/>
+          </p:nvPr>
+        </p:nvSpPr>
+        <p:spPr/>
+        <p:txBody>
+          <a:bodyPr/>
+          <a:lstStyle/>
+          <a:p>
+            <a:fld id="{8AAE40A0-A7D8-4DC3-BC9E-BADA32DA2004}" type="datetime4">
+              <a:rPr lang="en-US" smtClean="0"/>
+              <a:t>July 30, 2019</a:t>
+            </a:fld>
+            <a:endParaRPr lang="en-US" dirty="0"/>
+          </a:p>
+        </p:txBody>
+      </p:sp>
+      <p:sp>
+        <p:nvSpPr>
+          <p:cNvPr id="5" name="Footer Placeholder 4">
+            <a:extLst>
+              <a:ext uri="{FF2B5EF4-FFF2-40B4-BE49-F238E27FC236}">
+                <a16:creationId xmlns:a16="http://schemas.microsoft.com/office/drawing/2014/main" id="{112AF0ED-0352-4AB1-9F1D-E1A89A11AE24}"/>
+              </a:ext>
+            </a:extLst>
+          </p:cNvPr>
+          <p:cNvSpPr>
+            <a:spLocks noGrp="1"/>
+          </p:cNvSpPr>
+          <p:nvPr>
+            <p:ph type="ftr" sz="quarter" idx="11"/>
+          </p:nvPr>
+        </p:nvSpPr>
+        <p:spPr/>
+        <p:txBody>
+          <a:bodyPr/>
+          <a:lstStyle/>
+          <a:p>
+            <a:r>
+              <a:rPr lang="en-US"/>
+              <a:t>Digital Scholarship Services </a:t>
+            </a:r>
+            <a:r>
+              <a:rPr lang="en-US">
+                <a:solidFill>
+                  <a:schemeClr val="accent1">
+                    <a:lumMod val="50000"/>
+                  </a:schemeClr>
+                </a:solidFill>
+              </a:rPr>
+              <a:t>| Email</a:t>
+            </a:r>
+            <a:r>
+              <a:rPr lang="en-US"/>
+              <a:t> cf24@rice.edu </a:t>
+            </a:r>
+            <a:r>
+              <a:rPr lang="en-US">
+                <a:solidFill>
+                  <a:schemeClr val="accent1">
+                    <a:lumMod val="50000"/>
+                  </a:schemeClr>
+                </a:solidFill>
+              </a:rPr>
+              <a:t>|</a:t>
+            </a:r>
+            <a:r>
+              <a:rPr lang="en-US"/>
+              <a:t> library.rice.edu/dss</a:t>
+            </a:r>
+            <a:endParaRPr lang="en-US" dirty="0"/>
+          </a:p>
+        </p:txBody>
+      </p:sp>
+      <p:sp>
+        <p:nvSpPr>
+          <p:cNvPr id="6" name="Slide Number Placeholder 5">
+            <a:extLst>
+              <a:ext uri="{FF2B5EF4-FFF2-40B4-BE49-F238E27FC236}">
+                <a16:creationId xmlns:a16="http://schemas.microsoft.com/office/drawing/2014/main" id="{6089B17D-061B-423C-94B0-38D32F83111F}"/>
+              </a:ext>
+            </a:extLst>
+          </p:cNvPr>
+          <p:cNvSpPr>
+            <a:spLocks noGrp="1"/>
+          </p:cNvSpPr>
+          <p:nvPr>
+            <p:ph type="sldNum" sz="quarter" idx="12"/>
+          </p:nvPr>
+        </p:nvSpPr>
+        <p:spPr/>
+        <p:txBody>
+          <a:bodyPr/>
+          <a:lstStyle/>
+          <a:p>
+            <a:fld id="{D57F1E4F-1CFF-5643-939E-02111984F565}" type="slidenum">
+              <a:rPr lang="en-US" smtClean="0"/>
+              <a:t>64</a:t>
+            </a:fld>
+            <a:endParaRPr lang="en-US" dirty="0"/>
+          </a:p>
+        </p:txBody>
+      </p:sp>
+    </p:spTree>
+    <p:extLst>
+      <p:ext uri="{BB962C8B-B14F-4D97-AF65-F5344CB8AC3E}">
+        <p14:creationId xmlns:p14="http://schemas.microsoft.com/office/powerpoint/2010/main" val="3177806857"/>
+      </p:ext>
+    </p:extLst>
+  </p:cSld>
+  <p:clrMapOvr>
+    <a:masterClrMapping/>
+  </p:clrMapOvr>
+</p:sld>
+</file>
+
+<file path=ppt/slides/slide65.xml><?xml version="1.0" encoding="utf-8"?>
+<p:sld xmlns:a="http://schemas.openxmlformats.org/drawingml/2006/main" xmlns:r="http://schemas.openxmlformats.org/officeDocument/2006/relationships" xmlns:p="http://schemas.openxmlformats.org/presentationml/2006/main">
+  <p:cSld>
+    <p:spTree>
+      <p:nvGrpSpPr>
+        <p:cNvPr id="1" name=""/>
+        <p:cNvGrpSpPr/>
+        <p:nvPr/>
+      </p:nvGrpSpPr>
+      <p:grpSpPr>
+        <a:xfrm>
+          <a:off x="0" y="0"/>
+          <a:ext cx="0" cy="0"/>
+          <a:chOff x="0" y="0"/>
+          <a:chExt cx="0" cy="0"/>
+        </a:xfrm>
+      </p:grpSpPr>
+      <p:sp>
+        <p:nvSpPr>
+          <p:cNvPr id="7" name="Title 6">
+            <a:extLst>
+              <a:ext uri="{FF2B5EF4-FFF2-40B4-BE49-F238E27FC236}">
+                <a16:creationId xmlns:a16="http://schemas.microsoft.com/office/drawing/2014/main" id="{495B4BC0-844B-4414-A623-BEF78AAC1BA1}"/>
+              </a:ext>
+            </a:extLst>
+          </p:cNvPr>
+          <p:cNvSpPr>
+            <a:spLocks noGrp="1"/>
+          </p:cNvSpPr>
+          <p:nvPr>
+            <p:ph type="title"/>
+          </p:nvPr>
+        </p:nvSpPr>
+        <p:spPr/>
+        <p:txBody>
+          <a:bodyPr/>
+          <a:lstStyle/>
+          <a:p>
+            <a:r>
+              <a:rPr lang="en-US" dirty="0"/>
+              <a:t>ACKNOWLEDGMENTS</a:t>
+            </a:r>
+          </a:p>
+        </p:txBody>
+      </p:sp>
+      <p:sp>
+        <p:nvSpPr>
+          <p:cNvPr id="8" name="Content Placeholder 7">
+            <a:extLst>
+              <a:ext uri="{FF2B5EF4-FFF2-40B4-BE49-F238E27FC236}">
+                <a16:creationId xmlns:a16="http://schemas.microsoft.com/office/drawing/2014/main" id="{2BED3EB3-7E98-4A82-8335-7321D9E37B16}"/>
+              </a:ext>
+            </a:extLst>
+          </p:cNvPr>
+          <p:cNvSpPr>
+            <a:spLocks noGrp="1"/>
+          </p:cNvSpPr>
+          <p:nvPr>
+            <p:ph idx="1"/>
+          </p:nvPr>
+        </p:nvSpPr>
+        <p:spPr/>
+        <p:txBody>
+          <a:bodyPr/>
+          <a:lstStyle/>
+          <a:p>
+            <a:r>
+              <a:rPr lang="en-US" dirty="0"/>
+              <a:t>Plots were created using the ggplot2 package in R</a:t>
+            </a:r>
+          </a:p>
+          <a:p>
+            <a:r>
+              <a:rPr lang="en-US" dirty="0"/>
+              <a:t>Shumway and </a:t>
+            </a:r>
+            <a:r>
+              <a:rPr lang="en-US" dirty="0" err="1"/>
+              <a:t>Stoffer’s</a:t>
+            </a:r>
+            <a:r>
+              <a:rPr lang="en-US" dirty="0"/>
+              <a:t> </a:t>
+            </a:r>
+            <a:r>
+              <a:rPr lang="en-US" i="1" dirty="0"/>
+              <a:t>Time Series Analysis and Its Applications With R Examples, Fourth Edition </a:t>
+            </a:r>
+            <a:r>
+              <a:rPr lang="en-US" dirty="0"/>
+              <a:t>published by Springer was used as the main reference for the ARIMA section</a:t>
+            </a:r>
+          </a:p>
+          <a:p>
+            <a:r>
+              <a:rPr lang="en-US" i="1" dirty="0"/>
+              <a:t>Forecasting at Scale </a:t>
+            </a:r>
+            <a:r>
+              <a:rPr lang="en-US" dirty="0"/>
+              <a:t>by Sean J. Taylor and Benjamin </a:t>
+            </a:r>
+            <a:r>
+              <a:rPr lang="en-US" dirty="0" err="1"/>
+              <a:t>Letham</a:t>
+            </a:r>
+            <a:r>
+              <a:rPr lang="en-US" dirty="0"/>
+              <a:t> at Facebook was used as the main reference for the Prophet section</a:t>
+            </a:r>
+            <a:endParaRPr lang="en-US" i="1" dirty="0"/>
+          </a:p>
+          <a:p>
+            <a:endParaRPr lang="en-US" dirty="0"/>
+          </a:p>
+        </p:txBody>
+      </p:sp>
+      <p:sp>
+        <p:nvSpPr>
+          <p:cNvPr id="4" name="Date Placeholder 3">
+            <a:extLst>
+              <a:ext uri="{FF2B5EF4-FFF2-40B4-BE49-F238E27FC236}">
+                <a16:creationId xmlns:a16="http://schemas.microsoft.com/office/drawing/2014/main" id="{540F37F1-4F33-429F-A568-1A3ADC499E54}"/>
+              </a:ext>
+            </a:extLst>
+          </p:cNvPr>
+          <p:cNvSpPr>
+            <a:spLocks noGrp="1"/>
+          </p:cNvSpPr>
+          <p:nvPr>
+            <p:ph type="dt" sz="half" idx="10"/>
+          </p:nvPr>
+        </p:nvSpPr>
+        <p:spPr/>
+        <p:txBody>
+          <a:bodyPr/>
+          <a:lstStyle/>
+          <a:p>
+            <a:fld id="{B08FEED8-D7D4-44E9-BFBC-ED06B5996D94}" type="datetime4">
+              <a:rPr lang="en-US" smtClean="0"/>
+              <a:t>July 30, 2019</a:t>
+            </a:fld>
+            <a:endParaRPr lang="en-US" dirty="0"/>
+          </a:p>
+        </p:txBody>
+      </p:sp>
+      <p:sp>
+        <p:nvSpPr>
+          <p:cNvPr id="5" name="Footer Placeholder 4">
+            <a:extLst>
+              <a:ext uri="{FF2B5EF4-FFF2-40B4-BE49-F238E27FC236}">
+                <a16:creationId xmlns:a16="http://schemas.microsoft.com/office/drawing/2014/main" id="{673FFA57-C126-4795-A5F6-DD33AAC5ACBD}"/>
+              </a:ext>
+            </a:extLst>
+          </p:cNvPr>
+          <p:cNvSpPr>
+            <a:spLocks noGrp="1"/>
+          </p:cNvSpPr>
+          <p:nvPr>
+            <p:ph type="ftr" sz="quarter" idx="11"/>
+          </p:nvPr>
+        </p:nvSpPr>
+        <p:spPr/>
+        <p:txBody>
+          <a:bodyPr/>
+          <a:lstStyle/>
+          <a:p>
+            <a:r>
+              <a:rPr lang="en-US"/>
+              <a:t>Digital Scholarship Services </a:t>
+            </a:r>
+            <a:r>
+              <a:rPr lang="en-US">
+                <a:solidFill>
+                  <a:schemeClr val="accent1">
+                    <a:lumMod val="50000"/>
+                  </a:schemeClr>
+                </a:solidFill>
+              </a:rPr>
+              <a:t>| Email</a:t>
+            </a:r>
+            <a:r>
+              <a:rPr lang="en-US"/>
+              <a:t> cf24@rice.edu </a:t>
+            </a:r>
+            <a:r>
+              <a:rPr lang="en-US">
+                <a:solidFill>
+                  <a:schemeClr val="accent1">
+                    <a:lumMod val="50000"/>
+                  </a:schemeClr>
+                </a:solidFill>
+              </a:rPr>
+              <a:t>|</a:t>
+            </a:r>
+            <a:r>
+              <a:rPr lang="en-US"/>
+              <a:t> library.rice.edu/dss</a:t>
+            </a:r>
+            <a:endParaRPr lang="en-US" dirty="0"/>
+          </a:p>
+        </p:txBody>
+      </p:sp>
+      <p:sp>
+        <p:nvSpPr>
+          <p:cNvPr id="6" name="Slide Number Placeholder 5">
+            <a:extLst>
+              <a:ext uri="{FF2B5EF4-FFF2-40B4-BE49-F238E27FC236}">
+                <a16:creationId xmlns:a16="http://schemas.microsoft.com/office/drawing/2014/main" id="{2FA49567-BB70-4798-8746-D0B522CCEE20}"/>
+              </a:ext>
+            </a:extLst>
+          </p:cNvPr>
+          <p:cNvSpPr>
+            <a:spLocks noGrp="1"/>
+          </p:cNvSpPr>
+          <p:nvPr>
+            <p:ph type="sldNum" sz="quarter" idx="12"/>
+          </p:nvPr>
+        </p:nvSpPr>
+        <p:spPr/>
+        <p:txBody>
+          <a:bodyPr/>
+          <a:lstStyle/>
+          <a:p>
+            <a:fld id="{D57F1E4F-1CFF-5643-939E-02111984F565}" type="slidenum">
+              <a:rPr lang="en-US" smtClean="0"/>
+              <a:t>65</a:t>
+            </a:fld>
+            <a:endParaRPr lang="en-US" dirty="0"/>
+          </a:p>
+        </p:txBody>
+      </p:sp>
+    </p:spTree>
+    <p:extLst>
+      <p:ext uri="{BB962C8B-B14F-4D97-AF65-F5344CB8AC3E}">
+        <p14:creationId xmlns:p14="http://schemas.microsoft.com/office/powerpoint/2010/main" val="1585568494"/>
       </p:ext>
     </p:extLst>
   </p:cSld>

</xml_diff>

<commit_message>
model comparisons and stuff
</commit_message>
<xml_diff>
--- a/tsa/Introduction to Time Series Analysis.pptx
+++ b/tsa/Introduction to Time Series Analysis.pptx
@@ -5,7 +5,7 @@
     <p:sldMasterId id="2147483707" r:id="rId1"/>
   </p:sldMasterIdLst>
   <p:notesMasterIdLst>
-    <p:notesMasterId r:id="rId67"/>
+    <p:notesMasterId r:id="rId76"/>
   </p:notesMasterIdLst>
   <p:sldIdLst>
     <p:sldId id="266" r:id="rId2"/>
@@ -69,10 +69,19 @@
     <p:sldId id="333" r:id="rId60"/>
     <p:sldId id="335" r:id="rId61"/>
     <p:sldId id="336" r:id="rId62"/>
-    <p:sldId id="337" r:id="rId63"/>
-    <p:sldId id="338" r:id="rId64"/>
-    <p:sldId id="339" r:id="rId65"/>
-    <p:sldId id="268" r:id="rId66"/>
+    <p:sldId id="340" r:id="rId63"/>
+    <p:sldId id="337" r:id="rId64"/>
+    <p:sldId id="341" r:id="rId65"/>
+    <p:sldId id="342" r:id="rId66"/>
+    <p:sldId id="339" r:id="rId67"/>
+    <p:sldId id="344" r:id="rId68"/>
+    <p:sldId id="346" r:id="rId69"/>
+    <p:sldId id="348" r:id="rId70"/>
+    <p:sldId id="347" r:id="rId71"/>
+    <p:sldId id="349" r:id="rId72"/>
+    <p:sldId id="351" r:id="rId73"/>
+    <p:sldId id="352" r:id="rId74"/>
+    <p:sldId id="268" r:id="rId75"/>
   </p:sldIdLst>
   <p:sldSz cx="12192000" cy="6858000"/>
   <p:notesSz cx="6858000" cy="9144000"/>
@@ -3981,6 +3990,12 @@
               <a:t>Commonly by month, day of week, day of year, etc.</a:t>
             </a:r>
           </a:p>
+          <a:p>
+            <a:r>
+              <a:rPr lang="en-US" dirty="0"/>
+              <a:t>Also called seasonality</a:t>
+            </a:r>
+          </a:p>
         </p:txBody>
       </p:sp>
       <p:sp>
@@ -5618,6 +5633,25 @@
             <a:r>
               <a:rPr lang="en-US" dirty="0"/>
               <a:t>Once we have our data stationary (or at least close), we can build amazing models!</a:t>
+            </a:r>
+          </a:p>
+          <a:p>
+            <a:r>
+              <a:rPr lang="en-US" dirty="0"/>
+              <a:t>Can’t have a trend</a:t>
+            </a:r>
+          </a:p>
+          <a:p>
+            <a:pPr lvl="1"/>
+            <a:r>
+              <a:rPr lang="en-US" dirty="0"/>
+              <a:t>If we do, we need to know when we are</a:t>
+            </a:r>
+          </a:p>
+          <a:p>
+            <a:r>
+              <a:rPr lang="en-US" dirty="0"/>
+              <a:t>Should minimize interaction between data points</a:t>
             </a:r>
           </a:p>
           <a:p>
@@ -9691,6 +9725,13 @@
               <a:t>I’m going to be using mean relative error, which measures how close our predictions are on average to the true value</a:t>
             </a:r>
           </a:p>
+          <a:p>
+            <a:pPr lvl="1"/>
+            <a:r>
+              <a:rPr lang="en-US" dirty="0"/>
+              <a:t>Another common metric: Mean Root Squared Error</a:t>
+            </a:r>
+          </a:p>
         </p:txBody>
       </p:sp>
       <p:sp>
@@ -11211,9 +11252,8 @@
         </p:nvPicPr>
         <p:blipFill>
           <a:blip r:embed="rId2"/>
-          <a:stretch>
-            <a:fillRect/>
-          </a:stretch>
+          <a:srcRect/>
+          <a:stretch/>
         </p:blipFill>
         <p:spPr>
           <a:xfrm>
@@ -16173,7 +16213,7 @@
             <a:pPr lvl="1"/>
             <a:r>
               <a:rPr lang="en-US" dirty="0"/>
-              <a:t>Can take a very long time to train the model</a:t>
+              <a:t>Can take a very long time to train the model (can be days)</a:t>
             </a:r>
           </a:p>
           <a:p>
@@ -16666,13 +16706,8 @@
           <a:p>
             <a:r>
               <a:rPr lang="en-US" dirty="0"/>
-              <a:t>Don’t </a:t>
-            </a:r>
-            <a:r>
-              <a:rPr lang="en-US"/>
-              <a:t>worry about the details!</a:t>
-            </a:r>
-            <a:endParaRPr lang="en-US" dirty="0"/>
+              <a:t>Don’t worry about the details!</a:t>
+            </a:r>
           </a:p>
         </p:txBody>
       </p:sp>
@@ -17130,7 +17165,9 @@
         </p:nvSpPr>
         <p:spPr/>
         <p:txBody>
-          <a:bodyPr/>
+          <a:bodyPr>
+            <a:normAutofit lnSpcReduction="10000"/>
+          </a:bodyPr>
           <a:lstStyle/>
           <a:p>
             <a:r>
@@ -17165,33 +17202,142 @@
             </a:r>
           </a:p>
           <a:p>
-            <a:r>
-              <a:rPr lang="en-US" dirty="0"/>
-              <a:t>Python</a:t>
-            </a:r>
-          </a:p>
-          <a:p>
             <a:pPr marL="0" indent="0">
               <a:buNone/>
             </a:pPr>
             <a:r>
+              <a:rPr lang="en-US" dirty="0" err="1">
+                <a:latin typeface="Courier New" panose="02070309020205020404" pitchFamily="49" charset="0"/>
+                <a:cs typeface="Courier New" panose="02070309020205020404" pitchFamily="49" charset="0"/>
+              </a:rPr>
+              <a:t>keras_model_sequential</a:t>
+            </a:r>
+            <a:r>
               <a:rPr lang="en-US" dirty="0">
                 <a:latin typeface="Courier New" panose="02070309020205020404" pitchFamily="49" charset="0"/>
                 <a:cs typeface="Courier New" panose="02070309020205020404" pitchFamily="49" charset="0"/>
               </a:rPr>
-              <a:t>import </a:t>
+              <a:t>() %&gt;%</a:t>
+            </a:r>
+          </a:p>
+          <a:p>
+            <a:pPr marL="0" indent="0">
+              <a:buNone/>
+            </a:pPr>
+            <a:r>
+              <a:rPr lang="en-US" dirty="0">
+                <a:latin typeface="Courier New" panose="02070309020205020404" pitchFamily="49" charset="0"/>
+                <a:cs typeface="Courier New" panose="02070309020205020404" pitchFamily="49" charset="0"/>
+              </a:rPr>
+              <a:t>    </a:t>
             </a:r>
             <a:r>
               <a:rPr lang="en-US" dirty="0" err="1">
                 <a:latin typeface="Courier New" panose="02070309020205020404" pitchFamily="49" charset="0"/>
                 <a:cs typeface="Courier New" panose="02070309020205020404" pitchFamily="49" charset="0"/>
               </a:rPr>
-              <a:t>keras</a:t>
-            </a:r>
-            <a:endParaRPr lang="en-US" dirty="0"/>
-          </a:p>
-          <a:p>
-            <a:endParaRPr lang="en-US" dirty="0"/>
+              <a:t>layer_simple_rnn</a:t>
+            </a:r>
+            <a:r>
+              <a:rPr lang="en-US" dirty="0">
+                <a:latin typeface="Courier New" panose="02070309020205020404" pitchFamily="49" charset="0"/>
+                <a:cs typeface="Courier New" panose="02070309020205020404" pitchFamily="49" charset="0"/>
+              </a:rPr>
+              <a:t>(units) …</a:t>
+            </a:r>
+          </a:p>
+          <a:p>
+            <a:r>
+              <a:rPr lang="en-US" dirty="0"/>
+              <a:t>Python</a:t>
+            </a:r>
+          </a:p>
+          <a:p>
+            <a:pPr marL="0" indent="0">
+              <a:buNone/>
+            </a:pPr>
+            <a:r>
+              <a:rPr lang="en-US" dirty="0">
+                <a:latin typeface="Courier New" panose="02070309020205020404" pitchFamily="49" charset="0"/>
+                <a:cs typeface="Courier New" panose="02070309020205020404" pitchFamily="49" charset="0"/>
+              </a:rPr>
+              <a:t>import </a:t>
+            </a:r>
+            <a:r>
+              <a:rPr lang="en-US" dirty="0" err="1">
+                <a:latin typeface="Courier New" panose="02070309020205020404" pitchFamily="49" charset="0"/>
+                <a:cs typeface="Courier New" panose="02070309020205020404" pitchFamily="49" charset="0"/>
+              </a:rPr>
+              <a:t>keras.models</a:t>
+            </a:r>
+            <a:endParaRPr lang="en-US" dirty="0">
+              <a:latin typeface="Courier New" panose="02070309020205020404" pitchFamily="49" charset="0"/>
+              <a:cs typeface="Courier New" panose="02070309020205020404" pitchFamily="49" charset="0"/>
+            </a:endParaRPr>
+          </a:p>
+          <a:p>
+            <a:pPr marL="0" indent="0">
+              <a:buNone/>
+            </a:pPr>
+            <a:r>
+              <a:rPr lang="en-US" dirty="0">
+                <a:latin typeface="Courier New" panose="02070309020205020404" pitchFamily="49" charset="0"/>
+                <a:cs typeface="Courier New" panose="02070309020205020404" pitchFamily="49" charset="0"/>
+              </a:rPr>
+              <a:t>model = </a:t>
+            </a:r>
+            <a:r>
+              <a:rPr lang="en-US" dirty="0" err="1">
+                <a:latin typeface="Courier New" panose="02070309020205020404" pitchFamily="49" charset="0"/>
+                <a:cs typeface="Courier New" panose="02070309020205020404" pitchFamily="49" charset="0"/>
+              </a:rPr>
+              <a:t>models.Sequential</a:t>
+            </a:r>
+            <a:r>
+              <a:rPr lang="en-US" dirty="0">
+                <a:latin typeface="Courier New" panose="02070309020205020404" pitchFamily="49" charset="0"/>
+                <a:cs typeface="Courier New" panose="02070309020205020404" pitchFamily="49" charset="0"/>
+              </a:rPr>
+              <a:t>([</a:t>
+            </a:r>
+          </a:p>
+          <a:p>
+            <a:pPr marL="0" indent="0">
+              <a:buNone/>
+            </a:pPr>
+            <a:r>
+              <a:rPr lang="en-US" dirty="0">
+                <a:latin typeface="Courier New" panose="02070309020205020404" pitchFamily="49" charset="0"/>
+                <a:cs typeface="Courier New" panose="02070309020205020404" pitchFamily="49" charset="0"/>
+              </a:rPr>
+              <a:t>    </a:t>
+            </a:r>
+            <a:r>
+              <a:rPr lang="en-US" dirty="0" err="1">
+                <a:latin typeface="Courier New" panose="02070309020205020404" pitchFamily="49" charset="0"/>
+                <a:cs typeface="Courier New" panose="02070309020205020404" pitchFamily="49" charset="0"/>
+              </a:rPr>
+              <a:t>SimpleRNN</a:t>
+            </a:r>
+            <a:r>
+              <a:rPr lang="en-US" dirty="0">
+                <a:latin typeface="Courier New" panose="02070309020205020404" pitchFamily="49" charset="0"/>
+                <a:cs typeface="Courier New" panose="02070309020205020404" pitchFamily="49" charset="0"/>
+              </a:rPr>
+              <a:t>(units) …</a:t>
+            </a:r>
+          </a:p>
+          <a:p>
+            <a:pPr marL="0" indent="0">
+              <a:buNone/>
+            </a:pPr>
+            <a:r>
+              <a:rPr lang="en-US" dirty="0">
+                <a:latin typeface="Courier New" panose="02070309020205020404" pitchFamily="49" charset="0"/>
+                <a:cs typeface="Courier New" panose="02070309020205020404" pitchFamily="49" charset="0"/>
+              </a:rPr>
+              <a:t>])</a:t>
+            </a:r>
           </a:p>
         </p:txBody>
       </p:sp>
@@ -17363,7 +17509,7 @@
           <a:p>
             <a:r>
               <a:rPr lang="en-US" dirty="0"/>
-              <a:t>AN RNN MODEL</a:t>
+              <a:t>AN RNN MODEL: SAME DATA</a:t>
             </a:r>
           </a:p>
         </p:txBody>
@@ -17511,26 +17657,7 @@
           <a:p>
             <a:r>
               <a:rPr lang="en-US" dirty="0"/>
-              <a:t>Mean Relative Error: 7.4%</a:t>
-            </a:r>
-          </a:p>
-          <a:p>
-            <a:r>
-              <a:rPr lang="en-US" dirty="0"/>
-              <a:t>Very interested in cycles</a:t>
-            </a:r>
-          </a:p>
-          <a:p>
-            <a:r>
-              <a:rPr lang="en-US" dirty="0"/>
-              <a:t>Not bad, but slightly worse than ARIMA</a:t>
-            </a:r>
-          </a:p>
-          <a:p>
-            <a:pPr lvl="1"/>
-            <a:r>
-              <a:rPr lang="en-US" dirty="0"/>
-              <a:t>Much faster, though</a:t>
+              <a:t>Just not enough data!</a:t>
             </a:r>
           </a:p>
         </p:txBody>
@@ -17596,10 +17723,10 @@
       </p:grpSpPr>
       <p:sp>
         <p:nvSpPr>
-          <p:cNvPr id="7" name="Title 6">
-            <a:extLst>
-              <a:ext uri="{FF2B5EF4-FFF2-40B4-BE49-F238E27FC236}">
-                <a16:creationId xmlns:a16="http://schemas.microsoft.com/office/drawing/2014/main" id="{75C0DCD3-95F8-4E1F-BF1A-5FAAB84A40A3}"/>
+          <p:cNvPr id="2" name="Title 1">
+            <a:extLst>
+              <a:ext uri="{FF2B5EF4-FFF2-40B4-BE49-F238E27FC236}">
+                <a16:creationId xmlns:a16="http://schemas.microsoft.com/office/drawing/2014/main" id="{D1BF0482-6913-4A5E-A533-479864CB5349}"/>
               </a:ext>
             </a:extLst>
           </p:cNvPr>
@@ -17617,91 +17744,8 @@
           <a:p>
             <a:r>
               <a:rPr lang="en-US" dirty="0"/>
-              <a:t>BUILDING AN LSTM MODEL</a:t>
-            </a:r>
-          </a:p>
-        </p:txBody>
-      </p:sp>
-      <p:sp>
-        <p:nvSpPr>
-          <p:cNvPr id="8" name="Content Placeholder 7">
-            <a:extLst>
-              <a:ext uri="{FF2B5EF4-FFF2-40B4-BE49-F238E27FC236}">
-                <a16:creationId xmlns:a16="http://schemas.microsoft.com/office/drawing/2014/main" id="{52BB1FAB-BB61-4B66-A4EA-A0EABC2B3ECA}"/>
-              </a:ext>
-            </a:extLst>
-          </p:cNvPr>
-          <p:cNvSpPr>
-            <a:spLocks noGrp="1"/>
-          </p:cNvSpPr>
-          <p:nvPr>
-            <p:ph idx="1"/>
-          </p:nvPr>
-        </p:nvSpPr>
-        <p:spPr/>
-        <p:txBody>
-          <a:bodyPr/>
-          <a:lstStyle/>
-          <a:p>
-            <a:r>
-              <a:rPr lang="en-US" dirty="0"/>
-              <a:t>R</a:t>
-            </a:r>
-          </a:p>
-          <a:p>
-            <a:pPr marL="0" indent="0">
-              <a:buNone/>
-            </a:pPr>
-            <a:r>
-              <a:rPr lang="en-US" dirty="0">
-                <a:latin typeface="Courier New" panose="02070309020205020404" pitchFamily="49" charset="0"/>
-                <a:cs typeface="Courier New" panose="02070309020205020404" pitchFamily="49" charset="0"/>
-              </a:rPr>
-              <a:t>library(</a:t>
-            </a:r>
-            <a:r>
-              <a:rPr lang="en-US" dirty="0" err="1">
-                <a:latin typeface="Courier New" panose="02070309020205020404" pitchFamily="49" charset="0"/>
-                <a:cs typeface="Courier New" panose="02070309020205020404" pitchFamily="49" charset="0"/>
-              </a:rPr>
-              <a:t>keras</a:t>
-            </a:r>
-            <a:r>
-              <a:rPr lang="en-US" dirty="0">
-                <a:latin typeface="Courier New" panose="02070309020205020404" pitchFamily="49" charset="0"/>
-                <a:cs typeface="Courier New" panose="02070309020205020404" pitchFamily="49" charset="0"/>
-              </a:rPr>
-              <a:t>)</a:t>
-            </a:r>
-          </a:p>
-          <a:p>
-            <a:r>
-              <a:rPr lang="en-US" dirty="0"/>
-              <a:t>Python</a:t>
-            </a:r>
-          </a:p>
-          <a:p>
-            <a:pPr marL="0" indent="0">
-              <a:buNone/>
-            </a:pPr>
-            <a:r>
-              <a:rPr lang="en-US" dirty="0">
-                <a:latin typeface="Courier New" panose="02070309020205020404" pitchFamily="49" charset="0"/>
-                <a:cs typeface="Courier New" panose="02070309020205020404" pitchFamily="49" charset="0"/>
-              </a:rPr>
-              <a:t>import </a:t>
-            </a:r>
-            <a:r>
-              <a:rPr lang="en-US" dirty="0" err="1">
-                <a:latin typeface="Courier New" panose="02070309020205020404" pitchFamily="49" charset="0"/>
-                <a:cs typeface="Courier New" panose="02070309020205020404" pitchFamily="49" charset="0"/>
-              </a:rPr>
-              <a:t>keras</a:t>
-            </a:r>
-            <a:endParaRPr lang="en-US" dirty="0">
-              <a:latin typeface="Courier New" panose="02070309020205020404" pitchFamily="49" charset="0"/>
-              <a:cs typeface="Courier New" panose="02070309020205020404" pitchFamily="49" charset="0"/>
-            </a:endParaRPr>
+              <a:t>AN RNN MODEL: USING ALL DATA</a:t>
+            </a:r>
           </a:p>
         </p:txBody>
       </p:sp>
@@ -17710,7 +17754,7 @@
           <p:cNvPr id="4" name="Date Placeholder 3">
             <a:extLst>
               <a:ext uri="{FF2B5EF4-FFF2-40B4-BE49-F238E27FC236}">
-                <a16:creationId xmlns:a16="http://schemas.microsoft.com/office/drawing/2014/main" id="{02256D86-7CE0-416E-B2A3-402D20EE9E90}"/>
+                <a16:creationId xmlns:a16="http://schemas.microsoft.com/office/drawing/2014/main" id="{B23DAF35-209C-48FA-AAAB-F69E14183A91}"/>
               </a:ext>
             </a:extLst>
           </p:cNvPr>
@@ -17726,7 +17770,7 @@
           <a:bodyPr/>
           <a:lstStyle/>
           <a:p>
-            <a:fld id="{B08FEED8-D7D4-44E9-BFBC-ED06B5996D94}" type="datetime4">
+            <a:fld id="{8AAE40A0-A7D8-4DC3-BC9E-BADA32DA2004}" type="datetime4">
               <a:rPr lang="en-US" smtClean="0"/>
               <a:t>July 30, 2019</a:t>
             </a:fld>
@@ -17739,7 +17783,7 @@
           <p:cNvPr id="5" name="Footer Placeholder 4">
             <a:extLst>
               <a:ext uri="{FF2B5EF4-FFF2-40B4-BE49-F238E27FC236}">
-                <a16:creationId xmlns:a16="http://schemas.microsoft.com/office/drawing/2014/main" id="{1D4ED112-7CF4-4BB9-B46E-B366A5054A9A}"/>
+                <a16:creationId xmlns:a16="http://schemas.microsoft.com/office/drawing/2014/main" id="{3D8E22A6-180D-41CF-9959-4347A11F2AD1}"/>
               </a:ext>
             </a:extLst>
           </p:cNvPr>
@@ -17796,7 +17840,7 @@
           <p:cNvPr id="6" name="Slide Number Placeholder 5">
             <a:extLst>
               <a:ext uri="{FF2B5EF4-FFF2-40B4-BE49-F238E27FC236}">
-                <a16:creationId xmlns:a16="http://schemas.microsoft.com/office/drawing/2014/main" id="{8CC75551-85BF-4C9F-8893-AA28ECA8A6B5}"/>
+                <a16:creationId xmlns:a16="http://schemas.microsoft.com/office/drawing/2014/main" id="{CECE3146-0C2B-4CC7-BC7C-FD23AAF7ECAE}"/>
               </a:ext>
             </a:extLst>
           </p:cNvPr>
@@ -17820,10 +17864,93 @@
           </a:p>
         </p:txBody>
       </p:sp>
+      <p:sp>
+        <p:nvSpPr>
+          <p:cNvPr id="8" name="Content Placeholder 7">
+            <a:extLst>
+              <a:ext uri="{FF2B5EF4-FFF2-40B4-BE49-F238E27FC236}">
+                <a16:creationId xmlns:a16="http://schemas.microsoft.com/office/drawing/2014/main" id="{30C259F3-048F-4C4B-AC8C-24699B6ABD42}"/>
+              </a:ext>
+            </a:extLst>
+          </p:cNvPr>
+          <p:cNvSpPr>
+            <a:spLocks noGrp="1"/>
+          </p:cNvSpPr>
+          <p:nvPr>
+            <p:ph idx="1"/>
+          </p:nvPr>
+        </p:nvSpPr>
+        <p:spPr>
+          <a:xfrm>
+            <a:off x="838200" y="1825625"/>
+            <a:ext cx="5257800" cy="4351338"/>
+          </a:xfrm>
+        </p:spPr>
+        <p:txBody>
+          <a:bodyPr/>
+          <a:lstStyle/>
+          <a:p>
+            <a:r>
+              <a:rPr lang="en-US" dirty="0"/>
+              <a:t>Each minute from January 1</a:t>
+            </a:r>
+            <a:r>
+              <a:rPr lang="en-US" baseline="30000" dirty="0"/>
+              <a:t>st</a:t>
+            </a:r>
+            <a:r>
+              <a:rPr lang="en-US" dirty="0"/>
+              <a:t> to May 31</a:t>
+            </a:r>
+            <a:r>
+              <a:rPr lang="en-US" baseline="30000" dirty="0"/>
+              <a:t>st</a:t>
+            </a:r>
+          </a:p>
+          <a:p>
+            <a:r>
+              <a:rPr lang="en-US" dirty="0"/>
+              <a:t>Mean Relative Error:</a:t>
+            </a:r>
+          </a:p>
+          <a:p>
+            <a:endParaRPr lang="en-US" dirty="0"/>
+          </a:p>
+        </p:txBody>
+      </p:sp>
+      <p:pic>
+        <p:nvPicPr>
+          <p:cNvPr id="10" name="Picture 9">
+            <a:extLst>
+              <a:ext uri="{FF2B5EF4-FFF2-40B4-BE49-F238E27FC236}">
+                <a16:creationId xmlns:a16="http://schemas.microsoft.com/office/drawing/2014/main" id="{64B67945-AF39-4BB8-86D4-3E74D0B6AE5C}"/>
+              </a:ext>
+            </a:extLst>
+          </p:cNvPr>
+          <p:cNvPicPr>
+            <a:picLocks noChangeAspect="1"/>
+          </p:cNvPicPr>
+          <p:nvPr/>
+        </p:nvPicPr>
+        <p:blipFill>
+          <a:blip r:embed="rId2"/>
+          <a:srcRect/>
+          <a:stretch/>
+        </p:blipFill>
+        <p:spPr>
+          <a:xfrm>
+            <a:off x="6096000" y="2096028"/>
+            <a:ext cx="5715798" cy="3810532"/>
+          </a:xfrm>
+          <a:prstGeom prst="rect">
+            <a:avLst/>
+          </a:prstGeom>
+        </p:spPr>
+      </p:pic>
     </p:spTree>
     <p:extLst>
       <p:ext uri="{BB962C8B-B14F-4D97-AF65-F5344CB8AC3E}">
-        <p14:creationId xmlns:p14="http://schemas.microsoft.com/office/powerpoint/2010/main" val="3436625262"/>
+        <p14:creationId xmlns:p14="http://schemas.microsoft.com/office/powerpoint/2010/main" val="219047416"/>
       </p:ext>
     </p:extLst>
   </p:cSld>
@@ -17852,10 +17979,10 @@
       </p:grpSpPr>
       <p:sp>
         <p:nvSpPr>
-          <p:cNvPr id="2" name="Title 1">
-            <a:extLst>
-              <a:ext uri="{FF2B5EF4-FFF2-40B4-BE49-F238E27FC236}">
-                <a16:creationId xmlns:a16="http://schemas.microsoft.com/office/drawing/2014/main" id="{D1BF0482-6913-4A5E-A533-479864CB5349}"/>
+          <p:cNvPr id="7" name="Title 6">
+            <a:extLst>
+              <a:ext uri="{FF2B5EF4-FFF2-40B4-BE49-F238E27FC236}">
+                <a16:creationId xmlns:a16="http://schemas.microsoft.com/office/drawing/2014/main" id="{75C0DCD3-95F8-4E1F-BF1A-5FAAB84A40A3}"/>
               </a:ext>
             </a:extLst>
           </p:cNvPr>
@@ -17873,7 +18000,187 @@
           <a:p>
             <a:r>
               <a:rPr lang="en-US" dirty="0"/>
-              <a:t>AN LSTM MODEL</a:t>
+              <a:t>BUILDING AN LSTM MODEL</a:t>
+            </a:r>
+          </a:p>
+        </p:txBody>
+      </p:sp>
+      <p:sp>
+        <p:nvSpPr>
+          <p:cNvPr id="8" name="Content Placeholder 7">
+            <a:extLst>
+              <a:ext uri="{FF2B5EF4-FFF2-40B4-BE49-F238E27FC236}">
+                <a16:creationId xmlns:a16="http://schemas.microsoft.com/office/drawing/2014/main" id="{52BB1FAB-BB61-4B66-A4EA-A0EABC2B3ECA}"/>
+              </a:ext>
+            </a:extLst>
+          </p:cNvPr>
+          <p:cNvSpPr>
+            <a:spLocks noGrp="1"/>
+          </p:cNvSpPr>
+          <p:nvPr>
+            <p:ph idx="1"/>
+          </p:nvPr>
+        </p:nvSpPr>
+        <p:spPr/>
+        <p:txBody>
+          <a:bodyPr>
+            <a:normAutofit lnSpcReduction="10000"/>
+          </a:bodyPr>
+          <a:lstStyle/>
+          <a:p>
+            <a:r>
+              <a:rPr lang="en-US" dirty="0"/>
+              <a:t>R</a:t>
+            </a:r>
+          </a:p>
+          <a:p>
+            <a:pPr marL="0" indent="0">
+              <a:buNone/>
+            </a:pPr>
+            <a:r>
+              <a:rPr lang="en-US" dirty="0">
+                <a:latin typeface="Courier New" panose="02070309020205020404" pitchFamily="49" charset="0"/>
+                <a:cs typeface="Courier New" panose="02070309020205020404" pitchFamily="49" charset="0"/>
+              </a:rPr>
+              <a:t>library(</a:t>
+            </a:r>
+            <a:r>
+              <a:rPr lang="en-US" dirty="0" err="1">
+                <a:latin typeface="Courier New" panose="02070309020205020404" pitchFamily="49" charset="0"/>
+                <a:cs typeface="Courier New" panose="02070309020205020404" pitchFamily="49" charset="0"/>
+              </a:rPr>
+              <a:t>keras</a:t>
+            </a:r>
+            <a:r>
+              <a:rPr lang="en-US" dirty="0">
+                <a:latin typeface="Courier New" panose="02070309020205020404" pitchFamily="49" charset="0"/>
+                <a:cs typeface="Courier New" panose="02070309020205020404" pitchFamily="49" charset="0"/>
+              </a:rPr>
+              <a:t>)</a:t>
+            </a:r>
+          </a:p>
+          <a:p>
+            <a:pPr marL="0" indent="0">
+              <a:buNone/>
+            </a:pPr>
+            <a:r>
+              <a:rPr lang="en-US" dirty="0" err="1">
+                <a:latin typeface="Courier New" panose="02070309020205020404" pitchFamily="49" charset="0"/>
+                <a:cs typeface="Courier New" panose="02070309020205020404" pitchFamily="49" charset="0"/>
+              </a:rPr>
+              <a:t>keras_model_sequential</a:t>
+            </a:r>
+            <a:r>
+              <a:rPr lang="en-US" dirty="0">
+                <a:latin typeface="Courier New" panose="02070309020205020404" pitchFamily="49" charset="0"/>
+                <a:cs typeface="Courier New" panose="02070309020205020404" pitchFamily="49" charset="0"/>
+              </a:rPr>
+              <a:t>() %&gt;%</a:t>
+            </a:r>
+          </a:p>
+          <a:p>
+            <a:pPr marL="0" indent="0">
+              <a:buNone/>
+            </a:pPr>
+            <a:r>
+              <a:rPr lang="en-US" dirty="0">
+                <a:latin typeface="Courier New" panose="02070309020205020404" pitchFamily="49" charset="0"/>
+                <a:cs typeface="Courier New" panose="02070309020205020404" pitchFamily="49" charset="0"/>
+              </a:rPr>
+              <a:t>    </a:t>
+            </a:r>
+            <a:r>
+              <a:rPr lang="en-US" dirty="0" err="1">
+                <a:latin typeface="Courier New" panose="02070309020205020404" pitchFamily="49" charset="0"/>
+                <a:cs typeface="Courier New" panose="02070309020205020404" pitchFamily="49" charset="0"/>
+              </a:rPr>
+              <a:t>layer_lstm</a:t>
+            </a:r>
+            <a:r>
+              <a:rPr lang="en-US" dirty="0">
+                <a:latin typeface="Courier New" panose="02070309020205020404" pitchFamily="49" charset="0"/>
+                <a:cs typeface="Courier New" panose="02070309020205020404" pitchFamily="49" charset="0"/>
+              </a:rPr>
+              <a:t>(units) …</a:t>
+            </a:r>
+          </a:p>
+          <a:p>
+            <a:r>
+              <a:rPr lang="en-US" dirty="0"/>
+              <a:t>Python</a:t>
+            </a:r>
+          </a:p>
+          <a:p>
+            <a:pPr marL="0" indent="0">
+              <a:buNone/>
+            </a:pPr>
+            <a:r>
+              <a:rPr lang="en-US" dirty="0">
+                <a:latin typeface="Courier New" panose="02070309020205020404" pitchFamily="49" charset="0"/>
+                <a:cs typeface="Courier New" panose="02070309020205020404" pitchFamily="49" charset="0"/>
+              </a:rPr>
+              <a:t>import </a:t>
+            </a:r>
+            <a:r>
+              <a:rPr lang="en-US" dirty="0" err="1">
+                <a:latin typeface="Courier New" panose="02070309020205020404" pitchFamily="49" charset="0"/>
+                <a:cs typeface="Courier New" panose="02070309020205020404" pitchFamily="49" charset="0"/>
+              </a:rPr>
+              <a:t>keras.models</a:t>
+            </a:r>
+            <a:endParaRPr lang="en-US" dirty="0">
+              <a:latin typeface="Courier New" panose="02070309020205020404" pitchFamily="49" charset="0"/>
+              <a:cs typeface="Courier New" panose="02070309020205020404" pitchFamily="49" charset="0"/>
+            </a:endParaRPr>
+          </a:p>
+          <a:p>
+            <a:pPr marL="0" indent="0">
+              <a:buNone/>
+            </a:pPr>
+            <a:r>
+              <a:rPr lang="en-US" dirty="0">
+                <a:latin typeface="Courier New" panose="02070309020205020404" pitchFamily="49" charset="0"/>
+                <a:cs typeface="Courier New" panose="02070309020205020404" pitchFamily="49" charset="0"/>
+              </a:rPr>
+              <a:t>model = </a:t>
+            </a:r>
+            <a:r>
+              <a:rPr lang="en-US" dirty="0" err="1">
+                <a:latin typeface="Courier New" panose="02070309020205020404" pitchFamily="49" charset="0"/>
+                <a:cs typeface="Courier New" panose="02070309020205020404" pitchFamily="49" charset="0"/>
+              </a:rPr>
+              <a:t>models.Sequential</a:t>
+            </a:r>
+            <a:r>
+              <a:rPr lang="en-US" dirty="0">
+                <a:latin typeface="Courier New" panose="02070309020205020404" pitchFamily="49" charset="0"/>
+                <a:cs typeface="Courier New" panose="02070309020205020404" pitchFamily="49" charset="0"/>
+              </a:rPr>
+              <a:t>([</a:t>
+            </a:r>
+          </a:p>
+          <a:p>
+            <a:pPr marL="0" indent="0">
+              <a:buNone/>
+            </a:pPr>
+            <a:r>
+              <a:rPr lang="en-US" dirty="0">
+                <a:latin typeface="Courier New" panose="02070309020205020404" pitchFamily="49" charset="0"/>
+                <a:cs typeface="Courier New" panose="02070309020205020404" pitchFamily="49" charset="0"/>
+              </a:rPr>
+              <a:t>    LSTM(units) …</a:t>
+            </a:r>
+          </a:p>
+          <a:p>
+            <a:pPr marL="0" indent="0">
+              <a:buNone/>
+            </a:pPr>
+            <a:r>
+              <a:rPr lang="en-US" dirty="0">
+                <a:latin typeface="Courier New" panose="02070309020205020404" pitchFamily="49" charset="0"/>
+                <a:cs typeface="Courier New" panose="02070309020205020404" pitchFamily="49" charset="0"/>
+              </a:rPr>
+              <a:t>])</a:t>
             </a:r>
           </a:p>
         </p:txBody>
@@ -17883,7 +18190,7 @@
           <p:cNvPr id="4" name="Date Placeholder 3">
             <a:extLst>
               <a:ext uri="{FF2B5EF4-FFF2-40B4-BE49-F238E27FC236}">
-                <a16:creationId xmlns:a16="http://schemas.microsoft.com/office/drawing/2014/main" id="{B23DAF35-209C-48FA-AAAB-F69E14183A91}"/>
+                <a16:creationId xmlns:a16="http://schemas.microsoft.com/office/drawing/2014/main" id="{02256D86-7CE0-416E-B2A3-402D20EE9E90}"/>
               </a:ext>
             </a:extLst>
           </p:cNvPr>
@@ -17899,7 +18206,7 @@
           <a:bodyPr/>
           <a:lstStyle/>
           <a:p>
-            <a:fld id="{8AAE40A0-A7D8-4DC3-BC9E-BADA32DA2004}" type="datetime4">
+            <a:fld id="{B08FEED8-D7D4-44E9-BFBC-ED06B5996D94}" type="datetime4">
               <a:rPr lang="en-US" smtClean="0"/>
               <a:t>July 30, 2019</a:t>
             </a:fld>
@@ -17912,7 +18219,7 @@
           <p:cNvPr id="5" name="Footer Placeholder 4">
             <a:extLst>
               <a:ext uri="{FF2B5EF4-FFF2-40B4-BE49-F238E27FC236}">
-                <a16:creationId xmlns:a16="http://schemas.microsoft.com/office/drawing/2014/main" id="{3D8E22A6-180D-41CF-9959-4347A11F2AD1}"/>
+                <a16:creationId xmlns:a16="http://schemas.microsoft.com/office/drawing/2014/main" id="{1D4ED112-7CF4-4BB9-B46E-B366A5054A9A}"/>
               </a:ext>
             </a:extLst>
           </p:cNvPr>
@@ -17969,7 +18276,7 @@
           <p:cNvPr id="6" name="Slide Number Placeholder 5">
             <a:extLst>
               <a:ext uri="{FF2B5EF4-FFF2-40B4-BE49-F238E27FC236}">
-                <a16:creationId xmlns:a16="http://schemas.microsoft.com/office/drawing/2014/main" id="{CECE3146-0C2B-4CC7-BC7C-FD23AAF7ECAE}"/>
+                <a16:creationId xmlns:a16="http://schemas.microsoft.com/office/drawing/2014/main" id="{8CC75551-85BF-4C9F-8893-AA28ECA8A6B5}"/>
               </a:ext>
             </a:extLst>
           </p:cNvPr>
@@ -17993,91 +18300,10 @@
           </a:p>
         </p:txBody>
       </p:sp>
-      <p:sp>
-        <p:nvSpPr>
-          <p:cNvPr id="8" name="Content Placeholder 7">
-            <a:extLst>
-              <a:ext uri="{FF2B5EF4-FFF2-40B4-BE49-F238E27FC236}">
-                <a16:creationId xmlns:a16="http://schemas.microsoft.com/office/drawing/2014/main" id="{30C259F3-048F-4C4B-AC8C-24699B6ABD42}"/>
-              </a:ext>
-            </a:extLst>
-          </p:cNvPr>
-          <p:cNvSpPr>
-            <a:spLocks noGrp="1"/>
-          </p:cNvSpPr>
-          <p:nvPr>
-            <p:ph idx="1"/>
-          </p:nvPr>
-        </p:nvSpPr>
-        <p:spPr>
-          <a:xfrm>
-            <a:off x="838200" y="1825625"/>
-            <a:ext cx="5257800" cy="4351338"/>
-          </a:xfrm>
-        </p:spPr>
-        <p:txBody>
-          <a:bodyPr/>
-          <a:lstStyle/>
-          <a:p>
-            <a:r>
-              <a:rPr lang="en-US" dirty="0"/>
-              <a:t>Mean Relative Error: 7.4%</a:t>
-            </a:r>
-          </a:p>
-          <a:p>
-            <a:r>
-              <a:rPr lang="en-US" dirty="0"/>
-              <a:t>Very interested in cycles</a:t>
-            </a:r>
-          </a:p>
-          <a:p>
-            <a:r>
-              <a:rPr lang="en-US" dirty="0"/>
-              <a:t>Not bad, but slightly worse than ARIMA</a:t>
-            </a:r>
-          </a:p>
-          <a:p>
-            <a:pPr lvl="1"/>
-            <a:r>
-              <a:rPr lang="en-US" dirty="0"/>
-              <a:t>Much faster, though</a:t>
-            </a:r>
-          </a:p>
-        </p:txBody>
-      </p:sp>
-      <p:pic>
-        <p:nvPicPr>
-          <p:cNvPr id="10" name="Picture 9">
-            <a:extLst>
-              <a:ext uri="{FF2B5EF4-FFF2-40B4-BE49-F238E27FC236}">
-                <a16:creationId xmlns:a16="http://schemas.microsoft.com/office/drawing/2014/main" id="{64B67945-AF39-4BB8-86D4-3E74D0B6AE5C}"/>
-              </a:ext>
-            </a:extLst>
-          </p:cNvPr>
-          <p:cNvPicPr>
-            <a:picLocks noChangeAspect="1"/>
-          </p:cNvPicPr>
-          <p:nvPr/>
-        </p:nvPicPr>
-        <p:blipFill>
-          <a:blip r:embed="rId2"/>
-          <a:srcRect/>
-          <a:stretch/>
-        </p:blipFill>
-        <p:spPr>
-          <a:xfrm>
-            <a:off x="6096000" y="2096028"/>
-            <a:ext cx="5715798" cy="3810532"/>
-          </a:xfrm>
-          <a:prstGeom prst="rect">
-            <a:avLst/>
-          </a:prstGeom>
-        </p:spPr>
-      </p:pic>
     </p:spTree>
     <p:extLst>
       <p:ext uri="{BB962C8B-B14F-4D97-AF65-F5344CB8AC3E}">
-        <p14:creationId xmlns:p14="http://schemas.microsoft.com/office/powerpoint/2010/main" val="3102886213"/>
+        <p14:creationId xmlns:p14="http://schemas.microsoft.com/office/powerpoint/2010/main" val="3436625262"/>
       </p:ext>
     </p:extLst>
   </p:cSld>
@@ -18106,10 +18332,10 @@
       </p:grpSpPr>
       <p:sp>
         <p:nvSpPr>
-          <p:cNvPr id="7" name="Title 6">
-            <a:extLst>
-              <a:ext uri="{FF2B5EF4-FFF2-40B4-BE49-F238E27FC236}">
-                <a16:creationId xmlns:a16="http://schemas.microsoft.com/office/drawing/2014/main" id="{104472AF-9F8F-4DDB-87F2-C7E7CE4538C8}"/>
+          <p:cNvPr id="2" name="Title 1">
+            <a:extLst>
+              <a:ext uri="{FF2B5EF4-FFF2-40B4-BE49-F238E27FC236}">
+                <a16:creationId xmlns:a16="http://schemas.microsoft.com/office/drawing/2014/main" id="{D1BF0482-6913-4A5E-A533-479864CB5349}"/>
               </a:ext>
             </a:extLst>
           </p:cNvPr>
@@ -18127,42 +18353,7 @@
           <a:p>
             <a:r>
               <a:rPr lang="en-US" dirty="0"/>
-              <a:t>COMPARISON AND</a:t>
-            </a:r>
-            <a:br>
-              <a:rPr lang="en-US" dirty="0"/>
-            </a:br>
-            <a:r>
-              <a:rPr lang="en-US" dirty="0"/>
-              <a:t>SUMMARY</a:t>
-            </a:r>
-          </a:p>
-        </p:txBody>
-      </p:sp>
-      <p:sp>
-        <p:nvSpPr>
-          <p:cNvPr id="8" name="Text Placeholder 7">
-            <a:extLst>
-              <a:ext uri="{FF2B5EF4-FFF2-40B4-BE49-F238E27FC236}">
-                <a16:creationId xmlns:a16="http://schemas.microsoft.com/office/drawing/2014/main" id="{DD688F21-A860-408B-AB59-DE6ECA0510A7}"/>
-              </a:ext>
-            </a:extLst>
-          </p:cNvPr>
-          <p:cNvSpPr>
-            <a:spLocks noGrp="1"/>
-          </p:cNvSpPr>
-          <p:nvPr>
-            <p:ph type="body" idx="1"/>
-          </p:nvPr>
-        </p:nvSpPr>
-        <p:spPr/>
-        <p:txBody>
-          <a:bodyPr/>
-          <a:lstStyle/>
-          <a:p>
-            <a:r>
-              <a:rPr lang="en-US" dirty="0"/>
-              <a:t>A look back at our models</a:t>
+              <a:t>AN LSTM MODEL: SAME DATA</a:t>
             </a:r>
           </a:p>
         </p:txBody>
@@ -18172,7 +18363,7 @@
           <p:cNvPr id="4" name="Date Placeholder 3">
             <a:extLst>
               <a:ext uri="{FF2B5EF4-FFF2-40B4-BE49-F238E27FC236}">
-                <a16:creationId xmlns:a16="http://schemas.microsoft.com/office/drawing/2014/main" id="{2BDFDE93-390C-49C9-82C5-E17C875CFB35}"/>
+                <a16:creationId xmlns:a16="http://schemas.microsoft.com/office/drawing/2014/main" id="{B23DAF35-209C-48FA-AAAB-F69E14183A91}"/>
               </a:ext>
             </a:extLst>
           </p:cNvPr>
@@ -18201,7 +18392,7 @@
           <p:cNvPr id="5" name="Footer Placeholder 4">
             <a:extLst>
               <a:ext uri="{FF2B5EF4-FFF2-40B4-BE49-F238E27FC236}">
-                <a16:creationId xmlns:a16="http://schemas.microsoft.com/office/drawing/2014/main" id="{112AF0ED-0352-4AB1-9F1D-E1A89A11AE24}"/>
+                <a16:creationId xmlns:a16="http://schemas.microsoft.com/office/drawing/2014/main" id="{3D8E22A6-180D-41CF-9959-4347A11F2AD1}"/>
               </a:ext>
             </a:extLst>
           </p:cNvPr>
@@ -18258,7 +18449,7 @@
           <p:cNvPr id="6" name="Slide Number Placeholder 5">
             <a:extLst>
               <a:ext uri="{FF2B5EF4-FFF2-40B4-BE49-F238E27FC236}">
-                <a16:creationId xmlns:a16="http://schemas.microsoft.com/office/drawing/2014/main" id="{6089B17D-061B-423C-94B0-38D32F83111F}"/>
+                <a16:creationId xmlns:a16="http://schemas.microsoft.com/office/drawing/2014/main" id="{CECE3146-0C2B-4CC7-BC7C-FD23AAF7ECAE}"/>
               </a:ext>
             </a:extLst>
           </p:cNvPr>
@@ -18282,10 +18473,72 @@
           </a:p>
         </p:txBody>
       </p:sp>
+      <p:sp>
+        <p:nvSpPr>
+          <p:cNvPr id="8" name="Content Placeholder 7">
+            <a:extLst>
+              <a:ext uri="{FF2B5EF4-FFF2-40B4-BE49-F238E27FC236}">
+                <a16:creationId xmlns:a16="http://schemas.microsoft.com/office/drawing/2014/main" id="{30C259F3-048F-4C4B-AC8C-24699B6ABD42}"/>
+              </a:ext>
+            </a:extLst>
+          </p:cNvPr>
+          <p:cNvSpPr>
+            <a:spLocks noGrp="1"/>
+          </p:cNvSpPr>
+          <p:nvPr>
+            <p:ph idx="1"/>
+          </p:nvPr>
+        </p:nvSpPr>
+        <p:spPr>
+          <a:xfrm>
+            <a:off x="838200" y="1825625"/>
+            <a:ext cx="5257800" cy="4351338"/>
+          </a:xfrm>
+        </p:spPr>
+        <p:txBody>
+          <a:bodyPr/>
+          <a:lstStyle/>
+          <a:p>
+            <a:r>
+              <a:rPr lang="en-US" dirty="0"/>
+              <a:t>Just not enough data!</a:t>
+            </a:r>
+          </a:p>
+        </p:txBody>
+      </p:sp>
+      <p:pic>
+        <p:nvPicPr>
+          <p:cNvPr id="10" name="Picture 9">
+            <a:extLst>
+              <a:ext uri="{FF2B5EF4-FFF2-40B4-BE49-F238E27FC236}">
+                <a16:creationId xmlns:a16="http://schemas.microsoft.com/office/drawing/2014/main" id="{64B67945-AF39-4BB8-86D4-3E74D0B6AE5C}"/>
+              </a:ext>
+            </a:extLst>
+          </p:cNvPr>
+          <p:cNvPicPr>
+            <a:picLocks noChangeAspect="1"/>
+          </p:cNvPicPr>
+          <p:nvPr/>
+        </p:nvPicPr>
+        <p:blipFill>
+          <a:blip r:embed="rId2"/>
+          <a:srcRect/>
+          <a:stretch/>
+        </p:blipFill>
+        <p:spPr>
+          <a:xfrm>
+            <a:off x="6096000" y="2096028"/>
+            <a:ext cx="5715798" cy="3810532"/>
+          </a:xfrm>
+          <a:prstGeom prst="rect">
+            <a:avLst/>
+          </a:prstGeom>
+        </p:spPr>
+      </p:pic>
     </p:spTree>
     <p:extLst>
       <p:ext uri="{BB962C8B-B14F-4D97-AF65-F5344CB8AC3E}">
-        <p14:creationId xmlns:p14="http://schemas.microsoft.com/office/powerpoint/2010/main" val="3177806857"/>
+        <p14:creationId xmlns:p14="http://schemas.microsoft.com/office/powerpoint/2010/main" val="1928417119"/>
       </p:ext>
     </p:extLst>
   </p:cSld>
@@ -18314,10 +18567,10 @@
       </p:grpSpPr>
       <p:sp>
         <p:nvSpPr>
-          <p:cNvPr id="7" name="Title 6">
-            <a:extLst>
-              <a:ext uri="{FF2B5EF4-FFF2-40B4-BE49-F238E27FC236}">
-                <a16:creationId xmlns:a16="http://schemas.microsoft.com/office/drawing/2014/main" id="{495B4BC0-844B-4414-A623-BEF78AAC1BA1}"/>
+          <p:cNvPr id="2" name="Title 1">
+            <a:extLst>
+              <a:ext uri="{FF2B5EF4-FFF2-40B4-BE49-F238E27FC236}">
+                <a16:creationId xmlns:a16="http://schemas.microsoft.com/office/drawing/2014/main" id="{D1BF0482-6913-4A5E-A533-479864CB5349}"/>
               </a:ext>
             </a:extLst>
           </p:cNvPr>
@@ -18335,85 +18588,8 @@
           <a:p>
             <a:r>
               <a:rPr lang="en-US" dirty="0"/>
-              <a:t>ACKNOWLEDGMENTS</a:t>
-            </a:r>
-          </a:p>
-        </p:txBody>
-      </p:sp>
-      <p:sp>
-        <p:nvSpPr>
-          <p:cNvPr id="8" name="Content Placeholder 7">
-            <a:extLst>
-              <a:ext uri="{FF2B5EF4-FFF2-40B4-BE49-F238E27FC236}">
-                <a16:creationId xmlns:a16="http://schemas.microsoft.com/office/drawing/2014/main" id="{2BED3EB3-7E98-4A82-8335-7321D9E37B16}"/>
-              </a:ext>
-            </a:extLst>
-          </p:cNvPr>
-          <p:cNvSpPr>
-            <a:spLocks noGrp="1"/>
-          </p:cNvSpPr>
-          <p:nvPr>
-            <p:ph idx="1"/>
-          </p:nvPr>
-        </p:nvSpPr>
-        <p:spPr/>
-        <p:txBody>
-          <a:bodyPr/>
-          <a:lstStyle/>
-          <a:p>
-            <a:r>
-              <a:rPr lang="en-US" dirty="0"/>
-              <a:t>Plots were created using the ggplot2 package in R</a:t>
-            </a:r>
-          </a:p>
-          <a:p>
-            <a:r>
-              <a:rPr lang="en-US" dirty="0"/>
-              <a:t>Shumway and </a:t>
-            </a:r>
-            <a:r>
-              <a:rPr lang="en-US" dirty="0" err="1"/>
-              <a:t>Stoffer’s</a:t>
-            </a:r>
-            <a:r>
-              <a:rPr lang="en-US" dirty="0"/>
-              <a:t> </a:t>
-            </a:r>
-            <a:r>
-              <a:rPr lang="en-US" i="1" dirty="0"/>
-              <a:t>Time Series Analysis and Its Applications With R Examples, Fourth Edition </a:t>
-            </a:r>
-            <a:r>
-              <a:rPr lang="en-US" dirty="0"/>
-              <a:t>published by Springer was used as the main reference for the ARIMA section</a:t>
-            </a:r>
-          </a:p>
-          <a:p>
-            <a:r>
-              <a:rPr lang="en-US" i="1" dirty="0"/>
-              <a:t>Forecasting at Scale </a:t>
-            </a:r>
-            <a:r>
-              <a:rPr lang="en-US" dirty="0"/>
-              <a:t>by Sean J. Taylor and Benjamin </a:t>
-            </a:r>
-            <a:r>
-              <a:rPr lang="en-US" dirty="0" err="1"/>
-              <a:t>Letham</a:t>
-            </a:r>
-            <a:r>
-              <a:rPr lang="en-US" dirty="0"/>
-              <a:t> at Facebook was used as the main reference for the Prophet section</a:t>
-            </a:r>
-          </a:p>
-          <a:p>
-            <a:r>
-              <a:rPr lang="en-US" dirty="0"/>
-              <a:t>The pictures under Neural Networks are licensed for free use under Wikimedia Commons.</a:t>
-            </a:r>
-          </a:p>
-          <a:p>
-            <a:endParaRPr lang="en-US" dirty="0"/>
+              <a:t>AN LSTM MODEL: USING ALL DATA</a:t>
+            </a:r>
           </a:p>
         </p:txBody>
       </p:sp>
@@ -18422,7 +18598,7 @@
           <p:cNvPr id="4" name="Date Placeholder 3">
             <a:extLst>
               <a:ext uri="{FF2B5EF4-FFF2-40B4-BE49-F238E27FC236}">
-                <a16:creationId xmlns:a16="http://schemas.microsoft.com/office/drawing/2014/main" id="{540F37F1-4F33-429F-A568-1A3ADC499E54}"/>
+                <a16:creationId xmlns:a16="http://schemas.microsoft.com/office/drawing/2014/main" id="{B23DAF35-209C-48FA-AAAB-F69E14183A91}"/>
               </a:ext>
             </a:extLst>
           </p:cNvPr>
@@ -18438,7 +18614,7 @@
           <a:bodyPr/>
           <a:lstStyle/>
           <a:p>
-            <a:fld id="{B08FEED8-D7D4-44E9-BFBC-ED06B5996D94}" type="datetime4">
+            <a:fld id="{8AAE40A0-A7D8-4DC3-BC9E-BADA32DA2004}" type="datetime4">
               <a:rPr lang="en-US" smtClean="0"/>
               <a:t>July 30, 2019</a:t>
             </a:fld>
@@ -18451,7 +18627,7 @@
           <p:cNvPr id="5" name="Footer Placeholder 4">
             <a:extLst>
               <a:ext uri="{FF2B5EF4-FFF2-40B4-BE49-F238E27FC236}">
-                <a16:creationId xmlns:a16="http://schemas.microsoft.com/office/drawing/2014/main" id="{673FFA57-C126-4795-A5F6-DD33AAC5ACBD}"/>
+                <a16:creationId xmlns:a16="http://schemas.microsoft.com/office/drawing/2014/main" id="{3D8E22A6-180D-41CF-9959-4347A11F2AD1}"/>
               </a:ext>
             </a:extLst>
           </p:cNvPr>
@@ -18508,7 +18684,7 @@
           <p:cNvPr id="6" name="Slide Number Placeholder 5">
             <a:extLst>
               <a:ext uri="{FF2B5EF4-FFF2-40B4-BE49-F238E27FC236}">
-                <a16:creationId xmlns:a16="http://schemas.microsoft.com/office/drawing/2014/main" id="{2FA49567-BB70-4798-8746-D0B522CCEE20}"/>
+                <a16:creationId xmlns:a16="http://schemas.microsoft.com/office/drawing/2014/main" id="{CECE3146-0C2B-4CC7-BC7C-FD23AAF7ECAE}"/>
               </a:ext>
             </a:extLst>
           </p:cNvPr>
@@ -18532,10 +18708,1058 @@
           </a:p>
         </p:txBody>
       </p:sp>
+      <p:sp>
+        <p:nvSpPr>
+          <p:cNvPr id="8" name="Content Placeholder 7">
+            <a:extLst>
+              <a:ext uri="{FF2B5EF4-FFF2-40B4-BE49-F238E27FC236}">
+                <a16:creationId xmlns:a16="http://schemas.microsoft.com/office/drawing/2014/main" id="{30C259F3-048F-4C4B-AC8C-24699B6ABD42}"/>
+              </a:ext>
+            </a:extLst>
+          </p:cNvPr>
+          <p:cNvSpPr>
+            <a:spLocks noGrp="1"/>
+          </p:cNvSpPr>
+          <p:nvPr>
+            <p:ph idx="1"/>
+          </p:nvPr>
+        </p:nvSpPr>
+        <p:spPr>
+          <a:xfrm>
+            <a:off x="838200" y="1825625"/>
+            <a:ext cx="5257800" cy="4351338"/>
+          </a:xfrm>
+        </p:spPr>
+        <p:txBody>
+          <a:bodyPr/>
+          <a:lstStyle/>
+          <a:p>
+            <a:r>
+              <a:rPr lang="en-US" dirty="0"/>
+              <a:t>Each minute from January 1</a:t>
+            </a:r>
+            <a:r>
+              <a:rPr lang="en-US" baseline="30000" dirty="0"/>
+              <a:t>st</a:t>
+            </a:r>
+            <a:r>
+              <a:rPr lang="en-US" dirty="0"/>
+              <a:t> to May 31</a:t>
+            </a:r>
+            <a:r>
+              <a:rPr lang="en-US" baseline="30000" dirty="0"/>
+              <a:t>st</a:t>
+            </a:r>
+          </a:p>
+          <a:p>
+            <a:r>
+              <a:rPr lang="en-US" dirty="0"/>
+              <a:t>Mean Relative Error:</a:t>
+            </a:r>
+          </a:p>
+          <a:p>
+            <a:endParaRPr lang="en-US" dirty="0"/>
+          </a:p>
+        </p:txBody>
+      </p:sp>
+      <p:pic>
+        <p:nvPicPr>
+          <p:cNvPr id="10" name="Picture 9">
+            <a:extLst>
+              <a:ext uri="{FF2B5EF4-FFF2-40B4-BE49-F238E27FC236}">
+                <a16:creationId xmlns:a16="http://schemas.microsoft.com/office/drawing/2014/main" id="{64B67945-AF39-4BB8-86D4-3E74D0B6AE5C}"/>
+              </a:ext>
+            </a:extLst>
+          </p:cNvPr>
+          <p:cNvPicPr>
+            <a:picLocks noChangeAspect="1"/>
+          </p:cNvPicPr>
+          <p:nvPr/>
+        </p:nvPicPr>
+        <p:blipFill>
+          <a:blip r:embed="rId2"/>
+          <a:srcRect/>
+          <a:stretch/>
+        </p:blipFill>
+        <p:spPr>
+          <a:xfrm>
+            <a:off x="6096000" y="2096028"/>
+            <a:ext cx="5715798" cy="3810532"/>
+          </a:xfrm>
+          <a:prstGeom prst="rect">
+            <a:avLst/>
+          </a:prstGeom>
+        </p:spPr>
+      </p:pic>
     </p:spTree>
     <p:extLst>
       <p:ext uri="{BB962C8B-B14F-4D97-AF65-F5344CB8AC3E}">
-        <p14:creationId xmlns:p14="http://schemas.microsoft.com/office/powerpoint/2010/main" val="1585568494"/>
+        <p14:creationId xmlns:p14="http://schemas.microsoft.com/office/powerpoint/2010/main" val="3021477682"/>
+      </p:ext>
+    </p:extLst>
+  </p:cSld>
+  <p:clrMapOvr>
+    <a:masterClrMapping/>
+  </p:clrMapOvr>
+</p:sld>
+</file>
+
+<file path=ppt/slides/slide66.xml><?xml version="1.0" encoding="utf-8"?>
+<p:sld xmlns:a="http://schemas.openxmlformats.org/drawingml/2006/main" xmlns:r="http://schemas.openxmlformats.org/officeDocument/2006/relationships" xmlns:p="http://schemas.openxmlformats.org/presentationml/2006/main">
+  <p:cSld>
+    <p:spTree>
+      <p:nvGrpSpPr>
+        <p:cNvPr id="1" name=""/>
+        <p:cNvGrpSpPr/>
+        <p:nvPr/>
+      </p:nvGrpSpPr>
+      <p:grpSpPr>
+        <a:xfrm>
+          <a:off x="0" y="0"/>
+          <a:ext cx="0" cy="0"/>
+          <a:chOff x="0" y="0"/>
+          <a:chExt cx="0" cy="0"/>
+        </a:xfrm>
+      </p:grpSpPr>
+      <p:sp>
+        <p:nvSpPr>
+          <p:cNvPr id="7" name="Title 6">
+            <a:extLst>
+              <a:ext uri="{FF2B5EF4-FFF2-40B4-BE49-F238E27FC236}">
+                <a16:creationId xmlns:a16="http://schemas.microsoft.com/office/drawing/2014/main" id="{104472AF-9F8F-4DDB-87F2-C7E7CE4538C8}"/>
+              </a:ext>
+            </a:extLst>
+          </p:cNvPr>
+          <p:cNvSpPr>
+            <a:spLocks noGrp="1"/>
+          </p:cNvSpPr>
+          <p:nvPr>
+            <p:ph type="title"/>
+          </p:nvPr>
+        </p:nvSpPr>
+        <p:spPr/>
+        <p:txBody>
+          <a:bodyPr/>
+          <a:lstStyle/>
+          <a:p>
+            <a:r>
+              <a:rPr lang="en-US" dirty="0"/>
+              <a:t>COMPARISON AND</a:t>
+            </a:r>
+            <a:br>
+              <a:rPr lang="en-US" dirty="0"/>
+            </a:br>
+            <a:r>
+              <a:rPr lang="en-US" dirty="0"/>
+              <a:t>SUMMARY</a:t>
+            </a:r>
+          </a:p>
+        </p:txBody>
+      </p:sp>
+      <p:sp>
+        <p:nvSpPr>
+          <p:cNvPr id="8" name="Text Placeholder 7">
+            <a:extLst>
+              <a:ext uri="{FF2B5EF4-FFF2-40B4-BE49-F238E27FC236}">
+                <a16:creationId xmlns:a16="http://schemas.microsoft.com/office/drawing/2014/main" id="{DD688F21-A860-408B-AB59-DE6ECA0510A7}"/>
+              </a:ext>
+            </a:extLst>
+          </p:cNvPr>
+          <p:cNvSpPr>
+            <a:spLocks noGrp="1"/>
+          </p:cNvSpPr>
+          <p:nvPr>
+            <p:ph type="body" idx="1"/>
+          </p:nvPr>
+        </p:nvSpPr>
+        <p:spPr/>
+        <p:txBody>
+          <a:bodyPr/>
+          <a:lstStyle/>
+          <a:p>
+            <a:r>
+              <a:rPr lang="en-US" dirty="0"/>
+              <a:t>A look back at our models</a:t>
+            </a:r>
+          </a:p>
+        </p:txBody>
+      </p:sp>
+      <p:sp>
+        <p:nvSpPr>
+          <p:cNvPr id="4" name="Date Placeholder 3">
+            <a:extLst>
+              <a:ext uri="{FF2B5EF4-FFF2-40B4-BE49-F238E27FC236}">
+                <a16:creationId xmlns:a16="http://schemas.microsoft.com/office/drawing/2014/main" id="{2BDFDE93-390C-49C9-82C5-E17C875CFB35}"/>
+              </a:ext>
+            </a:extLst>
+          </p:cNvPr>
+          <p:cNvSpPr>
+            <a:spLocks noGrp="1"/>
+          </p:cNvSpPr>
+          <p:nvPr>
+            <p:ph type="dt" sz="half" idx="10"/>
+          </p:nvPr>
+        </p:nvSpPr>
+        <p:spPr/>
+        <p:txBody>
+          <a:bodyPr/>
+          <a:lstStyle/>
+          <a:p>
+            <a:fld id="{8AAE40A0-A7D8-4DC3-BC9E-BADA32DA2004}" type="datetime4">
+              <a:rPr lang="en-US" smtClean="0"/>
+              <a:t>July 30, 2019</a:t>
+            </a:fld>
+            <a:endParaRPr lang="en-US" dirty="0"/>
+          </a:p>
+        </p:txBody>
+      </p:sp>
+      <p:sp>
+        <p:nvSpPr>
+          <p:cNvPr id="5" name="Footer Placeholder 4">
+            <a:extLst>
+              <a:ext uri="{FF2B5EF4-FFF2-40B4-BE49-F238E27FC236}">
+                <a16:creationId xmlns:a16="http://schemas.microsoft.com/office/drawing/2014/main" id="{112AF0ED-0352-4AB1-9F1D-E1A89A11AE24}"/>
+              </a:ext>
+            </a:extLst>
+          </p:cNvPr>
+          <p:cNvSpPr>
+            <a:spLocks noGrp="1"/>
+          </p:cNvSpPr>
+          <p:nvPr>
+            <p:ph type="ftr" sz="quarter" idx="11"/>
+          </p:nvPr>
+        </p:nvSpPr>
+        <p:spPr/>
+        <p:txBody>
+          <a:bodyPr/>
+          <a:lstStyle/>
+          <a:p>
+            <a:r>
+              <a:rPr lang="en-US"/>
+              <a:t>Digital Scholarship Services </a:t>
+            </a:r>
+            <a:r>
+              <a:rPr lang="en-US">
+                <a:solidFill>
+                  <a:schemeClr val="accent1">
+                    <a:lumMod val="50000"/>
+                  </a:schemeClr>
+                </a:solidFill>
+              </a:rPr>
+              <a:t>| Email</a:t>
+            </a:r>
+            <a:r>
+              <a:rPr lang="en-US"/>
+              <a:t> cf24@rice.edu </a:t>
+            </a:r>
+            <a:r>
+              <a:rPr lang="en-US">
+                <a:solidFill>
+                  <a:schemeClr val="accent1">
+                    <a:lumMod val="50000"/>
+                  </a:schemeClr>
+                </a:solidFill>
+              </a:rPr>
+              <a:t>|</a:t>
+            </a:r>
+            <a:r>
+              <a:rPr lang="en-US"/>
+              <a:t> library.rice.edu/dss</a:t>
+            </a:r>
+            <a:endParaRPr lang="en-US" dirty="0"/>
+          </a:p>
+        </p:txBody>
+      </p:sp>
+      <p:sp>
+        <p:nvSpPr>
+          <p:cNvPr id="6" name="Slide Number Placeholder 5">
+            <a:extLst>
+              <a:ext uri="{FF2B5EF4-FFF2-40B4-BE49-F238E27FC236}">
+                <a16:creationId xmlns:a16="http://schemas.microsoft.com/office/drawing/2014/main" id="{6089B17D-061B-423C-94B0-38D32F83111F}"/>
+              </a:ext>
+            </a:extLst>
+          </p:cNvPr>
+          <p:cNvSpPr>
+            <a:spLocks noGrp="1"/>
+          </p:cNvSpPr>
+          <p:nvPr>
+            <p:ph type="sldNum" sz="quarter" idx="12"/>
+          </p:nvPr>
+        </p:nvSpPr>
+        <p:spPr/>
+        <p:txBody>
+          <a:bodyPr/>
+          <a:lstStyle/>
+          <a:p>
+            <a:fld id="{D57F1E4F-1CFF-5643-939E-02111984F565}" type="slidenum">
+              <a:rPr lang="en-US" smtClean="0"/>
+              <a:t>66</a:t>
+            </a:fld>
+            <a:endParaRPr lang="en-US" dirty="0"/>
+          </a:p>
+        </p:txBody>
+      </p:sp>
+    </p:spTree>
+    <p:extLst>
+      <p:ext uri="{BB962C8B-B14F-4D97-AF65-F5344CB8AC3E}">
+        <p14:creationId xmlns:p14="http://schemas.microsoft.com/office/powerpoint/2010/main" val="3177806857"/>
+      </p:ext>
+    </p:extLst>
+  </p:cSld>
+  <p:clrMapOvr>
+    <a:masterClrMapping/>
+  </p:clrMapOvr>
+</p:sld>
+</file>
+
+<file path=ppt/slides/slide67.xml><?xml version="1.0" encoding="utf-8"?>
+<p:sld xmlns:a="http://schemas.openxmlformats.org/drawingml/2006/main" xmlns:r="http://schemas.openxmlformats.org/officeDocument/2006/relationships" xmlns:p="http://schemas.openxmlformats.org/presentationml/2006/main">
+  <p:cSld>
+    <p:spTree>
+      <p:nvGrpSpPr>
+        <p:cNvPr id="1" name=""/>
+        <p:cNvGrpSpPr/>
+        <p:nvPr/>
+      </p:nvGrpSpPr>
+      <p:grpSpPr>
+        <a:xfrm>
+          <a:off x="0" y="0"/>
+          <a:ext cx="0" cy="0"/>
+          <a:chOff x="0" y="0"/>
+          <a:chExt cx="0" cy="0"/>
+        </a:xfrm>
+      </p:grpSpPr>
+      <p:sp>
+        <p:nvSpPr>
+          <p:cNvPr id="2" name="Title 1">
+            <a:extLst>
+              <a:ext uri="{FF2B5EF4-FFF2-40B4-BE49-F238E27FC236}">
+                <a16:creationId xmlns:a16="http://schemas.microsoft.com/office/drawing/2014/main" id="{D1BF0482-6913-4A5E-A533-479864CB5349}"/>
+              </a:ext>
+            </a:extLst>
+          </p:cNvPr>
+          <p:cNvSpPr>
+            <a:spLocks noGrp="1"/>
+          </p:cNvSpPr>
+          <p:nvPr>
+            <p:ph type="title"/>
+          </p:nvPr>
+        </p:nvSpPr>
+        <p:spPr/>
+        <p:txBody>
+          <a:bodyPr/>
+          <a:lstStyle/>
+          <a:p>
+            <a:r>
+              <a:rPr lang="en-US" dirty="0"/>
+              <a:t>MODEL COMPARISON: ARIMA</a:t>
+            </a:r>
+          </a:p>
+        </p:txBody>
+      </p:sp>
+      <p:sp>
+        <p:nvSpPr>
+          <p:cNvPr id="4" name="Date Placeholder 3">
+            <a:extLst>
+              <a:ext uri="{FF2B5EF4-FFF2-40B4-BE49-F238E27FC236}">
+                <a16:creationId xmlns:a16="http://schemas.microsoft.com/office/drawing/2014/main" id="{B23DAF35-209C-48FA-AAAB-F69E14183A91}"/>
+              </a:ext>
+            </a:extLst>
+          </p:cNvPr>
+          <p:cNvSpPr>
+            <a:spLocks noGrp="1"/>
+          </p:cNvSpPr>
+          <p:nvPr>
+            <p:ph type="dt" sz="half" idx="10"/>
+          </p:nvPr>
+        </p:nvSpPr>
+        <p:spPr/>
+        <p:txBody>
+          <a:bodyPr/>
+          <a:lstStyle/>
+          <a:p>
+            <a:fld id="{8AAE40A0-A7D8-4DC3-BC9E-BADA32DA2004}" type="datetime4">
+              <a:rPr lang="en-US" smtClean="0"/>
+              <a:t>July 30, 2019</a:t>
+            </a:fld>
+            <a:endParaRPr lang="en-US" dirty="0"/>
+          </a:p>
+        </p:txBody>
+      </p:sp>
+      <p:sp>
+        <p:nvSpPr>
+          <p:cNvPr id="5" name="Footer Placeholder 4">
+            <a:extLst>
+              <a:ext uri="{FF2B5EF4-FFF2-40B4-BE49-F238E27FC236}">
+                <a16:creationId xmlns:a16="http://schemas.microsoft.com/office/drawing/2014/main" id="{3D8E22A6-180D-41CF-9959-4347A11F2AD1}"/>
+              </a:ext>
+            </a:extLst>
+          </p:cNvPr>
+          <p:cNvSpPr>
+            <a:spLocks noGrp="1"/>
+          </p:cNvSpPr>
+          <p:nvPr>
+            <p:ph type="ftr" sz="quarter" idx="11"/>
+          </p:nvPr>
+        </p:nvSpPr>
+        <p:spPr/>
+        <p:txBody>
+          <a:bodyPr/>
+          <a:lstStyle/>
+          <a:p>
+            <a:r>
+              <a:rPr lang="en-US"/>
+              <a:t>Digital Scholarship Services </a:t>
+            </a:r>
+            <a:r>
+              <a:rPr lang="en-US">
+                <a:solidFill>
+                  <a:schemeClr val="accent1">
+                    <a:lumMod val="50000"/>
+                  </a:schemeClr>
+                </a:solidFill>
+              </a:rPr>
+              <a:t>| Email</a:t>
+            </a:r>
+            <a:r>
+              <a:rPr lang="en-US"/>
+              <a:t> cf24@rice.edu </a:t>
+            </a:r>
+            <a:r>
+              <a:rPr lang="en-US">
+                <a:solidFill>
+                  <a:schemeClr val="accent1">
+                    <a:lumMod val="50000"/>
+                  </a:schemeClr>
+                </a:solidFill>
+              </a:rPr>
+              <a:t>|</a:t>
+            </a:r>
+            <a:r>
+              <a:rPr lang="en-US"/>
+              <a:t> library.rice.edu/dss</a:t>
+            </a:r>
+            <a:endParaRPr lang="en-US" dirty="0"/>
+          </a:p>
+        </p:txBody>
+      </p:sp>
+      <p:sp>
+        <p:nvSpPr>
+          <p:cNvPr id="6" name="Slide Number Placeholder 5">
+            <a:extLst>
+              <a:ext uri="{FF2B5EF4-FFF2-40B4-BE49-F238E27FC236}">
+                <a16:creationId xmlns:a16="http://schemas.microsoft.com/office/drawing/2014/main" id="{CECE3146-0C2B-4CC7-BC7C-FD23AAF7ECAE}"/>
+              </a:ext>
+            </a:extLst>
+          </p:cNvPr>
+          <p:cNvSpPr>
+            <a:spLocks noGrp="1"/>
+          </p:cNvSpPr>
+          <p:nvPr>
+            <p:ph type="sldNum" sz="quarter" idx="12"/>
+          </p:nvPr>
+        </p:nvSpPr>
+        <p:spPr/>
+        <p:txBody>
+          <a:bodyPr/>
+          <a:lstStyle/>
+          <a:p>
+            <a:fld id="{D57F1E4F-1CFF-5643-939E-02111984F565}" type="slidenum">
+              <a:rPr lang="en-US" smtClean="0"/>
+              <a:t>67</a:t>
+            </a:fld>
+            <a:endParaRPr lang="en-US" dirty="0"/>
+          </a:p>
+        </p:txBody>
+      </p:sp>
+      <p:sp>
+        <p:nvSpPr>
+          <p:cNvPr id="8" name="Content Placeholder 7">
+            <a:extLst>
+              <a:ext uri="{FF2B5EF4-FFF2-40B4-BE49-F238E27FC236}">
+                <a16:creationId xmlns:a16="http://schemas.microsoft.com/office/drawing/2014/main" id="{30C259F3-048F-4C4B-AC8C-24699B6ABD42}"/>
+              </a:ext>
+            </a:extLst>
+          </p:cNvPr>
+          <p:cNvSpPr>
+            <a:spLocks noGrp="1"/>
+          </p:cNvSpPr>
+          <p:nvPr>
+            <p:ph idx="1"/>
+          </p:nvPr>
+        </p:nvSpPr>
+        <p:spPr>
+          <a:xfrm>
+            <a:off x="838200" y="1825625"/>
+            <a:ext cx="5257800" cy="4351338"/>
+          </a:xfrm>
+        </p:spPr>
+        <p:txBody>
+          <a:bodyPr/>
+          <a:lstStyle/>
+          <a:p>
+            <a:r>
+              <a:rPr lang="en-US" dirty="0"/>
+              <a:t>Mean Relative Error: 5.6%</a:t>
+            </a:r>
+          </a:p>
+          <a:p>
+            <a:r>
+              <a:rPr lang="en-US" dirty="0"/>
+              <a:t>Follows peaks nicely!</a:t>
+            </a:r>
+          </a:p>
+          <a:p>
+            <a:pPr lvl="1"/>
+            <a:r>
+              <a:rPr lang="en-US" dirty="0"/>
+              <a:t>Only major miss is the huge spike</a:t>
+            </a:r>
+          </a:p>
+        </p:txBody>
+      </p:sp>
+      <p:pic>
+        <p:nvPicPr>
+          <p:cNvPr id="10" name="Picture 9" descr="A picture containing object&#10;&#10;Description automatically generated">
+            <a:extLst>
+              <a:ext uri="{FF2B5EF4-FFF2-40B4-BE49-F238E27FC236}">
+                <a16:creationId xmlns:a16="http://schemas.microsoft.com/office/drawing/2014/main" id="{64B67945-AF39-4BB8-86D4-3E74D0B6AE5C}"/>
+              </a:ext>
+            </a:extLst>
+          </p:cNvPr>
+          <p:cNvPicPr>
+            <a:picLocks noChangeAspect="1"/>
+          </p:cNvPicPr>
+          <p:nvPr/>
+        </p:nvPicPr>
+        <p:blipFill>
+          <a:blip r:embed="rId2"/>
+          <a:stretch>
+            <a:fillRect/>
+          </a:stretch>
+        </p:blipFill>
+        <p:spPr>
+          <a:xfrm>
+            <a:off x="6096000" y="2096028"/>
+            <a:ext cx="5715798" cy="3810532"/>
+          </a:xfrm>
+          <a:prstGeom prst="rect">
+            <a:avLst/>
+          </a:prstGeom>
+        </p:spPr>
+      </p:pic>
+    </p:spTree>
+    <p:extLst>
+      <p:ext uri="{BB962C8B-B14F-4D97-AF65-F5344CB8AC3E}">
+        <p14:creationId xmlns:p14="http://schemas.microsoft.com/office/powerpoint/2010/main" val="939056684"/>
+      </p:ext>
+    </p:extLst>
+  </p:cSld>
+  <p:clrMapOvr>
+    <a:masterClrMapping/>
+  </p:clrMapOvr>
+</p:sld>
+</file>
+
+<file path=ppt/slides/slide68.xml><?xml version="1.0" encoding="utf-8"?>
+<p:sld xmlns:a="http://schemas.openxmlformats.org/drawingml/2006/main" xmlns:r="http://schemas.openxmlformats.org/officeDocument/2006/relationships" xmlns:p="http://schemas.openxmlformats.org/presentationml/2006/main">
+  <p:cSld>
+    <p:spTree>
+      <p:nvGrpSpPr>
+        <p:cNvPr id="1" name=""/>
+        <p:cNvGrpSpPr/>
+        <p:nvPr/>
+      </p:nvGrpSpPr>
+      <p:grpSpPr>
+        <a:xfrm>
+          <a:off x="0" y="0"/>
+          <a:ext cx="0" cy="0"/>
+          <a:chOff x="0" y="0"/>
+          <a:chExt cx="0" cy="0"/>
+        </a:xfrm>
+      </p:grpSpPr>
+      <p:sp>
+        <p:nvSpPr>
+          <p:cNvPr id="2" name="Title 1">
+            <a:extLst>
+              <a:ext uri="{FF2B5EF4-FFF2-40B4-BE49-F238E27FC236}">
+                <a16:creationId xmlns:a16="http://schemas.microsoft.com/office/drawing/2014/main" id="{D1BF0482-6913-4A5E-A533-479864CB5349}"/>
+              </a:ext>
+            </a:extLst>
+          </p:cNvPr>
+          <p:cNvSpPr>
+            <a:spLocks noGrp="1"/>
+          </p:cNvSpPr>
+          <p:nvPr>
+            <p:ph type="title"/>
+          </p:nvPr>
+        </p:nvSpPr>
+        <p:spPr/>
+        <p:txBody>
+          <a:bodyPr/>
+          <a:lstStyle/>
+          <a:p>
+            <a:r>
+              <a:rPr lang="en-US" dirty="0"/>
+              <a:t>MODEL COMPARISON: PROPHET</a:t>
+            </a:r>
+          </a:p>
+        </p:txBody>
+      </p:sp>
+      <p:sp>
+        <p:nvSpPr>
+          <p:cNvPr id="4" name="Date Placeholder 3">
+            <a:extLst>
+              <a:ext uri="{FF2B5EF4-FFF2-40B4-BE49-F238E27FC236}">
+                <a16:creationId xmlns:a16="http://schemas.microsoft.com/office/drawing/2014/main" id="{B23DAF35-209C-48FA-AAAB-F69E14183A91}"/>
+              </a:ext>
+            </a:extLst>
+          </p:cNvPr>
+          <p:cNvSpPr>
+            <a:spLocks noGrp="1"/>
+          </p:cNvSpPr>
+          <p:nvPr>
+            <p:ph type="dt" sz="half" idx="10"/>
+          </p:nvPr>
+        </p:nvSpPr>
+        <p:spPr/>
+        <p:txBody>
+          <a:bodyPr/>
+          <a:lstStyle/>
+          <a:p>
+            <a:fld id="{8AAE40A0-A7D8-4DC3-BC9E-BADA32DA2004}" type="datetime4">
+              <a:rPr lang="en-US" smtClean="0"/>
+              <a:t>July 30, 2019</a:t>
+            </a:fld>
+            <a:endParaRPr lang="en-US" dirty="0"/>
+          </a:p>
+        </p:txBody>
+      </p:sp>
+      <p:sp>
+        <p:nvSpPr>
+          <p:cNvPr id="5" name="Footer Placeholder 4">
+            <a:extLst>
+              <a:ext uri="{FF2B5EF4-FFF2-40B4-BE49-F238E27FC236}">
+                <a16:creationId xmlns:a16="http://schemas.microsoft.com/office/drawing/2014/main" id="{3D8E22A6-180D-41CF-9959-4347A11F2AD1}"/>
+              </a:ext>
+            </a:extLst>
+          </p:cNvPr>
+          <p:cNvSpPr>
+            <a:spLocks noGrp="1"/>
+          </p:cNvSpPr>
+          <p:nvPr>
+            <p:ph type="ftr" sz="quarter" idx="11"/>
+          </p:nvPr>
+        </p:nvSpPr>
+        <p:spPr/>
+        <p:txBody>
+          <a:bodyPr/>
+          <a:lstStyle/>
+          <a:p>
+            <a:r>
+              <a:rPr lang="en-US"/>
+              <a:t>Digital Scholarship Services </a:t>
+            </a:r>
+            <a:r>
+              <a:rPr lang="en-US">
+                <a:solidFill>
+                  <a:schemeClr val="accent1">
+                    <a:lumMod val="50000"/>
+                  </a:schemeClr>
+                </a:solidFill>
+              </a:rPr>
+              <a:t>| Email</a:t>
+            </a:r>
+            <a:r>
+              <a:rPr lang="en-US"/>
+              <a:t> cf24@rice.edu </a:t>
+            </a:r>
+            <a:r>
+              <a:rPr lang="en-US">
+                <a:solidFill>
+                  <a:schemeClr val="accent1">
+                    <a:lumMod val="50000"/>
+                  </a:schemeClr>
+                </a:solidFill>
+              </a:rPr>
+              <a:t>|</a:t>
+            </a:r>
+            <a:r>
+              <a:rPr lang="en-US"/>
+              <a:t> library.rice.edu/dss</a:t>
+            </a:r>
+            <a:endParaRPr lang="en-US" dirty="0"/>
+          </a:p>
+        </p:txBody>
+      </p:sp>
+      <p:sp>
+        <p:nvSpPr>
+          <p:cNvPr id="6" name="Slide Number Placeholder 5">
+            <a:extLst>
+              <a:ext uri="{FF2B5EF4-FFF2-40B4-BE49-F238E27FC236}">
+                <a16:creationId xmlns:a16="http://schemas.microsoft.com/office/drawing/2014/main" id="{CECE3146-0C2B-4CC7-BC7C-FD23AAF7ECAE}"/>
+              </a:ext>
+            </a:extLst>
+          </p:cNvPr>
+          <p:cNvSpPr>
+            <a:spLocks noGrp="1"/>
+          </p:cNvSpPr>
+          <p:nvPr>
+            <p:ph type="sldNum" sz="quarter" idx="12"/>
+          </p:nvPr>
+        </p:nvSpPr>
+        <p:spPr/>
+        <p:txBody>
+          <a:bodyPr/>
+          <a:lstStyle/>
+          <a:p>
+            <a:fld id="{D57F1E4F-1CFF-5643-939E-02111984F565}" type="slidenum">
+              <a:rPr lang="en-US" smtClean="0"/>
+              <a:t>68</a:t>
+            </a:fld>
+            <a:endParaRPr lang="en-US" dirty="0"/>
+          </a:p>
+        </p:txBody>
+      </p:sp>
+      <p:sp>
+        <p:nvSpPr>
+          <p:cNvPr id="8" name="Content Placeholder 7">
+            <a:extLst>
+              <a:ext uri="{FF2B5EF4-FFF2-40B4-BE49-F238E27FC236}">
+                <a16:creationId xmlns:a16="http://schemas.microsoft.com/office/drawing/2014/main" id="{30C259F3-048F-4C4B-AC8C-24699B6ABD42}"/>
+              </a:ext>
+            </a:extLst>
+          </p:cNvPr>
+          <p:cNvSpPr>
+            <a:spLocks noGrp="1"/>
+          </p:cNvSpPr>
+          <p:nvPr>
+            <p:ph idx="1"/>
+          </p:nvPr>
+        </p:nvSpPr>
+        <p:spPr>
+          <a:xfrm>
+            <a:off x="838200" y="1825625"/>
+            <a:ext cx="5257800" cy="4351338"/>
+          </a:xfrm>
+        </p:spPr>
+        <p:txBody>
+          <a:bodyPr/>
+          <a:lstStyle/>
+          <a:p>
+            <a:r>
+              <a:rPr lang="en-US" dirty="0"/>
+              <a:t>Mean Relative Error: 7.4%</a:t>
+            </a:r>
+          </a:p>
+          <a:p>
+            <a:r>
+              <a:rPr lang="en-US" dirty="0"/>
+              <a:t>Very interested in cycles</a:t>
+            </a:r>
+          </a:p>
+          <a:p>
+            <a:r>
+              <a:rPr lang="en-US" dirty="0"/>
+              <a:t>Not bad, but slightly worse than ARIMA</a:t>
+            </a:r>
+          </a:p>
+          <a:p>
+            <a:pPr lvl="1"/>
+            <a:r>
+              <a:rPr lang="en-US" dirty="0"/>
+              <a:t>Much faster, though</a:t>
+            </a:r>
+          </a:p>
+        </p:txBody>
+      </p:sp>
+      <p:pic>
+        <p:nvPicPr>
+          <p:cNvPr id="10" name="Picture 9">
+            <a:extLst>
+              <a:ext uri="{FF2B5EF4-FFF2-40B4-BE49-F238E27FC236}">
+                <a16:creationId xmlns:a16="http://schemas.microsoft.com/office/drawing/2014/main" id="{64B67945-AF39-4BB8-86D4-3E74D0B6AE5C}"/>
+              </a:ext>
+            </a:extLst>
+          </p:cNvPr>
+          <p:cNvPicPr>
+            <a:picLocks noChangeAspect="1"/>
+          </p:cNvPicPr>
+          <p:nvPr/>
+        </p:nvPicPr>
+        <p:blipFill>
+          <a:blip r:embed="rId2"/>
+          <a:srcRect/>
+          <a:stretch/>
+        </p:blipFill>
+        <p:spPr>
+          <a:xfrm>
+            <a:off x="6096000" y="2096028"/>
+            <a:ext cx="5715798" cy="3810532"/>
+          </a:xfrm>
+          <a:prstGeom prst="rect">
+            <a:avLst/>
+          </a:prstGeom>
+        </p:spPr>
+      </p:pic>
+    </p:spTree>
+    <p:extLst>
+      <p:ext uri="{BB962C8B-B14F-4D97-AF65-F5344CB8AC3E}">
+        <p14:creationId xmlns:p14="http://schemas.microsoft.com/office/powerpoint/2010/main" val="362039217"/>
+      </p:ext>
+    </p:extLst>
+  </p:cSld>
+  <p:clrMapOvr>
+    <a:masterClrMapping/>
+  </p:clrMapOvr>
+</p:sld>
+</file>
+
+<file path=ppt/slides/slide69.xml><?xml version="1.0" encoding="utf-8"?>
+<p:sld xmlns:a="http://schemas.openxmlformats.org/drawingml/2006/main" xmlns:r="http://schemas.openxmlformats.org/officeDocument/2006/relationships" xmlns:p="http://schemas.openxmlformats.org/presentationml/2006/main">
+  <p:cSld>
+    <p:spTree>
+      <p:nvGrpSpPr>
+        <p:cNvPr id="1" name=""/>
+        <p:cNvGrpSpPr/>
+        <p:nvPr/>
+      </p:nvGrpSpPr>
+      <p:grpSpPr>
+        <a:xfrm>
+          <a:off x="0" y="0"/>
+          <a:ext cx="0" cy="0"/>
+          <a:chOff x="0" y="0"/>
+          <a:chExt cx="0" cy="0"/>
+        </a:xfrm>
+      </p:grpSpPr>
+      <p:sp>
+        <p:nvSpPr>
+          <p:cNvPr id="2" name="Title 1">
+            <a:extLst>
+              <a:ext uri="{FF2B5EF4-FFF2-40B4-BE49-F238E27FC236}">
+                <a16:creationId xmlns:a16="http://schemas.microsoft.com/office/drawing/2014/main" id="{D1BF0482-6913-4A5E-A533-479864CB5349}"/>
+              </a:ext>
+            </a:extLst>
+          </p:cNvPr>
+          <p:cNvSpPr>
+            <a:spLocks noGrp="1"/>
+          </p:cNvSpPr>
+          <p:nvPr>
+            <p:ph type="title"/>
+          </p:nvPr>
+        </p:nvSpPr>
+        <p:spPr/>
+        <p:txBody>
+          <a:bodyPr/>
+          <a:lstStyle/>
+          <a:p>
+            <a:r>
+              <a:rPr lang="en-US" dirty="0"/>
+              <a:t>MODEL COMPARISON: RNN</a:t>
+            </a:r>
+          </a:p>
+        </p:txBody>
+      </p:sp>
+      <p:sp>
+        <p:nvSpPr>
+          <p:cNvPr id="4" name="Date Placeholder 3">
+            <a:extLst>
+              <a:ext uri="{FF2B5EF4-FFF2-40B4-BE49-F238E27FC236}">
+                <a16:creationId xmlns:a16="http://schemas.microsoft.com/office/drawing/2014/main" id="{B23DAF35-209C-48FA-AAAB-F69E14183A91}"/>
+              </a:ext>
+            </a:extLst>
+          </p:cNvPr>
+          <p:cNvSpPr>
+            <a:spLocks noGrp="1"/>
+          </p:cNvSpPr>
+          <p:nvPr>
+            <p:ph type="dt" sz="half" idx="10"/>
+          </p:nvPr>
+        </p:nvSpPr>
+        <p:spPr/>
+        <p:txBody>
+          <a:bodyPr/>
+          <a:lstStyle/>
+          <a:p>
+            <a:fld id="{8AAE40A0-A7D8-4DC3-BC9E-BADA32DA2004}" type="datetime4">
+              <a:rPr lang="en-US" smtClean="0"/>
+              <a:t>July 30, 2019</a:t>
+            </a:fld>
+            <a:endParaRPr lang="en-US" dirty="0"/>
+          </a:p>
+        </p:txBody>
+      </p:sp>
+      <p:sp>
+        <p:nvSpPr>
+          <p:cNvPr id="5" name="Footer Placeholder 4">
+            <a:extLst>
+              <a:ext uri="{FF2B5EF4-FFF2-40B4-BE49-F238E27FC236}">
+                <a16:creationId xmlns:a16="http://schemas.microsoft.com/office/drawing/2014/main" id="{3D8E22A6-180D-41CF-9959-4347A11F2AD1}"/>
+              </a:ext>
+            </a:extLst>
+          </p:cNvPr>
+          <p:cNvSpPr>
+            <a:spLocks noGrp="1"/>
+          </p:cNvSpPr>
+          <p:nvPr>
+            <p:ph type="ftr" sz="quarter" idx="11"/>
+          </p:nvPr>
+        </p:nvSpPr>
+        <p:spPr/>
+        <p:txBody>
+          <a:bodyPr/>
+          <a:lstStyle/>
+          <a:p>
+            <a:r>
+              <a:rPr lang="en-US"/>
+              <a:t>Digital Scholarship Services </a:t>
+            </a:r>
+            <a:r>
+              <a:rPr lang="en-US">
+                <a:solidFill>
+                  <a:schemeClr val="accent1">
+                    <a:lumMod val="50000"/>
+                  </a:schemeClr>
+                </a:solidFill>
+              </a:rPr>
+              <a:t>| Email</a:t>
+            </a:r>
+            <a:r>
+              <a:rPr lang="en-US"/>
+              <a:t> cf24@rice.edu </a:t>
+            </a:r>
+            <a:r>
+              <a:rPr lang="en-US">
+                <a:solidFill>
+                  <a:schemeClr val="accent1">
+                    <a:lumMod val="50000"/>
+                  </a:schemeClr>
+                </a:solidFill>
+              </a:rPr>
+              <a:t>|</a:t>
+            </a:r>
+            <a:r>
+              <a:rPr lang="en-US"/>
+              <a:t> library.rice.edu/dss</a:t>
+            </a:r>
+            <a:endParaRPr lang="en-US" dirty="0"/>
+          </a:p>
+        </p:txBody>
+      </p:sp>
+      <p:sp>
+        <p:nvSpPr>
+          <p:cNvPr id="6" name="Slide Number Placeholder 5">
+            <a:extLst>
+              <a:ext uri="{FF2B5EF4-FFF2-40B4-BE49-F238E27FC236}">
+                <a16:creationId xmlns:a16="http://schemas.microsoft.com/office/drawing/2014/main" id="{CECE3146-0C2B-4CC7-BC7C-FD23AAF7ECAE}"/>
+              </a:ext>
+            </a:extLst>
+          </p:cNvPr>
+          <p:cNvSpPr>
+            <a:spLocks noGrp="1"/>
+          </p:cNvSpPr>
+          <p:nvPr>
+            <p:ph type="sldNum" sz="quarter" idx="12"/>
+          </p:nvPr>
+        </p:nvSpPr>
+        <p:spPr/>
+        <p:txBody>
+          <a:bodyPr/>
+          <a:lstStyle/>
+          <a:p>
+            <a:fld id="{D57F1E4F-1CFF-5643-939E-02111984F565}" type="slidenum">
+              <a:rPr lang="en-US" smtClean="0"/>
+              <a:t>69</a:t>
+            </a:fld>
+            <a:endParaRPr lang="en-US" dirty="0"/>
+          </a:p>
+        </p:txBody>
+      </p:sp>
+      <p:sp>
+        <p:nvSpPr>
+          <p:cNvPr id="8" name="Content Placeholder 7">
+            <a:extLst>
+              <a:ext uri="{FF2B5EF4-FFF2-40B4-BE49-F238E27FC236}">
+                <a16:creationId xmlns:a16="http://schemas.microsoft.com/office/drawing/2014/main" id="{30C259F3-048F-4C4B-AC8C-24699B6ABD42}"/>
+              </a:ext>
+            </a:extLst>
+          </p:cNvPr>
+          <p:cNvSpPr>
+            <a:spLocks noGrp="1"/>
+          </p:cNvSpPr>
+          <p:nvPr>
+            <p:ph idx="1"/>
+          </p:nvPr>
+        </p:nvSpPr>
+        <p:spPr>
+          <a:xfrm>
+            <a:off x="838200" y="1825625"/>
+            <a:ext cx="5257800" cy="4351338"/>
+          </a:xfrm>
+        </p:spPr>
+        <p:txBody>
+          <a:bodyPr/>
+          <a:lstStyle/>
+          <a:p>
+            <a:r>
+              <a:rPr lang="en-US" dirty="0"/>
+              <a:t>Mean Relative Error: 7.4%</a:t>
+            </a:r>
+          </a:p>
+          <a:p>
+            <a:r>
+              <a:rPr lang="en-US" dirty="0"/>
+              <a:t>Very interested in cycles</a:t>
+            </a:r>
+          </a:p>
+          <a:p>
+            <a:r>
+              <a:rPr lang="en-US" dirty="0"/>
+              <a:t>Not bad, but slightly worse than ARIMA</a:t>
+            </a:r>
+          </a:p>
+          <a:p>
+            <a:pPr lvl="1"/>
+            <a:r>
+              <a:rPr lang="en-US" dirty="0"/>
+              <a:t>Much faster, though</a:t>
+            </a:r>
+          </a:p>
+        </p:txBody>
+      </p:sp>
+      <p:pic>
+        <p:nvPicPr>
+          <p:cNvPr id="10" name="Picture 9">
+            <a:extLst>
+              <a:ext uri="{FF2B5EF4-FFF2-40B4-BE49-F238E27FC236}">
+                <a16:creationId xmlns:a16="http://schemas.microsoft.com/office/drawing/2014/main" id="{64B67945-AF39-4BB8-86D4-3E74D0B6AE5C}"/>
+              </a:ext>
+            </a:extLst>
+          </p:cNvPr>
+          <p:cNvPicPr>
+            <a:picLocks noChangeAspect="1"/>
+          </p:cNvPicPr>
+          <p:nvPr/>
+        </p:nvPicPr>
+        <p:blipFill>
+          <a:blip r:embed="rId2"/>
+          <a:srcRect/>
+          <a:stretch/>
+        </p:blipFill>
+        <p:spPr>
+          <a:xfrm>
+            <a:off x="6096000" y="2096028"/>
+            <a:ext cx="5715798" cy="3810532"/>
+          </a:xfrm>
+          <a:prstGeom prst="rect">
+            <a:avLst/>
+          </a:prstGeom>
+        </p:spPr>
+      </p:pic>
+    </p:spTree>
+    <p:extLst>
+      <p:ext uri="{BB962C8B-B14F-4D97-AF65-F5344CB8AC3E}">
+        <p14:creationId xmlns:p14="http://schemas.microsoft.com/office/powerpoint/2010/main" val="2278730989"/>
       </p:ext>
     </p:extLst>
   </p:cSld>
@@ -18744,6 +19968,1289 @@
     <p:extLst>
       <p:ext uri="{BB962C8B-B14F-4D97-AF65-F5344CB8AC3E}">
         <p14:creationId xmlns:p14="http://schemas.microsoft.com/office/powerpoint/2010/main" val="2581962988"/>
+      </p:ext>
+    </p:extLst>
+  </p:cSld>
+  <p:clrMapOvr>
+    <a:masterClrMapping/>
+  </p:clrMapOvr>
+</p:sld>
+</file>
+
+<file path=ppt/slides/slide70.xml><?xml version="1.0" encoding="utf-8"?>
+<p:sld xmlns:a="http://schemas.openxmlformats.org/drawingml/2006/main" xmlns:r="http://schemas.openxmlformats.org/officeDocument/2006/relationships" xmlns:p="http://schemas.openxmlformats.org/presentationml/2006/main">
+  <p:cSld>
+    <p:spTree>
+      <p:nvGrpSpPr>
+        <p:cNvPr id="1" name=""/>
+        <p:cNvGrpSpPr/>
+        <p:nvPr/>
+      </p:nvGrpSpPr>
+      <p:grpSpPr>
+        <a:xfrm>
+          <a:off x="0" y="0"/>
+          <a:ext cx="0" cy="0"/>
+          <a:chOff x="0" y="0"/>
+          <a:chExt cx="0" cy="0"/>
+        </a:xfrm>
+      </p:grpSpPr>
+      <p:sp>
+        <p:nvSpPr>
+          <p:cNvPr id="2" name="Title 1">
+            <a:extLst>
+              <a:ext uri="{FF2B5EF4-FFF2-40B4-BE49-F238E27FC236}">
+                <a16:creationId xmlns:a16="http://schemas.microsoft.com/office/drawing/2014/main" id="{D1BF0482-6913-4A5E-A533-479864CB5349}"/>
+              </a:ext>
+            </a:extLst>
+          </p:cNvPr>
+          <p:cNvSpPr>
+            <a:spLocks noGrp="1"/>
+          </p:cNvSpPr>
+          <p:nvPr>
+            <p:ph type="title"/>
+          </p:nvPr>
+        </p:nvSpPr>
+        <p:spPr/>
+        <p:txBody>
+          <a:bodyPr/>
+          <a:lstStyle/>
+          <a:p>
+            <a:r>
+              <a:rPr lang="en-US" dirty="0"/>
+              <a:t>MODEL COMPARISON: LSTM</a:t>
+            </a:r>
+          </a:p>
+        </p:txBody>
+      </p:sp>
+      <p:sp>
+        <p:nvSpPr>
+          <p:cNvPr id="4" name="Date Placeholder 3">
+            <a:extLst>
+              <a:ext uri="{FF2B5EF4-FFF2-40B4-BE49-F238E27FC236}">
+                <a16:creationId xmlns:a16="http://schemas.microsoft.com/office/drawing/2014/main" id="{B23DAF35-209C-48FA-AAAB-F69E14183A91}"/>
+              </a:ext>
+            </a:extLst>
+          </p:cNvPr>
+          <p:cNvSpPr>
+            <a:spLocks noGrp="1"/>
+          </p:cNvSpPr>
+          <p:nvPr>
+            <p:ph type="dt" sz="half" idx="10"/>
+          </p:nvPr>
+        </p:nvSpPr>
+        <p:spPr/>
+        <p:txBody>
+          <a:bodyPr/>
+          <a:lstStyle/>
+          <a:p>
+            <a:fld id="{8AAE40A0-A7D8-4DC3-BC9E-BADA32DA2004}" type="datetime4">
+              <a:rPr lang="en-US" smtClean="0"/>
+              <a:t>July 30, 2019</a:t>
+            </a:fld>
+            <a:endParaRPr lang="en-US" dirty="0"/>
+          </a:p>
+        </p:txBody>
+      </p:sp>
+      <p:sp>
+        <p:nvSpPr>
+          <p:cNvPr id="5" name="Footer Placeholder 4">
+            <a:extLst>
+              <a:ext uri="{FF2B5EF4-FFF2-40B4-BE49-F238E27FC236}">
+                <a16:creationId xmlns:a16="http://schemas.microsoft.com/office/drawing/2014/main" id="{3D8E22A6-180D-41CF-9959-4347A11F2AD1}"/>
+              </a:ext>
+            </a:extLst>
+          </p:cNvPr>
+          <p:cNvSpPr>
+            <a:spLocks noGrp="1"/>
+          </p:cNvSpPr>
+          <p:nvPr>
+            <p:ph type="ftr" sz="quarter" idx="11"/>
+          </p:nvPr>
+        </p:nvSpPr>
+        <p:spPr/>
+        <p:txBody>
+          <a:bodyPr/>
+          <a:lstStyle/>
+          <a:p>
+            <a:r>
+              <a:rPr lang="en-US"/>
+              <a:t>Digital Scholarship Services </a:t>
+            </a:r>
+            <a:r>
+              <a:rPr lang="en-US">
+                <a:solidFill>
+                  <a:schemeClr val="accent1">
+                    <a:lumMod val="50000"/>
+                  </a:schemeClr>
+                </a:solidFill>
+              </a:rPr>
+              <a:t>| Email</a:t>
+            </a:r>
+            <a:r>
+              <a:rPr lang="en-US"/>
+              <a:t> cf24@rice.edu </a:t>
+            </a:r>
+            <a:r>
+              <a:rPr lang="en-US">
+                <a:solidFill>
+                  <a:schemeClr val="accent1">
+                    <a:lumMod val="50000"/>
+                  </a:schemeClr>
+                </a:solidFill>
+              </a:rPr>
+              <a:t>|</a:t>
+            </a:r>
+            <a:r>
+              <a:rPr lang="en-US"/>
+              <a:t> library.rice.edu/dss</a:t>
+            </a:r>
+            <a:endParaRPr lang="en-US" dirty="0"/>
+          </a:p>
+        </p:txBody>
+      </p:sp>
+      <p:sp>
+        <p:nvSpPr>
+          <p:cNvPr id="6" name="Slide Number Placeholder 5">
+            <a:extLst>
+              <a:ext uri="{FF2B5EF4-FFF2-40B4-BE49-F238E27FC236}">
+                <a16:creationId xmlns:a16="http://schemas.microsoft.com/office/drawing/2014/main" id="{CECE3146-0C2B-4CC7-BC7C-FD23AAF7ECAE}"/>
+              </a:ext>
+            </a:extLst>
+          </p:cNvPr>
+          <p:cNvSpPr>
+            <a:spLocks noGrp="1"/>
+          </p:cNvSpPr>
+          <p:nvPr>
+            <p:ph type="sldNum" sz="quarter" idx="12"/>
+          </p:nvPr>
+        </p:nvSpPr>
+        <p:spPr/>
+        <p:txBody>
+          <a:bodyPr/>
+          <a:lstStyle/>
+          <a:p>
+            <a:fld id="{D57F1E4F-1CFF-5643-939E-02111984F565}" type="slidenum">
+              <a:rPr lang="en-US" smtClean="0"/>
+              <a:t>70</a:t>
+            </a:fld>
+            <a:endParaRPr lang="en-US" dirty="0"/>
+          </a:p>
+        </p:txBody>
+      </p:sp>
+      <p:sp>
+        <p:nvSpPr>
+          <p:cNvPr id="8" name="Content Placeholder 7">
+            <a:extLst>
+              <a:ext uri="{FF2B5EF4-FFF2-40B4-BE49-F238E27FC236}">
+                <a16:creationId xmlns:a16="http://schemas.microsoft.com/office/drawing/2014/main" id="{30C259F3-048F-4C4B-AC8C-24699B6ABD42}"/>
+              </a:ext>
+            </a:extLst>
+          </p:cNvPr>
+          <p:cNvSpPr>
+            <a:spLocks noGrp="1"/>
+          </p:cNvSpPr>
+          <p:nvPr>
+            <p:ph idx="1"/>
+          </p:nvPr>
+        </p:nvSpPr>
+        <p:spPr>
+          <a:xfrm>
+            <a:off x="838200" y="1825625"/>
+            <a:ext cx="5257800" cy="4351338"/>
+          </a:xfrm>
+        </p:spPr>
+        <p:txBody>
+          <a:bodyPr/>
+          <a:lstStyle/>
+          <a:p>
+            <a:r>
+              <a:rPr lang="en-US" dirty="0"/>
+              <a:t>Mean Relative Error: 7.4%</a:t>
+            </a:r>
+          </a:p>
+          <a:p>
+            <a:r>
+              <a:rPr lang="en-US" dirty="0"/>
+              <a:t>Very interested in cycles</a:t>
+            </a:r>
+          </a:p>
+          <a:p>
+            <a:r>
+              <a:rPr lang="en-US" dirty="0"/>
+              <a:t>Not bad, but slightly worse than ARIMA</a:t>
+            </a:r>
+          </a:p>
+          <a:p>
+            <a:pPr lvl="1"/>
+            <a:r>
+              <a:rPr lang="en-US" dirty="0"/>
+              <a:t>Much faster, though</a:t>
+            </a:r>
+          </a:p>
+        </p:txBody>
+      </p:sp>
+      <p:pic>
+        <p:nvPicPr>
+          <p:cNvPr id="10" name="Picture 9">
+            <a:extLst>
+              <a:ext uri="{FF2B5EF4-FFF2-40B4-BE49-F238E27FC236}">
+                <a16:creationId xmlns:a16="http://schemas.microsoft.com/office/drawing/2014/main" id="{64B67945-AF39-4BB8-86D4-3E74D0B6AE5C}"/>
+              </a:ext>
+            </a:extLst>
+          </p:cNvPr>
+          <p:cNvPicPr>
+            <a:picLocks noChangeAspect="1"/>
+          </p:cNvPicPr>
+          <p:nvPr/>
+        </p:nvPicPr>
+        <p:blipFill>
+          <a:blip r:embed="rId2"/>
+          <a:srcRect/>
+          <a:stretch/>
+        </p:blipFill>
+        <p:spPr>
+          <a:xfrm>
+            <a:off x="6096000" y="2096028"/>
+            <a:ext cx="5715798" cy="3810532"/>
+          </a:xfrm>
+          <a:prstGeom prst="rect">
+            <a:avLst/>
+          </a:prstGeom>
+        </p:spPr>
+      </p:pic>
+    </p:spTree>
+    <p:extLst>
+      <p:ext uri="{BB962C8B-B14F-4D97-AF65-F5344CB8AC3E}">
+        <p14:creationId xmlns:p14="http://schemas.microsoft.com/office/powerpoint/2010/main" val="2453879310"/>
+      </p:ext>
+    </p:extLst>
+  </p:cSld>
+  <p:clrMapOvr>
+    <a:masterClrMapping/>
+  </p:clrMapOvr>
+</p:sld>
+</file>
+
+<file path=ppt/slides/slide71.xml><?xml version="1.0" encoding="utf-8"?>
+<p:sld xmlns:a="http://schemas.openxmlformats.org/drawingml/2006/main" xmlns:r="http://schemas.openxmlformats.org/officeDocument/2006/relationships" xmlns:p="http://schemas.openxmlformats.org/presentationml/2006/main">
+  <p:cSld>
+    <p:spTree>
+      <p:nvGrpSpPr>
+        <p:cNvPr id="1" name=""/>
+        <p:cNvGrpSpPr/>
+        <p:nvPr/>
+      </p:nvGrpSpPr>
+      <p:grpSpPr>
+        <a:xfrm>
+          <a:off x="0" y="0"/>
+          <a:ext cx="0" cy="0"/>
+          <a:chOff x="0" y="0"/>
+          <a:chExt cx="0" cy="0"/>
+        </a:xfrm>
+      </p:grpSpPr>
+      <p:sp>
+        <p:nvSpPr>
+          <p:cNvPr id="2" name="Title 1">
+            <a:extLst>
+              <a:ext uri="{FF2B5EF4-FFF2-40B4-BE49-F238E27FC236}">
+                <a16:creationId xmlns:a16="http://schemas.microsoft.com/office/drawing/2014/main" id="{0A17E1CB-6C3C-4BC7-8386-7D3C4C842418}"/>
+              </a:ext>
+            </a:extLst>
+          </p:cNvPr>
+          <p:cNvSpPr>
+            <a:spLocks noGrp="1"/>
+          </p:cNvSpPr>
+          <p:nvPr>
+            <p:ph type="title"/>
+          </p:nvPr>
+        </p:nvSpPr>
+        <p:spPr/>
+        <p:txBody>
+          <a:bodyPr/>
+          <a:lstStyle/>
+          <a:p>
+            <a:r>
+              <a:rPr lang="en-US" dirty="0"/>
+              <a:t>MODEL STRENGTHS</a:t>
+            </a:r>
+          </a:p>
+        </p:txBody>
+      </p:sp>
+      <p:sp>
+        <p:nvSpPr>
+          <p:cNvPr id="3" name="Content Placeholder 2">
+            <a:extLst>
+              <a:ext uri="{FF2B5EF4-FFF2-40B4-BE49-F238E27FC236}">
+                <a16:creationId xmlns:a16="http://schemas.microsoft.com/office/drawing/2014/main" id="{FAB0179F-E1A1-4EC1-ADBD-FF50D7EA5440}"/>
+              </a:ext>
+            </a:extLst>
+          </p:cNvPr>
+          <p:cNvSpPr>
+            <a:spLocks noGrp="1"/>
+          </p:cNvSpPr>
+          <p:nvPr>
+            <p:ph idx="1"/>
+          </p:nvPr>
+        </p:nvSpPr>
+        <p:spPr>
+          <a:xfrm>
+            <a:off x="838200" y="1811034"/>
+            <a:ext cx="10515600" cy="4351338"/>
+          </a:xfrm>
+        </p:spPr>
+        <p:txBody>
+          <a:bodyPr/>
+          <a:lstStyle/>
+          <a:p>
+            <a:r>
+              <a:rPr lang="en-US" dirty="0"/>
+              <a:t>ARIMA</a:t>
+            </a:r>
+          </a:p>
+          <a:p>
+            <a:pPr lvl="1"/>
+            <a:r>
+              <a:rPr lang="en-US" dirty="0"/>
+              <a:t>Flexible, interpretable, not too complicated to estimate parameters, easy to tweak</a:t>
+            </a:r>
+          </a:p>
+          <a:p>
+            <a:r>
+              <a:rPr lang="en-US" dirty="0"/>
+              <a:t>Prophet</a:t>
+            </a:r>
+          </a:p>
+          <a:p>
+            <a:pPr lvl="1"/>
+            <a:r>
+              <a:rPr lang="en-US" dirty="0"/>
+              <a:t>Great for business-style forecasting (Facebook’s interest), fast, interpretable, holidays, longer seasonality</a:t>
+            </a:r>
+          </a:p>
+          <a:p>
+            <a:r>
+              <a:rPr lang="en-US" dirty="0"/>
+              <a:t>Simple RNN</a:t>
+            </a:r>
+          </a:p>
+          <a:p>
+            <a:pPr lvl="1"/>
+            <a:r>
+              <a:rPr lang="en-US" dirty="0"/>
+              <a:t>Somewhat less complicated than LSTM</a:t>
+            </a:r>
+          </a:p>
+          <a:p>
+            <a:r>
+              <a:rPr lang="en-US" dirty="0"/>
+              <a:t>LSTM</a:t>
+            </a:r>
+          </a:p>
+          <a:p>
+            <a:pPr lvl="1"/>
+            <a:r>
+              <a:rPr lang="en-US" dirty="0"/>
+              <a:t>Highest ceiling, extreme flexibility</a:t>
+            </a:r>
+          </a:p>
+        </p:txBody>
+      </p:sp>
+      <p:sp>
+        <p:nvSpPr>
+          <p:cNvPr id="4" name="Date Placeholder 3">
+            <a:extLst>
+              <a:ext uri="{FF2B5EF4-FFF2-40B4-BE49-F238E27FC236}">
+                <a16:creationId xmlns:a16="http://schemas.microsoft.com/office/drawing/2014/main" id="{8A58F40E-A27B-49B2-B497-6F5BD5CEE0FD}"/>
+              </a:ext>
+            </a:extLst>
+          </p:cNvPr>
+          <p:cNvSpPr>
+            <a:spLocks noGrp="1"/>
+          </p:cNvSpPr>
+          <p:nvPr>
+            <p:ph type="dt" sz="half" idx="10"/>
+          </p:nvPr>
+        </p:nvSpPr>
+        <p:spPr/>
+        <p:txBody>
+          <a:bodyPr/>
+          <a:lstStyle/>
+          <a:p>
+            <a:fld id="{8AAE40A0-A7D8-4DC3-BC9E-BADA32DA2004}" type="datetime4">
+              <a:rPr lang="en-US" smtClean="0"/>
+              <a:t>July 30, 2019</a:t>
+            </a:fld>
+            <a:endParaRPr lang="en-US" dirty="0"/>
+          </a:p>
+        </p:txBody>
+      </p:sp>
+      <p:sp>
+        <p:nvSpPr>
+          <p:cNvPr id="5" name="Footer Placeholder 4">
+            <a:extLst>
+              <a:ext uri="{FF2B5EF4-FFF2-40B4-BE49-F238E27FC236}">
+                <a16:creationId xmlns:a16="http://schemas.microsoft.com/office/drawing/2014/main" id="{4CD04C65-71CE-41A8-A0E2-02185BFF3E8E}"/>
+              </a:ext>
+            </a:extLst>
+          </p:cNvPr>
+          <p:cNvSpPr>
+            <a:spLocks noGrp="1"/>
+          </p:cNvSpPr>
+          <p:nvPr>
+            <p:ph type="ftr" sz="quarter" idx="11"/>
+          </p:nvPr>
+        </p:nvSpPr>
+        <p:spPr/>
+        <p:txBody>
+          <a:bodyPr/>
+          <a:lstStyle/>
+          <a:p>
+            <a:r>
+              <a:rPr lang="en-US"/>
+              <a:t>Digital Scholarship Services </a:t>
+            </a:r>
+            <a:r>
+              <a:rPr lang="en-US">
+                <a:solidFill>
+                  <a:schemeClr val="accent1">
+                    <a:lumMod val="50000"/>
+                  </a:schemeClr>
+                </a:solidFill>
+              </a:rPr>
+              <a:t>| Email</a:t>
+            </a:r>
+            <a:r>
+              <a:rPr lang="en-US"/>
+              <a:t> cf24@rice.edu </a:t>
+            </a:r>
+            <a:r>
+              <a:rPr lang="en-US">
+                <a:solidFill>
+                  <a:schemeClr val="accent1">
+                    <a:lumMod val="50000"/>
+                  </a:schemeClr>
+                </a:solidFill>
+              </a:rPr>
+              <a:t>|</a:t>
+            </a:r>
+            <a:r>
+              <a:rPr lang="en-US"/>
+              <a:t> library.rice.edu/dss</a:t>
+            </a:r>
+            <a:endParaRPr lang="en-US" dirty="0"/>
+          </a:p>
+        </p:txBody>
+      </p:sp>
+      <p:sp>
+        <p:nvSpPr>
+          <p:cNvPr id="6" name="Slide Number Placeholder 5">
+            <a:extLst>
+              <a:ext uri="{FF2B5EF4-FFF2-40B4-BE49-F238E27FC236}">
+                <a16:creationId xmlns:a16="http://schemas.microsoft.com/office/drawing/2014/main" id="{65AF10BF-F78F-40C0-B461-213D5763B751}"/>
+              </a:ext>
+            </a:extLst>
+          </p:cNvPr>
+          <p:cNvSpPr>
+            <a:spLocks noGrp="1"/>
+          </p:cNvSpPr>
+          <p:nvPr>
+            <p:ph type="sldNum" sz="quarter" idx="12"/>
+          </p:nvPr>
+        </p:nvSpPr>
+        <p:spPr/>
+        <p:txBody>
+          <a:bodyPr/>
+          <a:lstStyle/>
+          <a:p>
+            <a:fld id="{D57F1E4F-1CFF-5643-939E-02111984F565}" type="slidenum">
+              <a:rPr lang="en-US" smtClean="0"/>
+              <a:t>71</a:t>
+            </a:fld>
+            <a:endParaRPr lang="en-US" dirty="0"/>
+          </a:p>
+        </p:txBody>
+      </p:sp>
+    </p:spTree>
+    <p:extLst>
+      <p:ext uri="{BB962C8B-B14F-4D97-AF65-F5344CB8AC3E}">
+        <p14:creationId xmlns:p14="http://schemas.microsoft.com/office/powerpoint/2010/main" val="1759267313"/>
+      </p:ext>
+    </p:extLst>
+  </p:cSld>
+  <p:clrMapOvr>
+    <a:masterClrMapping/>
+  </p:clrMapOvr>
+</p:sld>
+</file>
+
+<file path=ppt/slides/slide72.xml><?xml version="1.0" encoding="utf-8"?>
+<p:sld xmlns:a="http://schemas.openxmlformats.org/drawingml/2006/main" xmlns:r="http://schemas.openxmlformats.org/officeDocument/2006/relationships" xmlns:p="http://schemas.openxmlformats.org/presentationml/2006/main">
+  <p:cSld>
+    <p:spTree>
+      <p:nvGrpSpPr>
+        <p:cNvPr id="1" name=""/>
+        <p:cNvGrpSpPr/>
+        <p:nvPr/>
+      </p:nvGrpSpPr>
+      <p:grpSpPr>
+        <a:xfrm>
+          <a:off x="0" y="0"/>
+          <a:ext cx="0" cy="0"/>
+          <a:chOff x="0" y="0"/>
+          <a:chExt cx="0" cy="0"/>
+        </a:xfrm>
+      </p:grpSpPr>
+      <p:sp>
+        <p:nvSpPr>
+          <p:cNvPr id="2" name="Title 1">
+            <a:extLst>
+              <a:ext uri="{FF2B5EF4-FFF2-40B4-BE49-F238E27FC236}">
+                <a16:creationId xmlns:a16="http://schemas.microsoft.com/office/drawing/2014/main" id="{0A17E1CB-6C3C-4BC7-8386-7D3C4C842418}"/>
+              </a:ext>
+            </a:extLst>
+          </p:cNvPr>
+          <p:cNvSpPr>
+            <a:spLocks noGrp="1"/>
+          </p:cNvSpPr>
+          <p:nvPr>
+            <p:ph type="title"/>
+          </p:nvPr>
+        </p:nvSpPr>
+        <p:spPr/>
+        <p:txBody>
+          <a:bodyPr/>
+          <a:lstStyle/>
+          <a:p>
+            <a:r>
+              <a:rPr lang="en-US" dirty="0"/>
+              <a:t>MODEL WEAKNESSES</a:t>
+            </a:r>
+          </a:p>
+        </p:txBody>
+      </p:sp>
+      <p:sp>
+        <p:nvSpPr>
+          <p:cNvPr id="3" name="Content Placeholder 2">
+            <a:extLst>
+              <a:ext uri="{FF2B5EF4-FFF2-40B4-BE49-F238E27FC236}">
+                <a16:creationId xmlns:a16="http://schemas.microsoft.com/office/drawing/2014/main" id="{FAB0179F-E1A1-4EC1-ADBD-FF50D7EA5440}"/>
+              </a:ext>
+            </a:extLst>
+          </p:cNvPr>
+          <p:cNvSpPr>
+            <a:spLocks noGrp="1"/>
+          </p:cNvSpPr>
+          <p:nvPr>
+            <p:ph idx="1"/>
+          </p:nvPr>
+        </p:nvSpPr>
+        <p:spPr>
+          <a:xfrm>
+            <a:off x="838200" y="1811034"/>
+            <a:ext cx="10515600" cy="4351338"/>
+          </a:xfrm>
+        </p:spPr>
+        <p:txBody>
+          <a:bodyPr/>
+          <a:lstStyle/>
+          <a:p>
+            <a:r>
+              <a:rPr lang="en-US" dirty="0"/>
+              <a:t>ARIMA</a:t>
+            </a:r>
+          </a:p>
+          <a:p>
+            <a:pPr lvl="1"/>
+            <a:r>
+              <a:rPr lang="en-US" dirty="0"/>
+              <a:t>Not great at longer seasonal trends, never forgets</a:t>
+            </a:r>
+          </a:p>
+          <a:p>
+            <a:r>
+              <a:rPr lang="en-US" dirty="0"/>
+              <a:t>Prophet</a:t>
+            </a:r>
+          </a:p>
+          <a:p>
+            <a:pPr lvl="1"/>
+            <a:r>
+              <a:rPr lang="en-US" dirty="0"/>
+              <a:t>Annoying interface, </a:t>
+            </a:r>
+          </a:p>
+          <a:p>
+            <a:r>
+              <a:rPr lang="en-US" dirty="0"/>
+              <a:t>Simple RNN</a:t>
+            </a:r>
+          </a:p>
+          <a:p>
+            <a:pPr lvl="1"/>
+            <a:r>
+              <a:rPr lang="en-US" dirty="0"/>
+              <a:t>All the drawbacks of LSTM, but also less flexibility</a:t>
+            </a:r>
+          </a:p>
+          <a:p>
+            <a:r>
+              <a:rPr lang="en-US" dirty="0"/>
+              <a:t>LSTM</a:t>
+            </a:r>
+          </a:p>
+          <a:p>
+            <a:pPr lvl="1"/>
+            <a:r>
+              <a:rPr lang="en-US" dirty="0"/>
+              <a:t>Can be very finicky to train, uninterpretable, extremely slow and resource-intensive</a:t>
+            </a:r>
+          </a:p>
+        </p:txBody>
+      </p:sp>
+      <p:sp>
+        <p:nvSpPr>
+          <p:cNvPr id="4" name="Date Placeholder 3">
+            <a:extLst>
+              <a:ext uri="{FF2B5EF4-FFF2-40B4-BE49-F238E27FC236}">
+                <a16:creationId xmlns:a16="http://schemas.microsoft.com/office/drawing/2014/main" id="{8A58F40E-A27B-49B2-B497-6F5BD5CEE0FD}"/>
+              </a:ext>
+            </a:extLst>
+          </p:cNvPr>
+          <p:cNvSpPr>
+            <a:spLocks noGrp="1"/>
+          </p:cNvSpPr>
+          <p:nvPr>
+            <p:ph type="dt" sz="half" idx="10"/>
+          </p:nvPr>
+        </p:nvSpPr>
+        <p:spPr/>
+        <p:txBody>
+          <a:bodyPr/>
+          <a:lstStyle/>
+          <a:p>
+            <a:fld id="{8AAE40A0-A7D8-4DC3-BC9E-BADA32DA2004}" type="datetime4">
+              <a:rPr lang="en-US" smtClean="0"/>
+              <a:t>July 30, 2019</a:t>
+            </a:fld>
+            <a:endParaRPr lang="en-US" dirty="0"/>
+          </a:p>
+        </p:txBody>
+      </p:sp>
+      <p:sp>
+        <p:nvSpPr>
+          <p:cNvPr id="5" name="Footer Placeholder 4">
+            <a:extLst>
+              <a:ext uri="{FF2B5EF4-FFF2-40B4-BE49-F238E27FC236}">
+                <a16:creationId xmlns:a16="http://schemas.microsoft.com/office/drawing/2014/main" id="{4CD04C65-71CE-41A8-A0E2-02185BFF3E8E}"/>
+              </a:ext>
+            </a:extLst>
+          </p:cNvPr>
+          <p:cNvSpPr>
+            <a:spLocks noGrp="1"/>
+          </p:cNvSpPr>
+          <p:nvPr>
+            <p:ph type="ftr" sz="quarter" idx="11"/>
+          </p:nvPr>
+        </p:nvSpPr>
+        <p:spPr/>
+        <p:txBody>
+          <a:bodyPr/>
+          <a:lstStyle/>
+          <a:p>
+            <a:r>
+              <a:rPr lang="en-US"/>
+              <a:t>Digital Scholarship Services </a:t>
+            </a:r>
+            <a:r>
+              <a:rPr lang="en-US">
+                <a:solidFill>
+                  <a:schemeClr val="accent1">
+                    <a:lumMod val="50000"/>
+                  </a:schemeClr>
+                </a:solidFill>
+              </a:rPr>
+              <a:t>| Email</a:t>
+            </a:r>
+            <a:r>
+              <a:rPr lang="en-US"/>
+              <a:t> cf24@rice.edu </a:t>
+            </a:r>
+            <a:r>
+              <a:rPr lang="en-US">
+                <a:solidFill>
+                  <a:schemeClr val="accent1">
+                    <a:lumMod val="50000"/>
+                  </a:schemeClr>
+                </a:solidFill>
+              </a:rPr>
+              <a:t>|</a:t>
+            </a:r>
+            <a:r>
+              <a:rPr lang="en-US"/>
+              <a:t> library.rice.edu/dss</a:t>
+            </a:r>
+            <a:endParaRPr lang="en-US" dirty="0"/>
+          </a:p>
+        </p:txBody>
+      </p:sp>
+      <p:sp>
+        <p:nvSpPr>
+          <p:cNvPr id="6" name="Slide Number Placeholder 5">
+            <a:extLst>
+              <a:ext uri="{FF2B5EF4-FFF2-40B4-BE49-F238E27FC236}">
+                <a16:creationId xmlns:a16="http://schemas.microsoft.com/office/drawing/2014/main" id="{65AF10BF-F78F-40C0-B461-213D5763B751}"/>
+              </a:ext>
+            </a:extLst>
+          </p:cNvPr>
+          <p:cNvSpPr>
+            <a:spLocks noGrp="1"/>
+          </p:cNvSpPr>
+          <p:nvPr>
+            <p:ph type="sldNum" sz="quarter" idx="12"/>
+          </p:nvPr>
+        </p:nvSpPr>
+        <p:spPr/>
+        <p:txBody>
+          <a:bodyPr/>
+          <a:lstStyle/>
+          <a:p>
+            <a:fld id="{D57F1E4F-1CFF-5643-939E-02111984F565}" type="slidenum">
+              <a:rPr lang="en-US" smtClean="0"/>
+              <a:t>72</a:t>
+            </a:fld>
+            <a:endParaRPr lang="en-US" dirty="0"/>
+          </a:p>
+        </p:txBody>
+      </p:sp>
+    </p:spTree>
+    <p:extLst>
+      <p:ext uri="{BB962C8B-B14F-4D97-AF65-F5344CB8AC3E}">
+        <p14:creationId xmlns:p14="http://schemas.microsoft.com/office/powerpoint/2010/main" val="2589269930"/>
+      </p:ext>
+    </p:extLst>
+  </p:cSld>
+  <p:clrMapOvr>
+    <a:masterClrMapping/>
+  </p:clrMapOvr>
+</p:sld>
+</file>
+
+<file path=ppt/slides/slide73.xml><?xml version="1.0" encoding="utf-8"?>
+<p:sld xmlns:a="http://schemas.openxmlformats.org/drawingml/2006/main" xmlns:r="http://schemas.openxmlformats.org/officeDocument/2006/relationships" xmlns:p="http://schemas.openxmlformats.org/presentationml/2006/main">
+  <p:cSld>
+    <p:spTree>
+      <p:nvGrpSpPr>
+        <p:cNvPr id="1" name=""/>
+        <p:cNvGrpSpPr/>
+        <p:nvPr/>
+      </p:nvGrpSpPr>
+      <p:grpSpPr>
+        <a:xfrm>
+          <a:off x="0" y="0"/>
+          <a:ext cx="0" cy="0"/>
+          <a:chOff x="0" y="0"/>
+          <a:chExt cx="0" cy="0"/>
+        </a:xfrm>
+      </p:grpSpPr>
+      <p:sp>
+        <p:nvSpPr>
+          <p:cNvPr id="2" name="Title 1">
+            <a:extLst>
+              <a:ext uri="{FF2B5EF4-FFF2-40B4-BE49-F238E27FC236}">
+                <a16:creationId xmlns:a16="http://schemas.microsoft.com/office/drawing/2014/main" id="{0A17E1CB-6C3C-4BC7-8386-7D3C4C842418}"/>
+              </a:ext>
+            </a:extLst>
+          </p:cNvPr>
+          <p:cNvSpPr>
+            <a:spLocks noGrp="1"/>
+          </p:cNvSpPr>
+          <p:nvPr>
+            <p:ph type="title"/>
+          </p:nvPr>
+        </p:nvSpPr>
+        <p:spPr/>
+        <p:txBody>
+          <a:bodyPr/>
+          <a:lstStyle/>
+          <a:p>
+            <a:r>
+              <a:rPr lang="en-US" dirty="0"/>
+              <a:t>MY PERSONAL ADVICE</a:t>
+            </a:r>
+          </a:p>
+        </p:txBody>
+      </p:sp>
+      <p:sp>
+        <p:nvSpPr>
+          <p:cNvPr id="3" name="Content Placeholder 2">
+            <a:extLst>
+              <a:ext uri="{FF2B5EF4-FFF2-40B4-BE49-F238E27FC236}">
+                <a16:creationId xmlns:a16="http://schemas.microsoft.com/office/drawing/2014/main" id="{FAB0179F-E1A1-4EC1-ADBD-FF50D7EA5440}"/>
+              </a:ext>
+            </a:extLst>
+          </p:cNvPr>
+          <p:cNvSpPr>
+            <a:spLocks noGrp="1"/>
+          </p:cNvSpPr>
+          <p:nvPr>
+            <p:ph idx="1"/>
+          </p:nvPr>
+        </p:nvSpPr>
+        <p:spPr>
+          <a:xfrm>
+            <a:off x="838200" y="1811034"/>
+            <a:ext cx="10515600" cy="4351338"/>
+          </a:xfrm>
+        </p:spPr>
+        <p:txBody>
+          <a:bodyPr>
+            <a:normAutofit fontScale="92500"/>
+          </a:bodyPr>
+          <a:lstStyle/>
+          <a:p>
+            <a:r>
+              <a:rPr lang="en-US" dirty="0"/>
+              <a:t>Visualize your data extensively</a:t>
+            </a:r>
+          </a:p>
+          <a:p>
+            <a:pPr lvl="1"/>
+            <a:r>
+              <a:rPr lang="en-US" dirty="0"/>
+              <a:t>Lots of great insights can be found</a:t>
+            </a:r>
+          </a:p>
+          <a:p>
+            <a:pPr lvl="1"/>
+            <a:r>
+              <a:rPr lang="en-US" dirty="0"/>
+              <a:t>Lagged scatterplots, plots by day/week/hour of day</a:t>
+            </a:r>
+            <a:r>
+              <a:rPr lang="en-US"/>
+              <a:t>, (partial</a:t>
+            </a:r>
+            <a:r>
+              <a:rPr lang="en-US" dirty="0"/>
+              <a:t>)-autocorrelation plots</a:t>
+            </a:r>
+          </a:p>
+          <a:p>
+            <a:r>
+              <a:rPr lang="en-US" dirty="0"/>
+              <a:t>Make it stationary</a:t>
+            </a:r>
+          </a:p>
+          <a:p>
+            <a:pPr lvl="1"/>
+            <a:r>
+              <a:rPr lang="en-US" dirty="0"/>
+              <a:t>This will help you understand the data more</a:t>
+            </a:r>
+          </a:p>
+          <a:p>
+            <a:r>
+              <a:rPr lang="en-US" dirty="0"/>
+              <a:t>Start with a Prophet model</a:t>
+            </a:r>
+          </a:p>
+          <a:p>
+            <a:pPr lvl="1"/>
+            <a:r>
+              <a:rPr lang="en-US" dirty="0"/>
+              <a:t>Quick and fast</a:t>
+            </a:r>
+          </a:p>
+          <a:p>
+            <a:r>
+              <a:rPr lang="en-US" dirty="0"/>
+              <a:t>Try out a few ARIMA models</a:t>
+            </a:r>
+          </a:p>
+          <a:p>
+            <a:pPr lvl="1"/>
+            <a:r>
+              <a:rPr lang="en-US" dirty="0"/>
+              <a:t>Tweak the parameters a little bit</a:t>
+            </a:r>
+          </a:p>
+          <a:p>
+            <a:r>
+              <a:rPr lang="en-US" dirty="0"/>
+              <a:t>If, and only if, these models don’t meet your needs, build and tune an LSTM</a:t>
+            </a:r>
+          </a:p>
+        </p:txBody>
+      </p:sp>
+      <p:sp>
+        <p:nvSpPr>
+          <p:cNvPr id="4" name="Date Placeholder 3">
+            <a:extLst>
+              <a:ext uri="{FF2B5EF4-FFF2-40B4-BE49-F238E27FC236}">
+                <a16:creationId xmlns:a16="http://schemas.microsoft.com/office/drawing/2014/main" id="{8A58F40E-A27B-49B2-B497-6F5BD5CEE0FD}"/>
+              </a:ext>
+            </a:extLst>
+          </p:cNvPr>
+          <p:cNvSpPr>
+            <a:spLocks noGrp="1"/>
+          </p:cNvSpPr>
+          <p:nvPr>
+            <p:ph type="dt" sz="half" idx="10"/>
+          </p:nvPr>
+        </p:nvSpPr>
+        <p:spPr/>
+        <p:txBody>
+          <a:bodyPr/>
+          <a:lstStyle/>
+          <a:p>
+            <a:fld id="{8AAE40A0-A7D8-4DC3-BC9E-BADA32DA2004}" type="datetime4">
+              <a:rPr lang="en-US" smtClean="0"/>
+              <a:t>July 30, 2019</a:t>
+            </a:fld>
+            <a:endParaRPr lang="en-US" dirty="0"/>
+          </a:p>
+        </p:txBody>
+      </p:sp>
+      <p:sp>
+        <p:nvSpPr>
+          <p:cNvPr id="5" name="Footer Placeholder 4">
+            <a:extLst>
+              <a:ext uri="{FF2B5EF4-FFF2-40B4-BE49-F238E27FC236}">
+                <a16:creationId xmlns:a16="http://schemas.microsoft.com/office/drawing/2014/main" id="{4CD04C65-71CE-41A8-A0E2-02185BFF3E8E}"/>
+              </a:ext>
+            </a:extLst>
+          </p:cNvPr>
+          <p:cNvSpPr>
+            <a:spLocks noGrp="1"/>
+          </p:cNvSpPr>
+          <p:nvPr>
+            <p:ph type="ftr" sz="quarter" idx="11"/>
+          </p:nvPr>
+        </p:nvSpPr>
+        <p:spPr/>
+        <p:txBody>
+          <a:bodyPr/>
+          <a:lstStyle/>
+          <a:p>
+            <a:r>
+              <a:rPr lang="en-US"/>
+              <a:t>Digital Scholarship Services </a:t>
+            </a:r>
+            <a:r>
+              <a:rPr lang="en-US">
+                <a:solidFill>
+                  <a:schemeClr val="accent1">
+                    <a:lumMod val="50000"/>
+                  </a:schemeClr>
+                </a:solidFill>
+              </a:rPr>
+              <a:t>| Email</a:t>
+            </a:r>
+            <a:r>
+              <a:rPr lang="en-US"/>
+              <a:t> cf24@rice.edu </a:t>
+            </a:r>
+            <a:r>
+              <a:rPr lang="en-US">
+                <a:solidFill>
+                  <a:schemeClr val="accent1">
+                    <a:lumMod val="50000"/>
+                  </a:schemeClr>
+                </a:solidFill>
+              </a:rPr>
+              <a:t>|</a:t>
+            </a:r>
+            <a:r>
+              <a:rPr lang="en-US"/>
+              <a:t> library.rice.edu/dss</a:t>
+            </a:r>
+            <a:endParaRPr lang="en-US" dirty="0"/>
+          </a:p>
+        </p:txBody>
+      </p:sp>
+      <p:sp>
+        <p:nvSpPr>
+          <p:cNvPr id="6" name="Slide Number Placeholder 5">
+            <a:extLst>
+              <a:ext uri="{FF2B5EF4-FFF2-40B4-BE49-F238E27FC236}">
+                <a16:creationId xmlns:a16="http://schemas.microsoft.com/office/drawing/2014/main" id="{65AF10BF-F78F-40C0-B461-213D5763B751}"/>
+              </a:ext>
+            </a:extLst>
+          </p:cNvPr>
+          <p:cNvSpPr>
+            <a:spLocks noGrp="1"/>
+          </p:cNvSpPr>
+          <p:nvPr>
+            <p:ph type="sldNum" sz="quarter" idx="12"/>
+          </p:nvPr>
+        </p:nvSpPr>
+        <p:spPr/>
+        <p:txBody>
+          <a:bodyPr/>
+          <a:lstStyle/>
+          <a:p>
+            <a:fld id="{D57F1E4F-1CFF-5643-939E-02111984F565}" type="slidenum">
+              <a:rPr lang="en-US" smtClean="0"/>
+              <a:t>73</a:t>
+            </a:fld>
+            <a:endParaRPr lang="en-US" dirty="0"/>
+          </a:p>
+        </p:txBody>
+      </p:sp>
+    </p:spTree>
+    <p:extLst>
+      <p:ext uri="{BB962C8B-B14F-4D97-AF65-F5344CB8AC3E}">
+        <p14:creationId xmlns:p14="http://schemas.microsoft.com/office/powerpoint/2010/main" val="2224208961"/>
+      </p:ext>
+    </p:extLst>
+  </p:cSld>
+  <p:clrMapOvr>
+    <a:masterClrMapping/>
+  </p:clrMapOvr>
+</p:sld>
+</file>
+
+<file path=ppt/slides/slide74.xml><?xml version="1.0" encoding="utf-8"?>
+<p:sld xmlns:a="http://schemas.openxmlformats.org/drawingml/2006/main" xmlns:r="http://schemas.openxmlformats.org/officeDocument/2006/relationships" xmlns:p="http://schemas.openxmlformats.org/presentationml/2006/main">
+  <p:cSld>
+    <p:spTree>
+      <p:nvGrpSpPr>
+        <p:cNvPr id="1" name=""/>
+        <p:cNvGrpSpPr/>
+        <p:nvPr/>
+      </p:nvGrpSpPr>
+      <p:grpSpPr>
+        <a:xfrm>
+          <a:off x="0" y="0"/>
+          <a:ext cx="0" cy="0"/>
+          <a:chOff x="0" y="0"/>
+          <a:chExt cx="0" cy="0"/>
+        </a:xfrm>
+      </p:grpSpPr>
+      <p:sp>
+        <p:nvSpPr>
+          <p:cNvPr id="7" name="Title 6">
+            <a:extLst>
+              <a:ext uri="{FF2B5EF4-FFF2-40B4-BE49-F238E27FC236}">
+                <a16:creationId xmlns:a16="http://schemas.microsoft.com/office/drawing/2014/main" id="{495B4BC0-844B-4414-A623-BEF78AAC1BA1}"/>
+              </a:ext>
+            </a:extLst>
+          </p:cNvPr>
+          <p:cNvSpPr>
+            <a:spLocks noGrp="1"/>
+          </p:cNvSpPr>
+          <p:nvPr>
+            <p:ph type="title"/>
+          </p:nvPr>
+        </p:nvSpPr>
+        <p:spPr/>
+        <p:txBody>
+          <a:bodyPr/>
+          <a:lstStyle/>
+          <a:p>
+            <a:r>
+              <a:rPr lang="en-US" dirty="0"/>
+              <a:t>ACKNOWLEDGMENTS</a:t>
+            </a:r>
+          </a:p>
+        </p:txBody>
+      </p:sp>
+      <p:sp>
+        <p:nvSpPr>
+          <p:cNvPr id="8" name="Content Placeholder 7">
+            <a:extLst>
+              <a:ext uri="{FF2B5EF4-FFF2-40B4-BE49-F238E27FC236}">
+                <a16:creationId xmlns:a16="http://schemas.microsoft.com/office/drawing/2014/main" id="{2BED3EB3-7E98-4A82-8335-7321D9E37B16}"/>
+              </a:ext>
+            </a:extLst>
+          </p:cNvPr>
+          <p:cNvSpPr>
+            <a:spLocks noGrp="1"/>
+          </p:cNvSpPr>
+          <p:nvPr>
+            <p:ph idx="1"/>
+          </p:nvPr>
+        </p:nvSpPr>
+        <p:spPr/>
+        <p:txBody>
+          <a:bodyPr/>
+          <a:lstStyle/>
+          <a:p>
+            <a:r>
+              <a:rPr lang="en-US" dirty="0"/>
+              <a:t>Plots were created using the ggplot2 package in R</a:t>
+            </a:r>
+          </a:p>
+          <a:p>
+            <a:r>
+              <a:rPr lang="en-US" dirty="0"/>
+              <a:t>Shumway and </a:t>
+            </a:r>
+            <a:r>
+              <a:rPr lang="en-US" dirty="0" err="1"/>
+              <a:t>Stoffer’s</a:t>
+            </a:r>
+            <a:r>
+              <a:rPr lang="en-US" dirty="0"/>
+              <a:t> </a:t>
+            </a:r>
+            <a:r>
+              <a:rPr lang="en-US" i="1" dirty="0"/>
+              <a:t>Time Series Analysis and Its Applications With R Examples, Fourth Edition </a:t>
+            </a:r>
+            <a:r>
+              <a:rPr lang="en-US" dirty="0"/>
+              <a:t>published by Springer was used as the main reference for the ARIMA section</a:t>
+            </a:r>
+          </a:p>
+          <a:p>
+            <a:r>
+              <a:rPr lang="en-US" i="1" dirty="0"/>
+              <a:t>Forecasting at Scale </a:t>
+            </a:r>
+            <a:r>
+              <a:rPr lang="en-US" dirty="0"/>
+              <a:t>by Sean J. Taylor and Benjamin </a:t>
+            </a:r>
+            <a:r>
+              <a:rPr lang="en-US" dirty="0" err="1"/>
+              <a:t>Letham</a:t>
+            </a:r>
+            <a:r>
+              <a:rPr lang="en-US" dirty="0"/>
+              <a:t> at Facebook was used as the main reference for the Prophet section</a:t>
+            </a:r>
+          </a:p>
+          <a:p>
+            <a:r>
+              <a:rPr lang="en-US" dirty="0"/>
+              <a:t>The pictures under Neural Networks are licensed for free use under Wikimedia Commons.</a:t>
+            </a:r>
+          </a:p>
+          <a:p>
+            <a:endParaRPr lang="en-US" dirty="0"/>
+          </a:p>
+        </p:txBody>
+      </p:sp>
+      <p:sp>
+        <p:nvSpPr>
+          <p:cNvPr id="4" name="Date Placeholder 3">
+            <a:extLst>
+              <a:ext uri="{FF2B5EF4-FFF2-40B4-BE49-F238E27FC236}">
+                <a16:creationId xmlns:a16="http://schemas.microsoft.com/office/drawing/2014/main" id="{540F37F1-4F33-429F-A568-1A3ADC499E54}"/>
+              </a:ext>
+            </a:extLst>
+          </p:cNvPr>
+          <p:cNvSpPr>
+            <a:spLocks noGrp="1"/>
+          </p:cNvSpPr>
+          <p:nvPr>
+            <p:ph type="dt" sz="half" idx="10"/>
+          </p:nvPr>
+        </p:nvSpPr>
+        <p:spPr/>
+        <p:txBody>
+          <a:bodyPr/>
+          <a:lstStyle/>
+          <a:p>
+            <a:fld id="{B08FEED8-D7D4-44E9-BFBC-ED06B5996D94}" type="datetime4">
+              <a:rPr lang="en-US" smtClean="0"/>
+              <a:t>July 30, 2019</a:t>
+            </a:fld>
+            <a:endParaRPr lang="en-US" dirty="0"/>
+          </a:p>
+        </p:txBody>
+      </p:sp>
+      <p:sp>
+        <p:nvSpPr>
+          <p:cNvPr id="5" name="Footer Placeholder 4">
+            <a:extLst>
+              <a:ext uri="{FF2B5EF4-FFF2-40B4-BE49-F238E27FC236}">
+                <a16:creationId xmlns:a16="http://schemas.microsoft.com/office/drawing/2014/main" id="{673FFA57-C126-4795-A5F6-DD33AAC5ACBD}"/>
+              </a:ext>
+            </a:extLst>
+          </p:cNvPr>
+          <p:cNvSpPr>
+            <a:spLocks noGrp="1"/>
+          </p:cNvSpPr>
+          <p:nvPr>
+            <p:ph type="ftr" sz="quarter" idx="11"/>
+          </p:nvPr>
+        </p:nvSpPr>
+        <p:spPr/>
+        <p:txBody>
+          <a:bodyPr/>
+          <a:lstStyle/>
+          <a:p>
+            <a:r>
+              <a:rPr lang="en-US"/>
+              <a:t>Digital Scholarship Services </a:t>
+            </a:r>
+            <a:r>
+              <a:rPr lang="en-US">
+                <a:solidFill>
+                  <a:schemeClr val="accent1">
+                    <a:lumMod val="50000"/>
+                  </a:schemeClr>
+                </a:solidFill>
+              </a:rPr>
+              <a:t>| Email</a:t>
+            </a:r>
+            <a:r>
+              <a:rPr lang="en-US"/>
+              <a:t> cf24@rice.edu </a:t>
+            </a:r>
+            <a:r>
+              <a:rPr lang="en-US">
+                <a:solidFill>
+                  <a:schemeClr val="accent1">
+                    <a:lumMod val="50000"/>
+                  </a:schemeClr>
+                </a:solidFill>
+              </a:rPr>
+              <a:t>|</a:t>
+            </a:r>
+            <a:r>
+              <a:rPr lang="en-US"/>
+              <a:t> library.rice.edu/dss</a:t>
+            </a:r>
+            <a:endParaRPr lang="en-US" dirty="0"/>
+          </a:p>
+        </p:txBody>
+      </p:sp>
+      <p:sp>
+        <p:nvSpPr>
+          <p:cNvPr id="6" name="Slide Number Placeholder 5">
+            <a:extLst>
+              <a:ext uri="{FF2B5EF4-FFF2-40B4-BE49-F238E27FC236}">
+                <a16:creationId xmlns:a16="http://schemas.microsoft.com/office/drawing/2014/main" id="{2FA49567-BB70-4798-8746-D0B522CCEE20}"/>
+              </a:ext>
+            </a:extLst>
+          </p:cNvPr>
+          <p:cNvSpPr>
+            <a:spLocks noGrp="1"/>
+          </p:cNvSpPr>
+          <p:nvPr>
+            <p:ph type="sldNum" sz="quarter" idx="12"/>
+          </p:nvPr>
+        </p:nvSpPr>
+        <p:spPr/>
+        <p:txBody>
+          <a:bodyPr/>
+          <a:lstStyle/>
+          <a:p>
+            <a:fld id="{D57F1E4F-1CFF-5643-939E-02111984F565}" type="slidenum">
+              <a:rPr lang="en-US" smtClean="0"/>
+              <a:t>74</a:t>
+            </a:fld>
+            <a:endParaRPr lang="en-US" dirty="0"/>
+          </a:p>
+        </p:txBody>
+      </p:sp>
+    </p:spTree>
+    <p:extLst>
+      <p:ext uri="{BB962C8B-B14F-4D97-AF65-F5344CB8AC3E}">
+        <p14:creationId xmlns:p14="http://schemas.microsoft.com/office/powerpoint/2010/main" val="1585568494"/>
       </p:ext>
     </p:extLst>
   </p:cSld>

</xml_diff>